<commit_message>
Lots of small fixes (read updates) in Hartmut's Section   But lots left to do (for Hartmut)
  Minor update in SAGA-Intro-Conclusion.pptx



git-svn-id: file://localhost/tmp/svn2git/svn@3256 defb5e50-622e-49ec-a68e-d72c7db87b45
</commit_message>
<xml_diff>
--- a/tutorial/general_tutorial/SAGA-API-levels.pptx
+++ b/tutorial/general_tutorial/SAGA-API-levels.pptx
@@ -1,6 +1,6 @@
 
 <file path=ppt/presentation.xml><?xml version="1.0" encoding="utf-8"?>
-<p:presentation xmlns:a="http://schemas.openxmlformats.org/drawingml/2006/main" xmlns:r="http://schemas.openxmlformats.org/officeDocument/2006/relationships" xmlns:p="http://schemas.openxmlformats.org/presentationml/2006/main" showSpecialPlsOnTitleSld="0" strictFirstAndLastChars="0" saveSubsetFonts="1">
+<p:presentation xmlns:a="http://schemas.openxmlformats.org/drawingml/2006/main" xmlns:r="http://schemas.openxmlformats.org/officeDocument/2006/relationships" xmlns:mc="http://schemas.openxmlformats.org/markup-compatibility/2006" xmlns:mv="urn:schemas-microsoft-com:mac:vml" xmlns:p="http://schemas.openxmlformats.org/presentationml/2006/main" mc:Ignorable="mv" mc:PreserveAttributes="mv:*" showSpecialPlsOnTitleSld="0" strictFirstAndLastChars="0" saveSubsetFonts="1">
   <p:sldMasterIdLst>
     <p:sldMasterId id="2147483701" r:id="rId1"/>
   </p:sldMasterIdLst>
@@ -175,7 +175,7 @@
 </file>
 
 <file path=ppt/notesMasters/notesMaster1.xml><?xml version="1.0" encoding="utf-8"?>
-<p:notesMaster xmlns:a="http://schemas.openxmlformats.org/drawingml/2006/main" xmlns:r="http://schemas.openxmlformats.org/officeDocument/2006/relationships" xmlns:p="http://schemas.openxmlformats.org/presentationml/2006/main">
+<p:notesMaster xmlns:a="http://schemas.openxmlformats.org/drawingml/2006/main" xmlns:r="http://schemas.openxmlformats.org/officeDocument/2006/relationships" xmlns:mc="http://schemas.openxmlformats.org/markup-compatibility/2006" xmlns:mv="urn:schemas-microsoft-com:mac:vml" xmlns:p="http://schemas.openxmlformats.org/presentationml/2006/main" mc:Ignorable="mv" mc:PreserveAttributes="mv:*">
   <p:cSld>
     <p:bg>
       <p:bgRef idx="1001">
@@ -257,7 +257,7 @@
             <a:fld id="{FD89E5DE-5FFC-4DBE-9A7F-2C9F568D0D45}" type="datetimeFigureOut">
               <a:rPr lang="en-US" smtClean="0"/>
               <a:pPr/>
-              <a:t>10/20/2010</a:t>
+              <a:t>11/28/10</a:t>
             </a:fld>
             <a:endParaRPr lang="en-US"/>
           </a:p>
@@ -428,7 +428,7 @@
     </p:spTree>
     <p:extLst>
       <p:ext uri="{BB962C8B-B14F-4D97-AF65-F5344CB8AC3E}">
-        <p14:creationId xmlns:p14="http://schemas.microsoft.com/office/powerpoint/2010/main" val="2265826956"/>
+        <p14:creationId xmlns:p14="http://schemas.microsoft.com/office/powerpoint/2010/main" xmlns:p="http://schemas.openxmlformats.org/presentationml/2006/main" xmlns:r="http://schemas.openxmlformats.org/officeDocument/2006/relationships" xmlns:a="http://schemas.openxmlformats.org/drawingml/2006/main" xmlns="" val="2265826956"/>
       </p:ext>
     </p:extLst>
   </p:cSld>
@@ -529,7 +529,7 @@
 </file>
 
 <file path=ppt/notesSlides/notesSlide1.xml><?xml version="1.0" encoding="utf-8"?>
-<p:notes xmlns:a="http://schemas.openxmlformats.org/drawingml/2006/main" xmlns:r="http://schemas.openxmlformats.org/officeDocument/2006/relationships" xmlns:p="http://schemas.openxmlformats.org/presentationml/2006/main">
+<p:notes xmlns:a="http://schemas.openxmlformats.org/drawingml/2006/main" xmlns:r="http://schemas.openxmlformats.org/officeDocument/2006/relationships" xmlns:mc="http://schemas.openxmlformats.org/markup-compatibility/2006" xmlns:mv="urn:schemas-microsoft-com:mac:vml" xmlns:p="http://schemas.openxmlformats.org/presentationml/2006/main" mc:Ignorable="mv" mc:PreserveAttributes="mv:*">
   <p:cSld>
     <p:spTree>
       <p:nvGrpSpPr>
@@ -611,7 +611,7 @@
 </file>
 
 <file path=ppt/slideLayouts/slideLayout1.xml><?xml version="1.0" encoding="utf-8"?>
-<p:sldLayout xmlns:a="http://schemas.openxmlformats.org/drawingml/2006/main" xmlns:r="http://schemas.openxmlformats.org/officeDocument/2006/relationships" xmlns:p="http://schemas.openxmlformats.org/presentationml/2006/main" preserve="1">
+<p:sldLayout xmlns:a="http://schemas.openxmlformats.org/drawingml/2006/main" xmlns:r="http://schemas.openxmlformats.org/officeDocument/2006/relationships" xmlns:mc="http://schemas.openxmlformats.org/markup-compatibility/2006" xmlns:mv="urn:schemas-microsoft-com:mac:vml" xmlns:p="http://schemas.openxmlformats.org/presentationml/2006/main" mc:Ignorable="mv" mc:PreserveAttributes="mv:*" preserve="1">
   <p:cSld name="Title Slide">
     <p:spTree>
       <p:nvGrpSpPr>
@@ -839,7 +839,7 @@
 </file>
 
 <file path=ppt/slideLayouts/slideLayout10.xml><?xml version="1.0" encoding="utf-8"?>
-<p:sldLayout xmlns:a="http://schemas.openxmlformats.org/drawingml/2006/main" xmlns:r="http://schemas.openxmlformats.org/officeDocument/2006/relationships" xmlns:p="http://schemas.openxmlformats.org/presentationml/2006/main" type="picTx" preserve="1">
+<p:sldLayout xmlns:a="http://schemas.openxmlformats.org/drawingml/2006/main" xmlns:r="http://schemas.openxmlformats.org/officeDocument/2006/relationships" xmlns:mc="http://schemas.openxmlformats.org/markup-compatibility/2006" xmlns:mv="urn:schemas-microsoft-com:mac:vml" xmlns:p="http://schemas.openxmlformats.org/presentationml/2006/main" mc:Ignorable="mv" mc:PreserveAttributes="mv:*" type="picTx" preserve="1">
   <p:cSld name="Picture with Caption">
     <p:spTree>
       <p:nvGrpSpPr>
@@ -1165,7 +1165,7 @@
 </file>
 
 <file path=ppt/slideLayouts/slideLayout11.xml><?xml version="1.0" encoding="utf-8"?>
-<p:sldLayout xmlns:a="http://schemas.openxmlformats.org/drawingml/2006/main" xmlns:r="http://schemas.openxmlformats.org/officeDocument/2006/relationships" xmlns:p="http://schemas.openxmlformats.org/presentationml/2006/main" preserve="1">
+<p:sldLayout xmlns:a="http://schemas.openxmlformats.org/drawingml/2006/main" xmlns:r="http://schemas.openxmlformats.org/officeDocument/2006/relationships" xmlns:mc="http://schemas.openxmlformats.org/markup-compatibility/2006" xmlns:mv="urn:schemas-microsoft-com:mac:vml" xmlns:p="http://schemas.openxmlformats.org/presentationml/2006/main" mc:Ignorable="mv" mc:PreserveAttributes="mv:*" preserve="1">
   <p:cSld name="Picture above Caption">
     <p:spTree>
       <p:nvGrpSpPr>
@@ -1455,7 +1455,7 @@
 </file>
 
 <file path=ppt/slideLayouts/slideLayout12.xml><?xml version="1.0" encoding="utf-8"?>
-<p:sldLayout xmlns:a="http://schemas.openxmlformats.org/drawingml/2006/main" xmlns:r="http://schemas.openxmlformats.org/officeDocument/2006/relationships" xmlns:p="http://schemas.openxmlformats.org/presentationml/2006/main" preserve="1">
+<p:sldLayout xmlns:a="http://schemas.openxmlformats.org/drawingml/2006/main" xmlns:r="http://schemas.openxmlformats.org/officeDocument/2006/relationships" xmlns:mc="http://schemas.openxmlformats.org/markup-compatibility/2006" xmlns:mv="urn:schemas-microsoft-com:mac:vml" xmlns:p="http://schemas.openxmlformats.org/presentationml/2006/main" mc:Ignorable="mv" mc:PreserveAttributes="mv:*" preserve="1">
   <p:cSld name="2 Pictures with Caption">
     <p:spTree>
       <p:nvGrpSpPr>
@@ -1785,7 +1785,7 @@
 </file>
 
 <file path=ppt/slideLayouts/slideLayout13.xml><?xml version="1.0" encoding="utf-8"?>
-<p:sldLayout xmlns:a="http://schemas.openxmlformats.org/drawingml/2006/main" xmlns:r="http://schemas.openxmlformats.org/officeDocument/2006/relationships" xmlns:p="http://schemas.openxmlformats.org/presentationml/2006/main" preserve="1">
+<p:sldLayout xmlns:a="http://schemas.openxmlformats.org/drawingml/2006/main" xmlns:r="http://schemas.openxmlformats.org/officeDocument/2006/relationships" xmlns:mc="http://schemas.openxmlformats.org/markup-compatibility/2006" xmlns:mv="urn:schemas-microsoft-com:mac:vml" xmlns:p="http://schemas.openxmlformats.org/presentationml/2006/main" mc:Ignorable="mv" mc:PreserveAttributes="mv:*" preserve="1">
   <p:cSld name="3 Pictures with Caption">
     <p:spTree>
       <p:nvGrpSpPr>
@@ -2150,7 +2150,7 @@
 </file>
 
 <file path=ppt/slideLayouts/slideLayout14.xml><?xml version="1.0" encoding="utf-8"?>
-<p:sldLayout xmlns:a="http://schemas.openxmlformats.org/drawingml/2006/main" xmlns:r="http://schemas.openxmlformats.org/officeDocument/2006/relationships" xmlns:p="http://schemas.openxmlformats.org/presentationml/2006/main" type="vertTx" preserve="1">
+<p:sldLayout xmlns:a="http://schemas.openxmlformats.org/drawingml/2006/main" xmlns:r="http://schemas.openxmlformats.org/officeDocument/2006/relationships" xmlns:mc="http://schemas.openxmlformats.org/markup-compatibility/2006" xmlns:mv="urn:schemas-microsoft-com:mac:vml" xmlns:p="http://schemas.openxmlformats.org/presentationml/2006/main" mc:Ignorable="mv" mc:PreserveAttributes="mv:*" type="vertTx" preserve="1">
   <p:cSld name="Title and Vertical Text">
     <p:spTree>
       <p:nvGrpSpPr>
@@ -2320,7 +2320,7 @@
 </file>
 
 <file path=ppt/slideLayouts/slideLayout15.xml><?xml version="1.0" encoding="utf-8"?>
-<p:sldLayout xmlns:a="http://schemas.openxmlformats.org/drawingml/2006/main" xmlns:r="http://schemas.openxmlformats.org/officeDocument/2006/relationships" xmlns:p="http://schemas.openxmlformats.org/presentationml/2006/main" type="vertTitleAndTx" preserve="1">
+<p:sldLayout xmlns:a="http://schemas.openxmlformats.org/drawingml/2006/main" xmlns:r="http://schemas.openxmlformats.org/officeDocument/2006/relationships" xmlns:mc="http://schemas.openxmlformats.org/markup-compatibility/2006" xmlns:mv="urn:schemas-microsoft-com:mac:vml" xmlns:p="http://schemas.openxmlformats.org/presentationml/2006/main" mc:Ignorable="mv" mc:PreserveAttributes="mv:*" type="vertTitleAndTx" preserve="1">
   <p:cSld name="Vertical Title and Text">
     <p:spTree>
       <p:nvGrpSpPr>
@@ -2500,7 +2500,7 @@
 </file>
 
 <file path=ppt/slideLayouts/slideLayout16.xml><?xml version="1.0" encoding="utf-8"?>
-<p:sldLayout xmlns:a="http://schemas.openxmlformats.org/drawingml/2006/main" xmlns:r="http://schemas.openxmlformats.org/officeDocument/2006/relationships" xmlns:p="http://schemas.openxmlformats.org/presentationml/2006/main" showMasterSp="0" type="title">
+<p:sldLayout xmlns:a="http://schemas.openxmlformats.org/drawingml/2006/main" xmlns:r="http://schemas.openxmlformats.org/officeDocument/2006/relationships" xmlns:mc="http://schemas.openxmlformats.org/markup-compatibility/2006" xmlns:mv="urn:schemas-microsoft-com:mac:vml" xmlns:p="http://schemas.openxmlformats.org/presentationml/2006/main" mc:Ignorable="mv" mc:PreserveAttributes="mv:*" showMasterSp="0" type="title">
   <p:cSld name="1_Title Slide">
     <p:spTree>
       <p:nvGrpSpPr>
@@ -2779,7 +2779,7 @@
 </file>
 
 <file path=ppt/slideLayouts/slideLayout2.xml><?xml version="1.0" encoding="utf-8"?>
-<p:sldLayout xmlns:a="http://schemas.openxmlformats.org/drawingml/2006/main" xmlns:r="http://schemas.openxmlformats.org/officeDocument/2006/relationships" xmlns:p="http://schemas.openxmlformats.org/presentationml/2006/main" type="obj" preserve="1">
+<p:sldLayout xmlns:a="http://schemas.openxmlformats.org/drawingml/2006/main" xmlns:r="http://schemas.openxmlformats.org/officeDocument/2006/relationships" xmlns:mc="http://schemas.openxmlformats.org/markup-compatibility/2006" xmlns:mv="urn:schemas-microsoft-com:mac:vml" xmlns:p="http://schemas.openxmlformats.org/presentationml/2006/main" mc:Ignorable="mv" mc:PreserveAttributes="mv:*" type="obj" preserve="1">
   <p:cSld name="Title and Content">
     <p:spTree>
       <p:nvGrpSpPr>
@@ -3079,7 +3079,7 @@
 </file>
 
 <file path=ppt/slideLayouts/slideLayout3.xml><?xml version="1.0" encoding="utf-8"?>
-<p:sldLayout xmlns:a="http://schemas.openxmlformats.org/drawingml/2006/main" xmlns:r="http://schemas.openxmlformats.org/officeDocument/2006/relationships" xmlns:p="http://schemas.openxmlformats.org/presentationml/2006/main" preserve="1">
+<p:sldLayout xmlns:a="http://schemas.openxmlformats.org/drawingml/2006/main" xmlns:r="http://schemas.openxmlformats.org/officeDocument/2006/relationships" xmlns:mc="http://schemas.openxmlformats.org/markup-compatibility/2006" xmlns:mv="urn:schemas-microsoft-com:mac:vml" xmlns:p="http://schemas.openxmlformats.org/presentationml/2006/main" mc:Ignorable="mv" mc:PreserveAttributes="mv:*" preserve="1">
   <p:cSld name="Title Slide with Picture">
     <p:spTree>
       <p:nvGrpSpPr>
@@ -3364,7 +3364,7 @@
 </file>
 
 <file path=ppt/slideLayouts/slideLayout4.xml><?xml version="1.0" encoding="utf-8"?>
-<p:sldLayout xmlns:a="http://schemas.openxmlformats.org/drawingml/2006/main" xmlns:r="http://schemas.openxmlformats.org/officeDocument/2006/relationships" xmlns:p="http://schemas.openxmlformats.org/presentationml/2006/main" type="secHead" preserve="1">
+<p:sldLayout xmlns:a="http://schemas.openxmlformats.org/drawingml/2006/main" xmlns:r="http://schemas.openxmlformats.org/officeDocument/2006/relationships" xmlns:mc="http://schemas.openxmlformats.org/markup-compatibility/2006" xmlns:mv="urn:schemas-microsoft-com:mac:vml" xmlns:p="http://schemas.openxmlformats.org/presentationml/2006/main" mc:Ignorable="mv" mc:PreserveAttributes="mv:*" type="secHead" preserve="1">
   <p:cSld name="Section Header">
     <p:spTree>
       <p:nvGrpSpPr>
@@ -3700,7 +3700,7 @@
 </file>
 
 <file path=ppt/slideLayouts/slideLayout5.xml><?xml version="1.0" encoding="utf-8"?>
-<p:sldLayout xmlns:a="http://schemas.openxmlformats.org/drawingml/2006/main" xmlns:r="http://schemas.openxmlformats.org/officeDocument/2006/relationships" xmlns:p="http://schemas.openxmlformats.org/presentationml/2006/main" type="twoObj" preserve="1">
+<p:sldLayout xmlns:a="http://schemas.openxmlformats.org/drawingml/2006/main" xmlns:r="http://schemas.openxmlformats.org/officeDocument/2006/relationships" xmlns:mc="http://schemas.openxmlformats.org/markup-compatibility/2006" xmlns:mv="urn:schemas-microsoft-com:mac:vml" xmlns:p="http://schemas.openxmlformats.org/presentationml/2006/main" mc:Ignorable="mv" mc:PreserveAttributes="mv:*" type="twoObj" preserve="1">
   <p:cSld name="Two Content">
     <p:spTree>
       <p:nvGrpSpPr>
@@ -4033,7 +4033,7 @@
 </file>
 
 <file path=ppt/slideLayouts/slideLayout6.xml><?xml version="1.0" encoding="utf-8"?>
-<p:sldLayout xmlns:a="http://schemas.openxmlformats.org/drawingml/2006/main" xmlns:r="http://schemas.openxmlformats.org/officeDocument/2006/relationships" xmlns:p="http://schemas.openxmlformats.org/presentationml/2006/main" type="twoTxTwoObj" preserve="1">
+<p:sldLayout xmlns:a="http://schemas.openxmlformats.org/drawingml/2006/main" xmlns:r="http://schemas.openxmlformats.org/officeDocument/2006/relationships" xmlns:mc="http://schemas.openxmlformats.org/markup-compatibility/2006" xmlns:mv="urn:schemas-microsoft-com:mac:vml" xmlns:p="http://schemas.openxmlformats.org/presentationml/2006/main" mc:Ignorable="mv" mc:PreserveAttributes="mv:*" type="twoTxTwoObj" preserve="1">
   <p:cSld name="Comparison">
     <p:spTree>
       <p:nvGrpSpPr>
@@ -4737,7 +4737,7 @@
 </file>
 
 <file path=ppt/slideLayouts/slideLayout7.xml><?xml version="1.0" encoding="utf-8"?>
-<p:sldLayout xmlns:a="http://schemas.openxmlformats.org/drawingml/2006/main" xmlns:r="http://schemas.openxmlformats.org/officeDocument/2006/relationships" xmlns:p="http://schemas.openxmlformats.org/presentationml/2006/main" type="titleOnly" preserve="1">
+<p:sldLayout xmlns:a="http://schemas.openxmlformats.org/drawingml/2006/main" xmlns:r="http://schemas.openxmlformats.org/officeDocument/2006/relationships" xmlns:mc="http://schemas.openxmlformats.org/markup-compatibility/2006" xmlns:mv="urn:schemas-microsoft-com:mac:vml" xmlns:p="http://schemas.openxmlformats.org/presentationml/2006/main" mc:Ignorable="mv" mc:PreserveAttributes="mv:*" type="titleOnly" preserve="1">
   <p:cSld name="Title Only">
     <p:spTree>
       <p:nvGrpSpPr>
@@ -4891,7 +4891,7 @@
 </file>
 
 <file path=ppt/slideLayouts/slideLayout8.xml><?xml version="1.0" encoding="utf-8"?>
-<p:sldLayout xmlns:a="http://schemas.openxmlformats.org/drawingml/2006/main" xmlns:r="http://schemas.openxmlformats.org/officeDocument/2006/relationships" xmlns:p="http://schemas.openxmlformats.org/presentationml/2006/main" type="blank" preserve="1">
+<p:sldLayout xmlns:a="http://schemas.openxmlformats.org/drawingml/2006/main" xmlns:r="http://schemas.openxmlformats.org/officeDocument/2006/relationships" xmlns:mc="http://schemas.openxmlformats.org/markup-compatibility/2006" xmlns:mv="urn:schemas-microsoft-com:mac:vml" xmlns:p="http://schemas.openxmlformats.org/presentationml/2006/main" mc:Ignorable="mv" mc:PreserveAttributes="mv:*" type="blank" preserve="1">
   <p:cSld name="Blank">
     <p:spTree>
       <p:nvGrpSpPr>
@@ -5058,7 +5058,7 @@
 </file>
 
 <file path=ppt/slideLayouts/slideLayout9.xml><?xml version="1.0" encoding="utf-8"?>
-<p:sldLayout xmlns:a="http://schemas.openxmlformats.org/drawingml/2006/main" xmlns:r="http://schemas.openxmlformats.org/officeDocument/2006/relationships" xmlns:p="http://schemas.openxmlformats.org/presentationml/2006/main" type="objTx" preserve="1">
+<p:sldLayout xmlns:a="http://schemas.openxmlformats.org/drawingml/2006/main" xmlns:r="http://schemas.openxmlformats.org/officeDocument/2006/relationships" xmlns:mc="http://schemas.openxmlformats.org/markup-compatibility/2006" xmlns:mv="urn:schemas-microsoft-com:mac:vml" xmlns:p="http://schemas.openxmlformats.org/presentationml/2006/main" mc:Ignorable="mv" mc:PreserveAttributes="mv:*" type="objTx" preserve="1">
   <p:cSld name="Content with Caption">
     <p:spTree>
       <p:nvGrpSpPr>
@@ -5436,7 +5436,7 @@
 </file>
 
 <file path=ppt/slideMasters/slideMaster1.xml><?xml version="1.0" encoding="utf-8"?>
-<p:sldMaster xmlns:a="http://schemas.openxmlformats.org/drawingml/2006/main" xmlns:r="http://schemas.openxmlformats.org/officeDocument/2006/relationships" xmlns:p="http://schemas.openxmlformats.org/presentationml/2006/main">
+<p:sldMaster xmlns:a="http://schemas.openxmlformats.org/drawingml/2006/main" xmlns:r="http://schemas.openxmlformats.org/officeDocument/2006/relationships" xmlns:mc="http://schemas.openxmlformats.org/markup-compatibility/2006" xmlns:mv="urn:schemas-microsoft-com:mac:vml" xmlns:p="http://schemas.openxmlformats.org/presentationml/2006/main" mc:Ignorable="mv" mc:PreserveAttributes="mv:*">
   <p:cSld>
     <p:bg>
       <p:bgRef idx="1001">
@@ -6094,7 +6094,7 @@
 </file>
 
 <file path=ppt/slides/slide1.xml><?xml version="1.0" encoding="utf-8"?>
-<p:sld xmlns:a="http://schemas.openxmlformats.org/drawingml/2006/main" xmlns:r="http://schemas.openxmlformats.org/officeDocument/2006/relationships" xmlns:p="http://schemas.openxmlformats.org/presentationml/2006/main">
+<p:sld xmlns:a="http://schemas.openxmlformats.org/drawingml/2006/main" xmlns:r="http://schemas.openxmlformats.org/officeDocument/2006/relationships" xmlns:mc="http://schemas.openxmlformats.org/markup-compatibility/2006" xmlns:mv="urn:schemas-microsoft-com:mac:vml" xmlns:p="http://schemas.openxmlformats.org/presentationml/2006/main" mc:Ignorable="mv" mc:PreserveAttributes="mv:*">
   <p:cSld>
     <p:spTree>
       <p:nvGrpSpPr>
@@ -6166,7 +6166,7 @@
               <a:solidFill>
                 <a:schemeClr val="bg2"/>
               </a:solidFill>
-              <a:hlinkClick r:id="rId2"/>
+              <a:hlinkClick r:id="rId2" invalidUrl="file:///%5C%5Clocalhost%5CUsers%5Coweidner%5CDesktop%5Cfaust_agents_01.graffle%5C"/>
             </a:endParaRPr>
           </a:p>
         </p:txBody>
@@ -6277,7 +6277,7 @@
 </file>
 
 <file path=ppt/slides/slide10.xml><?xml version="1.0" encoding="utf-8"?>
-<p:sld xmlns:a="http://schemas.openxmlformats.org/drawingml/2006/main" xmlns:r="http://schemas.openxmlformats.org/officeDocument/2006/relationships" xmlns:p="http://schemas.openxmlformats.org/presentationml/2006/main">
+<p:sld xmlns:a="http://schemas.openxmlformats.org/drawingml/2006/main" xmlns:r="http://schemas.openxmlformats.org/officeDocument/2006/relationships" xmlns:mc="http://schemas.openxmlformats.org/markup-compatibility/2006" xmlns:mv="urn:schemas-microsoft-com:mac:vml" xmlns:p="http://schemas.openxmlformats.org/presentationml/2006/main" mc:Ignorable="mv" mc:PreserveAttributes="mv:*">
   <p:cSld>
     <p:spTree>
       <p:nvGrpSpPr>
@@ -6498,7 +6498,7 @@
 </file>
 
 <file path=ppt/slides/slide11.xml><?xml version="1.0" encoding="utf-8"?>
-<p:sld xmlns:a="http://schemas.openxmlformats.org/drawingml/2006/main" xmlns:r="http://schemas.openxmlformats.org/officeDocument/2006/relationships" xmlns:p="http://schemas.openxmlformats.org/presentationml/2006/main">
+<p:sld xmlns:a="http://schemas.openxmlformats.org/drawingml/2006/main" xmlns:r="http://schemas.openxmlformats.org/officeDocument/2006/relationships" xmlns:mc="http://schemas.openxmlformats.org/markup-compatibility/2006" xmlns:mv="urn:schemas-microsoft-com:mac:vml" xmlns:p="http://schemas.openxmlformats.org/presentationml/2006/main" mc:Ignorable="mv" mc:PreserveAttributes="mv:*">
   <p:cSld>
     <p:spTree>
       <p:nvGrpSpPr>
@@ -6641,7 +6641,7 @@
           <p:nvPr>
             <p:extLst>
               <p:ext uri="{D42A27DB-BD31-4B8C-83A1-F6EECF244321}">
-                <p14:modId xmlns:p14="http://schemas.microsoft.com/office/powerpoint/2010/main" val="3414472680"/>
+                <p14:modId xmlns:p14="http://schemas.microsoft.com/office/powerpoint/2010/main" xmlns:p="http://schemas.openxmlformats.org/presentationml/2006/main" xmlns:r="http://schemas.openxmlformats.org/officeDocument/2006/relationships" xmlns:a="http://schemas.openxmlformats.org/drawingml/2006/main" xmlns="" val="3414472680"/>
               </p:ext>
             </p:extLst>
           </p:nvPr>
@@ -7280,7 +7280,7 @@
 </file>
 
 <file path=ppt/slides/slide12.xml><?xml version="1.0" encoding="utf-8"?>
-<p:sld xmlns:a="http://schemas.openxmlformats.org/drawingml/2006/main" xmlns:r="http://schemas.openxmlformats.org/officeDocument/2006/relationships" xmlns:p="http://schemas.openxmlformats.org/presentationml/2006/main">
+<p:sld xmlns:a="http://schemas.openxmlformats.org/drawingml/2006/main" xmlns:r="http://schemas.openxmlformats.org/officeDocument/2006/relationships" xmlns:mc="http://schemas.openxmlformats.org/markup-compatibility/2006" xmlns:mv="urn:schemas-microsoft-com:mac:vml" xmlns:p="http://schemas.openxmlformats.org/presentationml/2006/main" mc:Ignorable="mv" mc:PreserveAttributes="mv:*">
   <p:cSld>
     <p:spTree>
       <p:nvGrpSpPr>
@@ -7470,7 +7470,7 @@
 </file>
 
 <file path=ppt/slides/slide13.xml><?xml version="1.0" encoding="utf-8"?>
-<p:sld xmlns:a="http://schemas.openxmlformats.org/drawingml/2006/main" xmlns:r="http://schemas.openxmlformats.org/officeDocument/2006/relationships" xmlns:p="http://schemas.openxmlformats.org/presentationml/2006/main">
+<p:sld xmlns:a="http://schemas.openxmlformats.org/drawingml/2006/main" xmlns:r="http://schemas.openxmlformats.org/officeDocument/2006/relationships" xmlns:mc="http://schemas.openxmlformats.org/markup-compatibility/2006" xmlns:mv="urn:schemas-microsoft-com:mac:vml" xmlns:p="http://schemas.openxmlformats.org/presentationml/2006/main" mc:Ignorable="mv" mc:PreserveAttributes="mv:*">
   <p:cSld>
     <p:spTree>
       <p:nvGrpSpPr>
@@ -7611,7 +7611,7 @@
           <p:nvPr>
             <p:extLst>
               <p:ext uri="{D42A27DB-BD31-4B8C-83A1-F6EECF244321}">
-                <p14:modId xmlns:p14="http://schemas.microsoft.com/office/powerpoint/2010/main" val="4007099573"/>
+                <p14:modId xmlns:p14="http://schemas.microsoft.com/office/powerpoint/2010/main" xmlns:p="http://schemas.openxmlformats.org/presentationml/2006/main" xmlns:r="http://schemas.openxmlformats.org/officeDocument/2006/relationships" xmlns:a="http://schemas.openxmlformats.org/drawingml/2006/main" xmlns="" val="4007099573"/>
               </p:ext>
             </p:extLst>
           </p:nvPr>
@@ -8022,7 +8022,7 @@
 </file>
 
 <file path=ppt/slides/slide14.xml><?xml version="1.0" encoding="utf-8"?>
-<p:sld xmlns:a="http://schemas.openxmlformats.org/drawingml/2006/main" xmlns:r="http://schemas.openxmlformats.org/officeDocument/2006/relationships" xmlns:p="http://schemas.openxmlformats.org/presentationml/2006/main">
+<p:sld xmlns:a="http://schemas.openxmlformats.org/drawingml/2006/main" xmlns:r="http://schemas.openxmlformats.org/officeDocument/2006/relationships" xmlns:mc="http://schemas.openxmlformats.org/markup-compatibility/2006" xmlns:mv="urn:schemas-microsoft-com:mac:vml" xmlns:p="http://schemas.openxmlformats.org/presentationml/2006/main" mc:Ignorable="mv" mc:PreserveAttributes="mv:*">
   <p:cSld>
     <p:spTree>
       <p:nvGrpSpPr>
@@ -8277,7 +8277,7 @@
     </p:spTree>
     <p:extLst>
       <p:ext uri="{BB962C8B-B14F-4D97-AF65-F5344CB8AC3E}">
-        <p14:creationId xmlns:p14="http://schemas.microsoft.com/office/powerpoint/2010/main" val="943545212"/>
+        <p14:creationId xmlns:p14="http://schemas.microsoft.com/office/powerpoint/2010/main" xmlns:p="http://schemas.openxmlformats.org/presentationml/2006/main" xmlns:r="http://schemas.openxmlformats.org/officeDocument/2006/relationships" xmlns:a="http://schemas.openxmlformats.org/drawingml/2006/main" xmlns="" val="943545212"/>
       </p:ext>
     </p:extLst>
   </p:cSld>
@@ -8295,7 +8295,7 @@
 </file>
 
 <file path=ppt/slides/slide15.xml><?xml version="1.0" encoding="utf-8"?>
-<p:sld xmlns:a="http://schemas.openxmlformats.org/drawingml/2006/main" xmlns:r="http://schemas.openxmlformats.org/officeDocument/2006/relationships" xmlns:p="http://schemas.openxmlformats.org/presentationml/2006/main">
+<p:sld xmlns:a="http://schemas.openxmlformats.org/drawingml/2006/main" xmlns:r="http://schemas.openxmlformats.org/officeDocument/2006/relationships" xmlns:mc="http://schemas.openxmlformats.org/markup-compatibility/2006" xmlns:mv="urn:schemas-microsoft-com:mac:vml" xmlns:p="http://schemas.openxmlformats.org/presentationml/2006/main" mc:Ignorable="mv" mc:PreserveAttributes="mv:*">
   <p:cSld>
     <p:spTree>
       <p:nvGrpSpPr>
@@ -8613,7 +8613,7 @@
     </p:spTree>
     <p:extLst>
       <p:ext uri="{BB962C8B-B14F-4D97-AF65-F5344CB8AC3E}">
-        <p14:creationId xmlns:p14="http://schemas.microsoft.com/office/powerpoint/2010/main" val="2110749326"/>
+        <p14:creationId xmlns:p14="http://schemas.microsoft.com/office/powerpoint/2010/main" xmlns:p="http://schemas.openxmlformats.org/presentationml/2006/main" xmlns:r="http://schemas.openxmlformats.org/officeDocument/2006/relationships" xmlns:a="http://schemas.openxmlformats.org/drawingml/2006/main" xmlns="" val="2110749326"/>
       </p:ext>
     </p:extLst>
   </p:cSld>
@@ -8631,7 +8631,7 @@
 </file>
 
 <file path=ppt/slides/slide16.xml><?xml version="1.0" encoding="utf-8"?>
-<p:sld xmlns:a="http://schemas.openxmlformats.org/drawingml/2006/main" xmlns:r="http://schemas.openxmlformats.org/officeDocument/2006/relationships" xmlns:p="http://schemas.openxmlformats.org/presentationml/2006/main">
+<p:sld xmlns:a="http://schemas.openxmlformats.org/drawingml/2006/main" xmlns:r="http://schemas.openxmlformats.org/officeDocument/2006/relationships" xmlns:mc="http://schemas.openxmlformats.org/markup-compatibility/2006" xmlns:mv="urn:schemas-microsoft-com:mac:vml" xmlns:p="http://schemas.openxmlformats.org/presentationml/2006/main" mc:Ignorable="mv" mc:PreserveAttributes="mv:*">
   <p:cSld>
     <p:spTree>
       <p:nvGrpSpPr>
@@ -8694,7 +8694,11 @@
           </a:p>
           <a:p>
             <a:r>
-              <a:rPr lang="en-US" dirty="0" smtClean="0"/>
+              <a:rPr lang="en-US" dirty="0" smtClean="0">
+                <a:solidFill>
+                  <a:srgbClr val="800000"/>
+                </a:solidFill>
+              </a:rPr>
               <a:t>FIXME</a:t>
             </a:r>
           </a:p>
@@ -8773,7 +8777,7 @@
     </p:spTree>
     <p:extLst>
       <p:ext uri="{BB962C8B-B14F-4D97-AF65-F5344CB8AC3E}">
-        <p14:creationId xmlns:p14="http://schemas.microsoft.com/office/powerpoint/2010/main" val="2059702227"/>
+        <p14:creationId xmlns:p14="http://schemas.microsoft.com/office/powerpoint/2010/main" xmlns:p="http://schemas.openxmlformats.org/presentationml/2006/main" xmlns:r="http://schemas.openxmlformats.org/officeDocument/2006/relationships" xmlns:a="http://schemas.openxmlformats.org/drawingml/2006/main" xmlns="" val="2059702227"/>
       </p:ext>
     </p:extLst>
   </p:cSld>
@@ -8784,7 +8788,7 @@
 </file>
 
 <file path=ppt/slides/slide17.xml><?xml version="1.0" encoding="utf-8"?>
-<p:sld xmlns:a="http://schemas.openxmlformats.org/drawingml/2006/main" xmlns:r="http://schemas.openxmlformats.org/officeDocument/2006/relationships" xmlns:p="http://schemas.openxmlformats.org/presentationml/2006/main">
+<p:sld xmlns:a="http://schemas.openxmlformats.org/drawingml/2006/main" xmlns:r="http://schemas.openxmlformats.org/officeDocument/2006/relationships" xmlns:mc="http://schemas.openxmlformats.org/markup-compatibility/2006" xmlns:mv="urn:schemas-microsoft-com:mac:vml" xmlns:p="http://schemas.openxmlformats.org/presentationml/2006/main" mc:Ignorable="mv" mc:PreserveAttributes="mv:*">
   <p:cSld>
     <p:spTree>
       <p:nvGrpSpPr>
@@ -9075,7 +9079,7 @@
     </p:spTree>
     <p:extLst>
       <p:ext uri="{BB962C8B-B14F-4D97-AF65-F5344CB8AC3E}">
-        <p14:creationId xmlns:p14="http://schemas.microsoft.com/office/powerpoint/2010/main" val="2253681799"/>
+        <p14:creationId xmlns:p14="http://schemas.microsoft.com/office/powerpoint/2010/main" xmlns:p="http://schemas.openxmlformats.org/presentationml/2006/main" xmlns:r="http://schemas.openxmlformats.org/officeDocument/2006/relationships" xmlns:a="http://schemas.openxmlformats.org/drawingml/2006/main" xmlns="" val="2253681799"/>
       </p:ext>
     </p:extLst>
   </p:cSld>
@@ -9086,7 +9090,7 @@
 </file>
 
 <file path=ppt/slides/slide18.xml><?xml version="1.0" encoding="utf-8"?>
-<p:sld xmlns:a="http://schemas.openxmlformats.org/drawingml/2006/main" xmlns:r="http://schemas.openxmlformats.org/officeDocument/2006/relationships" xmlns:p="http://schemas.openxmlformats.org/presentationml/2006/main">
+<p:sld xmlns:a="http://schemas.openxmlformats.org/drawingml/2006/main" xmlns:r="http://schemas.openxmlformats.org/officeDocument/2006/relationships" xmlns:mc="http://schemas.openxmlformats.org/markup-compatibility/2006" xmlns:mv="urn:schemas-microsoft-com:mac:vml" xmlns:p="http://schemas.openxmlformats.org/presentationml/2006/main" mc:Ignorable="mv" mc:PreserveAttributes="mv:*">
   <p:cSld>
     <p:spTree>
       <p:nvGrpSpPr>
@@ -9352,7 +9356,7 @@
     </p:spTree>
     <p:extLst>
       <p:ext uri="{BB962C8B-B14F-4D97-AF65-F5344CB8AC3E}">
-        <p14:creationId xmlns:p14="http://schemas.microsoft.com/office/powerpoint/2010/main" val="3368190089"/>
+        <p14:creationId xmlns:p14="http://schemas.microsoft.com/office/powerpoint/2010/main" xmlns:p="http://schemas.openxmlformats.org/presentationml/2006/main" xmlns:r="http://schemas.openxmlformats.org/officeDocument/2006/relationships" xmlns:a="http://schemas.openxmlformats.org/drawingml/2006/main" xmlns="" val="3368190089"/>
       </p:ext>
     </p:extLst>
   </p:cSld>
@@ -9370,7 +9374,7 @@
 </file>
 
 <file path=ppt/slides/slide19.xml><?xml version="1.0" encoding="utf-8"?>
-<p:sld xmlns:a="http://schemas.openxmlformats.org/drawingml/2006/main" xmlns:r="http://schemas.openxmlformats.org/officeDocument/2006/relationships" xmlns:p="http://schemas.openxmlformats.org/presentationml/2006/main">
+<p:sld xmlns:a="http://schemas.openxmlformats.org/drawingml/2006/main" xmlns:r="http://schemas.openxmlformats.org/officeDocument/2006/relationships" xmlns:mc="http://schemas.openxmlformats.org/markup-compatibility/2006" xmlns:mv="urn:schemas-microsoft-com:mac:vml" xmlns:p="http://schemas.openxmlformats.org/presentationml/2006/main" mc:Ignorable="mv" mc:PreserveAttributes="mv:*">
   <p:cSld>
     <p:spTree>
       <p:nvGrpSpPr>
@@ -9761,7 +9765,7 @@
     </p:spTree>
     <p:extLst>
       <p:ext uri="{BB962C8B-B14F-4D97-AF65-F5344CB8AC3E}">
-        <p14:creationId xmlns:p14="http://schemas.microsoft.com/office/powerpoint/2010/main" val="2572922824"/>
+        <p14:creationId xmlns:p14="http://schemas.microsoft.com/office/powerpoint/2010/main" xmlns:p="http://schemas.openxmlformats.org/presentationml/2006/main" xmlns:r="http://schemas.openxmlformats.org/officeDocument/2006/relationships" xmlns:a="http://schemas.openxmlformats.org/drawingml/2006/main" xmlns="" val="2572922824"/>
       </p:ext>
     </p:extLst>
   </p:cSld>
@@ -9779,7 +9783,7 @@
 </file>
 
 <file path=ppt/slides/slide2.xml><?xml version="1.0" encoding="utf-8"?>
-<p:sld xmlns:a="http://schemas.openxmlformats.org/drawingml/2006/main" xmlns:r="http://schemas.openxmlformats.org/officeDocument/2006/relationships" xmlns:p="http://schemas.openxmlformats.org/presentationml/2006/main">
+<p:sld xmlns:a="http://schemas.openxmlformats.org/drawingml/2006/main" xmlns:r="http://schemas.openxmlformats.org/officeDocument/2006/relationships" xmlns:mc="http://schemas.openxmlformats.org/markup-compatibility/2006" xmlns:mv="urn:schemas-microsoft-com:mac:vml" xmlns:p="http://schemas.openxmlformats.org/presentationml/2006/main" mc:Ignorable="mv" mc:PreserveAttributes="mv:*">
   <p:cSld>
     <p:spTree>
       <p:nvGrpSpPr>
@@ -9950,7 +9954,7 @@
 </file>
 
 <file path=ppt/slides/slide20.xml><?xml version="1.0" encoding="utf-8"?>
-<p:sld xmlns:a="http://schemas.openxmlformats.org/drawingml/2006/main" xmlns:r="http://schemas.openxmlformats.org/officeDocument/2006/relationships" xmlns:p="http://schemas.openxmlformats.org/presentationml/2006/main">
+<p:sld xmlns:a="http://schemas.openxmlformats.org/drawingml/2006/main" xmlns:r="http://schemas.openxmlformats.org/officeDocument/2006/relationships" xmlns:mc="http://schemas.openxmlformats.org/markup-compatibility/2006" xmlns:mv="urn:schemas-microsoft-com:mac:vml" xmlns:p="http://schemas.openxmlformats.org/presentationml/2006/main" mc:Ignorable="mv" mc:PreserveAttributes="mv:*">
   <p:cSld>
     <p:spTree>
       <p:nvGrpSpPr>
@@ -10021,7 +10025,11 @@
           </a:p>
           <a:p>
             <a:r>
-              <a:rPr lang="en-US" dirty="0" smtClean="0"/>
+              <a:rPr lang="en-US" dirty="0" smtClean="0">
+                <a:solidFill>
+                  <a:srgbClr val="800000"/>
+                </a:solidFill>
+              </a:rPr>
               <a:t>FIXME</a:t>
             </a:r>
           </a:p>
@@ -10100,7 +10108,7 @@
     </p:spTree>
     <p:extLst>
       <p:ext uri="{BB962C8B-B14F-4D97-AF65-F5344CB8AC3E}">
-        <p14:creationId xmlns:p14="http://schemas.microsoft.com/office/powerpoint/2010/main" val="1169737179"/>
+        <p14:creationId xmlns:p14="http://schemas.microsoft.com/office/powerpoint/2010/main" xmlns:p="http://schemas.openxmlformats.org/presentationml/2006/main" xmlns:r="http://schemas.openxmlformats.org/officeDocument/2006/relationships" xmlns:a="http://schemas.openxmlformats.org/drawingml/2006/main" xmlns="" val="1169737179"/>
       </p:ext>
     </p:extLst>
   </p:cSld>
@@ -10111,7 +10119,7 @@
 </file>
 
 <file path=ppt/slides/slide21.xml><?xml version="1.0" encoding="utf-8"?>
-<p:sld xmlns:a="http://schemas.openxmlformats.org/drawingml/2006/main" xmlns:r="http://schemas.openxmlformats.org/officeDocument/2006/relationships" xmlns:p="http://schemas.openxmlformats.org/presentationml/2006/main">
+<p:sld xmlns:a="http://schemas.openxmlformats.org/drawingml/2006/main" xmlns:r="http://schemas.openxmlformats.org/officeDocument/2006/relationships" xmlns:mc="http://schemas.openxmlformats.org/markup-compatibility/2006" xmlns:mv="urn:schemas-microsoft-com:mac:vml" xmlns:p="http://schemas.openxmlformats.org/presentationml/2006/main" mc:Ignorable="mv" mc:PreserveAttributes="mv:*">
   <p:cSld>
     <p:spTree>
       <p:nvGrpSpPr>
@@ -10250,7 +10258,7 @@
     </p:spTree>
     <p:extLst>
       <p:ext uri="{BB962C8B-B14F-4D97-AF65-F5344CB8AC3E}">
-        <p14:creationId xmlns:p14="http://schemas.microsoft.com/office/powerpoint/2010/main" val="935873552"/>
+        <p14:creationId xmlns:p14="http://schemas.microsoft.com/office/powerpoint/2010/main" xmlns:p="http://schemas.openxmlformats.org/presentationml/2006/main" xmlns:r="http://schemas.openxmlformats.org/officeDocument/2006/relationships" xmlns:a="http://schemas.openxmlformats.org/drawingml/2006/main" xmlns="" val="935873552"/>
       </p:ext>
     </p:extLst>
   </p:cSld>
@@ -10261,7 +10269,7 @@
 </file>
 
 <file path=ppt/slides/slide22.xml><?xml version="1.0" encoding="utf-8"?>
-<p:sld xmlns:a="http://schemas.openxmlformats.org/drawingml/2006/main" xmlns:r="http://schemas.openxmlformats.org/officeDocument/2006/relationships" xmlns:p="http://schemas.openxmlformats.org/presentationml/2006/main">
+<p:sld xmlns:a="http://schemas.openxmlformats.org/drawingml/2006/main" xmlns:r="http://schemas.openxmlformats.org/officeDocument/2006/relationships" xmlns:mc="http://schemas.openxmlformats.org/markup-compatibility/2006" xmlns:mv="urn:schemas-microsoft-com:mac:vml" xmlns:p="http://schemas.openxmlformats.org/presentationml/2006/main" mc:Ignorable="mv" mc:PreserveAttributes="mv:*">
   <p:cSld>
     <p:spTree>
       <p:nvGrpSpPr>
@@ -10466,7 +10474,7 @@
 </file>
 
 <file path=ppt/slides/slide23.xml><?xml version="1.0" encoding="utf-8"?>
-<p:sld xmlns:a="http://schemas.openxmlformats.org/drawingml/2006/main" xmlns:r="http://schemas.openxmlformats.org/officeDocument/2006/relationships" xmlns:p="http://schemas.openxmlformats.org/presentationml/2006/main">
+<p:sld xmlns:a="http://schemas.openxmlformats.org/drawingml/2006/main" xmlns:r="http://schemas.openxmlformats.org/officeDocument/2006/relationships" xmlns:mc="http://schemas.openxmlformats.org/markup-compatibility/2006" xmlns:mv="urn:schemas-microsoft-com:mac:vml" xmlns:p="http://schemas.openxmlformats.org/presentationml/2006/main" mc:Ignorable="mv" mc:PreserveAttributes="mv:*">
   <p:cSld>
     <p:spTree>
       <p:nvGrpSpPr>
@@ -10496,12 +10504,14 @@
           <a:ln/>
         </p:spPr>
         <p:txBody>
-          <a:bodyPr/>
-          <a:lstStyle/>
-          <a:p>
-            <a:r>
-              <a:rPr lang="en-US" dirty="0" smtClean="0"/>
-              <a:t>Example </a:t>
+          <a:bodyPr>
+            <a:normAutofit/>
+          </a:bodyPr>
+          <a:lstStyle/>
+          <a:p>
+            <a:r>
+              <a:rPr lang="en-US" dirty="0" smtClean="0"/>
+              <a:t>SAGA Tutorial Example </a:t>
             </a:r>
             <a:r>
               <a:rPr lang="en-US" dirty="0"/>
@@ -10700,7 +10710,7 @@
 </file>
 
 <file path=ppt/slides/slide24.xml><?xml version="1.0" encoding="utf-8"?>
-<p:sld xmlns:a="http://schemas.openxmlformats.org/drawingml/2006/main" xmlns:r="http://schemas.openxmlformats.org/officeDocument/2006/relationships" xmlns:p="http://schemas.openxmlformats.org/presentationml/2006/main">
+<p:sld xmlns:a="http://schemas.openxmlformats.org/drawingml/2006/main" xmlns:r="http://schemas.openxmlformats.org/officeDocument/2006/relationships" xmlns:mc="http://schemas.openxmlformats.org/markup-compatibility/2006" xmlns:mv="urn:schemas-microsoft-com:mac:vml" xmlns:p="http://schemas.openxmlformats.org/presentationml/2006/main" mc:Ignorable="mv" mc:PreserveAttributes="mv:*">
   <p:cSld>
     <p:spTree>
       <p:nvGrpSpPr>
@@ -10735,7 +10745,7 @@
           <a:p>
             <a:r>
               <a:rPr lang="en-US" dirty="0" smtClean="0"/>
-              <a:t>Example </a:t>
+              <a:t>SAGA Tutorial Example </a:t>
             </a:r>
             <a:r>
               <a:rPr lang="en-US" dirty="0"/>
@@ -10832,33 +10842,29 @@
               <a:rPr lang="en-US" dirty="0" smtClean="0"/>
               <a:t>The source code can be found here (see ‘Example1’):</a:t>
             </a:r>
+            <a:endParaRPr lang="en-US" dirty="0" smtClean="0"/>
           </a:p>
           <a:p>
             <a:pPr lvl="1"/>
-            <a:r>
-              <a:rPr lang="en-US" dirty="0" smtClean="0"/>
-              <a:t>http://faust.cct.lsu.edu/trac/saga/wiki/		</a:t>
-            </a:r>
             <a:r>
               <a:rPr lang="en-US" dirty="0" smtClean="0">
                 <a:solidFill>
                   <a:srgbClr val="FF0000"/>
                 </a:solidFill>
+                <a:hlinkClick r:id="rId2"/>
               </a:rPr>
-              <a:t>FIXME</a:t>
-            </a:r>
-            <a:endParaRPr lang="en-US" dirty="0" smtClean="0">
-              <a:solidFill>
-                <a:srgbClr val="FF0000"/>
-              </a:solidFill>
-              <a:hlinkClick r:id="rId2"/>
-            </a:endParaRPr>
+              <a:t>https://svn.cct.lsu.edu/repos/saga/core/trunk/examples/tutorial/</a:t>
+            </a:r>
           </a:p>
           <a:p>
             <a:pPr lvl="1" fontAlgn="ctr"/>
             <a:r>
+              <a:rPr lang="en-US" sz="2800" dirty="0" smtClean="0"/>
+              <a:t>The </a:t>
+            </a:r>
+            <a:r>
               <a:rPr lang="en-US" sz="2800" dirty="0"/>
-              <a:t>The example uses </a:t>
+              <a:t>example uses </a:t>
             </a:r>
             <a:r>
               <a:rPr lang="en-US" sz="2800" dirty="0" err="1"/>
@@ -10994,7 +11000,7 @@
 </file>
 
 <file path=ppt/slides/slide25.xml><?xml version="1.0" encoding="utf-8"?>
-<p:sld xmlns:a="http://schemas.openxmlformats.org/drawingml/2006/main" xmlns:r="http://schemas.openxmlformats.org/officeDocument/2006/relationships" xmlns:p="http://schemas.openxmlformats.org/presentationml/2006/main">
+<p:sld xmlns:a="http://schemas.openxmlformats.org/drawingml/2006/main" xmlns:r="http://schemas.openxmlformats.org/officeDocument/2006/relationships" xmlns:mc="http://schemas.openxmlformats.org/markup-compatibility/2006" xmlns:mv="urn:schemas-microsoft-com:mac:vml" xmlns:p="http://schemas.openxmlformats.org/presentationml/2006/main" mc:Ignorable="mv" mc:PreserveAttributes="mv:*">
   <p:cSld>
     <p:spTree>
       <p:nvGrpSpPr>
@@ -11027,7 +11033,11 @@
           <a:p>
             <a:r>
               <a:rPr lang="en-US" dirty="0" smtClean="0"/>
-              <a:t>Example 2: </a:t>
+              <a:t>SAGA Tutorial Example </a:t>
+            </a:r>
+            <a:r>
+              <a:rPr lang="en-US" dirty="0" smtClean="0"/>
+              <a:t>2: </a:t>
             </a:r>
             <a:r>
               <a:rPr lang="en-US" dirty="0" err="1" smtClean="0"/>
@@ -11236,7 +11246,7 @@
 </file>
 
 <file path=ppt/slides/slide26.xml><?xml version="1.0" encoding="utf-8"?>
-<p:sld xmlns:a="http://schemas.openxmlformats.org/drawingml/2006/main" xmlns:r="http://schemas.openxmlformats.org/officeDocument/2006/relationships" xmlns:p="http://schemas.openxmlformats.org/presentationml/2006/main">
+<p:sld xmlns:a="http://schemas.openxmlformats.org/drawingml/2006/main" xmlns:r="http://schemas.openxmlformats.org/officeDocument/2006/relationships" xmlns:mc="http://schemas.openxmlformats.org/markup-compatibility/2006" xmlns:mv="urn:schemas-microsoft-com:mac:vml" xmlns:p="http://schemas.openxmlformats.org/presentationml/2006/main" mc:Ignorable="mv" mc:PreserveAttributes="mv:*">
   <p:cSld>
     <p:spTree>
       <p:nvGrpSpPr>
@@ -11269,7 +11279,11 @@
           <a:p>
             <a:r>
               <a:rPr lang="en-US" dirty="0" smtClean="0"/>
-              <a:t>Example 3: </a:t>
+              <a:t>SAGA Tutorial Example </a:t>
+            </a:r>
+            <a:r>
+              <a:rPr lang="en-US" dirty="0" smtClean="0"/>
+              <a:t>3: </a:t>
             </a:r>
             <a:r>
               <a:rPr lang="en-US" dirty="0" err="1" smtClean="0"/>
@@ -11450,7 +11464,7 @@
 </file>
 
 <file path=ppt/slides/slide3.xml><?xml version="1.0" encoding="utf-8"?>
-<p:sld xmlns:a="http://schemas.openxmlformats.org/drawingml/2006/main" xmlns:r="http://schemas.openxmlformats.org/officeDocument/2006/relationships" xmlns:p="http://schemas.openxmlformats.org/presentationml/2006/main">
+<p:sld xmlns:a="http://schemas.openxmlformats.org/drawingml/2006/main" xmlns:r="http://schemas.openxmlformats.org/officeDocument/2006/relationships" xmlns:mc="http://schemas.openxmlformats.org/markup-compatibility/2006" xmlns:mv="urn:schemas-microsoft-com:mac:vml" xmlns:p="http://schemas.openxmlformats.org/presentationml/2006/main" mc:Ignorable="mv" mc:PreserveAttributes="mv:*">
   <p:cSld>
     <p:spTree>
       <p:nvGrpSpPr>
@@ -11484,9 +11498,10 @@
           <a:lstStyle/>
           <a:p>
             <a:r>
-              <a:rPr lang="en-US"/>
-              <a:t>Documentation</a:t>
-            </a:r>
+              <a:rPr lang="en-US" dirty="0" smtClean="0"/>
+              <a:t>General Information and Documentation</a:t>
+            </a:r>
+            <a:endParaRPr lang="en-US" dirty="0"/>
           </a:p>
         </p:txBody>
       </p:sp>
@@ -11501,11 +11516,15 @@
           </p:nvPr>
         </p:nvSpPr>
         <p:spPr>
+          <a:xfrm>
+            <a:off x="1447159" y="2667000"/>
+            <a:ext cx="10961589" cy="6245113"/>
+          </a:xfrm>
           <a:ln/>
         </p:spPr>
         <p:txBody>
           <a:bodyPr>
-            <a:normAutofit/>
+            <a:normAutofit fontScale="92500" lnSpcReduction="10000"/>
           </a:bodyPr>
           <a:lstStyle/>
           <a:p>
@@ -11520,24 +11539,37 @@
               <a:rPr lang="en-US" dirty="0" smtClean="0">
                 <a:hlinkClick r:id="rId3"/>
               </a:rPr>
-              <a:t>http://faust.cct.lsu.edu/</a:t>
-            </a:r>
-            <a:r>
-              <a:rPr lang="en-US" dirty="0" err="1" smtClean="0">
-                <a:hlinkClick r:id="rId3"/>
-              </a:rPr>
-              <a:t>trac</a:t>
+              <a:t>http:/</a:t>
             </a:r>
             <a:r>
               <a:rPr lang="en-US" dirty="0" smtClean="0">
                 <a:hlinkClick r:id="rId3"/>
               </a:rPr>
-              <a:t>/saga/wiki/</a:t>
-            </a:r>
-            <a:r>
-              <a:rPr lang="en-US" dirty="0" smtClean="0"/>
-              <a:t>... FIXME</a:t>
-            </a:r>
+              <a:t>/saga. cct.lsu.edu/</a:t>
+            </a:r>
+            <a:endParaRPr lang="en-US" dirty="0" smtClean="0"/>
+          </a:p>
+          <a:p>
+            <a:r>
+              <a:rPr lang="en-US" dirty="0" smtClean="0"/>
+              <a:t>Documentation:</a:t>
+            </a:r>
+          </a:p>
+          <a:p>
+            <a:pPr lvl="1"/>
+            <a:r>
+              <a:rPr lang="en-US" dirty="0" smtClean="0"/>
+              <a:t>http</a:t>
+            </a:r>
+            <a:r>
+              <a:rPr lang="en-US" dirty="0" smtClean="0"/>
+              <a:t>://</a:t>
+            </a:r>
+            <a:r>
+              <a:rPr lang="en-US" dirty="0" err="1" smtClean="0"/>
+              <a:t>saga.cct.lsu.edu/software/cpp/documentation</a:t>
+            </a:r>
+            <a:endParaRPr lang="en-US" dirty="0" smtClean="0"/>
           </a:p>
           <a:p>
             <a:r>
@@ -11600,29 +11632,23 @@
             <a:pPr marL="295662"/>
             <a:r>
               <a:rPr lang="en-US" dirty="0" smtClean="0"/>
-              <a:t>Programmers manual</a:t>
-            </a:r>
-          </a:p>
-          <a:p>
-            <a:pPr marL="965200" lvl="1" indent="-477838"/>
-            <a:r>
-              <a:rPr lang="en-US" dirty="0">
-                <a:solidFill>
-                  <a:srgbClr val="B70000"/>
-                </a:solidFill>
-                <a:hlinkClick r:id="rId6"/>
-              </a:rPr>
-              <a:t>http://</a:t>
-            </a:r>
-            <a:r>
-              <a:rPr lang="en-US" dirty="0" smtClean="0">
-                <a:solidFill>
-                  <a:srgbClr val="B70000"/>
-                </a:solidFill>
-                <a:hlinkClick r:id="rId6"/>
-              </a:rPr>
-              <a:t>static.saga.cct.lsu.edu/docs/programming_guide/html/saga-programming-guide.html</a:t>
-            </a:r>
+              <a:t>Programmers</a:t>
+            </a:r>
+            <a:r>
+              <a:rPr lang="en-US" dirty="0" smtClean="0"/>
+              <a:t> Guide:</a:t>
+            </a:r>
+          </a:p>
+          <a:p>
+            <a:pPr marL="783335" lvl="1"/>
+            <a:r>
+              <a:rPr lang="en-US" dirty="0" err="1" smtClean="0"/>
+              <a:t>https://svn.cct.lsu.edu/repos/saga/core/trunk/docs/manuals/programming_guide/tex/saga-programming-guide.pdf</a:t>
+            </a:r>
+            <a:endParaRPr lang="en-US" dirty="0" smtClean="0"/>
+          </a:p>
+          <a:p>
+            <a:pPr marL="783335" lvl="1"/>
             <a:endParaRPr lang="en-US" dirty="0" smtClean="0"/>
           </a:p>
           <a:p>
@@ -11739,7 +11765,7 @@
 </file>
 
 <file path=ppt/slides/slide4.xml><?xml version="1.0" encoding="utf-8"?>
-<p:sld xmlns:a="http://schemas.openxmlformats.org/drawingml/2006/main" xmlns:r="http://schemas.openxmlformats.org/officeDocument/2006/relationships" xmlns:p="http://schemas.openxmlformats.org/presentationml/2006/main">
+<p:sld xmlns:a="http://schemas.openxmlformats.org/drawingml/2006/main" xmlns:r="http://schemas.openxmlformats.org/officeDocument/2006/relationships" xmlns:mc="http://schemas.openxmlformats.org/markup-compatibility/2006" xmlns:mv="urn:schemas-microsoft-com:mac:vml" xmlns:p="http://schemas.openxmlformats.org/presentationml/2006/main" mc:Ignorable="mv" mc:PreserveAttributes="mv:*">
   <p:cSld>
     <p:spTree>
       <p:nvGrpSpPr>
@@ -11903,7 +11929,7 @@
     </p:spTree>
     <p:extLst>
       <p:ext uri="{BB962C8B-B14F-4D97-AF65-F5344CB8AC3E}">
-        <p14:creationId xmlns:p14="http://schemas.microsoft.com/office/powerpoint/2010/main" val="2448934113"/>
+        <p14:creationId xmlns:p14="http://schemas.microsoft.com/office/powerpoint/2010/main" xmlns:p="http://schemas.openxmlformats.org/presentationml/2006/main" xmlns:r="http://schemas.openxmlformats.org/officeDocument/2006/relationships" xmlns:a="http://schemas.openxmlformats.org/drawingml/2006/main" xmlns="" val="2448934113"/>
       </p:ext>
     </p:extLst>
   </p:cSld>
@@ -11922,7 +11948,7 @@
 </file>
 
 <file path=ppt/slides/slide5.xml><?xml version="1.0" encoding="utf-8"?>
-<p:sld xmlns:a="http://schemas.openxmlformats.org/drawingml/2006/main" xmlns:r="http://schemas.openxmlformats.org/officeDocument/2006/relationships" xmlns:p="http://schemas.openxmlformats.org/presentationml/2006/main">
+<p:sld xmlns:a="http://schemas.openxmlformats.org/drawingml/2006/main" xmlns:r="http://schemas.openxmlformats.org/officeDocument/2006/relationships" xmlns:mc="http://schemas.openxmlformats.org/markup-compatibility/2006" xmlns:mv="urn:schemas-microsoft-com:mac:vml" xmlns:p="http://schemas.openxmlformats.org/presentationml/2006/main" mc:Ignorable="mv" mc:PreserveAttributes="mv:*">
   <p:cSld>
     <p:spTree>
       <p:nvGrpSpPr>
@@ -11967,7 +11993,7 @@
             <p:ph idx="1"/>
             <p:extLst>
               <p:ext uri="{D42A27DB-BD31-4B8C-83A1-F6EECF244321}">
-                <p14:modId xmlns:p14="http://schemas.microsoft.com/office/powerpoint/2010/main" val="3478891187"/>
+                <p14:modId xmlns:p14="http://schemas.microsoft.com/office/powerpoint/2010/main" xmlns:p="http://schemas.openxmlformats.org/presentationml/2006/main" xmlns:r="http://schemas.openxmlformats.org/officeDocument/2006/relationships" xmlns:a="http://schemas.openxmlformats.org/drawingml/2006/main" xmlns="" val="3478891187"/>
               </p:ext>
             </p:extLst>
           </p:nvPr>
@@ -12305,11 +12331,7 @@
                       </a:r>
                       <a:r>
                         <a:rPr lang="en-US" sz="2000" baseline="0" dirty="0" smtClean="0"/>
-                        <a:t> </a:t>
-                      </a:r>
-                      <a:r>
-                        <a:rPr lang="en-US" sz="2000" baseline="0" dirty="0" smtClean="0"/>
-                        <a:t>copy </a:t>
+                        <a:t> copy </a:t>
                       </a:r>
                       <a:r>
                         <a:rPr lang="en-US" sz="2000" baseline="0" dirty="0" err="1" smtClean="0"/>
@@ -12760,11 +12782,7 @@
                       <a:pPr algn="l"/>
                       <a:r>
                         <a:rPr lang="en-US" sz="2000" dirty="0" smtClean="0"/>
-                        <a:t>	using </a:t>
-                      </a:r>
-                      <a:r>
-                        <a:rPr lang="en-US" sz="2000" dirty="0" smtClean="0"/>
-                        <a:t>saga::job::job;</a:t>
+                        <a:t>	using saga::job::job;</a:t>
                       </a:r>
                     </a:p>
                     <a:p>
@@ -12902,7 +12920,7 @@
     </p:spTree>
     <p:extLst>
       <p:ext uri="{BB962C8B-B14F-4D97-AF65-F5344CB8AC3E}">
-        <p14:creationId xmlns:p14="http://schemas.microsoft.com/office/powerpoint/2010/main" val="4167202409"/>
+        <p14:creationId xmlns:p14="http://schemas.microsoft.com/office/powerpoint/2010/main" xmlns:p="http://schemas.openxmlformats.org/presentationml/2006/main" xmlns:r="http://schemas.openxmlformats.org/officeDocument/2006/relationships" xmlns:a="http://schemas.openxmlformats.org/drawingml/2006/main" xmlns="" val="4167202409"/>
       </p:ext>
     </p:extLst>
   </p:cSld>
@@ -12920,7 +12938,7 @@
 </file>
 
 <file path=ppt/slides/slide6.xml><?xml version="1.0" encoding="utf-8"?>
-<p:sld xmlns:a="http://schemas.openxmlformats.org/drawingml/2006/main" xmlns:r="http://schemas.openxmlformats.org/officeDocument/2006/relationships" xmlns:p="http://schemas.openxmlformats.org/presentationml/2006/main">
+<p:sld xmlns:a="http://schemas.openxmlformats.org/drawingml/2006/main" xmlns:r="http://schemas.openxmlformats.org/officeDocument/2006/relationships" xmlns:mc="http://schemas.openxmlformats.org/markup-compatibility/2006" xmlns:mv="urn:schemas-microsoft-com:mac:vml" xmlns:p="http://schemas.openxmlformats.org/presentationml/2006/main" mc:Ignorable="mv" mc:PreserveAttributes="mv:*">
   <p:cSld>
     <p:spTree>
       <p:nvGrpSpPr>
@@ -13183,7 +13201,7 @@
 </file>
 
 <file path=ppt/slides/slide7.xml><?xml version="1.0" encoding="utf-8"?>
-<p:sld xmlns:a="http://schemas.openxmlformats.org/drawingml/2006/main" xmlns:r="http://schemas.openxmlformats.org/officeDocument/2006/relationships" xmlns:p="http://schemas.openxmlformats.org/presentationml/2006/main">
+<p:sld xmlns:a="http://schemas.openxmlformats.org/drawingml/2006/main" xmlns:r="http://schemas.openxmlformats.org/officeDocument/2006/relationships" xmlns:mc="http://schemas.openxmlformats.org/markup-compatibility/2006" xmlns:mv="urn:schemas-microsoft-com:mac:vml" xmlns:p="http://schemas.openxmlformats.org/presentationml/2006/main" mc:Ignorable="mv" mc:PreserveAttributes="mv:*">
   <p:cSld>
     <p:spTree>
       <p:nvGrpSpPr>
@@ -13386,7 +13404,7 @@
 </file>
 
 <file path=ppt/slides/slide8.xml><?xml version="1.0" encoding="utf-8"?>
-<p:sld xmlns:a="http://schemas.openxmlformats.org/drawingml/2006/main" xmlns:r="http://schemas.openxmlformats.org/officeDocument/2006/relationships" xmlns:p="http://schemas.openxmlformats.org/presentationml/2006/main">
+<p:sld xmlns:a="http://schemas.openxmlformats.org/drawingml/2006/main" xmlns:r="http://schemas.openxmlformats.org/officeDocument/2006/relationships" xmlns:mc="http://schemas.openxmlformats.org/markup-compatibility/2006" xmlns:mv="urn:schemas-microsoft-com:mac:vml" xmlns:p="http://schemas.openxmlformats.org/presentationml/2006/main" mc:Ignorable="mv" mc:PreserveAttributes="mv:*">
   <p:cSld>
     <p:spTree>
       <p:nvGrpSpPr>
@@ -13555,7 +13573,7 @@
           <p:nvPr>
             <p:extLst>
               <p:ext uri="{D42A27DB-BD31-4B8C-83A1-F6EECF244321}">
-                <p14:modId xmlns:p14="http://schemas.microsoft.com/office/powerpoint/2010/main" val="3768818699"/>
+                <p14:modId xmlns:p14="http://schemas.microsoft.com/office/powerpoint/2010/main" xmlns:p="http://schemas.openxmlformats.org/presentationml/2006/main" xmlns:r="http://schemas.openxmlformats.org/officeDocument/2006/relationships" xmlns:a="http://schemas.openxmlformats.org/drawingml/2006/main" xmlns="" val="3768818699"/>
               </p:ext>
             </p:extLst>
           </p:nvPr>
@@ -13862,7 +13880,7 @@
 </file>
 
 <file path=ppt/slides/slide9.xml><?xml version="1.0" encoding="utf-8"?>
-<p:sld xmlns:a="http://schemas.openxmlformats.org/drawingml/2006/main" xmlns:r="http://schemas.openxmlformats.org/officeDocument/2006/relationships" xmlns:p="http://schemas.openxmlformats.org/presentationml/2006/main">
+<p:sld xmlns:a="http://schemas.openxmlformats.org/drawingml/2006/main" xmlns:r="http://schemas.openxmlformats.org/officeDocument/2006/relationships" xmlns:mc="http://schemas.openxmlformats.org/markup-compatibility/2006" xmlns:mv="urn:schemas-microsoft-com:mac:vml" xmlns:p="http://schemas.openxmlformats.org/presentationml/2006/main" mc:Ignorable="mv" mc:PreserveAttributes="mv:*">
   <p:cSld>
     <p:spTree>
       <p:nvGrpSpPr>
@@ -14031,7 +14049,7 @@
           <p:nvPr>
             <p:extLst>
               <p:ext uri="{D42A27DB-BD31-4B8C-83A1-F6EECF244321}">
-                <p14:modId xmlns:p14="http://schemas.microsoft.com/office/powerpoint/2010/main" val="1142005977"/>
+                <p14:modId xmlns:p14="http://schemas.microsoft.com/office/powerpoint/2010/main" xmlns:p="http://schemas.openxmlformats.org/presentationml/2006/main" xmlns:r="http://schemas.openxmlformats.org/officeDocument/2006/relationships" xmlns:a="http://schemas.openxmlformats.org/drawingml/2006/main" xmlns="" val="1142005977"/>
               </p:ext>
             </p:extLst>
           </p:nvPr>

</xml_diff>

<commit_message>
Updating examples, minor changes
git-svn-id: file://localhost/tmp/svn2git/svn@3259 defb5e50-622e-49ec-a68e-d72c7db87b45
</commit_message>
<xml_diff>
--- a/tutorial/general_tutorial/SAGA-API-levels.pptx
+++ b/tutorial/general_tutorial/SAGA-API-levels.pptx
@@ -1,11 +1,11 @@
 
 <file path=ppt/presentation.xml><?xml version="1.0" encoding="utf-8"?>
-<p:presentation xmlns:a="http://schemas.openxmlformats.org/drawingml/2006/main" xmlns:r="http://schemas.openxmlformats.org/officeDocument/2006/relationships" xmlns:mc="http://schemas.openxmlformats.org/markup-compatibility/2006" xmlns:mv="urn:schemas-microsoft-com:mac:vml" xmlns:p="http://schemas.openxmlformats.org/presentationml/2006/main" mc:Ignorable="mv" mc:PreserveAttributes="mv:*" showSpecialPlsOnTitleSld="0" strictFirstAndLastChars="0" saveSubsetFonts="1">
+<p:presentation xmlns:a="http://schemas.openxmlformats.org/drawingml/2006/main" xmlns:r="http://schemas.openxmlformats.org/officeDocument/2006/relationships" xmlns:p="http://schemas.openxmlformats.org/presentationml/2006/main" showSpecialPlsOnTitleSld="0" strictFirstAndLastChars="0" saveSubsetFonts="1">
   <p:sldMasterIdLst>
     <p:sldMasterId id="2147483701" r:id="rId1"/>
   </p:sldMasterIdLst>
   <p:notesMasterIdLst>
-    <p:notesMasterId r:id="rId28"/>
+    <p:notesMasterId r:id="rId29"/>
   </p:notesMasterIdLst>
   <p:sldIdLst>
     <p:sldId id="259" r:id="rId2"/>
@@ -24,16 +24,17 @@
     <p:sldId id="309" r:id="rId15"/>
     <p:sldId id="314" r:id="rId16"/>
     <p:sldId id="311" r:id="rId17"/>
-    <p:sldId id="310" r:id="rId18"/>
-    <p:sldId id="315" r:id="rId19"/>
-    <p:sldId id="316" r:id="rId20"/>
-    <p:sldId id="317" r:id="rId21"/>
-    <p:sldId id="318" r:id="rId22"/>
-    <p:sldId id="295" r:id="rId23"/>
-    <p:sldId id="257" r:id="rId24"/>
-    <p:sldId id="299" r:id="rId25"/>
-    <p:sldId id="301" r:id="rId26"/>
-    <p:sldId id="303" r:id="rId27"/>
+    <p:sldId id="319" r:id="rId18"/>
+    <p:sldId id="310" r:id="rId19"/>
+    <p:sldId id="315" r:id="rId20"/>
+    <p:sldId id="316" r:id="rId21"/>
+    <p:sldId id="317" r:id="rId22"/>
+    <p:sldId id="318" r:id="rId23"/>
+    <p:sldId id="295" r:id="rId24"/>
+    <p:sldId id="257" r:id="rId25"/>
+    <p:sldId id="299" r:id="rId26"/>
+    <p:sldId id="301" r:id="rId27"/>
+    <p:sldId id="303" r:id="rId28"/>
   </p:sldIdLst>
   <p:sldSz cx="13004800" cy="9753600"/>
   <p:notesSz cx="6858000" cy="9144000"/>
@@ -175,7 +176,7 @@
 </file>
 
 <file path=ppt/notesMasters/notesMaster1.xml><?xml version="1.0" encoding="utf-8"?>
-<p:notesMaster xmlns:a="http://schemas.openxmlformats.org/drawingml/2006/main" xmlns:r="http://schemas.openxmlformats.org/officeDocument/2006/relationships" xmlns:mc="http://schemas.openxmlformats.org/markup-compatibility/2006" xmlns:mv="urn:schemas-microsoft-com:mac:vml" xmlns:p="http://schemas.openxmlformats.org/presentationml/2006/main" mc:Ignorable="mv" mc:PreserveAttributes="mv:*">
+<p:notesMaster xmlns:a="http://schemas.openxmlformats.org/drawingml/2006/main" xmlns:r="http://schemas.openxmlformats.org/officeDocument/2006/relationships" xmlns:p="http://schemas.openxmlformats.org/presentationml/2006/main">
   <p:cSld>
     <p:bg>
       <p:bgRef idx="1001">
@@ -257,7 +258,7 @@
             <a:fld id="{FD89E5DE-5FFC-4DBE-9A7F-2C9F568D0D45}" type="datetimeFigureOut">
               <a:rPr lang="en-US" smtClean="0"/>
               <a:pPr/>
-              <a:t>11/28/10</a:t>
+              <a:t>11/28/2010</a:t>
             </a:fld>
             <a:endParaRPr lang="en-US"/>
           </a:p>
@@ -428,7 +429,7 @@
     </p:spTree>
     <p:extLst>
       <p:ext uri="{BB962C8B-B14F-4D97-AF65-F5344CB8AC3E}">
-        <p14:creationId xmlns:p14="http://schemas.microsoft.com/office/powerpoint/2010/main" xmlns:p="http://schemas.openxmlformats.org/presentationml/2006/main" xmlns:r="http://schemas.openxmlformats.org/officeDocument/2006/relationships" xmlns:a="http://schemas.openxmlformats.org/drawingml/2006/main" xmlns="" val="2265826956"/>
+        <p14:creationId xmlns:p14="http://schemas.microsoft.com/office/powerpoint/2010/main" val="2265826956"/>
       </p:ext>
     </p:extLst>
   </p:cSld>
@@ -529,7 +530,7 @@
 </file>
 
 <file path=ppt/notesSlides/notesSlide1.xml><?xml version="1.0" encoding="utf-8"?>
-<p:notes xmlns:a="http://schemas.openxmlformats.org/drawingml/2006/main" xmlns:r="http://schemas.openxmlformats.org/officeDocument/2006/relationships" xmlns:mc="http://schemas.openxmlformats.org/markup-compatibility/2006" xmlns:mv="urn:schemas-microsoft-com:mac:vml" xmlns:p="http://schemas.openxmlformats.org/presentationml/2006/main" mc:Ignorable="mv" mc:PreserveAttributes="mv:*">
+<p:notes xmlns:a="http://schemas.openxmlformats.org/drawingml/2006/main" xmlns:r="http://schemas.openxmlformats.org/officeDocument/2006/relationships" xmlns:p="http://schemas.openxmlformats.org/presentationml/2006/main">
   <p:cSld>
     <p:spTree>
       <p:nvGrpSpPr>
@@ -611,7 +612,7 @@
 </file>
 
 <file path=ppt/slideLayouts/slideLayout1.xml><?xml version="1.0" encoding="utf-8"?>
-<p:sldLayout xmlns:a="http://schemas.openxmlformats.org/drawingml/2006/main" xmlns:r="http://schemas.openxmlformats.org/officeDocument/2006/relationships" xmlns:mc="http://schemas.openxmlformats.org/markup-compatibility/2006" xmlns:mv="urn:schemas-microsoft-com:mac:vml" xmlns:p="http://schemas.openxmlformats.org/presentationml/2006/main" mc:Ignorable="mv" mc:PreserveAttributes="mv:*" preserve="1">
+<p:sldLayout xmlns:a="http://schemas.openxmlformats.org/drawingml/2006/main" xmlns:r="http://schemas.openxmlformats.org/officeDocument/2006/relationships" xmlns:p="http://schemas.openxmlformats.org/presentationml/2006/main" preserve="1">
   <p:cSld name="Title Slide">
     <p:spTree>
       <p:nvGrpSpPr>
@@ -796,7 +797,7 @@
           <a:p>
             <a:r>
               <a:rPr lang="en-US" smtClean="0"/>
-              <a:t>November FIXME, 2010</a:t>
+              <a:t>November 29th, 2010</a:t>
             </a:r>
             <a:endParaRPr lang="en-US" dirty="0"/>
           </a:p>
@@ -839,7 +840,7 @@
 </file>
 
 <file path=ppt/slideLayouts/slideLayout10.xml><?xml version="1.0" encoding="utf-8"?>
-<p:sldLayout xmlns:a="http://schemas.openxmlformats.org/drawingml/2006/main" xmlns:r="http://schemas.openxmlformats.org/officeDocument/2006/relationships" xmlns:mc="http://schemas.openxmlformats.org/markup-compatibility/2006" xmlns:mv="urn:schemas-microsoft-com:mac:vml" xmlns:p="http://schemas.openxmlformats.org/presentationml/2006/main" mc:Ignorable="mv" mc:PreserveAttributes="mv:*" type="picTx" preserve="1">
+<p:sldLayout xmlns:a="http://schemas.openxmlformats.org/drawingml/2006/main" xmlns:r="http://schemas.openxmlformats.org/officeDocument/2006/relationships" xmlns:p="http://schemas.openxmlformats.org/presentationml/2006/main" type="picTx" preserve="1">
   <p:cSld name="Picture with Caption">
     <p:spTree>
       <p:nvGrpSpPr>
@@ -1103,7 +1104,7 @@
           <a:p>
             <a:r>
               <a:rPr lang="en-US" smtClean="0"/>
-              <a:t>November FIXME, 2010</a:t>
+              <a:t>November 29th, 2010</a:t>
             </a:r>
             <a:endParaRPr lang="en-US"/>
           </a:p>
@@ -1165,7 +1166,7 @@
 </file>
 
 <file path=ppt/slideLayouts/slideLayout11.xml><?xml version="1.0" encoding="utf-8"?>
-<p:sldLayout xmlns:a="http://schemas.openxmlformats.org/drawingml/2006/main" xmlns:r="http://schemas.openxmlformats.org/officeDocument/2006/relationships" xmlns:mc="http://schemas.openxmlformats.org/markup-compatibility/2006" xmlns:mv="urn:schemas-microsoft-com:mac:vml" xmlns:p="http://schemas.openxmlformats.org/presentationml/2006/main" mc:Ignorable="mv" mc:PreserveAttributes="mv:*" preserve="1">
+<p:sldLayout xmlns:a="http://schemas.openxmlformats.org/drawingml/2006/main" xmlns:r="http://schemas.openxmlformats.org/officeDocument/2006/relationships" xmlns:p="http://schemas.openxmlformats.org/presentationml/2006/main" preserve="1">
   <p:cSld name="Picture above Caption">
     <p:spTree>
       <p:nvGrpSpPr>
@@ -1382,7 +1383,7 @@
           <a:p>
             <a:r>
               <a:rPr lang="en-US" smtClean="0"/>
-              <a:t>November FIXME, 2010</a:t>
+              <a:t>November 29th, 2010</a:t>
             </a:r>
             <a:endParaRPr lang="en-US" dirty="0"/>
           </a:p>
@@ -1455,7 +1456,7 @@
 </file>
 
 <file path=ppt/slideLayouts/slideLayout12.xml><?xml version="1.0" encoding="utf-8"?>
-<p:sldLayout xmlns:a="http://schemas.openxmlformats.org/drawingml/2006/main" xmlns:r="http://schemas.openxmlformats.org/officeDocument/2006/relationships" xmlns:mc="http://schemas.openxmlformats.org/markup-compatibility/2006" xmlns:mv="urn:schemas-microsoft-com:mac:vml" xmlns:p="http://schemas.openxmlformats.org/presentationml/2006/main" mc:Ignorable="mv" mc:PreserveAttributes="mv:*" preserve="1">
+<p:sldLayout xmlns:a="http://schemas.openxmlformats.org/drawingml/2006/main" xmlns:r="http://schemas.openxmlformats.org/officeDocument/2006/relationships" xmlns:p="http://schemas.openxmlformats.org/presentationml/2006/main" preserve="1">
   <p:cSld name="2 Pictures with Caption">
     <p:spTree>
       <p:nvGrpSpPr>
@@ -1677,7 +1678,7 @@
           <a:p>
             <a:r>
               <a:rPr lang="en-US" smtClean="0"/>
-              <a:t>November FIXME, 2010</a:t>
+              <a:t>November 29th, 2010</a:t>
             </a:r>
             <a:endParaRPr lang="en-US" dirty="0"/>
           </a:p>
@@ -1785,7 +1786,7 @@
 </file>
 
 <file path=ppt/slideLayouts/slideLayout13.xml><?xml version="1.0" encoding="utf-8"?>
-<p:sldLayout xmlns:a="http://schemas.openxmlformats.org/drawingml/2006/main" xmlns:r="http://schemas.openxmlformats.org/officeDocument/2006/relationships" xmlns:mc="http://schemas.openxmlformats.org/markup-compatibility/2006" xmlns:mv="urn:schemas-microsoft-com:mac:vml" xmlns:p="http://schemas.openxmlformats.org/presentationml/2006/main" mc:Ignorable="mv" mc:PreserveAttributes="mv:*" preserve="1">
+<p:sldLayout xmlns:a="http://schemas.openxmlformats.org/drawingml/2006/main" xmlns:r="http://schemas.openxmlformats.org/officeDocument/2006/relationships" xmlns:p="http://schemas.openxmlformats.org/presentationml/2006/main" preserve="1">
   <p:cSld name="3 Pictures with Caption">
     <p:spTree>
       <p:nvGrpSpPr>
@@ -2007,7 +2008,7 @@
           <a:p>
             <a:r>
               <a:rPr lang="en-US" smtClean="0"/>
-              <a:t>November FIXME, 2010</a:t>
+              <a:t>November 29th, 2010</a:t>
             </a:r>
             <a:endParaRPr lang="en-US" dirty="0"/>
           </a:p>
@@ -2150,7 +2151,7 @@
 </file>
 
 <file path=ppt/slideLayouts/slideLayout14.xml><?xml version="1.0" encoding="utf-8"?>
-<p:sldLayout xmlns:a="http://schemas.openxmlformats.org/drawingml/2006/main" xmlns:r="http://schemas.openxmlformats.org/officeDocument/2006/relationships" xmlns:mc="http://schemas.openxmlformats.org/markup-compatibility/2006" xmlns:mv="urn:schemas-microsoft-com:mac:vml" xmlns:p="http://schemas.openxmlformats.org/presentationml/2006/main" mc:Ignorable="mv" mc:PreserveAttributes="mv:*" type="vertTx" preserve="1">
+<p:sldLayout xmlns:a="http://schemas.openxmlformats.org/drawingml/2006/main" xmlns:r="http://schemas.openxmlformats.org/officeDocument/2006/relationships" xmlns:p="http://schemas.openxmlformats.org/presentationml/2006/main" type="vertTx" preserve="1">
   <p:cSld name="Title and Vertical Text">
     <p:spTree>
       <p:nvGrpSpPr>
@@ -2258,7 +2259,7 @@
           <a:p>
             <a:r>
               <a:rPr lang="en-US" smtClean="0"/>
-              <a:t>November FIXME, 2010</a:t>
+              <a:t>November 29th, 2010</a:t>
             </a:r>
             <a:endParaRPr lang="en-US"/>
           </a:p>
@@ -2320,7 +2321,7 @@
 </file>
 
 <file path=ppt/slideLayouts/slideLayout15.xml><?xml version="1.0" encoding="utf-8"?>
-<p:sldLayout xmlns:a="http://schemas.openxmlformats.org/drawingml/2006/main" xmlns:r="http://schemas.openxmlformats.org/officeDocument/2006/relationships" xmlns:mc="http://schemas.openxmlformats.org/markup-compatibility/2006" xmlns:mv="urn:schemas-microsoft-com:mac:vml" xmlns:p="http://schemas.openxmlformats.org/presentationml/2006/main" mc:Ignorable="mv" mc:PreserveAttributes="mv:*" type="vertTitleAndTx" preserve="1">
+<p:sldLayout xmlns:a="http://schemas.openxmlformats.org/drawingml/2006/main" xmlns:r="http://schemas.openxmlformats.org/officeDocument/2006/relationships" xmlns:p="http://schemas.openxmlformats.org/presentationml/2006/main" type="vertTitleAndTx" preserve="1">
   <p:cSld name="Vertical Title and Text">
     <p:spTree>
       <p:nvGrpSpPr>
@@ -2438,7 +2439,7 @@
           <a:p>
             <a:r>
               <a:rPr lang="en-US" smtClean="0"/>
-              <a:t>November FIXME, 2010</a:t>
+              <a:t>November 29th, 2010</a:t>
             </a:r>
             <a:endParaRPr lang="en-US"/>
           </a:p>
@@ -2500,7 +2501,7 @@
 </file>
 
 <file path=ppt/slideLayouts/slideLayout16.xml><?xml version="1.0" encoding="utf-8"?>
-<p:sldLayout xmlns:a="http://schemas.openxmlformats.org/drawingml/2006/main" xmlns:r="http://schemas.openxmlformats.org/officeDocument/2006/relationships" xmlns:mc="http://schemas.openxmlformats.org/markup-compatibility/2006" xmlns:mv="urn:schemas-microsoft-com:mac:vml" xmlns:p="http://schemas.openxmlformats.org/presentationml/2006/main" mc:Ignorable="mv" mc:PreserveAttributes="mv:*" showMasterSp="0" type="title">
+<p:sldLayout xmlns:a="http://schemas.openxmlformats.org/drawingml/2006/main" xmlns:r="http://schemas.openxmlformats.org/officeDocument/2006/relationships" xmlns:p="http://schemas.openxmlformats.org/presentationml/2006/main" showMasterSp="0" type="title">
   <p:cSld name="1_Title Slide">
     <p:spTree>
       <p:nvGrpSpPr>
@@ -2649,7 +2650,7 @@
           <a:p>
             <a:r>
               <a:rPr lang="en-US" smtClean="0"/>
-              <a:t>November FIXME, 2010</a:t>
+              <a:t>November 29th, 2010</a:t>
             </a:r>
             <a:endParaRPr lang="en-US" dirty="0"/>
           </a:p>
@@ -2779,7 +2780,7 @@
 </file>
 
 <file path=ppt/slideLayouts/slideLayout2.xml><?xml version="1.0" encoding="utf-8"?>
-<p:sldLayout xmlns:a="http://schemas.openxmlformats.org/drawingml/2006/main" xmlns:r="http://schemas.openxmlformats.org/officeDocument/2006/relationships" xmlns:mc="http://schemas.openxmlformats.org/markup-compatibility/2006" xmlns:mv="urn:schemas-microsoft-com:mac:vml" xmlns:p="http://schemas.openxmlformats.org/presentationml/2006/main" mc:Ignorable="mv" mc:PreserveAttributes="mv:*" type="obj" preserve="1">
+<p:sldLayout xmlns:a="http://schemas.openxmlformats.org/drawingml/2006/main" xmlns:r="http://schemas.openxmlformats.org/officeDocument/2006/relationships" xmlns:p="http://schemas.openxmlformats.org/presentationml/2006/main" type="obj" preserve="1">
   <p:cSld name="Title and Content">
     <p:spTree>
       <p:nvGrpSpPr>
@@ -2972,7 +2973,7 @@
           <a:p>
             <a:r>
               <a:rPr lang="en-US" smtClean="0"/>
-              <a:t>November FIXME, 2010</a:t>
+              <a:t>November 29th, 2010</a:t>
             </a:r>
             <a:endParaRPr lang="en-US" dirty="0"/>
           </a:p>
@@ -3079,7 +3080,7 @@
 </file>
 
 <file path=ppt/slideLayouts/slideLayout3.xml><?xml version="1.0" encoding="utf-8"?>
-<p:sldLayout xmlns:a="http://schemas.openxmlformats.org/drawingml/2006/main" xmlns:r="http://schemas.openxmlformats.org/officeDocument/2006/relationships" xmlns:mc="http://schemas.openxmlformats.org/markup-compatibility/2006" xmlns:mv="urn:schemas-microsoft-com:mac:vml" xmlns:p="http://schemas.openxmlformats.org/presentationml/2006/main" mc:Ignorable="mv" mc:PreserveAttributes="mv:*" preserve="1">
+<p:sldLayout xmlns:a="http://schemas.openxmlformats.org/drawingml/2006/main" xmlns:r="http://schemas.openxmlformats.org/officeDocument/2006/relationships" xmlns:p="http://schemas.openxmlformats.org/presentationml/2006/main" preserve="1">
   <p:cSld name="Title Slide with Picture">
     <p:spTree>
       <p:nvGrpSpPr>
@@ -3291,7 +3292,7 @@
           <a:p>
             <a:r>
               <a:rPr lang="en-US" smtClean="0"/>
-              <a:t>November FIXME, 2010</a:t>
+              <a:t>November 29th, 2010</a:t>
             </a:r>
             <a:endParaRPr lang="en-US" dirty="0"/>
           </a:p>
@@ -3364,7 +3365,7 @@
 </file>
 
 <file path=ppt/slideLayouts/slideLayout4.xml><?xml version="1.0" encoding="utf-8"?>
-<p:sldLayout xmlns:a="http://schemas.openxmlformats.org/drawingml/2006/main" xmlns:r="http://schemas.openxmlformats.org/officeDocument/2006/relationships" xmlns:mc="http://schemas.openxmlformats.org/markup-compatibility/2006" xmlns:mv="urn:schemas-microsoft-com:mac:vml" xmlns:p="http://schemas.openxmlformats.org/presentationml/2006/main" mc:Ignorable="mv" mc:PreserveAttributes="mv:*" type="secHead" preserve="1">
+<p:sldLayout xmlns:a="http://schemas.openxmlformats.org/drawingml/2006/main" xmlns:r="http://schemas.openxmlformats.org/officeDocument/2006/relationships" xmlns:p="http://schemas.openxmlformats.org/presentationml/2006/main" type="secHead" preserve="1">
   <p:cSld name="Section Header">
     <p:spTree>
       <p:nvGrpSpPr>
@@ -3602,7 +3603,7 @@
           <a:p>
             <a:r>
               <a:rPr lang="en-US" smtClean="0"/>
-              <a:t>November FIXME, 2010</a:t>
+              <a:t>November 29th, 2010</a:t>
             </a:r>
             <a:endParaRPr lang="en-US" dirty="0"/>
           </a:p>
@@ -3700,7 +3701,7 @@
 </file>
 
 <file path=ppt/slideLayouts/slideLayout5.xml><?xml version="1.0" encoding="utf-8"?>
-<p:sldLayout xmlns:a="http://schemas.openxmlformats.org/drawingml/2006/main" xmlns:r="http://schemas.openxmlformats.org/officeDocument/2006/relationships" xmlns:mc="http://schemas.openxmlformats.org/markup-compatibility/2006" xmlns:mv="urn:schemas-microsoft-com:mac:vml" xmlns:p="http://schemas.openxmlformats.org/presentationml/2006/main" mc:Ignorable="mv" mc:PreserveAttributes="mv:*" type="twoObj" preserve="1">
+<p:sldLayout xmlns:a="http://schemas.openxmlformats.org/drawingml/2006/main" xmlns:r="http://schemas.openxmlformats.org/officeDocument/2006/relationships" xmlns:p="http://schemas.openxmlformats.org/presentationml/2006/main" type="twoObj" preserve="1">
   <p:cSld name="Two Content">
     <p:spTree>
       <p:nvGrpSpPr>
@@ -3935,7 +3936,7 @@
           <a:p>
             <a:r>
               <a:rPr lang="en-US" smtClean="0"/>
-              <a:t>November FIXME, 2010</a:t>
+              <a:t>November 29th, 2010</a:t>
             </a:r>
             <a:endParaRPr lang="en-US" dirty="0"/>
           </a:p>
@@ -4033,7 +4034,7 @@
 </file>
 
 <file path=ppt/slideLayouts/slideLayout6.xml><?xml version="1.0" encoding="utf-8"?>
-<p:sldLayout xmlns:a="http://schemas.openxmlformats.org/drawingml/2006/main" xmlns:r="http://schemas.openxmlformats.org/officeDocument/2006/relationships" xmlns:mc="http://schemas.openxmlformats.org/markup-compatibility/2006" xmlns:mv="urn:schemas-microsoft-com:mac:vml" xmlns:p="http://schemas.openxmlformats.org/presentationml/2006/main" mc:Ignorable="mv" mc:PreserveAttributes="mv:*" type="twoTxTwoObj" preserve="1">
+<p:sldLayout xmlns:a="http://schemas.openxmlformats.org/drawingml/2006/main" xmlns:r="http://schemas.openxmlformats.org/officeDocument/2006/relationships" xmlns:p="http://schemas.openxmlformats.org/presentationml/2006/main" type="twoTxTwoObj" preserve="1">
   <p:cSld name="Comparison">
     <p:spTree>
       <p:nvGrpSpPr>
@@ -4406,7 +4407,7 @@
           <a:p>
             <a:r>
               <a:rPr lang="en-US" smtClean="0"/>
-              <a:t>November FIXME, 2010</a:t>
+              <a:t>November 29th, 2010</a:t>
             </a:r>
             <a:endParaRPr lang="en-US" dirty="0"/>
           </a:p>
@@ -4737,7 +4738,7 @@
 </file>
 
 <file path=ppt/slideLayouts/slideLayout7.xml><?xml version="1.0" encoding="utf-8"?>
-<p:sldLayout xmlns:a="http://schemas.openxmlformats.org/drawingml/2006/main" xmlns:r="http://schemas.openxmlformats.org/officeDocument/2006/relationships" xmlns:mc="http://schemas.openxmlformats.org/markup-compatibility/2006" xmlns:mv="urn:schemas-microsoft-com:mac:vml" xmlns:p="http://schemas.openxmlformats.org/presentationml/2006/main" mc:Ignorable="mv" mc:PreserveAttributes="mv:*" type="titleOnly" preserve="1">
+<p:sldLayout xmlns:a="http://schemas.openxmlformats.org/drawingml/2006/main" xmlns:r="http://schemas.openxmlformats.org/officeDocument/2006/relationships" xmlns:p="http://schemas.openxmlformats.org/presentationml/2006/main" type="titleOnly" preserve="1">
   <p:cSld name="Title Only">
     <p:spTree>
       <p:nvGrpSpPr>
@@ -4793,7 +4794,7 @@
           <a:p>
             <a:r>
               <a:rPr lang="en-US" smtClean="0"/>
-              <a:t>November FIXME, 2010</a:t>
+              <a:t>November 29th, 2010</a:t>
             </a:r>
             <a:endParaRPr lang="en-US" dirty="0"/>
           </a:p>
@@ -4891,7 +4892,7 @@
 </file>
 
 <file path=ppt/slideLayouts/slideLayout8.xml><?xml version="1.0" encoding="utf-8"?>
-<p:sldLayout xmlns:a="http://schemas.openxmlformats.org/drawingml/2006/main" xmlns:r="http://schemas.openxmlformats.org/officeDocument/2006/relationships" xmlns:mc="http://schemas.openxmlformats.org/markup-compatibility/2006" xmlns:mv="urn:schemas-microsoft-com:mac:vml" xmlns:p="http://schemas.openxmlformats.org/presentationml/2006/main" mc:Ignorable="mv" mc:PreserveAttributes="mv:*" type="blank" preserve="1">
+<p:sldLayout xmlns:a="http://schemas.openxmlformats.org/drawingml/2006/main" xmlns:r="http://schemas.openxmlformats.org/officeDocument/2006/relationships" xmlns:p="http://schemas.openxmlformats.org/presentationml/2006/main" type="blank" preserve="1">
   <p:cSld name="Blank">
     <p:spTree>
       <p:nvGrpSpPr>
@@ -4924,7 +4925,7 @@
           <a:p>
             <a:r>
               <a:rPr lang="en-US" smtClean="0"/>
-              <a:t>November FIXME, 2010</a:t>
+              <a:t>November 29th, 2010</a:t>
             </a:r>
             <a:endParaRPr lang="en-US" dirty="0"/>
           </a:p>
@@ -5058,7 +5059,7 @@
 </file>
 
 <file path=ppt/slideLayouts/slideLayout9.xml><?xml version="1.0" encoding="utf-8"?>
-<p:sldLayout xmlns:a="http://schemas.openxmlformats.org/drawingml/2006/main" xmlns:r="http://schemas.openxmlformats.org/officeDocument/2006/relationships" xmlns:mc="http://schemas.openxmlformats.org/markup-compatibility/2006" xmlns:mv="urn:schemas-microsoft-com:mac:vml" xmlns:p="http://schemas.openxmlformats.org/presentationml/2006/main" mc:Ignorable="mv" mc:PreserveAttributes="mv:*" type="objTx" preserve="1">
+<p:sldLayout xmlns:a="http://schemas.openxmlformats.org/drawingml/2006/main" xmlns:r="http://schemas.openxmlformats.org/officeDocument/2006/relationships" xmlns:p="http://schemas.openxmlformats.org/presentationml/2006/main" type="objTx" preserve="1">
   <p:cSld name="Content with Caption">
     <p:spTree>
       <p:nvGrpSpPr>
@@ -5338,7 +5339,7 @@
           <a:p>
             <a:r>
               <a:rPr lang="en-US" smtClean="0"/>
-              <a:t>November FIXME, 2010</a:t>
+              <a:t>November 29th, 2010</a:t>
             </a:r>
             <a:endParaRPr lang="en-US" dirty="0"/>
           </a:p>
@@ -5436,7 +5437,7 @@
 </file>
 
 <file path=ppt/slideMasters/slideMaster1.xml><?xml version="1.0" encoding="utf-8"?>
-<p:sldMaster xmlns:a="http://schemas.openxmlformats.org/drawingml/2006/main" xmlns:r="http://schemas.openxmlformats.org/officeDocument/2006/relationships" xmlns:mc="http://schemas.openxmlformats.org/markup-compatibility/2006" xmlns:mv="urn:schemas-microsoft-com:mac:vml" xmlns:p="http://schemas.openxmlformats.org/presentationml/2006/main" mc:Ignorable="mv" mc:PreserveAttributes="mv:*">
+<p:sldMaster xmlns:a="http://schemas.openxmlformats.org/drawingml/2006/main" xmlns:r="http://schemas.openxmlformats.org/officeDocument/2006/relationships" xmlns:p="http://schemas.openxmlformats.org/presentationml/2006/main">
   <p:cSld>
     <p:bg>
       <p:bgRef idx="1001">
@@ -5591,7 +5592,7 @@
           <a:p>
             <a:r>
               <a:rPr lang="en-US" smtClean="0"/>
-              <a:t>November FIXME, 2010</a:t>
+              <a:t>November 29th, 2010</a:t>
             </a:r>
             <a:endParaRPr lang="en-US" dirty="0"/>
           </a:p>
@@ -6094,7 +6095,7 @@
 </file>
 
 <file path=ppt/slides/slide1.xml><?xml version="1.0" encoding="utf-8"?>
-<p:sld xmlns:a="http://schemas.openxmlformats.org/drawingml/2006/main" xmlns:r="http://schemas.openxmlformats.org/officeDocument/2006/relationships" xmlns:mc="http://schemas.openxmlformats.org/markup-compatibility/2006" xmlns:mv="urn:schemas-microsoft-com:mac:vml" xmlns:p="http://schemas.openxmlformats.org/presentationml/2006/main" mc:Ignorable="mv" mc:PreserveAttributes="mv:*">
+<p:sld xmlns:a="http://schemas.openxmlformats.org/drawingml/2006/main" xmlns:r="http://schemas.openxmlformats.org/officeDocument/2006/relationships" xmlns:p="http://schemas.openxmlformats.org/presentationml/2006/main">
   <p:cSld>
     <p:spTree>
       <p:nvGrpSpPr>
@@ -6166,7 +6167,7 @@
               <a:solidFill>
                 <a:schemeClr val="bg2"/>
               </a:solidFill>
-              <a:hlinkClick r:id="rId2" invalidUrl="file:///%5C%5Clocalhost%5CUsers%5Coweidner%5CDesktop%5Cfaust_agents_01.graffle%5C"/>
+              <a:hlinkClick r:id="rId2"/>
             </a:endParaRPr>
           </a:p>
         </p:txBody>
@@ -6206,8 +6207,8 @@
           <a:lstStyle/>
           <a:p>
             <a:r>
-              <a:rPr lang="en-US" smtClean="0"/>
-              <a:t>November FIXME, 2010</a:t>
+              <a:rPr lang="en-US" dirty="0" smtClean="0"/>
+              <a:t>November 29th, 2010</a:t>
             </a:r>
             <a:endParaRPr lang="en-US" dirty="0"/>
           </a:p>
@@ -6277,7 +6278,7 @@
 </file>
 
 <file path=ppt/slides/slide10.xml><?xml version="1.0" encoding="utf-8"?>
-<p:sld xmlns:a="http://schemas.openxmlformats.org/drawingml/2006/main" xmlns:r="http://schemas.openxmlformats.org/officeDocument/2006/relationships" xmlns:mc="http://schemas.openxmlformats.org/markup-compatibility/2006" xmlns:mv="urn:schemas-microsoft-com:mac:vml" xmlns:p="http://schemas.openxmlformats.org/presentationml/2006/main" mc:Ignorable="mv" mc:PreserveAttributes="mv:*">
+<p:sld xmlns:a="http://schemas.openxmlformats.org/drawingml/2006/main" xmlns:r="http://schemas.openxmlformats.org/officeDocument/2006/relationships" xmlns:p="http://schemas.openxmlformats.org/presentationml/2006/main">
   <p:cSld>
     <p:spTree>
       <p:nvGrpSpPr>
@@ -6428,7 +6429,7 @@
           <a:p>
             <a:r>
               <a:rPr lang="en-US" smtClean="0"/>
-              <a:t>November FIXME, 2010</a:t>
+              <a:t>November 29th, 2010</a:t>
             </a:r>
             <a:endParaRPr lang="en-US" dirty="0"/>
           </a:p>
@@ -6498,7 +6499,7 @@
 </file>
 
 <file path=ppt/slides/slide11.xml><?xml version="1.0" encoding="utf-8"?>
-<p:sld xmlns:a="http://schemas.openxmlformats.org/drawingml/2006/main" xmlns:r="http://schemas.openxmlformats.org/officeDocument/2006/relationships" xmlns:mc="http://schemas.openxmlformats.org/markup-compatibility/2006" xmlns:mv="urn:schemas-microsoft-com:mac:vml" xmlns:p="http://schemas.openxmlformats.org/presentationml/2006/main" mc:Ignorable="mv" mc:PreserveAttributes="mv:*">
+<p:sld xmlns:a="http://schemas.openxmlformats.org/drawingml/2006/main" xmlns:r="http://schemas.openxmlformats.org/officeDocument/2006/relationships" xmlns:p="http://schemas.openxmlformats.org/presentationml/2006/main">
   <p:cSld>
     <p:spTree>
       <p:nvGrpSpPr>
@@ -6579,7 +6580,7 @@
           <a:p>
             <a:r>
               <a:rPr lang="en-US" smtClean="0"/>
-              <a:t>November FIXME, 2010</a:t>
+              <a:t>November 29th, 2010</a:t>
             </a:r>
             <a:endParaRPr lang="en-US" dirty="0"/>
           </a:p>
@@ -6641,7 +6642,7 @@
           <p:nvPr>
             <p:extLst>
               <p:ext uri="{D42A27DB-BD31-4B8C-83A1-F6EECF244321}">
-                <p14:modId xmlns:p14="http://schemas.microsoft.com/office/powerpoint/2010/main" xmlns:p="http://schemas.openxmlformats.org/presentationml/2006/main" xmlns:r="http://schemas.openxmlformats.org/officeDocument/2006/relationships" xmlns:a="http://schemas.openxmlformats.org/drawingml/2006/main" xmlns="" val="3414472680"/>
+                <p14:modId xmlns:p14="http://schemas.microsoft.com/office/powerpoint/2010/main" val="3414472680"/>
               </p:ext>
             </p:extLst>
           </p:nvPr>
@@ -7280,7 +7281,7 @@
 </file>
 
 <file path=ppt/slides/slide12.xml><?xml version="1.0" encoding="utf-8"?>
-<p:sld xmlns:a="http://schemas.openxmlformats.org/drawingml/2006/main" xmlns:r="http://schemas.openxmlformats.org/officeDocument/2006/relationships" xmlns:mc="http://schemas.openxmlformats.org/markup-compatibility/2006" xmlns:mv="urn:schemas-microsoft-com:mac:vml" xmlns:p="http://schemas.openxmlformats.org/presentationml/2006/main" mc:Ignorable="mv" mc:PreserveAttributes="mv:*">
+<p:sld xmlns:a="http://schemas.openxmlformats.org/drawingml/2006/main" xmlns:r="http://schemas.openxmlformats.org/officeDocument/2006/relationships" xmlns:p="http://schemas.openxmlformats.org/presentationml/2006/main">
   <p:cSld>
     <p:spTree>
       <p:nvGrpSpPr>
@@ -7401,7 +7402,7 @@
           <a:p>
             <a:r>
               <a:rPr lang="en-US" smtClean="0"/>
-              <a:t>November FIXME, 2010</a:t>
+              <a:t>November 29th, 2010</a:t>
             </a:r>
             <a:endParaRPr lang="en-US" dirty="0"/>
           </a:p>
@@ -7470,7 +7471,7 @@
 </file>
 
 <file path=ppt/slides/slide13.xml><?xml version="1.0" encoding="utf-8"?>
-<p:sld xmlns:a="http://schemas.openxmlformats.org/drawingml/2006/main" xmlns:r="http://schemas.openxmlformats.org/officeDocument/2006/relationships" xmlns:mc="http://schemas.openxmlformats.org/markup-compatibility/2006" xmlns:mv="urn:schemas-microsoft-com:mac:vml" xmlns:p="http://schemas.openxmlformats.org/presentationml/2006/main" mc:Ignorable="mv" mc:PreserveAttributes="mv:*">
+<p:sld xmlns:a="http://schemas.openxmlformats.org/drawingml/2006/main" xmlns:r="http://schemas.openxmlformats.org/officeDocument/2006/relationships" xmlns:p="http://schemas.openxmlformats.org/presentationml/2006/main">
   <p:cSld>
     <p:spTree>
       <p:nvGrpSpPr>
@@ -7549,7 +7550,7 @@
           <a:p>
             <a:r>
               <a:rPr lang="en-US" smtClean="0"/>
-              <a:t>November FIXME, 2010</a:t>
+              <a:t>November 29th, 2010</a:t>
             </a:r>
             <a:endParaRPr lang="en-US" dirty="0"/>
           </a:p>
@@ -7611,7 +7612,7 @@
           <p:nvPr>
             <p:extLst>
               <p:ext uri="{D42A27DB-BD31-4B8C-83A1-F6EECF244321}">
-                <p14:modId xmlns:p14="http://schemas.microsoft.com/office/powerpoint/2010/main" xmlns:p="http://schemas.openxmlformats.org/presentationml/2006/main" xmlns:r="http://schemas.openxmlformats.org/officeDocument/2006/relationships" xmlns:a="http://schemas.openxmlformats.org/drawingml/2006/main" xmlns="" val="4007099573"/>
+                <p14:modId xmlns:p14="http://schemas.microsoft.com/office/powerpoint/2010/main" val="4007099573"/>
               </p:ext>
             </p:extLst>
           </p:nvPr>
@@ -8022,7 +8023,7 @@
 </file>
 
 <file path=ppt/slides/slide14.xml><?xml version="1.0" encoding="utf-8"?>
-<p:sld xmlns:a="http://schemas.openxmlformats.org/drawingml/2006/main" xmlns:r="http://schemas.openxmlformats.org/officeDocument/2006/relationships" xmlns:mc="http://schemas.openxmlformats.org/markup-compatibility/2006" xmlns:mv="urn:schemas-microsoft-com:mac:vml" xmlns:p="http://schemas.openxmlformats.org/presentationml/2006/main" mc:Ignorable="mv" mc:PreserveAttributes="mv:*">
+<p:sld xmlns:a="http://schemas.openxmlformats.org/drawingml/2006/main" xmlns:r="http://schemas.openxmlformats.org/officeDocument/2006/relationships" xmlns:p="http://schemas.openxmlformats.org/presentationml/2006/main">
   <p:cSld>
     <p:spTree>
       <p:nvGrpSpPr>
@@ -8221,7 +8222,7 @@
           <a:p>
             <a:r>
               <a:rPr lang="en-US" smtClean="0"/>
-              <a:t>November FIXME, 2010</a:t>
+              <a:t>November 29th, 2010</a:t>
             </a:r>
             <a:endParaRPr lang="en-US" dirty="0"/>
           </a:p>
@@ -8277,7 +8278,7 @@
     </p:spTree>
     <p:extLst>
       <p:ext uri="{BB962C8B-B14F-4D97-AF65-F5344CB8AC3E}">
-        <p14:creationId xmlns:p14="http://schemas.microsoft.com/office/powerpoint/2010/main" xmlns:p="http://schemas.openxmlformats.org/presentationml/2006/main" xmlns:r="http://schemas.openxmlformats.org/officeDocument/2006/relationships" xmlns:a="http://schemas.openxmlformats.org/drawingml/2006/main" xmlns="" val="943545212"/>
+        <p14:creationId xmlns:p14="http://schemas.microsoft.com/office/powerpoint/2010/main" val="943545212"/>
       </p:ext>
     </p:extLst>
   </p:cSld>
@@ -8295,7 +8296,7 @@
 </file>
 
 <file path=ppt/slides/slide15.xml><?xml version="1.0" encoding="utf-8"?>
-<p:sld xmlns:a="http://schemas.openxmlformats.org/drawingml/2006/main" xmlns:r="http://schemas.openxmlformats.org/officeDocument/2006/relationships" xmlns:mc="http://schemas.openxmlformats.org/markup-compatibility/2006" xmlns:mv="urn:schemas-microsoft-com:mac:vml" xmlns:p="http://schemas.openxmlformats.org/presentationml/2006/main" mc:Ignorable="mv" mc:PreserveAttributes="mv:*">
+<p:sld xmlns:a="http://schemas.openxmlformats.org/drawingml/2006/main" xmlns:r="http://schemas.openxmlformats.org/officeDocument/2006/relationships" xmlns:p="http://schemas.openxmlformats.org/presentationml/2006/main">
   <p:cSld>
     <p:spTree>
       <p:nvGrpSpPr>
@@ -8553,7 +8554,7 @@
           <a:p>
             <a:r>
               <a:rPr lang="en-US" smtClean="0"/>
-              <a:t>November FIXME, 2010</a:t>
+              <a:t>November 29th, 2010</a:t>
             </a:r>
             <a:endParaRPr lang="en-US" dirty="0"/>
           </a:p>
@@ -8613,7 +8614,7 @@
     </p:spTree>
     <p:extLst>
       <p:ext uri="{BB962C8B-B14F-4D97-AF65-F5344CB8AC3E}">
-        <p14:creationId xmlns:p14="http://schemas.microsoft.com/office/powerpoint/2010/main" xmlns:p="http://schemas.openxmlformats.org/presentationml/2006/main" xmlns:r="http://schemas.openxmlformats.org/officeDocument/2006/relationships" xmlns:a="http://schemas.openxmlformats.org/drawingml/2006/main" xmlns="" val="2110749326"/>
+        <p14:creationId xmlns:p14="http://schemas.microsoft.com/office/powerpoint/2010/main" val="2110749326"/>
       </p:ext>
     </p:extLst>
   </p:cSld>
@@ -8631,7 +8632,7 @@
 </file>
 
 <file path=ppt/slides/slide16.xml><?xml version="1.0" encoding="utf-8"?>
-<p:sld xmlns:a="http://schemas.openxmlformats.org/drawingml/2006/main" xmlns:r="http://schemas.openxmlformats.org/officeDocument/2006/relationships" xmlns:mc="http://schemas.openxmlformats.org/markup-compatibility/2006" xmlns:mv="urn:schemas-microsoft-com:mac:vml" xmlns:p="http://schemas.openxmlformats.org/presentationml/2006/main" mc:Ignorable="mv" mc:PreserveAttributes="mv:*">
+<p:sld xmlns:a="http://schemas.openxmlformats.org/drawingml/2006/main" xmlns:r="http://schemas.openxmlformats.org/officeDocument/2006/relationships" xmlns:p="http://schemas.openxmlformats.org/presentationml/2006/main">
   <p:cSld>
     <p:spTree>
       <p:nvGrpSpPr>
@@ -8666,7 +8667,15 @@
           <a:p>
             <a:r>
               <a:rPr lang="en-US" dirty="0" smtClean="0"/>
-              <a:t>Python API Example: Job Package</a:t>
+              <a:t>Python API Example: </a:t>
+            </a:r>
+            <a:r>
+              <a:rPr lang="en-US" smtClean="0"/>
+              <a:t>Job </a:t>
+            </a:r>
+            <a:r>
+              <a:rPr lang="en-US" smtClean="0"/>
+              <a:t>Package #1</a:t>
             </a:r>
             <a:endParaRPr lang="en-US" dirty="0"/>
           </a:p>
@@ -8684,7 +8693,9 @@
         </p:nvSpPr>
         <p:spPr/>
         <p:txBody>
-          <a:bodyPr/>
+          <a:bodyPr>
+            <a:normAutofit/>
+          </a:bodyPr>
           <a:lstStyle/>
           <a:p>
             <a:r>
@@ -8693,14 +8704,217 @@
             </a:r>
           </a:p>
           <a:p>
-            <a:r>
-              <a:rPr lang="en-US" dirty="0" smtClean="0">
-                <a:solidFill>
-                  <a:srgbClr val="800000"/>
-                </a:solidFill>
-              </a:rPr>
-              <a:t>FIXME</a:t>
-            </a:r>
+            <a:pPr marL="0" indent="0">
+              <a:buNone/>
+            </a:pPr>
+            <a:r>
+              <a:rPr lang="en-US" dirty="0"/>
+              <a:t>i</a:t>
+            </a:r>
+            <a:r>
+              <a:rPr lang="en-US" dirty="0" smtClean="0"/>
+              <a:t>mport saga</a:t>
+            </a:r>
+          </a:p>
+          <a:p>
+            <a:pPr marL="0" indent="0">
+              <a:buNone/>
+            </a:pPr>
+            <a:r>
+              <a:rPr lang="en-US" dirty="0" err="1" smtClean="0"/>
+              <a:t>js_url</a:t>
+            </a:r>
+            <a:r>
+              <a:rPr lang="en-US" dirty="0" smtClean="0"/>
+              <a:t> </a:t>
+            </a:r>
+            <a:r>
+              <a:rPr lang="en-US" dirty="0"/>
+              <a:t>= </a:t>
+            </a:r>
+            <a:r>
+              <a:rPr lang="en-US" dirty="0" err="1" smtClean="0"/>
+              <a:t>url</a:t>
+            </a:r>
+            <a:r>
+              <a:rPr lang="en-US" dirty="0"/>
+              <a:t>("fork://</a:t>
+            </a:r>
+            <a:r>
+              <a:rPr lang="en-US" dirty="0" err="1"/>
+              <a:t>localhost</a:t>
+            </a:r>
+            <a:r>
+              <a:rPr lang="en-US" dirty="0"/>
+              <a:t>/")</a:t>
+            </a:r>
+          </a:p>
+          <a:p>
+            <a:pPr marL="0" indent="0">
+              <a:spcBef>
+                <a:spcPts val="0"/>
+              </a:spcBef>
+              <a:buNone/>
+            </a:pPr>
+            <a:r>
+              <a:rPr lang="en-US" dirty="0" err="1" smtClean="0"/>
+              <a:t>job_service</a:t>
+            </a:r>
+            <a:r>
+              <a:rPr lang="en-US" dirty="0" smtClean="0"/>
+              <a:t> </a:t>
+            </a:r>
+            <a:r>
+              <a:rPr lang="en-US" dirty="0"/>
+              <a:t>= </a:t>
+            </a:r>
+            <a:r>
+              <a:rPr lang="en-US" dirty="0" err="1" smtClean="0"/>
+              <a:t>job.service</a:t>
+            </a:r>
+            <a:r>
+              <a:rPr lang="en-US" dirty="0" smtClean="0"/>
+              <a:t>(</a:t>
+            </a:r>
+            <a:r>
+              <a:rPr lang="en-US" dirty="0" err="1" smtClean="0"/>
+              <a:t>js_url</a:t>
+            </a:r>
+            <a:r>
+              <a:rPr lang="en-US" dirty="0" smtClean="0"/>
+              <a:t>)</a:t>
+            </a:r>
+            <a:endParaRPr lang="en-US" dirty="0"/>
+          </a:p>
+          <a:p>
+            <a:pPr marL="0" indent="0">
+              <a:spcBef>
+                <a:spcPts val="0"/>
+              </a:spcBef>
+              <a:buNone/>
+            </a:pPr>
+            <a:r>
+              <a:rPr lang="en-US" dirty="0" err="1" smtClean="0"/>
+              <a:t>job_desc</a:t>
+            </a:r>
+            <a:r>
+              <a:rPr lang="en-US" dirty="0" smtClean="0"/>
+              <a:t> </a:t>
+            </a:r>
+            <a:r>
+              <a:rPr lang="en-US" dirty="0"/>
+              <a:t>= </a:t>
+            </a:r>
+            <a:r>
+              <a:rPr lang="en-US" dirty="0" err="1" smtClean="0"/>
+              <a:t>job.description</a:t>
+            </a:r>
+            <a:r>
+              <a:rPr lang="en-US" dirty="0"/>
+              <a:t>()</a:t>
+            </a:r>
+          </a:p>
+          <a:p>
+            <a:pPr marL="0" indent="0">
+              <a:spcBef>
+                <a:spcPts val="0"/>
+              </a:spcBef>
+              <a:buNone/>
+            </a:pPr>
+            <a:r>
+              <a:rPr lang="en-US" dirty="0" err="1" smtClean="0"/>
+              <a:t>job_desc.executable</a:t>
+            </a:r>
+            <a:r>
+              <a:rPr lang="en-US" dirty="0" smtClean="0"/>
+              <a:t> </a:t>
+            </a:r>
+            <a:r>
+              <a:rPr lang="en-US" dirty="0"/>
+              <a:t>= "touch"</a:t>
+            </a:r>
+          </a:p>
+          <a:p>
+            <a:pPr marL="0" indent="0">
+              <a:spcBef>
+                <a:spcPts val="0"/>
+              </a:spcBef>
+              <a:buNone/>
+            </a:pPr>
+            <a:r>
+              <a:rPr lang="en-US" dirty="0" err="1" smtClean="0"/>
+              <a:t>job_desc.arguments</a:t>
+            </a:r>
+            <a:r>
+              <a:rPr lang="en-US" dirty="0" smtClean="0"/>
+              <a:t> </a:t>
+            </a:r>
+            <a:r>
+              <a:rPr lang="en-US" dirty="0"/>
+              <a:t>= ["-a", </a:t>
+            </a:r>
+            <a:r>
+              <a:rPr lang="en-US" dirty="0" err="1"/>
+              <a:t>self.filename_a</a:t>
+            </a:r>
+            <a:r>
+              <a:rPr lang="en-US" dirty="0" smtClean="0"/>
+              <a:t>]</a:t>
+            </a:r>
+            <a:endParaRPr lang="en-US" dirty="0"/>
+          </a:p>
+          <a:p>
+            <a:pPr marL="0" indent="0">
+              <a:spcBef>
+                <a:spcPts val="0"/>
+              </a:spcBef>
+              <a:buNone/>
+            </a:pPr>
+            <a:r>
+              <a:rPr lang="en-US" dirty="0" err="1" smtClean="0"/>
+              <a:t>my_job</a:t>
+            </a:r>
+            <a:r>
+              <a:rPr lang="en-US" dirty="0" smtClean="0"/>
+              <a:t> </a:t>
+            </a:r>
+            <a:r>
+              <a:rPr lang="en-US" dirty="0"/>
+              <a:t>= </a:t>
+            </a:r>
+            <a:r>
+              <a:rPr lang="en-US" dirty="0" err="1"/>
+              <a:t>job_service.create_job</a:t>
+            </a:r>
+            <a:r>
+              <a:rPr lang="en-US" dirty="0"/>
+              <a:t>(</a:t>
+            </a:r>
+            <a:r>
+              <a:rPr lang="en-US" dirty="0" err="1"/>
+              <a:t>job_desc</a:t>
+            </a:r>
+            <a:r>
+              <a:rPr lang="en-US" dirty="0"/>
+              <a:t>)</a:t>
+            </a:r>
+          </a:p>
+          <a:p>
+            <a:pPr marL="0" indent="0">
+              <a:spcBef>
+                <a:spcPts val="0"/>
+              </a:spcBef>
+              <a:buNone/>
+            </a:pPr>
+            <a:r>
+              <a:rPr lang="en-US" dirty="0" err="1" smtClean="0"/>
+              <a:t>my_job.run</a:t>
+            </a:r>
+            <a:r>
+              <a:rPr lang="en-US" dirty="0"/>
+              <a:t>()</a:t>
+            </a:r>
+            <a:endParaRPr lang="en-US" dirty="0" smtClean="0"/>
           </a:p>
         </p:txBody>
       </p:sp>
@@ -8721,7 +8935,7 @@
           <a:p>
             <a:r>
               <a:rPr lang="en-US" smtClean="0"/>
-              <a:t>November FIXME, 2010</a:t>
+              <a:t>November 29th, 2010</a:t>
             </a:r>
             <a:endParaRPr lang="en-US" dirty="0"/>
           </a:p>
@@ -8777,7 +8991,7 @@
     </p:spTree>
     <p:extLst>
       <p:ext uri="{BB962C8B-B14F-4D97-AF65-F5344CB8AC3E}">
-        <p14:creationId xmlns:p14="http://schemas.microsoft.com/office/powerpoint/2010/main" xmlns:p="http://schemas.openxmlformats.org/presentationml/2006/main" xmlns:r="http://schemas.openxmlformats.org/officeDocument/2006/relationships" xmlns:a="http://schemas.openxmlformats.org/drawingml/2006/main" xmlns="" val="2059702227"/>
+        <p14:creationId xmlns:p14="http://schemas.microsoft.com/office/powerpoint/2010/main" val="2059702227"/>
       </p:ext>
     </p:extLst>
   </p:cSld>
@@ -8788,7 +9002,7 @@
 </file>
 
 <file path=ppt/slides/slide17.xml><?xml version="1.0" encoding="utf-8"?>
-<p:sld xmlns:a="http://schemas.openxmlformats.org/drawingml/2006/main" xmlns:r="http://schemas.openxmlformats.org/officeDocument/2006/relationships" xmlns:mc="http://schemas.openxmlformats.org/markup-compatibility/2006" xmlns:mv="urn:schemas-microsoft-com:mac:vml" xmlns:p="http://schemas.openxmlformats.org/presentationml/2006/main" mc:Ignorable="mv" mc:PreserveAttributes="mv:*">
+<p:sld xmlns:a="http://schemas.openxmlformats.org/drawingml/2006/main" xmlns:r="http://schemas.openxmlformats.org/officeDocument/2006/relationships" xmlns:p="http://schemas.openxmlformats.org/presentationml/2006/main">
   <p:cSld>
     <p:spTree>
       <p:nvGrpSpPr>
@@ -8823,15 +9037,11 @@
           <a:p>
             <a:r>
               <a:rPr lang="en-US" dirty="0" smtClean="0"/>
-              <a:t>Python API Example: </a:t>
-            </a:r>
-            <a:r>
-              <a:rPr lang="en-US" dirty="0"/>
-              <a:t>Advert </a:t>
-            </a:r>
-            <a:r>
-              <a:rPr lang="en-US" dirty="0" smtClean="0"/>
-              <a:t>Package</a:t>
+              <a:t>Python API Example: Job </a:t>
+            </a:r>
+            <a:r>
+              <a:rPr lang="en-US" dirty="0" smtClean="0"/>
+              <a:t>Package #2</a:t>
             </a:r>
             <a:endParaRPr lang="en-US" dirty="0"/>
           </a:p>
@@ -8849,12 +9059,14 @@
         </p:nvSpPr>
         <p:spPr/>
         <p:txBody>
-          <a:bodyPr/>
-          <a:lstStyle/>
-          <a:p>
-            <a:r>
-              <a:rPr lang="en-US" dirty="0" smtClean="0"/>
-              <a:t>Create and modify an advert entry</a:t>
+          <a:bodyPr>
+            <a:normAutofit/>
+          </a:bodyPr>
+          <a:lstStyle/>
+          <a:p>
+            <a:r>
+              <a:rPr lang="en-US" dirty="0" smtClean="0"/>
+              <a:t>Submit a job</a:t>
             </a:r>
           </a:p>
           <a:p>
@@ -8862,72 +9074,12 @@
               <a:buNone/>
             </a:pPr>
             <a:r>
-              <a:rPr lang="en-US" dirty="0" smtClean="0"/>
-              <a:t># host A</a:t>
-            </a:r>
-            <a:br>
-              <a:rPr lang="en-US" dirty="0" smtClean="0"/>
-            </a:br>
-            <a:r>
-              <a:rPr lang="en-US" dirty="0" smtClean="0"/>
-              <a:t>using saga</a:t>
-            </a:r>
-            <a:br>
-              <a:rPr lang="en-US" dirty="0" smtClean="0"/>
-            </a:br>
-            <a:r>
-              <a:rPr lang="en-US" dirty="0" smtClean="0"/>
-              <a:t>name = </a:t>
-            </a:r>
-            <a:r>
-              <a:rPr lang="en-US" dirty="0" err="1" smtClean="0"/>
-              <a:t>url</a:t>
-            </a:r>
-            <a:r>
-              <a:rPr lang="en-US" dirty="0" smtClean="0"/>
-              <a:t>(' … ')</a:t>
-            </a:r>
-            <a:r>
               <a:rPr lang="en-US" dirty="0"/>
-              <a:t/>
-            </a:r>
-            <a:br>
-              <a:rPr lang="en-US" dirty="0"/>
-            </a:br>
-            <a:r>
-              <a:rPr lang="en-US" dirty="0" smtClean="0"/>
-              <a:t>e = </a:t>
-            </a:r>
-            <a:r>
-              <a:rPr lang="en-US" dirty="0" err="1" smtClean="0"/>
-              <a:t>advert.entry</a:t>
-            </a:r>
-            <a:r>
-              <a:rPr lang="en-US" dirty="0" smtClean="0"/>
-              <a:t>(name, </a:t>
-            </a:r>
-            <a:r>
-              <a:rPr lang="en-US" dirty="0" err="1" smtClean="0"/>
-              <a:t>advert.ReadWrite|advert.Create</a:t>
-            </a:r>
-            <a:r>
-              <a:rPr lang="en-US" dirty="0" smtClean="0"/>
-              <a:t>)</a:t>
-            </a:r>
-            <a:r>
-              <a:rPr lang="en-US" dirty="0"/>
-              <a:t/>
-            </a:r>
-            <a:br>
-              <a:rPr lang="en-US" dirty="0"/>
-            </a:br>
-            <a:r>
-              <a:rPr lang="en-US" dirty="0" err="1" smtClean="0"/>
-              <a:t>e.set_attribute</a:t>
-            </a:r>
-            <a:r>
-              <a:rPr lang="en-US" dirty="0" smtClean="0"/>
-              <a:t>('started', ' … ' )</a:t>
+              <a:t>i</a:t>
+            </a:r>
+            <a:r>
+              <a:rPr lang="en-US" dirty="0" smtClean="0"/>
+              <a:t>mport saga</a:t>
             </a:r>
           </a:p>
           <a:p>
@@ -8935,74 +9087,148 @@
               <a:buNone/>
             </a:pPr>
             <a:r>
-              <a:rPr lang="en-US" dirty="0" smtClean="0"/>
-              <a:t># host B</a:t>
-            </a:r>
-            <a:br>
-              <a:rPr lang="en-US" dirty="0" smtClean="0"/>
-            </a:br>
-            <a:r>
-              <a:rPr lang="en-US" dirty="0" smtClean="0"/>
-              <a:t>using </a:t>
+              <a:rPr lang="en-US" dirty="0" err="1"/>
+              <a:t>js_url</a:t>
             </a:r>
             <a:r>
               <a:rPr lang="en-US" dirty="0"/>
-              <a:t>saga</a:t>
-            </a:r>
-            <a:br>
+              <a:t> = saga.url("fork://</a:t>
+            </a:r>
+            <a:r>
+              <a:rPr lang="en-US" dirty="0" err="1"/>
+              <a:t>localhost</a:t>
+            </a:r>
+            <a:r>
               <a:rPr lang="en-US" dirty="0"/>
-            </a:br>
+              <a:t>/")</a:t>
+            </a:r>
+          </a:p>
+          <a:p>
+            <a:pPr marL="0" indent="0">
+              <a:spcBef>
+                <a:spcPts val="0"/>
+              </a:spcBef>
+              <a:buNone/>
+            </a:pPr>
+            <a:r>
+              <a:rPr lang="en-US" dirty="0" err="1"/>
+              <a:t>job_service</a:t>
+            </a:r>
             <a:r>
               <a:rPr lang="en-US" dirty="0"/>
-              <a:t>name = </a:t>
+              <a:t> = </a:t>
+            </a:r>
+            <a:r>
+              <a:rPr lang="en-US" dirty="0" err="1" smtClean="0"/>
+              <a:t>job.service</a:t>
+            </a:r>
+            <a:r>
+              <a:rPr lang="en-US" dirty="0" smtClean="0"/>
+              <a:t>(</a:t>
+            </a:r>
+            <a:r>
+              <a:rPr lang="en-US" dirty="0" err="1" smtClean="0"/>
+              <a:t>js_url</a:t>
+            </a:r>
+            <a:r>
+              <a:rPr lang="en-US" dirty="0"/>
+              <a:t>)</a:t>
+            </a:r>
+          </a:p>
+          <a:p>
+            <a:pPr marL="0" indent="0">
+              <a:spcBef>
+                <a:spcPts val="0"/>
+              </a:spcBef>
+              <a:buNone/>
+            </a:pPr>
+            <a:endParaRPr lang="en-US" dirty="0"/>
+          </a:p>
+          <a:p>
+            <a:pPr marL="0" indent="0">
+              <a:spcBef>
+                <a:spcPts val="0"/>
+              </a:spcBef>
+              <a:buNone/>
+            </a:pPr>
+            <a:r>
+              <a:rPr lang="en-US" dirty="0"/>
+              <a:t>(job, sin, </a:t>
             </a:r>
             <a:r>
               <a:rPr lang="en-US" dirty="0" err="1"/>
-              <a:t>url</a:t>
+              <a:t>sout</a:t>
             </a:r>
             <a:r>
               <a:rPr lang="en-US" dirty="0"/>
-              <a:t>(' … ')</a:t>
-            </a:r>
-            <a:br>
+              <a:t>, </a:t>
+            </a:r>
+            <a:r>
+              <a:rPr lang="en-US" dirty="0" err="1"/>
+              <a:t>serr</a:t>
+            </a:r>
+            <a:r>
               <a:rPr lang="en-US" dirty="0"/>
-            </a:br>
+              <a:t>) = </a:t>
+            </a:r>
+            <a:r>
+              <a:rPr lang="en-US" dirty="0" err="1"/>
+              <a:t>job_service.run_job</a:t>
+            </a:r>
+            <a:r>
+              <a:rPr lang="en-US" dirty="0" smtClean="0"/>
+              <a:t>( \</a:t>
+            </a:r>
+          </a:p>
+          <a:p>
+            <a:pPr marL="0" indent="0">
+              <a:spcBef>
+                <a:spcPts val="0"/>
+              </a:spcBef>
+              <a:buNone/>
+            </a:pPr>
             <a:r>
               <a:rPr lang="en-US" dirty="0"/>
-              <a:t>e = </a:t>
+              <a:t> 	</a:t>
+            </a:r>
+            <a:r>
+              <a:rPr lang="en-US" dirty="0" smtClean="0"/>
+              <a:t>"/</a:t>
+            </a:r>
+            <a:r>
+              <a:rPr lang="en-US" dirty="0"/>
+              <a:t>bin/echo -n HELLO SAGA</a:t>
+            </a:r>
+            <a:r>
+              <a:rPr lang="en-US" dirty="0" smtClean="0"/>
+              <a:t>")</a:t>
+            </a:r>
+            <a:endParaRPr lang="en-US" dirty="0"/>
+          </a:p>
+          <a:p>
+            <a:pPr marL="0" indent="0">
+              <a:spcBef>
+                <a:spcPts val="0"/>
+              </a:spcBef>
+              <a:buNone/>
+            </a:pPr>
+            <a:r>
+              <a:rPr lang="en-US" dirty="0"/>
+              <a:t>p</a:t>
+            </a:r>
+            <a:r>
+              <a:rPr lang="en-US" dirty="0" smtClean="0"/>
+              <a:t>rint </a:t>
             </a:r>
             <a:r>
               <a:rPr lang="en-US" dirty="0" err="1" smtClean="0"/>
-              <a:t>advert.entry</a:t>
-            </a:r>
-            <a:r>
-              <a:rPr lang="en-US" dirty="0" smtClean="0"/>
-              <a:t>(name)</a:t>
+              <a:t>sout.read</a:t>
             </a:r>
             <a:r>
               <a:rPr lang="en-US" dirty="0"/>
-              <a:t/>
-            </a:r>
-            <a:br>
-              <a:rPr lang="en-US" dirty="0"/>
-            </a:br>
-            <a:r>
-              <a:rPr lang="en-US" dirty="0" smtClean="0"/>
-              <a:t>started = </a:t>
-            </a:r>
-            <a:r>
-              <a:rPr lang="en-US" dirty="0" err="1" smtClean="0"/>
-              <a:t>e.get_attribute</a:t>
-            </a:r>
-            <a:r>
-              <a:rPr lang="en-US" dirty="0"/>
-              <a:t>('started</a:t>
-            </a:r>
-            <a:r>
-              <a:rPr lang="en-US" dirty="0" smtClean="0"/>
-              <a:t>')</a:t>
-            </a:r>
-            <a:endParaRPr lang="en-US" dirty="0"/>
+              <a:t>()</a:t>
+            </a:r>
+            <a:endParaRPr lang="en-US" dirty="0" smtClean="0"/>
           </a:p>
         </p:txBody>
       </p:sp>
@@ -9023,7 +9249,7 @@
           <a:p>
             <a:r>
               <a:rPr lang="en-US" smtClean="0"/>
-              <a:t>November FIXME, 2010</a:t>
+              <a:t>November 29th, 2010</a:t>
             </a:r>
             <a:endParaRPr lang="en-US" dirty="0"/>
           </a:p>
@@ -9079,7 +9305,7 @@
     </p:spTree>
     <p:extLst>
       <p:ext uri="{BB962C8B-B14F-4D97-AF65-F5344CB8AC3E}">
-        <p14:creationId xmlns:p14="http://schemas.microsoft.com/office/powerpoint/2010/main" xmlns:p="http://schemas.openxmlformats.org/presentationml/2006/main" xmlns:r="http://schemas.openxmlformats.org/officeDocument/2006/relationships" xmlns:a="http://schemas.openxmlformats.org/drawingml/2006/main" xmlns="" val="2253681799"/>
+        <p14:creationId xmlns:p14="http://schemas.microsoft.com/office/powerpoint/2010/main" val="3522440758"/>
       </p:ext>
     </p:extLst>
   </p:cSld>
@@ -9090,7 +9316,7 @@
 </file>
 
 <file path=ppt/slides/slide18.xml><?xml version="1.0" encoding="utf-8"?>
-<p:sld xmlns:a="http://schemas.openxmlformats.org/drawingml/2006/main" xmlns:r="http://schemas.openxmlformats.org/officeDocument/2006/relationships" xmlns:mc="http://schemas.openxmlformats.org/markup-compatibility/2006" xmlns:mv="urn:schemas-microsoft-com:mac:vml" xmlns:p="http://schemas.openxmlformats.org/presentationml/2006/main" mc:Ignorable="mv" mc:PreserveAttributes="mv:*">
+<p:sld xmlns:a="http://schemas.openxmlformats.org/drawingml/2006/main" xmlns:r="http://schemas.openxmlformats.org/officeDocument/2006/relationships" xmlns:p="http://schemas.openxmlformats.org/presentationml/2006/main">
   <p:cSld>
     <p:spTree>
       <p:nvGrpSpPr>
@@ -9125,23 +9351,15 @@
           <a:p>
             <a:r>
               <a:rPr lang="en-US" dirty="0" smtClean="0"/>
-              <a:t>C++ </a:t>
+              <a:t>Python API Example: </a:t>
             </a:r>
             <a:r>
               <a:rPr lang="en-US" dirty="0"/>
-              <a:t>API </a:t>
-            </a:r>
-            <a:r>
-              <a:rPr lang="en-US" dirty="0" smtClean="0"/>
-              <a:t>Example: </a:t>
-            </a:r>
-            <a:r>
-              <a:rPr lang="en-US" dirty="0"/>
-              <a:t>File P</a:t>
-            </a:r>
-            <a:r>
-              <a:rPr lang="en-US" dirty="0" smtClean="0"/>
-              <a:t>ackage</a:t>
+              <a:t>Advert </a:t>
+            </a:r>
+            <a:r>
+              <a:rPr lang="en-US" dirty="0" smtClean="0"/>
+              <a:t>Package</a:t>
             </a:r>
             <a:endParaRPr lang="en-US" dirty="0"/>
           </a:p>
@@ -9164,7 +9382,7 @@
           <a:p>
             <a:r>
               <a:rPr lang="en-US" dirty="0" smtClean="0"/>
-              <a:t>Copy a file</a:t>
+              <a:t>Create and modify an advert entry</a:t>
             </a:r>
           </a:p>
           <a:p>
@@ -9173,7 +9391,21 @@
             </a:pPr>
             <a:r>
               <a:rPr lang="en-US" dirty="0" smtClean="0"/>
-              <a:t>saga::</a:t>
+              <a:t># host A</a:t>
+            </a:r>
+            <a:br>
+              <a:rPr lang="en-US" dirty="0" smtClean="0"/>
+            </a:br>
+            <a:r>
+              <a:rPr lang="en-US" dirty="0" smtClean="0"/>
+              <a:t>using saga</a:t>
+            </a:r>
+            <a:br>
+              <a:rPr lang="en-US" dirty="0" smtClean="0"/>
+            </a:br>
+            <a:r>
+              <a:rPr lang="en-US" dirty="0" smtClean="0"/>
+              <a:t>name = </a:t>
             </a:r>
             <a:r>
               <a:rPr lang="en-US" dirty="0" err="1" smtClean="0"/>
@@ -9181,46 +9413,7 @@
             </a:r>
             <a:r>
               <a:rPr lang="en-US" dirty="0" smtClean="0"/>
-              <a:t> </a:t>
-            </a:r>
-            <a:r>
-              <a:rPr lang="en-US" dirty="0" err="1" smtClean="0"/>
-              <a:t>src</a:t>
-            </a:r>
-            <a:r>
-              <a:rPr lang="en-US" dirty="0" smtClean="0"/>
-              <a:t> (' … ');</a:t>
-            </a:r>
-            <a:br>
-              <a:rPr lang="en-US" dirty="0" smtClean="0"/>
-            </a:br>
-            <a:r>
-              <a:rPr lang="en-US" dirty="0"/>
-              <a:t>saga::</a:t>
-            </a:r>
-            <a:r>
-              <a:rPr lang="en-US" dirty="0" err="1"/>
-              <a:t>url</a:t>
-            </a:r>
-            <a:r>
-              <a:rPr lang="en-US" dirty="0"/>
-              <a:t> </a:t>
-            </a:r>
-            <a:r>
-              <a:rPr lang="en-US" dirty="0" err="1" smtClean="0"/>
-              <a:t>dst</a:t>
-            </a:r>
-            <a:r>
-              <a:rPr lang="en-US" dirty="0" smtClean="0"/>
-              <a:t> (' </a:t>
-            </a:r>
-            <a:r>
-              <a:rPr lang="en-US" dirty="0"/>
-              <a:t>… </a:t>
-            </a:r>
-            <a:r>
-              <a:rPr lang="en-US" dirty="0" smtClean="0"/>
-              <a:t>');</a:t>
+              <a:t>(' … ')</a:t>
             </a:r>
             <a:r>
               <a:rPr lang="en-US" dirty="0"/>
@@ -9231,31 +9424,23 @@
             </a:br>
             <a:r>
               <a:rPr lang="en-US" dirty="0" smtClean="0"/>
-              <a:t>saga::file f(</a:t>
+              <a:t>e = </a:t>
             </a:r>
             <a:r>
               <a:rPr lang="en-US" dirty="0" err="1" smtClean="0"/>
-              <a:t>src</a:t>
-            </a:r>
-            <a:r>
-              <a:rPr lang="en-US" dirty="0" smtClean="0"/>
-              <a:t>, saga::</a:t>
+              <a:t>advert.entry</a:t>
+            </a:r>
+            <a:r>
+              <a:rPr lang="en-US" dirty="0" smtClean="0"/>
+              <a:t>(name, </a:t>
             </a:r>
             <a:r>
               <a:rPr lang="en-US" dirty="0" err="1" smtClean="0"/>
-              <a:t>filesystem</a:t>
-            </a:r>
-            <a:r>
-              <a:rPr lang="en-US" dirty="0" smtClean="0"/>
-              <a:t>::</a:t>
-            </a:r>
-            <a:r>
-              <a:rPr lang="en-US" dirty="0" err="1" smtClean="0"/>
-              <a:t>ReadWrite</a:t>
-            </a:r>
-            <a:r>
-              <a:rPr lang="en-US" dirty="0" smtClean="0"/>
-              <a:t>);</a:t>
+              <a:t>advert.ReadWrite|advert.Create</a:t>
+            </a:r>
+            <a:r>
+              <a:rPr lang="en-US" dirty="0" smtClean="0"/>
+              <a:t>)</a:t>
             </a:r>
             <a:r>
               <a:rPr lang="en-US" dirty="0"/>
@@ -9266,20 +9451,86 @@
             </a:br>
             <a:r>
               <a:rPr lang="en-US" dirty="0" err="1" smtClean="0"/>
-              <a:t>f.copy</a:t>
-            </a:r>
-            <a:r>
-              <a:rPr lang="en-US" dirty="0" smtClean="0"/>
-              <a:t>(</a:t>
+              <a:t>e.set_attribute</a:t>
+            </a:r>
+            <a:r>
+              <a:rPr lang="en-US" dirty="0" smtClean="0"/>
+              <a:t>('started', ' … ' )</a:t>
+            </a:r>
+          </a:p>
+          <a:p>
+            <a:pPr marL="0" indent="0">
+              <a:buNone/>
+            </a:pPr>
+            <a:r>
+              <a:rPr lang="en-US" dirty="0" smtClean="0"/>
+              <a:t># host B</a:t>
+            </a:r>
+            <a:br>
+              <a:rPr lang="en-US" dirty="0" smtClean="0"/>
+            </a:br>
+            <a:r>
+              <a:rPr lang="en-US" dirty="0" smtClean="0"/>
+              <a:t>using </a:t>
+            </a:r>
+            <a:r>
+              <a:rPr lang="en-US" dirty="0"/>
+              <a:t>saga</a:t>
+            </a:r>
+            <a:br>
+              <a:rPr lang="en-US" dirty="0"/>
+            </a:br>
+            <a:r>
+              <a:rPr lang="en-US" dirty="0"/>
+              <a:t>name = </a:t>
+            </a:r>
+            <a:r>
+              <a:rPr lang="en-US" dirty="0" err="1"/>
+              <a:t>url</a:t>
+            </a:r>
+            <a:r>
+              <a:rPr lang="en-US" dirty="0"/>
+              <a:t>(' … ')</a:t>
+            </a:r>
+            <a:br>
+              <a:rPr lang="en-US" dirty="0"/>
+            </a:br>
+            <a:r>
+              <a:rPr lang="en-US" dirty="0"/>
+              <a:t>e = </a:t>
             </a:r>
             <a:r>
               <a:rPr lang="en-US" dirty="0" err="1" smtClean="0"/>
-              <a:t>dst</a:t>
-            </a:r>
-            <a:r>
-              <a:rPr lang="en-US" dirty="0" smtClean="0"/>
-              <a:t>);</a:t>
-            </a:r>
+              <a:t>advert.entry</a:t>
+            </a:r>
+            <a:r>
+              <a:rPr lang="en-US" dirty="0" smtClean="0"/>
+              <a:t>(name)</a:t>
+            </a:r>
+            <a:r>
+              <a:rPr lang="en-US" dirty="0"/>
+              <a:t/>
+            </a:r>
+            <a:br>
+              <a:rPr lang="en-US" dirty="0"/>
+            </a:br>
+            <a:r>
+              <a:rPr lang="en-US" dirty="0" smtClean="0"/>
+              <a:t>started = </a:t>
+            </a:r>
+            <a:r>
+              <a:rPr lang="en-US" dirty="0" err="1" smtClean="0"/>
+              <a:t>e.get_attribute</a:t>
+            </a:r>
+            <a:r>
+              <a:rPr lang="en-US" dirty="0"/>
+              <a:t>('started</a:t>
+            </a:r>
+            <a:r>
+              <a:rPr lang="en-US" dirty="0" smtClean="0"/>
+              <a:t>')</a:t>
+            </a:r>
+            <a:endParaRPr lang="en-US" dirty="0"/>
           </a:p>
         </p:txBody>
       </p:sp>
@@ -9300,7 +9551,7 @@
           <a:p>
             <a:r>
               <a:rPr lang="en-US" smtClean="0"/>
-              <a:t>November FIXME, 2010</a:t>
+              <a:t>November 29th, 2010</a:t>
             </a:r>
             <a:endParaRPr lang="en-US" dirty="0"/>
           </a:p>
@@ -9356,25 +9607,18 @@
     </p:spTree>
     <p:extLst>
       <p:ext uri="{BB962C8B-B14F-4D97-AF65-F5344CB8AC3E}">
-        <p14:creationId xmlns:p14="http://schemas.microsoft.com/office/powerpoint/2010/main" xmlns:p="http://schemas.openxmlformats.org/presentationml/2006/main" xmlns:r="http://schemas.openxmlformats.org/officeDocument/2006/relationships" xmlns:a="http://schemas.openxmlformats.org/drawingml/2006/main" xmlns="" val="3368190089"/>
+        <p14:creationId xmlns:p14="http://schemas.microsoft.com/office/powerpoint/2010/main" val="2253681799"/>
       </p:ext>
     </p:extLst>
   </p:cSld>
   <p:clrMapOvr>
     <a:masterClrMapping/>
   </p:clrMapOvr>
-  <p:timing>
-    <p:tnLst>
-      <p:par>
-        <p:cTn id="1" dur="indefinite" restart="never" nodeType="tmRoot"/>
-      </p:par>
-    </p:tnLst>
-  </p:timing>
 </p:sld>
 </file>
 
 <file path=ppt/slides/slide19.xml><?xml version="1.0" encoding="utf-8"?>
-<p:sld xmlns:a="http://schemas.openxmlformats.org/drawingml/2006/main" xmlns:r="http://schemas.openxmlformats.org/officeDocument/2006/relationships" xmlns:mc="http://schemas.openxmlformats.org/markup-compatibility/2006" xmlns:mv="urn:schemas-microsoft-com:mac:vml" xmlns:p="http://schemas.openxmlformats.org/presentationml/2006/main" mc:Ignorable="mv" mc:PreserveAttributes="mv:*">
+<p:sld xmlns:a="http://schemas.openxmlformats.org/drawingml/2006/main" xmlns:r="http://schemas.openxmlformats.org/officeDocument/2006/relationships" xmlns:p="http://schemas.openxmlformats.org/presentationml/2006/main">
   <p:cSld>
     <p:spTree>
       <p:nvGrpSpPr>
@@ -9443,31 +9687,21 @@
         </p:nvSpPr>
         <p:spPr/>
         <p:txBody>
-          <a:bodyPr>
-            <a:normAutofit/>
-          </a:bodyPr>
-          <a:lstStyle/>
-          <a:p>
-            <a:r>
-              <a:rPr lang="en-US" dirty="0" smtClean="0"/>
-              <a:t>Get a directory file listing</a:t>
+          <a:bodyPr/>
+          <a:lstStyle/>
+          <a:p>
+            <a:r>
+              <a:rPr lang="en-US" dirty="0" smtClean="0"/>
+              <a:t>Copy a file</a:t>
             </a:r>
           </a:p>
           <a:p>
             <a:pPr marL="0" indent="0">
               <a:buNone/>
-              <a:tabLst>
-                <a:tab pos="914400" algn="l"/>
-                <a:tab pos="4121150" algn="l"/>
-              </a:tabLst>
             </a:pPr>
             <a:r>
-              <a:rPr lang="en-US" dirty="0"/>
-              <a:t>s</a:t>
-            </a:r>
-            <a:r>
-              <a:rPr lang="en-US" dirty="0" smtClean="0"/>
-              <a:t>aga::</a:t>
+              <a:rPr lang="en-US" dirty="0" smtClean="0"/>
+              <a:t>saga::</a:t>
             </a:r>
             <a:r>
               <a:rPr lang="en-US" dirty="0" err="1" smtClean="0"/>
@@ -9484,6 +9718,37 @@
             <a:r>
               <a:rPr lang="en-US" dirty="0" smtClean="0"/>
               <a:t> (' … ');</a:t>
+            </a:r>
+            <a:br>
+              <a:rPr lang="en-US" dirty="0" smtClean="0"/>
+            </a:br>
+            <a:r>
+              <a:rPr lang="en-US" dirty="0"/>
+              <a:t>saga::</a:t>
+            </a:r>
+            <a:r>
+              <a:rPr lang="en-US" dirty="0" err="1"/>
+              <a:t>url</a:t>
+            </a:r>
+            <a:r>
+              <a:rPr lang="en-US" dirty="0"/>
+              <a:t> </a:t>
+            </a:r>
+            <a:r>
+              <a:rPr lang="en-US" dirty="0" err="1" smtClean="0"/>
+              <a:t>dst</a:t>
+            </a:r>
+            <a:r>
+              <a:rPr lang="en-US" dirty="0" smtClean="0"/>
+              <a:t> (' </a:t>
+            </a:r>
+            <a:r>
+              <a:rPr lang="en-US" dirty="0"/>
+              <a:t>… </a:t>
+            </a:r>
+            <a:r>
+              <a:rPr lang="en-US" dirty="0" smtClean="0"/>
+              <a:t>');</a:t>
             </a:r>
             <a:r>
               <a:rPr lang="en-US" dirty="0"/>
@@ -9494,11 +9759,27 @@
             </a:br>
             <a:r>
               <a:rPr lang="en-US" dirty="0" smtClean="0"/>
-              <a:t>saga::directory d (</a:t>
+              <a:t>saga::file f(</a:t>
             </a:r>
             <a:r>
               <a:rPr lang="en-US" dirty="0" err="1" smtClean="0"/>
               <a:t>src</a:t>
+            </a:r>
+            <a:r>
+              <a:rPr lang="en-US" dirty="0" smtClean="0"/>
+              <a:t>, saga::</a:t>
+            </a:r>
+            <a:r>
+              <a:rPr lang="en-US" dirty="0" err="1" smtClean="0"/>
+              <a:t>filesystem</a:t>
+            </a:r>
+            <a:r>
+              <a:rPr lang="en-US" dirty="0" smtClean="0"/>
+              <a:t>::</a:t>
+            </a:r>
+            <a:r>
+              <a:rPr lang="en-US" dirty="0" err="1" smtClean="0"/>
+              <a:t>ReadWrite</a:t>
             </a:r>
             <a:r>
               <a:rPr lang="en-US" dirty="0" smtClean="0"/>
@@ -9513,177 +9794,19 @@
             </a:br>
             <a:r>
               <a:rPr lang="en-US" dirty="0" err="1" smtClean="0"/>
-              <a:t>std</a:t>
-            </a:r>
-            <a:r>
-              <a:rPr lang="en-US" dirty="0" smtClean="0"/>
-              <a:t>::vector&lt;</a:t>
+              <a:t>f.copy</a:t>
+            </a:r>
+            <a:r>
+              <a:rPr lang="en-US" dirty="0" smtClean="0"/>
+              <a:t>(</a:t>
             </a:r>
             <a:r>
               <a:rPr lang="en-US" dirty="0" err="1" smtClean="0"/>
-              <a:t>std</a:t>
-            </a:r>
-            <a:r>
-              <a:rPr lang="en-US" dirty="0" smtClean="0"/>
-              <a:t>::string&gt; names = </a:t>
-            </a:r>
-            <a:r>
-              <a:rPr lang="en-US" dirty="0" err="1"/>
-              <a:t>d</a:t>
-            </a:r>
-            <a:r>
-              <a:rPr lang="en-US" dirty="0" err="1" smtClean="0"/>
-              <a:t>.list</a:t>
-            </a:r>
-            <a:r>
-              <a:rPr lang="en-US" dirty="0" smtClean="0"/>
-              <a:t>('*');</a:t>
-            </a:r>
-            <a:r>
-              <a:rPr lang="en-US" dirty="0"/>
-              <a:t/>
-            </a:r>
-            <a:br>
-              <a:rPr lang="en-US" dirty="0"/>
-            </a:br>
-            <a:r>
-              <a:rPr lang="en-US" dirty="0" smtClean="0"/>
-              <a:t/>
-            </a:r>
-            <a:br>
-              <a:rPr lang="en-US" dirty="0" smtClean="0"/>
-            </a:br>
-            <a:r>
-              <a:rPr lang="en-US" dirty="0" smtClean="0"/>
-              <a:t>for (auto it = </a:t>
-            </a:r>
-            <a:r>
-              <a:rPr lang="en-US" dirty="0" err="1" smtClean="0"/>
-              <a:t>names.begin</a:t>
-            </a:r>
-            <a:r>
-              <a:rPr lang="en-US" dirty="0" smtClean="0"/>
-              <a:t>(); it != </a:t>
-            </a:r>
-            <a:r>
-              <a:rPr lang="en-US" dirty="0" err="1" smtClean="0"/>
-              <a:t>names.end</a:t>
-            </a:r>
-            <a:r>
-              <a:rPr lang="en-US" dirty="0" smtClean="0"/>
-              <a:t>(); ++it) {</a:t>
-            </a:r>
-            <a:br>
-              <a:rPr lang="en-US" dirty="0" smtClean="0"/>
-            </a:br>
-            <a:r>
-              <a:rPr lang="en-US" dirty="0"/>
-              <a:t>	</a:t>
-            </a:r>
-            <a:r>
-              <a:rPr lang="en-US" dirty="0" smtClean="0"/>
-              <a:t>saga::</a:t>
-            </a:r>
-            <a:r>
-              <a:rPr lang="en-US" dirty="0" err="1" smtClean="0"/>
-              <a:t>name_space</a:t>
-            </a:r>
-            <a:r>
-              <a:rPr lang="en-US" dirty="0" smtClean="0"/>
-              <a:t>::entry ns (*it);</a:t>
-            </a:r>
-            <a:br>
-              <a:rPr lang="en-US" dirty="0" smtClean="0"/>
-            </a:br>
-            <a:r>
-              <a:rPr lang="en-US" dirty="0"/>
-              <a:t>	</a:t>
-            </a:r>
-            <a:r>
-              <a:rPr lang="en-US" dirty="0" smtClean="0"/>
-              <a:t>if (</a:t>
-            </a:r>
-            <a:r>
-              <a:rPr lang="en-US" dirty="0" err="1" smtClean="0"/>
-              <a:t>ns.is_dir</a:t>
-            </a:r>
-            <a:r>
-              <a:rPr lang="en-US" dirty="0" smtClean="0"/>
-              <a:t>())		</a:t>
-            </a:r>
-            <a:r>
-              <a:rPr lang="en-US" dirty="0" err="1" smtClean="0"/>
-              <a:t>cout</a:t>
-            </a:r>
-            <a:r>
-              <a:rPr lang="en-US" dirty="0" smtClean="0"/>
-              <a:t> &lt;&lt; 'd ' &lt;&lt;  *it &lt;&lt; </a:t>
-            </a:r>
-            <a:r>
-              <a:rPr lang="en-US" dirty="0"/>
-              <a:t>'\n'; 	</a:t>
-            </a:r>
-            <a:r>
-              <a:rPr lang="en-US" dirty="0" smtClean="0"/>
-              <a:t>else if (</a:t>
-            </a:r>
-            <a:r>
-              <a:rPr lang="en-US" dirty="0" err="1" smtClean="0"/>
-              <a:t>ns.is_link</a:t>
-            </a:r>
-            <a:r>
-              <a:rPr lang="en-US" dirty="0" smtClean="0"/>
-              <a:t>())	</a:t>
-            </a:r>
-            <a:r>
-              <a:rPr lang="en-US" dirty="0" err="1" smtClean="0"/>
-              <a:t>cout</a:t>
-            </a:r>
-            <a:r>
-              <a:rPr lang="en-US" dirty="0" smtClean="0"/>
-              <a:t> &lt;&lt; '-&gt;' &lt;&lt; </a:t>
-            </a:r>
-            <a:r>
-              <a:rPr lang="en-US" dirty="0" err="1" smtClean="0"/>
-              <a:t>ns.read_link</a:t>
-            </a:r>
-            <a:r>
-              <a:rPr lang="en-US" dirty="0" smtClean="0"/>
-              <a:t>() &lt;&lt; '\n';</a:t>
-            </a:r>
-            <a:br>
-              <a:rPr lang="en-US" dirty="0" smtClean="0"/>
-            </a:br>
-            <a:r>
-              <a:rPr lang="en-US" dirty="0"/>
-              <a:t>	</a:t>
-            </a:r>
-            <a:r>
-              <a:rPr lang="en-US" dirty="0" smtClean="0"/>
-              <a:t>else:		</a:t>
-            </a:r>
-            <a:r>
-              <a:rPr lang="en-US" dirty="0" err="1" smtClean="0"/>
-              <a:t>cout</a:t>
-            </a:r>
-            <a:r>
-              <a:rPr lang="en-US" dirty="0" smtClean="0"/>
-              <a:t> &lt;&lt; '  ' &lt;&lt; *it &lt;&lt; </a:t>
-            </a:r>
-            <a:r>
-              <a:rPr lang="en-US" dirty="0"/>
-              <a:t>'\n</a:t>
-            </a:r>
-            <a:r>
-              <a:rPr lang="en-US" dirty="0" smtClean="0"/>
-              <a:t>';</a:t>
-            </a:r>
-            <a:br>
-              <a:rPr lang="en-US" dirty="0" smtClean="0"/>
-            </a:br>
-            <a:r>
-              <a:rPr lang="en-US" dirty="0" smtClean="0"/>
-              <a:t>}</a:t>
+              <a:t>dst</a:t>
+            </a:r>
+            <a:r>
+              <a:rPr lang="en-US" dirty="0" smtClean="0"/>
+              <a:t>);</a:t>
             </a:r>
           </a:p>
         </p:txBody>
@@ -9705,7 +9828,7 @@
           <a:p>
             <a:r>
               <a:rPr lang="en-US" smtClean="0"/>
-              <a:t>November FIXME, 2010</a:t>
+              <a:t>November 29th, 2010</a:t>
             </a:r>
             <a:endParaRPr lang="en-US" dirty="0"/>
           </a:p>
@@ -9751,12 +9874,8 @@
           <a:lstStyle/>
           <a:p>
             <a:r>
-              <a:rPr lang="en-US" dirty="0" err="1" smtClean="0"/>
-              <a:t>TeraGrid</a:t>
-            </a:r>
-            <a:r>
-              <a:rPr lang="en-US" dirty="0" smtClean="0"/>
-              <a:t> SAGA Tutorial</a:t>
+              <a:rPr lang="en-US" smtClean="0"/>
+              <a:t>TeraGrid SAGA Tutorial</a:t>
             </a:r>
             <a:endParaRPr lang="en-US" dirty="0"/>
           </a:p>
@@ -9765,7 +9884,7 @@
     </p:spTree>
     <p:extLst>
       <p:ext uri="{BB962C8B-B14F-4D97-AF65-F5344CB8AC3E}">
-        <p14:creationId xmlns:p14="http://schemas.microsoft.com/office/powerpoint/2010/main" xmlns:p="http://schemas.openxmlformats.org/presentationml/2006/main" xmlns:r="http://schemas.openxmlformats.org/officeDocument/2006/relationships" xmlns:a="http://schemas.openxmlformats.org/drawingml/2006/main" xmlns="" val="2572922824"/>
+        <p14:creationId xmlns:p14="http://schemas.microsoft.com/office/powerpoint/2010/main" val="3368190089"/>
       </p:ext>
     </p:extLst>
   </p:cSld>
@@ -9783,7 +9902,7 @@
 </file>
 
 <file path=ppt/slides/slide2.xml><?xml version="1.0" encoding="utf-8"?>
-<p:sld xmlns:a="http://schemas.openxmlformats.org/drawingml/2006/main" xmlns:r="http://schemas.openxmlformats.org/officeDocument/2006/relationships" xmlns:mc="http://schemas.openxmlformats.org/markup-compatibility/2006" xmlns:mv="urn:schemas-microsoft-com:mac:vml" xmlns:p="http://schemas.openxmlformats.org/presentationml/2006/main" mc:Ignorable="mv" mc:PreserveAttributes="mv:*">
+<p:sld xmlns:a="http://schemas.openxmlformats.org/drawingml/2006/main" xmlns:r="http://schemas.openxmlformats.org/officeDocument/2006/relationships" xmlns:p="http://schemas.openxmlformats.org/presentationml/2006/main">
   <p:cSld>
     <p:spTree>
       <p:nvGrpSpPr>
@@ -9885,7 +10004,7 @@
           <a:p>
             <a:r>
               <a:rPr lang="en-US" smtClean="0"/>
-              <a:t>November FIXME, 2010</a:t>
+              <a:t>November 29th, 2010</a:t>
             </a:r>
             <a:endParaRPr lang="en-US" dirty="0"/>
           </a:p>
@@ -9954,7 +10073,7 @@
 </file>
 
 <file path=ppt/slides/slide20.xml><?xml version="1.0" encoding="utf-8"?>
-<p:sld xmlns:a="http://schemas.openxmlformats.org/drawingml/2006/main" xmlns:r="http://schemas.openxmlformats.org/officeDocument/2006/relationships" xmlns:mc="http://schemas.openxmlformats.org/markup-compatibility/2006" xmlns:mv="urn:schemas-microsoft-com:mac:vml" xmlns:p="http://schemas.openxmlformats.org/presentationml/2006/main" mc:Ignorable="mv" mc:PreserveAttributes="mv:*">
+<p:sld xmlns:a="http://schemas.openxmlformats.org/drawingml/2006/main" xmlns:r="http://schemas.openxmlformats.org/officeDocument/2006/relationships" xmlns:p="http://schemas.openxmlformats.org/presentationml/2006/main">
   <p:cSld>
     <p:spTree>
       <p:nvGrpSpPr>
@@ -9989,15 +10108,23 @@
           <a:p>
             <a:r>
               <a:rPr lang="en-US" dirty="0" smtClean="0"/>
-              <a:t>C++ API </a:t>
+              <a:t>C++ </a:t>
             </a:r>
             <a:r>
               <a:rPr lang="en-US" dirty="0"/>
-              <a:t>Example : </a:t>
-            </a:r>
-            <a:r>
-              <a:rPr lang="en-US" dirty="0" smtClean="0"/>
-              <a:t>Job Package</a:t>
+              <a:t>API </a:t>
+            </a:r>
+            <a:r>
+              <a:rPr lang="en-US" dirty="0" smtClean="0"/>
+              <a:t>Example: </a:t>
+            </a:r>
+            <a:r>
+              <a:rPr lang="en-US" dirty="0"/>
+              <a:t>File P</a:t>
+            </a:r>
+            <a:r>
+              <a:rPr lang="en-US" dirty="0" smtClean="0"/>
+              <a:t>ackage</a:t>
             </a:r>
             <a:endParaRPr lang="en-US" dirty="0"/>
           </a:p>
@@ -10015,22 +10142,247 @@
         </p:nvSpPr>
         <p:spPr/>
         <p:txBody>
-          <a:bodyPr/>
-          <a:lstStyle/>
-          <a:p>
-            <a:r>
-              <a:rPr lang="en-US" dirty="0" smtClean="0"/>
-              <a:t>Submit a job</a:t>
-            </a:r>
-          </a:p>
-          <a:p>
-            <a:r>
-              <a:rPr lang="en-US" dirty="0" smtClean="0">
-                <a:solidFill>
-                  <a:srgbClr val="800000"/>
-                </a:solidFill>
-              </a:rPr>
-              <a:t>FIXME</a:t>
+          <a:bodyPr>
+            <a:normAutofit/>
+          </a:bodyPr>
+          <a:lstStyle/>
+          <a:p>
+            <a:r>
+              <a:rPr lang="en-US" dirty="0" smtClean="0"/>
+              <a:t>Get a directory file listing</a:t>
+            </a:r>
+          </a:p>
+          <a:p>
+            <a:pPr marL="0" indent="0">
+              <a:buNone/>
+              <a:tabLst>
+                <a:tab pos="914400" algn="l"/>
+                <a:tab pos="4121150" algn="l"/>
+              </a:tabLst>
+            </a:pPr>
+            <a:r>
+              <a:rPr lang="en-US" dirty="0"/>
+              <a:t>s</a:t>
+            </a:r>
+            <a:r>
+              <a:rPr lang="en-US" dirty="0" smtClean="0"/>
+              <a:t>aga::</a:t>
+            </a:r>
+            <a:r>
+              <a:rPr lang="en-US" dirty="0" err="1" smtClean="0"/>
+              <a:t>url</a:t>
+            </a:r>
+            <a:r>
+              <a:rPr lang="en-US" dirty="0" smtClean="0"/>
+              <a:t> </a:t>
+            </a:r>
+            <a:r>
+              <a:rPr lang="en-US" dirty="0" err="1" smtClean="0"/>
+              <a:t>src</a:t>
+            </a:r>
+            <a:r>
+              <a:rPr lang="en-US" dirty="0" smtClean="0"/>
+              <a:t> (' … ');</a:t>
+            </a:r>
+            <a:r>
+              <a:rPr lang="en-US" dirty="0"/>
+              <a:t/>
+            </a:r>
+            <a:br>
+              <a:rPr lang="en-US" dirty="0"/>
+            </a:br>
+            <a:r>
+              <a:rPr lang="en-US" dirty="0" smtClean="0"/>
+              <a:t>saga::directory d (</a:t>
+            </a:r>
+            <a:r>
+              <a:rPr lang="en-US" dirty="0" err="1" smtClean="0"/>
+              <a:t>src</a:t>
+            </a:r>
+            <a:r>
+              <a:rPr lang="en-US" dirty="0" smtClean="0"/>
+              <a:t>);</a:t>
+            </a:r>
+            <a:r>
+              <a:rPr lang="en-US" dirty="0"/>
+              <a:t/>
+            </a:r>
+            <a:br>
+              <a:rPr lang="en-US" dirty="0"/>
+            </a:br>
+            <a:r>
+              <a:rPr lang="en-US" dirty="0" err="1" smtClean="0"/>
+              <a:t>std</a:t>
+            </a:r>
+            <a:r>
+              <a:rPr lang="en-US" dirty="0" smtClean="0"/>
+              <a:t>::vector&lt;</a:t>
+            </a:r>
+            <a:r>
+              <a:rPr lang="en-US" dirty="0" err="1" smtClean="0"/>
+              <a:t>std</a:t>
+            </a:r>
+            <a:r>
+              <a:rPr lang="en-US" dirty="0" smtClean="0"/>
+              <a:t>::string&gt; names = </a:t>
+            </a:r>
+            <a:r>
+              <a:rPr lang="en-US" dirty="0" err="1"/>
+              <a:t>d</a:t>
+            </a:r>
+            <a:r>
+              <a:rPr lang="en-US" dirty="0" err="1" smtClean="0"/>
+              <a:t>.list</a:t>
+            </a:r>
+            <a:r>
+              <a:rPr lang="en-US" dirty="0" smtClean="0"/>
+              <a:t>('*');</a:t>
+            </a:r>
+            <a:r>
+              <a:rPr lang="en-US" dirty="0"/>
+              <a:t/>
+            </a:r>
+            <a:br>
+              <a:rPr lang="en-US" dirty="0"/>
+            </a:br>
+            <a:r>
+              <a:rPr lang="en-US" dirty="0" smtClean="0"/>
+              <a:t/>
+            </a:r>
+            <a:br>
+              <a:rPr lang="en-US" dirty="0" smtClean="0"/>
+            </a:br>
+            <a:r>
+              <a:rPr lang="en-US" dirty="0" smtClean="0"/>
+              <a:t>for (auto it = </a:t>
+            </a:r>
+            <a:r>
+              <a:rPr lang="en-US" dirty="0" err="1" smtClean="0"/>
+              <a:t>names.begin</a:t>
+            </a:r>
+            <a:r>
+              <a:rPr lang="en-US" dirty="0" smtClean="0"/>
+              <a:t>(); it != </a:t>
+            </a:r>
+            <a:r>
+              <a:rPr lang="en-US" dirty="0" err="1" smtClean="0"/>
+              <a:t>names.end</a:t>
+            </a:r>
+            <a:r>
+              <a:rPr lang="en-US" dirty="0" smtClean="0"/>
+              <a:t>(); ++it) {</a:t>
+            </a:r>
+            <a:br>
+              <a:rPr lang="en-US" dirty="0" smtClean="0"/>
+            </a:br>
+            <a:r>
+              <a:rPr lang="en-US" dirty="0"/>
+              <a:t>	</a:t>
+            </a:r>
+            <a:r>
+              <a:rPr lang="en-US" dirty="0" smtClean="0"/>
+              <a:t>saga::</a:t>
+            </a:r>
+            <a:r>
+              <a:rPr lang="en-US" dirty="0" err="1" smtClean="0"/>
+              <a:t>name_space</a:t>
+            </a:r>
+            <a:r>
+              <a:rPr lang="en-US" dirty="0" smtClean="0"/>
+              <a:t>::entry ns (*it);</a:t>
+            </a:r>
+            <a:br>
+              <a:rPr lang="en-US" dirty="0" smtClean="0"/>
+            </a:br>
+            <a:r>
+              <a:rPr lang="en-US" dirty="0"/>
+              <a:t>	</a:t>
+            </a:r>
+            <a:r>
+              <a:rPr lang="en-US" dirty="0" smtClean="0"/>
+              <a:t>if (</a:t>
+            </a:r>
+            <a:r>
+              <a:rPr lang="en-US" dirty="0" err="1" smtClean="0"/>
+              <a:t>ns.is_dir</a:t>
+            </a:r>
+            <a:r>
+              <a:rPr lang="en-US" dirty="0" smtClean="0"/>
+              <a:t>())		</a:t>
+            </a:r>
+            <a:r>
+              <a:rPr lang="en-US" dirty="0" err="1" smtClean="0"/>
+              <a:t>cout</a:t>
+            </a:r>
+            <a:r>
+              <a:rPr lang="en-US" dirty="0" smtClean="0"/>
+              <a:t> &lt;&lt; 'd ' &lt;&lt;  *it &lt;&lt; </a:t>
+            </a:r>
+            <a:r>
+              <a:rPr lang="en-US" dirty="0"/>
+              <a:t>'\n'; 	</a:t>
+            </a:r>
+            <a:r>
+              <a:rPr lang="en-US" dirty="0" smtClean="0"/>
+              <a:t>else if (</a:t>
+            </a:r>
+            <a:r>
+              <a:rPr lang="en-US" dirty="0" err="1" smtClean="0"/>
+              <a:t>ns.is_link</a:t>
+            </a:r>
+            <a:r>
+              <a:rPr lang="en-US" dirty="0" smtClean="0"/>
+              <a:t>())	</a:t>
+            </a:r>
+            <a:r>
+              <a:rPr lang="en-US" dirty="0" err="1" smtClean="0"/>
+              <a:t>cout</a:t>
+            </a:r>
+            <a:r>
+              <a:rPr lang="en-US" dirty="0" smtClean="0"/>
+              <a:t> &lt;&lt; '-&gt;' &lt;&lt; </a:t>
+            </a:r>
+            <a:r>
+              <a:rPr lang="en-US" dirty="0" err="1" smtClean="0"/>
+              <a:t>ns.read_link</a:t>
+            </a:r>
+            <a:r>
+              <a:rPr lang="en-US" dirty="0" smtClean="0"/>
+              <a:t>() &lt;&lt; '\n';</a:t>
+            </a:r>
+            <a:br>
+              <a:rPr lang="en-US" dirty="0" smtClean="0"/>
+            </a:br>
+            <a:r>
+              <a:rPr lang="en-US" dirty="0"/>
+              <a:t>	</a:t>
+            </a:r>
+            <a:r>
+              <a:rPr lang="en-US" dirty="0" smtClean="0"/>
+              <a:t>else:		</a:t>
+            </a:r>
+            <a:r>
+              <a:rPr lang="en-US" dirty="0" err="1" smtClean="0"/>
+              <a:t>cout</a:t>
+            </a:r>
+            <a:r>
+              <a:rPr lang="en-US" dirty="0" smtClean="0"/>
+              <a:t> &lt;&lt; '  ' &lt;&lt; *it &lt;&lt; </a:t>
+            </a:r>
+            <a:r>
+              <a:rPr lang="en-US" dirty="0"/>
+              <a:t>'\n</a:t>
+            </a:r>
+            <a:r>
+              <a:rPr lang="en-US" dirty="0" smtClean="0"/>
+              <a:t>';</a:t>
+            </a:r>
+            <a:br>
+              <a:rPr lang="en-US" dirty="0" smtClean="0"/>
+            </a:br>
+            <a:r>
+              <a:rPr lang="en-US" dirty="0" smtClean="0"/>
+              <a:t>}</a:t>
             </a:r>
           </a:p>
         </p:txBody>
@@ -10052,7 +10404,7 @@
           <a:p>
             <a:r>
               <a:rPr lang="en-US" smtClean="0"/>
-              <a:t>November FIXME, 2010</a:t>
+              <a:t>November 29th, 2010</a:t>
             </a:r>
             <a:endParaRPr lang="en-US" dirty="0"/>
           </a:p>
@@ -10098,8 +10450,12 @@
           <a:lstStyle/>
           <a:p>
             <a:r>
-              <a:rPr lang="en-US" smtClean="0"/>
-              <a:t>TeraGrid SAGA Tutorial</a:t>
+              <a:rPr lang="en-US" dirty="0" err="1" smtClean="0"/>
+              <a:t>TeraGrid</a:t>
+            </a:r>
+            <a:r>
+              <a:rPr lang="en-US" dirty="0" smtClean="0"/>
+              <a:t> SAGA Tutorial</a:t>
             </a:r>
             <a:endParaRPr lang="en-US" dirty="0"/>
           </a:p>
@@ -10108,18 +10464,25 @@
     </p:spTree>
     <p:extLst>
       <p:ext uri="{BB962C8B-B14F-4D97-AF65-F5344CB8AC3E}">
-        <p14:creationId xmlns:p14="http://schemas.microsoft.com/office/powerpoint/2010/main" xmlns:p="http://schemas.openxmlformats.org/presentationml/2006/main" xmlns:r="http://schemas.openxmlformats.org/officeDocument/2006/relationships" xmlns:a="http://schemas.openxmlformats.org/drawingml/2006/main" xmlns="" val="1169737179"/>
+        <p14:creationId xmlns:p14="http://schemas.microsoft.com/office/powerpoint/2010/main" val="2572922824"/>
       </p:ext>
     </p:extLst>
   </p:cSld>
   <p:clrMapOvr>
     <a:masterClrMapping/>
   </p:clrMapOvr>
+  <p:timing>
+    <p:tnLst>
+      <p:par>
+        <p:cTn id="1" dur="indefinite" restart="never" nodeType="tmRoot"/>
+      </p:par>
+    </p:tnLst>
+  </p:timing>
 </p:sld>
 </file>
 
 <file path=ppt/slides/slide21.xml><?xml version="1.0" encoding="utf-8"?>
-<p:sld xmlns:a="http://schemas.openxmlformats.org/drawingml/2006/main" xmlns:r="http://schemas.openxmlformats.org/officeDocument/2006/relationships" xmlns:mc="http://schemas.openxmlformats.org/markup-compatibility/2006" xmlns:mv="urn:schemas-microsoft-com:mac:vml" xmlns:p="http://schemas.openxmlformats.org/presentationml/2006/main" mc:Ignorable="mv" mc:PreserveAttributes="mv:*">
+<p:sld xmlns:a="http://schemas.openxmlformats.org/drawingml/2006/main" xmlns:r="http://schemas.openxmlformats.org/officeDocument/2006/relationships" xmlns:p="http://schemas.openxmlformats.org/presentationml/2006/main">
   <p:cSld>
     <p:spTree>
       <p:nvGrpSpPr>
@@ -10154,12 +10517,17 @@
           <a:p>
             <a:r>
               <a:rPr lang="en-US" dirty="0" smtClean="0"/>
-              <a:t>C++ API Example: </a:t>
+              <a:t>C++ API </a:t>
             </a:r>
             <a:r>
               <a:rPr lang="en-US" dirty="0"/>
-              <a:t>Advert Package</a:t>
-            </a:r>
+              <a:t>Example : </a:t>
+            </a:r>
+            <a:r>
+              <a:rPr lang="en-US" dirty="0" smtClean="0"/>
+              <a:t>Job Package</a:t>
+            </a:r>
+            <a:endParaRPr lang="en-US" dirty="0"/>
           </a:p>
         </p:txBody>
       </p:sp>
@@ -10179,8 +10547,14 @@
           <a:lstStyle/>
           <a:p>
             <a:r>
-              <a:rPr lang="en-US" dirty="0"/>
-              <a:t>Create and modify an advert entry</a:t>
+              <a:rPr lang="en-US" dirty="0" smtClean="0"/>
+              <a:t>Submit a job</a:t>
+            </a:r>
+          </a:p>
+          <a:p>
+            <a:r>
+              <a:rPr lang="en-US" dirty="0" smtClean="0"/>
+              <a:t>FIXME</a:t>
             </a:r>
           </a:p>
         </p:txBody>
@@ -10202,7 +10576,7 @@
           <a:p>
             <a:r>
               <a:rPr lang="en-US" smtClean="0"/>
-              <a:t>November FIXME, 2010</a:t>
+              <a:t>November 29th, 2010</a:t>
             </a:r>
             <a:endParaRPr lang="en-US" dirty="0"/>
           </a:p>
@@ -10258,7 +10632,7 @@
     </p:spTree>
     <p:extLst>
       <p:ext uri="{BB962C8B-B14F-4D97-AF65-F5344CB8AC3E}">
-        <p14:creationId xmlns:p14="http://schemas.microsoft.com/office/powerpoint/2010/main" xmlns:p="http://schemas.openxmlformats.org/presentationml/2006/main" xmlns:r="http://schemas.openxmlformats.org/officeDocument/2006/relationships" xmlns:a="http://schemas.openxmlformats.org/drawingml/2006/main" xmlns="" val="935873552"/>
+        <p14:creationId xmlns:p14="http://schemas.microsoft.com/office/powerpoint/2010/main" val="1169737179"/>
       </p:ext>
     </p:extLst>
   </p:cSld>
@@ -10269,7 +10643,7 @@
 </file>
 
 <file path=ppt/slides/slide22.xml><?xml version="1.0" encoding="utf-8"?>
-<p:sld xmlns:a="http://schemas.openxmlformats.org/drawingml/2006/main" xmlns:r="http://schemas.openxmlformats.org/officeDocument/2006/relationships" xmlns:mc="http://schemas.openxmlformats.org/markup-compatibility/2006" xmlns:mv="urn:schemas-microsoft-com:mac:vml" xmlns:p="http://schemas.openxmlformats.org/presentationml/2006/main" mc:Ignorable="mv" mc:PreserveAttributes="mv:*">
+<p:sld xmlns:a="http://schemas.openxmlformats.org/drawingml/2006/main" xmlns:r="http://schemas.openxmlformats.org/officeDocument/2006/relationships" xmlns:p="http://schemas.openxmlformats.org/presentationml/2006/main">
   <p:cSld>
     <p:spTree>
       <p:nvGrpSpPr>
@@ -10297,6 +10671,156 @@
         </p:nvSpPr>
         <p:spPr/>
         <p:txBody>
+          <a:bodyPr>
+            <a:normAutofit/>
+          </a:bodyPr>
+          <a:lstStyle/>
+          <a:p>
+            <a:r>
+              <a:rPr lang="en-US" dirty="0" smtClean="0"/>
+              <a:t>C++ API Example: </a:t>
+            </a:r>
+            <a:r>
+              <a:rPr lang="en-US" dirty="0"/>
+              <a:t>Advert Package</a:t>
+            </a:r>
+          </a:p>
+        </p:txBody>
+      </p:sp>
+      <p:sp>
+        <p:nvSpPr>
+          <p:cNvPr id="3" name="Content Placeholder 2"/>
+          <p:cNvSpPr>
+            <a:spLocks noGrp="1"/>
+          </p:cNvSpPr>
+          <p:nvPr>
+            <p:ph idx="1"/>
+          </p:nvPr>
+        </p:nvSpPr>
+        <p:spPr/>
+        <p:txBody>
+          <a:bodyPr/>
+          <a:lstStyle/>
+          <a:p>
+            <a:r>
+              <a:rPr lang="en-US" dirty="0"/>
+              <a:t>Create and modify an advert entry</a:t>
+            </a:r>
+          </a:p>
+        </p:txBody>
+      </p:sp>
+      <p:sp>
+        <p:nvSpPr>
+          <p:cNvPr id="4" name="Date Placeholder 3"/>
+          <p:cNvSpPr>
+            <a:spLocks noGrp="1"/>
+          </p:cNvSpPr>
+          <p:nvPr>
+            <p:ph type="dt" sz="half" idx="10"/>
+          </p:nvPr>
+        </p:nvSpPr>
+        <p:spPr/>
+        <p:txBody>
+          <a:bodyPr/>
+          <a:lstStyle/>
+          <a:p>
+            <a:r>
+              <a:rPr lang="en-US" smtClean="0"/>
+              <a:t>November 29th, 2010</a:t>
+            </a:r>
+            <a:endParaRPr lang="en-US" dirty="0"/>
+          </a:p>
+        </p:txBody>
+      </p:sp>
+      <p:sp>
+        <p:nvSpPr>
+          <p:cNvPr id="6" name="Slide Number Placeholder 5"/>
+          <p:cNvSpPr>
+            <a:spLocks noGrp="1"/>
+          </p:cNvSpPr>
+          <p:nvPr>
+            <p:ph type="sldNum" sz="quarter" idx="11"/>
+          </p:nvPr>
+        </p:nvSpPr>
+        <p:spPr/>
+        <p:txBody>
+          <a:bodyPr/>
+          <a:lstStyle/>
+          <a:p>
+            <a:fld id="{7A426C1A-D210-4B4B-86AA-6AEDDDCCF5FF}" type="slidenum">
+              <a:rPr lang="en-US" smtClean="0"/>
+              <a:pPr/>
+              <a:t>22</a:t>
+            </a:fld>
+            <a:endParaRPr lang="en-US"/>
+          </a:p>
+        </p:txBody>
+      </p:sp>
+      <p:sp>
+        <p:nvSpPr>
+          <p:cNvPr id="5" name="Footer Placeholder 4"/>
+          <p:cNvSpPr>
+            <a:spLocks noGrp="1"/>
+          </p:cNvSpPr>
+          <p:nvPr>
+            <p:ph type="ftr" sz="quarter" idx="12"/>
+          </p:nvPr>
+        </p:nvSpPr>
+        <p:spPr/>
+        <p:txBody>
+          <a:bodyPr/>
+          <a:lstStyle/>
+          <a:p>
+            <a:r>
+              <a:rPr lang="en-US" smtClean="0"/>
+              <a:t>TeraGrid SAGA Tutorial</a:t>
+            </a:r>
+            <a:endParaRPr lang="en-US" dirty="0"/>
+          </a:p>
+        </p:txBody>
+      </p:sp>
+    </p:spTree>
+    <p:extLst>
+      <p:ext uri="{BB962C8B-B14F-4D97-AF65-F5344CB8AC3E}">
+        <p14:creationId xmlns:p14="http://schemas.microsoft.com/office/powerpoint/2010/main" val="935873552"/>
+      </p:ext>
+    </p:extLst>
+  </p:cSld>
+  <p:clrMapOvr>
+    <a:masterClrMapping/>
+  </p:clrMapOvr>
+</p:sld>
+</file>
+
+<file path=ppt/slides/slide23.xml><?xml version="1.0" encoding="utf-8"?>
+<p:sld xmlns:a="http://schemas.openxmlformats.org/drawingml/2006/main" xmlns:r="http://schemas.openxmlformats.org/officeDocument/2006/relationships" xmlns:p="http://schemas.openxmlformats.org/presentationml/2006/main">
+  <p:cSld>
+    <p:spTree>
+      <p:nvGrpSpPr>
+        <p:cNvPr id="1" name=""/>
+        <p:cNvGrpSpPr/>
+        <p:nvPr/>
+      </p:nvGrpSpPr>
+      <p:grpSpPr>
+        <a:xfrm>
+          <a:off x="0" y="0"/>
+          <a:ext cx="0" cy="0"/>
+          <a:chOff x="0" y="0"/>
+          <a:chExt cx="0" cy="0"/>
+        </a:xfrm>
+      </p:grpSpPr>
+      <p:sp>
+        <p:nvSpPr>
+          <p:cNvPr id="2" name="Title 1"/>
+          <p:cNvSpPr>
+            <a:spLocks noGrp="1"/>
+          </p:cNvSpPr>
+          <p:nvPr>
+            <p:ph type="title"/>
+          </p:nvPr>
+        </p:nvSpPr>
+        <p:spPr/>
+        <p:txBody>
           <a:bodyPr/>
           <a:lstStyle/>
           <a:p>
@@ -10405,7 +10929,7 @@
           <a:p>
             <a:r>
               <a:rPr lang="en-US" smtClean="0"/>
-              <a:t>November FIXME, 2010</a:t>
+              <a:t>November 29th, 2010</a:t>
             </a:r>
             <a:endParaRPr lang="en-US" dirty="0"/>
           </a:p>
@@ -10429,7 +10953,7 @@
             <a:fld id="{7A426C1A-D210-4B4B-86AA-6AEDDDCCF5FF}" type="slidenum">
               <a:rPr lang="en-US" smtClean="0"/>
               <a:pPr/>
-              <a:t>22</a:t>
+              <a:t>23</a:t>
             </a:fld>
             <a:endParaRPr lang="en-US"/>
           </a:p>
@@ -10473,8 +10997,8 @@
 </p:sld>
 </file>
 
-<file path=ppt/slides/slide23.xml><?xml version="1.0" encoding="utf-8"?>
-<p:sld xmlns:a="http://schemas.openxmlformats.org/drawingml/2006/main" xmlns:r="http://schemas.openxmlformats.org/officeDocument/2006/relationships" xmlns:mc="http://schemas.openxmlformats.org/markup-compatibility/2006" xmlns:mv="urn:schemas-microsoft-com:mac:vml" xmlns:p="http://schemas.openxmlformats.org/presentationml/2006/main" mc:Ignorable="mv" mc:PreserveAttributes="mv:*">
+<file path=ppt/slides/slide24.xml><?xml version="1.0" encoding="utf-8"?>
+<p:sld xmlns:a="http://schemas.openxmlformats.org/drawingml/2006/main" xmlns:r="http://schemas.openxmlformats.org/officeDocument/2006/relationships" xmlns:p="http://schemas.openxmlformats.org/presentationml/2006/main">
   <p:cSld>
     <p:spTree>
       <p:nvGrpSpPr>
@@ -10504,14 +11028,12 @@
           <a:ln/>
         </p:spPr>
         <p:txBody>
-          <a:bodyPr>
-            <a:normAutofit/>
-          </a:bodyPr>
-          <a:lstStyle/>
-          <a:p>
-            <a:r>
-              <a:rPr lang="en-US" dirty="0" smtClean="0"/>
-              <a:t>SAGA Tutorial Example </a:t>
+          <a:bodyPr/>
+          <a:lstStyle/>
+          <a:p>
+            <a:r>
+              <a:rPr lang="en-US" dirty="0" smtClean="0"/>
+              <a:t>Example </a:t>
             </a:r>
             <a:r>
               <a:rPr lang="en-US" dirty="0"/>
@@ -10640,293 +11162,7 @@
           <a:p>
             <a:r>
               <a:rPr lang="en-US" smtClean="0"/>
-              <a:t>November FIXME, 2010</a:t>
-            </a:r>
-            <a:endParaRPr lang="en-US" dirty="0"/>
-          </a:p>
-        </p:txBody>
-      </p:sp>
-      <p:sp>
-        <p:nvSpPr>
-          <p:cNvPr id="6" name="Slide Number Placeholder 5"/>
-          <p:cNvSpPr>
-            <a:spLocks noGrp="1"/>
-          </p:cNvSpPr>
-          <p:nvPr>
-            <p:ph type="sldNum" sz="quarter" idx="11"/>
-          </p:nvPr>
-        </p:nvSpPr>
-        <p:spPr/>
-        <p:txBody>
-          <a:bodyPr/>
-          <a:lstStyle/>
-          <a:p>
-            <a:fld id="{7A426C1A-D210-4B4B-86AA-6AEDDDCCF5FF}" type="slidenum">
-              <a:rPr lang="en-US" smtClean="0"/>
-              <a:pPr/>
-              <a:t>23</a:t>
-            </a:fld>
-            <a:endParaRPr lang="en-US"/>
-          </a:p>
-        </p:txBody>
-      </p:sp>
-      <p:sp>
-        <p:nvSpPr>
-          <p:cNvPr id="7" name="Footer Placeholder 6"/>
-          <p:cNvSpPr>
-            <a:spLocks noGrp="1"/>
-          </p:cNvSpPr>
-          <p:nvPr>
-            <p:ph type="ftr" sz="quarter" idx="12"/>
-          </p:nvPr>
-        </p:nvSpPr>
-        <p:spPr/>
-        <p:txBody>
-          <a:bodyPr/>
-          <a:lstStyle/>
-          <a:p>
-            <a:r>
-              <a:rPr lang="en-US" smtClean="0"/>
-              <a:t>TeraGrid SAGA Tutorial</a:t>
-            </a:r>
-            <a:endParaRPr lang="en-US" dirty="0"/>
-          </a:p>
-        </p:txBody>
-      </p:sp>
-    </p:spTree>
-  </p:cSld>
-  <p:clrMapOvr>
-    <a:masterClrMapping/>
-  </p:clrMapOvr>
-  <p:transition/>
-  <p:timing>
-    <p:tnLst>
-      <p:par>
-        <p:cTn id="1" dur="indefinite" restart="never" nodeType="tmRoot"/>
-      </p:par>
-    </p:tnLst>
-  </p:timing>
-</p:sld>
-</file>
-
-<file path=ppt/slides/slide24.xml><?xml version="1.0" encoding="utf-8"?>
-<p:sld xmlns:a="http://schemas.openxmlformats.org/drawingml/2006/main" xmlns:r="http://schemas.openxmlformats.org/officeDocument/2006/relationships" xmlns:mc="http://schemas.openxmlformats.org/markup-compatibility/2006" xmlns:mv="urn:schemas-microsoft-com:mac:vml" xmlns:p="http://schemas.openxmlformats.org/presentationml/2006/main" mc:Ignorable="mv" mc:PreserveAttributes="mv:*">
-  <p:cSld>
-    <p:spTree>
-      <p:nvGrpSpPr>
-        <p:cNvPr id="1" name=""/>
-        <p:cNvGrpSpPr/>
-        <p:nvPr/>
-      </p:nvGrpSpPr>
-      <p:grpSpPr>
-        <a:xfrm>
-          <a:off x="0" y="0"/>
-          <a:ext cx="0" cy="0"/>
-          <a:chOff x="0" y="0"/>
-          <a:chExt cx="0" cy="0"/>
-        </a:xfrm>
-      </p:grpSpPr>
-      <p:sp>
-        <p:nvSpPr>
-          <p:cNvPr id="29697" name="Rectangle 1"/>
-          <p:cNvSpPr>
-            <a:spLocks noGrp="1" noChangeArrowheads="1"/>
-          </p:cNvSpPr>
-          <p:nvPr>
-            <p:ph type="title"/>
-          </p:nvPr>
-        </p:nvSpPr>
-        <p:spPr>
-          <a:ln/>
-        </p:spPr>
-        <p:txBody>
-          <a:bodyPr/>
-          <a:lstStyle/>
-          <a:p>
-            <a:r>
-              <a:rPr lang="en-US" dirty="0" smtClean="0"/>
-              <a:t>SAGA Tutorial Example </a:t>
-            </a:r>
-            <a:r>
-              <a:rPr lang="en-US" dirty="0"/>
-              <a:t>1: </a:t>
-            </a:r>
-            <a:r>
-              <a:rPr lang="en-US" dirty="0" err="1"/>
-              <a:t>hello_world</a:t>
-            </a:r>
-            <a:endParaRPr lang="en-US" dirty="0"/>
-          </a:p>
-        </p:txBody>
-      </p:sp>
-      <p:sp>
-        <p:nvSpPr>
-          <p:cNvPr id="29698" name="Rectangle 2"/>
-          <p:cNvSpPr>
-            <a:spLocks noGrp="1" noChangeArrowheads="1"/>
-          </p:cNvSpPr>
-          <p:nvPr>
-            <p:ph idx="1"/>
-          </p:nvPr>
-        </p:nvSpPr>
-        <p:spPr>
-          <a:ln/>
-        </p:spPr>
-        <p:txBody>
-          <a:bodyPr>
-            <a:normAutofit fontScale="92500" lnSpcReduction="10000"/>
-          </a:bodyPr>
-          <a:lstStyle/>
-          <a:p>
-            <a:pPr fontAlgn="ctr"/>
-            <a:r>
-              <a:rPr lang="en-US" sz="4000" dirty="0" smtClean="0"/>
-              <a:t>Hello world</a:t>
-            </a:r>
-            <a:endParaRPr lang="en-US" sz="9600" dirty="0" smtClean="0"/>
-          </a:p>
-          <a:p>
-            <a:pPr lvl="1" fontAlgn="ctr"/>
-            <a:r>
-              <a:rPr lang="en-US" sz="3600" dirty="0" smtClean="0"/>
-              <a:t>Arbitrary sequence of results</a:t>
-            </a:r>
-            <a:endParaRPr lang="en-US" sz="8800" dirty="0" smtClean="0"/>
-          </a:p>
-          <a:p>
-            <a:pPr lvl="2" fontAlgn="ctr"/>
-            <a:r>
-              <a:rPr lang="en-US" dirty="0" smtClean="0"/>
-              <a:t>Optimally: "Hello distributed world!"</a:t>
-            </a:r>
-            <a:endParaRPr lang="en-US" sz="6000" dirty="0" smtClean="0"/>
-          </a:p>
-          <a:p>
-            <a:pPr lvl="1" fontAlgn="ctr"/>
-            <a:r>
-              <a:rPr lang="en-US" sz="3600" dirty="0" smtClean="0"/>
-              <a:t>Demonstrates</a:t>
-            </a:r>
-            <a:endParaRPr lang="en-US" sz="8800" dirty="0" smtClean="0"/>
-          </a:p>
-          <a:p>
-            <a:pPr lvl="2" fontAlgn="ctr"/>
-            <a:r>
-              <a:rPr lang="en-US" dirty="0" smtClean="0"/>
-              <a:t>How to launch a remote job using SAGA </a:t>
-            </a:r>
-            <a:r>
-              <a:rPr lang="en-US" dirty="0" err="1" smtClean="0"/>
-              <a:t>job_service</a:t>
-            </a:r>
-            <a:endParaRPr lang="en-US" sz="6000" dirty="0" smtClean="0"/>
-          </a:p>
-          <a:p>
-            <a:pPr lvl="2" fontAlgn="ctr"/>
-            <a:r>
-              <a:rPr lang="en-US" dirty="0" smtClean="0"/>
-              <a:t>Pass arguments using the command line</a:t>
-            </a:r>
-            <a:endParaRPr lang="en-US" sz="6000" dirty="0" smtClean="0"/>
-          </a:p>
-          <a:p>
-            <a:pPr lvl="2" fontAlgn="ctr"/>
-            <a:r>
-              <a:rPr lang="en-US" dirty="0" smtClean="0"/>
-              <a:t>Collect result by output redirection</a:t>
-            </a:r>
-            <a:endParaRPr lang="en-US" sz="6000" dirty="0" smtClean="0"/>
-          </a:p>
-          <a:p>
-            <a:r>
-              <a:rPr lang="en-US" dirty="0" smtClean="0"/>
-              <a:t>The source code can be found here (see ‘Example1’):</a:t>
-            </a:r>
-            <a:endParaRPr lang="en-US" dirty="0" smtClean="0"/>
-          </a:p>
-          <a:p>
-            <a:pPr lvl="1"/>
-            <a:r>
-              <a:rPr lang="en-US" dirty="0" smtClean="0">
-                <a:solidFill>
-                  <a:srgbClr val="FF0000"/>
-                </a:solidFill>
-                <a:hlinkClick r:id="rId2"/>
-              </a:rPr>
-              <a:t>https://svn.cct.lsu.edu/repos/saga/core/trunk/examples/tutorial/</a:t>
-            </a:r>
-          </a:p>
-          <a:p>
-            <a:pPr lvl="1" fontAlgn="ctr"/>
-            <a:r>
-              <a:rPr lang="en-US" sz="2800" dirty="0" smtClean="0"/>
-              <a:t>The </a:t>
-            </a:r>
-            <a:r>
-              <a:rPr lang="en-US" sz="2800" dirty="0"/>
-              <a:t>example uses </a:t>
-            </a:r>
-            <a:r>
-              <a:rPr lang="en-US" sz="2800" dirty="0" err="1"/>
-              <a:t>localhost</a:t>
-            </a:r>
-            <a:r>
-              <a:rPr lang="en-US" sz="2800" dirty="0"/>
-              <a:t> to spawn </a:t>
-            </a:r>
-            <a:r>
-              <a:rPr lang="en-US" sz="2800" dirty="0" err="1"/>
-              <a:t>childs</a:t>
-            </a:r>
-            <a:endParaRPr lang="en-US" sz="2800" dirty="0"/>
-          </a:p>
-          <a:p>
-            <a:pPr lvl="1" fontAlgn="ctr"/>
-            <a:r>
-              <a:rPr lang="en-US" dirty="0" smtClean="0"/>
-              <a:t>For remote execution change HOST1, HOST2, HOST3 from "</a:t>
-            </a:r>
-            <a:r>
-              <a:rPr lang="en-US" dirty="0" err="1" smtClean="0"/>
-              <a:t>localhost</a:t>
-            </a:r>
-            <a:r>
-              <a:rPr lang="en-US" dirty="0" smtClean="0"/>
-              <a:t>" to "</a:t>
-            </a:r>
-            <a:r>
-              <a:rPr lang="en-US" dirty="0" smtClean="0">
-                <a:solidFill>
-                  <a:srgbClr val="FF0000"/>
-                </a:solidFill>
-              </a:rPr>
-              <a:t>FIXME</a:t>
-            </a:r>
-            <a:r>
-              <a:rPr lang="en-US" dirty="0" smtClean="0"/>
-              <a:t>"</a:t>
-            </a:r>
-          </a:p>
-        </p:txBody>
-      </p:sp>
-      <p:sp>
-        <p:nvSpPr>
-          <p:cNvPr id="5" name="Date Placeholder 4"/>
-          <p:cNvSpPr>
-            <a:spLocks noGrp="1"/>
-          </p:cNvSpPr>
-          <p:nvPr>
-            <p:ph type="dt" sz="half" idx="10"/>
-          </p:nvPr>
-        </p:nvSpPr>
-        <p:spPr/>
-        <p:txBody>
-          <a:bodyPr/>
-          <a:lstStyle/>
-          <a:p>
-            <a:r>
-              <a:rPr lang="en-US" dirty="0" smtClean="0"/>
-              <a:t>November FIXME, 2010</a:t>
+              <a:t>November 29th, 2010</a:t>
             </a:r>
             <a:endParaRPr lang="en-US" dirty="0"/>
           </a:p>
@@ -10972,12 +11208,8 @@
           <a:lstStyle/>
           <a:p>
             <a:r>
-              <a:rPr lang="en-US" dirty="0" err="1" smtClean="0"/>
-              <a:t>TeraGrid</a:t>
-            </a:r>
-            <a:r>
-              <a:rPr lang="en-US" dirty="0" smtClean="0"/>
-              <a:t> SAGA Tutorial</a:t>
+              <a:rPr lang="en-US" smtClean="0"/>
+              <a:t>TeraGrid SAGA Tutorial</a:t>
             </a:r>
             <a:endParaRPr lang="en-US" dirty="0"/>
           </a:p>
@@ -11000,7 +11232,7 @@
 </file>
 
 <file path=ppt/slides/slide25.xml><?xml version="1.0" encoding="utf-8"?>
-<p:sld xmlns:a="http://schemas.openxmlformats.org/drawingml/2006/main" xmlns:r="http://schemas.openxmlformats.org/officeDocument/2006/relationships" xmlns:mc="http://schemas.openxmlformats.org/markup-compatibility/2006" xmlns:mv="urn:schemas-microsoft-com:mac:vml" xmlns:p="http://schemas.openxmlformats.org/presentationml/2006/main" mc:Ignorable="mv" mc:PreserveAttributes="mv:*">
+<p:sld xmlns:a="http://schemas.openxmlformats.org/drawingml/2006/main" xmlns:r="http://schemas.openxmlformats.org/officeDocument/2006/relationships" xmlns:p="http://schemas.openxmlformats.org/presentationml/2006/main">
   <p:cSld>
     <p:spTree>
       <p:nvGrpSpPr>
@@ -11018,158 +11250,194 @@
       </p:grpSpPr>
       <p:sp>
         <p:nvSpPr>
-          <p:cNvPr id="2" name="Title 1"/>
-          <p:cNvSpPr>
-            <a:spLocks noGrp="1"/>
+          <p:cNvPr id="29697" name="Rectangle 1"/>
+          <p:cNvSpPr>
+            <a:spLocks noGrp="1" noChangeArrowheads="1"/>
           </p:cNvSpPr>
           <p:nvPr>
             <p:ph type="title"/>
           </p:nvPr>
         </p:nvSpPr>
-        <p:spPr/>
-        <p:txBody>
-          <a:bodyPr/>
-          <a:lstStyle/>
-          <a:p>
-            <a:r>
-              <a:rPr lang="en-US" dirty="0" smtClean="0"/>
-              <a:t>SAGA Tutorial Example </a:t>
-            </a:r>
-            <a:r>
-              <a:rPr lang="en-US" dirty="0" smtClean="0"/>
-              <a:t>2: </a:t>
+        <p:spPr>
+          <a:ln/>
+        </p:spPr>
+        <p:txBody>
+          <a:bodyPr/>
+          <a:lstStyle/>
+          <a:p>
+            <a:r>
+              <a:rPr lang="en-US" dirty="0" smtClean="0"/>
+              <a:t>Example </a:t>
+            </a:r>
+            <a:r>
+              <a:rPr lang="en-US" dirty="0"/>
+              <a:t>1: </a:t>
+            </a:r>
+            <a:r>
+              <a:rPr lang="en-US" dirty="0" err="1"/>
+              <a:t>hello_world</a:t>
+            </a:r>
+            <a:endParaRPr lang="en-US" dirty="0"/>
+          </a:p>
+        </p:txBody>
+      </p:sp>
+      <p:sp>
+        <p:nvSpPr>
+          <p:cNvPr id="29698" name="Rectangle 2"/>
+          <p:cNvSpPr>
+            <a:spLocks noGrp="1" noChangeArrowheads="1"/>
+          </p:cNvSpPr>
+          <p:nvPr>
+            <p:ph idx="1"/>
+          </p:nvPr>
+        </p:nvSpPr>
+        <p:spPr>
+          <a:ln/>
+        </p:spPr>
+        <p:txBody>
+          <a:bodyPr>
+            <a:normAutofit fontScale="92500" lnSpcReduction="10000"/>
+          </a:bodyPr>
+          <a:lstStyle/>
+          <a:p>
+            <a:pPr fontAlgn="ctr"/>
+            <a:r>
+              <a:rPr lang="en-US" sz="4000" dirty="0" smtClean="0"/>
+              <a:t>Hello world</a:t>
+            </a:r>
+            <a:endParaRPr lang="en-US" sz="9600" dirty="0" smtClean="0"/>
+          </a:p>
+          <a:p>
+            <a:pPr lvl="1" fontAlgn="ctr"/>
+            <a:r>
+              <a:rPr lang="en-US" sz="3600" dirty="0" smtClean="0"/>
+              <a:t>Arbitrary sequence of results</a:t>
+            </a:r>
+            <a:endParaRPr lang="en-US" sz="8800" dirty="0" smtClean="0"/>
+          </a:p>
+          <a:p>
+            <a:pPr lvl="2" fontAlgn="ctr"/>
+            <a:r>
+              <a:rPr lang="en-US" dirty="0" smtClean="0"/>
+              <a:t>Optimally: "Hello distributed world!"</a:t>
+            </a:r>
+            <a:endParaRPr lang="en-US" sz="6000" dirty="0" smtClean="0"/>
+          </a:p>
+          <a:p>
+            <a:pPr lvl="1" fontAlgn="ctr"/>
+            <a:r>
+              <a:rPr lang="en-US" sz="3600" dirty="0" smtClean="0"/>
+              <a:t>Demonstrates</a:t>
+            </a:r>
+            <a:endParaRPr lang="en-US" sz="8800" dirty="0" smtClean="0"/>
+          </a:p>
+          <a:p>
+            <a:pPr lvl="2" fontAlgn="ctr"/>
+            <a:r>
+              <a:rPr lang="en-US" dirty="0" smtClean="0"/>
+              <a:t>How to launch a remote job using SAGA </a:t>
             </a:r>
             <a:r>
               <a:rPr lang="en-US" dirty="0" err="1" smtClean="0"/>
-              <a:t>chaining_jobs</a:t>
-            </a:r>
-            <a:endParaRPr lang="en-US" dirty="0"/>
-          </a:p>
-        </p:txBody>
-      </p:sp>
-      <p:sp>
-        <p:nvSpPr>
-          <p:cNvPr id="3" name="Content Placeholder 2"/>
-          <p:cNvSpPr>
-            <a:spLocks noGrp="1"/>
-          </p:cNvSpPr>
-          <p:nvPr>
-            <p:ph idx="1"/>
-          </p:nvPr>
-        </p:nvSpPr>
-        <p:spPr/>
-        <p:txBody>
-          <a:bodyPr>
-            <a:normAutofit fontScale="77500" lnSpcReduction="20000"/>
-          </a:bodyPr>
-          <a:lstStyle/>
-          <a:p>
-            <a:pPr fontAlgn="ctr"/>
-            <a:r>
-              <a:rPr lang="en-US" sz="4000" dirty="0" smtClean="0"/>
-              <a:t>Launch 3 jobs on 3 different machines</a:t>
-            </a:r>
-            <a:endParaRPr lang="en-US" sz="9600" dirty="0" smtClean="0"/>
-          </a:p>
-          <a:p>
-            <a:pPr fontAlgn="ctr"/>
-            <a:r>
-              <a:rPr lang="en-US" sz="4000" dirty="0" smtClean="0"/>
-              <a:t>Output of previous job is needed to launch next job</a:t>
-            </a:r>
-            <a:endParaRPr lang="en-US" sz="9600" dirty="0" smtClean="0"/>
-          </a:p>
-          <a:p>
-            <a:pPr fontAlgn="ctr"/>
-            <a:r>
-              <a:rPr lang="en-US" sz="4000" dirty="0" smtClean="0"/>
-              <a:t>Simple sequential execution, but SAGA style</a:t>
-            </a:r>
-            <a:endParaRPr lang="en-US" sz="9600" dirty="0" smtClean="0"/>
-          </a:p>
-          <a:p>
-            <a:pPr fontAlgn="ctr"/>
-            <a:r>
-              <a:rPr lang="en-US" sz="4000" dirty="0" smtClean="0"/>
-              <a:t>Demonstrates</a:t>
-            </a:r>
-            <a:endParaRPr lang="en-US" sz="9600" dirty="0" smtClean="0"/>
+              <a:t>job_service</a:t>
+            </a:r>
+            <a:endParaRPr lang="en-US" sz="6000" dirty="0" smtClean="0"/>
+          </a:p>
+          <a:p>
+            <a:pPr lvl="2" fontAlgn="ctr"/>
+            <a:r>
+              <a:rPr lang="en-US" dirty="0" smtClean="0"/>
+              <a:t>Pass arguments using the command line</a:t>
+            </a:r>
+            <a:endParaRPr lang="en-US" sz="6000" dirty="0" smtClean="0"/>
+          </a:p>
+          <a:p>
+            <a:pPr lvl="2" fontAlgn="ctr"/>
+            <a:r>
+              <a:rPr lang="en-US" dirty="0" smtClean="0"/>
+              <a:t>Collect result by output redirection</a:t>
+            </a:r>
+            <a:endParaRPr lang="en-US" sz="6000" dirty="0" smtClean="0"/>
+          </a:p>
+          <a:p>
+            <a:r>
+              <a:rPr lang="en-US" dirty="0" smtClean="0"/>
+              <a:t>The source code can be found here (see ‘Example1’):</a:t>
+            </a:r>
+          </a:p>
+          <a:p>
+            <a:pPr lvl="1"/>
+            <a:r>
+              <a:rPr lang="en-US" dirty="0" smtClean="0"/>
+              <a:t>http://faust.cct.lsu.edu/trac/saga/wiki/		</a:t>
+            </a:r>
+            <a:r>
+              <a:rPr lang="en-US" dirty="0" smtClean="0">
+                <a:solidFill>
+                  <a:srgbClr val="FF0000"/>
+                </a:solidFill>
+              </a:rPr>
+              <a:t>FIXME</a:t>
+            </a:r>
+            <a:endParaRPr lang="en-US" dirty="0" smtClean="0">
+              <a:solidFill>
+                <a:srgbClr val="FF0000"/>
+              </a:solidFill>
+              <a:hlinkClick r:id="rId2"/>
+            </a:endParaRPr>
           </a:p>
           <a:p>
             <a:pPr lvl="1" fontAlgn="ctr"/>
             <a:r>
-              <a:rPr lang="en-US" sz="3600" dirty="0" smtClean="0"/>
-              <a:t>How to launch a job using SAGA </a:t>
-            </a:r>
-            <a:r>
-              <a:rPr lang="en-US" sz="3600" dirty="0" err="1" smtClean="0"/>
-              <a:t>job_service</a:t>
-            </a:r>
-            <a:endParaRPr lang="en-US" sz="8800" dirty="0" smtClean="0"/>
+              <a:rPr lang="en-US" sz="2800" dirty="0"/>
+              <a:t>The example uses </a:t>
+            </a:r>
+            <a:r>
+              <a:rPr lang="en-US" sz="2800" dirty="0" err="1"/>
+              <a:t>localhost</a:t>
+            </a:r>
+            <a:r>
+              <a:rPr lang="en-US" sz="2800" dirty="0"/>
+              <a:t> to spawn </a:t>
+            </a:r>
+            <a:r>
+              <a:rPr lang="en-US" sz="2800" dirty="0" err="1"/>
+              <a:t>childs</a:t>
+            </a:r>
+            <a:endParaRPr lang="en-US" sz="2800" dirty="0"/>
           </a:p>
           <a:p>
             <a:pPr lvl="1" fontAlgn="ctr"/>
             <a:r>
-              <a:rPr lang="en-US" sz="3600" dirty="0" smtClean="0"/>
-              <a:t>How to feed input to launched job</a:t>
-            </a:r>
-            <a:endParaRPr lang="en-US" sz="8800" dirty="0" smtClean="0"/>
-          </a:p>
-          <a:p>
-            <a:pPr lvl="1" fontAlgn="ctr"/>
-            <a:r>
-              <a:rPr lang="en-US" sz="3600" dirty="0" smtClean="0"/>
-              <a:t>How to collect output</a:t>
-            </a:r>
-            <a:endParaRPr lang="en-US" sz="8800" dirty="0" smtClean="0"/>
-          </a:p>
-          <a:p>
-            <a:pPr fontAlgn="ctr"/>
-            <a:r>
-              <a:rPr lang="en-US" sz="4000" dirty="0" smtClean="0"/>
-              <a:t>Launched job: /</a:t>
-            </a:r>
-            <a:r>
-              <a:rPr lang="en-US" sz="4000" dirty="0" err="1" smtClean="0"/>
-              <a:t>usr</a:t>
-            </a:r>
-            <a:r>
-              <a:rPr lang="en-US" sz="4000" dirty="0" smtClean="0"/>
-              <a:t>/bin/</a:t>
-            </a:r>
-            <a:r>
-              <a:rPr lang="en-US" sz="4000" dirty="0" err="1" smtClean="0"/>
-              <a:t>bc</a:t>
-            </a:r>
-            <a:r>
-              <a:rPr lang="en-US" sz="4000" dirty="0" smtClean="0"/>
-              <a:t> </a:t>
-            </a:r>
-          </a:p>
-          <a:p>
-            <a:pPr fontAlgn="ctr"/>
-            <a:r>
-              <a:rPr lang="de-DE" sz="3600" dirty="0" smtClean="0"/>
-              <a:t>Increment the number passed as the argument</a:t>
-            </a:r>
-            <a:endParaRPr lang="de-DE" sz="8800" dirty="0" smtClean="0"/>
-          </a:p>
-          <a:p>
-            <a:pPr lvl="1" fontAlgn="ctr"/>
-            <a:r>
-              <a:rPr lang="de-DE" sz="3600" dirty="0" smtClean="0"/>
-              <a:t>Pass returned incremented number to next job</a:t>
-            </a:r>
-            <a:endParaRPr lang="de-DE" sz="8800" dirty="0" smtClean="0"/>
-          </a:p>
-          <a:p>
-            <a:endParaRPr lang="en-US" dirty="0"/>
-          </a:p>
-        </p:txBody>
-      </p:sp>
-      <p:sp>
-        <p:nvSpPr>
-          <p:cNvPr id="4" name="Date Placeholder 3"/>
+              <a:rPr lang="en-US" dirty="0" smtClean="0"/>
+              <a:t>For remote execution change HOST1, HOST2, HOST3 from "</a:t>
+            </a:r>
+            <a:r>
+              <a:rPr lang="en-US" dirty="0" err="1" smtClean="0"/>
+              <a:t>localhost</a:t>
+            </a:r>
+            <a:r>
+              <a:rPr lang="en-US" dirty="0" smtClean="0"/>
+              <a:t>" to "</a:t>
+            </a:r>
+            <a:r>
+              <a:rPr lang="en-US" dirty="0" smtClean="0">
+                <a:solidFill>
+                  <a:srgbClr val="FF0000"/>
+                </a:solidFill>
+              </a:rPr>
+              <a:t>FIXME</a:t>
+            </a:r>
+            <a:r>
+              <a:rPr lang="en-US" dirty="0" smtClean="0"/>
+              <a:t>"</a:t>
+            </a:r>
+          </a:p>
+        </p:txBody>
+      </p:sp>
+      <p:sp>
+        <p:nvSpPr>
+          <p:cNvPr id="5" name="Date Placeholder 4"/>
           <p:cNvSpPr>
             <a:spLocks noGrp="1"/>
           </p:cNvSpPr>
@@ -11184,7 +11452,7 @@
           <a:p>
             <a:r>
               <a:rPr lang="en-US" smtClean="0"/>
-              <a:t>November FIXME, 2010</a:t>
+              <a:t>November 29th, 2010</a:t>
             </a:r>
             <a:endParaRPr lang="en-US" dirty="0"/>
           </a:p>
@@ -11216,7 +11484,7 @@
       </p:sp>
       <p:sp>
         <p:nvSpPr>
-          <p:cNvPr id="5" name="Footer Placeholder 4"/>
+          <p:cNvPr id="7" name="Footer Placeholder 6"/>
           <p:cNvSpPr>
             <a:spLocks noGrp="1"/>
           </p:cNvSpPr>
@@ -11230,8 +11498,12 @@
           <a:lstStyle/>
           <a:p>
             <a:r>
-              <a:rPr lang="en-US" smtClean="0"/>
-              <a:t>TeraGrid SAGA Tutorial</a:t>
+              <a:rPr lang="en-US" dirty="0" err="1" smtClean="0"/>
+              <a:t>TeraGrid</a:t>
+            </a:r>
+            <a:r>
+              <a:rPr lang="en-US" dirty="0" smtClean="0"/>
+              <a:t> SAGA Tutorial</a:t>
             </a:r>
             <a:endParaRPr lang="en-US" dirty="0"/>
           </a:p>
@@ -11242,11 +11514,19 @@
   <p:clrMapOvr>
     <a:masterClrMapping/>
   </p:clrMapOvr>
+  <p:transition/>
+  <p:timing>
+    <p:tnLst>
+      <p:par>
+        <p:cTn id="1" dur="indefinite" restart="never" nodeType="tmRoot"/>
+      </p:par>
+    </p:tnLst>
+  </p:timing>
 </p:sld>
 </file>
 
 <file path=ppt/slides/slide26.xml><?xml version="1.0" encoding="utf-8"?>
-<p:sld xmlns:a="http://schemas.openxmlformats.org/drawingml/2006/main" xmlns:r="http://schemas.openxmlformats.org/officeDocument/2006/relationships" xmlns:mc="http://schemas.openxmlformats.org/markup-compatibility/2006" xmlns:mv="urn:schemas-microsoft-com:mac:vml" xmlns:p="http://schemas.openxmlformats.org/presentationml/2006/main" mc:Ignorable="mv" mc:PreserveAttributes="mv:*">
+<p:sld xmlns:a="http://schemas.openxmlformats.org/drawingml/2006/main" xmlns:r="http://schemas.openxmlformats.org/officeDocument/2006/relationships" xmlns:p="http://schemas.openxmlformats.org/presentationml/2006/main">
   <p:cSld>
     <p:spTree>
       <p:nvGrpSpPr>
@@ -11279,15 +11559,11 @@
           <a:p>
             <a:r>
               <a:rPr lang="en-US" dirty="0" smtClean="0"/>
-              <a:t>SAGA Tutorial Example </a:t>
-            </a:r>
-            <a:r>
-              <a:rPr lang="en-US" dirty="0" smtClean="0"/>
-              <a:t>3: </a:t>
+              <a:t>Example 2: </a:t>
             </a:r>
             <a:r>
               <a:rPr lang="en-US" dirty="0" err="1" smtClean="0"/>
-              <a:t>depending_jobs</a:t>
+              <a:t>chaining_jobs</a:t>
             </a:r>
             <a:endParaRPr lang="en-US" dirty="0"/>
           </a:p>
@@ -11306,81 +11582,109 @@
         <p:spPr/>
         <p:txBody>
           <a:bodyPr>
-            <a:normAutofit fontScale="70000" lnSpcReduction="20000"/>
+            <a:normAutofit fontScale="77500" lnSpcReduction="20000"/>
           </a:bodyPr>
           <a:lstStyle/>
           <a:p>
             <a:pPr fontAlgn="ctr"/>
             <a:r>
-              <a:rPr lang="de-DE" sz="4000" dirty="0" smtClean="0"/>
-              <a:t>Coordinating information from advert service</a:t>
-            </a:r>
+              <a:rPr lang="en-US" sz="4000" dirty="0" smtClean="0"/>
+              <a:t>Launch 3 jobs on 3 different machines</a:t>
+            </a:r>
+            <a:endParaRPr lang="en-US" sz="9600" dirty="0" smtClean="0"/>
           </a:p>
           <a:p>
             <a:pPr fontAlgn="ctr"/>
             <a:r>
-              <a:rPr lang="de-DE" sz="4000" dirty="0" smtClean="0"/>
-              <a:t>Launch a single job sequentially on a set of remote resources</a:t>
-            </a:r>
-            <a:endParaRPr lang="de-DE" sz="9600" dirty="0" smtClean="0"/>
+              <a:rPr lang="en-US" sz="4000" dirty="0" smtClean="0"/>
+              <a:t>Output of previous job is needed to launch next job</a:t>
+            </a:r>
+            <a:endParaRPr lang="en-US" sz="9600" dirty="0" smtClean="0"/>
+          </a:p>
+          <a:p>
+            <a:pPr fontAlgn="ctr"/>
+            <a:r>
+              <a:rPr lang="en-US" sz="4000" dirty="0" smtClean="0"/>
+              <a:t>Simple sequential execution, but SAGA style</a:t>
+            </a:r>
+            <a:endParaRPr lang="en-US" sz="9600" dirty="0" smtClean="0"/>
+          </a:p>
+          <a:p>
+            <a:pPr fontAlgn="ctr"/>
+            <a:r>
+              <a:rPr lang="en-US" sz="4000" dirty="0" smtClean="0"/>
+              <a:t>Demonstrates</a:t>
+            </a:r>
+            <a:endParaRPr lang="en-US" sz="9600" dirty="0" smtClean="0"/>
           </a:p>
           <a:p>
             <a:pPr lvl="1" fontAlgn="ctr"/>
             <a:r>
+              <a:rPr lang="en-US" sz="3600" dirty="0" smtClean="0"/>
+              <a:t>How to launch a job using SAGA </a:t>
+            </a:r>
+            <a:r>
+              <a:rPr lang="en-US" sz="3600" dirty="0" err="1" smtClean="0"/>
+              <a:t>job_service</a:t>
+            </a:r>
+            <a:endParaRPr lang="en-US" sz="8800" dirty="0" smtClean="0"/>
+          </a:p>
+          <a:p>
+            <a:pPr lvl="1" fontAlgn="ctr"/>
+            <a:r>
+              <a:rPr lang="en-US" sz="3600" dirty="0" smtClean="0"/>
+              <a:t>How to feed input to launched job</a:t>
+            </a:r>
+            <a:endParaRPr lang="en-US" sz="8800" dirty="0" smtClean="0"/>
+          </a:p>
+          <a:p>
+            <a:pPr lvl="1" fontAlgn="ctr"/>
+            <a:r>
+              <a:rPr lang="en-US" sz="3600" dirty="0" smtClean="0"/>
+              <a:t>How to collect output</a:t>
+            </a:r>
+            <a:endParaRPr lang="en-US" sz="8800" dirty="0" smtClean="0"/>
+          </a:p>
+          <a:p>
+            <a:pPr fontAlgn="ctr"/>
+            <a:r>
+              <a:rPr lang="en-US" sz="4000" dirty="0" smtClean="0"/>
+              <a:t>Launched job: /</a:t>
+            </a:r>
+            <a:r>
+              <a:rPr lang="en-US" sz="4000" dirty="0" err="1" smtClean="0"/>
+              <a:t>usr</a:t>
+            </a:r>
+            <a:r>
+              <a:rPr lang="en-US" sz="4000" dirty="0" smtClean="0"/>
+              <a:t>/bin/</a:t>
+            </a:r>
+            <a:r>
+              <a:rPr lang="en-US" sz="4000" dirty="0" err="1" smtClean="0"/>
+              <a:t>bc</a:t>
+            </a:r>
+            <a:r>
+              <a:rPr lang="en-US" sz="4000" dirty="0" smtClean="0"/>
+              <a:t> </a:t>
+            </a:r>
+          </a:p>
+          <a:p>
+            <a:pPr fontAlgn="ctr"/>
+            <a:r>
               <a:rPr lang="de-DE" sz="3600" dirty="0" smtClean="0"/>
-              <a:t>Simulating checkpointing/relaunching on different resource (migration)</a:t>
+              <a:t>Increment the number passed as the argument</a:t>
             </a:r>
             <a:endParaRPr lang="de-DE" sz="8800" dirty="0" smtClean="0"/>
           </a:p>
           <a:p>
-            <a:pPr fontAlgn="ctr"/>
-            <a:r>
-              <a:rPr lang="de-DE" sz="4000" dirty="0" smtClean="0"/>
-              <a:t>Maintain a single result value in advert service</a:t>
-            </a:r>
-            <a:endParaRPr lang="de-DE" sz="9600" dirty="0" smtClean="0"/>
-          </a:p>
-          <a:p>
             <a:pPr lvl="1" fontAlgn="ctr"/>
             <a:r>
               <a:rPr lang="de-DE" sz="3600" dirty="0" smtClean="0"/>
-              <a:t>Gets written by one job, and read by the next</a:t>
+              <a:t>Pass returned incremented number to next job</a:t>
             </a:r>
             <a:endParaRPr lang="de-DE" sz="8800" dirty="0" smtClean="0"/>
           </a:p>
           <a:p>
-            <a:pPr fontAlgn="ctr"/>
-            <a:r>
-              <a:rPr lang="de-DE" sz="4000" dirty="0" smtClean="0"/>
-              <a:t>Demonstrates </a:t>
-            </a:r>
-            <a:endParaRPr lang="de-DE" sz="9600" dirty="0" smtClean="0"/>
-          </a:p>
-          <a:p>
-            <a:pPr lvl="1" fontAlgn="ctr"/>
-            <a:r>
-              <a:rPr lang="de-DE" sz="3600" dirty="0" smtClean="0"/>
-              <a:t>How to launch remote job using SAGA job, while maintaining environment</a:t>
-            </a:r>
-            <a:endParaRPr lang="de-DE" sz="8800" dirty="0" smtClean="0"/>
-          </a:p>
-          <a:p>
-            <a:pPr lvl="1" fontAlgn="ctr"/>
-            <a:r>
-              <a:rPr lang="de-DE" sz="3600" dirty="0" smtClean="0"/>
-              <a:t>Assembling argument lists</a:t>
-            </a:r>
-            <a:endParaRPr lang="de-DE" sz="8800" dirty="0" smtClean="0"/>
-          </a:p>
-          <a:p>
-            <a:pPr fontAlgn="ctr"/>
-            <a:r>
-              <a:rPr lang="de-DE" sz="4000" dirty="0" smtClean="0"/>
-              <a:t>Result is left in advert service, but accessed afterwards</a:t>
-            </a:r>
-            <a:endParaRPr lang="de-DE" sz="9600" dirty="0" smtClean="0"/>
-          </a:p>
-          <a:p>
             <a:endParaRPr lang="en-US" dirty="0"/>
           </a:p>
         </p:txBody>
@@ -11402,7 +11706,7 @@
           <a:p>
             <a:r>
               <a:rPr lang="en-US" smtClean="0"/>
-              <a:t>November FIXME, 2010</a:t>
+              <a:t>November 29th, 2010</a:t>
             </a:r>
             <a:endParaRPr lang="en-US" dirty="0"/>
           </a:p>
@@ -11463,8 +11767,8 @@
 </p:sld>
 </file>
 
-<file path=ppt/slides/slide3.xml><?xml version="1.0" encoding="utf-8"?>
-<p:sld xmlns:a="http://schemas.openxmlformats.org/drawingml/2006/main" xmlns:r="http://schemas.openxmlformats.org/officeDocument/2006/relationships" xmlns:mc="http://schemas.openxmlformats.org/markup-compatibility/2006" xmlns:mv="urn:schemas-microsoft-com:mac:vml" xmlns:p="http://schemas.openxmlformats.org/presentationml/2006/main" mc:Ignorable="mv" mc:PreserveAttributes="mv:*">
+<file path=ppt/slides/slide27.xml><?xml version="1.0" encoding="utf-8"?>
+<p:sld xmlns:a="http://schemas.openxmlformats.org/drawingml/2006/main" xmlns:r="http://schemas.openxmlformats.org/officeDocument/2006/relationships" xmlns:p="http://schemas.openxmlformats.org/presentationml/2006/main">
   <p:cSld>
     <p:spTree>
       <p:nvGrpSpPr>
@@ -11482,6 +11786,220 @@
       </p:grpSpPr>
       <p:sp>
         <p:nvSpPr>
+          <p:cNvPr id="2" name="Title 1"/>
+          <p:cNvSpPr>
+            <a:spLocks noGrp="1"/>
+          </p:cNvSpPr>
+          <p:nvPr>
+            <p:ph type="title"/>
+          </p:nvPr>
+        </p:nvSpPr>
+        <p:spPr/>
+        <p:txBody>
+          <a:bodyPr/>
+          <a:lstStyle/>
+          <a:p>
+            <a:r>
+              <a:rPr lang="en-US" dirty="0" smtClean="0"/>
+              <a:t>Example 3: </a:t>
+            </a:r>
+            <a:r>
+              <a:rPr lang="en-US" dirty="0" err="1" smtClean="0"/>
+              <a:t>depending_jobs</a:t>
+            </a:r>
+            <a:endParaRPr lang="en-US" dirty="0"/>
+          </a:p>
+        </p:txBody>
+      </p:sp>
+      <p:sp>
+        <p:nvSpPr>
+          <p:cNvPr id="3" name="Content Placeholder 2"/>
+          <p:cNvSpPr>
+            <a:spLocks noGrp="1"/>
+          </p:cNvSpPr>
+          <p:nvPr>
+            <p:ph idx="1"/>
+          </p:nvPr>
+        </p:nvSpPr>
+        <p:spPr/>
+        <p:txBody>
+          <a:bodyPr>
+            <a:normAutofit fontScale="70000" lnSpcReduction="20000"/>
+          </a:bodyPr>
+          <a:lstStyle/>
+          <a:p>
+            <a:pPr fontAlgn="ctr"/>
+            <a:r>
+              <a:rPr lang="de-DE" sz="4000" dirty="0" smtClean="0"/>
+              <a:t>Coordinating information from advert service</a:t>
+            </a:r>
+          </a:p>
+          <a:p>
+            <a:pPr fontAlgn="ctr"/>
+            <a:r>
+              <a:rPr lang="de-DE" sz="4000" dirty="0" smtClean="0"/>
+              <a:t>Launch a single job sequentially on a set of remote resources</a:t>
+            </a:r>
+            <a:endParaRPr lang="de-DE" sz="9600" dirty="0" smtClean="0"/>
+          </a:p>
+          <a:p>
+            <a:pPr lvl="1" fontAlgn="ctr"/>
+            <a:r>
+              <a:rPr lang="de-DE" sz="3600" dirty="0" smtClean="0"/>
+              <a:t>Simulating checkpointing/relaunching on different resource (migration)</a:t>
+            </a:r>
+            <a:endParaRPr lang="de-DE" sz="8800" dirty="0" smtClean="0"/>
+          </a:p>
+          <a:p>
+            <a:pPr fontAlgn="ctr"/>
+            <a:r>
+              <a:rPr lang="de-DE" sz="4000" dirty="0" smtClean="0"/>
+              <a:t>Maintain a single result value in advert service</a:t>
+            </a:r>
+            <a:endParaRPr lang="de-DE" sz="9600" dirty="0" smtClean="0"/>
+          </a:p>
+          <a:p>
+            <a:pPr lvl="1" fontAlgn="ctr"/>
+            <a:r>
+              <a:rPr lang="de-DE" sz="3600" dirty="0" smtClean="0"/>
+              <a:t>Gets written by one job, and read by the next</a:t>
+            </a:r>
+            <a:endParaRPr lang="de-DE" sz="8800" dirty="0" smtClean="0"/>
+          </a:p>
+          <a:p>
+            <a:pPr fontAlgn="ctr"/>
+            <a:r>
+              <a:rPr lang="de-DE" sz="4000" dirty="0" smtClean="0"/>
+              <a:t>Demonstrates </a:t>
+            </a:r>
+            <a:endParaRPr lang="de-DE" sz="9600" dirty="0" smtClean="0"/>
+          </a:p>
+          <a:p>
+            <a:pPr lvl="1" fontAlgn="ctr"/>
+            <a:r>
+              <a:rPr lang="de-DE" sz="3600" dirty="0" smtClean="0"/>
+              <a:t>How to launch remote job using SAGA job, while maintaining environment</a:t>
+            </a:r>
+            <a:endParaRPr lang="de-DE" sz="8800" dirty="0" smtClean="0"/>
+          </a:p>
+          <a:p>
+            <a:pPr lvl="1" fontAlgn="ctr"/>
+            <a:r>
+              <a:rPr lang="de-DE" sz="3600" dirty="0" smtClean="0"/>
+              <a:t>Assembling argument lists</a:t>
+            </a:r>
+            <a:endParaRPr lang="de-DE" sz="8800" dirty="0" smtClean="0"/>
+          </a:p>
+          <a:p>
+            <a:pPr fontAlgn="ctr"/>
+            <a:r>
+              <a:rPr lang="de-DE" sz="4000" dirty="0" smtClean="0"/>
+              <a:t>Result is left in advert service, but accessed afterwards</a:t>
+            </a:r>
+            <a:endParaRPr lang="de-DE" sz="9600" dirty="0" smtClean="0"/>
+          </a:p>
+          <a:p>
+            <a:endParaRPr lang="en-US" dirty="0"/>
+          </a:p>
+        </p:txBody>
+      </p:sp>
+      <p:sp>
+        <p:nvSpPr>
+          <p:cNvPr id="4" name="Date Placeholder 3"/>
+          <p:cNvSpPr>
+            <a:spLocks noGrp="1"/>
+          </p:cNvSpPr>
+          <p:nvPr>
+            <p:ph type="dt" sz="half" idx="10"/>
+          </p:nvPr>
+        </p:nvSpPr>
+        <p:spPr/>
+        <p:txBody>
+          <a:bodyPr/>
+          <a:lstStyle/>
+          <a:p>
+            <a:r>
+              <a:rPr lang="en-US" smtClean="0"/>
+              <a:t>November 29th, 2010</a:t>
+            </a:r>
+            <a:endParaRPr lang="en-US" dirty="0"/>
+          </a:p>
+        </p:txBody>
+      </p:sp>
+      <p:sp>
+        <p:nvSpPr>
+          <p:cNvPr id="6" name="Slide Number Placeholder 5"/>
+          <p:cNvSpPr>
+            <a:spLocks noGrp="1"/>
+          </p:cNvSpPr>
+          <p:nvPr>
+            <p:ph type="sldNum" sz="quarter" idx="11"/>
+          </p:nvPr>
+        </p:nvSpPr>
+        <p:spPr/>
+        <p:txBody>
+          <a:bodyPr/>
+          <a:lstStyle/>
+          <a:p>
+            <a:fld id="{7A426C1A-D210-4B4B-86AA-6AEDDDCCF5FF}" type="slidenum">
+              <a:rPr lang="en-US" smtClean="0"/>
+              <a:pPr/>
+              <a:t>27</a:t>
+            </a:fld>
+            <a:endParaRPr lang="en-US"/>
+          </a:p>
+        </p:txBody>
+      </p:sp>
+      <p:sp>
+        <p:nvSpPr>
+          <p:cNvPr id="5" name="Footer Placeholder 4"/>
+          <p:cNvSpPr>
+            <a:spLocks noGrp="1"/>
+          </p:cNvSpPr>
+          <p:nvPr>
+            <p:ph type="ftr" sz="quarter" idx="12"/>
+          </p:nvPr>
+        </p:nvSpPr>
+        <p:spPr/>
+        <p:txBody>
+          <a:bodyPr/>
+          <a:lstStyle/>
+          <a:p>
+            <a:r>
+              <a:rPr lang="en-US" smtClean="0"/>
+              <a:t>TeraGrid SAGA Tutorial</a:t>
+            </a:r>
+            <a:endParaRPr lang="en-US" dirty="0"/>
+          </a:p>
+        </p:txBody>
+      </p:sp>
+    </p:spTree>
+  </p:cSld>
+  <p:clrMapOvr>
+    <a:masterClrMapping/>
+  </p:clrMapOvr>
+</p:sld>
+</file>
+
+<file path=ppt/slides/slide3.xml><?xml version="1.0" encoding="utf-8"?>
+<p:sld xmlns:a="http://schemas.openxmlformats.org/drawingml/2006/main" xmlns:r="http://schemas.openxmlformats.org/officeDocument/2006/relationships" xmlns:p="http://schemas.openxmlformats.org/presentationml/2006/main">
+  <p:cSld>
+    <p:spTree>
+      <p:nvGrpSpPr>
+        <p:cNvPr id="1" name=""/>
+        <p:cNvGrpSpPr/>
+        <p:nvPr/>
+      </p:nvGrpSpPr>
+      <p:grpSpPr>
+        <a:xfrm>
+          <a:off x="0" y="0"/>
+          <a:ext cx="0" cy="0"/>
+          <a:chOff x="0" y="0"/>
+          <a:chExt cx="0" cy="0"/>
+        </a:xfrm>
+      </p:grpSpPr>
+      <p:sp>
+        <p:nvSpPr>
           <p:cNvPr id="25601" name="Rectangle 1"/>
           <p:cNvSpPr>
             <a:spLocks noGrp="1" noChangeArrowheads="1"/>
@@ -11498,10 +12016,9 @@
           <a:lstStyle/>
           <a:p>
             <a:r>
-              <a:rPr lang="en-US" dirty="0" smtClean="0"/>
-              <a:t>General Information and Documentation</a:t>
-            </a:r>
-            <a:endParaRPr lang="en-US" dirty="0"/>
+              <a:rPr lang="en-US"/>
+              <a:t>Documentation</a:t>
+            </a:r>
           </a:p>
         </p:txBody>
       </p:sp>
@@ -11517,8 +12034,8 @@
         </p:nvSpPr>
         <p:spPr>
           <a:xfrm>
-            <a:off x="1447159" y="2667000"/>
-            <a:ext cx="10961589" cy="6245113"/>
+            <a:off x="1447159" y="2942035"/>
+            <a:ext cx="11303641" cy="5970078"/>
           </a:xfrm>
           <a:ln/>
         </p:spPr>
@@ -11536,81 +12053,42 @@
           <a:p>
             <a:pPr lvl="1"/>
             <a:r>
-              <a:rPr lang="en-US" dirty="0" smtClean="0">
+              <a:rPr lang="en-US" sz="2400" dirty="0">
                 <a:hlinkClick r:id="rId3"/>
               </a:rPr>
-              <a:t>http:/</a:t>
-            </a:r>
-            <a:r>
-              <a:rPr lang="en-US" dirty="0" smtClean="0">
+              <a:t>https://</a:t>
+            </a:r>
+            <a:r>
+              <a:rPr lang="en-US" sz="2400" dirty="0" smtClean="0">
                 <a:hlinkClick r:id="rId3"/>
               </a:rPr>
-              <a:t>/saga. cct.lsu.edu/</a:t>
-            </a:r>
-            <a:endParaRPr lang="en-US" dirty="0" smtClean="0"/>
-          </a:p>
-          <a:p>
-            <a:r>
-              <a:rPr lang="en-US" dirty="0" smtClean="0"/>
-              <a:t>Documentation:</a:t>
-            </a:r>
+              <a:t>svn.cct.lsu.edu/repos/saga-projects/tutorial/general_tutorial</a:t>
+            </a:r>
+            <a:endParaRPr lang="en-US" sz="2400" dirty="0" smtClean="0"/>
           </a:p>
           <a:p>
             <a:pPr lvl="1"/>
             <a:r>
-              <a:rPr lang="en-US" dirty="0" smtClean="0"/>
-              <a:t>http</a:t>
-            </a:r>
-            <a:r>
-              <a:rPr lang="en-US" dirty="0" smtClean="0"/>
-              <a:t>://</a:t>
-            </a:r>
-            <a:r>
-              <a:rPr lang="en-US" dirty="0" err="1" smtClean="0"/>
-              <a:t>saga.cct.lsu.edu/software/cpp/documentation</a:t>
-            </a:r>
-            <a:endParaRPr lang="en-US" dirty="0" smtClean="0"/>
-          </a:p>
-          <a:p>
-            <a:r>
-              <a:rPr lang="en-US" dirty="0" smtClean="0"/>
-              <a:t>API </a:t>
-            </a:r>
-            <a:r>
-              <a:rPr lang="en-US" dirty="0"/>
-              <a:t>documentation </a:t>
-            </a:r>
-            <a:endParaRPr lang="en-US" dirty="0" smtClean="0"/>
-          </a:p>
-          <a:p>
-            <a:pPr lvl="1"/>
-            <a:r>
-              <a:rPr lang="en-US" dirty="0" smtClean="0"/>
-              <a:t>Python</a:t>
-            </a:r>
-          </a:p>
-          <a:p>
-            <a:pPr lvl="2"/>
-            <a:r>
-              <a:rPr lang="en-US" dirty="0">
+              <a:rPr lang="en-US" sz="2400" dirty="0">
                 <a:hlinkClick r:id="rId4"/>
               </a:rPr>
-              <a:t>http://static.saga.cct.lsu.edu/apidoc/python/latest</a:t>
-            </a:r>
-            <a:r>
-              <a:rPr lang="en-US" dirty="0" smtClean="0">
-                <a:hlinkClick r:id="rId4"/>
-              </a:rPr>
-              <a:t>/</a:t>
-            </a:r>
-            <a:endParaRPr lang="en-US" dirty="0"/>
+              <a:t>http://saga.cct.lsu.edu/software/cpp/documentation/tutorials/loni-training-2010</a:t>
+            </a:r>
+            <a:endParaRPr lang="en-US" sz="2400" dirty="0" smtClean="0"/>
+          </a:p>
+          <a:p>
+            <a:r>
+              <a:rPr lang="en-US" dirty="0" smtClean="0"/>
+              <a:t>API documentation </a:t>
+            </a:r>
           </a:p>
           <a:p>
             <a:pPr lvl="1"/>
             <a:r>
               <a:rPr lang="en-US" dirty="0" smtClean="0"/>
-              <a:t>C++</a:t>
-            </a:r>
+              <a:t>Python</a:t>
+            </a:r>
+            <a:endParaRPr lang="en-US" dirty="0" smtClean="0"/>
           </a:p>
           <a:p>
             <a:pPr lvl="2"/>
@@ -11618,7 +12096,7 @@
               <a:rPr lang="en-US" dirty="0">
                 <a:hlinkClick r:id="rId5"/>
               </a:rPr>
-              <a:t>http://static.saga.cct.lsu.edu/apidoc/cpp/latest</a:t>
+              <a:t>http://static.saga.cct.lsu.edu/apidoc/python/latest</a:t>
             </a:r>
             <a:r>
               <a:rPr lang="en-US" dirty="0" smtClean="0">
@@ -11626,29 +12104,58 @@
               </a:rPr>
               <a:t>/</a:t>
             </a:r>
+            <a:endParaRPr lang="en-US" dirty="0"/>
+          </a:p>
+          <a:p>
+            <a:pPr lvl="1"/>
+            <a:r>
+              <a:rPr lang="en-US" dirty="0" smtClean="0"/>
+              <a:t>C++</a:t>
+            </a:r>
+          </a:p>
+          <a:p>
+            <a:pPr lvl="2"/>
+            <a:r>
+              <a:rPr lang="en-US" dirty="0">
+                <a:hlinkClick r:id="rId6"/>
+              </a:rPr>
+              <a:t>http://static.saga.cct.lsu.edu/apidoc/cpp/latest</a:t>
+            </a:r>
+            <a:r>
+              <a:rPr lang="en-US" dirty="0" smtClean="0">
+                <a:hlinkClick r:id="rId6"/>
+              </a:rPr>
+              <a:t>/</a:t>
+            </a:r>
             <a:endParaRPr lang="en-US" dirty="0" smtClean="0"/>
           </a:p>
           <a:p>
             <a:pPr marL="295662"/>
             <a:r>
               <a:rPr lang="en-US" dirty="0" smtClean="0"/>
-              <a:t>Programmers</a:t>
-            </a:r>
-            <a:r>
-              <a:rPr lang="en-US" dirty="0" smtClean="0"/>
-              <a:t> Guide:</a:t>
-            </a:r>
-          </a:p>
-          <a:p>
-            <a:pPr marL="783335" lvl="1"/>
-            <a:r>
-              <a:rPr lang="en-US" dirty="0" err="1" smtClean="0"/>
-              <a:t>https://svn.cct.lsu.edu/repos/saga/core/trunk/docs/manuals/programming_guide/tex/saga-programming-guide.pdf</a:t>
-            </a:r>
-            <a:endParaRPr lang="en-US" dirty="0" smtClean="0"/>
-          </a:p>
-          <a:p>
-            <a:pPr marL="783335" lvl="1"/>
+              <a:t>Programmers manual</a:t>
+            </a:r>
+          </a:p>
+          <a:p>
+            <a:pPr marL="965200" lvl="1" indent="-477838"/>
+            <a:r>
+              <a:rPr lang="en-US" dirty="0">
+                <a:solidFill>
+                  <a:srgbClr val="B70000"/>
+                </a:solidFill>
+                <a:hlinkClick r:id="rId7"/>
+              </a:rPr>
+              <a:t>http://</a:t>
+            </a:r>
+            <a:r>
+              <a:rPr lang="en-US" dirty="0" smtClean="0">
+                <a:solidFill>
+                  <a:srgbClr val="B70000"/>
+                </a:solidFill>
+                <a:hlinkClick r:id="rId7"/>
+              </a:rPr>
+              <a:t>static.saga.cct.lsu.edu/docs/programming_guide/html/saga-programming-guide.html</a:t>
+            </a:r>
             <a:endParaRPr lang="en-US" dirty="0" smtClean="0"/>
           </a:p>
           <a:p>
@@ -11661,7 +12168,7 @@
               <a:solidFill>
                 <a:srgbClr val="B70000"/>
               </a:solidFill>
-              <a:hlinkClick r:id="rId6"/>
+              <a:hlinkClick r:id="rId7"/>
             </a:endParaRPr>
           </a:p>
           <a:p>
@@ -11691,7 +12198,7 @@
           <a:p>
             <a:r>
               <a:rPr lang="en-US" smtClean="0"/>
-              <a:t>November FIXME, 2010</a:t>
+              <a:t>November 29th, 2010</a:t>
             </a:r>
             <a:endParaRPr lang="en-US" dirty="0"/>
           </a:p>
@@ -11765,7 +12272,7 @@
 </file>
 
 <file path=ppt/slides/slide4.xml><?xml version="1.0" encoding="utf-8"?>
-<p:sld xmlns:a="http://schemas.openxmlformats.org/drawingml/2006/main" xmlns:r="http://schemas.openxmlformats.org/officeDocument/2006/relationships" xmlns:mc="http://schemas.openxmlformats.org/markup-compatibility/2006" xmlns:mv="urn:schemas-microsoft-com:mac:vml" xmlns:p="http://schemas.openxmlformats.org/presentationml/2006/main" mc:Ignorable="mv" mc:PreserveAttributes="mv:*">
+<p:sld xmlns:a="http://schemas.openxmlformats.org/drawingml/2006/main" xmlns:r="http://schemas.openxmlformats.org/officeDocument/2006/relationships" xmlns:p="http://schemas.openxmlformats.org/presentationml/2006/main">
   <p:cSld>
     <p:spTree>
       <p:nvGrpSpPr>
@@ -11873,7 +12380,7 @@
           <a:p>
             <a:r>
               <a:rPr lang="en-US" smtClean="0"/>
-              <a:t>November FIXME, 2010</a:t>
+              <a:t>November 29th, 2010</a:t>
             </a:r>
             <a:endParaRPr lang="en-US" dirty="0"/>
           </a:p>
@@ -11929,7 +12436,7 @@
     </p:spTree>
     <p:extLst>
       <p:ext uri="{BB962C8B-B14F-4D97-AF65-F5344CB8AC3E}">
-        <p14:creationId xmlns:p14="http://schemas.microsoft.com/office/powerpoint/2010/main" xmlns:p="http://schemas.openxmlformats.org/presentationml/2006/main" xmlns:r="http://schemas.openxmlformats.org/officeDocument/2006/relationships" xmlns:a="http://schemas.openxmlformats.org/drawingml/2006/main" xmlns="" val="2448934113"/>
+        <p14:creationId xmlns:p14="http://schemas.microsoft.com/office/powerpoint/2010/main" val="2448934113"/>
       </p:ext>
     </p:extLst>
   </p:cSld>
@@ -11948,7 +12455,7 @@
 </file>
 
 <file path=ppt/slides/slide5.xml><?xml version="1.0" encoding="utf-8"?>
-<p:sld xmlns:a="http://schemas.openxmlformats.org/drawingml/2006/main" xmlns:r="http://schemas.openxmlformats.org/officeDocument/2006/relationships" xmlns:mc="http://schemas.openxmlformats.org/markup-compatibility/2006" xmlns:mv="urn:schemas-microsoft-com:mac:vml" xmlns:p="http://schemas.openxmlformats.org/presentationml/2006/main" mc:Ignorable="mv" mc:PreserveAttributes="mv:*">
+<p:sld xmlns:a="http://schemas.openxmlformats.org/drawingml/2006/main" xmlns:r="http://schemas.openxmlformats.org/officeDocument/2006/relationships" xmlns:p="http://schemas.openxmlformats.org/presentationml/2006/main">
   <p:cSld>
     <p:spTree>
       <p:nvGrpSpPr>
@@ -11979,7 +12486,11 @@
           <a:bodyPr/>
           <a:lstStyle/>
           <a:p>
-            <a:endParaRPr lang="en-US"/>
+            <a:r>
+              <a:rPr lang="en-US" dirty="0" smtClean="0"/>
+              <a:t>API Levels</a:t>
+            </a:r>
+            <a:endParaRPr lang="en-US" dirty="0"/>
           </a:p>
         </p:txBody>
       </p:sp>
@@ -11993,7 +12504,7 @@
             <p:ph idx="1"/>
             <p:extLst>
               <p:ext uri="{D42A27DB-BD31-4B8C-83A1-F6EECF244321}">
-                <p14:modId xmlns:p14="http://schemas.microsoft.com/office/powerpoint/2010/main" xmlns:p="http://schemas.openxmlformats.org/presentationml/2006/main" xmlns:r="http://schemas.openxmlformats.org/officeDocument/2006/relationships" xmlns:a="http://schemas.openxmlformats.org/drawingml/2006/main" xmlns="" val="3478891187"/>
+                <p14:modId xmlns:p14="http://schemas.microsoft.com/office/powerpoint/2010/main" val="3478891187"/>
               </p:ext>
             </p:extLst>
           </p:nvPr>
@@ -12864,7 +13375,7 @@
           <a:p>
             <a:r>
               <a:rPr lang="en-US" smtClean="0"/>
-              <a:t>November FIXME, 2010</a:t>
+              <a:t>November 29th, 2010</a:t>
             </a:r>
             <a:endParaRPr lang="en-US" dirty="0"/>
           </a:p>
@@ -12920,7 +13431,7 @@
     </p:spTree>
     <p:extLst>
       <p:ext uri="{BB962C8B-B14F-4D97-AF65-F5344CB8AC3E}">
-        <p14:creationId xmlns:p14="http://schemas.microsoft.com/office/powerpoint/2010/main" xmlns:p="http://schemas.openxmlformats.org/presentationml/2006/main" xmlns:r="http://schemas.openxmlformats.org/officeDocument/2006/relationships" xmlns:a="http://schemas.openxmlformats.org/drawingml/2006/main" xmlns="" val="4167202409"/>
+        <p14:creationId xmlns:p14="http://schemas.microsoft.com/office/powerpoint/2010/main" val="4167202409"/>
       </p:ext>
     </p:extLst>
   </p:cSld>
@@ -12938,7 +13449,7 @@
 </file>
 
 <file path=ppt/slides/slide6.xml><?xml version="1.0" encoding="utf-8"?>
-<p:sld xmlns:a="http://schemas.openxmlformats.org/drawingml/2006/main" xmlns:r="http://schemas.openxmlformats.org/officeDocument/2006/relationships" xmlns:mc="http://schemas.openxmlformats.org/markup-compatibility/2006" xmlns:mv="urn:schemas-microsoft-com:mac:vml" xmlns:p="http://schemas.openxmlformats.org/presentationml/2006/main" mc:Ignorable="mv" mc:PreserveAttributes="mv:*">
+<p:sld xmlns:a="http://schemas.openxmlformats.org/drawingml/2006/main" xmlns:r="http://schemas.openxmlformats.org/officeDocument/2006/relationships" xmlns:p="http://schemas.openxmlformats.org/presentationml/2006/main">
   <p:cSld>
     <p:spTree>
       <p:nvGrpSpPr>
@@ -13131,7 +13642,7 @@
           <a:p>
             <a:r>
               <a:rPr lang="en-US" smtClean="0"/>
-              <a:t>November FIXME, 2010</a:t>
+              <a:t>November 29th, 2010</a:t>
             </a:r>
             <a:endParaRPr lang="en-US" dirty="0"/>
           </a:p>
@@ -13201,7 +13712,7 @@
 </file>
 
 <file path=ppt/slides/slide7.xml><?xml version="1.0" encoding="utf-8"?>
-<p:sld xmlns:a="http://schemas.openxmlformats.org/drawingml/2006/main" xmlns:r="http://schemas.openxmlformats.org/officeDocument/2006/relationships" xmlns:mc="http://schemas.openxmlformats.org/markup-compatibility/2006" xmlns:mv="urn:schemas-microsoft-com:mac:vml" xmlns:p="http://schemas.openxmlformats.org/presentationml/2006/main" mc:Ignorable="mv" mc:PreserveAttributes="mv:*">
+<p:sld xmlns:a="http://schemas.openxmlformats.org/drawingml/2006/main" xmlns:r="http://schemas.openxmlformats.org/officeDocument/2006/relationships" xmlns:p="http://schemas.openxmlformats.org/presentationml/2006/main">
   <p:cSld>
     <p:spTree>
       <p:nvGrpSpPr>
@@ -13334,7 +13845,7 @@
           <a:p>
             <a:r>
               <a:rPr lang="en-US" smtClean="0"/>
-              <a:t>November FIXME, 2010</a:t>
+              <a:t>November 29th, 2010</a:t>
             </a:r>
             <a:endParaRPr lang="en-US" dirty="0"/>
           </a:p>
@@ -13404,7 +13915,7 @@
 </file>
 
 <file path=ppt/slides/slide8.xml><?xml version="1.0" encoding="utf-8"?>
-<p:sld xmlns:a="http://schemas.openxmlformats.org/drawingml/2006/main" xmlns:r="http://schemas.openxmlformats.org/officeDocument/2006/relationships" xmlns:mc="http://schemas.openxmlformats.org/markup-compatibility/2006" xmlns:mv="urn:schemas-microsoft-com:mac:vml" xmlns:p="http://schemas.openxmlformats.org/presentationml/2006/main" mc:Ignorable="mv" mc:PreserveAttributes="mv:*">
+<p:sld xmlns:a="http://schemas.openxmlformats.org/drawingml/2006/main" xmlns:r="http://schemas.openxmlformats.org/officeDocument/2006/relationships" xmlns:p="http://schemas.openxmlformats.org/presentationml/2006/main">
   <p:cSld>
     <p:spTree>
       <p:nvGrpSpPr>
@@ -13511,7 +14022,7 @@
           <a:p>
             <a:r>
               <a:rPr lang="en-US" smtClean="0"/>
-              <a:t>November FIXME, 2010</a:t>
+              <a:t>November 29th, 2010</a:t>
             </a:r>
             <a:endParaRPr lang="en-US" dirty="0"/>
           </a:p>
@@ -13573,7 +14084,7 @@
           <p:nvPr>
             <p:extLst>
               <p:ext uri="{D42A27DB-BD31-4B8C-83A1-F6EECF244321}">
-                <p14:modId xmlns:p14="http://schemas.microsoft.com/office/powerpoint/2010/main" xmlns:p="http://schemas.openxmlformats.org/presentationml/2006/main" xmlns:r="http://schemas.openxmlformats.org/officeDocument/2006/relationships" xmlns:a="http://schemas.openxmlformats.org/drawingml/2006/main" xmlns="" val="3768818699"/>
+                <p14:modId xmlns:p14="http://schemas.microsoft.com/office/powerpoint/2010/main" val="3768818699"/>
               </p:ext>
             </p:extLst>
           </p:nvPr>
@@ -13880,7 +14391,7 @@
 </file>
 
 <file path=ppt/slides/slide9.xml><?xml version="1.0" encoding="utf-8"?>
-<p:sld xmlns:a="http://schemas.openxmlformats.org/drawingml/2006/main" xmlns:r="http://schemas.openxmlformats.org/officeDocument/2006/relationships" xmlns:mc="http://schemas.openxmlformats.org/markup-compatibility/2006" xmlns:mv="urn:schemas-microsoft-com:mac:vml" xmlns:p="http://schemas.openxmlformats.org/presentationml/2006/main" mc:Ignorable="mv" mc:PreserveAttributes="mv:*">
+<p:sld xmlns:a="http://schemas.openxmlformats.org/drawingml/2006/main" xmlns:r="http://schemas.openxmlformats.org/officeDocument/2006/relationships" xmlns:p="http://schemas.openxmlformats.org/presentationml/2006/main">
   <p:cSld>
     <p:spTree>
       <p:nvGrpSpPr>
@@ -13987,7 +14498,7 @@
           <a:p>
             <a:r>
               <a:rPr lang="en-US" smtClean="0"/>
-              <a:t>November FIXME, 2010</a:t>
+              <a:t>November 29th, 2010</a:t>
             </a:r>
             <a:endParaRPr lang="en-US" dirty="0"/>
           </a:p>
@@ -14049,7 +14560,7 @@
           <p:nvPr>
             <p:extLst>
               <p:ext uri="{D42A27DB-BD31-4B8C-83A1-F6EECF244321}">
-                <p14:modId xmlns:p14="http://schemas.microsoft.com/office/powerpoint/2010/main" xmlns:p="http://schemas.openxmlformats.org/presentationml/2006/main" xmlns:r="http://schemas.openxmlformats.org/officeDocument/2006/relationships" xmlns:a="http://schemas.openxmlformats.org/drawingml/2006/main" xmlns="" val="1142005977"/>
+                <p14:modId xmlns:p14="http://schemas.microsoft.com/office/powerpoint/2010/main" val="1142005977"/>
               </p:ext>
             </p:extLst>
           </p:nvPr>

</xml_diff>

<commit_message>
changed hartmut's title slide template
git-svn-id: file://localhost/tmp/svn2git/svn@3263 defb5e50-622e-49ec-a68e-d72c7db87b45
</commit_message>
<xml_diff>
--- a/tutorial/general_tutorial/SAGA-API-levels.pptx
+++ b/tutorial/general_tutorial/SAGA-API-levels.pptx
@@ -1,6 +1,6 @@
 
 <file path=ppt/presentation.xml><?xml version="1.0" encoding="utf-8"?>
-<p:presentation xmlns:a="http://schemas.openxmlformats.org/drawingml/2006/main" xmlns:r="http://schemas.openxmlformats.org/officeDocument/2006/relationships" xmlns:p="http://schemas.openxmlformats.org/presentationml/2006/main" showSpecialPlsOnTitleSld="0" strictFirstAndLastChars="0" saveSubsetFonts="1">
+<p:presentation xmlns:a="http://schemas.openxmlformats.org/drawingml/2006/main" xmlns:r="http://schemas.openxmlformats.org/officeDocument/2006/relationships" xmlns:mc="http://schemas.openxmlformats.org/markup-compatibility/2006" xmlns:mv="urn:schemas-microsoft-com:mac:vml" xmlns:p="http://schemas.openxmlformats.org/presentationml/2006/main" mc:Ignorable="mv" mc:PreserveAttributes="mv:*" showSpecialPlsOnTitleSld="0" strictFirstAndLastChars="0" saveSubsetFonts="1">
   <p:sldMasterIdLst>
     <p:sldMasterId id="2147483701" r:id="rId1"/>
   </p:sldMasterIdLst>
@@ -8,7 +8,7 @@
     <p:notesMasterId r:id="rId29"/>
   </p:notesMasterIdLst>
   <p:sldIdLst>
-    <p:sldId id="259" r:id="rId2"/>
+    <p:sldId id="320" r:id="rId2"/>
     <p:sldId id="308" r:id="rId3"/>
     <p:sldId id="258" r:id="rId4"/>
     <p:sldId id="312" r:id="rId5"/>
@@ -49,7 +49,7 @@
       <a:spcAft>
         <a:spcPct val="0"/>
       </a:spcAft>
-      <a:defRPr sz="4200" kern="1200">
+      <a:defRPr sz="4300" kern="1200">
         <a:solidFill>
           <a:srgbClr val="414141"/>
         </a:solidFill>
@@ -59,14 +59,14 @@
         <a:sym typeface="Gill Sans Light" charset="0"/>
       </a:defRPr>
     </a:lvl1pPr>
-    <a:lvl2pPr marL="457200" algn="ctr" rtl="0" fontAlgn="base">
+    <a:lvl2pPr marL="457176" algn="ctr" rtl="0" fontAlgn="base">
       <a:spcBef>
         <a:spcPct val="0"/>
       </a:spcBef>
       <a:spcAft>
         <a:spcPct val="0"/>
       </a:spcAft>
-      <a:defRPr sz="4200" kern="1200">
+      <a:defRPr sz="4300" kern="1200">
         <a:solidFill>
           <a:srgbClr val="414141"/>
         </a:solidFill>
@@ -76,14 +76,14 @@
         <a:sym typeface="Gill Sans Light" charset="0"/>
       </a:defRPr>
     </a:lvl2pPr>
-    <a:lvl3pPr marL="914400" algn="ctr" rtl="0" fontAlgn="base">
+    <a:lvl3pPr marL="914354" algn="ctr" rtl="0" fontAlgn="base">
       <a:spcBef>
         <a:spcPct val="0"/>
       </a:spcBef>
       <a:spcAft>
         <a:spcPct val="0"/>
       </a:spcAft>
-      <a:defRPr sz="4200" kern="1200">
+      <a:defRPr sz="4300" kern="1200">
         <a:solidFill>
           <a:srgbClr val="414141"/>
         </a:solidFill>
@@ -93,14 +93,14 @@
         <a:sym typeface="Gill Sans Light" charset="0"/>
       </a:defRPr>
     </a:lvl3pPr>
-    <a:lvl4pPr marL="1371600" algn="ctr" rtl="0" fontAlgn="base">
+    <a:lvl4pPr marL="1371530" algn="ctr" rtl="0" fontAlgn="base">
       <a:spcBef>
         <a:spcPct val="0"/>
       </a:spcBef>
       <a:spcAft>
         <a:spcPct val="0"/>
       </a:spcAft>
-      <a:defRPr sz="4200" kern="1200">
+      <a:defRPr sz="4300" kern="1200">
         <a:solidFill>
           <a:srgbClr val="414141"/>
         </a:solidFill>
@@ -110,14 +110,14 @@
         <a:sym typeface="Gill Sans Light" charset="0"/>
       </a:defRPr>
     </a:lvl4pPr>
-    <a:lvl5pPr marL="1828800" algn="ctr" rtl="0" fontAlgn="base">
+    <a:lvl5pPr marL="1828706" algn="ctr" rtl="0" fontAlgn="base">
       <a:spcBef>
         <a:spcPct val="0"/>
       </a:spcBef>
       <a:spcAft>
         <a:spcPct val="0"/>
       </a:spcAft>
-      <a:defRPr sz="4200" kern="1200">
+      <a:defRPr sz="4300" kern="1200">
         <a:solidFill>
           <a:srgbClr val="414141"/>
         </a:solidFill>
@@ -127,8 +127,8 @@
         <a:sym typeface="Gill Sans Light" charset="0"/>
       </a:defRPr>
     </a:lvl5pPr>
-    <a:lvl6pPr marL="2286000" algn="l" defTabSz="914400" rtl="0" eaLnBrk="1" latinLnBrk="0" hangingPunct="1">
-      <a:defRPr sz="4200" kern="1200">
+    <a:lvl6pPr marL="2285884" algn="l" defTabSz="914354" rtl="0" eaLnBrk="1" latinLnBrk="0" hangingPunct="1">
+      <a:defRPr sz="4300" kern="1200">
         <a:solidFill>
           <a:srgbClr val="414141"/>
         </a:solidFill>
@@ -138,8 +138,8 @@
         <a:sym typeface="Gill Sans Light" charset="0"/>
       </a:defRPr>
     </a:lvl6pPr>
-    <a:lvl7pPr marL="2743200" algn="l" defTabSz="914400" rtl="0" eaLnBrk="1" latinLnBrk="0" hangingPunct="1">
-      <a:defRPr sz="4200" kern="1200">
+    <a:lvl7pPr marL="2743060" algn="l" defTabSz="914354" rtl="0" eaLnBrk="1" latinLnBrk="0" hangingPunct="1">
+      <a:defRPr sz="4300" kern="1200">
         <a:solidFill>
           <a:srgbClr val="414141"/>
         </a:solidFill>
@@ -149,8 +149,8 @@
         <a:sym typeface="Gill Sans Light" charset="0"/>
       </a:defRPr>
     </a:lvl7pPr>
-    <a:lvl8pPr marL="3200400" algn="l" defTabSz="914400" rtl="0" eaLnBrk="1" latinLnBrk="0" hangingPunct="1">
-      <a:defRPr sz="4200" kern="1200">
+    <a:lvl8pPr marL="3200236" algn="l" defTabSz="914354" rtl="0" eaLnBrk="1" latinLnBrk="0" hangingPunct="1">
+      <a:defRPr sz="4300" kern="1200">
         <a:solidFill>
           <a:srgbClr val="414141"/>
         </a:solidFill>
@@ -160,8 +160,8 @@
         <a:sym typeface="Gill Sans Light" charset="0"/>
       </a:defRPr>
     </a:lvl8pPr>
-    <a:lvl9pPr marL="3657600" algn="l" defTabSz="914400" rtl="0" eaLnBrk="1" latinLnBrk="0" hangingPunct="1">
-      <a:defRPr sz="4200" kern="1200">
+    <a:lvl9pPr marL="3657413" algn="l" defTabSz="914354" rtl="0" eaLnBrk="1" latinLnBrk="0" hangingPunct="1">
+      <a:defRPr sz="4300" kern="1200">
         <a:solidFill>
           <a:srgbClr val="414141"/>
         </a:solidFill>
@@ -176,7 +176,7 @@
 </file>
 
 <file path=ppt/notesMasters/notesMaster1.xml><?xml version="1.0" encoding="utf-8"?>
-<p:notesMaster xmlns:a="http://schemas.openxmlformats.org/drawingml/2006/main" xmlns:r="http://schemas.openxmlformats.org/officeDocument/2006/relationships" xmlns:p="http://schemas.openxmlformats.org/presentationml/2006/main">
+<p:notesMaster xmlns:a="http://schemas.openxmlformats.org/drawingml/2006/main" xmlns:r="http://schemas.openxmlformats.org/officeDocument/2006/relationships" xmlns:mc="http://schemas.openxmlformats.org/markup-compatibility/2006" xmlns:mv="urn:schemas-microsoft-com:mac:vml" xmlns:p="http://schemas.openxmlformats.org/presentationml/2006/main" mc:Ignorable="mv" mc:PreserveAttributes="mv:*">
   <p:cSld>
     <p:bg>
       <p:bgRef idx="1001">
@@ -258,7 +258,7 @@
             <a:fld id="{FD89E5DE-5FFC-4DBE-9A7F-2C9F568D0D45}" type="datetimeFigureOut">
               <a:rPr lang="en-US" smtClean="0"/>
               <a:pPr/>
-              <a:t>11/28/2010</a:t>
+              <a:t>11/28/10</a:t>
             </a:fld>
             <a:endParaRPr lang="en-US"/>
           </a:p>
@@ -429,14 +429,14 @@
     </p:spTree>
     <p:extLst>
       <p:ext uri="{BB962C8B-B14F-4D97-AF65-F5344CB8AC3E}">
-        <p14:creationId xmlns:p14="http://schemas.microsoft.com/office/powerpoint/2010/main" val="2265826956"/>
+        <p14:creationId xmlns:p14="http://schemas.microsoft.com/office/powerpoint/2010/main" xmlns:p="http://schemas.openxmlformats.org/presentationml/2006/main" xmlns:r="http://schemas.openxmlformats.org/officeDocument/2006/relationships" xmlns:a="http://schemas.openxmlformats.org/drawingml/2006/main" xmlns="" val="2265826956"/>
       </p:ext>
     </p:extLst>
   </p:cSld>
   <p:clrMap bg1="lt1" tx1="dk1" bg2="lt2" tx2="dk2" accent1="accent1" accent2="accent2" accent3="accent3" accent4="accent4" accent5="accent5" accent6="accent6" hlink="hlink" folHlink="folHlink"/>
   <p:notesStyle>
-    <a:lvl1pPr marL="0" algn="l" defTabSz="914400" rtl="0" eaLnBrk="1" latinLnBrk="0" hangingPunct="1">
-      <a:defRPr sz="1200" kern="1200">
+    <a:lvl1pPr marL="0" algn="l" defTabSz="914354" rtl="0" eaLnBrk="1" latinLnBrk="0" hangingPunct="1">
+      <a:defRPr sz="1100" kern="1200">
         <a:solidFill>
           <a:schemeClr val="tx1"/>
         </a:solidFill>
@@ -445,8 +445,8 @@
         <a:cs typeface="+mn-cs"/>
       </a:defRPr>
     </a:lvl1pPr>
-    <a:lvl2pPr marL="457200" algn="l" defTabSz="914400" rtl="0" eaLnBrk="1" latinLnBrk="0" hangingPunct="1">
-      <a:defRPr sz="1200" kern="1200">
+    <a:lvl2pPr marL="457176" algn="l" defTabSz="914354" rtl="0" eaLnBrk="1" latinLnBrk="0" hangingPunct="1">
+      <a:defRPr sz="1100" kern="1200">
         <a:solidFill>
           <a:schemeClr val="tx1"/>
         </a:solidFill>
@@ -455,8 +455,8 @@
         <a:cs typeface="+mn-cs"/>
       </a:defRPr>
     </a:lvl2pPr>
-    <a:lvl3pPr marL="914400" algn="l" defTabSz="914400" rtl="0" eaLnBrk="1" latinLnBrk="0" hangingPunct="1">
-      <a:defRPr sz="1200" kern="1200">
+    <a:lvl3pPr marL="914354" algn="l" defTabSz="914354" rtl="0" eaLnBrk="1" latinLnBrk="0" hangingPunct="1">
+      <a:defRPr sz="1100" kern="1200">
         <a:solidFill>
           <a:schemeClr val="tx1"/>
         </a:solidFill>
@@ -465,8 +465,8 @@
         <a:cs typeface="+mn-cs"/>
       </a:defRPr>
     </a:lvl3pPr>
-    <a:lvl4pPr marL="1371600" algn="l" defTabSz="914400" rtl="0" eaLnBrk="1" latinLnBrk="0" hangingPunct="1">
-      <a:defRPr sz="1200" kern="1200">
+    <a:lvl4pPr marL="1371530" algn="l" defTabSz="914354" rtl="0" eaLnBrk="1" latinLnBrk="0" hangingPunct="1">
+      <a:defRPr sz="1100" kern="1200">
         <a:solidFill>
           <a:schemeClr val="tx1"/>
         </a:solidFill>
@@ -475,8 +475,8 @@
         <a:cs typeface="+mn-cs"/>
       </a:defRPr>
     </a:lvl4pPr>
-    <a:lvl5pPr marL="1828800" algn="l" defTabSz="914400" rtl="0" eaLnBrk="1" latinLnBrk="0" hangingPunct="1">
-      <a:defRPr sz="1200" kern="1200">
+    <a:lvl5pPr marL="1828706" algn="l" defTabSz="914354" rtl="0" eaLnBrk="1" latinLnBrk="0" hangingPunct="1">
+      <a:defRPr sz="1100" kern="1200">
         <a:solidFill>
           <a:schemeClr val="tx1"/>
         </a:solidFill>
@@ -485,8 +485,8 @@
         <a:cs typeface="+mn-cs"/>
       </a:defRPr>
     </a:lvl5pPr>
-    <a:lvl6pPr marL="2286000" algn="l" defTabSz="914400" rtl="0" eaLnBrk="1" latinLnBrk="0" hangingPunct="1">
-      <a:defRPr sz="1200" kern="1200">
+    <a:lvl6pPr marL="2285884" algn="l" defTabSz="914354" rtl="0" eaLnBrk="1" latinLnBrk="0" hangingPunct="1">
+      <a:defRPr sz="1100" kern="1200">
         <a:solidFill>
           <a:schemeClr val="tx1"/>
         </a:solidFill>
@@ -495,8 +495,8 @@
         <a:cs typeface="+mn-cs"/>
       </a:defRPr>
     </a:lvl6pPr>
-    <a:lvl7pPr marL="2743200" algn="l" defTabSz="914400" rtl="0" eaLnBrk="1" latinLnBrk="0" hangingPunct="1">
-      <a:defRPr sz="1200" kern="1200">
+    <a:lvl7pPr marL="2743060" algn="l" defTabSz="914354" rtl="0" eaLnBrk="1" latinLnBrk="0" hangingPunct="1">
+      <a:defRPr sz="1100" kern="1200">
         <a:solidFill>
           <a:schemeClr val="tx1"/>
         </a:solidFill>
@@ -505,8 +505,8 @@
         <a:cs typeface="+mn-cs"/>
       </a:defRPr>
     </a:lvl7pPr>
-    <a:lvl8pPr marL="3200400" algn="l" defTabSz="914400" rtl="0" eaLnBrk="1" latinLnBrk="0" hangingPunct="1">
-      <a:defRPr sz="1200" kern="1200">
+    <a:lvl8pPr marL="3200236" algn="l" defTabSz="914354" rtl="0" eaLnBrk="1" latinLnBrk="0" hangingPunct="1">
+      <a:defRPr sz="1100" kern="1200">
         <a:solidFill>
           <a:schemeClr val="tx1"/>
         </a:solidFill>
@@ -515,8 +515,8 @@
         <a:cs typeface="+mn-cs"/>
       </a:defRPr>
     </a:lvl8pPr>
-    <a:lvl9pPr marL="3657600" algn="l" defTabSz="914400" rtl="0" eaLnBrk="1" latinLnBrk="0" hangingPunct="1">
-      <a:defRPr sz="1200" kern="1200">
+    <a:lvl9pPr marL="3657413" algn="l" defTabSz="914354" rtl="0" eaLnBrk="1" latinLnBrk="0" hangingPunct="1">
+      <a:defRPr sz="1100" kern="1200">
         <a:solidFill>
           <a:schemeClr val="tx1"/>
         </a:solidFill>
@@ -530,7 +530,7 @@
 </file>
 
 <file path=ppt/notesSlides/notesSlide1.xml><?xml version="1.0" encoding="utf-8"?>
-<p:notes xmlns:a="http://schemas.openxmlformats.org/drawingml/2006/main" xmlns:r="http://schemas.openxmlformats.org/officeDocument/2006/relationships" xmlns:p="http://schemas.openxmlformats.org/presentationml/2006/main">
+<p:notes xmlns:a="http://schemas.openxmlformats.org/drawingml/2006/main" xmlns:r="http://schemas.openxmlformats.org/officeDocument/2006/relationships" xmlns:mc="http://schemas.openxmlformats.org/markup-compatibility/2006" xmlns:mv="urn:schemas-microsoft-com:mac:vml" xmlns:p="http://schemas.openxmlformats.org/presentationml/2006/main" mc:Ignorable="mv" mc:PreserveAttributes="mv:*">
   <p:cSld>
     <p:spTree>
       <p:nvGrpSpPr>
@@ -594,6 +594,88 @@
           <a:bodyPr/>
           <a:lstStyle/>
           <a:p>
+            <a:fld id="{EE41C05A-BBAC-0741-9B8E-1278839E95FE}" type="slidenum">
+              <a:rPr lang="en-US" smtClean="0"/>
+              <a:pPr/>
+              <a:t>1</a:t>
+            </a:fld>
+            <a:endParaRPr lang="en-US"/>
+          </a:p>
+        </p:txBody>
+      </p:sp>
+    </p:spTree>
+  </p:cSld>
+  <p:clrMapOvr>
+    <a:masterClrMapping/>
+  </p:clrMapOvr>
+</p:notes>
+</file>
+
+<file path=ppt/notesSlides/notesSlide2.xml><?xml version="1.0" encoding="utf-8"?>
+<p:notes xmlns:a="http://schemas.openxmlformats.org/drawingml/2006/main" xmlns:r="http://schemas.openxmlformats.org/officeDocument/2006/relationships" xmlns:mc="http://schemas.openxmlformats.org/markup-compatibility/2006" xmlns:mv="urn:schemas-microsoft-com:mac:vml" xmlns:p="http://schemas.openxmlformats.org/presentationml/2006/main" mc:Ignorable="mv" mc:PreserveAttributes="mv:*">
+  <p:cSld>
+    <p:spTree>
+      <p:nvGrpSpPr>
+        <p:cNvPr id="1" name=""/>
+        <p:cNvGrpSpPr/>
+        <p:nvPr/>
+      </p:nvGrpSpPr>
+      <p:grpSpPr>
+        <a:xfrm>
+          <a:off x="0" y="0"/>
+          <a:ext cx="0" cy="0"/>
+          <a:chOff x="0" y="0"/>
+          <a:chExt cx="0" cy="0"/>
+        </a:xfrm>
+      </p:grpSpPr>
+      <p:sp>
+        <p:nvSpPr>
+          <p:cNvPr id="2" name="Slide Image Placeholder 1"/>
+          <p:cNvSpPr>
+            <a:spLocks noGrp="1" noRot="1" noChangeAspect="1"/>
+          </p:cNvSpPr>
+          <p:nvPr>
+            <p:ph type="sldImg"/>
+          </p:nvPr>
+        </p:nvSpPr>
+        <p:spPr/>
+      </p:sp>
+      <p:sp>
+        <p:nvSpPr>
+          <p:cNvPr id="3" name="Notes Placeholder 2"/>
+          <p:cNvSpPr>
+            <a:spLocks noGrp="1"/>
+          </p:cNvSpPr>
+          <p:nvPr>
+            <p:ph type="body" idx="1"/>
+          </p:nvPr>
+        </p:nvSpPr>
+        <p:spPr/>
+        <p:txBody>
+          <a:bodyPr>
+            <a:normAutofit/>
+          </a:bodyPr>
+          <a:lstStyle/>
+          <a:p>
+            <a:endParaRPr lang="en-US" dirty="0"/>
+          </a:p>
+        </p:txBody>
+      </p:sp>
+      <p:sp>
+        <p:nvSpPr>
+          <p:cNvPr id="4" name="Slide Number Placeholder 3"/>
+          <p:cNvSpPr>
+            <a:spLocks noGrp="1"/>
+          </p:cNvSpPr>
+          <p:nvPr>
+            <p:ph type="sldNum" sz="quarter" idx="10"/>
+          </p:nvPr>
+        </p:nvSpPr>
+        <p:spPr/>
+        <p:txBody>
+          <a:bodyPr/>
+          <a:lstStyle/>
+          <a:p>
             <a:fld id="{2415D97C-649C-43F9-ADD9-F4FB9523026C}" type="slidenum">
               <a:rPr lang="en-US" smtClean="0"/>
               <a:pPr/>
@@ -612,7 +694,7 @@
 </file>
 
 <file path=ppt/slideLayouts/slideLayout1.xml><?xml version="1.0" encoding="utf-8"?>
-<p:sldLayout xmlns:a="http://schemas.openxmlformats.org/drawingml/2006/main" xmlns:r="http://schemas.openxmlformats.org/officeDocument/2006/relationships" xmlns:p="http://schemas.openxmlformats.org/presentationml/2006/main" preserve="1">
+<p:sldLayout xmlns:a="http://schemas.openxmlformats.org/drawingml/2006/main" xmlns:r="http://schemas.openxmlformats.org/officeDocument/2006/relationships" xmlns:mc="http://schemas.openxmlformats.org/markup-compatibility/2006" xmlns:mv="urn:schemas-microsoft-com:mac:vml" xmlns:p="http://schemas.openxmlformats.org/presentationml/2006/main" mc:Ignorable="mv" mc:PreserveAttributes="mv:*" preserve="1">
   <p:cSld name="Title Slide">
     <p:spTree>
       <p:nvGrpSpPr>
@@ -645,7 +727,7 @@
         </p:blipFill>
         <p:spPr bwMode="auto">
           <a:xfrm>
-            <a:off x="10141321" y="811223"/>
+            <a:off x="10141323" y="811225"/>
             <a:ext cx="2338743" cy="1833283"/>
           </a:xfrm>
           <a:prstGeom prst="rect">
@@ -668,7 +750,7 @@
         </p:nvSpPr>
         <p:spPr>
           <a:xfrm>
-            <a:off x="1" y="3068187"/>
+            <a:off x="2" y="3068187"/>
             <a:ext cx="12690496" cy="1247622"/>
           </a:xfrm>
           <a:prstGeom prst="rect">
@@ -702,7 +784,7 @@
           </a:fontRef>
         </p:style>
         <p:txBody>
-          <a:bodyPr lIns="130046" tIns="65023" rIns="130046" bIns="65023" rtlCol="0" anchor="ctr"/>
+          <a:bodyPr lIns="130039" tIns="65020" rIns="130039" bIns="65020" rtlCol="0" anchor="ctr"/>
           <a:lstStyle/>
           <a:p>
             <a:pPr algn="ctr"/>
@@ -754,7 +836,7 @@
           </a:solidFill>
         </p:spPr>
         <p:txBody>
-          <a:bodyPr lIns="390138" tIns="130046" bIns="130046" anchor="t" anchorCtr="0">
+          <a:bodyPr lIns="390118" tIns="130039" bIns="130039" anchor="t" anchorCtr="0">
             <a:noAutofit/>
           </a:bodyPr>
           <a:lstStyle>
@@ -787,7 +869,7 @@
         </p:nvSpPr>
         <p:spPr>
           <a:xfrm>
-            <a:off x="9358356" y="9234312"/>
+            <a:off x="9358356" y="9234313"/>
             <a:ext cx="3034453" cy="519289"/>
           </a:xfrm>
         </p:spPr>
@@ -815,7 +897,7 @@
         </p:nvSpPr>
         <p:spPr>
           <a:xfrm>
-            <a:off x="1593725" y="9234312"/>
+            <a:off x="1593725" y="9234313"/>
             <a:ext cx="4118187" cy="519289"/>
           </a:xfrm>
         </p:spPr>
@@ -840,7 +922,7 @@
 </file>
 
 <file path=ppt/slideLayouts/slideLayout10.xml><?xml version="1.0" encoding="utf-8"?>
-<p:sldLayout xmlns:a="http://schemas.openxmlformats.org/drawingml/2006/main" xmlns:r="http://schemas.openxmlformats.org/officeDocument/2006/relationships" xmlns:p="http://schemas.openxmlformats.org/presentationml/2006/main" type="picTx" preserve="1">
+<p:sldLayout xmlns:a="http://schemas.openxmlformats.org/drawingml/2006/main" xmlns:r="http://schemas.openxmlformats.org/officeDocument/2006/relationships" xmlns:mc="http://schemas.openxmlformats.org/markup-compatibility/2006" xmlns:mv="urn:schemas-microsoft-com:mac:vml" xmlns:p="http://schemas.openxmlformats.org/presentationml/2006/main" mc:Ignorable="mv" mc:PreserveAttributes="mv:*" type="picTx" preserve="1">
   <p:cSld name="Picture with Caption">
     <p:spTree>
       <p:nvGrpSpPr>
@@ -876,11 +958,11 @@
           </a:solidFill>
         </p:spPr>
         <p:txBody>
-          <a:bodyPr vert="horz" lIns="1690598" tIns="65023" rIns="390138" bIns="65023" rtlCol="0" anchor="ctr">
+          <a:bodyPr vert="horz" lIns="1690511" tIns="65020" rIns="390118" bIns="65020" rtlCol="0" anchor="ctr">
             <a:normAutofit/>
           </a:bodyPr>
           <a:lstStyle>
-            <a:lvl1pPr marL="0" indent="0" algn="l" defTabSz="1300460" rtl="0" eaLnBrk="1" latinLnBrk="0" hangingPunct="1">
+            <a:lvl1pPr marL="0" indent="0" algn="l" defTabSz="1300393" rtl="0" eaLnBrk="1" latinLnBrk="0" hangingPunct="1">
               <a:spcBef>
                 <a:spcPct val="0"/>
               </a:spcBef>
@@ -916,7 +998,7 @@
         </p:nvSpPr>
         <p:spPr>
           <a:xfrm>
-            <a:off x="7805138" y="2913075"/>
+            <a:off x="7805139" y="2913075"/>
             <a:ext cx="4874543" cy="5982208"/>
           </a:xfrm>
         </p:spPr>
@@ -929,35 +1011,35 @@
               <a:buNone/>
               <a:defRPr sz="3400"/>
             </a:lvl1pPr>
-            <a:lvl2pPr marL="650230" indent="0">
+            <a:lvl2pPr marL="650197" indent="0">
               <a:buNone/>
               <a:defRPr sz="4000"/>
             </a:lvl2pPr>
-            <a:lvl3pPr marL="1300460" indent="0">
+            <a:lvl3pPr marL="1300393" indent="0">
               <a:buNone/>
               <a:defRPr sz="3400"/>
             </a:lvl3pPr>
-            <a:lvl4pPr marL="1950690" indent="0">
+            <a:lvl4pPr marL="1950590" indent="0">
               <a:buNone/>
               <a:defRPr sz="2800"/>
             </a:lvl4pPr>
-            <a:lvl5pPr marL="2600919" indent="0">
+            <a:lvl5pPr marL="2600786" indent="0">
               <a:buNone/>
               <a:defRPr sz="2800"/>
             </a:lvl5pPr>
-            <a:lvl6pPr marL="3251149" indent="0">
+            <a:lvl6pPr marL="3250983" indent="0">
               <a:buNone/>
               <a:defRPr sz="2800"/>
             </a:lvl6pPr>
-            <a:lvl7pPr marL="3901379" indent="0">
+            <a:lvl7pPr marL="3901180" indent="0">
               <a:buNone/>
               <a:defRPr sz="2800"/>
             </a:lvl7pPr>
-            <a:lvl8pPr marL="4551609" indent="0">
+            <a:lvl8pPr marL="4551376" indent="0">
               <a:buNone/>
               <a:defRPr sz="2800"/>
             </a:lvl8pPr>
-            <a:lvl9pPr marL="5201839" indent="0">
+            <a:lvl9pPr marL="5201573" indent="0">
               <a:buNone/>
               <a:defRPr sz="2800"/>
             </a:lvl9pPr>
@@ -1013,7 +1095,7 @@
           </a:fontRef>
         </p:style>
         <p:txBody>
-          <a:bodyPr vert="horz" lIns="416147" tIns="390138" rIns="390138" bIns="390138" rtlCol="0" anchor="t" anchorCtr="0">
+          <a:bodyPr vert="horz" lIns="416126" tIns="390118" rIns="390118" bIns="390118" rtlCol="0" anchor="t" anchorCtr="0">
             <a:normAutofit/>
           </a:bodyPr>
           <a:lstStyle>
@@ -1031,41 +1113,41 @@
                 <a:cs typeface="+mn-cs"/>
               </a:defRPr>
             </a:lvl1pPr>
-            <a:lvl2pPr marL="650230" indent="0">
+            <a:lvl2pPr marL="650197" indent="0">
               <a:buNone/>
               <a:defRPr sz="1700"/>
             </a:lvl2pPr>
-            <a:lvl3pPr marL="1300460" indent="0">
+            <a:lvl3pPr marL="1300393" indent="0">
               <a:buNone/>
               <a:defRPr sz="1400"/>
             </a:lvl3pPr>
-            <a:lvl4pPr marL="1950690" indent="0">
+            <a:lvl4pPr marL="1950590" indent="0">
               <a:buNone/>
               <a:defRPr sz="1300"/>
             </a:lvl4pPr>
-            <a:lvl5pPr marL="2600919" indent="0">
+            <a:lvl5pPr marL="2600786" indent="0">
               <a:buNone/>
               <a:defRPr sz="1300"/>
             </a:lvl5pPr>
-            <a:lvl6pPr marL="3251149" indent="0">
+            <a:lvl6pPr marL="3250983" indent="0">
               <a:buNone/>
               <a:defRPr sz="1300"/>
             </a:lvl6pPr>
-            <a:lvl7pPr marL="3901379" indent="0">
+            <a:lvl7pPr marL="3901180" indent="0">
               <a:buNone/>
               <a:defRPr sz="1300"/>
             </a:lvl7pPr>
-            <a:lvl8pPr marL="4551609" indent="0">
+            <a:lvl8pPr marL="4551376" indent="0">
               <a:buNone/>
               <a:defRPr sz="1300"/>
             </a:lvl8pPr>
-            <a:lvl9pPr marL="5201839" indent="0">
+            <a:lvl9pPr marL="5201573" indent="0">
               <a:buNone/>
               <a:defRPr sz="1300"/>
             </a:lvl9pPr>
           </a:lstStyle>
           <a:p>
-            <a:pPr marL="0" lvl="0" indent="0" algn="l" defTabSz="1300460" rtl="0" eaLnBrk="1" latinLnBrk="0" hangingPunct="1">
+            <a:pPr marL="0" lvl="0" indent="0" algn="l" defTabSz="1300393" rtl="0" eaLnBrk="1" latinLnBrk="0" hangingPunct="1">
               <a:spcBef>
                 <a:spcPts val="2844"/>
               </a:spcBef>
@@ -1076,7 +1158,7 @@
               <a:buNone/>
             </a:pPr>
             <a:r>
-              <a:rPr lang="en-US" smtClean="0"/>
+              <a:rPr lang="en-US" dirty="0" smtClean="0"/>
               <a:t>Click to edit Master text styles</a:t>
             </a:r>
           </a:p>
@@ -1094,7 +1176,7 @@
         </p:nvSpPr>
         <p:spPr>
           <a:xfrm>
-            <a:off x="9358356" y="267747"/>
+            <a:off x="9358356" y="267748"/>
             <a:ext cx="3034453" cy="519289"/>
           </a:xfrm>
         </p:spPr>
@@ -1166,7 +1248,7 @@
 </file>
 
 <file path=ppt/slideLayouts/slideLayout11.xml><?xml version="1.0" encoding="utf-8"?>
-<p:sldLayout xmlns:a="http://schemas.openxmlformats.org/drawingml/2006/main" xmlns:r="http://schemas.openxmlformats.org/officeDocument/2006/relationships" xmlns:p="http://schemas.openxmlformats.org/presentationml/2006/main" preserve="1">
+<p:sldLayout xmlns:a="http://schemas.openxmlformats.org/drawingml/2006/main" xmlns:r="http://schemas.openxmlformats.org/officeDocument/2006/relationships" xmlns:mc="http://schemas.openxmlformats.org/markup-compatibility/2006" xmlns:mv="urn:schemas-microsoft-com:mac:vml" xmlns:p="http://schemas.openxmlformats.org/presentationml/2006/main" mc:Ignorable="mv" mc:PreserveAttributes="mv:*" preserve="1">
   <p:cSld name="Picture above Caption">
     <p:spTree>
       <p:nvGrpSpPr>
@@ -1199,7 +1281,7 @@
           </a:xfrm>
         </p:spPr>
         <p:txBody>
-          <a:bodyPr tIns="195069" bIns="195069" anchor="b" anchorCtr="0">
+          <a:bodyPr tIns="195059" bIns="195059" anchor="b" anchorCtr="0">
             <a:normAutofit/>
           </a:bodyPr>
           <a:lstStyle>
@@ -1228,7 +1310,7 @@
         </p:nvSpPr>
         <p:spPr>
           <a:xfrm>
-            <a:off x="1300480" y="7114390"/>
+            <a:off x="1300480" y="7114391"/>
             <a:ext cx="11379200" cy="2639211"/>
           </a:xfrm>
           <a:solidFill>
@@ -1258,11 +1340,11 @@
           </a:fontRef>
         </p:style>
         <p:txBody>
-          <a:bodyPr lIns="416147" tIns="195069" rIns="390138" bIns="195069" rtlCol="0" anchor="t" anchorCtr="0">
+          <a:bodyPr lIns="416126" tIns="195059" rIns="390118" bIns="195059" rtlCol="0" anchor="t" anchorCtr="0">
             <a:normAutofit/>
           </a:bodyPr>
           <a:lstStyle>
-            <a:lvl1pPr marL="0" indent="0" algn="l" defTabSz="1300460" rtl="0" eaLnBrk="1" latinLnBrk="0" hangingPunct="1">
+            <a:lvl1pPr marL="0" indent="0" algn="l" defTabSz="1300393" rtl="0" eaLnBrk="1" latinLnBrk="0" hangingPunct="1">
               <a:buNone/>
               <a:defRPr sz="2300" kern="1200">
                 <a:solidFill>
@@ -1276,7 +1358,7 @@
                 <a:cs typeface="+mn-cs"/>
               </a:defRPr>
             </a:lvl1pPr>
-            <a:lvl2pPr marL="650230" indent="0" algn="ctr">
+            <a:lvl2pPr marL="650197" indent="0" algn="ctr">
               <a:buNone/>
               <a:defRPr>
                 <a:solidFill>
@@ -1286,7 +1368,7 @@
                 </a:solidFill>
               </a:defRPr>
             </a:lvl2pPr>
-            <a:lvl3pPr marL="1300460" indent="0" algn="ctr">
+            <a:lvl3pPr marL="1300393" indent="0" algn="ctr">
               <a:buNone/>
               <a:defRPr>
                 <a:solidFill>
@@ -1296,7 +1378,7 @@
                 </a:solidFill>
               </a:defRPr>
             </a:lvl3pPr>
-            <a:lvl4pPr marL="1950690" indent="0" algn="ctr">
+            <a:lvl4pPr marL="1950590" indent="0" algn="ctr">
               <a:buNone/>
               <a:defRPr>
                 <a:solidFill>
@@ -1306,7 +1388,7 @@
                 </a:solidFill>
               </a:defRPr>
             </a:lvl4pPr>
-            <a:lvl5pPr marL="2600919" indent="0" algn="ctr">
+            <a:lvl5pPr marL="2600786" indent="0" algn="ctr">
               <a:buNone/>
               <a:defRPr>
                 <a:solidFill>
@@ -1316,7 +1398,7 @@
                 </a:solidFill>
               </a:defRPr>
             </a:lvl5pPr>
-            <a:lvl6pPr marL="3251149" indent="0" algn="ctr">
+            <a:lvl6pPr marL="3250983" indent="0" algn="ctr">
               <a:buNone/>
               <a:defRPr>
                 <a:solidFill>
@@ -1326,7 +1408,7 @@
                 </a:solidFill>
               </a:defRPr>
             </a:lvl6pPr>
-            <a:lvl7pPr marL="3901379" indent="0" algn="ctr">
+            <a:lvl7pPr marL="3901180" indent="0" algn="ctr">
               <a:buNone/>
               <a:defRPr>
                 <a:solidFill>
@@ -1336,7 +1418,7 @@
                 </a:solidFill>
               </a:defRPr>
             </a:lvl7pPr>
-            <a:lvl8pPr marL="4551609" indent="0" algn="ctr">
+            <a:lvl8pPr marL="4551376" indent="0" algn="ctr">
               <a:buNone/>
               <a:defRPr>
                 <a:solidFill>
@@ -1346,7 +1428,7 @@
                 </a:solidFill>
               </a:defRPr>
             </a:lvl8pPr>
-            <a:lvl9pPr marL="5201839" indent="0" algn="ctr">
+            <a:lvl9pPr marL="5201573" indent="0" algn="ctr">
               <a:buNone/>
               <a:defRPr>
                 <a:solidFill>
@@ -1456,7 +1538,7 @@
 </file>
 
 <file path=ppt/slideLayouts/slideLayout12.xml><?xml version="1.0" encoding="utf-8"?>
-<p:sldLayout xmlns:a="http://schemas.openxmlformats.org/drawingml/2006/main" xmlns:r="http://schemas.openxmlformats.org/officeDocument/2006/relationships" xmlns:p="http://schemas.openxmlformats.org/presentationml/2006/main" preserve="1">
+<p:sldLayout xmlns:a="http://schemas.openxmlformats.org/drawingml/2006/main" xmlns:r="http://schemas.openxmlformats.org/officeDocument/2006/relationships" xmlns:mc="http://schemas.openxmlformats.org/markup-compatibility/2006" xmlns:mv="urn:schemas-microsoft-com:mac:vml" xmlns:p="http://schemas.openxmlformats.org/presentationml/2006/main" mc:Ignorable="mv" mc:PreserveAttributes="mv:*" preserve="1">
   <p:cSld name="2 Pictures with Caption">
     <p:spTree>
       <p:nvGrpSpPr>
@@ -1489,7 +1571,7 @@
           </a:xfrm>
         </p:spPr>
         <p:txBody>
-          <a:bodyPr tIns="195069" bIns="195069" anchor="b" anchorCtr="0">
+          <a:bodyPr tIns="195059" bIns="195059" anchor="b" anchorCtr="0">
             <a:normAutofit/>
           </a:bodyPr>
           <a:lstStyle>
@@ -1518,7 +1600,7 @@
         </p:nvSpPr>
         <p:spPr>
           <a:xfrm>
-            <a:off x="1300480" y="7114390"/>
+            <a:off x="1300480" y="7114391"/>
             <a:ext cx="11379200" cy="2639211"/>
           </a:xfrm>
           <a:solidFill>
@@ -1548,11 +1630,11 @@
           </a:fontRef>
         </p:style>
         <p:txBody>
-          <a:bodyPr lIns="416147" tIns="195069" rIns="390138" bIns="195069" rtlCol="0" anchor="t" anchorCtr="0">
+          <a:bodyPr lIns="416126" tIns="195059" rIns="390118" bIns="195059" rtlCol="0" anchor="t" anchorCtr="0">
             <a:normAutofit/>
           </a:bodyPr>
           <a:lstStyle>
-            <a:lvl1pPr marL="0" indent="0" algn="l" defTabSz="1300460" rtl="0" eaLnBrk="1" latinLnBrk="0" hangingPunct="1">
+            <a:lvl1pPr marL="0" indent="0" algn="l" defTabSz="1300393" rtl="0" eaLnBrk="1" latinLnBrk="0" hangingPunct="1">
               <a:buNone/>
               <a:defRPr sz="2300" kern="1200">
                 <a:solidFill>
@@ -1566,7 +1648,7 @@
                 <a:cs typeface="+mn-cs"/>
               </a:defRPr>
             </a:lvl1pPr>
-            <a:lvl2pPr marL="650230" indent="0" algn="ctr">
+            <a:lvl2pPr marL="650197" indent="0" algn="ctr">
               <a:buNone/>
               <a:defRPr>
                 <a:solidFill>
@@ -1576,7 +1658,7 @@
                 </a:solidFill>
               </a:defRPr>
             </a:lvl2pPr>
-            <a:lvl3pPr marL="1300460" indent="0" algn="ctr">
+            <a:lvl3pPr marL="1300393" indent="0" algn="ctr">
               <a:buNone/>
               <a:defRPr>
                 <a:solidFill>
@@ -1586,7 +1668,7 @@
                 </a:solidFill>
               </a:defRPr>
             </a:lvl3pPr>
-            <a:lvl4pPr marL="1950690" indent="0" algn="ctr">
+            <a:lvl4pPr marL="1950590" indent="0" algn="ctr">
               <a:buNone/>
               <a:defRPr>
                 <a:solidFill>
@@ -1596,7 +1678,7 @@
                 </a:solidFill>
               </a:defRPr>
             </a:lvl4pPr>
-            <a:lvl5pPr marL="2600919" indent="0" algn="ctr">
+            <a:lvl5pPr marL="2600786" indent="0" algn="ctr">
               <a:buNone/>
               <a:defRPr>
                 <a:solidFill>
@@ -1606,7 +1688,7 @@
                 </a:solidFill>
               </a:defRPr>
             </a:lvl5pPr>
-            <a:lvl6pPr marL="3251149" indent="0" algn="ctr">
+            <a:lvl6pPr marL="3250983" indent="0" algn="ctr">
               <a:buNone/>
               <a:defRPr>
                 <a:solidFill>
@@ -1616,7 +1698,7 @@
                 </a:solidFill>
               </a:defRPr>
             </a:lvl6pPr>
-            <a:lvl7pPr marL="3901379" indent="0" algn="ctr">
+            <a:lvl7pPr marL="3901180" indent="0" algn="ctr">
               <a:buNone/>
               <a:defRPr>
                 <a:solidFill>
@@ -1626,7 +1708,7 @@
                 </a:solidFill>
               </a:defRPr>
             </a:lvl7pPr>
-            <a:lvl8pPr marL="4551609" indent="0" algn="ctr">
+            <a:lvl8pPr marL="4551376" indent="0" algn="ctr">
               <a:buNone/>
               <a:defRPr>
                 <a:solidFill>
@@ -1636,7 +1718,7 @@
                 </a:solidFill>
               </a:defRPr>
             </a:lvl8pPr>
-            <a:lvl9pPr marL="5201839" indent="0" algn="ctr">
+            <a:lvl9pPr marL="5201573" indent="0" algn="ctr">
               <a:buNone/>
               <a:defRPr>
                 <a:solidFill>
@@ -1668,7 +1750,7 @@
         </p:nvSpPr>
         <p:spPr>
           <a:xfrm>
-            <a:off x="9358356" y="267747"/>
+            <a:off x="9358356" y="267748"/>
             <a:ext cx="3034453" cy="519289"/>
           </a:xfrm>
         </p:spPr>
@@ -1786,7 +1868,7 @@
 </file>
 
 <file path=ppt/slideLayouts/slideLayout13.xml><?xml version="1.0" encoding="utf-8"?>
-<p:sldLayout xmlns:a="http://schemas.openxmlformats.org/drawingml/2006/main" xmlns:r="http://schemas.openxmlformats.org/officeDocument/2006/relationships" xmlns:p="http://schemas.openxmlformats.org/presentationml/2006/main" preserve="1">
+<p:sldLayout xmlns:a="http://schemas.openxmlformats.org/drawingml/2006/main" xmlns:r="http://schemas.openxmlformats.org/officeDocument/2006/relationships" xmlns:mc="http://schemas.openxmlformats.org/markup-compatibility/2006" xmlns:mv="urn:schemas-microsoft-com:mac:vml" xmlns:p="http://schemas.openxmlformats.org/presentationml/2006/main" mc:Ignorable="mv" mc:PreserveAttributes="mv:*" preserve="1">
   <p:cSld name="3 Pictures with Caption">
     <p:spTree>
       <p:nvGrpSpPr>
@@ -1819,7 +1901,7 @@
           </a:xfrm>
         </p:spPr>
         <p:txBody>
-          <a:bodyPr tIns="195069" bIns="195069" anchor="b" anchorCtr="0">
+          <a:bodyPr tIns="195059" bIns="195059" anchor="b" anchorCtr="0">
             <a:normAutofit/>
           </a:bodyPr>
           <a:lstStyle>
@@ -1848,7 +1930,7 @@
         </p:nvSpPr>
         <p:spPr>
           <a:xfrm>
-            <a:off x="1300480" y="7114390"/>
+            <a:off x="1300480" y="7114391"/>
             <a:ext cx="11379200" cy="2639211"/>
           </a:xfrm>
           <a:solidFill>
@@ -1878,11 +1960,11 @@
           </a:fontRef>
         </p:style>
         <p:txBody>
-          <a:bodyPr lIns="416147" tIns="195069" rIns="390138" bIns="195069" rtlCol="0" anchor="t" anchorCtr="0">
+          <a:bodyPr lIns="416126" tIns="195059" rIns="390118" bIns="195059" rtlCol="0" anchor="t" anchorCtr="0">
             <a:normAutofit/>
           </a:bodyPr>
           <a:lstStyle>
-            <a:lvl1pPr marL="0" indent="0" algn="l" defTabSz="1300460" rtl="0" eaLnBrk="1" latinLnBrk="0" hangingPunct="1">
+            <a:lvl1pPr marL="0" indent="0" algn="l" defTabSz="1300393" rtl="0" eaLnBrk="1" latinLnBrk="0" hangingPunct="1">
               <a:buNone/>
               <a:defRPr sz="2300" kern="1200">
                 <a:solidFill>
@@ -1896,7 +1978,7 @@
                 <a:cs typeface="+mn-cs"/>
               </a:defRPr>
             </a:lvl1pPr>
-            <a:lvl2pPr marL="650230" indent="0" algn="ctr">
+            <a:lvl2pPr marL="650197" indent="0" algn="ctr">
               <a:buNone/>
               <a:defRPr>
                 <a:solidFill>
@@ -1906,7 +1988,7 @@
                 </a:solidFill>
               </a:defRPr>
             </a:lvl2pPr>
-            <a:lvl3pPr marL="1300460" indent="0" algn="ctr">
+            <a:lvl3pPr marL="1300393" indent="0" algn="ctr">
               <a:buNone/>
               <a:defRPr>
                 <a:solidFill>
@@ -1916,7 +1998,7 @@
                 </a:solidFill>
               </a:defRPr>
             </a:lvl3pPr>
-            <a:lvl4pPr marL="1950690" indent="0" algn="ctr">
+            <a:lvl4pPr marL="1950590" indent="0" algn="ctr">
               <a:buNone/>
               <a:defRPr>
                 <a:solidFill>
@@ -1926,7 +2008,7 @@
                 </a:solidFill>
               </a:defRPr>
             </a:lvl4pPr>
-            <a:lvl5pPr marL="2600919" indent="0" algn="ctr">
+            <a:lvl5pPr marL="2600786" indent="0" algn="ctr">
               <a:buNone/>
               <a:defRPr>
                 <a:solidFill>
@@ -1936,7 +2018,7 @@
                 </a:solidFill>
               </a:defRPr>
             </a:lvl5pPr>
-            <a:lvl6pPr marL="3251149" indent="0" algn="ctr">
+            <a:lvl6pPr marL="3250983" indent="0" algn="ctr">
               <a:buNone/>
               <a:defRPr>
                 <a:solidFill>
@@ -1946,7 +2028,7 @@
                 </a:solidFill>
               </a:defRPr>
             </a:lvl6pPr>
-            <a:lvl7pPr marL="3901379" indent="0" algn="ctr">
+            <a:lvl7pPr marL="3901180" indent="0" algn="ctr">
               <a:buNone/>
               <a:defRPr>
                 <a:solidFill>
@@ -1956,7 +2038,7 @@
                 </a:solidFill>
               </a:defRPr>
             </a:lvl7pPr>
-            <a:lvl8pPr marL="4551609" indent="0" algn="ctr">
+            <a:lvl8pPr marL="4551376" indent="0" algn="ctr">
               <a:buNone/>
               <a:defRPr>
                 <a:solidFill>
@@ -1966,7 +2048,7 @@
                 </a:solidFill>
               </a:defRPr>
             </a:lvl8pPr>
-            <a:lvl9pPr marL="5201839" indent="0" algn="ctr">
+            <a:lvl9pPr marL="5201573" indent="0" algn="ctr">
               <a:buNone/>
               <a:defRPr>
                 <a:solidFill>
@@ -1998,7 +2080,7 @@
         </p:nvSpPr>
         <p:spPr>
           <a:xfrm>
-            <a:off x="9358356" y="267747"/>
+            <a:off x="9358356" y="267748"/>
             <a:ext cx="3034453" cy="519289"/>
           </a:xfrm>
         </p:spPr>
@@ -2151,7 +2233,7 @@
 </file>
 
 <file path=ppt/slideLayouts/slideLayout14.xml><?xml version="1.0" encoding="utf-8"?>
-<p:sldLayout xmlns:a="http://schemas.openxmlformats.org/drawingml/2006/main" xmlns:r="http://schemas.openxmlformats.org/officeDocument/2006/relationships" xmlns:p="http://schemas.openxmlformats.org/presentationml/2006/main" type="vertTx" preserve="1">
+<p:sldLayout xmlns:a="http://schemas.openxmlformats.org/drawingml/2006/main" xmlns:r="http://schemas.openxmlformats.org/officeDocument/2006/relationships" xmlns:mc="http://schemas.openxmlformats.org/markup-compatibility/2006" xmlns:mv="urn:schemas-microsoft-com:mac:vml" xmlns:p="http://schemas.openxmlformats.org/presentationml/2006/main" mc:Ignorable="mv" mc:PreserveAttributes="mv:*" type="vertTx" preserve="1">
   <p:cSld name="Title and Vertical Text">
     <p:spTree>
       <p:nvGrpSpPr>
@@ -2321,7 +2403,7 @@
 </file>
 
 <file path=ppt/slideLayouts/slideLayout15.xml><?xml version="1.0" encoding="utf-8"?>
-<p:sldLayout xmlns:a="http://schemas.openxmlformats.org/drawingml/2006/main" xmlns:r="http://schemas.openxmlformats.org/officeDocument/2006/relationships" xmlns:p="http://schemas.openxmlformats.org/presentationml/2006/main" type="vertTitleAndTx" preserve="1">
+<p:sldLayout xmlns:a="http://schemas.openxmlformats.org/drawingml/2006/main" xmlns:r="http://schemas.openxmlformats.org/officeDocument/2006/relationships" xmlns:mc="http://schemas.openxmlformats.org/markup-compatibility/2006" xmlns:mv="urn:schemas-microsoft-com:mac:vml" xmlns:p="http://schemas.openxmlformats.org/presentationml/2006/main" mc:Ignorable="mv" mc:PreserveAttributes="mv:*" type="vertTitleAndTx" preserve="1">
   <p:cSld name="Vertical Title and Text">
     <p:spTree>
       <p:nvGrpSpPr>
@@ -2349,12 +2431,12 @@
         </p:nvSpPr>
         <p:spPr>
           <a:xfrm>
-            <a:off x="11360075" y="1606477"/>
+            <a:off x="11360075" y="1606478"/>
             <a:ext cx="1300480" cy="7869551"/>
           </a:xfrm>
         </p:spPr>
         <p:txBody>
-          <a:bodyPr vert="eaVert" lIns="390138" tIns="975345" bIns="975345"/>
+          <a:bodyPr vert="eaVert" lIns="390118" tIns="975295" bIns="975295"/>
           <a:lstStyle/>
           <a:p>
             <a:r>
@@ -2489,285 +2571,6 @@
               <a:t>‹#›</a:t>
             </a:fld>
             <a:endParaRPr lang="en-US"/>
-          </a:p>
-        </p:txBody>
-      </p:sp>
-    </p:spTree>
-  </p:cSld>
-  <p:clrMapOvr>
-    <a:masterClrMapping/>
-  </p:clrMapOvr>
-</p:sldLayout>
-</file>
-
-<file path=ppt/slideLayouts/slideLayout16.xml><?xml version="1.0" encoding="utf-8"?>
-<p:sldLayout xmlns:a="http://schemas.openxmlformats.org/drawingml/2006/main" xmlns:r="http://schemas.openxmlformats.org/officeDocument/2006/relationships" xmlns:p="http://schemas.openxmlformats.org/presentationml/2006/main" showMasterSp="0" type="title">
-  <p:cSld name="1_Title Slide">
-    <p:spTree>
-      <p:nvGrpSpPr>
-        <p:cNvPr id="1" name=""/>
-        <p:cNvGrpSpPr/>
-        <p:nvPr/>
-      </p:nvGrpSpPr>
-      <p:grpSpPr>
-        <a:xfrm>
-          <a:off x="0" y="0"/>
-          <a:ext cx="0" cy="0"/>
-          <a:chOff x="0" y="0"/>
-          <a:chExt cx="0" cy="0"/>
-        </a:xfrm>
-      </p:grpSpPr>
-      <p:sp>
-        <p:nvSpPr>
-          <p:cNvPr id="8" name="Title 7"/>
-          <p:cNvSpPr>
-            <a:spLocks noGrp="1"/>
-          </p:cNvSpPr>
-          <p:nvPr>
-            <p:ph type="ctrTitle"/>
-          </p:nvPr>
-        </p:nvSpPr>
-        <p:spPr>
-          <a:xfrm>
-            <a:off x="1733973" y="5527040"/>
-            <a:ext cx="9753600" cy="1408853"/>
-          </a:xfrm>
-        </p:spPr>
-        <p:txBody>
-          <a:bodyPr anchor="t" anchorCtr="0"/>
-          <a:lstStyle>
-            <a:lvl1pPr algn="r">
-              <a:defRPr sz="4600">
-                <a:solidFill>
-                  <a:schemeClr val="tx1"/>
-                </a:solidFill>
-              </a:defRPr>
-            </a:lvl1pPr>
-          </a:lstStyle>
-          <a:p>
-            <a:r>
-              <a:rPr kumimoji="0" lang="en-US" smtClean="0"/>
-              <a:t>Click to edit Master title style</a:t>
-            </a:r>
-            <a:endParaRPr kumimoji="0" lang="en-US"/>
-          </a:p>
-        </p:txBody>
-      </p:sp>
-      <p:sp>
-        <p:nvSpPr>
-          <p:cNvPr id="9" name="Subtitle 8"/>
-          <p:cNvSpPr>
-            <a:spLocks noGrp="1"/>
-          </p:cNvSpPr>
-          <p:nvPr>
-            <p:ph type="subTitle" idx="1"/>
-          </p:nvPr>
-        </p:nvSpPr>
-        <p:spPr>
-          <a:xfrm>
-            <a:off x="1733973" y="7288107"/>
-            <a:ext cx="9753600" cy="758613"/>
-          </a:xfrm>
-        </p:spPr>
-        <p:txBody>
-          <a:bodyPr/>
-          <a:lstStyle>
-            <a:lvl1pPr marL="0" indent="0" algn="r">
-              <a:buNone/>
-              <a:defRPr sz="2800">
-                <a:solidFill>
-                  <a:schemeClr val="tx2"/>
-                </a:solidFill>
-                <a:latin typeface="+mj-lt"/>
-                <a:ea typeface="+mj-ea"/>
-                <a:cs typeface="+mj-cs"/>
-              </a:defRPr>
-            </a:lvl1pPr>
-            <a:lvl2pPr marL="650230" indent="0" algn="ctr">
-              <a:buNone/>
-            </a:lvl2pPr>
-            <a:lvl3pPr marL="1300460" indent="0" algn="ctr">
-              <a:buNone/>
-            </a:lvl3pPr>
-            <a:lvl4pPr marL="1950690" indent="0" algn="ctr">
-              <a:buNone/>
-            </a:lvl4pPr>
-            <a:lvl5pPr marL="2600919" indent="0" algn="ctr">
-              <a:buNone/>
-            </a:lvl5pPr>
-            <a:lvl6pPr marL="3251149" indent="0" algn="ctr">
-              <a:buNone/>
-            </a:lvl6pPr>
-            <a:lvl7pPr marL="3901379" indent="0" algn="ctr">
-              <a:buNone/>
-            </a:lvl7pPr>
-            <a:lvl8pPr marL="4551609" indent="0" algn="ctr">
-              <a:buNone/>
-            </a:lvl8pPr>
-            <a:lvl9pPr marL="5201839" indent="0" algn="ctr">
-              <a:buNone/>
-            </a:lvl9pPr>
-          </a:lstStyle>
-          <a:p>
-            <a:r>
-              <a:rPr kumimoji="0" lang="en-US" smtClean="0"/>
-              <a:t>Click to edit Master subtitle style</a:t>
-            </a:r>
-            <a:endParaRPr kumimoji="0" lang="en-US"/>
-          </a:p>
-        </p:txBody>
-      </p:sp>
-      <p:sp>
-        <p:nvSpPr>
-          <p:cNvPr id="11" name="Date Placeholder 13"/>
-          <p:cNvSpPr>
-            <a:spLocks noGrp="1"/>
-          </p:cNvSpPr>
-          <p:nvPr>
-            <p:ph type="dt" sz="half" idx="2"/>
-          </p:nvPr>
-        </p:nvSpPr>
-        <p:spPr>
-          <a:xfrm>
-            <a:off x="9103360" y="9040142"/>
-            <a:ext cx="3255535" cy="520192"/>
-          </a:xfrm>
-          <a:prstGeom prst="rect">
-            <a:avLst/>
-          </a:prstGeom>
-        </p:spPr>
-        <p:txBody>
-          <a:bodyPr vert="horz" lIns="130046" tIns="65023" rIns="130046" bIns="65023"/>
-          <a:lstStyle>
-            <a:lvl1pPr algn="l" eaLnBrk="1" latinLnBrk="0" hangingPunct="1">
-              <a:defRPr kumimoji="0" sz="2000">
-                <a:solidFill>
-                  <a:schemeClr val="tx2"/>
-                </a:solidFill>
-              </a:defRPr>
-            </a:lvl1pPr>
-          </a:lstStyle>
-          <a:p>
-            <a:r>
-              <a:rPr lang="en-US" smtClean="0"/>
-              <a:t>November 29th, 2010</a:t>
-            </a:r>
-            <a:endParaRPr lang="en-US" dirty="0"/>
-          </a:p>
-        </p:txBody>
-      </p:sp>
-      <p:sp>
-        <p:nvSpPr>
-          <p:cNvPr id="12" name="Footer Placeholder 2"/>
-          <p:cNvSpPr>
-            <a:spLocks noGrp="1"/>
-          </p:cNvSpPr>
-          <p:nvPr>
-            <p:ph type="ftr" sz="quarter" idx="3"/>
-          </p:nvPr>
-        </p:nvSpPr>
-        <p:spPr>
-          <a:xfrm>
-            <a:off x="4122522" y="9040142"/>
-            <a:ext cx="4985173" cy="520192"/>
-          </a:xfrm>
-          <a:prstGeom prst="rect">
-            <a:avLst/>
-          </a:prstGeom>
-        </p:spPr>
-        <p:txBody>
-          <a:bodyPr vert="horz" lIns="130046" tIns="65023" rIns="130046" bIns="65023"/>
-          <a:lstStyle>
-            <a:lvl1pPr algn="r" eaLnBrk="1" latinLnBrk="0" hangingPunct="1">
-              <a:defRPr kumimoji="0" sz="2000">
-                <a:solidFill>
-                  <a:schemeClr val="tx2"/>
-                </a:solidFill>
-              </a:defRPr>
-            </a:lvl1pPr>
-          </a:lstStyle>
-          <a:p>
-            <a:r>
-              <a:rPr lang="en-US" smtClean="0"/>
-              <a:t>TeraGrid SAGA Tutorial</a:t>
-            </a:r>
-            <a:endParaRPr lang="en-US" dirty="0"/>
-          </a:p>
-        </p:txBody>
-      </p:sp>
-      <p:sp>
-        <p:nvSpPr>
-          <p:cNvPr id="13" name="Slide Number Placeholder 22"/>
-          <p:cNvSpPr>
-            <a:spLocks noGrp="1"/>
-          </p:cNvSpPr>
-          <p:nvPr>
-            <p:ph type="sldNum" sz="quarter" idx="4"/>
-          </p:nvPr>
-        </p:nvSpPr>
-        <p:spPr>
-          <a:xfrm>
-            <a:off x="871321" y="9040142"/>
-            <a:ext cx="2817707" cy="520192"/>
-          </a:xfrm>
-          <a:prstGeom prst="rect">
-            <a:avLst/>
-          </a:prstGeom>
-        </p:spPr>
-        <p:txBody>
-          <a:bodyPr vert="horz" lIns="130046" tIns="65023" rIns="130046" bIns="65023"/>
-          <a:lstStyle>
-            <a:lvl1pPr algn="l" eaLnBrk="1" latinLnBrk="0" hangingPunct="1">
-              <a:defRPr kumimoji="0" sz="2000">
-                <a:solidFill>
-                  <a:schemeClr val="tx2"/>
-                </a:solidFill>
-              </a:defRPr>
-            </a:lvl1pPr>
-          </a:lstStyle>
-          <a:p>
-            <a:fld id="{7A426C1A-D210-4B4B-86AA-6AEDDDCCF5FF}" type="slidenum">
-              <a:rPr lang="en-US" smtClean="0"/>
-              <a:pPr/>
-              <a:t>‹#›</a:t>
-            </a:fld>
-            <a:endParaRPr lang="en-US"/>
-          </a:p>
-        </p:txBody>
-      </p:sp>
-      <p:sp>
-        <p:nvSpPr>
-          <p:cNvPr id="14" name="Straight Connector 13"/>
-          <p:cNvSpPr>
-            <a:spLocks noChangeShapeType="1"/>
-          </p:cNvSpPr>
-          <p:nvPr userDrawn="1"/>
-        </p:nvSpPr>
-        <p:spPr bwMode="auto">
-          <a:xfrm>
-            <a:off x="650240" y="9035627"/>
-            <a:ext cx="11704320" cy="0"/>
-          </a:xfrm>
-          <a:prstGeom prst="line">
-            <a:avLst/>
-          </a:prstGeom>
-          <a:noFill/>
-          <a:ln w="9525" cap="flat" cmpd="sng" algn="ctr">
-            <a:solidFill>
-              <a:schemeClr val="accent2"/>
-            </a:solidFill>
-            <a:prstDash val="dash"/>
-            <a:round/>
-            <a:headEnd type="none" w="med" len="med"/>
-            <a:tailEnd type="none" w="med" len="med"/>
-          </a:ln>
-          <a:effectLst/>
-        </p:spPr>
-        <p:txBody>
-          <a:bodyPr vert="horz" wrap="square" lIns="130046" tIns="65023" rIns="130046" bIns="65023" anchor="t" compatLnSpc="1"/>
-          <a:lstStyle/>
-          <a:p>
-            <a:endParaRPr kumimoji="0" lang="en-US"/>
           </a:p>
         </p:txBody>
       </p:sp>
@@ -2780,7 +2583,7 @@
 </file>
 
 <file path=ppt/slideLayouts/slideLayout2.xml><?xml version="1.0" encoding="utf-8"?>
-<p:sldLayout xmlns:a="http://schemas.openxmlformats.org/drawingml/2006/main" xmlns:r="http://schemas.openxmlformats.org/officeDocument/2006/relationships" xmlns:p="http://schemas.openxmlformats.org/presentationml/2006/main" type="obj" preserve="1">
+<p:sldLayout xmlns:a="http://schemas.openxmlformats.org/drawingml/2006/main" xmlns:r="http://schemas.openxmlformats.org/officeDocument/2006/relationships" xmlns:mc="http://schemas.openxmlformats.org/markup-compatibility/2006" xmlns:mv="urn:schemas-microsoft-com:mac:vml" xmlns:p="http://schemas.openxmlformats.org/presentationml/2006/main" mc:Ignorable="mv" mc:PreserveAttributes="mv:*" type="obj" preserve="1">
   <p:cSld name="Title and Content">
     <p:spTree>
       <p:nvGrpSpPr>
@@ -2808,7 +2611,7 @@
         </p:nvSpPr>
         <p:spPr>
           <a:xfrm>
-            <a:off x="1" y="1457764"/>
+            <a:off x="2" y="1457764"/>
             <a:ext cx="12677423" cy="1127326"/>
           </a:xfrm>
           <a:solidFill>
@@ -2816,7 +2619,7 @@
           </a:solidFill>
         </p:spPr>
         <p:txBody>
-          <a:bodyPr lIns="1560552" anchor="ctr" anchorCtr="0">
+          <a:bodyPr lIns="1560472" anchor="ctr" anchorCtr="0">
             <a:normAutofit/>
           </a:bodyPr>
           <a:lstStyle>
@@ -2851,7 +2654,7 @@
         </p:nvSpPr>
         <p:spPr>
           <a:xfrm>
-            <a:off x="1447159" y="2942035"/>
+            <a:off x="1447160" y="2942035"/>
             <a:ext cx="10961589" cy="5970078"/>
           </a:xfrm>
         </p:spPr>
@@ -2943,7 +2746,7 @@
         </p:blipFill>
         <p:spPr>
           <a:xfrm>
-            <a:off x="1286113" y="475648"/>
+            <a:off x="1286113" y="475650"/>
             <a:ext cx="3245761" cy="793801"/>
           </a:xfrm>
           <a:prstGeom prst="rect">
@@ -2963,7 +2766,7 @@
         </p:nvSpPr>
         <p:spPr>
           <a:xfrm>
-            <a:off x="9358356" y="9234312"/>
+            <a:off x="9358356" y="9234313"/>
             <a:ext cx="3034453" cy="519289"/>
           </a:xfrm>
         </p:spPr>
@@ -3015,7 +2818,7 @@
         </p:nvSpPr>
         <p:spPr>
           <a:xfrm>
-            <a:off x="1593725" y="9234312"/>
+            <a:off x="1593725" y="9234313"/>
             <a:ext cx="4118187" cy="519289"/>
           </a:xfrm>
         </p:spPr>
@@ -3064,7 +2867,7 @@
           <a:effectLst/>
         </p:spPr>
         <p:txBody>
-          <a:bodyPr vert="horz" wrap="square" lIns="130046" tIns="65023" rIns="130046" bIns="65023" anchor="t" compatLnSpc="1"/>
+          <a:bodyPr vert="horz" wrap="square" lIns="130039" tIns="65020" rIns="130039" bIns="65020" anchor="t" compatLnSpc="1"/>
           <a:lstStyle/>
           <a:p>
             <a:endParaRPr kumimoji="0" lang="en-US"/>
@@ -3080,7 +2883,7 @@
 </file>
 
 <file path=ppt/slideLayouts/slideLayout3.xml><?xml version="1.0" encoding="utf-8"?>
-<p:sldLayout xmlns:a="http://schemas.openxmlformats.org/drawingml/2006/main" xmlns:r="http://schemas.openxmlformats.org/officeDocument/2006/relationships" xmlns:p="http://schemas.openxmlformats.org/presentationml/2006/main" preserve="1">
+<p:sldLayout xmlns:a="http://schemas.openxmlformats.org/drawingml/2006/main" xmlns:r="http://schemas.openxmlformats.org/officeDocument/2006/relationships" xmlns:mc="http://schemas.openxmlformats.org/markup-compatibility/2006" xmlns:mv="urn:schemas-microsoft-com:mac:vml" xmlns:p="http://schemas.openxmlformats.org/presentationml/2006/main" mc:Ignorable="mv" mc:PreserveAttributes="mv:*" preserve="1">
   <p:cSld name="Title Slide with Picture">
     <p:spTree>
       <p:nvGrpSpPr>
@@ -3166,9 +2969,9 @@
           </a:fontRef>
         </p:style>
         <p:txBody>
-          <a:bodyPr lIns="416147" tIns="130046" rIns="390138" bIns="130046" rtlCol="0" anchor="t" anchorCtr="0"/>
+          <a:bodyPr lIns="416126" tIns="130039" rIns="390118" bIns="130039" rtlCol="0" anchor="t" anchorCtr="0"/>
           <a:lstStyle>
-            <a:lvl1pPr marL="0" indent="0" algn="l" defTabSz="1300460" rtl="0" eaLnBrk="1" latinLnBrk="0" hangingPunct="1">
+            <a:lvl1pPr marL="0" indent="0" algn="l" defTabSz="1300393" rtl="0" eaLnBrk="1" latinLnBrk="0" hangingPunct="1">
               <a:spcBef>
                 <a:spcPts val="427"/>
               </a:spcBef>
@@ -3185,7 +2988,7 @@
                 <a:cs typeface="+mn-cs"/>
               </a:defRPr>
             </a:lvl1pPr>
-            <a:lvl2pPr marL="650230" indent="0" algn="ctr">
+            <a:lvl2pPr marL="650197" indent="0" algn="ctr">
               <a:buNone/>
               <a:defRPr>
                 <a:solidFill>
@@ -3195,7 +2998,7 @@
                 </a:solidFill>
               </a:defRPr>
             </a:lvl2pPr>
-            <a:lvl3pPr marL="1300460" indent="0" algn="ctr">
+            <a:lvl3pPr marL="1300393" indent="0" algn="ctr">
               <a:buNone/>
               <a:defRPr>
                 <a:solidFill>
@@ -3205,7 +3008,7 @@
                 </a:solidFill>
               </a:defRPr>
             </a:lvl3pPr>
-            <a:lvl4pPr marL="1950690" indent="0" algn="ctr">
+            <a:lvl4pPr marL="1950590" indent="0" algn="ctr">
               <a:buNone/>
               <a:defRPr>
                 <a:solidFill>
@@ -3215,7 +3018,7 @@
                 </a:solidFill>
               </a:defRPr>
             </a:lvl4pPr>
-            <a:lvl5pPr marL="2600919" indent="0" algn="ctr">
+            <a:lvl5pPr marL="2600786" indent="0" algn="ctr">
               <a:buNone/>
               <a:defRPr>
                 <a:solidFill>
@@ -3225,7 +3028,7 @@
                 </a:solidFill>
               </a:defRPr>
             </a:lvl5pPr>
-            <a:lvl6pPr marL="3251149" indent="0" algn="ctr">
+            <a:lvl6pPr marL="3250983" indent="0" algn="ctr">
               <a:buNone/>
               <a:defRPr>
                 <a:solidFill>
@@ -3235,7 +3038,7 @@
                 </a:solidFill>
               </a:defRPr>
             </a:lvl6pPr>
-            <a:lvl7pPr marL="3901379" indent="0" algn="ctr">
+            <a:lvl7pPr marL="3901180" indent="0" algn="ctr">
               <a:buNone/>
               <a:defRPr>
                 <a:solidFill>
@@ -3245,7 +3048,7 @@
                 </a:solidFill>
               </a:defRPr>
             </a:lvl7pPr>
-            <a:lvl8pPr marL="4551609" indent="0" algn="ctr">
+            <a:lvl8pPr marL="4551376" indent="0" algn="ctr">
               <a:buNone/>
               <a:defRPr>
                 <a:solidFill>
@@ -3255,7 +3058,7 @@
                 </a:solidFill>
               </a:defRPr>
             </a:lvl8pPr>
-            <a:lvl9pPr marL="5201839" indent="0" algn="ctr">
+            <a:lvl9pPr marL="5201573" indent="0" algn="ctr">
               <a:buNone/>
               <a:defRPr>
                 <a:solidFill>
@@ -3365,7 +3168,7 @@
 </file>
 
 <file path=ppt/slideLayouts/slideLayout4.xml><?xml version="1.0" encoding="utf-8"?>
-<p:sldLayout xmlns:a="http://schemas.openxmlformats.org/drawingml/2006/main" xmlns:r="http://schemas.openxmlformats.org/officeDocument/2006/relationships" xmlns:p="http://schemas.openxmlformats.org/presentationml/2006/main" type="secHead" preserve="1">
+<p:sldLayout xmlns:a="http://schemas.openxmlformats.org/drawingml/2006/main" xmlns:r="http://schemas.openxmlformats.org/officeDocument/2006/relationships" xmlns:mc="http://schemas.openxmlformats.org/markup-compatibility/2006" xmlns:mv="urn:schemas-microsoft-com:mac:vml" xmlns:p="http://schemas.openxmlformats.org/presentationml/2006/main" mc:Ignorable="mv" mc:PreserveAttributes="mv:*" type="secHead" preserve="1">
   <p:cSld name="Section Header">
     <p:spTree>
       <p:nvGrpSpPr>
@@ -3401,11 +3204,11 @@
           </a:solidFill>
         </p:spPr>
         <p:txBody>
-          <a:bodyPr vert="horz" lIns="1690598" tIns="65023" rIns="390138" bIns="65023" rtlCol="0" anchor="b" anchorCtr="0">
+          <a:bodyPr vert="horz" lIns="1690511" tIns="65020" rIns="390118" bIns="65020" rtlCol="0" anchor="b" anchorCtr="0">
             <a:normAutofit/>
           </a:bodyPr>
           <a:lstStyle>
-            <a:lvl1pPr marL="0" indent="0" algn="l" defTabSz="1300460" rtl="0" eaLnBrk="1" latinLnBrk="0" hangingPunct="1">
+            <a:lvl1pPr marL="0" indent="0" algn="l" defTabSz="1300393" rtl="0" eaLnBrk="1" latinLnBrk="0" hangingPunct="1">
               <a:spcBef>
                 <a:spcPct val="0"/>
               </a:spcBef>
@@ -3471,11 +3274,11 @@
           </a:fontRef>
         </p:style>
         <p:txBody>
-          <a:bodyPr vert="horz" lIns="416147" tIns="130046" rIns="390138" bIns="130046" rtlCol="0" anchor="ctr" anchorCtr="0">
+          <a:bodyPr vert="horz" lIns="416126" tIns="130039" rIns="390118" bIns="130039" rtlCol="0" anchor="ctr" anchorCtr="0">
             <a:normAutofit/>
           </a:bodyPr>
           <a:lstStyle>
-            <a:lvl1pPr marL="0" indent="0" algn="l" defTabSz="1300460" rtl="0" eaLnBrk="1" latinLnBrk="0" hangingPunct="1">
+            <a:lvl1pPr marL="0" indent="0" algn="l" defTabSz="1300393" rtl="0" eaLnBrk="1" latinLnBrk="0" hangingPunct="1">
               <a:spcBef>
                 <a:spcPts val="427"/>
               </a:spcBef>
@@ -3496,7 +3299,7 @@
                 <a:cs typeface="+mn-cs"/>
               </a:defRPr>
             </a:lvl1pPr>
-            <a:lvl2pPr marL="650230" indent="0">
+            <a:lvl2pPr marL="650197" indent="0">
               <a:buNone/>
               <a:defRPr sz="2600">
                 <a:solidFill>
@@ -3506,7 +3309,7 @@
                 </a:solidFill>
               </a:defRPr>
             </a:lvl2pPr>
-            <a:lvl3pPr marL="1300460" indent="0">
+            <a:lvl3pPr marL="1300393" indent="0">
               <a:buNone/>
               <a:defRPr sz="2300">
                 <a:solidFill>
@@ -3516,7 +3319,7 @@
                 </a:solidFill>
               </a:defRPr>
             </a:lvl3pPr>
-            <a:lvl4pPr marL="1950690" indent="0">
+            <a:lvl4pPr marL="1950590" indent="0">
               <a:buNone/>
               <a:defRPr sz="2000">
                 <a:solidFill>
@@ -3526,7 +3329,7 @@
                 </a:solidFill>
               </a:defRPr>
             </a:lvl4pPr>
-            <a:lvl5pPr marL="2600919" indent="0">
+            <a:lvl5pPr marL="2600786" indent="0">
               <a:buNone/>
               <a:defRPr sz="2000">
                 <a:solidFill>
@@ -3536,7 +3339,7 @@
                 </a:solidFill>
               </a:defRPr>
             </a:lvl5pPr>
-            <a:lvl6pPr marL="3251149" indent="0">
+            <a:lvl6pPr marL="3250983" indent="0">
               <a:buNone/>
               <a:defRPr sz="2000">
                 <a:solidFill>
@@ -3546,7 +3349,7 @@
                 </a:solidFill>
               </a:defRPr>
             </a:lvl6pPr>
-            <a:lvl7pPr marL="3901379" indent="0">
+            <a:lvl7pPr marL="3901180" indent="0">
               <a:buNone/>
               <a:defRPr sz="2000">
                 <a:solidFill>
@@ -3556,7 +3359,7 @@
                 </a:solidFill>
               </a:defRPr>
             </a:lvl7pPr>
-            <a:lvl8pPr marL="4551609" indent="0">
+            <a:lvl8pPr marL="4551376" indent="0">
               <a:buNone/>
               <a:defRPr sz="2000">
                 <a:solidFill>
@@ -3566,7 +3369,7 @@
                 </a:solidFill>
               </a:defRPr>
             </a:lvl8pPr>
-            <a:lvl9pPr marL="5201839" indent="0">
+            <a:lvl9pPr marL="5201573" indent="0">
               <a:buNone/>
               <a:defRPr sz="2000">
                 <a:solidFill>
@@ -3685,7 +3488,7 @@
           <a:effectLst/>
         </p:spPr>
         <p:txBody>
-          <a:bodyPr vert="horz" wrap="square" lIns="130046" tIns="65023" rIns="130046" bIns="65023" anchor="t" compatLnSpc="1"/>
+          <a:bodyPr vert="horz" wrap="square" lIns="130039" tIns="65020" rIns="130039" bIns="65020" anchor="t" compatLnSpc="1"/>
           <a:lstStyle/>
           <a:p>
             <a:endParaRPr kumimoji="0" lang="en-US"/>
@@ -3701,7 +3504,7 @@
 </file>
 
 <file path=ppt/slideLayouts/slideLayout5.xml><?xml version="1.0" encoding="utf-8"?>
-<p:sldLayout xmlns:a="http://schemas.openxmlformats.org/drawingml/2006/main" xmlns:r="http://schemas.openxmlformats.org/officeDocument/2006/relationships" xmlns:p="http://schemas.openxmlformats.org/presentationml/2006/main" type="twoObj" preserve="1">
+<p:sldLayout xmlns:a="http://schemas.openxmlformats.org/drawingml/2006/main" xmlns:r="http://schemas.openxmlformats.org/officeDocument/2006/relationships" xmlns:mc="http://schemas.openxmlformats.org/markup-compatibility/2006" xmlns:mv="urn:schemas-microsoft-com:mac:vml" xmlns:p="http://schemas.openxmlformats.org/presentationml/2006/main" mc:Ignorable="mv" mc:PreserveAttributes="mv:*" type="twoObj" preserve="1">
   <p:cSld name="Two Content">
     <p:spTree>
       <p:nvGrpSpPr>
@@ -3926,7 +3729,7 @@
         </p:nvSpPr>
         <p:spPr>
           <a:xfrm>
-            <a:off x="9358356" y="267747"/>
+            <a:off x="9358356" y="267748"/>
             <a:ext cx="3034453" cy="519289"/>
           </a:xfrm>
         </p:spPr>
@@ -4018,7 +3821,7 @@
           <a:effectLst/>
         </p:spPr>
         <p:txBody>
-          <a:bodyPr vert="horz" wrap="square" lIns="130046" tIns="65023" rIns="130046" bIns="65023" anchor="t" compatLnSpc="1"/>
+          <a:bodyPr vert="horz" wrap="square" lIns="130039" tIns="65020" rIns="130039" bIns="65020" anchor="t" compatLnSpc="1"/>
           <a:lstStyle/>
           <a:p>
             <a:endParaRPr kumimoji="0" lang="en-US"/>
@@ -4034,7 +3837,7 @@
 </file>
 
 <file path=ppt/slideLayouts/slideLayout6.xml><?xml version="1.0" encoding="utf-8"?>
-<p:sldLayout xmlns:a="http://schemas.openxmlformats.org/drawingml/2006/main" xmlns:r="http://schemas.openxmlformats.org/officeDocument/2006/relationships" xmlns:p="http://schemas.openxmlformats.org/presentationml/2006/main" type="twoTxTwoObj" preserve="1">
+<p:sldLayout xmlns:a="http://schemas.openxmlformats.org/drawingml/2006/main" xmlns:r="http://schemas.openxmlformats.org/officeDocument/2006/relationships" xmlns:mc="http://schemas.openxmlformats.org/markup-compatibility/2006" xmlns:mv="urn:schemas-microsoft-com:mac:vml" xmlns:p="http://schemas.openxmlformats.org/presentationml/2006/main" mc:Ignorable="mv" mc:PreserveAttributes="mv:*" type="twoTxTwoObj" preserve="1">
   <p:cSld name="Comparison">
     <p:spTree>
       <p:nvGrpSpPr>
@@ -4102,35 +3905,35 @@
               <a:buNone/>
               <a:defRPr sz="3400" b="0"/>
             </a:lvl1pPr>
-            <a:lvl2pPr marL="650230" indent="0">
+            <a:lvl2pPr marL="650197" indent="0">
               <a:buNone/>
               <a:defRPr sz="2800" b="1"/>
             </a:lvl2pPr>
-            <a:lvl3pPr marL="1300460" indent="0">
+            <a:lvl3pPr marL="1300393" indent="0">
               <a:buNone/>
               <a:defRPr sz="2600" b="1"/>
             </a:lvl3pPr>
-            <a:lvl4pPr marL="1950690" indent="0">
+            <a:lvl4pPr marL="1950590" indent="0">
               <a:buNone/>
               <a:defRPr sz="2300" b="1"/>
             </a:lvl4pPr>
-            <a:lvl5pPr marL="2600919" indent="0">
+            <a:lvl5pPr marL="2600786" indent="0">
               <a:buNone/>
               <a:defRPr sz="2300" b="1"/>
             </a:lvl5pPr>
-            <a:lvl6pPr marL="3251149" indent="0">
+            <a:lvl6pPr marL="3250983" indent="0">
               <a:buNone/>
               <a:defRPr sz="2300" b="1"/>
             </a:lvl6pPr>
-            <a:lvl7pPr marL="3901379" indent="0">
+            <a:lvl7pPr marL="3901180" indent="0">
               <a:buNone/>
               <a:defRPr sz="2300" b="1"/>
             </a:lvl7pPr>
-            <a:lvl8pPr marL="4551609" indent="0">
+            <a:lvl8pPr marL="4551376" indent="0">
               <a:buNone/>
               <a:defRPr sz="2300" b="1"/>
             </a:lvl8pPr>
-            <a:lvl9pPr marL="5201839" indent="0">
+            <a:lvl9pPr marL="5201573" indent="0">
               <a:buNone/>
               <a:defRPr sz="2300" b="1"/>
             </a:lvl9pPr>
@@ -4256,35 +4059,35 @@
               <a:buNone/>
               <a:defRPr sz="3400" b="0"/>
             </a:lvl1pPr>
-            <a:lvl2pPr marL="650230" indent="0">
+            <a:lvl2pPr marL="650197" indent="0">
               <a:buNone/>
               <a:defRPr sz="2800" b="1"/>
             </a:lvl2pPr>
-            <a:lvl3pPr marL="1300460" indent="0">
+            <a:lvl3pPr marL="1300393" indent="0">
               <a:buNone/>
               <a:defRPr sz="2600" b="1"/>
             </a:lvl3pPr>
-            <a:lvl4pPr marL="1950690" indent="0">
+            <a:lvl4pPr marL="1950590" indent="0">
               <a:buNone/>
               <a:defRPr sz="2300" b="1"/>
             </a:lvl4pPr>
-            <a:lvl5pPr marL="2600919" indent="0">
+            <a:lvl5pPr marL="2600786" indent="0">
               <a:buNone/>
               <a:defRPr sz="2300" b="1"/>
             </a:lvl5pPr>
-            <a:lvl6pPr marL="3251149" indent="0">
+            <a:lvl6pPr marL="3250983" indent="0">
               <a:buNone/>
               <a:defRPr sz="2300" b="1"/>
             </a:lvl6pPr>
-            <a:lvl7pPr marL="3901379" indent="0">
+            <a:lvl7pPr marL="3901180" indent="0">
               <a:buNone/>
               <a:defRPr sz="2300" b="1"/>
             </a:lvl7pPr>
-            <a:lvl8pPr marL="4551609" indent="0">
+            <a:lvl8pPr marL="4551376" indent="0">
               <a:buNone/>
               <a:defRPr sz="2300" b="1"/>
             </a:lvl8pPr>
-            <a:lvl9pPr marL="5201839" indent="0">
+            <a:lvl9pPr marL="5201573" indent="0">
               <a:buNone/>
               <a:defRPr sz="2300" b="1"/>
             </a:lvl9pPr>
@@ -4397,7 +4200,7 @@
         </p:nvSpPr>
         <p:spPr>
           <a:xfrm>
-            <a:off x="9358356" y="267747"/>
+            <a:off x="9358356" y="267748"/>
             <a:ext cx="3034453" cy="519289"/>
           </a:xfrm>
         </p:spPr>
@@ -4425,7 +4228,7 @@
         </p:nvSpPr>
         <p:spPr>
           <a:xfrm>
-            <a:off x="1593725" y="267747"/>
+            <a:off x="1593725" y="267748"/>
             <a:ext cx="4118187" cy="519289"/>
           </a:xfrm>
         </p:spPr>
@@ -4722,7 +4525,7 @@
           <a:effectLst/>
         </p:spPr>
         <p:txBody>
-          <a:bodyPr vert="horz" wrap="square" lIns="130046" tIns="65023" rIns="130046" bIns="65023" anchor="t" compatLnSpc="1"/>
+          <a:bodyPr vert="horz" wrap="square" lIns="130039" tIns="65020" rIns="130039" bIns="65020" anchor="t" compatLnSpc="1"/>
           <a:lstStyle/>
           <a:p>
             <a:endParaRPr kumimoji="0" lang="en-US"/>
@@ -4738,7 +4541,7 @@
 </file>
 
 <file path=ppt/slideLayouts/slideLayout7.xml><?xml version="1.0" encoding="utf-8"?>
-<p:sldLayout xmlns:a="http://schemas.openxmlformats.org/drawingml/2006/main" xmlns:r="http://schemas.openxmlformats.org/officeDocument/2006/relationships" xmlns:p="http://schemas.openxmlformats.org/presentationml/2006/main" type="titleOnly" preserve="1">
+<p:sldLayout xmlns:a="http://schemas.openxmlformats.org/drawingml/2006/main" xmlns:r="http://schemas.openxmlformats.org/officeDocument/2006/relationships" xmlns:mc="http://schemas.openxmlformats.org/markup-compatibility/2006" xmlns:mv="urn:schemas-microsoft-com:mac:vml" xmlns:p="http://schemas.openxmlformats.org/presentationml/2006/main" mc:Ignorable="mv" mc:PreserveAttributes="mv:*" type="titleOnly" preserve="1">
   <p:cSld name="Title Only">
     <p:spTree>
       <p:nvGrpSpPr>
@@ -4876,7 +4679,7 @@
           <a:effectLst/>
         </p:spPr>
         <p:txBody>
-          <a:bodyPr vert="horz" wrap="square" lIns="130046" tIns="65023" rIns="130046" bIns="65023" anchor="t" compatLnSpc="1"/>
+          <a:bodyPr vert="horz" wrap="square" lIns="130039" tIns="65020" rIns="130039" bIns="65020" anchor="t" compatLnSpc="1"/>
           <a:lstStyle/>
           <a:p>
             <a:endParaRPr kumimoji="0" lang="en-US"/>
@@ -4892,7 +4695,7 @@
 </file>
 
 <file path=ppt/slideLayouts/slideLayout8.xml><?xml version="1.0" encoding="utf-8"?>
-<p:sldLayout xmlns:a="http://schemas.openxmlformats.org/drawingml/2006/main" xmlns:r="http://schemas.openxmlformats.org/officeDocument/2006/relationships" xmlns:p="http://schemas.openxmlformats.org/presentationml/2006/main" type="blank" preserve="1">
+<p:sldLayout xmlns:a="http://schemas.openxmlformats.org/drawingml/2006/main" xmlns:r="http://schemas.openxmlformats.org/officeDocument/2006/relationships" xmlns:mc="http://schemas.openxmlformats.org/markup-compatibility/2006" xmlns:mv="urn:schemas-microsoft-com:mac:vml" xmlns:p="http://schemas.openxmlformats.org/presentationml/2006/main" mc:Ignorable="mv" mc:PreserveAttributes="mv:*" type="blank" preserve="1">
   <p:cSld name="Blank">
     <p:spTree>
       <p:nvGrpSpPr>
@@ -5007,7 +4810,7 @@
           <a:effectLst/>
         </p:spPr>
         <p:txBody>
-          <a:bodyPr vert="horz" wrap="square" lIns="130046" tIns="65023" rIns="130046" bIns="65023" anchor="t" compatLnSpc="1"/>
+          <a:bodyPr vert="horz" wrap="square" lIns="130039" tIns="65020" rIns="130039" bIns="65020" anchor="t" compatLnSpc="1"/>
           <a:lstStyle/>
           <a:p>
             <a:endParaRPr kumimoji="0" lang="en-US"/>
@@ -5024,7 +4827,7 @@
         </p:nvSpPr>
         <p:spPr bwMode="auto">
           <a:xfrm>
-            <a:off x="635000" y="9052743"/>
+            <a:off x="634999" y="9052743"/>
             <a:ext cx="11704320" cy="0"/>
           </a:xfrm>
           <a:prstGeom prst="line">
@@ -5043,7 +4846,7 @@
           <a:effectLst/>
         </p:spPr>
         <p:txBody>
-          <a:bodyPr vert="horz" wrap="square" lIns="130046" tIns="65023" rIns="130046" bIns="65023" anchor="t" compatLnSpc="1"/>
+          <a:bodyPr vert="horz" wrap="square" lIns="130039" tIns="65020" rIns="130039" bIns="65020" anchor="t" compatLnSpc="1"/>
           <a:lstStyle/>
           <a:p>
             <a:endParaRPr kumimoji="0" lang="en-US"/>
@@ -5059,7 +4862,7 @@
 </file>
 
 <file path=ppt/slideLayouts/slideLayout9.xml><?xml version="1.0" encoding="utf-8"?>
-<p:sldLayout xmlns:a="http://schemas.openxmlformats.org/drawingml/2006/main" xmlns:r="http://schemas.openxmlformats.org/officeDocument/2006/relationships" xmlns:p="http://schemas.openxmlformats.org/presentationml/2006/main" type="objTx" preserve="1">
+<p:sldLayout xmlns:a="http://schemas.openxmlformats.org/drawingml/2006/main" xmlns:r="http://schemas.openxmlformats.org/officeDocument/2006/relationships" xmlns:mc="http://schemas.openxmlformats.org/markup-compatibility/2006" xmlns:mv="urn:schemas-microsoft-com:mac:vml" xmlns:p="http://schemas.openxmlformats.org/presentationml/2006/main" mc:Ignorable="mv" mc:PreserveAttributes="mv:*" type="objTx" preserve="1">
   <p:cSld name="Content with Caption">
     <p:spTree>
       <p:nvGrpSpPr>
@@ -5095,11 +4898,11 @@
           </a:solidFill>
         </p:spPr>
         <p:txBody>
-          <a:bodyPr vert="horz" lIns="1690598" tIns="65023" rIns="390138" bIns="65023" rtlCol="0" anchor="ctr">
+          <a:bodyPr vert="horz" lIns="1690511" tIns="65020" rIns="390118" bIns="65020" rtlCol="0" anchor="ctr">
             <a:normAutofit/>
           </a:bodyPr>
           <a:lstStyle>
-            <a:lvl1pPr marL="0" indent="0" algn="l" defTabSz="1300460" rtl="0" eaLnBrk="1" latinLnBrk="0" hangingPunct="1">
+            <a:lvl1pPr marL="0" indent="0" algn="l" defTabSz="1300393" rtl="0" eaLnBrk="1" latinLnBrk="0" hangingPunct="1">
               <a:spcBef>
                 <a:spcPct val="0"/>
               </a:spcBef>
@@ -5250,11 +5053,11 @@
           </a:fontRef>
         </p:style>
         <p:txBody>
-          <a:bodyPr vert="horz" lIns="416147" tIns="390138" rIns="390138" bIns="390138" rtlCol="0" anchor="t" anchorCtr="0">
+          <a:bodyPr vert="horz" lIns="416126" tIns="390118" rIns="390118" bIns="390118" rtlCol="0" anchor="t" anchorCtr="0">
             <a:normAutofit/>
           </a:bodyPr>
           <a:lstStyle>
-            <a:lvl1pPr marL="0" indent="0" algn="l" defTabSz="1300460" rtl="0" eaLnBrk="1" latinLnBrk="0" hangingPunct="1">
+            <a:lvl1pPr marL="0" indent="0" algn="l" defTabSz="1300393" rtl="0" eaLnBrk="1" latinLnBrk="0" hangingPunct="1">
               <a:spcBef>
                 <a:spcPts val="2844"/>
               </a:spcBef>
@@ -5275,35 +5078,35 @@
                 <a:cs typeface="+mn-cs"/>
               </a:defRPr>
             </a:lvl1pPr>
-            <a:lvl2pPr marL="650230" indent="0">
+            <a:lvl2pPr marL="650197" indent="0">
               <a:buNone/>
               <a:defRPr sz="1700"/>
             </a:lvl2pPr>
-            <a:lvl3pPr marL="1300460" indent="0">
+            <a:lvl3pPr marL="1300393" indent="0">
               <a:buNone/>
               <a:defRPr sz="1400"/>
             </a:lvl3pPr>
-            <a:lvl4pPr marL="1950690" indent="0">
+            <a:lvl4pPr marL="1950590" indent="0">
               <a:buNone/>
               <a:defRPr sz="1300"/>
             </a:lvl4pPr>
-            <a:lvl5pPr marL="2600919" indent="0">
+            <a:lvl5pPr marL="2600786" indent="0">
               <a:buNone/>
               <a:defRPr sz="1300"/>
             </a:lvl5pPr>
-            <a:lvl6pPr marL="3251149" indent="0">
+            <a:lvl6pPr marL="3250983" indent="0">
               <a:buNone/>
               <a:defRPr sz="1300"/>
             </a:lvl6pPr>
-            <a:lvl7pPr marL="3901379" indent="0">
+            <a:lvl7pPr marL="3901180" indent="0">
               <a:buNone/>
               <a:defRPr sz="1300"/>
             </a:lvl7pPr>
-            <a:lvl8pPr marL="4551609" indent="0">
+            <a:lvl8pPr marL="4551376" indent="0">
               <a:buNone/>
               <a:defRPr sz="1300"/>
             </a:lvl8pPr>
-            <a:lvl9pPr marL="5201839" indent="0">
+            <a:lvl9pPr marL="5201573" indent="0">
               <a:buNone/>
               <a:defRPr sz="1300"/>
             </a:lvl9pPr>
@@ -5329,7 +5132,7 @@
         </p:nvSpPr>
         <p:spPr>
           <a:xfrm>
-            <a:off x="9358356" y="267747"/>
+            <a:off x="9358356" y="267748"/>
             <a:ext cx="3034453" cy="519289"/>
           </a:xfrm>
         </p:spPr>
@@ -5402,7 +5205,7 @@
         </p:nvSpPr>
         <p:spPr bwMode="auto">
           <a:xfrm>
-            <a:off x="635000" y="9052743"/>
+            <a:off x="634999" y="9052743"/>
             <a:ext cx="11704320" cy="0"/>
           </a:xfrm>
           <a:prstGeom prst="line">
@@ -5421,7 +5224,7 @@
           <a:effectLst/>
         </p:spPr>
         <p:txBody>
-          <a:bodyPr vert="horz" wrap="square" lIns="130046" tIns="65023" rIns="130046" bIns="65023" anchor="t" compatLnSpc="1"/>
+          <a:bodyPr vert="horz" wrap="square" lIns="130039" tIns="65020" rIns="130039" bIns="65020" anchor="t" compatLnSpc="1"/>
           <a:lstStyle/>
           <a:p>
             <a:endParaRPr kumimoji="0" lang="en-US"/>
@@ -5437,7 +5240,7 @@
 </file>
 
 <file path=ppt/slideMasters/slideMaster1.xml><?xml version="1.0" encoding="utf-8"?>
-<p:sldMaster xmlns:a="http://schemas.openxmlformats.org/drawingml/2006/main" xmlns:r="http://schemas.openxmlformats.org/officeDocument/2006/relationships" xmlns:p="http://schemas.openxmlformats.org/presentationml/2006/main">
+<p:sldMaster xmlns:a="http://schemas.openxmlformats.org/drawingml/2006/main" xmlns:r="http://schemas.openxmlformats.org/officeDocument/2006/relationships" xmlns:mc="http://schemas.openxmlformats.org/markup-compatibility/2006" xmlns:mv="urn:schemas-microsoft-com:mac:vml" xmlns:p="http://schemas.openxmlformats.org/presentationml/2006/main" mc:Ignorable="mv" mc:PreserveAttributes="mv:*">
   <p:cSld>
     <p:bg>
       <p:bgRef idx="1001">
@@ -5470,7 +5273,7 @@
         </p:nvSpPr>
         <p:spPr>
           <a:xfrm>
-            <a:off x="1" y="1598373"/>
+            <a:off x="2" y="1598373"/>
             <a:ext cx="12677423" cy="1300480"/>
           </a:xfrm>
           <a:prstGeom prst="rect">
@@ -5481,7 +5284,7 @@
           </a:solidFill>
         </p:spPr>
         <p:txBody>
-          <a:bodyPr vert="horz" lIns="1690598" tIns="65023" rIns="390138" bIns="65023" rtlCol="0" anchor="ctr">
+          <a:bodyPr vert="horz" lIns="1690511" tIns="65020" rIns="390118" bIns="65020" rtlCol="0" anchor="ctr">
             <a:normAutofit/>
           </a:bodyPr>
           <a:lstStyle/>
@@ -5506,7 +5309,7 @@
         </p:nvSpPr>
         <p:spPr>
           <a:xfrm>
-            <a:off x="1584959" y="3691467"/>
+            <a:off x="1584959" y="3691468"/>
             <a:ext cx="10823788" cy="5220646"/>
           </a:xfrm>
           <a:prstGeom prst="rect">
@@ -5514,7 +5317,7 @@
           </a:prstGeom>
         </p:spPr>
         <p:txBody>
-          <a:bodyPr vert="horz" lIns="130046" tIns="65023" rIns="130046" bIns="65023" rtlCol="0">
+          <a:bodyPr vert="horz" lIns="130039" tIns="65020" rIns="130039" bIns="65020" rtlCol="0">
             <a:normAutofit/>
           </a:bodyPr>
           <a:lstStyle/>
@@ -5568,7 +5371,7 @@
         </p:nvSpPr>
         <p:spPr>
           <a:xfrm>
-            <a:off x="9358356" y="267747"/>
+            <a:off x="9358356" y="267748"/>
             <a:ext cx="3034453" cy="519289"/>
           </a:xfrm>
           <a:prstGeom prst="rect">
@@ -5576,7 +5379,7 @@
           </a:prstGeom>
         </p:spPr>
         <p:txBody>
-          <a:bodyPr vert="horz" lIns="130046" tIns="65023" rIns="130046" bIns="65023" rtlCol="0" anchor="ctr"/>
+          <a:bodyPr vert="horz" lIns="130039" tIns="65020" rIns="130039" bIns="65020" rtlCol="0" anchor="ctr"/>
           <a:lstStyle>
             <a:lvl1pPr algn="r">
               <a:defRPr sz="1400">
@@ -5610,7 +5413,7 @@
         </p:nvSpPr>
         <p:spPr>
           <a:xfrm>
-            <a:off x="1593725" y="267747"/>
+            <a:off x="1593725" y="267748"/>
             <a:ext cx="4118187" cy="519289"/>
           </a:xfrm>
           <a:prstGeom prst="rect">
@@ -5618,7 +5421,7 @@
           </a:prstGeom>
         </p:spPr>
         <p:txBody>
-          <a:bodyPr vert="horz" lIns="130046" tIns="65023" rIns="130046" bIns="65023" rtlCol="0" anchor="ctr"/>
+          <a:bodyPr vert="horz" lIns="130039" tIns="65020" rIns="130039" bIns="65020" rtlCol="0" anchor="ctr"/>
           <a:lstStyle>
             <a:lvl1pPr algn="l">
               <a:defRPr sz="1400">
@@ -5656,7 +5459,7 @@
         </p:nvSpPr>
         <p:spPr>
           <a:xfrm>
-            <a:off x="12501183" y="9342685"/>
+            <a:off x="12501183" y="9342687"/>
             <a:ext cx="650240" cy="519289"/>
           </a:xfrm>
           <a:prstGeom prst="rect">
@@ -5664,7 +5467,7 @@
           </a:prstGeom>
         </p:spPr>
         <p:txBody>
-          <a:bodyPr vert="horz" lIns="130046" tIns="65023" rIns="130046" bIns="65023" rtlCol="0" anchor="ctr"/>
+          <a:bodyPr vert="horz" lIns="130039" tIns="65020" rIns="130039" bIns="65020" rtlCol="0" anchor="ctr"/>
           <a:lstStyle>
             <a:lvl1pPr algn="ctr">
               <a:defRPr sz="1100">
@@ -5695,7 +5498,7 @@
         </p:nvSpPr>
         <p:spPr>
           <a:xfrm>
-            <a:off x="1300481" y="0"/>
+            <a:off x="1300482" y="0"/>
             <a:ext cx="11376943" cy="260096"/>
           </a:xfrm>
           <a:prstGeom prst="rect">
@@ -5728,7 +5531,7 @@
           </a:fontRef>
         </p:style>
         <p:txBody>
-          <a:bodyPr lIns="130046" tIns="65023" rIns="130046" bIns="65023" rtlCol="0" anchor="ctr"/>
+          <a:bodyPr lIns="130039" tIns="65020" rIns="130039" bIns="65020" rtlCol="0" anchor="ctr"/>
           <a:lstStyle/>
           <a:p>
             <a:pPr algn="ctr"/>
@@ -5744,7 +5547,7 @@
         </p:nvSpPr>
         <p:spPr>
           <a:xfrm>
-            <a:off x="1300481" y="9493504"/>
+            <a:off x="1300482" y="9493504"/>
             <a:ext cx="11376943" cy="260096"/>
           </a:xfrm>
           <a:prstGeom prst="rect">
@@ -5777,7 +5580,7 @@
           </a:fontRef>
         </p:style>
         <p:txBody>
-          <a:bodyPr lIns="130046" tIns="65023" rIns="130046" bIns="65023" rtlCol="0" anchor="ctr"/>
+          <a:bodyPr lIns="130039" tIns="65020" rIns="130039" bIns="65020" rtlCol="0" anchor="ctr"/>
           <a:lstStyle/>
           <a:p>
             <a:pPr algn="ctr"/>
@@ -5804,12 +5607,11 @@
     <p:sldLayoutId id="2147483714" r:id="rId13"/>
     <p:sldLayoutId id="2147483715" r:id="rId14"/>
     <p:sldLayoutId id="2147483716" r:id="rId15"/>
-    <p:sldLayoutId id="2147483717" r:id="rId16"/>
   </p:sldLayoutIdLst>
   <p:hf hdr="0"/>
   <p:txStyles>
     <p:titleStyle>
-      <a:lvl1pPr marL="0" indent="0" algn="l" defTabSz="1300460" rtl="0" eaLnBrk="1" latinLnBrk="0" hangingPunct="1">
+      <a:lvl1pPr marL="0" indent="0" algn="l" defTabSz="1300393" rtl="0" eaLnBrk="1" latinLnBrk="0" hangingPunct="1">
         <a:spcBef>
           <a:spcPct val="0"/>
         </a:spcBef>
@@ -5825,7 +5627,7 @@
       </a:lvl1pPr>
     </p:titleStyle>
     <p:bodyStyle>
-      <a:lvl1pPr marL="487672" indent="-487672" algn="l" defTabSz="1300460" rtl="0" eaLnBrk="1" latinLnBrk="0" hangingPunct="1">
+      <a:lvl1pPr marL="487647" indent="-487647" algn="l" defTabSz="1300393" rtl="0" eaLnBrk="1" latinLnBrk="0" hangingPunct="1">
         <a:spcBef>
           <a:spcPts val="2844"/>
         </a:spcBef>
@@ -5846,7 +5648,7 @@
           <a:cs typeface="+mn-cs"/>
         </a:defRPr>
       </a:lvl1pPr>
-      <a:lvl2pPr marL="975345" indent="-478641" algn="l" defTabSz="1300460" rtl="0" eaLnBrk="1" latinLnBrk="0" hangingPunct="1">
+      <a:lvl2pPr marL="975295" indent="-478616" algn="l" defTabSz="1300393" rtl="0" eaLnBrk="1" latinLnBrk="0" hangingPunct="1">
         <a:spcBef>
           <a:spcPts val="853"/>
         </a:spcBef>
@@ -5869,7 +5671,7 @@
           <a:cs typeface="+mn-cs"/>
         </a:defRPr>
       </a:lvl2pPr>
-      <a:lvl3pPr marL="1472048" indent="-496703" algn="l" defTabSz="1300460" rtl="0" eaLnBrk="1" latinLnBrk="0" hangingPunct="1">
+      <a:lvl3pPr marL="1471973" indent="-496678" algn="l" defTabSz="1300393" rtl="0" eaLnBrk="1" latinLnBrk="0" hangingPunct="1">
         <a:spcBef>
           <a:spcPts val="853"/>
         </a:spcBef>
@@ -5890,7 +5692,7 @@
           <a:cs typeface="+mn-cs"/>
         </a:defRPr>
       </a:lvl3pPr>
-      <a:lvl4pPr marL="1950690" indent="-478641" algn="l" defTabSz="1300460" rtl="0" eaLnBrk="1" latinLnBrk="0" hangingPunct="1">
+      <a:lvl4pPr marL="1950590" indent="-478616" algn="l" defTabSz="1300393" rtl="0" eaLnBrk="1" latinLnBrk="0" hangingPunct="1">
         <a:spcBef>
           <a:spcPts val="853"/>
         </a:spcBef>
@@ -5913,7 +5715,7 @@
           <a:cs typeface="+mn-cs"/>
         </a:defRPr>
       </a:lvl4pPr>
-      <a:lvl5pPr marL="2447393" indent="-496703" algn="l" defTabSz="1300460" rtl="0" eaLnBrk="1" latinLnBrk="0" hangingPunct="1">
+      <a:lvl5pPr marL="2447268" indent="-496678" algn="l" defTabSz="1300393" rtl="0" eaLnBrk="1" latinLnBrk="0" hangingPunct="1">
         <a:spcBef>
           <a:spcPts val="853"/>
         </a:spcBef>
@@ -5934,7 +5736,7 @@
           <a:cs typeface="+mn-cs"/>
         </a:defRPr>
       </a:lvl5pPr>
-      <a:lvl6pPr marL="3576264" indent="-325115" algn="l" defTabSz="1300460" rtl="0" eaLnBrk="1" latinLnBrk="0" hangingPunct="1">
+      <a:lvl6pPr marL="3576081" indent="-325098" algn="l" defTabSz="1300393" rtl="0" eaLnBrk="1" latinLnBrk="0" hangingPunct="1">
         <a:spcBef>
           <a:spcPct val="20000"/>
         </a:spcBef>
@@ -5949,7 +5751,7 @@
           <a:cs typeface="+mn-cs"/>
         </a:defRPr>
       </a:lvl6pPr>
-      <a:lvl7pPr marL="4226494" indent="-325115" algn="l" defTabSz="1300460" rtl="0" eaLnBrk="1" latinLnBrk="0" hangingPunct="1">
+      <a:lvl7pPr marL="4226278" indent="-325098" algn="l" defTabSz="1300393" rtl="0" eaLnBrk="1" latinLnBrk="0" hangingPunct="1">
         <a:spcBef>
           <a:spcPct val="20000"/>
         </a:spcBef>
@@ -5964,7 +5766,7 @@
           <a:cs typeface="+mn-cs"/>
         </a:defRPr>
       </a:lvl7pPr>
-      <a:lvl8pPr marL="4876724" indent="-325115" algn="l" defTabSz="1300460" rtl="0" eaLnBrk="1" latinLnBrk="0" hangingPunct="1">
+      <a:lvl8pPr marL="4876475" indent="-325098" algn="l" defTabSz="1300393" rtl="0" eaLnBrk="1" latinLnBrk="0" hangingPunct="1">
         <a:spcBef>
           <a:spcPct val="20000"/>
         </a:spcBef>
@@ -5979,7 +5781,7 @@
           <a:cs typeface="+mn-cs"/>
         </a:defRPr>
       </a:lvl8pPr>
-      <a:lvl9pPr marL="5526954" indent="-325115" algn="l" defTabSz="1300460" rtl="0" eaLnBrk="1" latinLnBrk="0" hangingPunct="1">
+      <a:lvl9pPr marL="5526671" indent="-325098" algn="l" defTabSz="1300393" rtl="0" eaLnBrk="1" latinLnBrk="0" hangingPunct="1">
         <a:spcBef>
           <a:spcPct val="20000"/>
         </a:spcBef>
@@ -5999,7 +5801,7 @@
       <a:defPPr>
         <a:defRPr/>
       </a:defPPr>
-      <a:lvl1pPr marL="0" algn="l" defTabSz="1300460" rtl="0" eaLnBrk="1" latinLnBrk="0" hangingPunct="1">
+      <a:lvl1pPr marL="0" algn="l" defTabSz="1300393" rtl="0" eaLnBrk="1" latinLnBrk="0" hangingPunct="1">
         <a:defRPr sz="2600" kern="1200">
           <a:solidFill>
             <a:schemeClr val="tx1"/>
@@ -6009,7 +5811,7 @@
           <a:cs typeface="+mn-cs"/>
         </a:defRPr>
       </a:lvl1pPr>
-      <a:lvl2pPr marL="650230" algn="l" defTabSz="1300460" rtl="0" eaLnBrk="1" latinLnBrk="0" hangingPunct="1">
+      <a:lvl2pPr marL="650197" algn="l" defTabSz="1300393" rtl="0" eaLnBrk="1" latinLnBrk="0" hangingPunct="1">
         <a:defRPr sz="2600" kern="1200">
           <a:solidFill>
             <a:schemeClr val="tx1"/>
@@ -6019,7 +5821,7 @@
           <a:cs typeface="+mn-cs"/>
         </a:defRPr>
       </a:lvl2pPr>
-      <a:lvl3pPr marL="1300460" algn="l" defTabSz="1300460" rtl="0" eaLnBrk="1" latinLnBrk="0" hangingPunct="1">
+      <a:lvl3pPr marL="1300393" algn="l" defTabSz="1300393" rtl="0" eaLnBrk="1" latinLnBrk="0" hangingPunct="1">
         <a:defRPr sz="2600" kern="1200">
           <a:solidFill>
             <a:schemeClr val="tx1"/>
@@ -6029,7 +5831,7 @@
           <a:cs typeface="+mn-cs"/>
         </a:defRPr>
       </a:lvl3pPr>
-      <a:lvl4pPr marL="1950690" algn="l" defTabSz="1300460" rtl="0" eaLnBrk="1" latinLnBrk="0" hangingPunct="1">
+      <a:lvl4pPr marL="1950590" algn="l" defTabSz="1300393" rtl="0" eaLnBrk="1" latinLnBrk="0" hangingPunct="1">
         <a:defRPr sz="2600" kern="1200">
           <a:solidFill>
             <a:schemeClr val="tx1"/>
@@ -6039,7 +5841,7 @@
           <a:cs typeface="+mn-cs"/>
         </a:defRPr>
       </a:lvl4pPr>
-      <a:lvl5pPr marL="2600919" algn="l" defTabSz="1300460" rtl="0" eaLnBrk="1" latinLnBrk="0" hangingPunct="1">
+      <a:lvl5pPr marL="2600786" algn="l" defTabSz="1300393" rtl="0" eaLnBrk="1" latinLnBrk="0" hangingPunct="1">
         <a:defRPr sz="2600" kern="1200">
           <a:solidFill>
             <a:schemeClr val="tx1"/>
@@ -6049,7 +5851,7 @@
           <a:cs typeface="+mn-cs"/>
         </a:defRPr>
       </a:lvl5pPr>
-      <a:lvl6pPr marL="3251149" algn="l" defTabSz="1300460" rtl="0" eaLnBrk="1" latinLnBrk="0" hangingPunct="1">
+      <a:lvl6pPr marL="3250983" algn="l" defTabSz="1300393" rtl="0" eaLnBrk="1" latinLnBrk="0" hangingPunct="1">
         <a:defRPr sz="2600" kern="1200">
           <a:solidFill>
             <a:schemeClr val="tx1"/>
@@ -6059,7 +5861,7 @@
           <a:cs typeface="+mn-cs"/>
         </a:defRPr>
       </a:lvl6pPr>
-      <a:lvl7pPr marL="3901379" algn="l" defTabSz="1300460" rtl="0" eaLnBrk="1" latinLnBrk="0" hangingPunct="1">
+      <a:lvl7pPr marL="3901180" algn="l" defTabSz="1300393" rtl="0" eaLnBrk="1" latinLnBrk="0" hangingPunct="1">
         <a:defRPr sz="2600" kern="1200">
           <a:solidFill>
             <a:schemeClr val="tx1"/>
@@ -6069,7 +5871,7 @@
           <a:cs typeface="+mn-cs"/>
         </a:defRPr>
       </a:lvl7pPr>
-      <a:lvl8pPr marL="4551609" algn="l" defTabSz="1300460" rtl="0" eaLnBrk="1" latinLnBrk="0" hangingPunct="1">
+      <a:lvl8pPr marL="4551376" algn="l" defTabSz="1300393" rtl="0" eaLnBrk="1" latinLnBrk="0" hangingPunct="1">
         <a:defRPr sz="2600" kern="1200">
           <a:solidFill>
             <a:schemeClr val="tx1"/>
@@ -6079,7 +5881,7 @@
           <a:cs typeface="+mn-cs"/>
         </a:defRPr>
       </a:lvl8pPr>
-      <a:lvl9pPr marL="5201839" algn="l" defTabSz="1300460" rtl="0" eaLnBrk="1" latinLnBrk="0" hangingPunct="1">
+      <a:lvl9pPr marL="5201573" algn="l" defTabSz="1300393" rtl="0" eaLnBrk="1" latinLnBrk="0" hangingPunct="1">
         <a:defRPr sz="2600" kern="1200">
           <a:solidFill>
             <a:schemeClr val="tx1"/>
@@ -6095,7 +5897,7 @@
 </file>
 
 <file path=ppt/slides/slide1.xml><?xml version="1.0" encoding="utf-8"?>
-<p:sld xmlns:a="http://schemas.openxmlformats.org/drawingml/2006/main" xmlns:r="http://schemas.openxmlformats.org/officeDocument/2006/relationships" xmlns:p="http://schemas.openxmlformats.org/presentationml/2006/main">
+<p:sld xmlns:a="http://schemas.openxmlformats.org/drawingml/2006/main" xmlns:r="http://schemas.openxmlformats.org/officeDocument/2006/relationships" xmlns:mc="http://schemas.openxmlformats.org/markup-compatibility/2006" xmlns:mv="urn:schemas-microsoft-com:mac:vml" xmlns:p="http://schemas.openxmlformats.org/presentationml/2006/main" mc:Ignorable="mv" mc:PreserveAttributes="mv:*">
   <p:cSld>
     <p:spTree>
       <p:nvGrpSpPr>
@@ -6113,160 +5915,154 @@
       </p:grpSpPr>
       <p:sp>
         <p:nvSpPr>
-          <p:cNvPr id="20481" name="Rectangle 1"/>
-          <p:cNvSpPr>
-            <a:spLocks noGrp="1" noChangeArrowheads="1"/>
-          </p:cNvSpPr>
-          <p:nvPr>
-            <p:ph type="ctrTitle"/>
+          <p:cNvPr id="3" name="Subtitle 2"/>
+          <p:cNvSpPr>
+            <a:spLocks noGrp="1"/>
+          </p:cNvSpPr>
+          <p:nvPr>
+            <p:ph type="subTitle" idx="4294967295"/>
           </p:nvPr>
         </p:nvSpPr>
         <p:spPr>
           <a:xfrm>
-            <a:off x="1778000" y="5486400"/>
-            <a:ext cx="9709573" cy="1449493"/>
+            <a:off x="1300480" y="6141156"/>
+            <a:ext cx="11379200" cy="3612444"/>
           </a:xfrm>
         </p:spPr>
         <p:txBody>
-          <a:bodyPr>
-            <a:normAutofit fontScale="90000"/>
-          </a:bodyPr>
-          <a:lstStyle/>
-          <a:p>
-            <a:r>
-              <a:rPr lang="en-US" dirty="0" smtClean="0">
-                <a:solidFill>
-                  <a:schemeClr val="bg2"/>
-                </a:solidFill>
-              </a:rPr>
-              <a:t>SAGA: API Layers – </a:t>
-            </a:r>
-            <a:br>
-              <a:rPr lang="en-US" dirty="0" smtClean="0">
-                <a:solidFill>
-                  <a:schemeClr val="bg2"/>
-                </a:solidFill>
-              </a:rPr>
-            </a:br>
-            <a:r>
-              <a:rPr lang="en-US" dirty="0" smtClean="0">
-                <a:solidFill>
-                  <a:schemeClr val="bg2"/>
-                </a:solidFill>
-              </a:rPr>
-              <a:t>Shell, Python, C++</a:t>
-            </a:r>
-            <a:br>
-              <a:rPr lang="en-US" dirty="0" smtClean="0">
-                <a:solidFill>
-                  <a:schemeClr val="bg2"/>
-                </a:solidFill>
-              </a:rPr>
-            </a:br>
-            <a:endParaRPr lang="en-US" dirty="0">
-              <a:solidFill>
-                <a:schemeClr val="bg2"/>
-              </a:solidFill>
-              <a:hlinkClick r:id="rId2"/>
-            </a:endParaRPr>
-          </a:p>
-        </p:txBody>
-      </p:sp>
-      <p:sp>
-        <p:nvSpPr>
-          <p:cNvPr id="2" name="Subtitle 1"/>
-          <p:cNvSpPr>
-            <a:spLocks noGrp="1"/>
-          </p:cNvSpPr>
-          <p:nvPr>
-            <p:ph type="subTitle" idx="1"/>
-          </p:nvPr>
-        </p:nvSpPr>
-        <p:spPr/>
-        <p:txBody>
-          <a:bodyPr/>
-          <a:lstStyle/>
-          <a:p>
+          <a:bodyPr/>
+          <a:lstStyle/>
+          <a:p>
+            <a:r>
+              <a:rPr lang="en-US" dirty="0" smtClean="0"/>
+              <a:t>Building and Installing</a:t>
+            </a:r>
             <a:endParaRPr lang="en-US" dirty="0"/>
           </a:p>
         </p:txBody>
       </p:sp>
       <p:sp>
         <p:nvSpPr>
-          <p:cNvPr id="3" name="Date Placeholder 2"/>
-          <p:cNvSpPr>
-            <a:spLocks noGrp="1"/>
-          </p:cNvSpPr>
-          <p:nvPr>
-            <p:ph type="dt" sz="half" idx="2"/>
-          </p:nvPr>
-        </p:nvSpPr>
-        <p:spPr/>
-        <p:txBody>
-          <a:bodyPr/>
-          <a:lstStyle/>
-          <a:p>
-            <a:r>
-              <a:rPr lang="en-US" dirty="0" smtClean="0"/>
-              <a:t>November 29th, 2010</a:t>
+          <p:cNvPr id="13" name="Title 12"/>
+          <p:cNvSpPr>
+            <a:spLocks noGrp="1"/>
+          </p:cNvSpPr>
+          <p:nvPr>
+            <p:ph type="title"/>
+          </p:nvPr>
+        </p:nvSpPr>
+        <p:spPr/>
+        <p:txBody>
+          <a:bodyPr tIns="390138"/>
+          <a:lstStyle/>
+          <a:p>
+            <a:r>
+              <a:rPr lang="en-US" dirty="0" smtClean="0"/>
+              <a:t>SAGA API Examples: Shell, Python and C++ </a:t>
             </a:r>
             <a:endParaRPr lang="en-US" dirty="0"/>
           </a:p>
         </p:txBody>
       </p:sp>
-      <p:sp>
-        <p:nvSpPr>
-          <p:cNvPr id="4" name="Footer Placeholder 3"/>
-          <p:cNvSpPr>
-            <a:spLocks noGrp="1"/>
-          </p:cNvSpPr>
-          <p:nvPr>
-            <p:ph type="ftr" sz="quarter" idx="3"/>
-          </p:nvPr>
-        </p:nvSpPr>
-        <p:spPr/>
-        <p:txBody>
-          <a:bodyPr/>
-          <a:lstStyle/>
-          <a:p>
-            <a:r>
-              <a:rPr lang="en-US" smtClean="0"/>
-              <a:t>TeraGrid SAGA Tutorial</a:t>
-            </a:r>
-            <a:endParaRPr lang="en-US" dirty="0"/>
-          </a:p>
-        </p:txBody>
-      </p:sp>
-      <p:sp>
-        <p:nvSpPr>
-          <p:cNvPr id="5" name="Slide Number Placeholder 4"/>
-          <p:cNvSpPr>
-            <a:spLocks noGrp="1"/>
-          </p:cNvSpPr>
-          <p:nvPr>
-            <p:ph type="sldNum" sz="quarter" idx="4"/>
-          </p:nvPr>
-        </p:nvSpPr>
-        <p:spPr/>
-        <p:txBody>
-          <a:bodyPr/>
-          <a:lstStyle/>
-          <a:p>
-            <a:fld id="{7A426C1A-D210-4B4B-86AA-6AEDDDCCF5FF}" type="slidenum">
-              <a:rPr lang="en-US" smtClean="0"/>
-              <a:pPr/>
-              <a:t>1</a:t>
-            </a:fld>
-            <a:endParaRPr lang="en-US"/>
-          </a:p>
-        </p:txBody>
-      </p:sp>
+      <p:pic>
+        <p:nvPicPr>
+          <p:cNvPr id="8" name="Picture 7"/>
+          <p:cNvPicPr>
+            <a:picLocks noChangeAspect="1"/>
+          </p:cNvPicPr>
+          <p:nvPr/>
+        </p:nvPicPr>
+        <p:blipFill>
+          <a:blip r:embed="rId3">
+            <a:clrChange>
+              <a:clrFrom>
+                <a:srgbClr val="FFFFFF"/>
+              </a:clrFrom>
+              <a:clrTo>
+                <a:srgbClr val="FFFFFF">
+                  <a:alpha val="0"/>
+                </a:srgbClr>
+              </a:clrTo>
+            </a:clrChange>
+          </a:blip>
+          <a:stretch>
+            <a:fillRect/>
+          </a:stretch>
+        </p:blipFill>
+        <p:spPr>
+          <a:xfrm>
+            <a:off x="11670058" y="8935683"/>
+            <a:ext cx="672331" cy="659422"/>
+          </a:xfrm>
+          <a:prstGeom prst="rect">
+            <a:avLst/>
+          </a:prstGeom>
+        </p:spPr>
+      </p:pic>
+      <p:pic>
+        <p:nvPicPr>
+          <p:cNvPr id="9" name="Picture 8"/>
+          <p:cNvPicPr>
+            <a:picLocks noChangeAspect="1"/>
+          </p:cNvPicPr>
+          <p:nvPr/>
+        </p:nvPicPr>
+        <p:blipFill>
+          <a:blip r:embed="rId4">
+            <a:clrChange>
+              <a:clrFrom>
+                <a:srgbClr val="FFFFFF"/>
+              </a:clrFrom>
+              <a:clrTo>
+                <a:srgbClr val="FFFFFF">
+                  <a:alpha val="0"/>
+                </a:srgbClr>
+              </a:clrTo>
+            </a:clrChange>
+          </a:blip>
+          <a:stretch>
+            <a:fillRect/>
+          </a:stretch>
+        </p:blipFill>
+        <p:spPr>
+          <a:xfrm>
+            <a:off x="10867233" y="8919839"/>
+            <a:ext cx="659422" cy="659422"/>
+          </a:xfrm>
+          <a:prstGeom prst="rect">
+            <a:avLst/>
+          </a:prstGeom>
+        </p:spPr>
+      </p:pic>
+      <p:pic>
+        <p:nvPicPr>
+          <p:cNvPr id="10" name="Picture 9"/>
+          <p:cNvPicPr>
+            <a:picLocks noChangeAspect="1"/>
+          </p:cNvPicPr>
+          <p:nvPr/>
+        </p:nvPicPr>
+        <p:blipFill>
+          <a:blip r:embed="rId5"/>
+          <a:stretch>
+            <a:fillRect/>
+          </a:stretch>
+        </p:blipFill>
+        <p:spPr>
+          <a:xfrm>
+            <a:off x="9228474" y="8969478"/>
+            <a:ext cx="1535552" cy="599825"/>
+          </a:xfrm>
+          <a:prstGeom prst="rect">
+            <a:avLst/>
+          </a:prstGeom>
+        </p:spPr>
+      </p:pic>
     </p:spTree>
   </p:cSld>
   <p:clrMapOvr>
     <a:masterClrMapping/>
   </p:clrMapOvr>
-  <p:transition/>
   <p:timing>
     <p:tnLst>
       <p:par>
@@ -6278,7 +6074,7 @@
 </file>
 
 <file path=ppt/slides/slide10.xml><?xml version="1.0" encoding="utf-8"?>
-<p:sld xmlns:a="http://schemas.openxmlformats.org/drawingml/2006/main" xmlns:r="http://schemas.openxmlformats.org/officeDocument/2006/relationships" xmlns:p="http://schemas.openxmlformats.org/presentationml/2006/main">
+<p:sld xmlns:a="http://schemas.openxmlformats.org/drawingml/2006/main" xmlns:r="http://schemas.openxmlformats.org/officeDocument/2006/relationships" xmlns:mc="http://schemas.openxmlformats.org/markup-compatibility/2006" xmlns:mv="urn:schemas-microsoft-com:mac:vml" xmlns:p="http://schemas.openxmlformats.org/presentationml/2006/main" mc:Ignorable="mv" mc:PreserveAttributes="mv:*">
   <p:cSld>
     <p:spTree>
       <p:nvGrpSpPr>
@@ -6343,7 +6139,7 @@
           <a:p>
             <a:pPr lvl="1" fontAlgn="ctr"/>
             <a:r>
-              <a:rPr lang="de-DE" sz="3200" dirty="0" smtClean="0"/>
+              <a:rPr lang="de-DE" sz="3100" dirty="0" smtClean="0"/>
               <a:t>Central data store with </a:t>
             </a:r>
           </a:p>
@@ -6364,7 +6160,7 @@
           <a:p>
             <a:pPr lvl="1" fontAlgn="ctr"/>
             <a:r>
-              <a:rPr lang="de-DE" sz="3200" dirty="0" smtClean="0"/>
+              <a:rPr lang="de-DE" sz="3100" dirty="0" smtClean="0"/>
               <a:t>Filesystem like structure</a:t>
             </a:r>
           </a:p>
@@ -6378,14 +6174,14 @@
           <a:p>
             <a:pPr lvl="1" fontAlgn="ctr"/>
             <a:r>
-              <a:rPr lang="de-DE" sz="3200" dirty="0" smtClean="0"/>
+              <a:rPr lang="de-DE" sz="3100" dirty="0" smtClean="0"/>
               <a:t>Depends on SAGA adaptors</a:t>
             </a:r>
           </a:p>
           <a:p>
             <a:pPr lvl="1" fontAlgn="ctr"/>
             <a:r>
-              <a:rPr lang="de-DE" sz="3200" dirty="0" smtClean="0"/>
+              <a:rPr lang="de-DE" sz="3100" dirty="0" smtClean="0"/>
               <a:t>Local adaptor:</a:t>
             </a:r>
           </a:p>
@@ -6406,7 +6202,7 @@
           <a:p>
             <a:pPr lvl="1" fontAlgn="ctr"/>
             <a:r>
-              <a:rPr lang="de-DE" sz="3200" dirty="0" smtClean="0"/>
+              <a:rPr lang="de-DE" sz="3100" dirty="0" smtClean="0"/>
               <a:t>Also available: Hadoop H-Base, Hypertable</a:t>
             </a:r>
           </a:p>
@@ -6499,7 +6295,7 @@
 </file>
 
 <file path=ppt/slides/slide11.xml><?xml version="1.0" encoding="utf-8"?>
-<p:sld xmlns:a="http://schemas.openxmlformats.org/drawingml/2006/main" xmlns:r="http://schemas.openxmlformats.org/officeDocument/2006/relationships" xmlns:p="http://schemas.openxmlformats.org/presentationml/2006/main">
+<p:sld xmlns:a="http://schemas.openxmlformats.org/drawingml/2006/main" xmlns:r="http://schemas.openxmlformats.org/officeDocument/2006/relationships" xmlns:mc="http://schemas.openxmlformats.org/markup-compatibility/2006" xmlns:mv="urn:schemas-microsoft-com:mac:vml" xmlns:p="http://schemas.openxmlformats.org/presentationml/2006/main" mc:Ignorable="mv" mc:PreserveAttributes="mv:*">
   <p:cSld>
     <p:spTree>
       <p:nvGrpSpPr>
@@ -6642,14 +6438,14 @@
           <p:nvPr>
             <p:extLst>
               <p:ext uri="{D42A27DB-BD31-4B8C-83A1-F6EECF244321}">
-                <p14:modId xmlns:p14="http://schemas.microsoft.com/office/powerpoint/2010/main" val="3414472680"/>
+                <p14:modId xmlns:p14="http://schemas.microsoft.com/office/powerpoint/2010/main" xmlns:p="http://schemas.openxmlformats.org/presentationml/2006/main" xmlns:r="http://schemas.openxmlformats.org/officeDocument/2006/relationships" xmlns:a="http://schemas.openxmlformats.org/drawingml/2006/main" xmlns="" val="3414472680"/>
               </p:ext>
             </p:extLst>
           </p:nvPr>
         </p:nvGraphicFramePr>
         <p:xfrm>
-          <a:off x="863599" y="3005797"/>
-          <a:ext cx="11109569" cy="5344160"/>
+          <a:off x="863599" y="3005798"/>
+          <a:ext cx="11109569" cy="5354998"/>
         </p:xfrm>
         <a:graphic>
           <a:graphicData uri="http://schemas.openxmlformats.org/drawingml/2006/table">
@@ -6760,7 +6556,7 @@
                   <a:tcPr/>
                 </a:tc>
               </a:tr>
-              <a:tr h="528320">
+              <a:tr h="828379">
                 <a:tc>
                   <a:txBody>
                     <a:bodyPr/>
@@ -6819,7 +6615,7 @@
                   <a:tcPr/>
                 </a:tc>
               </a:tr>
-              <a:tr h="528320">
+              <a:tr h="828379">
                 <a:tc>
                   <a:txBody>
                     <a:bodyPr/>
@@ -7281,7 +7077,7 @@
 </file>
 
 <file path=ppt/slides/slide12.xml><?xml version="1.0" encoding="utf-8"?>
-<p:sld xmlns:a="http://schemas.openxmlformats.org/drawingml/2006/main" xmlns:r="http://schemas.openxmlformats.org/officeDocument/2006/relationships" xmlns:p="http://schemas.openxmlformats.org/presentationml/2006/main">
+<p:sld xmlns:a="http://schemas.openxmlformats.org/drawingml/2006/main" xmlns:r="http://schemas.openxmlformats.org/officeDocument/2006/relationships" xmlns:mc="http://schemas.openxmlformats.org/markup-compatibility/2006" xmlns:mv="urn:schemas-microsoft-com:mac:vml" xmlns:p="http://schemas.openxmlformats.org/presentationml/2006/main" mc:Ignorable="mv" mc:PreserveAttributes="mv:*">
   <p:cSld>
     <p:spTree>
       <p:nvGrpSpPr>
@@ -7471,7 +7267,7 @@
 </file>
 
 <file path=ppt/slides/slide13.xml><?xml version="1.0" encoding="utf-8"?>
-<p:sld xmlns:a="http://schemas.openxmlformats.org/drawingml/2006/main" xmlns:r="http://schemas.openxmlformats.org/officeDocument/2006/relationships" xmlns:p="http://schemas.openxmlformats.org/presentationml/2006/main">
+<p:sld xmlns:a="http://schemas.openxmlformats.org/drawingml/2006/main" xmlns:r="http://schemas.openxmlformats.org/officeDocument/2006/relationships" xmlns:mc="http://schemas.openxmlformats.org/markup-compatibility/2006" xmlns:mv="urn:schemas-microsoft-com:mac:vml" xmlns:p="http://schemas.openxmlformats.org/presentationml/2006/main" mc:Ignorable="mv" mc:PreserveAttributes="mv:*">
   <p:cSld>
     <p:spTree>
       <p:nvGrpSpPr>
@@ -7612,13 +7408,13 @@
           <p:nvPr>
             <p:extLst>
               <p:ext uri="{D42A27DB-BD31-4B8C-83A1-F6EECF244321}">
-                <p14:modId xmlns:p14="http://schemas.microsoft.com/office/powerpoint/2010/main" val="4007099573"/>
+                <p14:modId xmlns:p14="http://schemas.microsoft.com/office/powerpoint/2010/main" xmlns:p="http://schemas.openxmlformats.org/presentationml/2006/main" xmlns:r="http://schemas.openxmlformats.org/officeDocument/2006/relationships" xmlns:a="http://schemas.openxmlformats.org/drawingml/2006/main" xmlns="" val="4007099573"/>
               </p:ext>
             </p:extLst>
           </p:nvPr>
         </p:nvGraphicFramePr>
         <p:xfrm>
-          <a:off x="1016000" y="2971800"/>
+          <a:off x="1016000" y="2971801"/>
           <a:ext cx="10972800" cy="3464560"/>
         </p:xfrm>
         <a:graphic>
@@ -7635,8 +7431,8 @@
                 <a:tableStyleId>{5C22544A-7EE6-4342-B048-85BDC9FD1C3A}</a:tableStyleId>
               </a:tblPr>
               <a:tblGrid>
-                <a:gridCol w="3886200"/>
-                <a:gridCol w="7086600"/>
+                <a:gridCol w="3886199"/>
+                <a:gridCol w="7086601"/>
               </a:tblGrid>
               <a:tr h="528320">
                 <a:tc>
@@ -7811,7 +7607,7 @@
                   <a:tcPr/>
                 </a:tc>
               </a:tr>
-              <a:tr h="528320">
+              <a:tr h="828379">
                 <a:tc>
                   <a:txBody>
                     <a:bodyPr/>
@@ -8023,7 +7819,7 @@
 </file>
 
 <file path=ppt/slides/slide14.xml><?xml version="1.0" encoding="utf-8"?>
-<p:sld xmlns:a="http://schemas.openxmlformats.org/drawingml/2006/main" xmlns:r="http://schemas.openxmlformats.org/officeDocument/2006/relationships" xmlns:p="http://schemas.openxmlformats.org/presentationml/2006/main">
+<p:sld xmlns:a="http://schemas.openxmlformats.org/drawingml/2006/main" xmlns:r="http://schemas.openxmlformats.org/officeDocument/2006/relationships" xmlns:mc="http://schemas.openxmlformats.org/markup-compatibility/2006" xmlns:mv="urn:schemas-microsoft-com:mac:vml" xmlns:p="http://schemas.openxmlformats.org/presentationml/2006/main" mc:Ignorable="mv" mc:PreserveAttributes="mv:*">
   <p:cSld>
     <p:spTree>
       <p:nvGrpSpPr>
@@ -8278,7 +8074,7 @@
     </p:spTree>
     <p:extLst>
       <p:ext uri="{BB962C8B-B14F-4D97-AF65-F5344CB8AC3E}">
-        <p14:creationId xmlns:p14="http://schemas.microsoft.com/office/powerpoint/2010/main" val="943545212"/>
+        <p14:creationId xmlns:p14="http://schemas.microsoft.com/office/powerpoint/2010/main" xmlns:p="http://schemas.openxmlformats.org/presentationml/2006/main" xmlns:r="http://schemas.openxmlformats.org/officeDocument/2006/relationships" xmlns:a="http://schemas.openxmlformats.org/drawingml/2006/main" xmlns="" val="943545212"/>
       </p:ext>
     </p:extLst>
   </p:cSld>
@@ -8296,7 +8092,7 @@
 </file>
 
 <file path=ppt/slides/slide15.xml><?xml version="1.0" encoding="utf-8"?>
-<p:sld xmlns:a="http://schemas.openxmlformats.org/drawingml/2006/main" xmlns:r="http://schemas.openxmlformats.org/officeDocument/2006/relationships" xmlns:p="http://schemas.openxmlformats.org/presentationml/2006/main">
+<p:sld xmlns:a="http://schemas.openxmlformats.org/drawingml/2006/main" xmlns:r="http://schemas.openxmlformats.org/officeDocument/2006/relationships" xmlns:mc="http://schemas.openxmlformats.org/markup-compatibility/2006" xmlns:mv="urn:schemas-microsoft-com:mac:vml" xmlns:p="http://schemas.openxmlformats.org/presentationml/2006/main" mc:Ignorable="mv" mc:PreserveAttributes="mv:*">
   <p:cSld>
     <p:spTree>
       <p:nvGrpSpPr>
@@ -8371,7 +8167,7 @@
             <a:pPr marL="0" indent="0">
               <a:buNone/>
               <a:tabLst>
-                <a:tab pos="3206750" algn="l"/>
+                <a:tab pos="3206586" algn="l"/>
               </a:tabLst>
             </a:pPr>
             <a:r>
@@ -8614,7 +8410,7 @@
     </p:spTree>
     <p:extLst>
       <p:ext uri="{BB962C8B-B14F-4D97-AF65-F5344CB8AC3E}">
-        <p14:creationId xmlns:p14="http://schemas.microsoft.com/office/powerpoint/2010/main" val="2110749326"/>
+        <p14:creationId xmlns:p14="http://schemas.microsoft.com/office/powerpoint/2010/main" xmlns:p="http://schemas.openxmlformats.org/presentationml/2006/main" xmlns:r="http://schemas.openxmlformats.org/officeDocument/2006/relationships" xmlns:a="http://schemas.openxmlformats.org/drawingml/2006/main" xmlns="" val="2110749326"/>
       </p:ext>
     </p:extLst>
   </p:cSld>
@@ -8632,7 +8428,7 @@
 </file>
 
 <file path=ppt/slides/slide16.xml><?xml version="1.0" encoding="utf-8"?>
-<p:sld xmlns:a="http://schemas.openxmlformats.org/drawingml/2006/main" xmlns:r="http://schemas.openxmlformats.org/officeDocument/2006/relationships" xmlns:p="http://schemas.openxmlformats.org/presentationml/2006/main">
+<p:sld xmlns:a="http://schemas.openxmlformats.org/drawingml/2006/main" xmlns:r="http://schemas.openxmlformats.org/officeDocument/2006/relationships" xmlns:mc="http://schemas.openxmlformats.org/markup-compatibility/2006" xmlns:mv="urn:schemas-microsoft-com:mac:vml" xmlns:p="http://schemas.openxmlformats.org/presentationml/2006/main" mc:Ignorable="mv" mc:PreserveAttributes="mv:*">
   <p:cSld>
     <p:spTree>
       <p:nvGrpSpPr>
@@ -8671,11 +8467,7 @@
             </a:r>
             <a:r>
               <a:rPr lang="en-US" smtClean="0"/>
-              <a:t>Job </a:t>
-            </a:r>
-            <a:r>
-              <a:rPr lang="en-US" smtClean="0"/>
-              <a:t>Package #1</a:t>
+              <a:t>Job Package #1</a:t>
             </a:r>
             <a:endParaRPr lang="en-US" dirty="0"/>
           </a:p>
@@ -8991,7 +8783,7 @@
     </p:spTree>
     <p:extLst>
       <p:ext uri="{BB962C8B-B14F-4D97-AF65-F5344CB8AC3E}">
-        <p14:creationId xmlns:p14="http://schemas.microsoft.com/office/powerpoint/2010/main" val="2059702227"/>
+        <p14:creationId xmlns:p14="http://schemas.microsoft.com/office/powerpoint/2010/main" xmlns:p="http://schemas.openxmlformats.org/presentationml/2006/main" xmlns:r="http://schemas.openxmlformats.org/officeDocument/2006/relationships" xmlns:a="http://schemas.openxmlformats.org/drawingml/2006/main" xmlns="" val="2059702227"/>
       </p:ext>
     </p:extLst>
   </p:cSld>
@@ -9002,7 +8794,7 @@
 </file>
 
 <file path=ppt/slides/slide17.xml><?xml version="1.0" encoding="utf-8"?>
-<p:sld xmlns:a="http://schemas.openxmlformats.org/drawingml/2006/main" xmlns:r="http://schemas.openxmlformats.org/officeDocument/2006/relationships" xmlns:p="http://schemas.openxmlformats.org/presentationml/2006/main">
+<p:sld xmlns:a="http://schemas.openxmlformats.org/drawingml/2006/main" xmlns:r="http://schemas.openxmlformats.org/officeDocument/2006/relationships" xmlns:mc="http://schemas.openxmlformats.org/markup-compatibility/2006" xmlns:mv="urn:schemas-microsoft-com:mac:vml" xmlns:p="http://schemas.openxmlformats.org/presentationml/2006/main" mc:Ignorable="mv" mc:PreserveAttributes="mv:*">
   <p:cSld>
     <p:spTree>
       <p:nvGrpSpPr>
@@ -9037,11 +8829,7 @@
           <a:p>
             <a:r>
               <a:rPr lang="en-US" dirty="0" smtClean="0"/>
-              <a:t>Python API Example: Job </a:t>
-            </a:r>
-            <a:r>
-              <a:rPr lang="en-US" dirty="0" smtClean="0"/>
-              <a:t>Package #2</a:t>
+              <a:t>Python API Example: Job Package #2</a:t>
             </a:r>
             <a:endParaRPr lang="en-US" dirty="0"/>
           </a:p>
@@ -9305,7 +9093,7 @@
     </p:spTree>
     <p:extLst>
       <p:ext uri="{BB962C8B-B14F-4D97-AF65-F5344CB8AC3E}">
-        <p14:creationId xmlns:p14="http://schemas.microsoft.com/office/powerpoint/2010/main" val="3522440758"/>
+        <p14:creationId xmlns:p14="http://schemas.microsoft.com/office/powerpoint/2010/main" xmlns:p="http://schemas.openxmlformats.org/presentationml/2006/main" xmlns:r="http://schemas.openxmlformats.org/officeDocument/2006/relationships" xmlns:a="http://schemas.openxmlformats.org/drawingml/2006/main" xmlns="" val="3522440758"/>
       </p:ext>
     </p:extLst>
   </p:cSld>
@@ -9316,7 +9104,7 @@
 </file>
 
 <file path=ppt/slides/slide18.xml><?xml version="1.0" encoding="utf-8"?>
-<p:sld xmlns:a="http://schemas.openxmlformats.org/drawingml/2006/main" xmlns:r="http://schemas.openxmlformats.org/officeDocument/2006/relationships" xmlns:p="http://schemas.openxmlformats.org/presentationml/2006/main">
+<p:sld xmlns:a="http://schemas.openxmlformats.org/drawingml/2006/main" xmlns:r="http://schemas.openxmlformats.org/officeDocument/2006/relationships" xmlns:mc="http://schemas.openxmlformats.org/markup-compatibility/2006" xmlns:mv="urn:schemas-microsoft-com:mac:vml" xmlns:p="http://schemas.openxmlformats.org/presentationml/2006/main" mc:Ignorable="mv" mc:PreserveAttributes="mv:*">
   <p:cSld>
     <p:spTree>
       <p:nvGrpSpPr>
@@ -9607,7 +9395,7 @@
     </p:spTree>
     <p:extLst>
       <p:ext uri="{BB962C8B-B14F-4D97-AF65-F5344CB8AC3E}">
-        <p14:creationId xmlns:p14="http://schemas.microsoft.com/office/powerpoint/2010/main" val="2253681799"/>
+        <p14:creationId xmlns:p14="http://schemas.microsoft.com/office/powerpoint/2010/main" xmlns:p="http://schemas.openxmlformats.org/presentationml/2006/main" xmlns:r="http://schemas.openxmlformats.org/officeDocument/2006/relationships" xmlns:a="http://schemas.openxmlformats.org/drawingml/2006/main" xmlns="" val="2253681799"/>
       </p:ext>
     </p:extLst>
   </p:cSld>
@@ -9618,7 +9406,7 @@
 </file>
 
 <file path=ppt/slides/slide19.xml><?xml version="1.0" encoding="utf-8"?>
-<p:sld xmlns:a="http://schemas.openxmlformats.org/drawingml/2006/main" xmlns:r="http://schemas.openxmlformats.org/officeDocument/2006/relationships" xmlns:p="http://schemas.openxmlformats.org/presentationml/2006/main">
+<p:sld xmlns:a="http://schemas.openxmlformats.org/drawingml/2006/main" xmlns:r="http://schemas.openxmlformats.org/officeDocument/2006/relationships" xmlns:mc="http://schemas.openxmlformats.org/markup-compatibility/2006" xmlns:mv="urn:schemas-microsoft-com:mac:vml" xmlns:p="http://schemas.openxmlformats.org/presentationml/2006/main" mc:Ignorable="mv" mc:PreserveAttributes="mv:*">
   <p:cSld>
     <p:spTree>
       <p:nvGrpSpPr>
@@ -9884,7 +9672,7 @@
     </p:spTree>
     <p:extLst>
       <p:ext uri="{BB962C8B-B14F-4D97-AF65-F5344CB8AC3E}">
-        <p14:creationId xmlns:p14="http://schemas.microsoft.com/office/powerpoint/2010/main" val="3368190089"/>
+        <p14:creationId xmlns:p14="http://schemas.microsoft.com/office/powerpoint/2010/main" xmlns:p="http://schemas.openxmlformats.org/presentationml/2006/main" xmlns:r="http://schemas.openxmlformats.org/officeDocument/2006/relationships" xmlns:a="http://schemas.openxmlformats.org/drawingml/2006/main" xmlns="" val="3368190089"/>
       </p:ext>
     </p:extLst>
   </p:cSld>
@@ -9902,7 +9690,7 @@
 </file>
 
 <file path=ppt/slides/slide2.xml><?xml version="1.0" encoding="utf-8"?>
-<p:sld xmlns:a="http://schemas.openxmlformats.org/drawingml/2006/main" xmlns:r="http://schemas.openxmlformats.org/officeDocument/2006/relationships" xmlns:p="http://schemas.openxmlformats.org/presentationml/2006/main">
+<p:sld xmlns:a="http://schemas.openxmlformats.org/drawingml/2006/main" xmlns:r="http://schemas.openxmlformats.org/officeDocument/2006/relationships" xmlns:mc="http://schemas.openxmlformats.org/markup-compatibility/2006" xmlns:mv="urn:schemas-microsoft-com:mac:vml" xmlns:p="http://schemas.openxmlformats.org/presentationml/2006/main" mc:Ignorable="mv" mc:PreserveAttributes="mv:*">
   <p:cSld>
     <p:spTree>
       <p:nvGrpSpPr>
@@ -10073,7 +9861,7 @@
 </file>
 
 <file path=ppt/slides/slide20.xml><?xml version="1.0" encoding="utf-8"?>
-<p:sld xmlns:a="http://schemas.openxmlformats.org/drawingml/2006/main" xmlns:r="http://schemas.openxmlformats.org/officeDocument/2006/relationships" xmlns:p="http://schemas.openxmlformats.org/presentationml/2006/main">
+<p:sld xmlns:a="http://schemas.openxmlformats.org/drawingml/2006/main" xmlns:r="http://schemas.openxmlformats.org/officeDocument/2006/relationships" xmlns:mc="http://schemas.openxmlformats.org/markup-compatibility/2006" xmlns:mv="urn:schemas-microsoft-com:mac:vml" xmlns:p="http://schemas.openxmlformats.org/presentationml/2006/main" mc:Ignorable="mv" mc:PreserveAttributes="mv:*">
   <p:cSld>
     <p:spTree>
       <p:nvGrpSpPr>
@@ -10156,8 +9944,8 @@
             <a:pPr marL="0" indent="0">
               <a:buNone/>
               <a:tabLst>
-                <a:tab pos="914400" algn="l"/>
-                <a:tab pos="4121150" algn="l"/>
+                <a:tab pos="914354" algn="l"/>
+                <a:tab pos="4120940" algn="l"/>
               </a:tabLst>
             </a:pPr>
             <a:r>
@@ -10464,7 +10252,7 @@
     </p:spTree>
     <p:extLst>
       <p:ext uri="{BB962C8B-B14F-4D97-AF65-F5344CB8AC3E}">
-        <p14:creationId xmlns:p14="http://schemas.microsoft.com/office/powerpoint/2010/main" val="2572922824"/>
+        <p14:creationId xmlns:p14="http://schemas.microsoft.com/office/powerpoint/2010/main" xmlns:p="http://schemas.openxmlformats.org/presentationml/2006/main" xmlns:r="http://schemas.openxmlformats.org/officeDocument/2006/relationships" xmlns:a="http://schemas.openxmlformats.org/drawingml/2006/main" xmlns="" val="2572922824"/>
       </p:ext>
     </p:extLst>
   </p:cSld>
@@ -10482,7 +10270,7 @@
 </file>
 
 <file path=ppt/slides/slide21.xml><?xml version="1.0" encoding="utf-8"?>
-<p:sld xmlns:a="http://schemas.openxmlformats.org/drawingml/2006/main" xmlns:r="http://schemas.openxmlformats.org/officeDocument/2006/relationships" xmlns:p="http://schemas.openxmlformats.org/presentationml/2006/main">
+<p:sld xmlns:a="http://schemas.openxmlformats.org/drawingml/2006/main" xmlns:r="http://schemas.openxmlformats.org/officeDocument/2006/relationships" xmlns:mc="http://schemas.openxmlformats.org/markup-compatibility/2006" xmlns:mv="urn:schemas-microsoft-com:mac:vml" xmlns:p="http://schemas.openxmlformats.org/presentationml/2006/main" mc:Ignorable="mv" mc:PreserveAttributes="mv:*">
   <p:cSld>
     <p:spTree>
       <p:nvGrpSpPr>
@@ -10632,7 +10420,7 @@
     </p:spTree>
     <p:extLst>
       <p:ext uri="{BB962C8B-B14F-4D97-AF65-F5344CB8AC3E}">
-        <p14:creationId xmlns:p14="http://schemas.microsoft.com/office/powerpoint/2010/main" val="1169737179"/>
+        <p14:creationId xmlns:p14="http://schemas.microsoft.com/office/powerpoint/2010/main" xmlns:p="http://schemas.openxmlformats.org/presentationml/2006/main" xmlns:r="http://schemas.openxmlformats.org/officeDocument/2006/relationships" xmlns:a="http://schemas.openxmlformats.org/drawingml/2006/main" xmlns="" val="1169737179"/>
       </p:ext>
     </p:extLst>
   </p:cSld>
@@ -10643,7 +10431,7 @@
 </file>
 
 <file path=ppt/slides/slide22.xml><?xml version="1.0" encoding="utf-8"?>
-<p:sld xmlns:a="http://schemas.openxmlformats.org/drawingml/2006/main" xmlns:r="http://schemas.openxmlformats.org/officeDocument/2006/relationships" xmlns:p="http://schemas.openxmlformats.org/presentationml/2006/main">
+<p:sld xmlns:a="http://schemas.openxmlformats.org/drawingml/2006/main" xmlns:r="http://schemas.openxmlformats.org/officeDocument/2006/relationships" xmlns:mc="http://schemas.openxmlformats.org/markup-compatibility/2006" xmlns:mv="urn:schemas-microsoft-com:mac:vml" xmlns:p="http://schemas.openxmlformats.org/presentationml/2006/main" mc:Ignorable="mv" mc:PreserveAttributes="mv:*">
   <p:cSld>
     <p:spTree>
       <p:nvGrpSpPr>
@@ -10782,7 +10570,7 @@
     </p:spTree>
     <p:extLst>
       <p:ext uri="{BB962C8B-B14F-4D97-AF65-F5344CB8AC3E}">
-        <p14:creationId xmlns:p14="http://schemas.microsoft.com/office/powerpoint/2010/main" val="935873552"/>
+        <p14:creationId xmlns:p14="http://schemas.microsoft.com/office/powerpoint/2010/main" xmlns:p="http://schemas.openxmlformats.org/presentationml/2006/main" xmlns:r="http://schemas.openxmlformats.org/officeDocument/2006/relationships" xmlns:a="http://schemas.openxmlformats.org/drawingml/2006/main" xmlns="" val="935873552"/>
       </p:ext>
     </p:extLst>
   </p:cSld>
@@ -10793,7 +10581,7 @@
 </file>
 
 <file path=ppt/slides/slide23.xml><?xml version="1.0" encoding="utf-8"?>
-<p:sld xmlns:a="http://schemas.openxmlformats.org/drawingml/2006/main" xmlns:r="http://schemas.openxmlformats.org/officeDocument/2006/relationships" xmlns:p="http://schemas.openxmlformats.org/presentationml/2006/main">
+<p:sld xmlns:a="http://schemas.openxmlformats.org/drawingml/2006/main" xmlns:r="http://schemas.openxmlformats.org/officeDocument/2006/relationships" xmlns:mc="http://schemas.openxmlformats.org/markup-compatibility/2006" xmlns:mv="urn:schemas-microsoft-com:mac:vml" xmlns:p="http://schemas.openxmlformats.org/presentationml/2006/main" mc:Ignorable="mv" mc:PreserveAttributes="mv:*">
   <p:cSld>
     <p:spTree>
       <p:nvGrpSpPr>
@@ -10852,7 +10640,7 @@
               <a:rPr lang="en-US" sz="4000" dirty="0" smtClean="0"/>
               <a:t>Set of very small and easy examples, one for each package/paradigm</a:t>
             </a:r>
-            <a:endParaRPr lang="en-US" sz="9600" dirty="0" smtClean="0"/>
+            <a:endParaRPr lang="en-US" sz="9500" dirty="0" smtClean="0"/>
           </a:p>
           <a:p>
             <a:pPr lvl="1" fontAlgn="ctr"/>
@@ -10998,7 +10786,7 @@
 </file>
 
 <file path=ppt/slides/slide24.xml><?xml version="1.0" encoding="utf-8"?>
-<p:sld xmlns:a="http://schemas.openxmlformats.org/drawingml/2006/main" xmlns:r="http://schemas.openxmlformats.org/officeDocument/2006/relationships" xmlns:p="http://schemas.openxmlformats.org/presentationml/2006/main">
+<p:sld xmlns:a="http://schemas.openxmlformats.org/drawingml/2006/main" xmlns:r="http://schemas.openxmlformats.org/officeDocument/2006/relationships" xmlns:mc="http://schemas.openxmlformats.org/markup-compatibility/2006" xmlns:mv="urn:schemas-microsoft-com:mac:vml" xmlns:p="http://schemas.openxmlformats.org/presentationml/2006/main" mc:Ignorable="mv" mc:PreserveAttributes="mv:*">
   <p:cSld>
     <p:spTree>
       <p:nvGrpSpPr>
@@ -11071,7 +10859,7 @@
               <a:rPr lang="en-US" sz="4000" dirty="0" smtClean="0"/>
               <a:t>Hello world</a:t>
             </a:r>
-            <a:endParaRPr lang="en-US" sz="9600" dirty="0" smtClean="0"/>
+            <a:endParaRPr lang="en-US" sz="9500" dirty="0" smtClean="0"/>
           </a:p>
           <a:p>
             <a:pPr lvl="1" fontAlgn="ctr"/>
@@ -11232,7 +11020,7 @@
 </file>
 
 <file path=ppt/slides/slide25.xml><?xml version="1.0" encoding="utf-8"?>
-<p:sld xmlns:a="http://schemas.openxmlformats.org/drawingml/2006/main" xmlns:r="http://schemas.openxmlformats.org/officeDocument/2006/relationships" xmlns:p="http://schemas.openxmlformats.org/presentationml/2006/main">
+<p:sld xmlns:a="http://schemas.openxmlformats.org/drawingml/2006/main" xmlns:r="http://schemas.openxmlformats.org/officeDocument/2006/relationships" xmlns:mc="http://schemas.openxmlformats.org/markup-compatibility/2006" xmlns:mv="urn:schemas-microsoft-com:mac:vml" xmlns:p="http://schemas.openxmlformats.org/presentationml/2006/main" mc:Ignorable="mv" mc:PreserveAttributes="mv:*">
   <p:cSld>
     <p:spTree>
       <p:nvGrpSpPr>
@@ -11305,7 +11093,7 @@
               <a:rPr lang="en-US" sz="4000" dirty="0" smtClean="0"/>
               <a:t>Hello world</a:t>
             </a:r>
-            <a:endParaRPr lang="en-US" sz="9600" dirty="0" smtClean="0"/>
+            <a:endParaRPr lang="en-US" sz="9500" dirty="0" smtClean="0"/>
           </a:p>
           <a:p>
             <a:pPr lvl="1" fontAlgn="ctr"/>
@@ -11526,7 +11314,7 @@
 </file>
 
 <file path=ppt/slides/slide26.xml><?xml version="1.0" encoding="utf-8"?>
-<p:sld xmlns:a="http://schemas.openxmlformats.org/drawingml/2006/main" xmlns:r="http://schemas.openxmlformats.org/officeDocument/2006/relationships" xmlns:p="http://schemas.openxmlformats.org/presentationml/2006/main">
+<p:sld xmlns:a="http://schemas.openxmlformats.org/drawingml/2006/main" xmlns:r="http://schemas.openxmlformats.org/officeDocument/2006/relationships" xmlns:mc="http://schemas.openxmlformats.org/markup-compatibility/2006" xmlns:mv="urn:schemas-microsoft-com:mac:vml" xmlns:p="http://schemas.openxmlformats.org/presentationml/2006/main" mc:Ignorable="mv" mc:PreserveAttributes="mv:*">
   <p:cSld>
     <p:spTree>
       <p:nvGrpSpPr>
@@ -11591,7 +11379,7 @@
               <a:rPr lang="en-US" sz="4000" dirty="0" smtClean="0"/>
               <a:t>Launch 3 jobs on 3 different machines</a:t>
             </a:r>
-            <a:endParaRPr lang="en-US" sz="9600" dirty="0" smtClean="0"/>
+            <a:endParaRPr lang="en-US" sz="9500" dirty="0" smtClean="0"/>
           </a:p>
           <a:p>
             <a:pPr fontAlgn="ctr"/>
@@ -11599,7 +11387,7 @@
               <a:rPr lang="en-US" sz="4000" dirty="0" smtClean="0"/>
               <a:t>Output of previous job is needed to launch next job</a:t>
             </a:r>
-            <a:endParaRPr lang="en-US" sz="9600" dirty="0" smtClean="0"/>
+            <a:endParaRPr lang="en-US" sz="9500" dirty="0" smtClean="0"/>
           </a:p>
           <a:p>
             <a:pPr fontAlgn="ctr"/>
@@ -11607,7 +11395,7 @@
               <a:rPr lang="en-US" sz="4000" dirty="0" smtClean="0"/>
               <a:t>Simple sequential execution, but SAGA style</a:t>
             </a:r>
-            <a:endParaRPr lang="en-US" sz="9600" dirty="0" smtClean="0"/>
+            <a:endParaRPr lang="en-US" sz="9500" dirty="0" smtClean="0"/>
           </a:p>
           <a:p>
             <a:pPr fontAlgn="ctr"/>
@@ -11615,7 +11403,7 @@
               <a:rPr lang="en-US" sz="4000" dirty="0" smtClean="0"/>
               <a:t>Demonstrates</a:t>
             </a:r>
-            <a:endParaRPr lang="en-US" sz="9600" dirty="0" smtClean="0"/>
+            <a:endParaRPr lang="en-US" sz="9500" dirty="0" smtClean="0"/>
           </a:p>
           <a:p>
             <a:pPr lvl="1" fontAlgn="ctr"/>
@@ -11768,7 +11556,7 @@
 </file>
 
 <file path=ppt/slides/slide27.xml><?xml version="1.0" encoding="utf-8"?>
-<p:sld xmlns:a="http://schemas.openxmlformats.org/drawingml/2006/main" xmlns:r="http://schemas.openxmlformats.org/officeDocument/2006/relationships" xmlns:p="http://schemas.openxmlformats.org/presentationml/2006/main">
+<p:sld xmlns:a="http://schemas.openxmlformats.org/drawingml/2006/main" xmlns:r="http://schemas.openxmlformats.org/officeDocument/2006/relationships" xmlns:mc="http://schemas.openxmlformats.org/markup-compatibility/2006" xmlns:mv="urn:schemas-microsoft-com:mac:vml" xmlns:p="http://schemas.openxmlformats.org/presentationml/2006/main" mc:Ignorable="mv" mc:PreserveAttributes="mv:*">
   <p:cSld>
     <p:spTree>
       <p:nvGrpSpPr>
@@ -11840,7 +11628,7 @@
               <a:rPr lang="de-DE" sz="4000" dirty="0" smtClean="0"/>
               <a:t>Launch a single job sequentially on a set of remote resources</a:t>
             </a:r>
-            <a:endParaRPr lang="de-DE" sz="9600" dirty="0" smtClean="0"/>
+            <a:endParaRPr lang="de-DE" sz="9500" dirty="0" smtClean="0"/>
           </a:p>
           <a:p>
             <a:pPr lvl="1" fontAlgn="ctr"/>
@@ -11856,7 +11644,7 @@
               <a:rPr lang="de-DE" sz="4000" dirty="0" smtClean="0"/>
               <a:t>Maintain a single result value in advert service</a:t>
             </a:r>
-            <a:endParaRPr lang="de-DE" sz="9600" dirty="0" smtClean="0"/>
+            <a:endParaRPr lang="de-DE" sz="9500" dirty="0" smtClean="0"/>
           </a:p>
           <a:p>
             <a:pPr lvl="1" fontAlgn="ctr"/>
@@ -11872,7 +11660,7 @@
               <a:rPr lang="de-DE" sz="4000" dirty="0" smtClean="0"/>
               <a:t>Demonstrates </a:t>
             </a:r>
-            <a:endParaRPr lang="de-DE" sz="9600" dirty="0" smtClean="0"/>
+            <a:endParaRPr lang="de-DE" sz="9500" dirty="0" smtClean="0"/>
           </a:p>
           <a:p>
             <a:pPr lvl="1" fontAlgn="ctr"/>
@@ -11896,7 +11684,7 @@
               <a:rPr lang="de-DE" sz="4000" dirty="0" smtClean="0"/>
               <a:t>Result is left in advert service, but accessed afterwards</a:t>
             </a:r>
-            <a:endParaRPr lang="de-DE" sz="9600" dirty="0" smtClean="0"/>
+            <a:endParaRPr lang="de-DE" sz="9500" dirty="0" smtClean="0"/>
           </a:p>
           <a:p>
             <a:endParaRPr lang="en-US" dirty="0"/>
@@ -11982,7 +11770,7 @@
 </file>
 
 <file path=ppt/slides/slide3.xml><?xml version="1.0" encoding="utf-8"?>
-<p:sld xmlns:a="http://schemas.openxmlformats.org/drawingml/2006/main" xmlns:r="http://schemas.openxmlformats.org/officeDocument/2006/relationships" xmlns:p="http://schemas.openxmlformats.org/presentationml/2006/main">
+<p:sld xmlns:a="http://schemas.openxmlformats.org/drawingml/2006/main" xmlns:r="http://schemas.openxmlformats.org/officeDocument/2006/relationships" xmlns:mc="http://schemas.openxmlformats.org/markup-compatibility/2006" xmlns:mv="urn:schemas-microsoft-com:mac:vml" xmlns:p="http://schemas.openxmlformats.org/presentationml/2006/main" mc:Ignorable="mv" mc:PreserveAttributes="mv:*">
   <p:cSld>
     <p:spTree>
       <p:nvGrpSpPr>
@@ -12034,8 +11822,8 @@
         </p:nvSpPr>
         <p:spPr>
           <a:xfrm>
-            <a:off x="1447159" y="2942035"/>
-            <a:ext cx="11303641" cy="5970078"/>
+            <a:off x="1447160" y="2942035"/>
+            <a:ext cx="11303642" cy="5970078"/>
           </a:xfrm>
           <a:ln/>
         </p:spPr>
@@ -12088,7 +11876,6 @@
               <a:rPr lang="en-US" dirty="0" smtClean="0"/>
               <a:t>Python</a:t>
             </a:r>
-            <a:endParaRPr lang="en-US" dirty="0" smtClean="0"/>
           </a:p>
           <a:p>
             <a:pPr lvl="2"/>
@@ -12130,14 +11917,14 @@
             <a:endParaRPr lang="en-US" dirty="0" smtClean="0"/>
           </a:p>
           <a:p>
-            <a:pPr marL="295662"/>
+            <a:pPr marL="295647"/>
             <a:r>
               <a:rPr lang="en-US" dirty="0" smtClean="0"/>
               <a:t>Programmers manual</a:t>
             </a:r>
           </a:p>
           <a:p>
-            <a:pPr marL="965200" lvl="1" indent="-477838"/>
+            <a:pPr marL="965150" lvl="1" indent="-477814"/>
             <a:r>
               <a:rPr lang="en-US" dirty="0">
                 <a:solidFill>
@@ -12159,11 +11946,11 @@
             <a:endParaRPr lang="en-US" dirty="0" smtClean="0"/>
           </a:p>
           <a:p>
-            <a:pPr marL="783335" lvl="1"/>
+            <a:pPr marL="783295" lvl="1"/>
             <a:endParaRPr lang="en-US" dirty="0" smtClean="0"/>
           </a:p>
           <a:p>
-            <a:pPr marL="685800" lvl="1"/>
+            <a:pPr marL="685765" lvl="1"/>
             <a:endParaRPr lang="en-US" dirty="0" smtClean="0">
               <a:solidFill>
                 <a:srgbClr val="B70000"/>
@@ -12172,7 +11959,7 @@
             </a:endParaRPr>
           </a:p>
           <a:p>
-            <a:pPr marL="685800" lvl="1"/>
+            <a:pPr marL="685765" lvl="1"/>
             <a:endParaRPr lang="en-US" dirty="0">
               <a:solidFill>
                 <a:srgbClr val="B70000"/>
@@ -12272,7 +12059,7 @@
 </file>
 
 <file path=ppt/slides/slide4.xml><?xml version="1.0" encoding="utf-8"?>
-<p:sld xmlns:a="http://schemas.openxmlformats.org/drawingml/2006/main" xmlns:r="http://schemas.openxmlformats.org/officeDocument/2006/relationships" xmlns:p="http://schemas.openxmlformats.org/presentationml/2006/main">
+<p:sld xmlns:a="http://schemas.openxmlformats.org/drawingml/2006/main" xmlns:r="http://schemas.openxmlformats.org/officeDocument/2006/relationships" xmlns:mc="http://schemas.openxmlformats.org/markup-compatibility/2006" xmlns:mv="urn:schemas-microsoft-com:mac:vml" xmlns:p="http://schemas.openxmlformats.org/presentationml/2006/main" mc:Ignorable="mv" mc:PreserveAttributes="mv:*">
   <p:cSld>
     <p:spTree>
       <p:nvGrpSpPr>
@@ -12303,8 +12090,8 @@
         </p:blipFill>
         <p:spPr bwMode="auto">
           <a:xfrm>
-            <a:off x="1543377" y="3058551"/>
-            <a:ext cx="9982914" cy="5638800"/>
+            <a:off x="1543377" y="3058552"/>
+            <a:ext cx="9982913" cy="5638800"/>
           </a:xfrm>
           <a:prstGeom prst="rect">
             <a:avLst/>
@@ -12436,7 +12223,7 @@
     </p:spTree>
     <p:extLst>
       <p:ext uri="{BB962C8B-B14F-4D97-AF65-F5344CB8AC3E}">
-        <p14:creationId xmlns:p14="http://schemas.microsoft.com/office/powerpoint/2010/main" val="2448934113"/>
+        <p14:creationId xmlns:p14="http://schemas.microsoft.com/office/powerpoint/2010/main" xmlns:p="http://schemas.openxmlformats.org/presentationml/2006/main" xmlns:r="http://schemas.openxmlformats.org/officeDocument/2006/relationships" xmlns:a="http://schemas.openxmlformats.org/drawingml/2006/main" xmlns="" val="2448934113"/>
       </p:ext>
     </p:extLst>
   </p:cSld>
@@ -12455,7 +12242,7 @@
 </file>
 
 <file path=ppt/slides/slide5.xml><?xml version="1.0" encoding="utf-8"?>
-<p:sld xmlns:a="http://schemas.openxmlformats.org/drawingml/2006/main" xmlns:r="http://schemas.openxmlformats.org/officeDocument/2006/relationships" xmlns:p="http://schemas.openxmlformats.org/presentationml/2006/main">
+<p:sld xmlns:a="http://schemas.openxmlformats.org/drawingml/2006/main" xmlns:r="http://schemas.openxmlformats.org/officeDocument/2006/relationships" xmlns:mc="http://schemas.openxmlformats.org/markup-compatibility/2006" xmlns:mv="urn:schemas-microsoft-com:mac:vml" xmlns:p="http://schemas.openxmlformats.org/presentationml/2006/main" mc:Ignorable="mv" mc:PreserveAttributes="mv:*">
   <p:cSld>
     <p:spTree>
       <p:nvGrpSpPr>
@@ -12504,14 +12291,14 @@
             <p:ph idx="1"/>
             <p:extLst>
               <p:ext uri="{D42A27DB-BD31-4B8C-83A1-F6EECF244321}">
-                <p14:modId xmlns:p14="http://schemas.microsoft.com/office/powerpoint/2010/main" val="3478891187"/>
+                <p14:modId xmlns:p14="http://schemas.microsoft.com/office/powerpoint/2010/main" xmlns:p="http://schemas.openxmlformats.org/presentationml/2006/main" xmlns:r="http://schemas.openxmlformats.org/officeDocument/2006/relationships" xmlns:a="http://schemas.openxmlformats.org/drawingml/2006/main" xmlns="" val="3478891187"/>
               </p:ext>
             </p:extLst>
           </p:nvPr>
         </p:nvGraphicFramePr>
         <p:xfrm>
-          <a:off x="838591" y="3276600"/>
-          <a:ext cx="11353801" cy="5669280"/>
+          <a:off x="838592" y="3276600"/>
+          <a:ext cx="11353800" cy="5669280"/>
         </p:xfrm>
         <a:graphic>
           <a:graphicData uri="http://schemas.openxmlformats.org/drawingml/2006/table">
@@ -12520,19 +12307,19 @@
                 <a:tableStyleId>{5C22544A-7EE6-4342-B048-85BDC9FD1C3A}</a:tableStyleId>
               </a:tblPr>
               <a:tblGrid>
-                <a:gridCol w="1651687"/>
+                <a:gridCol w="1651686"/>
                 <a:gridCol w="3072713"/>
                 <a:gridCol w="3124200"/>
                 <a:gridCol w="2996809"/>
                 <a:gridCol w="508392"/>
               </a:tblGrid>
-              <a:tr h="845483">
+              <a:tr h="883920">
                 <a:tc>
                   <a:txBody>
                     <a:bodyPr/>
                     <a:lstStyle/>
                     <a:p>
-                      <a:endParaRPr lang="en-US" dirty="0"/>
+                      <a:endParaRPr lang="en-US" sz="2600" dirty="0"/>
                     </a:p>
                   </a:txBody>
                   <a:tcPr/>
@@ -12543,17 +12330,17 @@
                     <a:lstStyle/>
                     <a:p>
                       <a:r>
-                        <a:rPr lang="en-US" dirty="0" smtClean="0"/>
+                        <a:rPr lang="en-US" sz="2600" dirty="0" smtClean="0"/>
                         <a:t>Local </a:t>
                       </a:r>
                       <a:br>
-                        <a:rPr lang="en-US" dirty="0" smtClean="0"/>
+                        <a:rPr lang="en-US" sz="2600" dirty="0" smtClean="0"/>
                       </a:br>
                       <a:r>
-                        <a:rPr lang="en-US" dirty="0" smtClean="0"/>
+                        <a:rPr lang="en-US" sz="2600" dirty="0" smtClean="0"/>
                         <a:t>Adaptors</a:t>
                       </a:r>
-                      <a:endParaRPr lang="en-US" dirty="0"/>
+                      <a:endParaRPr lang="en-US" sz="2600" dirty="0"/>
                     </a:p>
                   </a:txBody>
                   <a:tcPr/>
@@ -12564,16 +12351,16 @@
                     <a:lstStyle/>
                     <a:p>
                       <a:r>
-                        <a:rPr lang="en-US" dirty="0" smtClean="0"/>
+                        <a:rPr lang="en-US" sz="2600" dirty="0" smtClean="0"/>
                         <a:t>Globus</a:t>
                       </a:r>
                     </a:p>
                     <a:p>
                       <a:r>
-                        <a:rPr lang="en-US" dirty="0" smtClean="0"/>
+                        <a:rPr lang="en-US" sz="2600" dirty="0" smtClean="0"/>
                         <a:t>Adaptors</a:t>
                       </a:r>
-                      <a:endParaRPr lang="en-US" dirty="0"/>
+                      <a:endParaRPr lang="en-US" sz="2600" dirty="0"/>
                     </a:p>
                   </a:txBody>
                   <a:tcPr/>
@@ -12584,17 +12371,17 @@
                     <a:lstStyle/>
                     <a:p>
                       <a:r>
-                        <a:rPr lang="en-US" dirty="0" smtClean="0"/>
+                        <a:rPr lang="en-US" sz="2600" dirty="0" smtClean="0"/>
                         <a:t>SSH</a:t>
                       </a:r>
                       <a:br>
-                        <a:rPr lang="en-US" dirty="0" smtClean="0"/>
+                        <a:rPr lang="en-US" sz="2600" dirty="0" smtClean="0"/>
                       </a:br>
                       <a:r>
-                        <a:rPr lang="en-US" dirty="0" smtClean="0"/>
+                        <a:rPr lang="en-US" sz="2600" dirty="0" smtClean="0"/>
                         <a:t>Adaptors</a:t>
                       </a:r>
-                      <a:endParaRPr lang="en-US" dirty="0"/>
+                      <a:endParaRPr lang="en-US" sz="2600" dirty="0"/>
                     </a:p>
                   </a:txBody>
                   <a:tcPr/>
@@ -12605,16 +12392,16 @@
                     <a:lstStyle/>
                     <a:p>
                       <a:r>
-                        <a:rPr lang="en-US" dirty="0" smtClean="0"/>
+                        <a:rPr lang="en-US" sz="2600" dirty="0" smtClean="0"/>
                         <a:t>…</a:t>
                       </a:r>
-                      <a:endParaRPr lang="en-US" dirty="0"/>
+                      <a:endParaRPr lang="en-US" sz="2600" dirty="0"/>
                     </a:p>
                   </a:txBody>
                   <a:tcPr/>
                 </a:tc>
               </a:tr>
-              <a:tr h="868680">
+              <a:tr h="1005840">
                 <a:tc>
                   <a:txBody>
                     <a:bodyPr/>
@@ -12806,13 +12593,13 @@
                     <a:bodyPr/>
                     <a:lstStyle/>
                     <a:p>
-                      <a:endParaRPr lang="en-US" dirty="0"/>
+                      <a:endParaRPr lang="en-US" sz="2600" dirty="0"/>
                     </a:p>
                   </a:txBody>
                   <a:tcPr/>
                 </a:tc>
               </a:tr>
-              <a:tr h="350520">
+              <a:tr h="487680">
                 <a:tc rowSpan="2">
                   <a:txBody>
                     <a:bodyPr/>
@@ -12887,13 +12674,13 @@
                     <a:lstStyle/>
                     <a:p>
                       <a:pPr algn="l"/>
-                      <a:endParaRPr lang="en-US" dirty="0"/>
+                      <a:endParaRPr lang="en-US" sz="2600" dirty="0"/>
                     </a:p>
                   </a:txBody>
                   <a:tcPr anchor="ctr"/>
                 </a:tc>
               </a:tr>
-              <a:tr h="350520">
+              <a:tr h="487680">
                 <a:tc vMerge="1">
                   <a:txBody>
                     <a:bodyPr/>
@@ -12973,13 +12760,13 @@
                     <a:lstStyle/>
                     <a:p>
                       <a:pPr algn="l"/>
-                      <a:endParaRPr lang="en-US" dirty="0"/>
+                      <a:endParaRPr lang="en-US" sz="2600" dirty="0"/>
                     </a:p>
                   </a:txBody>
                   <a:tcPr anchor="ctr"/>
                 </a:tc>
               </a:tr>
-              <a:tr h="424186">
+              <a:tr h="701040">
                 <a:tc rowSpan="2">
                   <a:txBody>
                     <a:bodyPr/>
@@ -13072,7 +12859,7 @@
                     <a:lstStyle/>
                     <a:p>
                       <a:pPr algn="l"/>
-                      <a:endParaRPr lang="en-US" dirty="0"/>
+                      <a:endParaRPr lang="en-US" sz="2600" dirty="0"/>
                     </a:p>
                   </a:txBody>
                   <a:tcPr anchor="ctr"/>
@@ -13158,13 +12945,13 @@
                     <a:lstStyle/>
                     <a:p>
                       <a:pPr algn="l"/>
-                      <a:endParaRPr lang="en-US" dirty="0"/>
+                      <a:endParaRPr lang="en-US" sz="2600" dirty="0"/>
                     </a:p>
                   </a:txBody>
                   <a:tcPr anchor="ctr"/>
                 </a:tc>
               </a:tr>
-              <a:tr h="381000">
+              <a:tr h="701040">
                 <a:tc rowSpan="2">
                   <a:txBody>
                     <a:bodyPr/>
@@ -13268,13 +13055,13 @@
                     <a:lstStyle/>
                     <a:p>
                       <a:pPr algn="l"/>
-                      <a:endParaRPr lang="en-US" dirty="0"/>
+                      <a:endParaRPr lang="en-US" sz="2600" dirty="0"/>
                     </a:p>
                   </a:txBody>
                   <a:tcPr anchor="ctr"/>
                 </a:tc>
               </a:tr>
-              <a:tr h="381000">
+              <a:tr h="701040">
                 <a:tc vMerge="1">
                   <a:txBody>
                     <a:bodyPr/>
@@ -13348,7 +13135,7 @@
                     <a:lstStyle/>
                     <a:p>
                       <a:pPr algn="l"/>
-                      <a:endParaRPr lang="en-US" dirty="0"/>
+                      <a:endParaRPr lang="en-US" sz="2600" dirty="0"/>
                     </a:p>
                   </a:txBody>
                   <a:tcPr anchor="ctr"/>
@@ -13431,7 +13218,7 @@
     </p:spTree>
     <p:extLst>
       <p:ext uri="{BB962C8B-B14F-4D97-AF65-F5344CB8AC3E}">
-        <p14:creationId xmlns:p14="http://schemas.microsoft.com/office/powerpoint/2010/main" val="4167202409"/>
+        <p14:creationId xmlns:p14="http://schemas.microsoft.com/office/powerpoint/2010/main" xmlns:p="http://schemas.openxmlformats.org/presentationml/2006/main" xmlns:r="http://schemas.openxmlformats.org/officeDocument/2006/relationships" xmlns:a="http://schemas.openxmlformats.org/drawingml/2006/main" xmlns="" val="4167202409"/>
       </p:ext>
     </p:extLst>
   </p:cSld>
@@ -13449,7 +13236,7 @@
 </file>
 
 <file path=ppt/slides/slide6.xml><?xml version="1.0" encoding="utf-8"?>
-<p:sld xmlns:a="http://schemas.openxmlformats.org/drawingml/2006/main" xmlns:r="http://schemas.openxmlformats.org/officeDocument/2006/relationships" xmlns:p="http://schemas.openxmlformats.org/presentationml/2006/main">
+<p:sld xmlns:a="http://schemas.openxmlformats.org/drawingml/2006/main" xmlns:r="http://schemas.openxmlformats.org/officeDocument/2006/relationships" xmlns:mc="http://schemas.openxmlformats.org/markup-compatibility/2006" xmlns:mv="urn:schemas-microsoft-com:mac:vml" xmlns:p="http://schemas.openxmlformats.org/presentationml/2006/main" mc:Ignorable="mv" mc:PreserveAttributes="mv:*">
   <p:cSld>
     <p:spTree>
       <p:nvGrpSpPr>
@@ -13535,9 +13322,9 @@
             </a:r>
           </a:p>
           <a:p>
-            <a:pPr marL="911225" lvl="1" indent="-477838">
+            <a:pPr marL="911178" lvl="1" indent="-477814">
               <a:tabLst>
-                <a:tab pos="3657600" algn="l"/>
+                <a:tab pos="3657413" algn="l"/>
               </a:tabLst>
             </a:pPr>
             <a:r>
@@ -13562,9 +13349,9 @@
             </a:r>
           </a:p>
           <a:p>
-            <a:pPr marL="911225" lvl="1" indent="-477838">
+            <a:pPr marL="911178" lvl="1" indent="-477814">
               <a:tabLst>
-                <a:tab pos="3657600" algn="l"/>
+                <a:tab pos="3657413" algn="l"/>
               </a:tabLst>
             </a:pPr>
             <a:r>
@@ -13585,9 +13372,9 @@
             </a:r>
           </a:p>
           <a:p>
-            <a:pPr marL="911225" lvl="1" indent="-477838">
+            <a:pPr marL="911178" lvl="1" indent="-477814">
               <a:tabLst>
-                <a:tab pos="3657600" algn="l"/>
+                <a:tab pos="3657413" algn="l"/>
               </a:tabLst>
             </a:pPr>
             <a:r>
@@ -13612,9 +13399,9 @@
             </a:r>
           </a:p>
           <a:p>
-            <a:pPr marL="911225" lvl="1" indent="-477838">
+            <a:pPr marL="911178" lvl="1" indent="-477814">
               <a:tabLst>
-                <a:tab pos="3657600" algn="l"/>
+                <a:tab pos="3657413" algn="l"/>
               </a:tabLst>
             </a:pPr>
             <a:r>
@@ -13712,7 +13499,7 @@
 </file>
 
 <file path=ppt/slides/slide7.xml><?xml version="1.0" encoding="utf-8"?>
-<p:sld xmlns:a="http://schemas.openxmlformats.org/drawingml/2006/main" xmlns:r="http://schemas.openxmlformats.org/officeDocument/2006/relationships" xmlns:p="http://schemas.openxmlformats.org/presentationml/2006/main">
+<p:sld xmlns:a="http://schemas.openxmlformats.org/drawingml/2006/main" xmlns:r="http://schemas.openxmlformats.org/officeDocument/2006/relationships" xmlns:mc="http://schemas.openxmlformats.org/markup-compatibility/2006" xmlns:mv="urn:schemas-microsoft-com:mac:vml" xmlns:p="http://schemas.openxmlformats.org/presentationml/2006/main" mc:Ignorable="mv" mc:PreserveAttributes="mv:*">
   <p:cSld>
     <p:spTree>
       <p:nvGrpSpPr>
@@ -13915,7 +13702,7 @@
 </file>
 
 <file path=ppt/slides/slide8.xml><?xml version="1.0" encoding="utf-8"?>
-<p:sld xmlns:a="http://schemas.openxmlformats.org/drawingml/2006/main" xmlns:r="http://schemas.openxmlformats.org/officeDocument/2006/relationships" xmlns:p="http://schemas.openxmlformats.org/presentationml/2006/main">
+<p:sld xmlns:a="http://schemas.openxmlformats.org/drawingml/2006/main" xmlns:r="http://schemas.openxmlformats.org/officeDocument/2006/relationships" xmlns:mc="http://schemas.openxmlformats.org/markup-compatibility/2006" xmlns:mv="urn:schemas-microsoft-com:mac:vml" xmlns:p="http://schemas.openxmlformats.org/presentationml/2006/main" mc:Ignorable="mv" mc:PreserveAttributes="mv:*">
   <p:cSld>
     <p:spTree>
       <p:nvGrpSpPr>
@@ -13966,8 +13753,8 @@
         </p:nvSpPr>
         <p:spPr>
           <a:xfrm>
-            <a:off x="863601" y="2942035"/>
-            <a:ext cx="11545148" cy="2391965"/>
+            <a:off x="863602" y="2942036"/>
+            <a:ext cx="11545148" cy="2391964"/>
           </a:xfrm>
         </p:spPr>
         <p:txBody>
@@ -13985,14 +13772,14 @@
           <a:p>
             <a:pPr lvl="1" fontAlgn="ctr"/>
             <a:r>
-              <a:rPr lang="de-DE" sz="3200" dirty="0" smtClean="0"/>
+              <a:rPr lang="de-DE" sz="3100" dirty="0" smtClean="0"/>
               <a:t>Depends on SAGA adaptors</a:t>
             </a:r>
           </a:p>
           <a:p>
             <a:pPr lvl="1" fontAlgn="ctr"/>
             <a:r>
-              <a:rPr lang="de-DE" sz="3200" dirty="0" smtClean="0"/>
+              <a:rPr lang="de-DE" sz="3100" dirty="0" smtClean="0"/>
               <a:t>Also available: Globus GridFTP, Curl (subset), KFS, Amazon EC2, Opencloud (Sector/Sphere), Hadoop (HDFS)</a:t>
             </a:r>
           </a:p>
@@ -14084,13 +13871,13 @@
           <p:nvPr>
             <p:extLst>
               <p:ext uri="{D42A27DB-BD31-4B8C-83A1-F6EECF244321}">
-                <p14:modId xmlns:p14="http://schemas.microsoft.com/office/powerpoint/2010/main" val="3768818699"/>
+                <p14:modId xmlns:p14="http://schemas.microsoft.com/office/powerpoint/2010/main" xmlns:p="http://schemas.openxmlformats.org/presentationml/2006/main" xmlns:r="http://schemas.openxmlformats.org/officeDocument/2006/relationships" xmlns:a="http://schemas.openxmlformats.org/drawingml/2006/main" xmlns="" val="3768818699"/>
               </p:ext>
             </p:extLst>
           </p:nvPr>
         </p:nvGraphicFramePr>
         <p:xfrm>
-          <a:off x="1015609" y="5513363"/>
+          <a:off x="1015609" y="5513362"/>
           <a:ext cx="10972800" cy="3169920"/>
         </p:xfrm>
         <a:graphic>
@@ -14391,7 +14178,7 @@
 </file>
 
 <file path=ppt/slides/slide9.xml><?xml version="1.0" encoding="utf-8"?>
-<p:sld xmlns:a="http://schemas.openxmlformats.org/drawingml/2006/main" xmlns:r="http://schemas.openxmlformats.org/officeDocument/2006/relationships" xmlns:p="http://schemas.openxmlformats.org/presentationml/2006/main">
+<p:sld xmlns:a="http://schemas.openxmlformats.org/drawingml/2006/main" xmlns:r="http://schemas.openxmlformats.org/officeDocument/2006/relationships" xmlns:mc="http://schemas.openxmlformats.org/markup-compatibility/2006" xmlns:mv="urn:schemas-microsoft-com:mac:vml" xmlns:p="http://schemas.openxmlformats.org/presentationml/2006/main" mc:Ignorable="mv" mc:PreserveAttributes="mv:*">
   <p:cSld>
     <p:spTree>
       <p:nvGrpSpPr>
@@ -14442,7 +14229,7 @@
         </p:nvSpPr>
         <p:spPr>
           <a:xfrm>
-            <a:off x="853831" y="2971800"/>
+            <a:off x="853831" y="2971801"/>
             <a:ext cx="11704320" cy="2362199"/>
           </a:xfrm>
         </p:spPr>
@@ -14461,14 +14248,14 @@
           <a:p>
             <a:pPr lvl="1" fontAlgn="ctr"/>
             <a:r>
-              <a:rPr lang="de-DE" sz="3200" dirty="0" smtClean="0"/>
+              <a:rPr lang="de-DE" sz="3100" dirty="0" smtClean="0"/>
               <a:t>Depends on SAGA adaptors</a:t>
             </a:r>
           </a:p>
           <a:p>
             <a:pPr lvl="1" fontAlgn="ctr"/>
             <a:r>
-              <a:rPr lang="de-DE" sz="3200" dirty="0" smtClean="0"/>
+              <a:rPr lang="de-DE" sz="3100" dirty="0" smtClean="0"/>
               <a:t>Also available: Globus Gram, Condor, OMII-GridSAM, LSF, Amazon EC2, Opencloud (Sector/Sphere)</a:t>
             </a:r>
           </a:p>
@@ -14560,13 +14347,13 @@
           <p:nvPr>
             <p:extLst>
               <p:ext uri="{D42A27DB-BD31-4B8C-83A1-F6EECF244321}">
-                <p14:modId xmlns:p14="http://schemas.microsoft.com/office/powerpoint/2010/main" val="1142005977"/>
+                <p14:modId xmlns:p14="http://schemas.microsoft.com/office/powerpoint/2010/main" xmlns:p="http://schemas.openxmlformats.org/presentationml/2006/main" xmlns:r="http://schemas.openxmlformats.org/officeDocument/2006/relationships" xmlns:a="http://schemas.openxmlformats.org/drawingml/2006/main" xmlns="" val="1142005977"/>
               </p:ext>
             </p:extLst>
           </p:nvPr>
         </p:nvGraphicFramePr>
         <p:xfrm>
-          <a:off x="986302" y="5486400"/>
+          <a:off x="986303" y="5486401"/>
           <a:ext cx="10972800" cy="3698240"/>
         </p:xfrm>
         <a:graphic>

</xml_diff>

<commit_message>
Pending changes from yesterday...
git-svn-id: file://localhost/tmp/svn2git/svn@3268 defb5e50-622e-49ec-a68e-d72c7db87b45
</commit_message>
<xml_diff>
--- a/tutorial/general_tutorial/SAGA-API-levels.pptx
+++ b/tutorial/general_tutorial/SAGA-API-levels.pptx
@@ -1,14 +1,14 @@
 
 <file path=ppt/presentation.xml><?xml version="1.0" encoding="utf-8"?>
-<p:presentation xmlns:a="http://schemas.openxmlformats.org/drawingml/2006/main" xmlns:r="http://schemas.openxmlformats.org/officeDocument/2006/relationships" xmlns:mc="http://schemas.openxmlformats.org/markup-compatibility/2006" xmlns:mv="urn:schemas-microsoft-com:mac:vml" xmlns:p="http://schemas.openxmlformats.org/presentationml/2006/main" mc:Ignorable="mv" mc:PreserveAttributes="mv:*" showSpecialPlsOnTitleSld="0" strictFirstAndLastChars="0" saveSubsetFonts="1">
+<p:presentation xmlns:a="http://schemas.openxmlformats.org/drawingml/2006/main" xmlns:r="http://schemas.openxmlformats.org/officeDocument/2006/relationships" xmlns:p="http://schemas.openxmlformats.org/presentationml/2006/main" showSpecialPlsOnTitleSld="0" strictFirstAndLastChars="0" saveSubsetFonts="1">
   <p:sldMasterIdLst>
     <p:sldMasterId id="2147483701" r:id="rId1"/>
   </p:sldMasterIdLst>
   <p:notesMasterIdLst>
-    <p:notesMasterId r:id="rId29"/>
+    <p:notesMasterId r:id="rId30"/>
   </p:notesMasterIdLst>
   <p:sldIdLst>
-    <p:sldId id="320" r:id="rId2"/>
+    <p:sldId id="321" r:id="rId2"/>
     <p:sldId id="308" r:id="rId3"/>
     <p:sldId id="258" r:id="rId4"/>
     <p:sldId id="312" r:id="rId5"/>
@@ -29,12 +29,13 @@
     <p:sldId id="315" r:id="rId20"/>
     <p:sldId id="316" r:id="rId21"/>
     <p:sldId id="317" r:id="rId22"/>
-    <p:sldId id="318" r:id="rId23"/>
-    <p:sldId id="295" r:id="rId24"/>
-    <p:sldId id="257" r:id="rId25"/>
-    <p:sldId id="299" r:id="rId26"/>
-    <p:sldId id="301" r:id="rId27"/>
-    <p:sldId id="303" r:id="rId28"/>
+    <p:sldId id="320" r:id="rId23"/>
+    <p:sldId id="318" r:id="rId24"/>
+    <p:sldId id="295" r:id="rId25"/>
+    <p:sldId id="257" r:id="rId26"/>
+    <p:sldId id="299" r:id="rId27"/>
+    <p:sldId id="301" r:id="rId28"/>
+    <p:sldId id="303" r:id="rId29"/>
   </p:sldIdLst>
   <p:sldSz cx="13004800" cy="9753600"/>
   <p:notesSz cx="6858000" cy="9144000"/>
@@ -49,7 +50,7 @@
       <a:spcAft>
         <a:spcPct val="0"/>
       </a:spcAft>
-      <a:defRPr sz="4300" kern="1200">
+      <a:defRPr sz="4200" kern="1200">
         <a:solidFill>
           <a:srgbClr val="414141"/>
         </a:solidFill>
@@ -59,14 +60,14 @@
         <a:sym typeface="Gill Sans Light" charset="0"/>
       </a:defRPr>
     </a:lvl1pPr>
-    <a:lvl2pPr marL="457176" algn="ctr" rtl="0" fontAlgn="base">
+    <a:lvl2pPr marL="457200" algn="ctr" rtl="0" fontAlgn="base">
       <a:spcBef>
         <a:spcPct val="0"/>
       </a:spcBef>
       <a:spcAft>
         <a:spcPct val="0"/>
       </a:spcAft>
-      <a:defRPr sz="4300" kern="1200">
+      <a:defRPr sz="4200" kern="1200">
         <a:solidFill>
           <a:srgbClr val="414141"/>
         </a:solidFill>
@@ -76,14 +77,14 @@
         <a:sym typeface="Gill Sans Light" charset="0"/>
       </a:defRPr>
     </a:lvl2pPr>
-    <a:lvl3pPr marL="914354" algn="ctr" rtl="0" fontAlgn="base">
+    <a:lvl3pPr marL="914400" algn="ctr" rtl="0" fontAlgn="base">
       <a:spcBef>
         <a:spcPct val="0"/>
       </a:spcBef>
       <a:spcAft>
         <a:spcPct val="0"/>
       </a:spcAft>
-      <a:defRPr sz="4300" kern="1200">
+      <a:defRPr sz="4200" kern="1200">
         <a:solidFill>
           <a:srgbClr val="414141"/>
         </a:solidFill>
@@ -93,14 +94,14 @@
         <a:sym typeface="Gill Sans Light" charset="0"/>
       </a:defRPr>
     </a:lvl3pPr>
-    <a:lvl4pPr marL="1371530" algn="ctr" rtl="0" fontAlgn="base">
+    <a:lvl4pPr marL="1371600" algn="ctr" rtl="0" fontAlgn="base">
       <a:spcBef>
         <a:spcPct val="0"/>
       </a:spcBef>
       <a:spcAft>
         <a:spcPct val="0"/>
       </a:spcAft>
-      <a:defRPr sz="4300" kern="1200">
+      <a:defRPr sz="4200" kern="1200">
         <a:solidFill>
           <a:srgbClr val="414141"/>
         </a:solidFill>
@@ -110,14 +111,14 @@
         <a:sym typeface="Gill Sans Light" charset="0"/>
       </a:defRPr>
     </a:lvl4pPr>
-    <a:lvl5pPr marL="1828706" algn="ctr" rtl="0" fontAlgn="base">
+    <a:lvl5pPr marL="1828800" algn="ctr" rtl="0" fontAlgn="base">
       <a:spcBef>
         <a:spcPct val="0"/>
       </a:spcBef>
       <a:spcAft>
         <a:spcPct val="0"/>
       </a:spcAft>
-      <a:defRPr sz="4300" kern="1200">
+      <a:defRPr sz="4200" kern="1200">
         <a:solidFill>
           <a:srgbClr val="414141"/>
         </a:solidFill>
@@ -127,8 +128,8 @@
         <a:sym typeface="Gill Sans Light" charset="0"/>
       </a:defRPr>
     </a:lvl5pPr>
-    <a:lvl6pPr marL="2285884" algn="l" defTabSz="914354" rtl="0" eaLnBrk="1" latinLnBrk="0" hangingPunct="1">
-      <a:defRPr sz="4300" kern="1200">
+    <a:lvl6pPr marL="2286000" algn="l" defTabSz="914400" rtl="0" eaLnBrk="1" latinLnBrk="0" hangingPunct="1">
+      <a:defRPr sz="4200" kern="1200">
         <a:solidFill>
           <a:srgbClr val="414141"/>
         </a:solidFill>
@@ -138,8 +139,8 @@
         <a:sym typeface="Gill Sans Light" charset="0"/>
       </a:defRPr>
     </a:lvl6pPr>
-    <a:lvl7pPr marL="2743060" algn="l" defTabSz="914354" rtl="0" eaLnBrk="1" latinLnBrk="0" hangingPunct="1">
-      <a:defRPr sz="4300" kern="1200">
+    <a:lvl7pPr marL="2743200" algn="l" defTabSz="914400" rtl="0" eaLnBrk="1" latinLnBrk="0" hangingPunct="1">
+      <a:defRPr sz="4200" kern="1200">
         <a:solidFill>
           <a:srgbClr val="414141"/>
         </a:solidFill>
@@ -149,8 +150,8 @@
         <a:sym typeface="Gill Sans Light" charset="0"/>
       </a:defRPr>
     </a:lvl7pPr>
-    <a:lvl8pPr marL="3200236" algn="l" defTabSz="914354" rtl="0" eaLnBrk="1" latinLnBrk="0" hangingPunct="1">
-      <a:defRPr sz="4300" kern="1200">
+    <a:lvl8pPr marL="3200400" algn="l" defTabSz="914400" rtl="0" eaLnBrk="1" latinLnBrk="0" hangingPunct="1">
+      <a:defRPr sz="4200" kern="1200">
         <a:solidFill>
           <a:srgbClr val="414141"/>
         </a:solidFill>
@@ -160,8 +161,8 @@
         <a:sym typeface="Gill Sans Light" charset="0"/>
       </a:defRPr>
     </a:lvl8pPr>
-    <a:lvl9pPr marL="3657413" algn="l" defTabSz="914354" rtl="0" eaLnBrk="1" latinLnBrk="0" hangingPunct="1">
-      <a:defRPr sz="4300" kern="1200">
+    <a:lvl9pPr marL="3657600" algn="l" defTabSz="914400" rtl="0" eaLnBrk="1" latinLnBrk="0" hangingPunct="1">
+      <a:defRPr sz="4200" kern="1200">
         <a:solidFill>
           <a:srgbClr val="414141"/>
         </a:solidFill>
@@ -176,7 +177,7 @@
 </file>
 
 <file path=ppt/notesMasters/notesMaster1.xml><?xml version="1.0" encoding="utf-8"?>
-<p:notesMaster xmlns:a="http://schemas.openxmlformats.org/drawingml/2006/main" xmlns:r="http://schemas.openxmlformats.org/officeDocument/2006/relationships" xmlns:mc="http://schemas.openxmlformats.org/markup-compatibility/2006" xmlns:mv="urn:schemas-microsoft-com:mac:vml" xmlns:p="http://schemas.openxmlformats.org/presentationml/2006/main" mc:Ignorable="mv" mc:PreserveAttributes="mv:*">
+<p:notesMaster xmlns:a="http://schemas.openxmlformats.org/drawingml/2006/main" xmlns:r="http://schemas.openxmlformats.org/officeDocument/2006/relationships" xmlns:p="http://schemas.openxmlformats.org/presentationml/2006/main">
   <p:cSld>
     <p:bg>
       <p:bgRef idx="1001">
@@ -258,7 +259,7 @@
             <a:fld id="{FD89E5DE-5FFC-4DBE-9A7F-2C9F568D0D45}" type="datetimeFigureOut">
               <a:rPr lang="en-US" smtClean="0"/>
               <a:pPr/>
-              <a:t>11/28/10</a:t>
+              <a:t>11/29/2010</a:t>
             </a:fld>
             <a:endParaRPr lang="en-US"/>
           </a:p>
@@ -429,14 +430,14 @@
     </p:spTree>
     <p:extLst>
       <p:ext uri="{BB962C8B-B14F-4D97-AF65-F5344CB8AC3E}">
-        <p14:creationId xmlns:p14="http://schemas.microsoft.com/office/powerpoint/2010/main" xmlns:p="http://schemas.openxmlformats.org/presentationml/2006/main" xmlns:r="http://schemas.openxmlformats.org/officeDocument/2006/relationships" xmlns:a="http://schemas.openxmlformats.org/drawingml/2006/main" xmlns="" val="2265826956"/>
+        <p14:creationId xmlns:p14="http://schemas.microsoft.com/office/powerpoint/2010/main" val="2265826956"/>
       </p:ext>
     </p:extLst>
   </p:cSld>
   <p:clrMap bg1="lt1" tx1="dk1" bg2="lt2" tx2="dk2" accent1="accent1" accent2="accent2" accent3="accent3" accent4="accent4" accent5="accent5" accent6="accent6" hlink="hlink" folHlink="folHlink"/>
   <p:notesStyle>
-    <a:lvl1pPr marL="0" algn="l" defTabSz="914354" rtl="0" eaLnBrk="1" latinLnBrk="0" hangingPunct="1">
-      <a:defRPr sz="1100" kern="1200">
+    <a:lvl1pPr marL="0" algn="l" defTabSz="914400" rtl="0" eaLnBrk="1" latinLnBrk="0" hangingPunct="1">
+      <a:defRPr sz="1200" kern="1200">
         <a:solidFill>
           <a:schemeClr val="tx1"/>
         </a:solidFill>
@@ -445,8 +446,8 @@
         <a:cs typeface="+mn-cs"/>
       </a:defRPr>
     </a:lvl1pPr>
-    <a:lvl2pPr marL="457176" algn="l" defTabSz="914354" rtl="0" eaLnBrk="1" latinLnBrk="0" hangingPunct="1">
-      <a:defRPr sz="1100" kern="1200">
+    <a:lvl2pPr marL="457200" algn="l" defTabSz="914400" rtl="0" eaLnBrk="1" latinLnBrk="0" hangingPunct="1">
+      <a:defRPr sz="1200" kern="1200">
         <a:solidFill>
           <a:schemeClr val="tx1"/>
         </a:solidFill>
@@ -455,8 +456,8 @@
         <a:cs typeface="+mn-cs"/>
       </a:defRPr>
     </a:lvl2pPr>
-    <a:lvl3pPr marL="914354" algn="l" defTabSz="914354" rtl="0" eaLnBrk="1" latinLnBrk="0" hangingPunct="1">
-      <a:defRPr sz="1100" kern="1200">
+    <a:lvl3pPr marL="914400" algn="l" defTabSz="914400" rtl="0" eaLnBrk="1" latinLnBrk="0" hangingPunct="1">
+      <a:defRPr sz="1200" kern="1200">
         <a:solidFill>
           <a:schemeClr val="tx1"/>
         </a:solidFill>
@@ -465,8 +466,8 @@
         <a:cs typeface="+mn-cs"/>
       </a:defRPr>
     </a:lvl3pPr>
-    <a:lvl4pPr marL="1371530" algn="l" defTabSz="914354" rtl="0" eaLnBrk="1" latinLnBrk="0" hangingPunct="1">
-      <a:defRPr sz="1100" kern="1200">
+    <a:lvl4pPr marL="1371600" algn="l" defTabSz="914400" rtl="0" eaLnBrk="1" latinLnBrk="0" hangingPunct="1">
+      <a:defRPr sz="1200" kern="1200">
         <a:solidFill>
           <a:schemeClr val="tx1"/>
         </a:solidFill>
@@ -475,8 +476,8 @@
         <a:cs typeface="+mn-cs"/>
       </a:defRPr>
     </a:lvl4pPr>
-    <a:lvl5pPr marL="1828706" algn="l" defTabSz="914354" rtl="0" eaLnBrk="1" latinLnBrk="0" hangingPunct="1">
-      <a:defRPr sz="1100" kern="1200">
+    <a:lvl5pPr marL="1828800" algn="l" defTabSz="914400" rtl="0" eaLnBrk="1" latinLnBrk="0" hangingPunct="1">
+      <a:defRPr sz="1200" kern="1200">
         <a:solidFill>
           <a:schemeClr val="tx1"/>
         </a:solidFill>
@@ -485,8 +486,8 @@
         <a:cs typeface="+mn-cs"/>
       </a:defRPr>
     </a:lvl5pPr>
-    <a:lvl6pPr marL="2285884" algn="l" defTabSz="914354" rtl="0" eaLnBrk="1" latinLnBrk="0" hangingPunct="1">
-      <a:defRPr sz="1100" kern="1200">
+    <a:lvl6pPr marL="2286000" algn="l" defTabSz="914400" rtl="0" eaLnBrk="1" latinLnBrk="0" hangingPunct="1">
+      <a:defRPr sz="1200" kern="1200">
         <a:solidFill>
           <a:schemeClr val="tx1"/>
         </a:solidFill>
@@ -495,8 +496,8 @@
         <a:cs typeface="+mn-cs"/>
       </a:defRPr>
     </a:lvl6pPr>
-    <a:lvl7pPr marL="2743060" algn="l" defTabSz="914354" rtl="0" eaLnBrk="1" latinLnBrk="0" hangingPunct="1">
-      <a:defRPr sz="1100" kern="1200">
+    <a:lvl7pPr marL="2743200" algn="l" defTabSz="914400" rtl="0" eaLnBrk="1" latinLnBrk="0" hangingPunct="1">
+      <a:defRPr sz="1200" kern="1200">
         <a:solidFill>
           <a:schemeClr val="tx1"/>
         </a:solidFill>
@@ -505,8 +506,8 @@
         <a:cs typeface="+mn-cs"/>
       </a:defRPr>
     </a:lvl7pPr>
-    <a:lvl8pPr marL="3200236" algn="l" defTabSz="914354" rtl="0" eaLnBrk="1" latinLnBrk="0" hangingPunct="1">
-      <a:defRPr sz="1100" kern="1200">
+    <a:lvl8pPr marL="3200400" algn="l" defTabSz="914400" rtl="0" eaLnBrk="1" latinLnBrk="0" hangingPunct="1">
+      <a:defRPr sz="1200" kern="1200">
         <a:solidFill>
           <a:schemeClr val="tx1"/>
         </a:solidFill>
@@ -515,8 +516,8 @@
         <a:cs typeface="+mn-cs"/>
       </a:defRPr>
     </a:lvl8pPr>
-    <a:lvl9pPr marL="3657413" algn="l" defTabSz="914354" rtl="0" eaLnBrk="1" latinLnBrk="0" hangingPunct="1">
-      <a:defRPr sz="1100" kern="1200">
+    <a:lvl9pPr marL="3657600" algn="l" defTabSz="914400" rtl="0" eaLnBrk="1" latinLnBrk="0" hangingPunct="1">
+      <a:defRPr sz="1200" kern="1200">
         <a:solidFill>
           <a:schemeClr val="tx1"/>
         </a:solidFill>
@@ -530,7 +531,7 @@
 </file>
 
 <file path=ppt/notesSlides/notesSlide1.xml><?xml version="1.0" encoding="utf-8"?>
-<p:notes xmlns:a="http://schemas.openxmlformats.org/drawingml/2006/main" xmlns:r="http://schemas.openxmlformats.org/officeDocument/2006/relationships" xmlns:mc="http://schemas.openxmlformats.org/markup-compatibility/2006" xmlns:mv="urn:schemas-microsoft-com:mac:vml" xmlns:p="http://schemas.openxmlformats.org/presentationml/2006/main" mc:Ignorable="mv" mc:PreserveAttributes="mv:*">
+<p:notes xmlns:a="http://schemas.openxmlformats.org/drawingml/2006/main" xmlns:r="http://schemas.openxmlformats.org/officeDocument/2006/relationships" xmlns:p="http://schemas.openxmlformats.org/presentationml/2006/main">
   <p:cSld>
     <p:spTree>
       <p:nvGrpSpPr>
@@ -612,7 +613,7 @@
 </file>
 
 <file path=ppt/notesSlides/notesSlide2.xml><?xml version="1.0" encoding="utf-8"?>
-<p:notes xmlns:a="http://schemas.openxmlformats.org/drawingml/2006/main" xmlns:r="http://schemas.openxmlformats.org/officeDocument/2006/relationships" xmlns:mc="http://schemas.openxmlformats.org/markup-compatibility/2006" xmlns:mv="urn:schemas-microsoft-com:mac:vml" xmlns:p="http://schemas.openxmlformats.org/presentationml/2006/main" mc:Ignorable="mv" mc:PreserveAttributes="mv:*">
+<p:notes xmlns:a="http://schemas.openxmlformats.org/drawingml/2006/main" xmlns:r="http://schemas.openxmlformats.org/officeDocument/2006/relationships" xmlns:p="http://schemas.openxmlformats.org/presentationml/2006/main">
   <p:cSld>
     <p:spTree>
       <p:nvGrpSpPr>
@@ -694,7 +695,7 @@
 </file>
 
 <file path=ppt/slideLayouts/slideLayout1.xml><?xml version="1.0" encoding="utf-8"?>
-<p:sldLayout xmlns:a="http://schemas.openxmlformats.org/drawingml/2006/main" xmlns:r="http://schemas.openxmlformats.org/officeDocument/2006/relationships" xmlns:mc="http://schemas.openxmlformats.org/markup-compatibility/2006" xmlns:mv="urn:schemas-microsoft-com:mac:vml" xmlns:p="http://schemas.openxmlformats.org/presentationml/2006/main" mc:Ignorable="mv" mc:PreserveAttributes="mv:*" preserve="1">
+<p:sldLayout xmlns:a="http://schemas.openxmlformats.org/drawingml/2006/main" xmlns:r="http://schemas.openxmlformats.org/officeDocument/2006/relationships" xmlns:p="http://schemas.openxmlformats.org/presentationml/2006/main" preserve="1">
   <p:cSld name="Title Slide">
     <p:spTree>
       <p:nvGrpSpPr>
@@ -727,7 +728,7 @@
         </p:blipFill>
         <p:spPr bwMode="auto">
           <a:xfrm>
-            <a:off x="10141323" y="811225"/>
+            <a:off x="10141321" y="811223"/>
             <a:ext cx="2338743" cy="1833283"/>
           </a:xfrm>
           <a:prstGeom prst="rect">
@@ -750,7 +751,7 @@
         </p:nvSpPr>
         <p:spPr>
           <a:xfrm>
-            <a:off x="2" y="3068187"/>
+            <a:off x="1" y="3068187"/>
             <a:ext cx="12690496" cy="1247622"/>
           </a:xfrm>
           <a:prstGeom prst="rect">
@@ -784,7 +785,7 @@
           </a:fontRef>
         </p:style>
         <p:txBody>
-          <a:bodyPr lIns="130039" tIns="65020" rIns="130039" bIns="65020" rtlCol="0" anchor="ctr"/>
+          <a:bodyPr lIns="130046" tIns="65023" rIns="130046" bIns="65023" rtlCol="0" anchor="ctr"/>
           <a:lstStyle/>
           <a:p>
             <a:pPr algn="ctr"/>
@@ -836,7 +837,7 @@
           </a:solidFill>
         </p:spPr>
         <p:txBody>
-          <a:bodyPr lIns="390118" tIns="130039" bIns="130039" anchor="t" anchorCtr="0">
+          <a:bodyPr lIns="390138" tIns="130046" bIns="130046" anchor="t" anchorCtr="0">
             <a:noAutofit/>
           </a:bodyPr>
           <a:lstStyle>
@@ -869,7 +870,7 @@
         </p:nvSpPr>
         <p:spPr>
           <a:xfrm>
-            <a:off x="9358356" y="9234313"/>
+            <a:off x="9358356" y="9234312"/>
             <a:ext cx="3034453" cy="519289"/>
           </a:xfrm>
         </p:spPr>
@@ -897,7 +898,7 @@
         </p:nvSpPr>
         <p:spPr>
           <a:xfrm>
-            <a:off x="1593725" y="9234313"/>
+            <a:off x="1593725" y="9234312"/>
             <a:ext cx="4118187" cy="519289"/>
           </a:xfrm>
         </p:spPr>
@@ -922,7 +923,7 @@
 </file>
 
 <file path=ppt/slideLayouts/slideLayout10.xml><?xml version="1.0" encoding="utf-8"?>
-<p:sldLayout xmlns:a="http://schemas.openxmlformats.org/drawingml/2006/main" xmlns:r="http://schemas.openxmlformats.org/officeDocument/2006/relationships" xmlns:mc="http://schemas.openxmlformats.org/markup-compatibility/2006" xmlns:mv="urn:schemas-microsoft-com:mac:vml" xmlns:p="http://schemas.openxmlformats.org/presentationml/2006/main" mc:Ignorable="mv" mc:PreserveAttributes="mv:*" type="picTx" preserve="1">
+<p:sldLayout xmlns:a="http://schemas.openxmlformats.org/drawingml/2006/main" xmlns:r="http://schemas.openxmlformats.org/officeDocument/2006/relationships" xmlns:p="http://schemas.openxmlformats.org/presentationml/2006/main" type="picTx" preserve="1">
   <p:cSld name="Picture with Caption">
     <p:spTree>
       <p:nvGrpSpPr>
@@ -958,11 +959,11 @@
           </a:solidFill>
         </p:spPr>
         <p:txBody>
-          <a:bodyPr vert="horz" lIns="1690511" tIns="65020" rIns="390118" bIns="65020" rtlCol="0" anchor="ctr">
+          <a:bodyPr vert="horz" lIns="1690598" tIns="65023" rIns="390138" bIns="65023" rtlCol="0" anchor="ctr">
             <a:normAutofit/>
           </a:bodyPr>
           <a:lstStyle>
-            <a:lvl1pPr marL="0" indent="0" algn="l" defTabSz="1300393" rtl="0" eaLnBrk="1" latinLnBrk="0" hangingPunct="1">
+            <a:lvl1pPr marL="0" indent="0" algn="l" defTabSz="1300460" rtl="0" eaLnBrk="1" latinLnBrk="0" hangingPunct="1">
               <a:spcBef>
                 <a:spcPct val="0"/>
               </a:spcBef>
@@ -998,7 +999,7 @@
         </p:nvSpPr>
         <p:spPr>
           <a:xfrm>
-            <a:off x="7805139" y="2913075"/>
+            <a:off x="7805138" y="2913075"/>
             <a:ext cx="4874543" cy="5982208"/>
           </a:xfrm>
         </p:spPr>
@@ -1011,35 +1012,35 @@
               <a:buNone/>
               <a:defRPr sz="3400"/>
             </a:lvl1pPr>
-            <a:lvl2pPr marL="650197" indent="0">
+            <a:lvl2pPr marL="650230" indent="0">
               <a:buNone/>
               <a:defRPr sz="4000"/>
             </a:lvl2pPr>
-            <a:lvl3pPr marL="1300393" indent="0">
+            <a:lvl3pPr marL="1300460" indent="0">
               <a:buNone/>
               <a:defRPr sz="3400"/>
             </a:lvl3pPr>
-            <a:lvl4pPr marL="1950590" indent="0">
+            <a:lvl4pPr marL="1950690" indent="0">
               <a:buNone/>
               <a:defRPr sz="2800"/>
             </a:lvl4pPr>
-            <a:lvl5pPr marL="2600786" indent="0">
+            <a:lvl5pPr marL="2600919" indent="0">
               <a:buNone/>
               <a:defRPr sz="2800"/>
             </a:lvl5pPr>
-            <a:lvl6pPr marL="3250983" indent="0">
+            <a:lvl6pPr marL="3251149" indent="0">
               <a:buNone/>
               <a:defRPr sz="2800"/>
             </a:lvl6pPr>
-            <a:lvl7pPr marL="3901180" indent="0">
+            <a:lvl7pPr marL="3901379" indent="0">
               <a:buNone/>
               <a:defRPr sz="2800"/>
             </a:lvl7pPr>
-            <a:lvl8pPr marL="4551376" indent="0">
+            <a:lvl8pPr marL="4551609" indent="0">
               <a:buNone/>
               <a:defRPr sz="2800"/>
             </a:lvl8pPr>
-            <a:lvl9pPr marL="5201573" indent="0">
+            <a:lvl9pPr marL="5201839" indent="0">
               <a:buNone/>
               <a:defRPr sz="2800"/>
             </a:lvl9pPr>
@@ -1095,7 +1096,7 @@
           </a:fontRef>
         </p:style>
         <p:txBody>
-          <a:bodyPr vert="horz" lIns="416126" tIns="390118" rIns="390118" bIns="390118" rtlCol="0" anchor="t" anchorCtr="0">
+          <a:bodyPr vert="horz" lIns="416147" tIns="390138" rIns="390138" bIns="390138" rtlCol="0" anchor="t" anchorCtr="0">
             <a:normAutofit/>
           </a:bodyPr>
           <a:lstStyle>
@@ -1113,41 +1114,41 @@
                 <a:cs typeface="+mn-cs"/>
               </a:defRPr>
             </a:lvl1pPr>
-            <a:lvl2pPr marL="650197" indent="0">
+            <a:lvl2pPr marL="650230" indent="0">
               <a:buNone/>
               <a:defRPr sz="1700"/>
             </a:lvl2pPr>
-            <a:lvl3pPr marL="1300393" indent="0">
+            <a:lvl3pPr marL="1300460" indent="0">
               <a:buNone/>
               <a:defRPr sz="1400"/>
             </a:lvl3pPr>
-            <a:lvl4pPr marL="1950590" indent="0">
+            <a:lvl4pPr marL="1950690" indent="0">
               <a:buNone/>
               <a:defRPr sz="1300"/>
             </a:lvl4pPr>
-            <a:lvl5pPr marL="2600786" indent="0">
+            <a:lvl5pPr marL="2600919" indent="0">
               <a:buNone/>
               <a:defRPr sz="1300"/>
             </a:lvl5pPr>
-            <a:lvl6pPr marL="3250983" indent="0">
+            <a:lvl6pPr marL="3251149" indent="0">
               <a:buNone/>
               <a:defRPr sz="1300"/>
             </a:lvl6pPr>
-            <a:lvl7pPr marL="3901180" indent="0">
+            <a:lvl7pPr marL="3901379" indent="0">
               <a:buNone/>
               <a:defRPr sz="1300"/>
             </a:lvl7pPr>
-            <a:lvl8pPr marL="4551376" indent="0">
+            <a:lvl8pPr marL="4551609" indent="0">
               <a:buNone/>
               <a:defRPr sz="1300"/>
             </a:lvl8pPr>
-            <a:lvl9pPr marL="5201573" indent="0">
+            <a:lvl9pPr marL="5201839" indent="0">
               <a:buNone/>
               <a:defRPr sz="1300"/>
             </a:lvl9pPr>
           </a:lstStyle>
           <a:p>
-            <a:pPr marL="0" lvl="0" indent="0" algn="l" defTabSz="1300393" rtl="0" eaLnBrk="1" latinLnBrk="0" hangingPunct="1">
+            <a:pPr marL="0" lvl="0" indent="0" algn="l" defTabSz="1300460" rtl="0" eaLnBrk="1" latinLnBrk="0" hangingPunct="1">
               <a:spcBef>
                 <a:spcPts val="2844"/>
               </a:spcBef>
@@ -1158,7 +1159,7 @@
               <a:buNone/>
             </a:pPr>
             <a:r>
-              <a:rPr lang="en-US" dirty="0" smtClean="0"/>
+              <a:rPr lang="en-US" smtClean="0"/>
               <a:t>Click to edit Master text styles</a:t>
             </a:r>
           </a:p>
@@ -1176,7 +1177,7 @@
         </p:nvSpPr>
         <p:spPr>
           <a:xfrm>
-            <a:off x="9358356" y="267748"/>
+            <a:off x="9358356" y="267747"/>
             <a:ext cx="3034453" cy="519289"/>
           </a:xfrm>
         </p:spPr>
@@ -1248,7 +1249,7 @@
 </file>
 
 <file path=ppt/slideLayouts/slideLayout11.xml><?xml version="1.0" encoding="utf-8"?>
-<p:sldLayout xmlns:a="http://schemas.openxmlformats.org/drawingml/2006/main" xmlns:r="http://schemas.openxmlformats.org/officeDocument/2006/relationships" xmlns:mc="http://schemas.openxmlformats.org/markup-compatibility/2006" xmlns:mv="urn:schemas-microsoft-com:mac:vml" xmlns:p="http://schemas.openxmlformats.org/presentationml/2006/main" mc:Ignorable="mv" mc:PreserveAttributes="mv:*" preserve="1">
+<p:sldLayout xmlns:a="http://schemas.openxmlformats.org/drawingml/2006/main" xmlns:r="http://schemas.openxmlformats.org/officeDocument/2006/relationships" xmlns:p="http://schemas.openxmlformats.org/presentationml/2006/main" preserve="1">
   <p:cSld name="Picture above Caption">
     <p:spTree>
       <p:nvGrpSpPr>
@@ -1281,7 +1282,7 @@
           </a:xfrm>
         </p:spPr>
         <p:txBody>
-          <a:bodyPr tIns="195059" bIns="195059" anchor="b" anchorCtr="0">
+          <a:bodyPr tIns="195069" bIns="195069" anchor="b" anchorCtr="0">
             <a:normAutofit/>
           </a:bodyPr>
           <a:lstStyle>
@@ -1310,7 +1311,7 @@
         </p:nvSpPr>
         <p:spPr>
           <a:xfrm>
-            <a:off x="1300480" y="7114391"/>
+            <a:off x="1300480" y="7114390"/>
             <a:ext cx="11379200" cy="2639211"/>
           </a:xfrm>
           <a:solidFill>
@@ -1340,11 +1341,11 @@
           </a:fontRef>
         </p:style>
         <p:txBody>
-          <a:bodyPr lIns="416126" tIns="195059" rIns="390118" bIns="195059" rtlCol="0" anchor="t" anchorCtr="0">
+          <a:bodyPr lIns="416147" tIns="195069" rIns="390138" bIns="195069" rtlCol="0" anchor="t" anchorCtr="0">
             <a:normAutofit/>
           </a:bodyPr>
           <a:lstStyle>
-            <a:lvl1pPr marL="0" indent="0" algn="l" defTabSz="1300393" rtl="0" eaLnBrk="1" latinLnBrk="0" hangingPunct="1">
+            <a:lvl1pPr marL="0" indent="0" algn="l" defTabSz="1300460" rtl="0" eaLnBrk="1" latinLnBrk="0" hangingPunct="1">
               <a:buNone/>
               <a:defRPr sz="2300" kern="1200">
                 <a:solidFill>
@@ -1358,7 +1359,7 @@
                 <a:cs typeface="+mn-cs"/>
               </a:defRPr>
             </a:lvl1pPr>
-            <a:lvl2pPr marL="650197" indent="0" algn="ctr">
+            <a:lvl2pPr marL="650230" indent="0" algn="ctr">
               <a:buNone/>
               <a:defRPr>
                 <a:solidFill>
@@ -1368,7 +1369,7 @@
                 </a:solidFill>
               </a:defRPr>
             </a:lvl2pPr>
-            <a:lvl3pPr marL="1300393" indent="0" algn="ctr">
+            <a:lvl3pPr marL="1300460" indent="0" algn="ctr">
               <a:buNone/>
               <a:defRPr>
                 <a:solidFill>
@@ -1378,7 +1379,7 @@
                 </a:solidFill>
               </a:defRPr>
             </a:lvl3pPr>
-            <a:lvl4pPr marL="1950590" indent="0" algn="ctr">
+            <a:lvl4pPr marL="1950690" indent="0" algn="ctr">
               <a:buNone/>
               <a:defRPr>
                 <a:solidFill>
@@ -1388,7 +1389,7 @@
                 </a:solidFill>
               </a:defRPr>
             </a:lvl4pPr>
-            <a:lvl5pPr marL="2600786" indent="0" algn="ctr">
+            <a:lvl5pPr marL="2600919" indent="0" algn="ctr">
               <a:buNone/>
               <a:defRPr>
                 <a:solidFill>
@@ -1398,7 +1399,7 @@
                 </a:solidFill>
               </a:defRPr>
             </a:lvl5pPr>
-            <a:lvl6pPr marL="3250983" indent="0" algn="ctr">
+            <a:lvl6pPr marL="3251149" indent="0" algn="ctr">
               <a:buNone/>
               <a:defRPr>
                 <a:solidFill>
@@ -1408,7 +1409,7 @@
                 </a:solidFill>
               </a:defRPr>
             </a:lvl6pPr>
-            <a:lvl7pPr marL="3901180" indent="0" algn="ctr">
+            <a:lvl7pPr marL="3901379" indent="0" algn="ctr">
               <a:buNone/>
               <a:defRPr>
                 <a:solidFill>
@@ -1418,7 +1419,7 @@
                 </a:solidFill>
               </a:defRPr>
             </a:lvl7pPr>
-            <a:lvl8pPr marL="4551376" indent="0" algn="ctr">
+            <a:lvl8pPr marL="4551609" indent="0" algn="ctr">
               <a:buNone/>
               <a:defRPr>
                 <a:solidFill>
@@ -1428,7 +1429,7 @@
                 </a:solidFill>
               </a:defRPr>
             </a:lvl8pPr>
-            <a:lvl9pPr marL="5201573" indent="0" algn="ctr">
+            <a:lvl9pPr marL="5201839" indent="0" algn="ctr">
               <a:buNone/>
               <a:defRPr>
                 <a:solidFill>
@@ -1538,7 +1539,7 @@
 </file>
 
 <file path=ppt/slideLayouts/slideLayout12.xml><?xml version="1.0" encoding="utf-8"?>
-<p:sldLayout xmlns:a="http://schemas.openxmlformats.org/drawingml/2006/main" xmlns:r="http://schemas.openxmlformats.org/officeDocument/2006/relationships" xmlns:mc="http://schemas.openxmlformats.org/markup-compatibility/2006" xmlns:mv="urn:schemas-microsoft-com:mac:vml" xmlns:p="http://schemas.openxmlformats.org/presentationml/2006/main" mc:Ignorable="mv" mc:PreserveAttributes="mv:*" preserve="1">
+<p:sldLayout xmlns:a="http://schemas.openxmlformats.org/drawingml/2006/main" xmlns:r="http://schemas.openxmlformats.org/officeDocument/2006/relationships" xmlns:p="http://schemas.openxmlformats.org/presentationml/2006/main" preserve="1">
   <p:cSld name="2 Pictures with Caption">
     <p:spTree>
       <p:nvGrpSpPr>
@@ -1571,7 +1572,7 @@
           </a:xfrm>
         </p:spPr>
         <p:txBody>
-          <a:bodyPr tIns="195059" bIns="195059" anchor="b" anchorCtr="0">
+          <a:bodyPr tIns="195069" bIns="195069" anchor="b" anchorCtr="0">
             <a:normAutofit/>
           </a:bodyPr>
           <a:lstStyle>
@@ -1600,7 +1601,7 @@
         </p:nvSpPr>
         <p:spPr>
           <a:xfrm>
-            <a:off x="1300480" y="7114391"/>
+            <a:off x="1300480" y="7114390"/>
             <a:ext cx="11379200" cy="2639211"/>
           </a:xfrm>
           <a:solidFill>
@@ -1630,11 +1631,11 @@
           </a:fontRef>
         </p:style>
         <p:txBody>
-          <a:bodyPr lIns="416126" tIns="195059" rIns="390118" bIns="195059" rtlCol="0" anchor="t" anchorCtr="0">
+          <a:bodyPr lIns="416147" tIns="195069" rIns="390138" bIns="195069" rtlCol="0" anchor="t" anchorCtr="0">
             <a:normAutofit/>
           </a:bodyPr>
           <a:lstStyle>
-            <a:lvl1pPr marL="0" indent="0" algn="l" defTabSz="1300393" rtl="0" eaLnBrk="1" latinLnBrk="0" hangingPunct="1">
+            <a:lvl1pPr marL="0" indent="0" algn="l" defTabSz="1300460" rtl="0" eaLnBrk="1" latinLnBrk="0" hangingPunct="1">
               <a:buNone/>
               <a:defRPr sz="2300" kern="1200">
                 <a:solidFill>
@@ -1648,7 +1649,7 @@
                 <a:cs typeface="+mn-cs"/>
               </a:defRPr>
             </a:lvl1pPr>
-            <a:lvl2pPr marL="650197" indent="0" algn="ctr">
+            <a:lvl2pPr marL="650230" indent="0" algn="ctr">
               <a:buNone/>
               <a:defRPr>
                 <a:solidFill>
@@ -1658,7 +1659,7 @@
                 </a:solidFill>
               </a:defRPr>
             </a:lvl2pPr>
-            <a:lvl3pPr marL="1300393" indent="0" algn="ctr">
+            <a:lvl3pPr marL="1300460" indent="0" algn="ctr">
               <a:buNone/>
               <a:defRPr>
                 <a:solidFill>
@@ -1668,7 +1669,7 @@
                 </a:solidFill>
               </a:defRPr>
             </a:lvl3pPr>
-            <a:lvl4pPr marL="1950590" indent="0" algn="ctr">
+            <a:lvl4pPr marL="1950690" indent="0" algn="ctr">
               <a:buNone/>
               <a:defRPr>
                 <a:solidFill>
@@ -1678,7 +1679,7 @@
                 </a:solidFill>
               </a:defRPr>
             </a:lvl4pPr>
-            <a:lvl5pPr marL="2600786" indent="0" algn="ctr">
+            <a:lvl5pPr marL="2600919" indent="0" algn="ctr">
               <a:buNone/>
               <a:defRPr>
                 <a:solidFill>
@@ -1688,7 +1689,7 @@
                 </a:solidFill>
               </a:defRPr>
             </a:lvl5pPr>
-            <a:lvl6pPr marL="3250983" indent="0" algn="ctr">
+            <a:lvl6pPr marL="3251149" indent="0" algn="ctr">
               <a:buNone/>
               <a:defRPr>
                 <a:solidFill>
@@ -1698,7 +1699,7 @@
                 </a:solidFill>
               </a:defRPr>
             </a:lvl6pPr>
-            <a:lvl7pPr marL="3901180" indent="0" algn="ctr">
+            <a:lvl7pPr marL="3901379" indent="0" algn="ctr">
               <a:buNone/>
               <a:defRPr>
                 <a:solidFill>
@@ -1708,7 +1709,7 @@
                 </a:solidFill>
               </a:defRPr>
             </a:lvl7pPr>
-            <a:lvl8pPr marL="4551376" indent="0" algn="ctr">
+            <a:lvl8pPr marL="4551609" indent="0" algn="ctr">
               <a:buNone/>
               <a:defRPr>
                 <a:solidFill>
@@ -1718,7 +1719,7 @@
                 </a:solidFill>
               </a:defRPr>
             </a:lvl8pPr>
-            <a:lvl9pPr marL="5201573" indent="0" algn="ctr">
+            <a:lvl9pPr marL="5201839" indent="0" algn="ctr">
               <a:buNone/>
               <a:defRPr>
                 <a:solidFill>
@@ -1750,7 +1751,7 @@
         </p:nvSpPr>
         <p:spPr>
           <a:xfrm>
-            <a:off x="9358356" y="267748"/>
+            <a:off x="9358356" y="267747"/>
             <a:ext cx="3034453" cy="519289"/>
           </a:xfrm>
         </p:spPr>
@@ -1868,7 +1869,7 @@
 </file>
 
 <file path=ppt/slideLayouts/slideLayout13.xml><?xml version="1.0" encoding="utf-8"?>
-<p:sldLayout xmlns:a="http://schemas.openxmlformats.org/drawingml/2006/main" xmlns:r="http://schemas.openxmlformats.org/officeDocument/2006/relationships" xmlns:mc="http://schemas.openxmlformats.org/markup-compatibility/2006" xmlns:mv="urn:schemas-microsoft-com:mac:vml" xmlns:p="http://schemas.openxmlformats.org/presentationml/2006/main" mc:Ignorable="mv" mc:PreserveAttributes="mv:*" preserve="1">
+<p:sldLayout xmlns:a="http://schemas.openxmlformats.org/drawingml/2006/main" xmlns:r="http://schemas.openxmlformats.org/officeDocument/2006/relationships" xmlns:p="http://schemas.openxmlformats.org/presentationml/2006/main" preserve="1">
   <p:cSld name="3 Pictures with Caption">
     <p:spTree>
       <p:nvGrpSpPr>
@@ -1901,7 +1902,7 @@
           </a:xfrm>
         </p:spPr>
         <p:txBody>
-          <a:bodyPr tIns="195059" bIns="195059" anchor="b" anchorCtr="0">
+          <a:bodyPr tIns="195069" bIns="195069" anchor="b" anchorCtr="0">
             <a:normAutofit/>
           </a:bodyPr>
           <a:lstStyle>
@@ -1930,7 +1931,7 @@
         </p:nvSpPr>
         <p:spPr>
           <a:xfrm>
-            <a:off x="1300480" y="7114391"/>
+            <a:off x="1300480" y="7114390"/>
             <a:ext cx="11379200" cy="2639211"/>
           </a:xfrm>
           <a:solidFill>
@@ -1960,11 +1961,11 @@
           </a:fontRef>
         </p:style>
         <p:txBody>
-          <a:bodyPr lIns="416126" tIns="195059" rIns="390118" bIns="195059" rtlCol="0" anchor="t" anchorCtr="0">
+          <a:bodyPr lIns="416147" tIns="195069" rIns="390138" bIns="195069" rtlCol="0" anchor="t" anchorCtr="0">
             <a:normAutofit/>
           </a:bodyPr>
           <a:lstStyle>
-            <a:lvl1pPr marL="0" indent="0" algn="l" defTabSz="1300393" rtl="0" eaLnBrk="1" latinLnBrk="0" hangingPunct="1">
+            <a:lvl1pPr marL="0" indent="0" algn="l" defTabSz="1300460" rtl="0" eaLnBrk="1" latinLnBrk="0" hangingPunct="1">
               <a:buNone/>
               <a:defRPr sz="2300" kern="1200">
                 <a:solidFill>
@@ -1978,7 +1979,7 @@
                 <a:cs typeface="+mn-cs"/>
               </a:defRPr>
             </a:lvl1pPr>
-            <a:lvl2pPr marL="650197" indent="0" algn="ctr">
+            <a:lvl2pPr marL="650230" indent="0" algn="ctr">
               <a:buNone/>
               <a:defRPr>
                 <a:solidFill>
@@ -1988,7 +1989,7 @@
                 </a:solidFill>
               </a:defRPr>
             </a:lvl2pPr>
-            <a:lvl3pPr marL="1300393" indent="0" algn="ctr">
+            <a:lvl3pPr marL="1300460" indent="0" algn="ctr">
               <a:buNone/>
               <a:defRPr>
                 <a:solidFill>
@@ -1998,7 +1999,7 @@
                 </a:solidFill>
               </a:defRPr>
             </a:lvl3pPr>
-            <a:lvl4pPr marL="1950590" indent="0" algn="ctr">
+            <a:lvl4pPr marL="1950690" indent="0" algn="ctr">
               <a:buNone/>
               <a:defRPr>
                 <a:solidFill>
@@ -2008,7 +2009,7 @@
                 </a:solidFill>
               </a:defRPr>
             </a:lvl4pPr>
-            <a:lvl5pPr marL="2600786" indent="0" algn="ctr">
+            <a:lvl5pPr marL="2600919" indent="0" algn="ctr">
               <a:buNone/>
               <a:defRPr>
                 <a:solidFill>
@@ -2018,7 +2019,7 @@
                 </a:solidFill>
               </a:defRPr>
             </a:lvl5pPr>
-            <a:lvl6pPr marL="3250983" indent="0" algn="ctr">
+            <a:lvl6pPr marL="3251149" indent="0" algn="ctr">
               <a:buNone/>
               <a:defRPr>
                 <a:solidFill>
@@ -2028,7 +2029,7 @@
                 </a:solidFill>
               </a:defRPr>
             </a:lvl6pPr>
-            <a:lvl7pPr marL="3901180" indent="0" algn="ctr">
+            <a:lvl7pPr marL="3901379" indent="0" algn="ctr">
               <a:buNone/>
               <a:defRPr>
                 <a:solidFill>
@@ -2038,7 +2039,7 @@
                 </a:solidFill>
               </a:defRPr>
             </a:lvl7pPr>
-            <a:lvl8pPr marL="4551376" indent="0" algn="ctr">
+            <a:lvl8pPr marL="4551609" indent="0" algn="ctr">
               <a:buNone/>
               <a:defRPr>
                 <a:solidFill>
@@ -2048,7 +2049,7 @@
                 </a:solidFill>
               </a:defRPr>
             </a:lvl8pPr>
-            <a:lvl9pPr marL="5201573" indent="0" algn="ctr">
+            <a:lvl9pPr marL="5201839" indent="0" algn="ctr">
               <a:buNone/>
               <a:defRPr>
                 <a:solidFill>
@@ -2080,7 +2081,7 @@
         </p:nvSpPr>
         <p:spPr>
           <a:xfrm>
-            <a:off x="9358356" y="267748"/>
+            <a:off x="9358356" y="267747"/>
             <a:ext cx="3034453" cy="519289"/>
           </a:xfrm>
         </p:spPr>
@@ -2233,7 +2234,7 @@
 </file>
 
 <file path=ppt/slideLayouts/slideLayout14.xml><?xml version="1.0" encoding="utf-8"?>
-<p:sldLayout xmlns:a="http://schemas.openxmlformats.org/drawingml/2006/main" xmlns:r="http://schemas.openxmlformats.org/officeDocument/2006/relationships" xmlns:mc="http://schemas.openxmlformats.org/markup-compatibility/2006" xmlns:mv="urn:schemas-microsoft-com:mac:vml" xmlns:p="http://schemas.openxmlformats.org/presentationml/2006/main" mc:Ignorable="mv" mc:PreserveAttributes="mv:*" type="vertTx" preserve="1">
+<p:sldLayout xmlns:a="http://schemas.openxmlformats.org/drawingml/2006/main" xmlns:r="http://schemas.openxmlformats.org/officeDocument/2006/relationships" xmlns:p="http://schemas.openxmlformats.org/presentationml/2006/main" type="vertTx" preserve="1">
   <p:cSld name="Title and Vertical Text">
     <p:spTree>
       <p:nvGrpSpPr>
@@ -2403,7 +2404,7 @@
 </file>
 
 <file path=ppt/slideLayouts/slideLayout15.xml><?xml version="1.0" encoding="utf-8"?>
-<p:sldLayout xmlns:a="http://schemas.openxmlformats.org/drawingml/2006/main" xmlns:r="http://schemas.openxmlformats.org/officeDocument/2006/relationships" xmlns:mc="http://schemas.openxmlformats.org/markup-compatibility/2006" xmlns:mv="urn:schemas-microsoft-com:mac:vml" xmlns:p="http://schemas.openxmlformats.org/presentationml/2006/main" mc:Ignorable="mv" mc:PreserveAttributes="mv:*" type="vertTitleAndTx" preserve="1">
+<p:sldLayout xmlns:a="http://schemas.openxmlformats.org/drawingml/2006/main" xmlns:r="http://schemas.openxmlformats.org/officeDocument/2006/relationships" xmlns:p="http://schemas.openxmlformats.org/presentationml/2006/main" type="vertTitleAndTx" preserve="1">
   <p:cSld name="Vertical Title and Text">
     <p:spTree>
       <p:nvGrpSpPr>
@@ -2431,12 +2432,12 @@
         </p:nvSpPr>
         <p:spPr>
           <a:xfrm>
-            <a:off x="11360075" y="1606478"/>
+            <a:off x="11360075" y="1606477"/>
             <a:ext cx="1300480" cy="7869551"/>
           </a:xfrm>
         </p:spPr>
         <p:txBody>
-          <a:bodyPr vert="eaVert" lIns="390118" tIns="975295" bIns="975295"/>
+          <a:bodyPr vert="eaVert" lIns="390138" tIns="975345" bIns="975345"/>
           <a:lstStyle/>
           <a:p>
             <a:r>
@@ -2583,7 +2584,7 @@
 </file>
 
 <file path=ppt/slideLayouts/slideLayout2.xml><?xml version="1.0" encoding="utf-8"?>
-<p:sldLayout xmlns:a="http://schemas.openxmlformats.org/drawingml/2006/main" xmlns:r="http://schemas.openxmlformats.org/officeDocument/2006/relationships" xmlns:mc="http://schemas.openxmlformats.org/markup-compatibility/2006" xmlns:mv="urn:schemas-microsoft-com:mac:vml" xmlns:p="http://schemas.openxmlformats.org/presentationml/2006/main" mc:Ignorable="mv" mc:PreserveAttributes="mv:*" type="obj" preserve="1">
+<p:sldLayout xmlns:a="http://schemas.openxmlformats.org/drawingml/2006/main" xmlns:r="http://schemas.openxmlformats.org/officeDocument/2006/relationships" xmlns:p="http://schemas.openxmlformats.org/presentationml/2006/main" type="obj" preserve="1">
   <p:cSld name="Title and Content">
     <p:spTree>
       <p:nvGrpSpPr>
@@ -2611,7 +2612,7 @@
         </p:nvSpPr>
         <p:spPr>
           <a:xfrm>
-            <a:off x="2" y="1457764"/>
+            <a:off x="1" y="1457764"/>
             <a:ext cx="12677423" cy="1127326"/>
           </a:xfrm>
           <a:solidFill>
@@ -2619,7 +2620,7 @@
           </a:solidFill>
         </p:spPr>
         <p:txBody>
-          <a:bodyPr lIns="1560472" anchor="ctr" anchorCtr="0">
+          <a:bodyPr lIns="1560552" anchor="ctr" anchorCtr="0">
             <a:normAutofit/>
           </a:bodyPr>
           <a:lstStyle>
@@ -2654,7 +2655,7 @@
         </p:nvSpPr>
         <p:spPr>
           <a:xfrm>
-            <a:off x="1447160" y="2942035"/>
+            <a:off x="1447159" y="2942035"/>
             <a:ext cx="10961589" cy="5970078"/>
           </a:xfrm>
         </p:spPr>
@@ -2746,7 +2747,7 @@
         </p:blipFill>
         <p:spPr>
           <a:xfrm>
-            <a:off x="1286113" y="475650"/>
+            <a:off x="1286113" y="475648"/>
             <a:ext cx="3245761" cy="793801"/>
           </a:xfrm>
           <a:prstGeom prst="rect">
@@ -2766,7 +2767,7 @@
         </p:nvSpPr>
         <p:spPr>
           <a:xfrm>
-            <a:off x="9358356" y="9234313"/>
+            <a:off x="9358356" y="9234312"/>
             <a:ext cx="3034453" cy="519289"/>
           </a:xfrm>
         </p:spPr>
@@ -2818,7 +2819,7 @@
         </p:nvSpPr>
         <p:spPr>
           <a:xfrm>
-            <a:off x="1593725" y="9234313"/>
+            <a:off x="1593725" y="9234312"/>
             <a:ext cx="4118187" cy="519289"/>
           </a:xfrm>
         </p:spPr>
@@ -2867,7 +2868,7 @@
           <a:effectLst/>
         </p:spPr>
         <p:txBody>
-          <a:bodyPr vert="horz" wrap="square" lIns="130039" tIns="65020" rIns="130039" bIns="65020" anchor="t" compatLnSpc="1"/>
+          <a:bodyPr vert="horz" wrap="square" lIns="130046" tIns="65023" rIns="130046" bIns="65023" anchor="t" compatLnSpc="1"/>
           <a:lstStyle/>
           <a:p>
             <a:endParaRPr kumimoji="0" lang="en-US"/>
@@ -2883,7 +2884,7 @@
 </file>
 
 <file path=ppt/slideLayouts/slideLayout3.xml><?xml version="1.0" encoding="utf-8"?>
-<p:sldLayout xmlns:a="http://schemas.openxmlformats.org/drawingml/2006/main" xmlns:r="http://schemas.openxmlformats.org/officeDocument/2006/relationships" xmlns:mc="http://schemas.openxmlformats.org/markup-compatibility/2006" xmlns:mv="urn:schemas-microsoft-com:mac:vml" xmlns:p="http://schemas.openxmlformats.org/presentationml/2006/main" mc:Ignorable="mv" mc:PreserveAttributes="mv:*" preserve="1">
+<p:sldLayout xmlns:a="http://schemas.openxmlformats.org/drawingml/2006/main" xmlns:r="http://schemas.openxmlformats.org/officeDocument/2006/relationships" xmlns:p="http://schemas.openxmlformats.org/presentationml/2006/main" preserve="1">
   <p:cSld name="Title Slide with Picture">
     <p:spTree>
       <p:nvGrpSpPr>
@@ -2969,9 +2970,9 @@
           </a:fontRef>
         </p:style>
         <p:txBody>
-          <a:bodyPr lIns="416126" tIns="130039" rIns="390118" bIns="130039" rtlCol="0" anchor="t" anchorCtr="0"/>
+          <a:bodyPr lIns="416147" tIns="130046" rIns="390138" bIns="130046" rtlCol="0" anchor="t" anchorCtr="0"/>
           <a:lstStyle>
-            <a:lvl1pPr marL="0" indent="0" algn="l" defTabSz="1300393" rtl="0" eaLnBrk="1" latinLnBrk="0" hangingPunct="1">
+            <a:lvl1pPr marL="0" indent="0" algn="l" defTabSz="1300460" rtl="0" eaLnBrk="1" latinLnBrk="0" hangingPunct="1">
               <a:spcBef>
                 <a:spcPts val="427"/>
               </a:spcBef>
@@ -2988,7 +2989,7 @@
                 <a:cs typeface="+mn-cs"/>
               </a:defRPr>
             </a:lvl1pPr>
-            <a:lvl2pPr marL="650197" indent="0" algn="ctr">
+            <a:lvl2pPr marL="650230" indent="0" algn="ctr">
               <a:buNone/>
               <a:defRPr>
                 <a:solidFill>
@@ -2998,7 +2999,7 @@
                 </a:solidFill>
               </a:defRPr>
             </a:lvl2pPr>
-            <a:lvl3pPr marL="1300393" indent="0" algn="ctr">
+            <a:lvl3pPr marL="1300460" indent="0" algn="ctr">
               <a:buNone/>
               <a:defRPr>
                 <a:solidFill>
@@ -3008,7 +3009,7 @@
                 </a:solidFill>
               </a:defRPr>
             </a:lvl3pPr>
-            <a:lvl4pPr marL="1950590" indent="0" algn="ctr">
+            <a:lvl4pPr marL="1950690" indent="0" algn="ctr">
               <a:buNone/>
               <a:defRPr>
                 <a:solidFill>
@@ -3018,7 +3019,7 @@
                 </a:solidFill>
               </a:defRPr>
             </a:lvl4pPr>
-            <a:lvl5pPr marL="2600786" indent="0" algn="ctr">
+            <a:lvl5pPr marL="2600919" indent="0" algn="ctr">
               <a:buNone/>
               <a:defRPr>
                 <a:solidFill>
@@ -3028,7 +3029,7 @@
                 </a:solidFill>
               </a:defRPr>
             </a:lvl5pPr>
-            <a:lvl6pPr marL="3250983" indent="0" algn="ctr">
+            <a:lvl6pPr marL="3251149" indent="0" algn="ctr">
               <a:buNone/>
               <a:defRPr>
                 <a:solidFill>
@@ -3038,7 +3039,7 @@
                 </a:solidFill>
               </a:defRPr>
             </a:lvl6pPr>
-            <a:lvl7pPr marL="3901180" indent="0" algn="ctr">
+            <a:lvl7pPr marL="3901379" indent="0" algn="ctr">
               <a:buNone/>
               <a:defRPr>
                 <a:solidFill>
@@ -3048,7 +3049,7 @@
                 </a:solidFill>
               </a:defRPr>
             </a:lvl7pPr>
-            <a:lvl8pPr marL="4551376" indent="0" algn="ctr">
+            <a:lvl8pPr marL="4551609" indent="0" algn="ctr">
               <a:buNone/>
               <a:defRPr>
                 <a:solidFill>
@@ -3058,7 +3059,7 @@
                 </a:solidFill>
               </a:defRPr>
             </a:lvl8pPr>
-            <a:lvl9pPr marL="5201573" indent="0" algn="ctr">
+            <a:lvl9pPr marL="5201839" indent="0" algn="ctr">
               <a:buNone/>
               <a:defRPr>
                 <a:solidFill>
@@ -3168,7 +3169,7 @@
 </file>
 
 <file path=ppt/slideLayouts/slideLayout4.xml><?xml version="1.0" encoding="utf-8"?>
-<p:sldLayout xmlns:a="http://schemas.openxmlformats.org/drawingml/2006/main" xmlns:r="http://schemas.openxmlformats.org/officeDocument/2006/relationships" xmlns:mc="http://schemas.openxmlformats.org/markup-compatibility/2006" xmlns:mv="urn:schemas-microsoft-com:mac:vml" xmlns:p="http://schemas.openxmlformats.org/presentationml/2006/main" mc:Ignorable="mv" mc:PreserveAttributes="mv:*" type="secHead" preserve="1">
+<p:sldLayout xmlns:a="http://schemas.openxmlformats.org/drawingml/2006/main" xmlns:r="http://schemas.openxmlformats.org/officeDocument/2006/relationships" xmlns:p="http://schemas.openxmlformats.org/presentationml/2006/main" type="secHead" preserve="1">
   <p:cSld name="Section Header">
     <p:spTree>
       <p:nvGrpSpPr>
@@ -3204,11 +3205,11 @@
           </a:solidFill>
         </p:spPr>
         <p:txBody>
-          <a:bodyPr vert="horz" lIns="1690511" tIns="65020" rIns="390118" bIns="65020" rtlCol="0" anchor="b" anchorCtr="0">
+          <a:bodyPr vert="horz" lIns="1690598" tIns="65023" rIns="390138" bIns="65023" rtlCol="0" anchor="b" anchorCtr="0">
             <a:normAutofit/>
           </a:bodyPr>
           <a:lstStyle>
-            <a:lvl1pPr marL="0" indent="0" algn="l" defTabSz="1300393" rtl="0" eaLnBrk="1" latinLnBrk="0" hangingPunct="1">
+            <a:lvl1pPr marL="0" indent="0" algn="l" defTabSz="1300460" rtl="0" eaLnBrk="1" latinLnBrk="0" hangingPunct="1">
               <a:spcBef>
                 <a:spcPct val="0"/>
               </a:spcBef>
@@ -3274,11 +3275,11 @@
           </a:fontRef>
         </p:style>
         <p:txBody>
-          <a:bodyPr vert="horz" lIns="416126" tIns="130039" rIns="390118" bIns="130039" rtlCol="0" anchor="ctr" anchorCtr="0">
+          <a:bodyPr vert="horz" lIns="416147" tIns="130046" rIns="390138" bIns="130046" rtlCol="0" anchor="ctr" anchorCtr="0">
             <a:normAutofit/>
           </a:bodyPr>
           <a:lstStyle>
-            <a:lvl1pPr marL="0" indent="0" algn="l" defTabSz="1300393" rtl="0" eaLnBrk="1" latinLnBrk="0" hangingPunct="1">
+            <a:lvl1pPr marL="0" indent="0" algn="l" defTabSz="1300460" rtl="0" eaLnBrk="1" latinLnBrk="0" hangingPunct="1">
               <a:spcBef>
                 <a:spcPts val="427"/>
               </a:spcBef>
@@ -3299,7 +3300,7 @@
                 <a:cs typeface="+mn-cs"/>
               </a:defRPr>
             </a:lvl1pPr>
-            <a:lvl2pPr marL="650197" indent="0">
+            <a:lvl2pPr marL="650230" indent="0">
               <a:buNone/>
               <a:defRPr sz="2600">
                 <a:solidFill>
@@ -3309,7 +3310,7 @@
                 </a:solidFill>
               </a:defRPr>
             </a:lvl2pPr>
-            <a:lvl3pPr marL="1300393" indent="0">
+            <a:lvl3pPr marL="1300460" indent="0">
               <a:buNone/>
               <a:defRPr sz="2300">
                 <a:solidFill>
@@ -3319,7 +3320,7 @@
                 </a:solidFill>
               </a:defRPr>
             </a:lvl3pPr>
-            <a:lvl4pPr marL="1950590" indent="0">
+            <a:lvl4pPr marL="1950690" indent="0">
               <a:buNone/>
               <a:defRPr sz="2000">
                 <a:solidFill>
@@ -3329,7 +3330,7 @@
                 </a:solidFill>
               </a:defRPr>
             </a:lvl4pPr>
-            <a:lvl5pPr marL="2600786" indent="0">
+            <a:lvl5pPr marL="2600919" indent="0">
               <a:buNone/>
               <a:defRPr sz="2000">
                 <a:solidFill>
@@ -3339,7 +3340,7 @@
                 </a:solidFill>
               </a:defRPr>
             </a:lvl5pPr>
-            <a:lvl6pPr marL="3250983" indent="0">
+            <a:lvl6pPr marL="3251149" indent="0">
               <a:buNone/>
               <a:defRPr sz="2000">
                 <a:solidFill>
@@ -3349,7 +3350,7 @@
                 </a:solidFill>
               </a:defRPr>
             </a:lvl6pPr>
-            <a:lvl7pPr marL="3901180" indent="0">
+            <a:lvl7pPr marL="3901379" indent="0">
               <a:buNone/>
               <a:defRPr sz="2000">
                 <a:solidFill>
@@ -3359,7 +3360,7 @@
                 </a:solidFill>
               </a:defRPr>
             </a:lvl7pPr>
-            <a:lvl8pPr marL="4551376" indent="0">
+            <a:lvl8pPr marL="4551609" indent="0">
               <a:buNone/>
               <a:defRPr sz="2000">
                 <a:solidFill>
@@ -3369,7 +3370,7 @@
                 </a:solidFill>
               </a:defRPr>
             </a:lvl8pPr>
-            <a:lvl9pPr marL="5201573" indent="0">
+            <a:lvl9pPr marL="5201839" indent="0">
               <a:buNone/>
               <a:defRPr sz="2000">
                 <a:solidFill>
@@ -3488,7 +3489,7 @@
           <a:effectLst/>
         </p:spPr>
         <p:txBody>
-          <a:bodyPr vert="horz" wrap="square" lIns="130039" tIns="65020" rIns="130039" bIns="65020" anchor="t" compatLnSpc="1"/>
+          <a:bodyPr vert="horz" wrap="square" lIns="130046" tIns="65023" rIns="130046" bIns="65023" anchor="t" compatLnSpc="1"/>
           <a:lstStyle/>
           <a:p>
             <a:endParaRPr kumimoji="0" lang="en-US"/>
@@ -3504,7 +3505,7 @@
 </file>
 
 <file path=ppt/slideLayouts/slideLayout5.xml><?xml version="1.0" encoding="utf-8"?>
-<p:sldLayout xmlns:a="http://schemas.openxmlformats.org/drawingml/2006/main" xmlns:r="http://schemas.openxmlformats.org/officeDocument/2006/relationships" xmlns:mc="http://schemas.openxmlformats.org/markup-compatibility/2006" xmlns:mv="urn:schemas-microsoft-com:mac:vml" xmlns:p="http://schemas.openxmlformats.org/presentationml/2006/main" mc:Ignorable="mv" mc:PreserveAttributes="mv:*" type="twoObj" preserve="1">
+<p:sldLayout xmlns:a="http://schemas.openxmlformats.org/drawingml/2006/main" xmlns:r="http://schemas.openxmlformats.org/officeDocument/2006/relationships" xmlns:p="http://schemas.openxmlformats.org/presentationml/2006/main" type="twoObj" preserve="1">
   <p:cSld name="Two Content">
     <p:spTree>
       <p:nvGrpSpPr>
@@ -3729,7 +3730,7 @@
         </p:nvSpPr>
         <p:spPr>
           <a:xfrm>
-            <a:off x="9358356" y="267748"/>
+            <a:off x="9358356" y="267747"/>
             <a:ext cx="3034453" cy="519289"/>
           </a:xfrm>
         </p:spPr>
@@ -3821,7 +3822,7 @@
           <a:effectLst/>
         </p:spPr>
         <p:txBody>
-          <a:bodyPr vert="horz" wrap="square" lIns="130039" tIns="65020" rIns="130039" bIns="65020" anchor="t" compatLnSpc="1"/>
+          <a:bodyPr vert="horz" wrap="square" lIns="130046" tIns="65023" rIns="130046" bIns="65023" anchor="t" compatLnSpc="1"/>
           <a:lstStyle/>
           <a:p>
             <a:endParaRPr kumimoji="0" lang="en-US"/>
@@ -3837,7 +3838,7 @@
 </file>
 
 <file path=ppt/slideLayouts/slideLayout6.xml><?xml version="1.0" encoding="utf-8"?>
-<p:sldLayout xmlns:a="http://schemas.openxmlformats.org/drawingml/2006/main" xmlns:r="http://schemas.openxmlformats.org/officeDocument/2006/relationships" xmlns:mc="http://schemas.openxmlformats.org/markup-compatibility/2006" xmlns:mv="urn:schemas-microsoft-com:mac:vml" xmlns:p="http://schemas.openxmlformats.org/presentationml/2006/main" mc:Ignorable="mv" mc:PreserveAttributes="mv:*" type="twoTxTwoObj" preserve="1">
+<p:sldLayout xmlns:a="http://schemas.openxmlformats.org/drawingml/2006/main" xmlns:r="http://schemas.openxmlformats.org/officeDocument/2006/relationships" xmlns:p="http://schemas.openxmlformats.org/presentationml/2006/main" type="twoTxTwoObj" preserve="1">
   <p:cSld name="Comparison">
     <p:spTree>
       <p:nvGrpSpPr>
@@ -3905,35 +3906,35 @@
               <a:buNone/>
               <a:defRPr sz="3400" b="0"/>
             </a:lvl1pPr>
-            <a:lvl2pPr marL="650197" indent="0">
+            <a:lvl2pPr marL="650230" indent="0">
               <a:buNone/>
               <a:defRPr sz="2800" b="1"/>
             </a:lvl2pPr>
-            <a:lvl3pPr marL="1300393" indent="0">
+            <a:lvl3pPr marL="1300460" indent="0">
               <a:buNone/>
               <a:defRPr sz="2600" b="1"/>
             </a:lvl3pPr>
-            <a:lvl4pPr marL="1950590" indent="0">
+            <a:lvl4pPr marL="1950690" indent="0">
               <a:buNone/>
               <a:defRPr sz="2300" b="1"/>
             </a:lvl4pPr>
-            <a:lvl5pPr marL="2600786" indent="0">
+            <a:lvl5pPr marL="2600919" indent="0">
               <a:buNone/>
               <a:defRPr sz="2300" b="1"/>
             </a:lvl5pPr>
-            <a:lvl6pPr marL="3250983" indent="0">
+            <a:lvl6pPr marL="3251149" indent="0">
               <a:buNone/>
               <a:defRPr sz="2300" b="1"/>
             </a:lvl6pPr>
-            <a:lvl7pPr marL="3901180" indent="0">
+            <a:lvl7pPr marL="3901379" indent="0">
               <a:buNone/>
               <a:defRPr sz="2300" b="1"/>
             </a:lvl7pPr>
-            <a:lvl8pPr marL="4551376" indent="0">
+            <a:lvl8pPr marL="4551609" indent="0">
               <a:buNone/>
               <a:defRPr sz="2300" b="1"/>
             </a:lvl8pPr>
-            <a:lvl9pPr marL="5201573" indent="0">
+            <a:lvl9pPr marL="5201839" indent="0">
               <a:buNone/>
               <a:defRPr sz="2300" b="1"/>
             </a:lvl9pPr>
@@ -4059,35 +4060,35 @@
               <a:buNone/>
               <a:defRPr sz="3400" b="0"/>
             </a:lvl1pPr>
-            <a:lvl2pPr marL="650197" indent="0">
+            <a:lvl2pPr marL="650230" indent="0">
               <a:buNone/>
               <a:defRPr sz="2800" b="1"/>
             </a:lvl2pPr>
-            <a:lvl3pPr marL="1300393" indent="0">
+            <a:lvl3pPr marL="1300460" indent="0">
               <a:buNone/>
               <a:defRPr sz="2600" b="1"/>
             </a:lvl3pPr>
-            <a:lvl4pPr marL="1950590" indent="0">
+            <a:lvl4pPr marL="1950690" indent="0">
               <a:buNone/>
               <a:defRPr sz="2300" b="1"/>
             </a:lvl4pPr>
-            <a:lvl5pPr marL="2600786" indent="0">
+            <a:lvl5pPr marL="2600919" indent="0">
               <a:buNone/>
               <a:defRPr sz="2300" b="1"/>
             </a:lvl5pPr>
-            <a:lvl6pPr marL="3250983" indent="0">
+            <a:lvl6pPr marL="3251149" indent="0">
               <a:buNone/>
               <a:defRPr sz="2300" b="1"/>
             </a:lvl6pPr>
-            <a:lvl7pPr marL="3901180" indent="0">
+            <a:lvl7pPr marL="3901379" indent="0">
               <a:buNone/>
               <a:defRPr sz="2300" b="1"/>
             </a:lvl7pPr>
-            <a:lvl8pPr marL="4551376" indent="0">
+            <a:lvl8pPr marL="4551609" indent="0">
               <a:buNone/>
               <a:defRPr sz="2300" b="1"/>
             </a:lvl8pPr>
-            <a:lvl9pPr marL="5201573" indent="0">
+            <a:lvl9pPr marL="5201839" indent="0">
               <a:buNone/>
               <a:defRPr sz="2300" b="1"/>
             </a:lvl9pPr>
@@ -4200,7 +4201,7 @@
         </p:nvSpPr>
         <p:spPr>
           <a:xfrm>
-            <a:off x="9358356" y="267748"/>
+            <a:off x="9358356" y="267747"/>
             <a:ext cx="3034453" cy="519289"/>
           </a:xfrm>
         </p:spPr>
@@ -4228,7 +4229,7 @@
         </p:nvSpPr>
         <p:spPr>
           <a:xfrm>
-            <a:off x="1593725" y="267748"/>
+            <a:off x="1593725" y="267747"/>
             <a:ext cx="4118187" cy="519289"/>
           </a:xfrm>
         </p:spPr>
@@ -4525,7 +4526,7 @@
           <a:effectLst/>
         </p:spPr>
         <p:txBody>
-          <a:bodyPr vert="horz" wrap="square" lIns="130039" tIns="65020" rIns="130039" bIns="65020" anchor="t" compatLnSpc="1"/>
+          <a:bodyPr vert="horz" wrap="square" lIns="130046" tIns="65023" rIns="130046" bIns="65023" anchor="t" compatLnSpc="1"/>
           <a:lstStyle/>
           <a:p>
             <a:endParaRPr kumimoji="0" lang="en-US"/>
@@ -4541,7 +4542,7 @@
 </file>
 
 <file path=ppt/slideLayouts/slideLayout7.xml><?xml version="1.0" encoding="utf-8"?>
-<p:sldLayout xmlns:a="http://schemas.openxmlformats.org/drawingml/2006/main" xmlns:r="http://schemas.openxmlformats.org/officeDocument/2006/relationships" xmlns:mc="http://schemas.openxmlformats.org/markup-compatibility/2006" xmlns:mv="urn:schemas-microsoft-com:mac:vml" xmlns:p="http://schemas.openxmlformats.org/presentationml/2006/main" mc:Ignorable="mv" mc:PreserveAttributes="mv:*" type="titleOnly" preserve="1">
+<p:sldLayout xmlns:a="http://schemas.openxmlformats.org/drawingml/2006/main" xmlns:r="http://schemas.openxmlformats.org/officeDocument/2006/relationships" xmlns:p="http://schemas.openxmlformats.org/presentationml/2006/main" type="titleOnly" preserve="1">
   <p:cSld name="Title Only">
     <p:spTree>
       <p:nvGrpSpPr>
@@ -4679,7 +4680,7 @@
           <a:effectLst/>
         </p:spPr>
         <p:txBody>
-          <a:bodyPr vert="horz" wrap="square" lIns="130039" tIns="65020" rIns="130039" bIns="65020" anchor="t" compatLnSpc="1"/>
+          <a:bodyPr vert="horz" wrap="square" lIns="130046" tIns="65023" rIns="130046" bIns="65023" anchor="t" compatLnSpc="1"/>
           <a:lstStyle/>
           <a:p>
             <a:endParaRPr kumimoji="0" lang="en-US"/>
@@ -4695,7 +4696,7 @@
 </file>
 
 <file path=ppt/slideLayouts/slideLayout8.xml><?xml version="1.0" encoding="utf-8"?>
-<p:sldLayout xmlns:a="http://schemas.openxmlformats.org/drawingml/2006/main" xmlns:r="http://schemas.openxmlformats.org/officeDocument/2006/relationships" xmlns:mc="http://schemas.openxmlformats.org/markup-compatibility/2006" xmlns:mv="urn:schemas-microsoft-com:mac:vml" xmlns:p="http://schemas.openxmlformats.org/presentationml/2006/main" mc:Ignorable="mv" mc:PreserveAttributes="mv:*" type="blank" preserve="1">
+<p:sldLayout xmlns:a="http://schemas.openxmlformats.org/drawingml/2006/main" xmlns:r="http://schemas.openxmlformats.org/officeDocument/2006/relationships" xmlns:p="http://schemas.openxmlformats.org/presentationml/2006/main" type="blank" preserve="1">
   <p:cSld name="Blank">
     <p:spTree>
       <p:nvGrpSpPr>
@@ -4810,7 +4811,7 @@
           <a:effectLst/>
         </p:spPr>
         <p:txBody>
-          <a:bodyPr vert="horz" wrap="square" lIns="130039" tIns="65020" rIns="130039" bIns="65020" anchor="t" compatLnSpc="1"/>
+          <a:bodyPr vert="horz" wrap="square" lIns="130046" tIns="65023" rIns="130046" bIns="65023" anchor="t" compatLnSpc="1"/>
           <a:lstStyle/>
           <a:p>
             <a:endParaRPr kumimoji="0" lang="en-US"/>
@@ -4827,7 +4828,7 @@
         </p:nvSpPr>
         <p:spPr bwMode="auto">
           <a:xfrm>
-            <a:off x="634999" y="9052743"/>
+            <a:off x="635000" y="9052743"/>
             <a:ext cx="11704320" cy="0"/>
           </a:xfrm>
           <a:prstGeom prst="line">
@@ -4846,7 +4847,7 @@
           <a:effectLst/>
         </p:spPr>
         <p:txBody>
-          <a:bodyPr vert="horz" wrap="square" lIns="130039" tIns="65020" rIns="130039" bIns="65020" anchor="t" compatLnSpc="1"/>
+          <a:bodyPr vert="horz" wrap="square" lIns="130046" tIns="65023" rIns="130046" bIns="65023" anchor="t" compatLnSpc="1"/>
           <a:lstStyle/>
           <a:p>
             <a:endParaRPr kumimoji="0" lang="en-US"/>
@@ -4862,7 +4863,7 @@
 </file>
 
 <file path=ppt/slideLayouts/slideLayout9.xml><?xml version="1.0" encoding="utf-8"?>
-<p:sldLayout xmlns:a="http://schemas.openxmlformats.org/drawingml/2006/main" xmlns:r="http://schemas.openxmlformats.org/officeDocument/2006/relationships" xmlns:mc="http://schemas.openxmlformats.org/markup-compatibility/2006" xmlns:mv="urn:schemas-microsoft-com:mac:vml" xmlns:p="http://schemas.openxmlformats.org/presentationml/2006/main" mc:Ignorable="mv" mc:PreserveAttributes="mv:*" type="objTx" preserve="1">
+<p:sldLayout xmlns:a="http://schemas.openxmlformats.org/drawingml/2006/main" xmlns:r="http://schemas.openxmlformats.org/officeDocument/2006/relationships" xmlns:p="http://schemas.openxmlformats.org/presentationml/2006/main" type="objTx" preserve="1">
   <p:cSld name="Content with Caption">
     <p:spTree>
       <p:nvGrpSpPr>
@@ -4898,11 +4899,11 @@
           </a:solidFill>
         </p:spPr>
         <p:txBody>
-          <a:bodyPr vert="horz" lIns="1690511" tIns="65020" rIns="390118" bIns="65020" rtlCol="0" anchor="ctr">
+          <a:bodyPr vert="horz" lIns="1690598" tIns="65023" rIns="390138" bIns="65023" rtlCol="0" anchor="ctr">
             <a:normAutofit/>
           </a:bodyPr>
           <a:lstStyle>
-            <a:lvl1pPr marL="0" indent="0" algn="l" defTabSz="1300393" rtl="0" eaLnBrk="1" latinLnBrk="0" hangingPunct="1">
+            <a:lvl1pPr marL="0" indent="0" algn="l" defTabSz="1300460" rtl="0" eaLnBrk="1" latinLnBrk="0" hangingPunct="1">
               <a:spcBef>
                 <a:spcPct val="0"/>
               </a:spcBef>
@@ -5053,11 +5054,11 @@
           </a:fontRef>
         </p:style>
         <p:txBody>
-          <a:bodyPr vert="horz" lIns="416126" tIns="390118" rIns="390118" bIns="390118" rtlCol="0" anchor="t" anchorCtr="0">
+          <a:bodyPr vert="horz" lIns="416147" tIns="390138" rIns="390138" bIns="390138" rtlCol="0" anchor="t" anchorCtr="0">
             <a:normAutofit/>
           </a:bodyPr>
           <a:lstStyle>
-            <a:lvl1pPr marL="0" indent="0" algn="l" defTabSz="1300393" rtl="0" eaLnBrk="1" latinLnBrk="0" hangingPunct="1">
+            <a:lvl1pPr marL="0" indent="0" algn="l" defTabSz="1300460" rtl="0" eaLnBrk="1" latinLnBrk="0" hangingPunct="1">
               <a:spcBef>
                 <a:spcPts val="2844"/>
               </a:spcBef>
@@ -5078,35 +5079,35 @@
                 <a:cs typeface="+mn-cs"/>
               </a:defRPr>
             </a:lvl1pPr>
-            <a:lvl2pPr marL="650197" indent="0">
+            <a:lvl2pPr marL="650230" indent="0">
               <a:buNone/>
               <a:defRPr sz="1700"/>
             </a:lvl2pPr>
-            <a:lvl3pPr marL="1300393" indent="0">
+            <a:lvl3pPr marL="1300460" indent="0">
               <a:buNone/>
               <a:defRPr sz="1400"/>
             </a:lvl3pPr>
-            <a:lvl4pPr marL="1950590" indent="0">
+            <a:lvl4pPr marL="1950690" indent="0">
               <a:buNone/>
               <a:defRPr sz="1300"/>
             </a:lvl4pPr>
-            <a:lvl5pPr marL="2600786" indent="0">
+            <a:lvl5pPr marL="2600919" indent="0">
               <a:buNone/>
               <a:defRPr sz="1300"/>
             </a:lvl5pPr>
-            <a:lvl6pPr marL="3250983" indent="0">
+            <a:lvl6pPr marL="3251149" indent="0">
               <a:buNone/>
               <a:defRPr sz="1300"/>
             </a:lvl6pPr>
-            <a:lvl7pPr marL="3901180" indent="0">
+            <a:lvl7pPr marL="3901379" indent="0">
               <a:buNone/>
               <a:defRPr sz="1300"/>
             </a:lvl7pPr>
-            <a:lvl8pPr marL="4551376" indent="0">
+            <a:lvl8pPr marL="4551609" indent="0">
               <a:buNone/>
               <a:defRPr sz="1300"/>
             </a:lvl8pPr>
-            <a:lvl9pPr marL="5201573" indent="0">
+            <a:lvl9pPr marL="5201839" indent="0">
               <a:buNone/>
               <a:defRPr sz="1300"/>
             </a:lvl9pPr>
@@ -5132,7 +5133,7 @@
         </p:nvSpPr>
         <p:spPr>
           <a:xfrm>
-            <a:off x="9358356" y="267748"/>
+            <a:off x="9358356" y="267747"/>
             <a:ext cx="3034453" cy="519289"/>
           </a:xfrm>
         </p:spPr>
@@ -5205,7 +5206,7 @@
         </p:nvSpPr>
         <p:spPr bwMode="auto">
           <a:xfrm>
-            <a:off x="634999" y="9052743"/>
+            <a:off x="635000" y="9052743"/>
             <a:ext cx="11704320" cy="0"/>
           </a:xfrm>
           <a:prstGeom prst="line">
@@ -5224,7 +5225,7 @@
           <a:effectLst/>
         </p:spPr>
         <p:txBody>
-          <a:bodyPr vert="horz" wrap="square" lIns="130039" tIns="65020" rIns="130039" bIns="65020" anchor="t" compatLnSpc="1"/>
+          <a:bodyPr vert="horz" wrap="square" lIns="130046" tIns="65023" rIns="130046" bIns="65023" anchor="t" compatLnSpc="1"/>
           <a:lstStyle/>
           <a:p>
             <a:endParaRPr kumimoji="0" lang="en-US"/>
@@ -5240,7 +5241,7 @@
 </file>
 
 <file path=ppt/slideMasters/slideMaster1.xml><?xml version="1.0" encoding="utf-8"?>
-<p:sldMaster xmlns:a="http://schemas.openxmlformats.org/drawingml/2006/main" xmlns:r="http://schemas.openxmlformats.org/officeDocument/2006/relationships" xmlns:mc="http://schemas.openxmlformats.org/markup-compatibility/2006" xmlns:mv="urn:schemas-microsoft-com:mac:vml" xmlns:p="http://schemas.openxmlformats.org/presentationml/2006/main" mc:Ignorable="mv" mc:PreserveAttributes="mv:*">
+<p:sldMaster xmlns:a="http://schemas.openxmlformats.org/drawingml/2006/main" xmlns:r="http://schemas.openxmlformats.org/officeDocument/2006/relationships" xmlns:p="http://schemas.openxmlformats.org/presentationml/2006/main">
   <p:cSld>
     <p:bg>
       <p:bgRef idx="1001">
@@ -5273,7 +5274,7 @@
         </p:nvSpPr>
         <p:spPr>
           <a:xfrm>
-            <a:off x="2" y="1598373"/>
+            <a:off x="1" y="1598373"/>
             <a:ext cx="12677423" cy="1300480"/>
           </a:xfrm>
           <a:prstGeom prst="rect">
@@ -5284,7 +5285,7 @@
           </a:solidFill>
         </p:spPr>
         <p:txBody>
-          <a:bodyPr vert="horz" lIns="1690511" tIns="65020" rIns="390118" bIns="65020" rtlCol="0" anchor="ctr">
+          <a:bodyPr vert="horz" lIns="1690598" tIns="65023" rIns="390138" bIns="65023" rtlCol="0" anchor="ctr">
             <a:normAutofit/>
           </a:bodyPr>
           <a:lstStyle/>
@@ -5309,7 +5310,7 @@
         </p:nvSpPr>
         <p:spPr>
           <a:xfrm>
-            <a:off x="1584959" y="3691468"/>
+            <a:off x="1584959" y="3691467"/>
             <a:ext cx="10823788" cy="5220646"/>
           </a:xfrm>
           <a:prstGeom prst="rect">
@@ -5317,7 +5318,7 @@
           </a:prstGeom>
         </p:spPr>
         <p:txBody>
-          <a:bodyPr vert="horz" lIns="130039" tIns="65020" rIns="130039" bIns="65020" rtlCol="0">
+          <a:bodyPr vert="horz" lIns="130046" tIns="65023" rIns="130046" bIns="65023" rtlCol="0">
             <a:normAutofit/>
           </a:bodyPr>
           <a:lstStyle/>
@@ -5371,7 +5372,7 @@
         </p:nvSpPr>
         <p:spPr>
           <a:xfrm>
-            <a:off x="9358356" y="267748"/>
+            <a:off x="9358356" y="267747"/>
             <a:ext cx="3034453" cy="519289"/>
           </a:xfrm>
           <a:prstGeom prst="rect">
@@ -5379,7 +5380,7 @@
           </a:prstGeom>
         </p:spPr>
         <p:txBody>
-          <a:bodyPr vert="horz" lIns="130039" tIns="65020" rIns="130039" bIns="65020" rtlCol="0" anchor="ctr"/>
+          <a:bodyPr vert="horz" lIns="130046" tIns="65023" rIns="130046" bIns="65023" rtlCol="0" anchor="ctr"/>
           <a:lstStyle>
             <a:lvl1pPr algn="r">
               <a:defRPr sz="1400">
@@ -5413,7 +5414,7 @@
         </p:nvSpPr>
         <p:spPr>
           <a:xfrm>
-            <a:off x="1593725" y="267748"/>
+            <a:off x="1593725" y="267747"/>
             <a:ext cx="4118187" cy="519289"/>
           </a:xfrm>
           <a:prstGeom prst="rect">
@@ -5421,7 +5422,7 @@
           </a:prstGeom>
         </p:spPr>
         <p:txBody>
-          <a:bodyPr vert="horz" lIns="130039" tIns="65020" rIns="130039" bIns="65020" rtlCol="0" anchor="ctr"/>
+          <a:bodyPr vert="horz" lIns="130046" tIns="65023" rIns="130046" bIns="65023" rtlCol="0" anchor="ctr"/>
           <a:lstStyle>
             <a:lvl1pPr algn="l">
               <a:defRPr sz="1400">
@@ -5459,7 +5460,7 @@
         </p:nvSpPr>
         <p:spPr>
           <a:xfrm>
-            <a:off x="12501183" y="9342687"/>
+            <a:off x="12501183" y="9342685"/>
             <a:ext cx="650240" cy="519289"/>
           </a:xfrm>
           <a:prstGeom prst="rect">
@@ -5467,7 +5468,7 @@
           </a:prstGeom>
         </p:spPr>
         <p:txBody>
-          <a:bodyPr vert="horz" lIns="130039" tIns="65020" rIns="130039" bIns="65020" rtlCol="0" anchor="ctr"/>
+          <a:bodyPr vert="horz" lIns="130046" tIns="65023" rIns="130046" bIns="65023" rtlCol="0" anchor="ctr"/>
           <a:lstStyle>
             <a:lvl1pPr algn="ctr">
               <a:defRPr sz="1100">
@@ -5498,7 +5499,7 @@
         </p:nvSpPr>
         <p:spPr>
           <a:xfrm>
-            <a:off x="1300482" y="0"/>
+            <a:off x="1300481" y="0"/>
             <a:ext cx="11376943" cy="260096"/>
           </a:xfrm>
           <a:prstGeom prst="rect">
@@ -5531,7 +5532,7 @@
           </a:fontRef>
         </p:style>
         <p:txBody>
-          <a:bodyPr lIns="130039" tIns="65020" rIns="130039" bIns="65020" rtlCol="0" anchor="ctr"/>
+          <a:bodyPr lIns="130046" tIns="65023" rIns="130046" bIns="65023" rtlCol="0" anchor="ctr"/>
           <a:lstStyle/>
           <a:p>
             <a:pPr algn="ctr"/>
@@ -5547,7 +5548,7 @@
         </p:nvSpPr>
         <p:spPr>
           <a:xfrm>
-            <a:off x="1300482" y="9493504"/>
+            <a:off x="1300481" y="9493504"/>
             <a:ext cx="11376943" cy="260096"/>
           </a:xfrm>
           <a:prstGeom prst="rect">
@@ -5580,7 +5581,7 @@
           </a:fontRef>
         </p:style>
         <p:txBody>
-          <a:bodyPr lIns="130039" tIns="65020" rIns="130039" bIns="65020" rtlCol="0" anchor="ctr"/>
+          <a:bodyPr lIns="130046" tIns="65023" rIns="130046" bIns="65023" rtlCol="0" anchor="ctr"/>
           <a:lstStyle/>
           <a:p>
             <a:pPr algn="ctr"/>
@@ -5611,7 +5612,7 @@
   <p:hf hdr="0"/>
   <p:txStyles>
     <p:titleStyle>
-      <a:lvl1pPr marL="0" indent="0" algn="l" defTabSz="1300393" rtl="0" eaLnBrk="1" latinLnBrk="0" hangingPunct="1">
+      <a:lvl1pPr marL="0" indent="0" algn="l" defTabSz="1300460" rtl="0" eaLnBrk="1" latinLnBrk="0" hangingPunct="1">
         <a:spcBef>
           <a:spcPct val="0"/>
         </a:spcBef>
@@ -5627,7 +5628,7 @@
       </a:lvl1pPr>
     </p:titleStyle>
     <p:bodyStyle>
-      <a:lvl1pPr marL="487647" indent="-487647" algn="l" defTabSz="1300393" rtl="0" eaLnBrk="1" latinLnBrk="0" hangingPunct="1">
+      <a:lvl1pPr marL="487672" indent="-487672" algn="l" defTabSz="1300460" rtl="0" eaLnBrk="1" latinLnBrk="0" hangingPunct="1">
         <a:spcBef>
           <a:spcPts val="2844"/>
         </a:spcBef>
@@ -5648,7 +5649,7 @@
           <a:cs typeface="+mn-cs"/>
         </a:defRPr>
       </a:lvl1pPr>
-      <a:lvl2pPr marL="975295" indent="-478616" algn="l" defTabSz="1300393" rtl="0" eaLnBrk="1" latinLnBrk="0" hangingPunct="1">
+      <a:lvl2pPr marL="975345" indent="-478641" algn="l" defTabSz="1300460" rtl="0" eaLnBrk="1" latinLnBrk="0" hangingPunct="1">
         <a:spcBef>
           <a:spcPts val="853"/>
         </a:spcBef>
@@ -5671,7 +5672,7 @@
           <a:cs typeface="+mn-cs"/>
         </a:defRPr>
       </a:lvl2pPr>
-      <a:lvl3pPr marL="1471973" indent="-496678" algn="l" defTabSz="1300393" rtl="0" eaLnBrk="1" latinLnBrk="0" hangingPunct="1">
+      <a:lvl3pPr marL="1472048" indent="-496703" algn="l" defTabSz="1300460" rtl="0" eaLnBrk="1" latinLnBrk="0" hangingPunct="1">
         <a:spcBef>
           <a:spcPts val="853"/>
         </a:spcBef>
@@ -5692,7 +5693,7 @@
           <a:cs typeface="+mn-cs"/>
         </a:defRPr>
       </a:lvl3pPr>
-      <a:lvl4pPr marL="1950590" indent="-478616" algn="l" defTabSz="1300393" rtl="0" eaLnBrk="1" latinLnBrk="0" hangingPunct="1">
+      <a:lvl4pPr marL="1950690" indent="-478641" algn="l" defTabSz="1300460" rtl="0" eaLnBrk="1" latinLnBrk="0" hangingPunct="1">
         <a:spcBef>
           <a:spcPts val="853"/>
         </a:spcBef>
@@ -5715,7 +5716,7 @@
           <a:cs typeface="+mn-cs"/>
         </a:defRPr>
       </a:lvl4pPr>
-      <a:lvl5pPr marL="2447268" indent="-496678" algn="l" defTabSz="1300393" rtl="0" eaLnBrk="1" latinLnBrk="0" hangingPunct="1">
+      <a:lvl5pPr marL="2447393" indent="-496703" algn="l" defTabSz="1300460" rtl="0" eaLnBrk="1" latinLnBrk="0" hangingPunct="1">
         <a:spcBef>
           <a:spcPts val="853"/>
         </a:spcBef>
@@ -5736,7 +5737,7 @@
           <a:cs typeface="+mn-cs"/>
         </a:defRPr>
       </a:lvl5pPr>
-      <a:lvl6pPr marL="3576081" indent="-325098" algn="l" defTabSz="1300393" rtl="0" eaLnBrk="1" latinLnBrk="0" hangingPunct="1">
+      <a:lvl6pPr marL="3576264" indent="-325115" algn="l" defTabSz="1300460" rtl="0" eaLnBrk="1" latinLnBrk="0" hangingPunct="1">
         <a:spcBef>
           <a:spcPct val="20000"/>
         </a:spcBef>
@@ -5751,7 +5752,7 @@
           <a:cs typeface="+mn-cs"/>
         </a:defRPr>
       </a:lvl6pPr>
-      <a:lvl7pPr marL="4226278" indent="-325098" algn="l" defTabSz="1300393" rtl="0" eaLnBrk="1" latinLnBrk="0" hangingPunct="1">
+      <a:lvl7pPr marL="4226494" indent="-325115" algn="l" defTabSz="1300460" rtl="0" eaLnBrk="1" latinLnBrk="0" hangingPunct="1">
         <a:spcBef>
           <a:spcPct val="20000"/>
         </a:spcBef>
@@ -5766,7 +5767,7 @@
           <a:cs typeface="+mn-cs"/>
         </a:defRPr>
       </a:lvl7pPr>
-      <a:lvl8pPr marL="4876475" indent="-325098" algn="l" defTabSz="1300393" rtl="0" eaLnBrk="1" latinLnBrk="0" hangingPunct="1">
+      <a:lvl8pPr marL="4876724" indent="-325115" algn="l" defTabSz="1300460" rtl="0" eaLnBrk="1" latinLnBrk="0" hangingPunct="1">
         <a:spcBef>
           <a:spcPct val="20000"/>
         </a:spcBef>
@@ -5781,7 +5782,7 @@
           <a:cs typeface="+mn-cs"/>
         </a:defRPr>
       </a:lvl8pPr>
-      <a:lvl9pPr marL="5526671" indent="-325098" algn="l" defTabSz="1300393" rtl="0" eaLnBrk="1" latinLnBrk="0" hangingPunct="1">
+      <a:lvl9pPr marL="5526954" indent="-325115" algn="l" defTabSz="1300460" rtl="0" eaLnBrk="1" latinLnBrk="0" hangingPunct="1">
         <a:spcBef>
           <a:spcPct val="20000"/>
         </a:spcBef>
@@ -5801,7 +5802,7 @@
       <a:defPPr>
         <a:defRPr/>
       </a:defPPr>
-      <a:lvl1pPr marL="0" algn="l" defTabSz="1300393" rtl="0" eaLnBrk="1" latinLnBrk="0" hangingPunct="1">
+      <a:lvl1pPr marL="0" algn="l" defTabSz="1300460" rtl="0" eaLnBrk="1" latinLnBrk="0" hangingPunct="1">
         <a:defRPr sz="2600" kern="1200">
           <a:solidFill>
             <a:schemeClr val="tx1"/>
@@ -5811,7 +5812,7 @@
           <a:cs typeface="+mn-cs"/>
         </a:defRPr>
       </a:lvl1pPr>
-      <a:lvl2pPr marL="650197" algn="l" defTabSz="1300393" rtl="0" eaLnBrk="1" latinLnBrk="0" hangingPunct="1">
+      <a:lvl2pPr marL="650230" algn="l" defTabSz="1300460" rtl="0" eaLnBrk="1" latinLnBrk="0" hangingPunct="1">
         <a:defRPr sz="2600" kern="1200">
           <a:solidFill>
             <a:schemeClr val="tx1"/>
@@ -5821,7 +5822,7 @@
           <a:cs typeface="+mn-cs"/>
         </a:defRPr>
       </a:lvl2pPr>
-      <a:lvl3pPr marL="1300393" algn="l" defTabSz="1300393" rtl="0" eaLnBrk="1" latinLnBrk="0" hangingPunct="1">
+      <a:lvl3pPr marL="1300460" algn="l" defTabSz="1300460" rtl="0" eaLnBrk="1" latinLnBrk="0" hangingPunct="1">
         <a:defRPr sz="2600" kern="1200">
           <a:solidFill>
             <a:schemeClr val="tx1"/>
@@ -5831,7 +5832,7 @@
           <a:cs typeface="+mn-cs"/>
         </a:defRPr>
       </a:lvl3pPr>
-      <a:lvl4pPr marL="1950590" algn="l" defTabSz="1300393" rtl="0" eaLnBrk="1" latinLnBrk="0" hangingPunct="1">
+      <a:lvl4pPr marL="1950690" algn="l" defTabSz="1300460" rtl="0" eaLnBrk="1" latinLnBrk="0" hangingPunct="1">
         <a:defRPr sz="2600" kern="1200">
           <a:solidFill>
             <a:schemeClr val="tx1"/>
@@ -5841,7 +5842,7 @@
           <a:cs typeface="+mn-cs"/>
         </a:defRPr>
       </a:lvl4pPr>
-      <a:lvl5pPr marL="2600786" algn="l" defTabSz="1300393" rtl="0" eaLnBrk="1" latinLnBrk="0" hangingPunct="1">
+      <a:lvl5pPr marL="2600919" algn="l" defTabSz="1300460" rtl="0" eaLnBrk="1" latinLnBrk="0" hangingPunct="1">
         <a:defRPr sz="2600" kern="1200">
           <a:solidFill>
             <a:schemeClr val="tx1"/>
@@ -5851,7 +5852,7 @@
           <a:cs typeface="+mn-cs"/>
         </a:defRPr>
       </a:lvl5pPr>
-      <a:lvl6pPr marL="3250983" algn="l" defTabSz="1300393" rtl="0" eaLnBrk="1" latinLnBrk="0" hangingPunct="1">
+      <a:lvl6pPr marL="3251149" algn="l" defTabSz="1300460" rtl="0" eaLnBrk="1" latinLnBrk="0" hangingPunct="1">
         <a:defRPr sz="2600" kern="1200">
           <a:solidFill>
             <a:schemeClr val="tx1"/>
@@ -5861,7 +5862,7 @@
           <a:cs typeface="+mn-cs"/>
         </a:defRPr>
       </a:lvl6pPr>
-      <a:lvl7pPr marL="3901180" algn="l" defTabSz="1300393" rtl="0" eaLnBrk="1" latinLnBrk="0" hangingPunct="1">
+      <a:lvl7pPr marL="3901379" algn="l" defTabSz="1300460" rtl="0" eaLnBrk="1" latinLnBrk="0" hangingPunct="1">
         <a:defRPr sz="2600" kern="1200">
           <a:solidFill>
             <a:schemeClr val="tx1"/>
@@ -5871,7 +5872,7 @@
           <a:cs typeface="+mn-cs"/>
         </a:defRPr>
       </a:lvl7pPr>
-      <a:lvl8pPr marL="4551376" algn="l" defTabSz="1300393" rtl="0" eaLnBrk="1" latinLnBrk="0" hangingPunct="1">
+      <a:lvl8pPr marL="4551609" algn="l" defTabSz="1300460" rtl="0" eaLnBrk="1" latinLnBrk="0" hangingPunct="1">
         <a:defRPr sz="2600" kern="1200">
           <a:solidFill>
             <a:schemeClr val="tx1"/>
@@ -5881,7 +5882,7 @@
           <a:cs typeface="+mn-cs"/>
         </a:defRPr>
       </a:lvl8pPr>
-      <a:lvl9pPr marL="5201573" algn="l" defTabSz="1300393" rtl="0" eaLnBrk="1" latinLnBrk="0" hangingPunct="1">
+      <a:lvl9pPr marL="5201839" algn="l" defTabSz="1300460" rtl="0" eaLnBrk="1" latinLnBrk="0" hangingPunct="1">
         <a:defRPr sz="2600" kern="1200">
           <a:solidFill>
             <a:schemeClr val="tx1"/>
@@ -5897,7 +5898,7 @@
 </file>
 
 <file path=ppt/slides/slide1.xml><?xml version="1.0" encoding="utf-8"?>
-<p:sld xmlns:a="http://schemas.openxmlformats.org/drawingml/2006/main" xmlns:r="http://schemas.openxmlformats.org/officeDocument/2006/relationships" xmlns:mc="http://schemas.openxmlformats.org/markup-compatibility/2006" xmlns:mv="urn:schemas-microsoft-com:mac:vml" xmlns:p="http://schemas.openxmlformats.org/presentationml/2006/main" mc:Ignorable="mv" mc:PreserveAttributes="mv:*">
+<p:sld xmlns:a="http://schemas.openxmlformats.org/drawingml/2006/main" xmlns:r="http://schemas.openxmlformats.org/officeDocument/2006/relationships" xmlns:p="http://schemas.openxmlformats.org/presentationml/2006/main">
   <p:cSld>
     <p:spTree>
       <p:nvGrpSpPr>
@@ -6059,6 +6060,11 @@
         </p:spPr>
       </p:pic>
     </p:spTree>
+    <p:extLst>
+      <p:ext uri="{BB962C8B-B14F-4D97-AF65-F5344CB8AC3E}">
+        <p14:creationId xmlns:p14="http://schemas.microsoft.com/office/powerpoint/2010/main" val="1681731650"/>
+      </p:ext>
+    </p:extLst>
   </p:cSld>
   <p:clrMapOvr>
     <a:masterClrMapping/>
@@ -6074,7 +6080,7 @@
 </file>
 
 <file path=ppt/slides/slide10.xml><?xml version="1.0" encoding="utf-8"?>
-<p:sld xmlns:a="http://schemas.openxmlformats.org/drawingml/2006/main" xmlns:r="http://schemas.openxmlformats.org/officeDocument/2006/relationships" xmlns:mc="http://schemas.openxmlformats.org/markup-compatibility/2006" xmlns:mv="urn:schemas-microsoft-com:mac:vml" xmlns:p="http://schemas.openxmlformats.org/presentationml/2006/main" mc:Ignorable="mv" mc:PreserveAttributes="mv:*">
+<p:sld xmlns:a="http://schemas.openxmlformats.org/drawingml/2006/main" xmlns:r="http://schemas.openxmlformats.org/officeDocument/2006/relationships" xmlns:p="http://schemas.openxmlformats.org/presentationml/2006/main">
   <p:cSld>
     <p:spTree>
       <p:nvGrpSpPr>
@@ -6139,7 +6145,7 @@
           <a:p>
             <a:pPr lvl="1" fontAlgn="ctr"/>
             <a:r>
-              <a:rPr lang="de-DE" sz="3100" dirty="0" smtClean="0"/>
+              <a:rPr lang="de-DE" sz="3200" dirty="0" smtClean="0"/>
               <a:t>Central data store with </a:t>
             </a:r>
           </a:p>
@@ -6160,7 +6166,7 @@
           <a:p>
             <a:pPr lvl="1" fontAlgn="ctr"/>
             <a:r>
-              <a:rPr lang="de-DE" sz="3100" dirty="0" smtClean="0"/>
+              <a:rPr lang="de-DE" sz="3200" dirty="0" smtClean="0"/>
               <a:t>Filesystem like structure</a:t>
             </a:r>
           </a:p>
@@ -6174,14 +6180,14 @@
           <a:p>
             <a:pPr lvl="1" fontAlgn="ctr"/>
             <a:r>
-              <a:rPr lang="de-DE" sz="3100" dirty="0" smtClean="0"/>
+              <a:rPr lang="de-DE" sz="3200" dirty="0" smtClean="0"/>
               <a:t>Depends on SAGA adaptors</a:t>
             </a:r>
           </a:p>
           <a:p>
             <a:pPr lvl="1" fontAlgn="ctr"/>
             <a:r>
-              <a:rPr lang="de-DE" sz="3100" dirty="0" smtClean="0"/>
+              <a:rPr lang="de-DE" sz="3200" dirty="0" smtClean="0"/>
               <a:t>Local adaptor:</a:t>
             </a:r>
           </a:p>
@@ -6202,7 +6208,7 @@
           <a:p>
             <a:pPr lvl="1" fontAlgn="ctr"/>
             <a:r>
-              <a:rPr lang="de-DE" sz="3100" dirty="0" smtClean="0"/>
+              <a:rPr lang="de-DE" sz="3200" dirty="0" smtClean="0"/>
               <a:t>Also available: Hadoop H-Base, Hypertable</a:t>
             </a:r>
           </a:p>
@@ -6295,7 +6301,7 @@
 </file>
 
 <file path=ppt/slides/slide11.xml><?xml version="1.0" encoding="utf-8"?>
-<p:sld xmlns:a="http://schemas.openxmlformats.org/drawingml/2006/main" xmlns:r="http://schemas.openxmlformats.org/officeDocument/2006/relationships" xmlns:mc="http://schemas.openxmlformats.org/markup-compatibility/2006" xmlns:mv="urn:schemas-microsoft-com:mac:vml" xmlns:p="http://schemas.openxmlformats.org/presentationml/2006/main" mc:Ignorable="mv" mc:PreserveAttributes="mv:*">
+<p:sld xmlns:a="http://schemas.openxmlformats.org/drawingml/2006/main" xmlns:r="http://schemas.openxmlformats.org/officeDocument/2006/relationships" xmlns:p="http://schemas.openxmlformats.org/presentationml/2006/main">
   <p:cSld>
     <p:spTree>
       <p:nvGrpSpPr>
@@ -6438,14 +6444,14 @@
           <p:nvPr>
             <p:extLst>
               <p:ext uri="{D42A27DB-BD31-4B8C-83A1-F6EECF244321}">
-                <p14:modId xmlns:p14="http://schemas.microsoft.com/office/powerpoint/2010/main" xmlns:p="http://schemas.openxmlformats.org/presentationml/2006/main" xmlns:r="http://schemas.openxmlformats.org/officeDocument/2006/relationships" xmlns:a="http://schemas.openxmlformats.org/drawingml/2006/main" xmlns="" val="3414472680"/>
+                <p14:modId xmlns:p14="http://schemas.microsoft.com/office/powerpoint/2010/main" val="3414472680"/>
               </p:ext>
             </p:extLst>
           </p:nvPr>
         </p:nvGraphicFramePr>
         <p:xfrm>
-          <a:off x="863599" y="3005798"/>
-          <a:ext cx="11109569" cy="5354998"/>
+          <a:off x="863599" y="3005797"/>
+          <a:ext cx="11109569" cy="5344160"/>
         </p:xfrm>
         <a:graphic>
           <a:graphicData uri="http://schemas.openxmlformats.org/drawingml/2006/table">
@@ -6556,7 +6562,7 @@
                   <a:tcPr/>
                 </a:tc>
               </a:tr>
-              <a:tr h="828379">
+              <a:tr h="528320">
                 <a:tc>
                   <a:txBody>
                     <a:bodyPr/>
@@ -6615,7 +6621,7 @@
                   <a:tcPr/>
                 </a:tc>
               </a:tr>
-              <a:tr h="828379">
+              <a:tr h="528320">
                 <a:tc>
                   <a:txBody>
                     <a:bodyPr/>
@@ -7077,7 +7083,7 @@
 </file>
 
 <file path=ppt/slides/slide12.xml><?xml version="1.0" encoding="utf-8"?>
-<p:sld xmlns:a="http://schemas.openxmlformats.org/drawingml/2006/main" xmlns:r="http://schemas.openxmlformats.org/officeDocument/2006/relationships" xmlns:mc="http://schemas.openxmlformats.org/markup-compatibility/2006" xmlns:mv="urn:schemas-microsoft-com:mac:vml" xmlns:p="http://schemas.openxmlformats.org/presentationml/2006/main" mc:Ignorable="mv" mc:PreserveAttributes="mv:*">
+<p:sld xmlns:a="http://schemas.openxmlformats.org/drawingml/2006/main" xmlns:r="http://schemas.openxmlformats.org/officeDocument/2006/relationships" xmlns:p="http://schemas.openxmlformats.org/presentationml/2006/main">
   <p:cSld>
     <p:spTree>
       <p:nvGrpSpPr>
@@ -7267,7 +7273,7 @@
 </file>
 
 <file path=ppt/slides/slide13.xml><?xml version="1.0" encoding="utf-8"?>
-<p:sld xmlns:a="http://schemas.openxmlformats.org/drawingml/2006/main" xmlns:r="http://schemas.openxmlformats.org/officeDocument/2006/relationships" xmlns:mc="http://schemas.openxmlformats.org/markup-compatibility/2006" xmlns:mv="urn:schemas-microsoft-com:mac:vml" xmlns:p="http://schemas.openxmlformats.org/presentationml/2006/main" mc:Ignorable="mv" mc:PreserveAttributes="mv:*">
+<p:sld xmlns:a="http://schemas.openxmlformats.org/drawingml/2006/main" xmlns:r="http://schemas.openxmlformats.org/officeDocument/2006/relationships" xmlns:p="http://schemas.openxmlformats.org/presentationml/2006/main">
   <p:cSld>
     <p:spTree>
       <p:nvGrpSpPr>
@@ -7408,13 +7414,13 @@
           <p:nvPr>
             <p:extLst>
               <p:ext uri="{D42A27DB-BD31-4B8C-83A1-F6EECF244321}">
-                <p14:modId xmlns:p14="http://schemas.microsoft.com/office/powerpoint/2010/main" xmlns:p="http://schemas.openxmlformats.org/presentationml/2006/main" xmlns:r="http://schemas.openxmlformats.org/officeDocument/2006/relationships" xmlns:a="http://schemas.openxmlformats.org/drawingml/2006/main" xmlns="" val="4007099573"/>
+                <p14:modId xmlns:p14="http://schemas.microsoft.com/office/powerpoint/2010/main" val="4007099573"/>
               </p:ext>
             </p:extLst>
           </p:nvPr>
         </p:nvGraphicFramePr>
         <p:xfrm>
-          <a:off x="1016000" y="2971801"/>
+          <a:off x="1016000" y="2971800"/>
           <a:ext cx="10972800" cy="3464560"/>
         </p:xfrm>
         <a:graphic>
@@ -7431,8 +7437,8 @@
                 <a:tableStyleId>{5C22544A-7EE6-4342-B048-85BDC9FD1C3A}</a:tableStyleId>
               </a:tblPr>
               <a:tblGrid>
-                <a:gridCol w="3886199"/>
-                <a:gridCol w="7086601"/>
+                <a:gridCol w="3886200"/>
+                <a:gridCol w="7086600"/>
               </a:tblGrid>
               <a:tr h="528320">
                 <a:tc>
@@ -7607,7 +7613,7 @@
                   <a:tcPr/>
                 </a:tc>
               </a:tr>
-              <a:tr h="828379">
+              <a:tr h="528320">
                 <a:tc>
                   <a:txBody>
                     <a:bodyPr/>
@@ -7819,7 +7825,7 @@
 </file>
 
 <file path=ppt/slides/slide14.xml><?xml version="1.0" encoding="utf-8"?>
-<p:sld xmlns:a="http://schemas.openxmlformats.org/drawingml/2006/main" xmlns:r="http://schemas.openxmlformats.org/officeDocument/2006/relationships" xmlns:mc="http://schemas.openxmlformats.org/markup-compatibility/2006" xmlns:mv="urn:schemas-microsoft-com:mac:vml" xmlns:p="http://schemas.openxmlformats.org/presentationml/2006/main" mc:Ignorable="mv" mc:PreserveAttributes="mv:*">
+<p:sld xmlns:a="http://schemas.openxmlformats.org/drawingml/2006/main" xmlns:r="http://schemas.openxmlformats.org/officeDocument/2006/relationships" xmlns:p="http://schemas.openxmlformats.org/presentationml/2006/main">
   <p:cSld>
     <p:spTree>
       <p:nvGrpSpPr>
@@ -8074,7 +8080,7 @@
     </p:spTree>
     <p:extLst>
       <p:ext uri="{BB962C8B-B14F-4D97-AF65-F5344CB8AC3E}">
-        <p14:creationId xmlns:p14="http://schemas.microsoft.com/office/powerpoint/2010/main" xmlns:p="http://schemas.openxmlformats.org/presentationml/2006/main" xmlns:r="http://schemas.openxmlformats.org/officeDocument/2006/relationships" xmlns:a="http://schemas.openxmlformats.org/drawingml/2006/main" xmlns="" val="943545212"/>
+        <p14:creationId xmlns:p14="http://schemas.microsoft.com/office/powerpoint/2010/main" val="943545212"/>
       </p:ext>
     </p:extLst>
   </p:cSld>
@@ -8092,7 +8098,7 @@
 </file>
 
 <file path=ppt/slides/slide15.xml><?xml version="1.0" encoding="utf-8"?>
-<p:sld xmlns:a="http://schemas.openxmlformats.org/drawingml/2006/main" xmlns:r="http://schemas.openxmlformats.org/officeDocument/2006/relationships" xmlns:mc="http://schemas.openxmlformats.org/markup-compatibility/2006" xmlns:mv="urn:schemas-microsoft-com:mac:vml" xmlns:p="http://schemas.openxmlformats.org/presentationml/2006/main" mc:Ignorable="mv" mc:PreserveAttributes="mv:*">
+<p:sld xmlns:a="http://schemas.openxmlformats.org/drawingml/2006/main" xmlns:r="http://schemas.openxmlformats.org/officeDocument/2006/relationships" xmlns:p="http://schemas.openxmlformats.org/presentationml/2006/main">
   <p:cSld>
     <p:spTree>
       <p:nvGrpSpPr>
@@ -8167,7 +8173,7 @@
             <a:pPr marL="0" indent="0">
               <a:buNone/>
               <a:tabLst>
-                <a:tab pos="3206586" algn="l"/>
+                <a:tab pos="3206750" algn="l"/>
               </a:tabLst>
             </a:pPr>
             <a:r>
@@ -8410,7 +8416,7 @@
     </p:spTree>
     <p:extLst>
       <p:ext uri="{BB962C8B-B14F-4D97-AF65-F5344CB8AC3E}">
-        <p14:creationId xmlns:p14="http://schemas.microsoft.com/office/powerpoint/2010/main" xmlns:p="http://schemas.openxmlformats.org/presentationml/2006/main" xmlns:r="http://schemas.openxmlformats.org/officeDocument/2006/relationships" xmlns:a="http://schemas.openxmlformats.org/drawingml/2006/main" xmlns="" val="2110749326"/>
+        <p14:creationId xmlns:p14="http://schemas.microsoft.com/office/powerpoint/2010/main" val="2110749326"/>
       </p:ext>
     </p:extLst>
   </p:cSld>
@@ -8428,7 +8434,7 @@
 </file>
 
 <file path=ppt/slides/slide16.xml><?xml version="1.0" encoding="utf-8"?>
-<p:sld xmlns:a="http://schemas.openxmlformats.org/drawingml/2006/main" xmlns:r="http://schemas.openxmlformats.org/officeDocument/2006/relationships" xmlns:mc="http://schemas.openxmlformats.org/markup-compatibility/2006" xmlns:mv="urn:schemas-microsoft-com:mac:vml" xmlns:p="http://schemas.openxmlformats.org/presentationml/2006/main" mc:Ignorable="mv" mc:PreserveAttributes="mv:*">
+<p:sld xmlns:a="http://schemas.openxmlformats.org/drawingml/2006/main" xmlns:r="http://schemas.openxmlformats.org/officeDocument/2006/relationships" xmlns:p="http://schemas.openxmlformats.org/presentationml/2006/main">
   <p:cSld>
     <p:spTree>
       <p:nvGrpSpPr>
@@ -8646,12 +8652,8 @@
               <a:t>= ["-a", </a:t>
             </a:r>
             <a:r>
-              <a:rPr lang="en-US" dirty="0" err="1"/>
-              <a:t>self.filename_a</a:t>
-            </a:r>
-            <a:r>
-              <a:rPr lang="en-US" dirty="0" smtClean="0"/>
-              <a:t>]</a:t>
+              <a:rPr lang="en-US" dirty="0" smtClean="0"/>
+              <a:t>"…filename…"]</a:t>
             </a:r>
             <a:endParaRPr lang="en-US" dirty="0"/>
           </a:p>
@@ -8783,7 +8785,7 @@
     </p:spTree>
     <p:extLst>
       <p:ext uri="{BB962C8B-B14F-4D97-AF65-F5344CB8AC3E}">
-        <p14:creationId xmlns:p14="http://schemas.microsoft.com/office/powerpoint/2010/main" xmlns:p="http://schemas.openxmlformats.org/presentationml/2006/main" xmlns:r="http://schemas.openxmlformats.org/officeDocument/2006/relationships" xmlns:a="http://schemas.openxmlformats.org/drawingml/2006/main" xmlns="" val="2059702227"/>
+        <p14:creationId xmlns:p14="http://schemas.microsoft.com/office/powerpoint/2010/main" val="2059702227"/>
       </p:ext>
     </p:extLst>
   </p:cSld>
@@ -8794,7 +8796,7 @@
 </file>
 
 <file path=ppt/slides/slide17.xml><?xml version="1.0" encoding="utf-8"?>
-<p:sld xmlns:a="http://schemas.openxmlformats.org/drawingml/2006/main" xmlns:r="http://schemas.openxmlformats.org/officeDocument/2006/relationships" xmlns:mc="http://schemas.openxmlformats.org/markup-compatibility/2006" xmlns:mv="urn:schemas-microsoft-com:mac:vml" xmlns:p="http://schemas.openxmlformats.org/presentationml/2006/main" mc:Ignorable="mv" mc:PreserveAttributes="mv:*">
+<p:sld xmlns:a="http://schemas.openxmlformats.org/drawingml/2006/main" xmlns:r="http://schemas.openxmlformats.org/officeDocument/2006/relationships" xmlns:p="http://schemas.openxmlformats.org/presentationml/2006/main">
   <p:cSld>
     <p:spTree>
       <p:nvGrpSpPr>
@@ -9093,7 +9095,7 @@
     </p:spTree>
     <p:extLst>
       <p:ext uri="{BB962C8B-B14F-4D97-AF65-F5344CB8AC3E}">
-        <p14:creationId xmlns:p14="http://schemas.microsoft.com/office/powerpoint/2010/main" xmlns:p="http://schemas.openxmlformats.org/presentationml/2006/main" xmlns:r="http://schemas.openxmlformats.org/officeDocument/2006/relationships" xmlns:a="http://schemas.openxmlformats.org/drawingml/2006/main" xmlns="" val="3522440758"/>
+        <p14:creationId xmlns:p14="http://schemas.microsoft.com/office/powerpoint/2010/main" val="3522440758"/>
       </p:ext>
     </p:extLst>
   </p:cSld>
@@ -9104,7 +9106,7 @@
 </file>
 
 <file path=ppt/slides/slide18.xml><?xml version="1.0" encoding="utf-8"?>
-<p:sld xmlns:a="http://schemas.openxmlformats.org/drawingml/2006/main" xmlns:r="http://schemas.openxmlformats.org/officeDocument/2006/relationships" xmlns:mc="http://schemas.openxmlformats.org/markup-compatibility/2006" xmlns:mv="urn:schemas-microsoft-com:mac:vml" xmlns:p="http://schemas.openxmlformats.org/presentationml/2006/main" mc:Ignorable="mv" mc:PreserveAttributes="mv:*">
+<p:sld xmlns:a="http://schemas.openxmlformats.org/drawingml/2006/main" xmlns:r="http://schemas.openxmlformats.org/officeDocument/2006/relationships" xmlns:p="http://schemas.openxmlformats.org/presentationml/2006/main">
   <p:cSld>
     <p:spTree>
       <p:nvGrpSpPr>
@@ -9395,7 +9397,7 @@
     </p:spTree>
     <p:extLst>
       <p:ext uri="{BB962C8B-B14F-4D97-AF65-F5344CB8AC3E}">
-        <p14:creationId xmlns:p14="http://schemas.microsoft.com/office/powerpoint/2010/main" xmlns:p="http://schemas.openxmlformats.org/presentationml/2006/main" xmlns:r="http://schemas.openxmlformats.org/officeDocument/2006/relationships" xmlns:a="http://schemas.openxmlformats.org/drawingml/2006/main" xmlns="" val="2253681799"/>
+        <p14:creationId xmlns:p14="http://schemas.microsoft.com/office/powerpoint/2010/main" val="2253681799"/>
       </p:ext>
     </p:extLst>
   </p:cSld>
@@ -9406,7 +9408,7 @@
 </file>
 
 <file path=ppt/slides/slide19.xml><?xml version="1.0" encoding="utf-8"?>
-<p:sld xmlns:a="http://schemas.openxmlformats.org/drawingml/2006/main" xmlns:r="http://schemas.openxmlformats.org/officeDocument/2006/relationships" xmlns:mc="http://schemas.openxmlformats.org/markup-compatibility/2006" xmlns:mv="urn:schemas-microsoft-com:mac:vml" xmlns:p="http://schemas.openxmlformats.org/presentationml/2006/main" mc:Ignorable="mv" mc:PreserveAttributes="mv:*">
+<p:sld xmlns:a="http://schemas.openxmlformats.org/drawingml/2006/main" xmlns:r="http://schemas.openxmlformats.org/officeDocument/2006/relationships" xmlns:p="http://schemas.openxmlformats.org/presentationml/2006/main">
   <p:cSld>
     <p:spTree>
       <p:nvGrpSpPr>
@@ -9672,7 +9674,7 @@
     </p:spTree>
     <p:extLst>
       <p:ext uri="{BB962C8B-B14F-4D97-AF65-F5344CB8AC3E}">
-        <p14:creationId xmlns:p14="http://schemas.microsoft.com/office/powerpoint/2010/main" xmlns:p="http://schemas.openxmlformats.org/presentationml/2006/main" xmlns:r="http://schemas.openxmlformats.org/officeDocument/2006/relationships" xmlns:a="http://schemas.openxmlformats.org/drawingml/2006/main" xmlns="" val="3368190089"/>
+        <p14:creationId xmlns:p14="http://schemas.microsoft.com/office/powerpoint/2010/main" val="3368190089"/>
       </p:ext>
     </p:extLst>
   </p:cSld>
@@ -9690,7 +9692,7 @@
 </file>
 
 <file path=ppt/slides/slide2.xml><?xml version="1.0" encoding="utf-8"?>
-<p:sld xmlns:a="http://schemas.openxmlformats.org/drawingml/2006/main" xmlns:r="http://schemas.openxmlformats.org/officeDocument/2006/relationships" xmlns:mc="http://schemas.openxmlformats.org/markup-compatibility/2006" xmlns:mv="urn:schemas-microsoft-com:mac:vml" xmlns:p="http://schemas.openxmlformats.org/presentationml/2006/main" mc:Ignorable="mv" mc:PreserveAttributes="mv:*">
+<p:sld xmlns:a="http://schemas.openxmlformats.org/drawingml/2006/main" xmlns:r="http://schemas.openxmlformats.org/officeDocument/2006/relationships" xmlns:p="http://schemas.openxmlformats.org/presentationml/2006/main">
   <p:cSld>
     <p:spTree>
       <p:nvGrpSpPr>
@@ -9861,7 +9863,7 @@
 </file>
 
 <file path=ppt/slides/slide20.xml><?xml version="1.0" encoding="utf-8"?>
-<p:sld xmlns:a="http://schemas.openxmlformats.org/drawingml/2006/main" xmlns:r="http://schemas.openxmlformats.org/officeDocument/2006/relationships" xmlns:mc="http://schemas.openxmlformats.org/markup-compatibility/2006" xmlns:mv="urn:schemas-microsoft-com:mac:vml" xmlns:p="http://schemas.openxmlformats.org/presentationml/2006/main" mc:Ignorable="mv" mc:PreserveAttributes="mv:*">
+<p:sld xmlns:a="http://schemas.openxmlformats.org/drawingml/2006/main" xmlns:r="http://schemas.openxmlformats.org/officeDocument/2006/relationships" xmlns:p="http://schemas.openxmlformats.org/presentationml/2006/main">
   <p:cSld>
     <p:spTree>
       <p:nvGrpSpPr>
@@ -9944,8 +9946,8 @@
             <a:pPr marL="0" indent="0">
               <a:buNone/>
               <a:tabLst>
-                <a:tab pos="914354" algn="l"/>
-                <a:tab pos="4120940" algn="l"/>
+                <a:tab pos="914400" algn="l"/>
+                <a:tab pos="4121150" algn="l"/>
               </a:tabLst>
             </a:pPr>
             <a:r>
@@ -10252,7 +10254,7 @@
     </p:spTree>
     <p:extLst>
       <p:ext uri="{BB962C8B-B14F-4D97-AF65-F5344CB8AC3E}">
-        <p14:creationId xmlns:p14="http://schemas.microsoft.com/office/powerpoint/2010/main" xmlns:p="http://schemas.openxmlformats.org/presentationml/2006/main" xmlns:r="http://schemas.openxmlformats.org/officeDocument/2006/relationships" xmlns:a="http://schemas.openxmlformats.org/drawingml/2006/main" xmlns="" val="2572922824"/>
+        <p14:creationId xmlns:p14="http://schemas.microsoft.com/office/powerpoint/2010/main" val="2572922824"/>
       </p:ext>
     </p:extLst>
   </p:cSld>
@@ -10270,7 +10272,7 @@
 </file>
 
 <file path=ppt/slides/slide21.xml><?xml version="1.0" encoding="utf-8"?>
-<p:sld xmlns:a="http://schemas.openxmlformats.org/drawingml/2006/main" xmlns:r="http://schemas.openxmlformats.org/officeDocument/2006/relationships" xmlns:mc="http://schemas.openxmlformats.org/markup-compatibility/2006" xmlns:mv="urn:schemas-microsoft-com:mac:vml" xmlns:p="http://schemas.openxmlformats.org/presentationml/2006/main" mc:Ignorable="mv" mc:PreserveAttributes="mv:*">
+<p:sld xmlns:a="http://schemas.openxmlformats.org/drawingml/2006/main" xmlns:r="http://schemas.openxmlformats.org/officeDocument/2006/relationships" xmlns:p="http://schemas.openxmlformats.org/presentationml/2006/main">
   <p:cSld>
     <p:spTree>
       <p:nvGrpSpPr>
@@ -10313,7 +10315,7 @@
             </a:r>
             <a:r>
               <a:rPr lang="en-US" dirty="0" smtClean="0"/>
-              <a:t>Job Package</a:t>
+              <a:t>Job Package #1</a:t>
             </a:r>
             <a:endParaRPr lang="en-US" dirty="0"/>
           </a:p>
@@ -10331,7 +10333,9 @@
         </p:nvSpPr>
         <p:spPr/>
         <p:txBody>
-          <a:bodyPr/>
+          <a:bodyPr>
+            <a:normAutofit lnSpcReduction="10000"/>
+          </a:bodyPr>
           <a:lstStyle/>
           <a:p>
             <a:r>
@@ -10340,10 +10344,270 @@
             </a:r>
           </a:p>
           <a:p>
-            <a:r>
-              <a:rPr lang="en-US" dirty="0" smtClean="0"/>
-              <a:t>FIXME</a:t>
-            </a:r>
+            <a:pPr marL="0" indent="0">
+              <a:buNone/>
+            </a:pPr>
+            <a:r>
+              <a:rPr lang="en-US" dirty="0" smtClean="0"/>
+              <a:t>saga::</a:t>
+            </a:r>
+            <a:r>
+              <a:rPr lang="en-US" dirty="0" err="1" smtClean="0"/>
+              <a:t>url</a:t>
+            </a:r>
+            <a:r>
+              <a:rPr lang="en-US" dirty="0"/>
+              <a:t> </a:t>
+            </a:r>
+            <a:r>
+              <a:rPr lang="en-US" dirty="0" err="1"/>
+              <a:t>js_url</a:t>
+            </a:r>
+            <a:r>
+              <a:rPr lang="en-US" dirty="0" smtClean="0"/>
+              <a:t>("</a:t>
+            </a:r>
+            <a:r>
+              <a:rPr lang="en-US" dirty="0"/>
+              <a:t>fork://</a:t>
+            </a:r>
+            <a:r>
+              <a:rPr lang="en-US" dirty="0" err="1"/>
+              <a:t>localhost</a:t>
+            </a:r>
+            <a:r>
+              <a:rPr lang="en-US" dirty="0" smtClean="0"/>
+              <a:t>/");</a:t>
+            </a:r>
+            <a:endParaRPr lang="en-US" dirty="0"/>
+          </a:p>
+          <a:p>
+            <a:pPr marL="0" indent="0">
+              <a:spcBef>
+                <a:spcPts val="0"/>
+              </a:spcBef>
+              <a:buNone/>
+            </a:pPr>
+            <a:r>
+              <a:rPr lang="en-US" dirty="0"/>
+              <a:t>s</a:t>
+            </a:r>
+            <a:r>
+              <a:rPr lang="en-US" dirty="0" smtClean="0"/>
+              <a:t>aga::job::service </a:t>
+            </a:r>
+            <a:r>
+              <a:rPr lang="en-US" dirty="0" err="1" smtClean="0"/>
+              <a:t>js</a:t>
+            </a:r>
+            <a:r>
+              <a:rPr lang="en-US" dirty="0" smtClean="0"/>
+              <a:t>(</a:t>
+            </a:r>
+            <a:r>
+              <a:rPr lang="en-US" dirty="0" err="1" smtClean="0"/>
+              <a:t>js_url</a:t>
+            </a:r>
+            <a:r>
+              <a:rPr lang="en-US" dirty="0" smtClean="0"/>
+              <a:t>);</a:t>
+            </a:r>
+            <a:endParaRPr lang="en-US" dirty="0"/>
+          </a:p>
+          <a:p>
+            <a:pPr marL="0" indent="0">
+              <a:spcBef>
+                <a:spcPts val="0"/>
+              </a:spcBef>
+              <a:buNone/>
+            </a:pPr>
+            <a:r>
+              <a:rPr lang="en-US" dirty="0" smtClean="0"/>
+              <a:t>saga::job::description </a:t>
+            </a:r>
+            <a:r>
+              <a:rPr lang="en-US" dirty="0" err="1" smtClean="0"/>
+              <a:t>jd</a:t>
+            </a:r>
+            <a:r>
+              <a:rPr lang="en-US" dirty="0" smtClean="0"/>
+              <a:t>;</a:t>
+            </a:r>
+            <a:endParaRPr lang="en-US" dirty="0"/>
+          </a:p>
+          <a:p>
+            <a:pPr marL="0" indent="0">
+              <a:spcBef>
+                <a:spcPts val="0"/>
+              </a:spcBef>
+              <a:buNone/>
+            </a:pPr>
+            <a:r>
+              <a:rPr lang="en-US" dirty="0" err="1" smtClean="0"/>
+              <a:t>js.set_attribute</a:t>
+            </a:r>
+            <a:r>
+              <a:rPr lang="en-US" dirty="0" smtClean="0"/>
+              <a:t>("executable", "touch");</a:t>
+            </a:r>
+          </a:p>
+          <a:p>
+            <a:pPr marL="0" indent="0">
+              <a:spcBef>
+                <a:spcPts val="0"/>
+              </a:spcBef>
+              <a:buNone/>
+            </a:pPr>
+            <a:endParaRPr lang="en-US" dirty="0" smtClean="0"/>
+          </a:p>
+          <a:p>
+            <a:pPr marL="0" indent="0">
+              <a:spcBef>
+                <a:spcPts val="0"/>
+              </a:spcBef>
+              <a:buNone/>
+            </a:pPr>
+            <a:r>
+              <a:rPr lang="en-US" dirty="0" err="1" smtClean="0"/>
+              <a:t>std</a:t>
+            </a:r>
+            <a:r>
+              <a:rPr lang="en-US" dirty="0" smtClean="0"/>
+              <a:t>::vector&lt;</a:t>
+            </a:r>
+            <a:r>
+              <a:rPr lang="en-US" dirty="0" err="1" smtClean="0"/>
+              <a:t>std</a:t>
+            </a:r>
+            <a:r>
+              <a:rPr lang="en-US" dirty="0" smtClean="0"/>
+              <a:t>::string&gt; </a:t>
+            </a:r>
+            <a:r>
+              <a:rPr lang="en-US" dirty="0" err="1" smtClean="0"/>
+              <a:t>args</a:t>
+            </a:r>
+            <a:r>
+              <a:rPr lang="en-US" dirty="0" smtClean="0"/>
+              <a:t>;</a:t>
+            </a:r>
+          </a:p>
+          <a:p>
+            <a:pPr marL="0" indent="0">
+              <a:spcBef>
+                <a:spcPts val="0"/>
+              </a:spcBef>
+              <a:buNone/>
+            </a:pPr>
+            <a:r>
+              <a:rPr lang="en-US" dirty="0" err="1" smtClean="0"/>
+              <a:t>args.push_back</a:t>
+            </a:r>
+            <a:r>
+              <a:rPr lang="en-US" dirty="0" smtClean="0"/>
+              <a:t>("-a");</a:t>
+            </a:r>
+          </a:p>
+          <a:p>
+            <a:pPr marL="0" indent="0">
+              <a:spcBef>
+                <a:spcPts val="0"/>
+              </a:spcBef>
+              <a:buNone/>
+            </a:pPr>
+            <a:r>
+              <a:rPr lang="en-US" dirty="0" err="1"/>
+              <a:t>args.push_back</a:t>
+            </a:r>
+            <a:r>
+              <a:rPr lang="en-US" dirty="0" smtClean="0"/>
+              <a:t>("...filename…");</a:t>
+            </a:r>
+            <a:endParaRPr lang="en-US" dirty="0"/>
+          </a:p>
+          <a:p>
+            <a:pPr marL="0" indent="0">
+              <a:spcBef>
+                <a:spcPts val="0"/>
+              </a:spcBef>
+              <a:buNone/>
+            </a:pPr>
+            <a:r>
+              <a:rPr lang="en-US" dirty="0" err="1" smtClean="0"/>
+              <a:t>js.set_vector_attribute</a:t>
+            </a:r>
+            <a:r>
+              <a:rPr lang="en-US" dirty="0" smtClean="0"/>
+              <a:t>("arguments", </a:t>
+            </a:r>
+            <a:r>
+              <a:rPr lang="en-US" dirty="0" err="1" smtClean="0"/>
+              <a:t>args</a:t>
+            </a:r>
+            <a:r>
+              <a:rPr lang="en-US" dirty="0" smtClean="0"/>
+              <a:t>);</a:t>
+            </a:r>
+            <a:endParaRPr lang="en-US" dirty="0"/>
+          </a:p>
+          <a:p>
+            <a:pPr marL="0" indent="0">
+              <a:spcBef>
+                <a:spcPts val="0"/>
+              </a:spcBef>
+              <a:buNone/>
+            </a:pPr>
+            <a:endParaRPr lang="en-US" dirty="0" smtClean="0"/>
+          </a:p>
+          <a:p>
+            <a:pPr marL="0" indent="0">
+              <a:spcBef>
+                <a:spcPts val="0"/>
+              </a:spcBef>
+              <a:buNone/>
+            </a:pPr>
+            <a:r>
+              <a:rPr lang="en-US" dirty="0" smtClean="0"/>
+              <a:t>saga::job::job j = </a:t>
+            </a:r>
+            <a:r>
+              <a:rPr lang="en-US" dirty="0" err="1" smtClean="0"/>
+              <a:t>js.create_job</a:t>
+            </a:r>
+            <a:r>
+              <a:rPr lang="en-US" dirty="0" smtClean="0"/>
+              <a:t>(</a:t>
+            </a:r>
+            <a:r>
+              <a:rPr lang="en-US" dirty="0" err="1" smtClean="0"/>
+              <a:t>jd</a:t>
+            </a:r>
+            <a:r>
+              <a:rPr lang="en-US" dirty="0" smtClean="0"/>
+              <a:t>);</a:t>
+            </a:r>
+            <a:endParaRPr lang="en-US" dirty="0"/>
+          </a:p>
+          <a:p>
+            <a:pPr marL="0" indent="0">
+              <a:spcBef>
+                <a:spcPts val="0"/>
+              </a:spcBef>
+              <a:buNone/>
+            </a:pPr>
+            <a:r>
+              <a:rPr lang="en-US" dirty="0" err="1"/>
+              <a:t>j</a:t>
+            </a:r>
+            <a:r>
+              <a:rPr lang="en-US" dirty="0" err="1" smtClean="0"/>
+              <a:t>.run</a:t>
+            </a:r>
+            <a:r>
+              <a:rPr lang="en-US" dirty="0" smtClean="0"/>
+              <a:t>();</a:t>
+            </a:r>
+            <a:endParaRPr lang="en-US" dirty="0"/>
           </a:p>
         </p:txBody>
       </p:sp>
@@ -10420,7 +10684,7 @@
     </p:spTree>
     <p:extLst>
       <p:ext uri="{BB962C8B-B14F-4D97-AF65-F5344CB8AC3E}">
-        <p14:creationId xmlns:p14="http://schemas.microsoft.com/office/powerpoint/2010/main" xmlns:p="http://schemas.openxmlformats.org/presentationml/2006/main" xmlns:r="http://schemas.openxmlformats.org/officeDocument/2006/relationships" xmlns:a="http://schemas.openxmlformats.org/drawingml/2006/main" xmlns="" val="1169737179"/>
+        <p14:creationId xmlns:p14="http://schemas.microsoft.com/office/powerpoint/2010/main" val="1169737179"/>
       </p:ext>
     </p:extLst>
   </p:cSld>
@@ -10431,7 +10695,7 @@
 </file>
 
 <file path=ppt/slides/slide22.xml><?xml version="1.0" encoding="utf-8"?>
-<p:sld xmlns:a="http://schemas.openxmlformats.org/drawingml/2006/main" xmlns:r="http://schemas.openxmlformats.org/officeDocument/2006/relationships" xmlns:mc="http://schemas.openxmlformats.org/markup-compatibility/2006" xmlns:mv="urn:schemas-microsoft-com:mac:vml" xmlns:p="http://schemas.openxmlformats.org/presentationml/2006/main" mc:Ignorable="mv" mc:PreserveAttributes="mv:*">
+<p:sld xmlns:a="http://schemas.openxmlformats.org/drawingml/2006/main" xmlns:r="http://schemas.openxmlformats.org/officeDocument/2006/relationships" xmlns:p="http://schemas.openxmlformats.org/presentationml/2006/main">
   <p:cSld>
     <p:spTree>
       <p:nvGrpSpPr>
@@ -10466,12 +10730,17 @@
           <a:p>
             <a:r>
               <a:rPr lang="en-US" dirty="0" smtClean="0"/>
-              <a:t>C++ API Example: </a:t>
+              <a:t>C++ API </a:t>
             </a:r>
             <a:r>
               <a:rPr lang="en-US" dirty="0"/>
-              <a:t>Advert Package</a:t>
-            </a:r>
+              <a:t>Example : </a:t>
+            </a:r>
+            <a:r>
+              <a:rPr lang="en-US" dirty="0" smtClean="0"/>
+              <a:t>Job Package #2</a:t>
+            </a:r>
+            <a:endParaRPr lang="en-US" dirty="0"/>
           </a:p>
         </p:txBody>
       </p:sp>
@@ -10487,13 +10756,266 @@
         </p:nvSpPr>
         <p:spPr/>
         <p:txBody>
-          <a:bodyPr/>
-          <a:lstStyle/>
-          <a:p>
+          <a:bodyPr>
+            <a:normAutofit/>
+          </a:bodyPr>
+          <a:lstStyle/>
+          <a:p>
+            <a:r>
+              <a:rPr lang="en-US" dirty="0" smtClean="0"/>
+              <a:t>Submit a job</a:t>
+            </a:r>
+          </a:p>
+          <a:p>
+            <a:pPr marL="0" indent="0">
+              <a:spcBef>
+                <a:spcPts val="2400"/>
+              </a:spcBef>
+              <a:buNone/>
+            </a:pPr>
+            <a:r>
+              <a:rPr lang="en-US" dirty="0" smtClean="0"/>
+              <a:t>saga</a:t>
+            </a:r>
             <a:r>
               <a:rPr lang="en-US" dirty="0"/>
-              <a:t>Create and modify an advert entry</a:t>
-            </a:r>
+              <a:t>::job::service </a:t>
+            </a:r>
+            <a:r>
+              <a:rPr lang="en-US" dirty="0" err="1" smtClean="0"/>
+              <a:t>js</a:t>
+            </a:r>
+            <a:r>
+              <a:rPr lang="en-US" dirty="0" smtClean="0"/>
+              <a:t>;</a:t>
+            </a:r>
+            <a:endParaRPr lang="en-US" dirty="0"/>
+          </a:p>
+          <a:p>
+            <a:pPr marL="0" indent="0">
+              <a:spcBef>
+                <a:spcPts val="0"/>
+              </a:spcBef>
+              <a:buNone/>
+            </a:pPr>
+            <a:r>
+              <a:rPr lang="en-US" dirty="0" smtClean="0"/>
+              <a:t>saga::job::</a:t>
+            </a:r>
+            <a:r>
+              <a:rPr lang="en-US" dirty="0" err="1" smtClean="0"/>
+              <a:t>ostream</a:t>
+            </a:r>
+            <a:r>
+              <a:rPr lang="en-US" dirty="0" smtClean="0"/>
+              <a:t> in;</a:t>
+            </a:r>
+          </a:p>
+          <a:p>
+            <a:pPr marL="0" indent="0">
+              <a:spcBef>
+                <a:spcPts val="0"/>
+              </a:spcBef>
+              <a:buNone/>
+            </a:pPr>
+            <a:r>
+              <a:rPr lang="en-US" dirty="0"/>
+              <a:t>saga::job</a:t>
+            </a:r>
+            <a:r>
+              <a:rPr lang="en-US" dirty="0" smtClean="0"/>
+              <a:t>::</a:t>
+            </a:r>
+            <a:r>
+              <a:rPr lang="en-US" dirty="0" err="1" smtClean="0"/>
+              <a:t>istream</a:t>
+            </a:r>
+            <a:r>
+              <a:rPr lang="en-US" dirty="0" smtClean="0"/>
+              <a:t> out, err;</a:t>
+            </a:r>
+            <a:endParaRPr lang="en-US" dirty="0"/>
+          </a:p>
+          <a:p>
+            <a:pPr marL="0" indent="0">
+              <a:spcBef>
+                <a:spcPts val="0"/>
+              </a:spcBef>
+              <a:buNone/>
+            </a:pPr>
+            <a:endParaRPr lang="en-US" dirty="0"/>
+          </a:p>
+          <a:p>
+            <a:pPr marL="0" indent="0">
+              <a:spcBef>
+                <a:spcPts val="0"/>
+              </a:spcBef>
+              <a:buNone/>
+            </a:pPr>
+            <a:r>
+              <a:rPr lang="en-US" dirty="0" smtClean="0"/>
+              <a:t>saga::job::job j = </a:t>
+            </a:r>
+            <a:r>
+              <a:rPr lang="en-US" dirty="0" err="1" smtClean="0"/>
+              <a:t>js.run_job</a:t>
+            </a:r>
+            <a:r>
+              <a:rPr lang="en-US" dirty="0" smtClean="0"/>
+              <a:t>(</a:t>
+            </a:r>
+            <a:endParaRPr lang="en-US" dirty="0"/>
+          </a:p>
+          <a:p>
+            <a:pPr marL="0" indent="0">
+              <a:spcBef>
+                <a:spcPts val="0"/>
+              </a:spcBef>
+              <a:buNone/>
+            </a:pPr>
+            <a:r>
+              <a:rPr lang="en-US" dirty="0"/>
+              <a:t> 	"/bin/echo -n HELLO </a:t>
+            </a:r>
+            <a:r>
+              <a:rPr lang="en-US" dirty="0" smtClean="0"/>
+              <a:t>SAGA", </a:t>
+            </a:r>
+            <a:r>
+              <a:rPr lang="en-US" dirty="0"/>
+              <a:t>"fork://</a:t>
+            </a:r>
+            <a:r>
+              <a:rPr lang="en-US" dirty="0" err="1"/>
+              <a:t>localhost</a:t>
+            </a:r>
+            <a:r>
+              <a:rPr lang="en-US" dirty="0" smtClean="0"/>
+              <a:t>/",</a:t>
+            </a:r>
+          </a:p>
+          <a:p>
+            <a:pPr marL="0" indent="0">
+              <a:spcBef>
+                <a:spcPts val="0"/>
+              </a:spcBef>
+              <a:buNone/>
+            </a:pPr>
+            <a:r>
+              <a:rPr lang="en-US" dirty="0" smtClean="0"/>
+              <a:t>	in, out, err);</a:t>
+            </a:r>
+          </a:p>
+          <a:p>
+            <a:pPr marL="0" indent="0">
+              <a:spcBef>
+                <a:spcPts val="0"/>
+              </a:spcBef>
+              <a:buNone/>
+            </a:pPr>
+            <a:endParaRPr lang="en-US" dirty="0"/>
+          </a:p>
+          <a:p>
+            <a:pPr marL="0" indent="0">
+              <a:spcBef>
+                <a:spcPts val="0"/>
+              </a:spcBef>
+              <a:buNone/>
+            </a:pPr>
+            <a:r>
+              <a:rPr lang="en-US" dirty="0" err="1"/>
+              <a:t>s</a:t>
+            </a:r>
+            <a:r>
+              <a:rPr lang="en-US" dirty="0" err="1" smtClean="0"/>
+              <a:t>td</a:t>
+            </a:r>
+            <a:r>
+              <a:rPr lang="en-US" dirty="0" smtClean="0"/>
+              <a:t>::string line;</a:t>
+            </a:r>
+          </a:p>
+          <a:p>
+            <a:pPr marL="0" indent="0">
+              <a:spcBef>
+                <a:spcPts val="0"/>
+              </a:spcBef>
+              <a:buNone/>
+            </a:pPr>
+            <a:r>
+              <a:rPr lang="en-US" dirty="0" smtClean="0"/>
+              <a:t>while (</a:t>
+            </a:r>
+            <a:r>
+              <a:rPr lang="en-US" dirty="0" err="1"/>
+              <a:t>std</a:t>
+            </a:r>
+            <a:r>
+              <a:rPr lang="en-US" dirty="0"/>
+              <a:t>::</a:t>
+            </a:r>
+            <a:r>
+              <a:rPr lang="en-US" dirty="0" err="1"/>
+              <a:t>getline</a:t>
+            </a:r>
+            <a:r>
+              <a:rPr lang="en-US" dirty="0"/>
+              <a:t>(line, out)</a:t>
+            </a:r>
+            <a:r>
+              <a:rPr lang="en-US" dirty="0" smtClean="0"/>
+              <a:t>) </a:t>
+            </a:r>
+          </a:p>
+          <a:p>
+            <a:pPr marL="0" indent="0">
+              <a:spcBef>
+                <a:spcPts val="0"/>
+              </a:spcBef>
+              <a:buNone/>
+            </a:pPr>
+            <a:r>
+              <a:rPr lang="en-US" dirty="0" smtClean="0"/>
+              <a:t>	</a:t>
+            </a:r>
+            <a:r>
+              <a:rPr lang="en-US" dirty="0" err="1" smtClean="0"/>
+              <a:t>std</a:t>
+            </a:r>
+            <a:r>
+              <a:rPr lang="en-US" dirty="0" smtClean="0"/>
+              <a:t>::</a:t>
+            </a:r>
+            <a:r>
+              <a:rPr lang="en-US" dirty="0" err="1" smtClean="0"/>
+              <a:t>cout</a:t>
+            </a:r>
+            <a:r>
+              <a:rPr lang="en-US" dirty="0" smtClean="0"/>
+              <a:t> &lt;&lt; out &lt;&lt; </a:t>
+            </a:r>
+            <a:r>
+              <a:rPr lang="en-US" dirty="0" err="1" smtClean="0"/>
+              <a:t>std</a:t>
+            </a:r>
+            <a:r>
+              <a:rPr lang="en-US" dirty="0" smtClean="0"/>
+              <a:t>::</a:t>
+            </a:r>
+            <a:r>
+              <a:rPr lang="en-US" dirty="0" err="1" smtClean="0"/>
+              <a:t>endl</a:t>
+            </a:r>
+            <a:r>
+              <a:rPr lang="en-US" dirty="0" smtClean="0"/>
+              <a:t>;</a:t>
+            </a:r>
+          </a:p>
+          <a:p>
+            <a:pPr marL="0" indent="0">
+              <a:buNone/>
+            </a:pPr>
+            <a:endParaRPr lang="en-US" dirty="0"/>
           </a:p>
         </p:txBody>
       </p:sp>
@@ -10570,7 +11092,7 @@
     </p:spTree>
     <p:extLst>
       <p:ext uri="{BB962C8B-B14F-4D97-AF65-F5344CB8AC3E}">
-        <p14:creationId xmlns:p14="http://schemas.microsoft.com/office/powerpoint/2010/main" xmlns:p="http://schemas.openxmlformats.org/presentationml/2006/main" xmlns:r="http://schemas.openxmlformats.org/officeDocument/2006/relationships" xmlns:a="http://schemas.openxmlformats.org/drawingml/2006/main" xmlns="" val="935873552"/>
+        <p14:creationId xmlns:p14="http://schemas.microsoft.com/office/powerpoint/2010/main" val="1188723698"/>
       </p:ext>
     </p:extLst>
   </p:cSld>
@@ -10581,7 +11103,7 @@
 </file>
 
 <file path=ppt/slides/slide23.xml><?xml version="1.0" encoding="utf-8"?>
-<p:sld xmlns:a="http://schemas.openxmlformats.org/drawingml/2006/main" xmlns:r="http://schemas.openxmlformats.org/officeDocument/2006/relationships" xmlns:mc="http://schemas.openxmlformats.org/markup-compatibility/2006" xmlns:mv="urn:schemas-microsoft-com:mac:vml" xmlns:p="http://schemas.openxmlformats.org/presentationml/2006/main" mc:Ignorable="mv" mc:PreserveAttributes="mv:*">
+<p:sld xmlns:a="http://schemas.openxmlformats.org/drawingml/2006/main" xmlns:r="http://schemas.openxmlformats.org/officeDocument/2006/relationships" xmlns:p="http://schemas.openxmlformats.org/presentationml/2006/main">
   <p:cSld>
     <p:spTree>
       <p:nvGrpSpPr>
@@ -10609,6 +11131,330 @@
         </p:nvSpPr>
         <p:spPr/>
         <p:txBody>
+          <a:bodyPr>
+            <a:normAutofit/>
+          </a:bodyPr>
+          <a:lstStyle/>
+          <a:p>
+            <a:r>
+              <a:rPr lang="en-US" dirty="0" smtClean="0"/>
+              <a:t>C++ API Example: </a:t>
+            </a:r>
+            <a:r>
+              <a:rPr lang="en-US" dirty="0"/>
+              <a:t>Advert Package</a:t>
+            </a:r>
+          </a:p>
+        </p:txBody>
+      </p:sp>
+      <p:sp>
+        <p:nvSpPr>
+          <p:cNvPr id="3" name="Content Placeholder 2"/>
+          <p:cNvSpPr>
+            <a:spLocks noGrp="1"/>
+          </p:cNvSpPr>
+          <p:nvPr>
+            <p:ph idx="1"/>
+          </p:nvPr>
+        </p:nvSpPr>
+        <p:spPr/>
+        <p:txBody>
+          <a:bodyPr/>
+          <a:lstStyle/>
+          <a:p>
+            <a:r>
+              <a:rPr lang="en-US" dirty="0"/>
+              <a:t>Create and modify an advert </a:t>
+            </a:r>
+            <a:r>
+              <a:rPr lang="en-US" dirty="0" smtClean="0"/>
+              <a:t>entry</a:t>
+            </a:r>
+          </a:p>
+          <a:p>
+            <a:pPr marL="0" indent="0">
+              <a:buNone/>
+            </a:pPr>
+            <a:r>
+              <a:rPr lang="en-US" dirty="0" smtClean="0"/>
+              <a:t>// </a:t>
+            </a:r>
+            <a:r>
+              <a:rPr lang="en-US" dirty="0"/>
+              <a:t>host A</a:t>
+            </a:r>
+            <a:br>
+              <a:rPr lang="en-US" dirty="0"/>
+            </a:br>
+            <a:r>
+              <a:rPr lang="en-US" dirty="0" smtClean="0"/>
+              <a:t>saga::</a:t>
+            </a:r>
+            <a:r>
+              <a:rPr lang="en-US" dirty="0" err="1" smtClean="0"/>
+              <a:t>url</a:t>
+            </a:r>
+            <a:r>
+              <a:rPr lang="en-US" dirty="0" smtClean="0"/>
+              <a:t> name </a:t>
+            </a:r>
+            <a:r>
+              <a:rPr lang="en-US" dirty="0"/>
+              <a:t>= </a:t>
+            </a:r>
+            <a:r>
+              <a:rPr lang="en-US" dirty="0" err="1"/>
+              <a:t>url</a:t>
+            </a:r>
+            <a:r>
+              <a:rPr lang="en-US" dirty="0"/>
+              <a:t>(' … ')</a:t>
+            </a:r>
+            <a:br>
+              <a:rPr lang="en-US" dirty="0"/>
+            </a:br>
+            <a:r>
+              <a:rPr lang="en-US" dirty="0" smtClean="0"/>
+              <a:t>saga::advert::entry e(name, </a:t>
+            </a:r>
+            <a:br>
+              <a:rPr lang="en-US" dirty="0" smtClean="0"/>
+            </a:br>
+            <a:r>
+              <a:rPr lang="en-US" dirty="0" smtClean="0"/>
+              <a:t>	</a:t>
+            </a:r>
+            <a:r>
+              <a:rPr lang="en-US" dirty="0" err="1" smtClean="0"/>
+              <a:t>advert.ReadWrite|advert.Create</a:t>
+            </a:r>
+            <a:r>
+              <a:rPr lang="en-US" dirty="0"/>
+              <a:t>)</a:t>
+            </a:r>
+            <a:br>
+              <a:rPr lang="en-US" dirty="0"/>
+            </a:br>
+            <a:r>
+              <a:rPr lang="en-US" dirty="0" err="1" smtClean="0"/>
+              <a:t>e.set_attribute</a:t>
+            </a:r>
+            <a:r>
+              <a:rPr lang="en-US" dirty="0" smtClean="0"/>
+              <a:t>("started", " </a:t>
+            </a:r>
+            <a:r>
+              <a:rPr lang="en-US" dirty="0"/>
+              <a:t>… </a:t>
+            </a:r>
+            <a:r>
+              <a:rPr lang="en-US" dirty="0" smtClean="0"/>
+              <a:t>" </a:t>
+            </a:r>
+            <a:r>
+              <a:rPr lang="en-US" dirty="0"/>
+              <a:t>)</a:t>
+            </a:r>
+          </a:p>
+          <a:p>
+            <a:pPr marL="0" indent="0">
+              <a:buNone/>
+            </a:pPr>
+            <a:r>
+              <a:rPr lang="en-US" dirty="0" smtClean="0"/>
+              <a:t>// </a:t>
+            </a:r>
+            <a:r>
+              <a:rPr lang="en-US" dirty="0"/>
+              <a:t>host B</a:t>
+            </a:r>
+            <a:br>
+              <a:rPr lang="en-US" dirty="0"/>
+            </a:br>
+            <a:r>
+              <a:rPr lang="en-US" dirty="0"/>
+              <a:t>saga::</a:t>
+            </a:r>
+            <a:r>
+              <a:rPr lang="en-US" dirty="0" err="1"/>
+              <a:t>url</a:t>
+            </a:r>
+            <a:r>
+              <a:rPr lang="en-US" dirty="0"/>
+              <a:t> name = </a:t>
+            </a:r>
+            <a:r>
+              <a:rPr lang="en-US" dirty="0" err="1"/>
+              <a:t>url</a:t>
+            </a:r>
+            <a:r>
+              <a:rPr lang="en-US" dirty="0"/>
+              <a:t>(' … ')</a:t>
+            </a:r>
+            <a:br>
+              <a:rPr lang="en-US" dirty="0"/>
+            </a:br>
+            <a:r>
+              <a:rPr lang="en-US" dirty="0"/>
+              <a:t>saga::advert::entry e(name, </a:t>
+            </a:r>
+            <a:r>
+              <a:rPr lang="en-US" dirty="0" err="1" smtClean="0"/>
+              <a:t>advert.Read</a:t>
+            </a:r>
+            <a:r>
+              <a:rPr lang="en-US" dirty="0" smtClean="0"/>
+              <a:t>)</a:t>
+            </a:r>
+            <a:r>
+              <a:rPr lang="en-US" dirty="0"/>
+              <a:t/>
+            </a:r>
+            <a:br>
+              <a:rPr lang="en-US" dirty="0"/>
+            </a:br>
+            <a:r>
+              <a:rPr lang="en-US" dirty="0" err="1" smtClean="0"/>
+              <a:t>std</a:t>
+            </a:r>
+            <a:r>
+              <a:rPr lang="en-US" dirty="0" smtClean="0"/>
+              <a:t>::string started </a:t>
+            </a:r>
+            <a:r>
+              <a:rPr lang="en-US" dirty="0"/>
+              <a:t>= </a:t>
+            </a:r>
+            <a:r>
+              <a:rPr lang="en-US" dirty="0" err="1" smtClean="0"/>
+              <a:t>e.get_attribute</a:t>
+            </a:r>
+            <a:r>
+              <a:rPr lang="en-US" dirty="0" smtClean="0"/>
+              <a:t>("started")</a:t>
+            </a:r>
+            <a:endParaRPr lang="en-US" dirty="0"/>
+          </a:p>
+          <a:p>
+            <a:pPr marL="0" indent="0">
+              <a:buNone/>
+            </a:pPr>
+            <a:endParaRPr lang="en-US" dirty="0"/>
+          </a:p>
+        </p:txBody>
+      </p:sp>
+      <p:sp>
+        <p:nvSpPr>
+          <p:cNvPr id="4" name="Date Placeholder 3"/>
+          <p:cNvSpPr>
+            <a:spLocks noGrp="1"/>
+          </p:cNvSpPr>
+          <p:nvPr>
+            <p:ph type="dt" sz="half" idx="10"/>
+          </p:nvPr>
+        </p:nvSpPr>
+        <p:spPr/>
+        <p:txBody>
+          <a:bodyPr/>
+          <a:lstStyle/>
+          <a:p>
+            <a:r>
+              <a:rPr lang="en-US" smtClean="0"/>
+              <a:t>November 29th, 2010</a:t>
+            </a:r>
+            <a:endParaRPr lang="en-US" dirty="0"/>
+          </a:p>
+        </p:txBody>
+      </p:sp>
+      <p:sp>
+        <p:nvSpPr>
+          <p:cNvPr id="6" name="Slide Number Placeholder 5"/>
+          <p:cNvSpPr>
+            <a:spLocks noGrp="1"/>
+          </p:cNvSpPr>
+          <p:nvPr>
+            <p:ph type="sldNum" sz="quarter" idx="11"/>
+          </p:nvPr>
+        </p:nvSpPr>
+        <p:spPr/>
+        <p:txBody>
+          <a:bodyPr/>
+          <a:lstStyle/>
+          <a:p>
+            <a:fld id="{7A426C1A-D210-4B4B-86AA-6AEDDDCCF5FF}" type="slidenum">
+              <a:rPr lang="en-US" smtClean="0"/>
+              <a:pPr/>
+              <a:t>23</a:t>
+            </a:fld>
+            <a:endParaRPr lang="en-US"/>
+          </a:p>
+        </p:txBody>
+      </p:sp>
+      <p:sp>
+        <p:nvSpPr>
+          <p:cNvPr id="5" name="Footer Placeholder 4"/>
+          <p:cNvSpPr>
+            <a:spLocks noGrp="1"/>
+          </p:cNvSpPr>
+          <p:nvPr>
+            <p:ph type="ftr" sz="quarter" idx="12"/>
+          </p:nvPr>
+        </p:nvSpPr>
+        <p:spPr/>
+        <p:txBody>
+          <a:bodyPr/>
+          <a:lstStyle/>
+          <a:p>
+            <a:r>
+              <a:rPr lang="en-US" smtClean="0"/>
+              <a:t>TeraGrid SAGA Tutorial</a:t>
+            </a:r>
+            <a:endParaRPr lang="en-US" dirty="0"/>
+          </a:p>
+        </p:txBody>
+      </p:sp>
+    </p:spTree>
+    <p:extLst>
+      <p:ext uri="{BB962C8B-B14F-4D97-AF65-F5344CB8AC3E}">
+        <p14:creationId xmlns:p14="http://schemas.microsoft.com/office/powerpoint/2010/main" val="935873552"/>
+      </p:ext>
+    </p:extLst>
+  </p:cSld>
+  <p:clrMapOvr>
+    <a:masterClrMapping/>
+  </p:clrMapOvr>
+</p:sld>
+</file>
+
+<file path=ppt/slides/slide24.xml><?xml version="1.0" encoding="utf-8"?>
+<p:sld xmlns:a="http://schemas.openxmlformats.org/drawingml/2006/main" xmlns:r="http://schemas.openxmlformats.org/officeDocument/2006/relationships" xmlns:p="http://schemas.openxmlformats.org/presentationml/2006/main">
+  <p:cSld>
+    <p:spTree>
+      <p:nvGrpSpPr>
+        <p:cNvPr id="1" name=""/>
+        <p:cNvGrpSpPr/>
+        <p:nvPr/>
+      </p:nvGrpSpPr>
+      <p:grpSpPr>
+        <a:xfrm>
+          <a:off x="0" y="0"/>
+          <a:ext cx="0" cy="0"/>
+          <a:chOff x="0" y="0"/>
+          <a:chExt cx="0" cy="0"/>
+        </a:xfrm>
+      </p:grpSpPr>
+      <p:sp>
+        <p:nvSpPr>
+          <p:cNvPr id="2" name="Title 1"/>
+          <p:cNvSpPr>
+            <a:spLocks noGrp="1"/>
+          </p:cNvSpPr>
+          <p:nvPr>
+            <p:ph type="title"/>
+          </p:nvPr>
+        </p:nvSpPr>
+        <p:spPr/>
+        <p:txBody>
           <a:bodyPr/>
           <a:lstStyle/>
           <a:p>
@@ -10640,7 +11486,7 @@
               <a:rPr lang="en-US" sz="4000" dirty="0" smtClean="0"/>
               <a:t>Set of very small and easy examples, one for each package/paradigm</a:t>
             </a:r>
-            <a:endParaRPr lang="en-US" sz="9500" dirty="0" smtClean="0"/>
+            <a:endParaRPr lang="en-US" sz="9600" dirty="0" smtClean="0"/>
           </a:p>
           <a:p>
             <a:pPr lvl="1" fontAlgn="ctr"/>
@@ -10741,7 +11587,7 @@
             <a:fld id="{7A426C1A-D210-4B4B-86AA-6AEDDDCCF5FF}" type="slidenum">
               <a:rPr lang="en-US" smtClean="0"/>
               <a:pPr/>
-              <a:t>23</a:t>
+              <a:t>24</a:t>
             </a:fld>
             <a:endParaRPr lang="en-US"/>
           </a:p>
@@ -10785,8 +11631,8 @@
 </p:sld>
 </file>
 
-<file path=ppt/slides/slide24.xml><?xml version="1.0" encoding="utf-8"?>
-<p:sld xmlns:a="http://schemas.openxmlformats.org/drawingml/2006/main" xmlns:r="http://schemas.openxmlformats.org/officeDocument/2006/relationships" xmlns:mc="http://schemas.openxmlformats.org/markup-compatibility/2006" xmlns:mv="urn:schemas-microsoft-com:mac:vml" xmlns:p="http://schemas.openxmlformats.org/presentationml/2006/main" mc:Ignorable="mv" mc:PreserveAttributes="mv:*">
+<file path=ppt/slides/slide25.xml><?xml version="1.0" encoding="utf-8"?>
+<p:sld xmlns:a="http://schemas.openxmlformats.org/drawingml/2006/main" xmlns:r="http://schemas.openxmlformats.org/officeDocument/2006/relationships" xmlns:p="http://schemas.openxmlformats.org/presentationml/2006/main">
   <p:cSld>
     <p:spTree>
       <p:nvGrpSpPr>
@@ -10859,7 +11705,7 @@
               <a:rPr lang="en-US" sz="4000" dirty="0" smtClean="0"/>
               <a:t>Hello world</a:t>
             </a:r>
-            <a:endParaRPr lang="en-US" sz="9500" dirty="0" smtClean="0"/>
+            <a:endParaRPr lang="en-US" sz="9600" dirty="0" smtClean="0"/>
           </a:p>
           <a:p>
             <a:pPr lvl="1" fontAlgn="ctr"/>
@@ -10930,296 +11776,6 @@
               <a:t>As soon as result is collected it's printed on local console</a:t>
             </a:r>
             <a:endParaRPr lang="en-US" sz="8800" dirty="0" smtClean="0"/>
-          </a:p>
-        </p:txBody>
-      </p:sp>
-      <p:sp>
-        <p:nvSpPr>
-          <p:cNvPr id="5" name="Date Placeholder 4"/>
-          <p:cNvSpPr>
-            <a:spLocks noGrp="1"/>
-          </p:cNvSpPr>
-          <p:nvPr>
-            <p:ph type="dt" sz="half" idx="10"/>
-          </p:nvPr>
-        </p:nvSpPr>
-        <p:spPr/>
-        <p:txBody>
-          <a:bodyPr/>
-          <a:lstStyle/>
-          <a:p>
-            <a:r>
-              <a:rPr lang="en-US" smtClean="0"/>
-              <a:t>November 29th, 2010</a:t>
-            </a:r>
-            <a:endParaRPr lang="en-US" dirty="0"/>
-          </a:p>
-        </p:txBody>
-      </p:sp>
-      <p:sp>
-        <p:nvSpPr>
-          <p:cNvPr id="6" name="Slide Number Placeholder 5"/>
-          <p:cNvSpPr>
-            <a:spLocks noGrp="1"/>
-          </p:cNvSpPr>
-          <p:nvPr>
-            <p:ph type="sldNum" sz="quarter" idx="11"/>
-          </p:nvPr>
-        </p:nvSpPr>
-        <p:spPr/>
-        <p:txBody>
-          <a:bodyPr/>
-          <a:lstStyle/>
-          <a:p>
-            <a:fld id="{7A426C1A-D210-4B4B-86AA-6AEDDDCCF5FF}" type="slidenum">
-              <a:rPr lang="en-US" smtClean="0"/>
-              <a:pPr/>
-              <a:t>24</a:t>
-            </a:fld>
-            <a:endParaRPr lang="en-US"/>
-          </a:p>
-        </p:txBody>
-      </p:sp>
-      <p:sp>
-        <p:nvSpPr>
-          <p:cNvPr id="7" name="Footer Placeholder 6"/>
-          <p:cNvSpPr>
-            <a:spLocks noGrp="1"/>
-          </p:cNvSpPr>
-          <p:nvPr>
-            <p:ph type="ftr" sz="quarter" idx="12"/>
-          </p:nvPr>
-        </p:nvSpPr>
-        <p:spPr/>
-        <p:txBody>
-          <a:bodyPr/>
-          <a:lstStyle/>
-          <a:p>
-            <a:r>
-              <a:rPr lang="en-US" smtClean="0"/>
-              <a:t>TeraGrid SAGA Tutorial</a:t>
-            </a:r>
-            <a:endParaRPr lang="en-US" dirty="0"/>
-          </a:p>
-        </p:txBody>
-      </p:sp>
-    </p:spTree>
-  </p:cSld>
-  <p:clrMapOvr>
-    <a:masterClrMapping/>
-  </p:clrMapOvr>
-  <p:transition/>
-  <p:timing>
-    <p:tnLst>
-      <p:par>
-        <p:cTn id="1" dur="indefinite" restart="never" nodeType="tmRoot"/>
-      </p:par>
-    </p:tnLst>
-  </p:timing>
-</p:sld>
-</file>
-
-<file path=ppt/slides/slide25.xml><?xml version="1.0" encoding="utf-8"?>
-<p:sld xmlns:a="http://schemas.openxmlformats.org/drawingml/2006/main" xmlns:r="http://schemas.openxmlformats.org/officeDocument/2006/relationships" xmlns:mc="http://schemas.openxmlformats.org/markup-compatibility/2006" xmlns:mv="urn:schemas-microsoft-com:mac:vml" xmlns:p="http://schemas.openxmlformats.org/presentationml/2006/main" mc:Ignorable="mv" mc:PreserveAttributes="mv:*">
-  <p:cSld>
-    <p:spTree>
-      <p:nvGrpSpPr>
-        <p:cNvPr id="1" name=""/>
-        <p:cNvGrpSpPr/>
-        <p:nvPr/>
-      </p:nvGrpSpPr>
-      <p:grpSpPr>
-        <a:xfrm>
-          <a:off x="0" y="0"/>
-          <a:ext cx="0" cy="0"/>
-          <a:chOff x="0" y="0"/>
-          <a:chExt cx="0" cy="0"/>
-        </a:xfrm>
-      </p:grpSpPr>
-      <p:sp>
-        <p:nvSpPr>
-          <p:cNvPr id="29697" name="Rectangle 1"/>
-          <p:cNvSpPr>
-            <a:spLocks noGrp="1" noChangeArrowheads="1"/>
-          </p:cNvSpPr>
-          <p:nvPr>
-            <p:ph type="title"/>
-          </p:nvPr>
-        </p:nvSpPr>
-        <p:spPr>
-          <a:ln/>
-        </p:spPr>
-        <p:txBody>
-          <a:bodyPr/>
-          <a:lstStyle/>
-          <a:p>
-            <a:r>
-              <a:rPr lang="en-US" dirty="0" smtClean="0"/>
-              <a:t>Example </a:t>
-            </a:r>
-            <a:r>
-              <a:rPr lang="en-US" dirty="0"/>
-              <a:t>1: </a:t>
-            </a:r>
-            <a:r>
-              <a:rPr lang="en-US" dirty="0" err="1"/>
-              <a:t>hello_world</a:t>
-            </a:r>
-            <a:endParaRPr lang="en-US" dirty="0"/>
-          </a:p>
-        </p:txBody>
-      </p:sp>
-      <p:sp>
-        <p:nvSpPr>
-          <p:cNvPr id="29698" name="Rectangle 2"/>
-          <p:cNvSpPr>
-            <a:spLocks noGrp="1" noChangeArrowheads="1"/>
-          </p:cNvSpPr>
-          <p:nvPr>
-            <p:ph idx="1"/>
-          </p:nvPr>
-        </p:nvSpPr>
-        <p:spPr>
-          <a:ln/>
-        </p:spPr>
-        <p:txBody>
-          <a:bodyPr>
-            <a:normAutofit fontScale="92500" lnSpcReduction="10000"/>
-          </a:bodyPr>
-          <a:lstStyle/>
-          <a:p>
-            <a:pPr fontAlgn="ctr"/>
-            <a:r>
-              <a:rPr lang="en-US" sz="4000" dirty="0" smtClean="0"/>
-              <a:t>Hello world</a:t>
-            </a:r>
-            <a:endParaRPr lang="en-US" sz="9500" dirty="0" smtClean="0"/>
-          </a:p>
-          <a:p>
-            <a:pPr lvl="1" fontAlgn="ctr"/>
-            <a:r>
-              <a:rPr lang="en-US" sz="3600" dirty="0" smtClean="0"/>
-              <a:t>Arbitrary sequence of results</a:t>
-            </a:r>
-            <a:endParaRPr lang="en-US" sz="8800" dirty="0" smtClean="0"/>
-          </a:p>
-          <a:p>
-            <a:pPr lvl="2" fontAlgn="ctr"/>
-            <a:r>
-              <a:rPr lang="en-US" dirty="0" smtClean="0"/>
-              <a:t>Optimally: "Hello distributed world!"</a:t>
-            </a:r>
-            <a:endParaRPr lang="en-US" sz="6000" dirty="0" smtClean="0"/>
-          </a:p>
-          <a:p>
-            <a:pPr lvl="1" fontAlgn="ctr"/>
-            <a:r>
-              <a:rPr lang="en-US" sz="3600" dirty="0" smtClean="0"/>
-              <a:t>Demonstrates</a:t>
-            </a:r>
-            <a:endParaRPr lang="en-US" sz="8800" dirty="0" smtClean="0"/>
-          </a:p>
-          <a:p>
-            <a:pPr lvl="2" fontAlgn="ctr"/>
-            <a:r>
-              <a:rPr lang="en-US" dirty="0" smtClean="0"/>
-              <a:t>How to launch a remote job using SAGA </a:t>
-            </a:r>
-            <a:r>
-              <a:rPr lang="en-US" dirty="0" err="1" smtClean="0"/>
-              <a:t>job_service</a:t>
-            </a:r>
-            <a:endParaRPr lang="en-US" sz="6000" dirty="0" smtClean="0"/>
-          </a:p>
-          <a:p>
-            <a:pPr lvl="2" fontAlgn="ctr"/>
-            <a:r>
-              <a:rPr lang="en-US" dirty="0" smtClean="0"/>
-              <a:t>Pass arguments using the command line</a:t>
-            </a:r>
-            <a:endParaRPr lang="en-US" sz="6000" dirty="0" smtClean="0"/>
-          </a:p>
-          <a:p>
-            <a:pPr lvl="2" fontAlgn="ctr"/>
-            <a:r>
-              <a:rPr lang="en-US" dirty="0" smtClean="0"/>
-              <a:t>Collect result by output redirection</a:t>
-            </a:r>
-            <a:endParaRPr lang="en-US" sz="6000" dirty="0" smtClean="0"/>
-          </a:p>
-          <a:p>
-            <a:r>
-              <a:rPr lang="en-US" dirty="0" smtClean="0"/>
-              <a:t>The source code can be found here (see ‘Example1’):</a:t>
-            </a:r>
-          </a:p>
-          <a:p>
-            <a:pPr lvl="1"/>
-            <a:r>
-              <a:rPr lang="en-US" dirty="0" smtClean="0"/>
-              <a:t>http://faust.cct.lsu.edu/trac/saga/wiki/		</a:t>
-            </a:r>
-            <a:r>
-              <a:rPr lang="en-US" dirty="0" smtClean="0">
-                <a:solidFill>
-                  <a:srgbClr val="FF0000"/>
-                </a:solidFill>
-              </a:rPr>
-              <a:t>FIXME</a:t>
-            </a:r>
-            <a:endParaRPr lang="en-US" dirty="0" smtClean="0">
-              <a:solidFill>
-                <a:srgbClr val="FF0000"/>
-              </a:solidFill>
-              <a:hlinkClick r:id="rId2"/>
-            </a:endParaRPr>
-          </a:p>
-          <a:p>
-            <a:pPr lvl="1" fontAlgn="ctr"/>
-            <a:r>
-              <a:rPr lang="en-US" sz="2800" dirty="0"/>
-              <a:t>The example uses </a:t>
-            </a:r>
-            <a:r>
-              <a:rPr lang="en-US" sz="2800" dirty="0" err="1"/>
-              <a:t>localhost</a:t>
-            </a:r>
-            <a:r>
-              <a:rPr lang="en-US" sz="2800" dirty="0"/>
-              <a:t> to spawn </a:t>
-            </a:r>
-            <a:r>
-              <a:rPr lang="en-US" sz="2800" dirty="0" err="1"/>
-              <a:t>childs</a:t>
-            </a:r>
-            <a:endParaRPr lang="en-US" sz="2800" dirty="0"/>
-          </a:p>
-          <a:p>
-            <a:pPr lvl="1" fontAlgn="ctr"/>
-            <a:r>
-              <a:rPr lang="en-US" dirty="0" smtClean="0"/>
-              <a:t>For remote execution change HOST1, HOST2, HOST3 from "</a:t>
-            </a:r>
-            <a:r>
-              <a:rPr lang="en-US" dirty="0" err="1" smtClean="0"/>
-              <a:t>localhost</a:t>
-            </a:r>
-            <a:r>
-              <a:rPr lang="en-US" dirty="0" smtClean="0"/>
-              <a:t>" to "</a:t>
-            </a:r>
-            <a:r>
-              <a:rPr lang="en-US" dirty="0" smtClean="0">
-                <a:solidFill>
-                  <a:srgbClr val="FF0000"/>
-                </a:solidFill>
-              </a:rPr>
-              <a:t>FIXME</a:t>
-            </a:r>
-            <a:r>
-              <a:rPr lang="en-US" dirty="0" smtClean="0"/>
-              <a:t>"</a:t>
-            </a:r>
           </a:p>
         </p:txBody>
       </p:sp>
@@ -11286,12 +11842,8 @@
           <a:lstStyle/>
           <a:p>
             <a:r>
-              <a:rPr lang="en-US" dirty="0" err="1" smtClean="0"/>
-              <a:t>TeraGrid</a:t>
-            </a:r>
-            <a:r>
-              <a:rPr lang="en-US" dirty="0" smtClean="0"/>
-              <a:t> SAGA Tutorial</a:t>
+              <a:rPr lang="en-US" smtClean="0"/>
+              <a:t>TeraGrid SAGA Tutorial</a:t>
             </a:r>
             <a:endParaRPr lang="en-US" dirty="0"/>
           </a:p>
@@ -11314,7 +11866,7 @@
 </file>
 
 <file path=ppt/slides/slide26.xml><?xml version="1.0" encoding="utf-8"?>
-<p:sld xmlns:a="http://schemas.openxmlformats.org/drawingml/2006/main" xmlns:r="http://schemas.openxmlformats.org/officeDocument/2006/relationships" xmlns:mc="http://schemas.openxmlformats.org/markup-compatibility/2006" xmlns:mv="urn:schemas-microsoft-com:mac:vml" xmlns:p="http://schemas.openxmlformats.org/presentationml/2006/main" mc:Ignorable="mv" mc:PreserveAttributes="mv:*">
+<p:sld xmlns:a="http://schemas.openxmlformats.org/drawingml/2006/main" xmlns:r="http://schemas.openxmlformats.org/officeDocument/2006/relationships" xmlns:p="http://schemas.openxmlformats.org/presentationml/2006/main">
   <p:cSld>
     <p:spTree>
       <p:nvGrpSpPr>
@@ -11332,154 +11884,194 @@
       </p:grpSpPr>
       <p:sp>
         <p:nvSpPr>
-          <p:cNvPr id="2" name="Title 1"/>
-          <p:cNvSpPr>
-            <a:spLocks noGrp="1"/>
+          <p:cNvPr id="29697" name="Rectangle 1"/>
+          <p:cNvSpPr>
+            <a:spLocks noGrp="1" noChangeArrowheads="1"/>
           </p:cNvSpPr>
           <p:nvPr>
             <p:ph type="title"/>
           </p:nvPr>
         </p:nvSpPr>
-        <p:spPr/>
+        <p:spPr>
+          <a:ln/>
+        </p:spPr>
         <p:txBody>
           <a:bodyPr/>
           <a:lstStyle/>
           <a:p>
             <a:r>
               <a:rPr lang="en-US" dirty="0" smtClean="0"/>
-              <a:t>Example 2: </a:t>
+              <a:t>Example </a:t>
+            </a:r>
+            <a:r>
+              <a:rPr lang="en-US" dirty="0"/>
+              <a:t>1: </a:t>
+            </a:r>
+            <a:r>
+              <a:rPr lang="en-US" dirty="0" err="1"/>
+              <a:t>hello_world</a:t>
+            </a:r>
+            <a:endParaRPr lang="en-US" dirty="0"/>
+          </a:p>
+        </p:txBody>
+      </p:sp>
+      <p:sp>
+        <p:nvSpPr>
+          <p:cNvPr id="29698" name="Rectangle 2"/>
+          <p:cNvSpPr>
+            <a:spLocks noGrp="1" noChangeArrowheads="1"/>
+          </p:cNvSpPr>
+          <p:nvPr>
+            <p:ph idx="1"/>
+          </p:nvPr>
+        </p:nvSpPr>
+        <p:spPr>
+          <a:ln/>
+        </p:spPr>
+        <p:txBody>
+          <a:bodyPr>
+            <a:normAutofit fontScale="92500" lnSpcReduction="10000"/>
+          </a:bodyPr>
+          <a:lstStyle/>
+          <a:p>
+            <a:pPr fontAlgn="ctr"/>
+            <a:r>
+              <a:rPr lang="en-US" sz="4000" dirty="0" smtClean="0"/>
+              <a:t>Hello world</a:t>
+            </a:r>
+            <a:endParaRPr lang="en-US" sz="9600" dirty="0" smtClean="0"/>
+          </a:p>
+          <a:p>
+            <a:pPr lvl="1" fontAlgn="ctr"/>
+            <a:r>
+              <a:rPr lang="en-US" sz="3600" dirty="0" smtClean="0"/>
+              <a:t>Arbitrary sequence of results</a:t>
+            </a:r>
+            <a:endParaRPr lang="en-US" sz="8800" dirty="0" smtClean="0"/>
+          </a:p>
+          <a:p>
+            <a:pPr lvl="2" fontAlgn="ctr"/>
+            <a:r>
+              <a:rPr lang="en-US" dirty="0" smtClean="0"/>
+              <a:t>Optimally: "Hello distributed world!"</a:t>
+            </a:r>
+            <a:endParaRPr lang="en-US" sz="6000" dirty="0" smtClean="0"/>
+          </a:p>
+          <a:p>
+            <a:pPr lvl="1" fontAlgn="ctr"/>
+            <a:r>
+              <a:rPr lang="en-US" sz="3600" dirty="0" smtClean="0"/>
+              <a:t>Demonstrates</a:t>
+            </a:r>
+            <a:endParaRPr lang="en-US" sz="8800" dirty="0" smtClean="0"/>
+          </a:p>
+          <a:p>
+            <a:pPr lvl="2" fontAlgn="ctr"/>
+            <a:r>
+              <a:rPr lang="en-US" dirty="0" smtClean="0"/>
+              <a:t>How to launch a remote job using SAGA </a:t>
             </a:r>
             <a:r>
               <a:rPr lang="en-US" dirty="0" err="1" smtClean="0"/>
-              <a:t>chaining_jobs</a:t>
-            </a:r>
-            <a:endParaRPr lang="en-US" dirty="0"/>
-          </a:p>
-        </p:txBody>
-      </p:sp>
-      <p:sp>
-        <p:nvSpPr>
-          <p:cNvPr id="3" name="Content Placeholder 2"/>
-          <p:cNvSpPr>
-            <a:spLocks noGrp="1"/>
-          </p:cNvSpPr>
-          <p:nvPr>
-            <p:ph idx="1"/>
-          </p:nvPr>
-        </p:nvSpPr>
-        <p:spPr/>
-        <p:txBody>
-          <a:bodyPr>
-            <a:normAutofit fontScale="77500" lnSpcReduction="20000"/>
-          </a:bodyPr>
-          <a:lstStyle/>
-          <a:p>
-            <a:pPr fontAlgn="ctr"/>
-            <a:r>
-              <a:rPr lang="en-US" sz="4000" dirty="0" smtClean="0"/>
-              <a:t>Launch 3 jobs on 3 different machines</a:t>
-            </a:r>
-            <a:endParaRPr lang="en-US" sz="9500" dirty="0" smtClean="0"/>
-          </a:p>
-          <a:p>
-            <a:pPr fontAlgn="ctr"/>
-            <a:r>
-              <a:rPr lang="en-US" sz="4000" dirty="0" smtClean="0"/>
-              <a:t>Output of previous job is needed to launch next job</a:t>
-            </a:r>
-            <a:endParaRPr lang="en-US" sz="9500" dirty="0" smtClean="0"/>
-          </a:p>
-          <a:p>
-            <a:pPr fontAlgn="ctr"/>
-            <a:r>
-              <a:rPr lang="en-US" sz="4000" dirty="0" smtClean="0"/>
-              <a:t>Simple sequential execution, but SAGA style</a:t>
-            </a:r>
-            <a:endParaRPr lang="en-US" sz="9500" dirty="0" smtClean="0"/>
-          </a:p>
-          <a:p>
-            <a:pPr fontAlgn="ctr"/>
-            <a:r>
-              <a:rPr lang="en-US" sz="4000" dirty="0" smtClean="0"/>
-              <a:t>Demonstrates</a:t>
-            </a:r>
-            <a:endParaRPr lang="en-US" sz="9500" dirty="0" smtClean="0"/>
+              <a:t>job_service</a:t>
+            </a:r>
+            <a:endParaRPr lang="en-US" sz="6000" dirty="0" smtClean="0"/>
+          </a:p>
+          <a:p>
+            <a:pPr lvl="2" fontAlgn="ctr"/>
+            <a:r>
+              <a:rPr lang="en-US" dirty="0" smtClean="0"/>
+              <a:t>Pass arguments using the command line</a:t>
+            </a:r>
+            <a:endParaRPr lang="en-US" sz="6000" dirty="0" smtClean="0"/>
+          </a:p>
+          <a:p>
+            <a:pPr lvl="2" fontAlgn="ctr"/>
+            <a:r>
+              <a:rPr lang="en-US" dirty="0" smtClean="0"/>
+              <a:t>Collect result by output redirection</a:t>
+            </a:r>
+            <a:endParaRPr lang="en-US" sz="6000" dirty="0" smtClean="0"/>
+          </a:p>
+          <a:p>
+            <a:r>
+              <a:rPr lang="en-US" dirty="0" smtClean="0"/>
+              <a:t>The source code can be found here (see ‘Example1’):</a:t>
+            </a:r>
+          </a:p>
+          <a:p>
+            <a:pPr lvl="1"/>
+            <a:r>
+              <a:rPr lang="en-US" dirty="0" smtClean="0"/>
+              <a:t>http://faust.cct.lsu.edu/trac/saga/wiki/		</a:t>
+            </a:r>
+            <a:r>
+              <a:rPr lang="en-US" dirty="0" smtClean="0">
+                <a:solidFill>
+                  <a:srgbClr val="FF0000"/>
+                </a:solidFill>
+              </a:rPr>
+              <a:t>FIXME</a:t>
+            </a:r>
+            <a:endParaRPr lang="en-US" dirty="0" smtClean="0">
+              <a:solidFill>
+                <a:srgbClr val="FF0000"/>
+              </a:solidFill>
+              <a:hlinkClick r:id="rId2"/>
+            </a:endParaRPr>
           </a:p>
           <a:p>
             <a:pPr lvl="1" fontAlgn="ctr"/>
             <a:r>
-              <a:rPr lang="en-US" sz="3600" dirty="0" smtClean="0"/>
-              <a:t>How to launch a job using SAGA </a:t>
-            </a:r>
-            <a:r>
-              <a:rPr lang="en-US" sz="3600" dirty="0" err="1" smtClean="0"/>
-              <a:t>job_service</a:t>
-            </a:r>
-            <a:endParaRPr lang="en-US" sz="8800" dirty="0" smtClean="0"/>
+              <a:rPr lang="en-US" sz="2800" dirty="0"/>
+              <a:t>The example uses </a:t>
+            </a:r>
+            <a:r>
+              <a:rPr lang="en-US" sz="2800" dirty="0" err="1"/>
+              <a:t>localhost</a:t>
+            </a:r>
+            <a:r>
+              <a:rPr lang="en-US" sz="2800" dirty="0"/>
+              <a:t> to spawn </a:t>
+            </a:r>
+            <a:r>
+              <a:rPr lang="en-US" sz="2800" dirty="0" err="1"/>
+              <a:t>childs</a:t>
+            </a:r>
+            <a:endParaRPr lang="en-US" sz="2800" dirty="0"/>
           </a:p>
           <a:p>
             <a:pPr lvl="1" fontAlgn="ctr"/>
             <a:r>
-              <a:rPr lang="en-US" sz="3600" dirty="0" smtClean="0"/>
-              <a:t>How to feed input to launched job</a:t>
-            </a:r>
-            <a:endParaRPr lang="en-US" sz="8800" dirty="0" smtClean="0"/>
-          </a:p>
-          <a:p>
-            <a:pPr lvl="1" fontAlgn="ctr"/>
-            <a:r>
-              <a:rPr lang="en-US" sz="3600" dirty="0" smtClean="0"/>
-              <a:t>How to collect output</a:t>
-            </a:r>
-            <a:endParaRPr lang="en-US" sz="8800" dirty="0" smtClean="0"/>
-          </a:p>
-          <a:p>
-            <a:pPr fontAlgn="ctr"/>
-            <a:r>
-              <a:rPr lang="en-US" sz="4000" dirty="0" smtClean="0"/>
-              <a:t>Launched job: /</a:t>
-            </a:r>
-            <a:r>
-              <a:rPr lang="en-US" sz="4000" dirty="0" err="1" smtClean="0"/>
-              <a:t>usr</a:t>
-            </a:r>
-            <a:r>
-              <a:rPr lang="en-US" sz="4000" dirty="0" smtClean="0"/>
-              <a:t>/bin/</a:t>
-            </a:r>
-            <a:r>
-              <a:rPr lang="en-US" sz="4000" dirty="0" err="1" smtClean="0"/>
-              <a:t>bc</a:t>
-            </a:r>
-            <a:r>
-              <a:rPr lang="en-US" sz="4000" dirty="0" smtClean="0"/>
-              <a:t> </a:t>
-            </a:r>
-          </a:p>
-          <a:p>
-            <a:pPr fontAlgn="ctr"/>
-            <a:r>
-              <a:rPr lang="de-DE" sz="3600" dirty="0" smtClean="0"/>
-              <a:t>Increment the number passed as the argument</a:t>
-            </a:r>
-            <a:endParaRPr lang="de-DE" sz="8800" dirty="0" smtClean="0"/>
-          </a:p>
-          <a:p>
-            <a:pPr lvl="1" fontAlgn="ctr"/>
-            <a:r>
-              <a:rPr lang="de-DE" sz="3600" dirty="0" smtClean="0"/>
-              <a:t>Pass returned incremented number to next job</a:t>
-            </a:r>
-            <a:endParaRPr lang="de-DE" sz="8800" dirty="0" smtClean="0"/>
-          </a:p>
-          <a:p>
-            <a:endParaRPr lang="en-US" dirty="0"/>
-          </a:p>
-        </p:txBody>
-      </p:sp>
-      <p:sp>
-        <p:nvSpPr>
-          <p:cNvPr id="4" name="Date Placeholder 3"/>
+              <a:rPr lang="en-US" dirty="0" smtClean="0"/>
+              <a:t>For remote execution change HOST1, HOST2, HOST3 from "</a:t>
+            </a:r>
+            <a:r>
+              <a:rPr lang="en-US" dirty="0" err="1" smtClean="0"/>
+              <a:t>localhost</a:t>
+            </a:r>
+            <a:r>
+              <a:rPr lang="en-US" dirty="0" smtClean="0"/>
+              <a:t>" to "</a:t>
+            </a:r>
+            <a:r>
+              <a:rPr lang="en-US" dirty="0" smtClean="0">
+                <a:solidFill>
+                  <a:srgbClr val="FF0000"/>
+                </a:solidFill>
+              </a:rPr>
+              <a:t>FIXME</a:t>
+            </a:r>
+            <a:r>
+              <a:rPr lang="en-US" dirty="0" smtClean="0"/>
+              <a:t>"</a:t>
+            </a:r>
+          </a:p>
+        </p:txBody>
+      </p:sp>
+      <p:sp>
+        <p:nvSpPr>
+          <p:cNvPr id="5" name="Date Placeholder 4"/>
           <p:cNvSpPr>
             <a:spLocks noGrp="1"/>
           </p:cNvSpPr>
@@ -11526,7 +12118,7 @@
       </p:sp>
       <p:sp>
         <p:nvSpPr>
-          <p:cNvPr id="5" name="Footer Placeholder 4"/>
+          <p:cNvPr id="7" name="Footer Placeholder 6"/>
           <p:cNvSpPr>
             <a:spLocks noGrp="1"/>
           </p:cNvSpPr>
@@ -11540,8 +12132,12 @@
           <a:lstStyle/>
           <a:p>
             <a:r>
-              <a:rPr lang="en-US" smtClean="0"/>
-              <a:t>TeraGrid SAGA Tutorial</a:t>
+              <a:rPr lang="en-US" dirty="0" err="1" smtClean="0"/>
+              <a:t>TeraGrid</a:t>
+            </a:r>
+            <a:r>
+              <a:rPr lang="en-US" dirty="0" smtClean="0"/>
+              <a:t> SAGA Tutorial</a:t>
             </a:r>
             <a:endParaRPr lang="en-US" dirty="0"/>
           </a:p>
@@ -11552,11 +12148,19 @@
   <p:clrMapOvr>
     <a:masterClrMapping/>
   </p:clrMapOvr>
+  <p:transition/>
+  <p:timing>
+    <p:tnLst>
+      <p:par>
+        <p:cTn id="1" dur="indefinite" restart="never" nodeType="tmRoot"/>
+      </p:par>
+    </p:tnLst>
+  </p:timing>
 </p:sld>
 </file>
 
 <file path=ppt/slides/slide27.xml><?xml version="1.0" encoding="utf-8"?>
-<p:sld xmlns:a="http://schemas.openxmlformats.org/drawingml/2006/main" xmlns:r="http://schemas.openxmlformats.org/officeDocument/2006/relationships" xmlns:mc="http://schemas.openxmlformats.org/markup-compatibility/2006" xmlns:mv="urn:schemas-microsoft-com:mac:vml" xmlns:p="http://schemas.openxmlformats.org/presentationml/2006/main" mc:Ignorable="mv" mc:PreserveAttributes="mv:*">
+<p:sld xmlns:a="http://schemas.openxmlformats.org/drawingml/2006/main" xmlns:r="http://schemas.openxmlformats.org/officeDocument/2006/relationships" xmlns:p="http://schemas.openxmlformats.org/presentationml/2006/main">
   <p:cSld>
     <p:spTree>
       <p:nvGrpSpPr>
@@ -11589,11 +12193,11 @@
           <a:p>
             <a:r>
               <a:rPr lang="en-US" dirty="0" smtClean="0"/>
-              <a:t>Example 3: </a:t>
+              <a:t>Example 2: </a:t>
             </a:r>
             <a:r>
               <a:rPr lang="en-US" dirty="0" err="1" smtClean="0"/>
-              <a:t>depending_jobs</a:t>
+              <a:t>chaining_jobs</a:t>
             </a:r>
             <a:endParaRPr lang="en-US" dirty="0"/>
           </a:p>
@@ -11612,79 +12216,107 @@
         <p:spPr/>
         <p:txBody>
           <a:bodyPr>
-            <a:normAutofit fontScale="70000" lnSpcReduction="20000"/>
+            <a:normAutofit fontScale="77500" lnSpcReduction="20000"/>
           </a:bodyPr>
           <a:lstStyle/>
           <a:p>
             <a:pPr fontAlgn="ctr"/>
             <a:r>
-              <a:rPr lang="de-DE" sz="4000" dirty="0" smtClean="0"/>
-              <a:t>Coordinating information from advert service</a:t>
-            </a:r>
+              <a:rPr lang="en-US" sz="4000" dirty="0" smtClean="0"/>
+              <a:t>Launch 3 jobs on 3 different machines</a:t>
+            </a:r>
+            <a:endParaRPr lang="en-US" sz="9600" dirty="0" smtClean="0"/>
           </a:p>
           <a:p>
             <a:pPr fontAlgn="ctr"/>
             <a:r>
-              <a:rPr lang="de-DE" sz="4000" dirty="0" smtClean="0"/>
-              <a:t>Launch a single job sequentially on a set of remote resources</a:t>
-            </a:r>
-            <a:endParaRPr lang="de-DE" sz="9500" dirty="0" smtClean="0"/>
+              <a:rPr lang="en-US" sz="4000" dirty="0" smtClean="0"/>
+              <a:t>Output of previous job is needed to launch next job</a:t>
+            </a:r>
+            <a:endParaRPr lang="en-US" sz="9600" dirty="0" smtClean="0"/>
+          </a:p>
+          <a:p>
+            <a:pPr fontAlgn="ctr"/>
+            <a:r>
+              <a:rPr lang="en-US" sz="4000" dirty="0" smtClean="0"/>
+              <a:t>Simple sequential execution, but SAGA style</a:t>
+            </a:r>
+            <a:endParaRPr lang="en-US" sz="9600" dirty="0" smtClean="0"/>
+          </a:p>
+          <a:p>
+            <a:pPr fontAlgn="ctr"/>
+            <a:r>
+              <a:rPr lang="en-US" sz="4000" dirty="0" smtClean="0"/>
+              <a:t>Demonstrates</a:t>
+            </a:r>
+            <a:endParaRPr lang="en-US" sz="9600" dirty="0" smtClean="0"/>
           </a:p>
           <a:p>
             <a:pPr lvl="1" fontAlgn="ctr"/>
             <a:r>
+              <a:rPr lang="en-US" sz="3600" dirty="0" smtClean="0"/>
+              <a:t>How to launch a job using SAGA </a:t>
+            </a:r>
+            <a:r>
+              <a:rPr lang="en-US" sz="3600" dirty="0" err="1" smtClean="0"/>
+              <a:t>job_service</a:t>
+            </a:r>
+            <a:endParaRPr lang="en-US" sz="8800" dirty="0" smtClean="0"/>
+          </a:p>
+          <a:p>
+            <a:pPr lvl="1" fontAlgn="ctr"/>
+            <a:r>
+              <a:rPr lang="en-US" sz="3600" dirty="0" smtClean="0"/>
+              <a:t>How to feed input to launched job</a:t>
+            </a:r>
+            <a:endParaRPr lang="en-US" sz="8800" dirty="0" smtClean="0"/>
+          </a:p>
+          <a:p>
+            <a:pPr lvl="1" fontAlgn="ctr"/>
+            <a:r>
+              <a:rPr lang="en-US" sz="3600" dirty="0" smtClean="0"/>
+              <a:t>How to collect output</a:t>
+            </a:r>
+            <a:endParaRPr lang="en-US" sz="8800" dirty="0" smtClean="0"/>
+          </a:p>
+          <a:p>
+            <a:pPr fontAlgn="ctr"/>
+            <a:r>
+              <a:rPr lang="en-US" sz="4000" dirty="0" smtClean="0"/>
+              <a:t>Launched job: /</a:t>
+            </a:r>
+            <a:r>
+              <a:rPr lang="en-US" sz="4000" dirty="0" err="1" smtClean="0"/>
+              <a:t>usr</a:t>
+            </a:r>
+            <a:r>
+              <a:rPr lang="en-US" sz="4000" dirty="0" smtClean="0"/>
+              <a:t>/bin/</a:t>
+            </a:r>
+            <a:r>
+              <a:rPr lang="en-US" sz="4000" dirty="0" err="1" smtClean="0"/>
+              <a:t>bc</a:t>
+            </a:r>
+            <a:r>
+              <a:rPr lang="en-US" sz="4000" dirty="0" smtClean="0"/>
+              <a:t> </a:t>
+            </a:r>
+          </a:p>
+          <a:p>
+            <a:pPr fontAlgn="ctr"/>
+            <a:r>
               <a:rPr lang="de-DE" sz="3600" dirty="0" smtClean="0"/>
-              <a:t>Simulating checkpointing/relaunching on different resource (migration)</a:t>
+              <a:t>Increment the number passed as the argument</a:t>
             </a:r>
             <a:endParaRPr lang="de-DE" sz="8800" dirty="0" smtClean="0"/>
           </a:p>
           <a:p>
-            <a:pPr fontAlgn="ctr"/>
-            <a:r>
-              <a:rPr lang="de-DE" sz="4000" dirty="0" smtClean="0"/>
-              <a:t>Maintain a single result value in advert service</a:t>
-            </a:r>
-            <a:endParaRPr lang="de-DE" sz="9500" dirty="0" smtClean="0"/>
-          </a:p>
-          <a:p>
             <a:pPr lvl="1" fontAlgn="ctr"/>
             <a:r>
               <a:rPr lang="de-DE" sz="3600" dirty="0" smtClean="0"/>
-              <a:t>Gets written by one job, and read by the next</a:t>
+              <a:t>Pass returned incremented number to next job</a:t>
             </a:r>
             <a:endParaRPr lang="de-DE" sz="8800" dirty="0" smtClean="0"/>
-          </a:p>
-          <a:p>
-            <a:pPr fontAlgn="ctr"/>
-            <a:r>
-              <a:rPr lang="de-DE" sz="4000" dirty="0" smtClean="0"/>
-              <a:t>Demonstrates </a:t>
-            </a:r>
-            <a:endParaRPr lang="de-DE" sz="9500" dirty="0" smtClean="0"/>
-          </a:p>
-          <a:p>
-            <a:pPr lvl="1" fontAlgn="ctr"/>
-            <a:r>
-              <a:rPr lang="de-DE" sz="3600" dirty="0" smtClean="0"/>
-              <a:t>How to launch remote job using SAGA job, while maintaining environment</a:t>
-            </a:r>
-            <a:endParaRPr lang="de-DE" sz="8800" dirty="0" smtClean="0"/>
-          </a:p>
-          <a:p>
-            <a:pPr lvl="1" fontAlgn="ctr"/>
-            <a:r>
-              <a:rPr lang="de-DE" sz="3600" dirty="0" smtClean="0"/>
-              <a:t>Assembling argument lists</a:t>
-            </a:r>
-            <a:endParaRPr lang="de-DE" sz="8800" dirty="0" smtClean="0"/>
-          </a:p>
-          <a:p>
-            <a:pPr fontAlgn="ctr"/>
-            <a:r>
-              <a:rPr lang="de-DE" sz="4000" dirty="0" smtClean="0"/>
-              <a:t>Result is left in advert service, but accessed afterwards</a:t>
-            </a:r>
-            <a:endParaRPr lang="de-DE" sz="9500" dirty="0" smtClean="0"/>
           </a:p>
           <a:p>
             <a:endParaRPr lang="en-US" dirty="0"/>
@@ -11769,8 +12401,8 @@
 </p:sld>
 </file>
 
-<file path=ppt/slides/slide3.xml><?xml version="1.0" encoding="utf-8"?>
-<p:sld xmlns:a="http://schemas.openxmlformats.org/drawingml/2006/main" xmlns:r="http://schemas.openxmlformats.org/officeDocument/2006/relationships" xmlns:mc="http://schemas.openxmlformats.org/markup-compatibility/2006" xmlns:mv="urn:schemas-microsoft-com:mac:vml" xmlns:p="http://schemas.openxmlformats.org/presentationml/2006/main" mc:Ignorable="mv" mc:PreserveAttributes="mv:*">
+<file path=ppt/slides/slide28.xml><?xml version="1.0" encoding="utf-8"?>
+<p:sld xmlns:a="http://schemas.openxmlformats.org/drawingml/2006/main" xmlns:r="http://schemas.openxmlformats.org/officeDocument/2006/relationships" xmlns:p="http://schemas.openxmlformats.org/presentationml/2006/main">
   <p:cSld>
     <p:spTree>
       <p:nvGrpSpPr>
@@ -11788,6 +12420,220 @@
       </p:grpSpPr>
       <p:sp>
         <p:nvSpPr>
+          <p:cNvPr id="2" name="Title 1"/>
+          <p:cNvSpPr>
+            <a:spLocks noGrp="1"/>
+          </p:cNvSpPr>
+          <p:nvPr>
+            <p:ph type="title"/>
+          </p:nvPr>
+        </p:nvSpPr>
+        <p:spPr/>
+        <p:txBody>
+          <a:bodyPr/>
+          <a:lstStyle/>
+          <a:p>
+            <a:r>
+              <a:rPr lang="en-US" dirty="0" smtClean="0"/>
+              <a:t>Example 3: </a:t>
+            </a:r>
+            <a:r>
+              <a:rPr lang="en-US" dirty="0" err="1" smtClean="0"/>
+              <a:t>depending_jobs</a:t>
+            </a:r>
+            <a:endParaRPr lang="en-US" dirty="0"/>
+          </a:p>
+        </p:txBody>
+      </p:sp>
+      <p:sp>
+        <p:nvSpPr>
+          <p:cNvPr id="3" name="Content Placeholder 2"/>
+          <p:cNvSpPr>
+            <a:spLocks noGrp="1"/>
+          </p:cNvSpPr>
+          <p:nvPr>
+            <p:ph idx="1"/>
+          </p:nvPr>
+        </p:nvSpPr>
+        <p:spPr/>
+        <p:txBody>
+          <a:bodyPr>
+            <a:normAutofit fontScale="70000" lnSpcReduction="20000"/>
+          </a:bodyPr>
+          <a:lstStyle/>
+          <a:p>
+            <a:pPr fontAlgn="ctr"/>
+            <a:r>
+              <a:rPr lang="de-DE" sz="4000" dirty="0" smtClean="0"/>
+              <a:t>Coordinating information from advert service</a:t>
+            </a:r>
+          </a:p>
+          <a:p>
+            <a:pPr fontAlgn="ctr"/>
+            <a:r>
+              <a:rPr lang="de-DE" sz="4000" dirty="0" smtClean="0"/>
+              <a:t>Launch a single job sequentially on a set of remote resources</a:t>
+            </a:r>
+            <a:endParaRPr lang="de-DE" sz="9600" dirty="0" smtClean="0"/>
+          </a:p>
+          <a:p>
+            <a:pPr lvl="1" fontAlgn="ctr"/>
+            <a:r>
+              <a:rPr lang="de-DE" sz="3600" dirty="0" smtClean="0"/>
+              <a:t>Simulating checkpointing/relaunching on different resource (migration)</a:t>
+            </a:r>
+            <a:endParaRPr lang="de-DE" sz="8800" dirty="0" smtClean="0"/>
+          </a:p>
+          <a:p>
+            <a:pPr fontAlgn="ctr"/>
+            <a:r>
+              <a:rPr lang="de-DE" sz="4000" dirty="0" smtClean="0"/>
+              <a:t>Maintain a single result value in advert service</a:t>
+            </a:r>
+            <a:endParaRPr lang="de-DE" sz="9600" dirty="0" smtClean="0"/>
+          </a:p>
+          <a:p>
+            <a:pPr lvl="1" fontAlgn="ctr"/>
+            <a:r>
+              <a:rPr lang="de-DE" sz="3600" dirty="0" smtClean="0"/>
+              <a:t>Gets written by one job, and read by the next</a:t>
+            </a:r>
+            <a:endParaRPr lang="de-DE" sz="8800" dirty="0" smtClean="0"/>
+          </a:p>
+          <a:p>
+            <a:pPr fontAlgn="ctr"/>
+            <a:r>
+              <a:rPr lang="de-DE" sz="4000" dirty="0" smtClean="0"/>
+              <a:t>Demonstrates </a:t>
+            </a:r>
+            <a:endParaRPr lang="de-DE" sz="9600" dirty="0" smtClean="0"/>
+          </a:p>
+          <a:p>
+            <a:pPr lvl="1" fontAlgn="ctr"/>
+            <a:r>
+              <a:rPr lang="de-DE" sz="3600" dirty="0" smtClean="0"/>
+              <a:t>How to launch remote job using SAGA job, while maintaining environment</a:t>
+            </a:r>
+            <a:endParaRPr lang="de-DE" sz="8800" dirty="0" smtClean="0"/>
+          </a:p>
+          <a:p>
+            <a:pPr lvl="1" fontAlgn="ctr"/>
+            <a:r>
+              <a:rPr lang="de-DE" sz="3600" dirty="0" smtClean="0"/>
+              <a:t>Assembling argument lists</a:t>
+            </a:r>
+            <a:endParaRPr lang="de-DE" sz="8800" dirty="0" smtClean="0"/>
+          </a:p>
+          <a:p>
+            <a:pPr fontAlgn="ctr"/>
+            <a:r>
+              <a:rPr lang="de-DE" sz="4000" dirty="0" smtClean="0"/>
+              <a:t>Result is left in advert service, but accessed afterwards</a:t>
+            </a:r>
+            <a:endParaRPr lang="de-DE" sz="9600" dirty="0" smtClean="0"/>
+          </a:p>
+          <a:p>
+            <a:endParaRPr lang="en-US" dirty="0"/>
+          </a:p>
+        </p:txBody>
+      </p:sp>
+      <p:sp>
+        <p:nvSpPr>
+          <p:cNvPr id="4" name="Date Placeholder 3"/>
+          <p:cNvSpPr>
+            <a:spLocks noGrp="1"/>
+          </p:cNvSpPr>
+          <p:nvPr>
+            <p:ph type="dt" sz="half" idx="10"/>
+          </p:nvPr>
+        </p:nvSpPr>
+        <p:spPr/>
+        <p:txBody>
+          <a:bodyPr/>
+          <a:lstStyle/>
+          <a:p>
+            <a:r>
+              <a:rPr lang="en-US" smtClean="0"/>
+              <a:t>November 29th, 2010</a:t>
+            </a:r>
+            <a:endParaRPr lang="en-US" dirty="0"/>
+          </a:p>
+        </p:txBody>
+      </p:sp>
+      <p:sp>
+        <p:nvSpPr>
+          <p:cNvPr id="6" name="Slide Number Placeholder 5"/>
+          <p:cNvSpPr>
+            <a:spLocks noGrp="1"/>
+          </p:cNvSpPr>
+          <p:nvPr>
+            <p:ph type="sldNum" sz="quarter" idx="11"/>
+          </p:nvPr>
+        </p:nvSpPr>
+        <p:spPr/>
+        <p:txBody>
+          <a:bodyPr/>
+          <a:lstStyle/>
+          <a:p>
+            <a:fld id="{7A426C1A-D210-4B4B-86AA-6AEDDDCCF5FF}" type="slidenum">
+              <a:rPr lang="en-US" smtClean="0"/>
+              <a:pPr/>
+              <a:t>28</a:t>
+            </a:fld>
+            <a:endParaRPr lang="en-US"/>
+          </a:p>
+        </p:txBody>
+      </p:sp>
+      <p:sp>
+        <p:nvSpPr>
+          <p:cNvPr id="5" name="Footer Placeholder 4"/>
+          <p:cNvSpPr>
+            <a:spLocks noGrp="1"/>
+          </p:cNvSpPr>
+          <p:nvPr>
+            <p:ph type="ftr" sz="quarter" idx="12"/>
+          </p:nvPr>
+        </p:nvSpPr>
+        <p:spPr/>
+        <p:txBody>
+          <a:bodyPr/>
+          <a:lstStyle/>
+          <a:p>
+            <a:r>
+              <a:rPr lang="en-US" smtClean="0"/>
+              <a:t>TeraGrid SAGA Tutorial</a:t>
+            </a:r>
+            <a:endParaRPr lang="en-US" dirty="0"/>
+          </a:p>
+        </p:txBody>
+      </p:sp>
+    </p:spTree>
+  </p:cSld>
+  <p:clrMapOvr>
+    <a:masterClrMapping/>
+  </p:clrMapOvr>
+</p:sld>
+</file>
+
+<file path=ppt/slides/slide3.xml><?xml version="1.0" encoding="utf-8"?>
+<p:sld xmlns:a="http://schemas.openxmlformats.org/drawingml/2006/main" xmlns:r="http://schemas.openxmlformats.org/officeDocument/2006/relationships" xmlns:p="http://schemas.openxmlformats.org/presentationml/2006/main">
+  <p:cSld>
+    <p:spTree>
+      <p:nvGrpSpPr>
+        <p:cNvPr id="1" name=""/>
+        <p:cNvGrpSpPr/>
+        <p:nvPr/>
+      </p:nvGrpSpPr>
+      <p:grpSpPr>
+        <a:xfrm>
+          <a:off x="0" y="0"/>
+          <a:ext cx="0" cy="0"/>
+          <a:chOff x="0" y="0"/>
+          <a:chExt cx="0" cy="0"/>
+        </a:xfrm>
+      </p:grpSpPr>
+      <p:sp>
+        <p:nvSpPr>
           <p:cNvPr id="25601" name="Rectangle 1"/>
           <p:cNvSpPr>
             <a:spLocks noGrp="1" noChangeArrowheads="1"/>
@@ -11822,8 +12668,8 @@
         </p:nvSpPr>
         <p:spPr>
           <a:xfrm>
-            <a:off x="1447160" y="2942035"/>
-            <a:ext cx="11303642" cy="5970078"/>
+            <a:off x="1447159" y="2942035"/>
+            <a:ext cx="11303641" cy="5970078"/>
           </a:xfrm>
           <a:ln/>
         </p:spPr>
@@ -11917,14 +12763,14 @@
             <a:endParaRPr lang="en-US" dirty="0" smtClean="0"/>
           </a:p>
           <a:p>
-            <a:pPr marL="295647"/>
+            <a:pPr marL="295662"/>
             <a:r>
               <a:rPr lang="en-US" dirty="0" smtClean="0"/>
               <a:t>Programmers manual</a:t>
             </a:r>
           </a:p>
           <a:p>
-            <a:pPr marL="965150" lvl="1" indent="-477814"/>
+            <a:pPr marL="965200" lvl="1" indent="-477838"/>
             <a:r>
               <a:rPr lang="en-US" dirty="0">
                 <a:solidFill>
@@ -11946,11 +12792,11 @@
             <a:endParaRPr lang="en-US" dirty="0" smtClean="0"/>
           </a:p>
           <a:p>
-            <a:pPr marL="783295" lvl="1"/>
+            <a:pPr marL="783335" lvl="1"/>
             <a:endParaRPr lang="en-US" dirty="0" smtClean="0"/>
           </a:p>
           <a:p>
-            <a:pPr marL="685765" lvl="1"/>
+            <a:pPr marL="685800" lvl="1"/>
             <a:endParaRPr lang="en-US" dirty="0" smtClean="0">
               <a:solidFill>
                 <a:srgbClr val="B70000"/>
@@ -11959,7 +12805,7 @@
             </a:endParaRPr>
           </a:p>
           <a:p>
-            <a:pPr marL="685765" lvl="1"/>
+            <a:pPr marL="685800" lvl="1"/>
             <a:endParaRPr lang="en-US" dirty="0">
               <a:solidFill>
                 <a:srgbClr val="B70000"/>
@@ -12059,7 +12905,7 @@
 </file>
 
 <file path=ppt/slides/slide4.xml><?xml version="1.0" encoding="utf-8"?>
-<p:sld xmlns:a="http://schemas.openxmlformats.org/drawingml/2006/main" xmlns:r="http://schemas.openxmlformats.org/officeDocument/2006/relationships" xmlns:mc="http://schemas.openxmlformats.org/markup-compatibility/2006" xmlns:mv="urn:schemas-microsoft-com:mac:vml" xmlns:p="http://schemas.openxmlformats.org/presentationml/2006/main" mc:Ignorable="mv" mc:PreserveAttributes="mv:*">
+<p:sld xmlns:a="http://schemas.openxmlformats.org/drawingml/2006/main" xmlns:r="http://schemas.openxmlformats.org/officeDocument/2006/relationships" xmlns:p="http://schemas.openxmlformats.org/presentationml/2006/main">
   <p:cSld>
     <p:spTree>
       <p:nvGrpSpPr>
@@ -12090,8 +12936,8 @@
         </p:blipFill>
         <p:spPr bwMode="auto">
           <a:xfrm>
-            <a:off x="1543377" y="3058552"/>
-            <a:ext cx="9982913" cy="5638800"/>
+            <a:off x="1543377" y="3058551"/>
+            <a:ext cx="9982914" cy="5638800"/>
           </a:xfrm>
           <a:prstGeom prst="rect">
             <a:avLst/>
@@ -12223,7 +13069,7 @@
     </p:spTree>
     <p:extLst>
       <p:ext uri="{BB962C8B-B14F-4D97-AF65-F5344CB8AC3E}">
-        <p14:creationId xmlns:p14="http://schemas.microsoft.com/office/powerpoint/2010/main" xmlns:p="http://schemas.openxmlformats.org/presentationml/2006/main" xmlns:r="http://schemas.openxmlformats.org/officeDocument/2006/relationships" xmlns:a="http://schemas.openxmlformats.org/drawingml/2006/main" xmlns="" val="2448934113"/>
+        <p14:creationId xmlns:p14="http://schemas.microsoft.com/office/powerpoint/2010/main" val="2448934113"/>
       </p:ext>
     </p:extLst>
   </p:cSld>
@@ -12242,7 +13088,7 @@
 </file>
 
 <file path=ppt/slides/slide5.xml><?xml version="1.0" encoding="utf-8"?>
-<p:sld xmlns:a="http://schemas.openxmlformats.org/drawingml/2006/main" xmlns:r="http://schemas.openxmlformats.org/officeDocument/2006/relationships" xmlns:mc="http://schemas.openxmlformats.org/markup-compatibility/2006" xmlns:mv="urn:schemas-microsoft-com:mac:vml" xmlns:p="http://schemas.openxmlformats.org/presentationml/2006/main" mc:Ignorable="mv" mc:PreserveAttributes="mv:*">
+<p:sld xmlns:a="http://schemas.openxmlformats.org/drawingml/2006/main" xmlns:r="http://schemas.openxmlformats.org/officeDocument/2006/relationships" xmlns:p="http://schemas.openxmlformats.org/presentationml/2006/main">
   <p:cSld>
     <p:spTree>
       <p:nvGrpSpPr>
@@ -12291,14 +13137,14 @@
             <p:ph idx="1"/>
             <p:extLst>
               <p:ext uri="{D42A27DB-BD31-4B8C-83A1-F6EECF244321}">
-                <p14:modId xmlns:p14="http://schemas.microsoft.com/office/powerpoint/2010/main" xmlns:p="http://schemas.openxmlformats.org/presentationml/2006/main" xmlns:r="http://schemas.openxmlformats.org/officeDocument/2006/relationships" xmlns:a="http://schemas.openxmlformats.org/drawingml/2006/main" xmlns="" val="3478891187"/>
+                <p14:modId xmlns:p14="http://schemas.microsoft.com/office/powerpoint/2010/main" val="3478891187"/>
               </p:ext>
             </p:extLst>
           </p:nvPr>
         </p:nvGraphicFramePr>
         <p:xfrm>
-          <a:off x="838592" y="3276600"/>
-          <a:ext cx="11353800" cy="5669280"/>
+          <a:off x="838591" y="3276600"/>
+          <a:ext cx="11353801" cy="5669280"/>
         </p:xfrm>
         <a:graphic>
           <a:graphicData uri="http://schemas.openxmlformats.org/drawingml/2006/table">
@@ -12307,19 +13153,19 @@
                 <a:tableStyleId>{5C22544A-7EE6-4342-B048-85BDC9FD1C3A}</a:tableStyleId>
               </a:tblPr>
               <a:tblGrid>
-                <a:gridCol w="1651686"/>
+                <a:gridCol w="1651687"/>
                 <a:gridCol w="3072713"/>
                 <a:gridCol w="3124200"/>
                 <a:gridCol w="2996809"/>
                 <a:gridCol w="508392"/>
               </a:tblGrid>
-              <a:tr h="883920">
+              <a:tr h="845483">
                 <a:tc>
                   <a:txBody>
                     <a:bodyPr/>
                     <a:lstStyle/>
                     <a:p>
-                      <a:endParaRPr lang="en-US" sz="2600" dirty="0"/>
+                      <a:endParaRPr lang="en-US" dirty="0"/>
                     </a:p>
                   </a:txBody>
                   <a:tcPr/>
@@ -12330,17 +13176,17 @@
                     <a:lstStyle/>
                     <a:p>
                       <a:r>
-                        <a:rPr lang="en-US" sz="2600" dirty="0" smtClean="0"/>
+                        <a:rPr lang="en-US" dirty="0" smtClean="0"/>
                         <a:t>Local </a:t>
                       </a:r>
                       <a:br>
-                        <a:rPr lang="en-US" sz="2600" dirty="0" smtClean="0"/>
+                        <a:rPr lang="en-US" dirty="0" smtClean="0"/>
                       </a:br>
                       <a:r>
-                        <a:rPr lang="en-US" sz="2600" dirty="0" smtClean="0"/>
+                        <a:rPr lang="en-US" dirty="0" smtClean="0"/>
                         <a:t>Adaptors</a:t>
                       </a:r>
-                      <a:endParaRPr lang="en-US" sz="2600" dirty="0"/>
+                      <a:endParaRPr lang="en-US" dirty="0"/>
                     </a:p>
                   </a:txBody>
                   <a:tcPr/>
@@ -12351,16 +13197,16 @@
                     <a:lstStyle/>
                     <a:p>
                       <a:r>
-                        <a:rPr lang="en-US" sz="2600" dirty="0" smtClean="0"/>
+                        <a:rPr lang="en-US" dirty="0" smtClean="0"/>
                         <a:t>Globus</a:t>
                       </a:r>
                     </a:p>
                     <a:p>
                       <a:r>
-                        <a:rPr lang="en-US" sz="2600" dirty="0" smtClean="0"/>
+                        <a:rPr lang="en-US" dirty="0" smtClean="0"/>
                         <a:t>Adaptors</a:t>
                       </a:r>
-                      <a:endParaRPr lang="en-US" sz="2600" dirty="0"/>
+                      <a:endParaRPr lang="en-US" dirty="0"/>
                     </a:p>
                   </a:txBody>
                   <a:tcPr/>
@@ -12371,17 +13217,17 @@
                     <a:lstStyle/>
                     <a:p>
                       <a:r>
-                        <a:rPr lang="en-US" sz="2600" dirty="0" smtClean="0"/>
+                        <a:rPr lang="en-US" dirty="0" smtClean="0"/>
                         <a:t>SSH</a:t>
                       </a:r>
                       <a:br>
-                        <a:rPr lang="en-US" sz="2600" dirty="0" smtClean="0"/>
+                        <a:rPr lang="en-US" dirty="0" smtClean="0"/>
                       </a:br>
                       <a:r>
-                        <a:rPr lang="en-US" sz="2600" dirty="0" smtClean="0"/>
+                        <a:rPr lang="en-US" dirty="0" smtClean="0"/>
                         <a:t>Adaptors</a:t>
                       </a:r>
-                      <a:endParaRPr lang="en-US" sz="2600" dirty="0"/>
+                      <a:endParaRPr lang="en-US" dirty="0"/>
                     </a:p>
                   </a:txBody>
                   <a:tcPr/>
@@ -12392,16 +13238,16 @@
                     <a:lstStyle/>
                     <a:p>
                       <a:r>
-                        <a:rPr lang="en-US" sz="2600" dirty="0" smtClean="0"/>
+                        <a:rPr lang="en-US" dirty="0" smtClean="0"/>
                         <a:t>…</a:t>
                       </a:r>
-                      <a:endParaRPr lang="en-US" sz="2600" dirty="0"/>
+                      <a:endParaRPr lang="en-US" dirty="0"/>
                     </a:p>
                   </a:txBody>
                   <a:tcPr/>
                 </a:tc>
               </a:tr>
-              <a:tr h="1005840">
+              <a:tr h="868680">
                 <a:tc>
                   <a:txBody>
                     <a:bodyPr/>
@@ -12593,13 +13439,13 @@
                     <a:bodyPr/>
                     <a:lstStyle/>
                     <a:p>
-                      <a:endParaRPr lang="en-US" sz="2600" dirty="0"/>
+                      <a:endParaRPr lang="en-US" dirty="0"/>
                     </a:p>
                   </a:txBody>
                   <a:tcPr/>
                 </a:tc>
               </a:tr>
-              <a:tr h="487680">
+              <a:tr h="350520">
                 <a:tc rowSpan="2">
                   <a:txBody>
                     <a:bodyPr/>
@@ -12674,13 +13520,13 @@
                     <a:lstStyle/>
                     <a:p>
                       <a:pPr algn="l"/>
-                      <a:endParaRPr lang="en-US" sz="2600" dirty="0"/>
+                      <a:endParaRPr lang="en-US" dirty="0"/>
                     </a:p>
                   </a:txBody>
                   <a:tcPr anchor="ctr"/>
                 </a:tc>
               </a:tr>
-              <a:tr h="487680">
+              <a:tr h="350520">
                 <a:tc vMerge="1">
                   <a:txBody>
                     <a:bodyPr/>
@@ -12760,13 +13606,13 @@
                     <a:lstStyle/>
                     <a:p>
                       <a:pPr algn="l"/>
-                      <a:endParaRPr lang="en-US" sz="2600" dirty="0"/>
+                      <a:endParaRPr lang="en-US" dirty="0"/>
                     </a:p>
                   </a:txBody>
                   <a:tcPr anchor="ctr"/>
                 </a:tc>
               </a:tr>
-              <a:tr h="701040">
+              <a:tr h="424186">
                 <a:tc rowSpan="2">
                   <a:txBody>
                     <a:bodyPr/>
@@ -12859,7 +13705,7 @@
                     <a:lstStyle/>
                     <a:p>
                       <a:pPr algn="l"/>
-                      <a:endParaRPr lang="en-US" sz="2600" dirty="0"/>
+                      <a:endParaRPr lang="en-US" dirty="0"/>
                     </a:p>
                   </a:txBody>
                   <a:tcPr anchor="ctr"/>
@@ -12945,13 +13791,13 @@
                     <a:lstStyle/>
                     <a:p>
                       <a:pPr algn="l"/>
-                      <a:endParaRPr lang="en-US" sz="2600" dirty="0"/>
+                      <a:endParaRPr lang="en-US" dirty="0"/>
                     </a:p>
                   </a:txBody>
                   <a:tcPr anchor="ctr"/>
                 </a:tc>
               </a:tr>
-              <a:tr h="701040">
+              <a:tr h="381000">
                 <a:tc rowSpan="2">
                   <a:txBody>
                     <a:bodyPr/>
@@ -13055,13 +13901,13 @@
                     <a:lstStyle/>
                     <a:p>
                       <a:pPr algn="l"/>
-                      <a:endParaRPr lang="en-US" sz="2600" dirty="0"/>
+                      <a:endParaRPr lang="en-US" dirty="0"/>
                     </a:p>
                   </a:txBody>
                   <a:tcPr anchor="ctr"/>
                 </a:tc>
               </a:tr>
-              <a:tr h="701040">
+              <a:tr h="381000">
                 <a:tc vMerge="1">
                   <a:txBody>
                     <a:bodyPr/>
@@ -13135,7 +13981,7 @@
                     <a:lstStyle/>
                     <a:p>
                       <a:pPr algn="l"/>
-                      <a:endParaRPr lang="en-US" sz="2600" dirty="0"/>
+                      <a:endParaRPr lang="en-US" dirty="0"/>
                     </a:p>
                   </a:txBody>
                   <a:tcPr anchor="ctr"/>
@@ -13218,7 +14064,7 @@
     </p:spTree>
     <p:extLst>
       <p:ext uri="{BB962C8B-B14F-4D97-AF65-F5344CB8AC3E}">
-        <p14:creationId xmlns:p14="http://schemas.microsoft.com/office/powerpoint/2010/main" xmlns:p="http://schemas.openxmlformats.org/presentationml/2006/main" xmlns:r="http://schemas.openxmlformats.org/officeDocument/2006/relationships" xmlns:a="http://schemas.openxmlformats.org/drawingml/2006/main" xmlns="" val="4167202409"/>
+        <p14:creationId xmlns:p14="http://schemas.microsoft.com/office/powerpoint/2010/main" val="4167202409"/>
       </p:ext>
     </p:extLst>
   </p:cSld>
@@ -13236,7 +14082,7 @@
 </file>
 
 <file path=ppt/slides/slide6.xml><?xml version="1.0" encoding="utf-8"?>
-<p:sld xmlns:a="http://schemas.openxmlformats.org/drawingml/2006/main" xmlns:r="http://schemas.openxmlformats.org/officeDocument/2006/relationships" xmlns:mc="http://schemas.openxmlformats.org/markup-compatibility/2006" xmlns:mv="urn:schemas-microsoft-com:mac:vml" xmlns:p="http://schemas.openxmlformats.org/presentationml/2006/main" mc:Ignorable="mv" mc:PreserveAttributes="mv:*">
+<p:sld xmlns:a="http://schemas.openxmlformats.org/drawingml/2006/main" xmlns:r="http://schemas.openxmlformats.org/officeDocument/2006/relationships" xmlns:p="http://schemas.openxmlformats.org/presentationml/2006/main">
   <p:cSld>
     <p:spTree>
       <p:nvGrpSpPr>
@@ -13322,9 +14168,9 @@
             </a:r>
           </a:p>
           <a:p>
-            <a:pPr marL="911178" lvl="1" indent="-477814">
+            <a:pPr marL="911225" lvl="1" indent="-477838">
               <a:tabLst>
-                <a:tab pos="3657413" algn="l"/>
+                <a:tab pos="3657600" algn="l"/>
               </a:tabLst>
             </a:pPr>
             <a:r>
@@ -13349,9 +14195,9 @@
             </a:r>
           </a:p>
           <a:p>
-            <a:pPr marL="911178" lvl="1" indent="-477814">
+            <a:pPr marL="911225" lvl="1" indent="-477838">
               <a:tabLst>
-                <a:tab pos="3657413" algn="l"/>
+                <a:tab pos="3657600" algn="l"/>
               </a:tabLst>
             </a:pPr>
             <a:r>
@@ -13372,9 +14218,9 @@
             </a:r>
           </a:p>
           <a:p>
-            <a:pPr marL="911178" lvl="1" indent="-477814">
+            <a:pPr marL="911225" lvl="1" indent="-477838">
               <a:tabLst>
-                <a:tab pos="3657413" algn="l"/>
+                <a:tab pos="3657600" algn="l"/>
               </a:tabLst>
             </a:pPr>
             <a:r>
@@ -13399,9 +14245,9 @@
             </a:r>
           </a:p>
           <a:p>
-            <a:pPr marL="911178" lvl="1" indent="-477814">
+            <a:pPr marL="911225" lvl="1" indent="-477838">
               <a:tabLst>
-                <a:tab pos="3657413" algn="l"/>
+                <a:tab pos="3657600" algn="l"/>
               </a:tabLst>
             </a:pPr>
             <a:r>
@@ -13499,7 +14345,7 @@
 </file>
 
 <file path=ppt/slides/slide7.xml><?xml version="1.0" encoding="utf-8"?>
-<p:sld xmlns:a="http://schemas.openxmlformats.org/drawingml/2006/main" xmlns:r="http://schemas.openxmlformats.org/officeDocument/2006/relationships" xmlns:mc="http://schemas.openxmlformats.org/markup-compatibility/2006" xmlns:mv="urn:schemas-microsoft-com:mac:vml" xmlns:p="http://schemas.openxmlformats.org/presentationml/2006/main" mc:Ignorable="mv" mc:PreserveAttributes="mv:*">
+<p:sld xmlns:a="http://schemas.openxmlformats.org/drawingml/2006/main" xmlns:r="http://schemas.openxmlformats.org/officeDocument/2006/relationships" xmlns:p="http://schemas.openxmlformats.org/presentationml/2006/main">
   <p:cSld>
     <p:spTree>
       <p:nvGrpSpPr>
@@ -13702,7 +14548,7 @@
 </file>
 
 <file path=ppt/slides/slide8.xml><?xml version="1.0" encoding="utf-8"?>
-<p:sld xmlns:a="http://schemas.openxmlformats.org/drawingml/2006/main" xmlns:r="http://schemas.openxmlformats.org/officeDocument/2006/relationships" xmlns:mc="http://schemas.openxmlformats.org/markup-compatibility/2006" xmlns:mv="urn:schemas-microsoft-com:mac:vml" xmlns:p="http://schemas.openxmlformats.org/presentationml/2006/main" mc:Ignorable="mv" mc:PreserveAttributes="mv:*">
+<p:sld xmlns:a="http://schemas.openxmlformats.org/drawingml/2006/main" xmlns:r="http://schemas.openxmlformats.org/officeDocument/2006/relationships" xmlns:p="http://schemas.openxmlformats.org/presentationml/2006/main">
   <p:cSld>
     <p:spTree>
       <p:nvGrpSpPr>
@@ -13753,8 +14599,8 @@
         </p:nvSpPr>
         <p:spPr>
           <a:xfrm>
-            <a:off x="863602" y="2942036"/>
-            <a:ext cx="11545148" cy="2391964"/>
+            <a:off x="863601" y="2942035"/>
+            <a:ext cx="11545148" cy="2391965"/>
           </a:xfrm>
         </p:spPr>
         <p:txBody>
@@ -13772,14 +14618,14 @@
           <a:p>
             <a:pPr lvl="1" fontAlgn="ctr"/>
             <a:r>
-              <a:rPr lang="de-DE" sz="3100" dirty="0" smtClean="0"/>
+              <a:rPr lang="de-DE" sz="3200" dirty="0" smtClean="0"/>
               <a:t>Depends on SAGA adaptors</a:t>
             </a:r>
           </a:p>
           <a:p>
             <a:pPr lvl="1" fontAlgn="ctr"/>
             <a:r>
-              <a:rPr lang="de-DE" sz="3100" dirty="0" smtClean="0"/>
+              <a:rPr lang="de-DE" sz="3200" dirty="0" smtClean="0"/>
               <a:t>Also available: Globus GridFTP, Curl (subset), KFS, Amazon EC2, Opencloud (Sector/Sphere), Hadoop (HDFS)</a:t>
             </a:r>
           </a:p>
@@ -13871,13 +14717,13 @@
           <p:nvPr>
             <p:extLst>
               <p:ext uri="{D42A27DB-BD31-4B8C-83A1-F6EECF244321}">
-                <p14:modId xmlns:p14="http://schemas.microsoft.com/office/powerpoint/2010/main" xmlns:p="http://schemas.openxmlformats.org/presentationml/2006/main" xmlns:r="http://schemas.openxmlformats.org/officeDocument/2006/relationships" xmlns:a="http://schemas.openxmlformats.org/drawingml/2006/main" xmlns="" val="3768818699"/>
+                <p14:modId xmlns:p14="http://schemas.microsoft.com/office/powerpoint/2010/main" val="3768818699"/>
               </p:ext>
             </p:extLst>
           </p:nvPr>
         </p:nvGraphicFramePr>
         <p:xfrm>
-          <a:off x="1015609" y="5513362"/>
+          <a:off x="1015609" y="5513363"/>
           <a:ext cx="10972800" cy="3169920"/>
         </p:xfrm>
         <a:graphic>
@@ -14178,7 +15024,7 @@
 </file>
 
 <file path=ppt/slides/slide9.xml><?xml version="1.0" encoding="utf-8"?>
-<p:sld xmlns:a="http://schemas.openxmlformats.org/drawingml/2006/main" xmlns:r="http://schemas.openxmlformats.org/officeDocument/2006/relationships" xmlns:mc="http://schemas.openxmlformats.org/markup-compatibility/2006" xmlns:mv="urn:schemas-microsoft-com:mac:vml" xmlns:p="http://schemas.openxmlformats.org/presentationml/2006/main" mc:Ignorable="mv" mc:PreserveAttributes="mv:*">
+<p:sld xmlns:a="http://schemas.openxmlformats.org/drawingml/2006/main" xmlns:r="http://schemas.openxmlformats.org/officeDocument/2006/relationships" xmlns:p="http://schemas.openxmlformats.org/presentationml/2006/main">
   <p:cSld>
     <p:spTree>
       <p:nvGrpSpPr>
@@ -14229,7 +15075,7 @@
         </p:nvSpPr>
         <p:spPr>
           <a:xfrm>
-            <a:off x="853831" y="2971801"/>
+            <a:off x="853831" y="2971800"/>
             <a:ext cx="11704320" cy="2362199"/>
           </a:xfrm>
         </p:spPr>
@@ -14248,14 +15094,14 @@
           <a:p>
             <a:pPr lvl="1" fontAlgn="ctr"/>
             <a:r>
-              <a:rPr lang="de-DE" sz="3100" dirty="0" smtClean="0"/>
+              <a:rPr lang="de-DE" sz="3200" dirty="0" smtClean="0"/>
               <a:t>Depends on SAGA adaptors</a:t>
             </a:r>
           </a:p>
           <a:p>
             <a:pPr lvl="1" fontAlgn="ctr"/>
             <a:r>
-              <a:rPr lang="de-DE" sz="3100" dirty="0" smtClean="0"/>
+              <a:rPr lang="de-DE" sz="3200" dirty="0" smtClean="0"/>
               <a:t>Also available: Globus Gram, Condor, OMII-GridSAM, LSF, Amazon EC2, Opencloud (Sector/Sphere)</a:t>
             </a:r>
           </a:p>
@@ -14347,13 +15193,13 @@
           <p:nvPr>
             <p:extLst>
               <p:ext uri="{D42A27DB-BD31-4B8C-83A1-F6EECF244321}">
-                <p14:modId xmlns:p14="http://schemas.microsoft.com/office/powerpoint/2010/main" xmlns:p="http://schemas.openxmlformats.org/presentationml/2006/main" xmlns:r="http://schemas.openxmlformats.org/officeDocument/2006/relationships" xmlns:a="http://schemas.openxmlformats.org/drawingml/2006/main" xmlns="" val="1142005977"/>
+                <p14:modId xmlns:p14="http://schemas.microsoft.com/office/powerpoint/2010/main" val="1142005977"/>
               </p:ext>
             </p:extLst>
           </p:nvPr>
         </p:nvGraphicFramePr>
         <p:xfrm>
-          <a:off x="986303" y="5486401"/>
+          <a:off x="986302" y="5486400"/>
           <a:ext cx="10972800" cy="3698240"/>
         </p:xfrm>
         <a:graphic>

</xml_diff>

<commit_message>
More fixes & conclusion slide
git-svn-id: file://localhost/tmp/svn2git/svn@3275 defb5e50-622e-49ec-a68e-d72c7db87b45
</commit_message>
<xml_diff>
--- a/tutorial/general_tutorial/SAGA-API-levels.pptx
+++ b/tutorial/general_tutorial/SAGA-API-levels.pptx
@@ -5,7 +5,7 @@
     <p:sldMasterId id="2147483701" r:id="rId1"/>
   </p:sldMasterIdLst>
   <p:notesMasterIdLst>
-    <p:notesMasterId r:id="rId29"/>
+    <p:notesMasterId r:id="rId30"/>
   </p:notesMasterIdLst>
   <p:sldIdLst>
     <p:sldId id="321" r:id="rId2"/>
@@ -31,10 +31,11 @@
     <p:sldId id="320" r:id="rId22"/>
     <p:sldId id="318" r:id="rId23"/>
     <p:sldId id="295" r:id="rId24"/>
-    <p:sldId id="257" r:id="rId25"/>
+    <p:sldId id="323" r:id="rId25"/>
     <p:sldId id="299" r:id="rId26"/>
     <p:sldId id="301" r:id="rId27"/>
     <p:sldId id="303" r:id="rId28"/>
+    <p:sldId id="324" r:id="rId29"/>
   </p:sldIdLst>
   <p:sldSz cx="13004800" cy="9753600"/>
   <p:notesSz cx="6858000" cy="9144000"/>
@@ -611,6 +612,261 @@
 </p:notes>
 </file>
 
+<file path=ppt/notesSlides/notesSlide10.xml><?xml version="1.0" encoding="utf-8"?>
+<p:notes xmlns:a="http://schemas.openxmlformats.org/drawingml/2006/main" xmlns:r="http://schemas.openxmlformats.org/officeDocument/2006/relationships" xmlns:p="http://schemas.openxmlformats.org/presentationml/2006/main">
+  <p:cSld>
+    <p:spTree>
+      <p:nvGrpSpPr>
+        <p:cNvPr id="1" name=""/>
+        <p:cNvGrpSpPr/>
+        <p:nvPr/>
+      </p:nvGrpSpPr>
+      <p:grpSpPr>
+        <a:xfrm>
+          <a:off x="0" y="0"/>
+          <a:ext cx="0" cy="0"/>
+          <a:chOff x="0" y="0"/>
+          <a:chExt cx="0" cy="0"/>
+        </a:xfrm>
+      </p:grpSpPr>
+      <p:sp>
+        <p:nvSpPr>
+          <p:cNvPr id="2" name="Slide Image Placeholder 1"/>
+          <p:cNvSpPr>
+            <a:spLocks noGrp="1" noRot="1" noChangeAspect="1"/>
+          </p:cNvSpPr>
+          <p:nvPr>
+            <p:ph type="sldImg"/>
+          </p:nvPr>
+        </p:nvSpPr>
+        <p:spPr/>
+      </p:sp>
+      <p:sp>
+        <p:nvSpPr>
+          <p:cNvPr id="3" name="Notes Placeholder 2"/>
+          <p:cNvSpPr>
+            <a:spLocks noGrp="1"/>
+          </p:cNvSpPr>
+          <p:nvPr>
+            <p:ph type="body" idx="1"/>
+          </p:nvPr>
+        </p:nvSpPr>
+        <p:spPr/>
+        <p:txBody>
+          <a:bodyPr/>
+          <a:lstStyle/>
+          <a:p>
+            <a:r>
+              <a:rPr lang="en-US" dirty="0" smtClean="0"/>
+              <a:t>Here are</a:t>
+            </a:r>
+            <a:r>
+              <a:rPr lang="en-US" baseline="0" dirty="0" smtClean="0"/>
+              <a:t> a few practical examples, which are somewhat out of scope of this tutorial. They represent three common patterns for distributed applications:</a:t>
+            </a:r>
+          </a:p>
+          <a:p>
+            <a:endParaRPr lang="en-US" baseline="0" dirty="0" smtClean="0"/>
+          </a:p>
+          <a:p>
+            <a:r>
+              <a:rPr lang="en-US" b="1" baseline="0" dirty="0" err="1" smtClean="0"/>
+              <a:t>Hello_world</a:t>
+            </a:r>
+            <a:r>
+              <a:rPr lang="en-US" b="1" baseline="0" dirty="0" smtClean="0"/>
+              <a:t> </a:t>
+            </a:r>
+            <a:r>
+              <a:rPr lang="en-US" baseline="0" dirty="0" smtClean="0"/>
+              <a:t>*uncoupled jobs”</a:t>
+            </a:r>
+          </a:p>
+          <a:p>
+            <a:endParaRPr lang="en-US" baseline="0" dirty="0" smtClean="0"/>
+          </a:p>
+          <a:p>
+            <a:r>
+              <a:rPr lang="en-US" b="1" baseline="0" dirty="0" err="1" smtClean="0"/>
+              <a:t>Chaining_jobs</a:t>
+            </a:r>
+            <a:r>
+              <a:rPr lang="en-US" b="1" baseline="0" dirty="0" smtClean="0"/>
+              <a:t> </a:t>
+            </a:r>
+            <a:r>
+              <a:rPr lang="en-US" baseline="0" dirty="0" smtClean="0"/>
+              <a:t>– (“workflow”) on job’s input depends on the other’s output</a:t>
+            </a:r>
+          </a:p>
+          <a:p>
+            <a:endParaRPr lang="en-US" baseline="0" dirty="0" smtClean="0"/>
+          </a:p>
+          <a:p>
+            <a:r>
+              <a:rPr lang="en-US" b="1" baseline="0" dirty="0" smtClean="0"/>
+              <a:t>Depending jobs </a:t>
+            </a:r>
+            <a:r>
+              <a:rPr lang="en-US" baseline="0" dirty="0" smtClean="0"/>
+              <a:t>– Centrally coordinated jobs</a:t>
+            </a:r>
+          </a:p>
+          <a:p>
+            <a:endParaRPr lang="en-US" baseline="0" dirty="0" smtClean="0"/>
+          </a:p>
+          <a:p>
+            <a:endParaRPr lang="en-US" baseline="0" dirty="0" smtClean="0"/>
+          </a:p>
+          <a:p>
+            <a:r>
+              <a:rPr lang="en-US" baseline="0" dirty="0" smtClean="0"/>
+              <a:t>Feel free to check out http://</a:t>
+            </a:r>
+            <a:r>
+              <a:rPr lang="en-US" baseline="0" dirty="0" err="1" smtClean="0"/>
+              <a:t>saga.cct.lsu.edu</a:t>
+            </a:r>
+            <a:r>
+              <a:rPr lang="en-US" baseline="0" dirty="0" smtClean="0"/>
+              <a:t>/software/</a:t>
+            </a:r>
+            <a:r>
+              <a:rPr lang="en-US" baseline="0" dirty="0" err="1" smtClean="0"/>
+              <a:t>cpp</a:t>
+            </a:r>
+            <a:r>
+              <a:rPr lang="en-US" baseline="0" dirty="0" smtClean="0"/>
+              <a:t>/documentation/tutorials/loni-training-2010</a:t>
+            </a:r>
+          </a:p>
+          <a:p>
+            <a:endParaRPr lang="en-US" dirty="0"/>
+          </a:p>
+        </p:txBody>
+      </p:sp>
+      <p:sp>
+        <p:nvSpPr>
+          <p:cNvPr id="4" name="Slide Number Placeholder 3"/>
+          <p:cNvSpPr>
+            <a:spLocks noGrp="1"/>
+          </p:cNvSpPr>
+          <p:nvPr>
+            <p:ph type="sldNum" sz="quarter" idx="10"/>
+          </p:nvPr>
+        </p:nvSpPr>
+        <p:spPr/>
+        <p:txBody>
+          <a:bodyPr/>
+          <a:lstStyle/>
+          <a:p>
+            <a:fld id="{2415D97C-649C-43F9-ADD9-F4FB9523026C}" type="slidenum">
+              <a:rPr lang="en-US" smtClean="0"/>
+              <a:pPr/>
+              <a:t>27</a:t>
+            </a:fld>
+            <a:endParaRPr lang="en-US"/>
+          </a:p>
+        </p:txBody>
+      </p:sp>
+    </p:spTree>
+    <p:extLst>
+      <p:ext uri="{BB962C8B-B14F-4D97-AF65-F5344CB8AC3E}">
+        <p14:creationId xmlns:p14="http://schemas.microsoft.com/office/powerpoint/2010/main" val="229707918"/>
+      </p:ext>
+    </p:extLst>
+  </p:cSld>
+  <p:clrMapOvr>
+    <a:masterClrMapping/>
+  </p:clrMapOvr>
+</p:notes>
+</file>
+
+<file path=ppt/notesSlides/notesSlide11.xml><?xml version="1.0" encoding="utf-8"?>
+<p:notes xmlns:a="http://schemas.openxmlformats.org/drawingml/2006/main" xmlns:r="http://schemas.openxmlformats.org/officeDocument/2006/relationships" xmlns:p="http://schemas.openxmlformats.org/presentationml/2006/main">
+  <p:cSld>
+    <p:spTree>
+      <p:nvGrpSpPr>
+        <p:cNvPr id="1" name=""/>
+        <p:cNvGrpSpPr/>
+        <p:nvPr/>
+      </p:nvGrpSpPr>
+      <p:grpSpPr>
+        <a:xfrm>
+          <a:off x="0" y="0"/>
+          <a:ext cx="0" cy="0"/>
+          <a:chOff x="0" y="0"/>
+          <a:chExt cx="0" cy="0"/>
+        </a:xfrm>
+      </p:grpSpPr>
+      <p:sp>
+        <p:nvSpPr>
+          <p:cNvPr id="2" name="Slide Image Placeholder 1"/>
+          <p:cNvSpPr>
+            <a:spLocks noGrp="1" noRot="1" noChangeAspect="1"/>
+          </p:cNvSpPr>
+          <p:nvPr>
+            <p:ph type="sldImg"/>
+          </p:nvPr>
+        </p:nvSpPr>
+        <p:spPr/>
+      </p:sp>
+      <p:sp>
+        <p:nvSpPr>
+          <p:cNvPr id="3" name="Notes Placeholder 2"/>
+          <p:cNvSpPr>
+            <a:spLocks noGrp="1"/>
+          </p:cNvSpPr>
+          <p:nvPr>
+            <p:ph type="body" idx="1"/>
+          </p:nvPr>
+        </p:nvSpPr>
+        <p:spPr/>
+        <p:txBody>
+          <a:bodyPr/>
+          <a:lstStyle/>
+          <a:p>
+            <a:endParaRPr lang="en-US" dirty="0"/>
+          </a:p>
+        </p:txBody>
+      </p:sp>
+      <p:sp>
+        <p:nvSpPr>
+          <p:cNvPr id="4" name="Slide Number Placeholder 3"/>
+          <p:cNvSpPr>
+            <a:spLocks noGrp="1"/>
+          </p:cNvSpPr>
+          <p:nvPr>
+            <p:ph type="sldNum" sz="quarter" idx="10"/>
+          </p:nvPr>
+        </p:nvSpPr>
+        <p:spPr/>
+        <p:txBody>
+          <a:bodyPr/>
+          <a:lstStyle/>
+          <a:p>
+            <a:fld id="{2415D97C-649C-43F9-ADD9-F4FB9523026C}" type="slidenum">
+              <a:rPr lang="en-US" smtClean="0"/>
+              <a:pPr/>
+              <a:t>28</a:t>
+            </a:fld>
+            <a:endParaRPr lang="en-US"/>
+          </a:p>
+        </p:txBody>
+      </p:sp>
+    </p:spTree>
+    <p:extLst>
+      <p:ext uri="{BB962C8B-B14F-4D97-AF65-F5344CB8AC3E}">
+        <p14:creationId xmlns:p14="http://schemas.microsoft.com/office/powerpoint/2010/main" val="793208553"/>
+      </p:ext>
+    </p:extLst>
+  </p:cSld>
+  <p:clrMapOvr>
+    <a:masterClrMapping/>
+  </p:clrMapOvr>
+</p:notes>
+</file>
+
 <file path=ppt/notesSlides/notesSlide2.xml><?xml version="1.0" encoding="utf-8"?>
 <p:notes xmlns:a="http://schemas.openxmlformats.org/drawingml/2006/main" xmlns:r="http://schemas.openxmlformats.org/officeDocument/2006/relationships" xmlns:p="http://schemas.openxmlformats.org/presentationml/2006/main">
   <p:cSld>
@@ -1077,6 +1333,528 @@
     <p:extLst>
       <p:ext uri="{BB962C8B-B14F-4D97-AF65-F5344CB8AC3E}">
         <p14:creationId xmlns:p14="http://schemas.microsoft.com/office/powerpoint/2010/main" val="232248116"/>
+      </p:ext>
+    </p:extLst>
+  </p:cSld>
+  <p:clrMapOvr>
+    <a:masterClrMapping/>
+  </p:clrMapOvr>
+</p:notes>
+</file>
+
+<file path=ppt/notesSlides/notesSlide7.xml><?xml version="1.0" encoding="utf-8"?>
+<p:notes xmlns:a="http://schemas.openxmlformats.org/drawingml/2006/main" xmlns:r="http://schemas.openxmlformats.org/officeDocument/2006/relationships" xmlns:p="http://schemas.openxmlformats.org/presentationml/2006/main">
+  <p:cSld>
+    <p:spTree>
+      <p:nvGrpSpPr>
+        <p:cNvPr id="1" name=""/>
+        <p:cNvGrpSpPr/>
+        <p:nvPr/>
+      </p:nvGrpSpPr>
+      <p:grpSpPr>
+        <a:xfrm>
+          <a:off x="0" y="0"/>
+          <a:ext cx="0" cy="0"/>
+          <a:chOff x="0" y="0"/>
+          <a:chExt cx="0" cy="0"/>
+        </a:xfrm>
+      </p:grpSpPr>
+      <p:sp>
+        <p:nvSpPr>
+          <p:cNvPr id="2" name="Slide Image Placeholder 1"/>
+          <p:cNvSpPr>
+            <a:spLocks noGrp="1" noRot="1" noChangeAspect="1"/>
+          </p:cNvSpPr>
+          <p:nvPr>
+            <p:ph type="sldImg"/>
+          </p:nvPr>
+        </p:nvSpPr>
+        <p:spPr/>
+      </p:sp>
+      <p:sp>
+        <p:nvSpPr>
+          <p:cNvPr id="3" name="Notes Placeholder 2"/>
+          <p:cNvSpPr>
+            <a:spLocks noGrp="1"/>
+          </p:cNvSpPr>
+          <p:nvPr>
+            <p:ph type="body" idx="1"/>
+          </p:nvPr>
+        </p:nvSpPr>
+        <p:spPr/>
+        <p:txBody>
+          <a:bodyPr/>
+          <a:lstStyle/>
+          <a:p>
+            <a:r>
+              <a:rPr lang="en-US" dirty="0" smtClean="0"/>
+              <a:t>Here are</a:t>
+            </a:r>
+            <a:r>
+              <a:rPr lang="en-US" baseline="0" dirty="0" smtClean="0"/>
+              <a:t> a few practical examples, which are somewhat out of scope of this tutorial. They represent three common patterns for distributed applications:</a:t>
+            </a:r>
+          </a:p>
+          <a:p>
+            <a:endParaRPr lang="en-US" baseline="0" dirty="0" smtClean="0"/>
+          </a:p>
+          <a:p>
+            <a:r>
+              <a:rPr lang="en-US" b="1" baseline="0" dirty="0" err="1" smtClean="0"/>
+              <a:t>Hello_world</a:t>
+            </a:r>
+            <a:r>
+              <a:rPr lang="en-US" b="1" baseline="0" dirty="0" smtClean="0"/>
+              <a:t> </a:t>
+            </a:r>
+            <a:r>
+              <a:rPr lang="en-US" baseline="0" dirty="0" smtClean="0"/>
+              <a:t>*uncoupled jobs”</a:t>
+            </a:r>
+          </a:p>
+          <a:p>
+            <a:endParaRPr lang="en-US" baseline="0" dirty="0" smtClean="0"/>
+          </a:p>
+          <a:p>
+            <a:r>
+              <a:rPr lang="en-US" b="1" baseline="0" dirty="0" err="1" smtClean="0"/>
+              <a:t>Chaining_jobs</a:t>
+            </a:r>
+            <a:r>
+              <a:rPr lang="en-US" b="1" baseline="0" dirty="0" smtClean="0"/>
+              <a:t> </a:t>
+            </a:r>
+            <a:r>
+              <a:rPr lang="en-US" baseline="0" dirty="0" smtClean="0"/>
+              <a:t>– (“workflow”) on job’s input depends on the other’s output</a:t>
+            </a:r>
+          </a:p>
+          <a:p>
+            <a:endParaRPr lang="en-US" baseline="0" dirty="0" smtClean="0"/>
+          </a:p>
+          <a:p>
+            <a:r>
+              <a:rPr lang="en-US" b="1" baseline="0" dirty="0" smtClean="0"/>
+              <a:t>Depending jobs </a:t>
+            </a:r>
+            <a:r>
+              <a:rPr lang="en-US" baseline="0" dirty="0" smtClean="0"/>
+              <a:t>– Centrally coordinated jobs</a:t>
+            </a:r>
+          </a:p>
+          <a:p>
+            <a:endParaRPr lang="en-US" baseline="0" dirty="0" smtClean="0"/>
+          </a:p>
+          <a:p>
+            <a:endParaRPr lang="en-US" baseline="0" dirty="0" smtClean="0"/>
+          </a:p>
+          <a:p>
+            <a:r>
+              <a:rPr lang="en-US" baseline="0" dirty="0" smtClean="0"/>
+              <a:t>Feel free to check out http://</a:t>
+            </a:r>
+            <a:r>
+              <a:rPr lang="en-US" baseline="0" dirty="0" err="1" smtClean="0"/>
+              <a:t>saga.cct.lsu.edu</a:t>
+            </a:r>
+            <a:r>
+              <a:rPr lang="en-US" baseline="0" dirty="0" smtClean="0"/>
+              <a:t>/software/</a:t>
+            </a:r>
+            <a:r>
+              <a:rPr lang="en-US" baseline="0" dirty="0" err="1" smtClean="0"/>
+              <a:t>cpp</a:t>
+            </a:r>
+            <a:r>
+              <a:rPr lang="en-US" baseline="0" dirty="0" smtClean="0"/>
+              <a:t>/documentation/tutorials/loni-training-2010</a:t>
+            </a:r>
+          </a:p>
+          <a:p>
+            <a:endParaRPr lang="en-US" baseline="0" dirty="0" smtClean="0"/>
+          </a:p>
+          <a:p>
+            <a:r>
+              <a:rPr lang="en-US" baseline="0" dirty="0" smtClean="0"/>
+              <a:t>There’s a document called SAGA Tutorial Exercise – it explains the following three examples in detail! </a:t>
+            </a:r>
+          </a:p>
+          <a:p>
+            <a:endParaRPr lang="en-US" baseline="0" dirty="0" smtClean="0"/>
+          </a:p>
+          <a:p>
+            <a:endParaRPr lang="en-US" dirty="0"/>
+          </a:p>
+        </p:txBody>
+      </p:sp>
+      <p:sp>
+        <p:nvSpPr>
+          <p:cNvPr id="4" name="Slide Number Placeholder 3"/>
+          <p:cNvSpPr>
+            <a:spLocks noGrp="1"/>
+          </p:cNvSpPr>
+          <p:nvPr>
+            <p:ph type="sldNum" sz="quarter" idx="10"/>
+          </p:nvPr>
+        </p:nvSpPr>
+        <p:spPr/>
+        <p:txBody>
+          <a:bodyPr/>
+          <a:lstStyle/>
+          <a:p>
+            <a:fld id="{2415D97C-649C-43F9-ADD9-F4FB9523026C}" type="slidenum">
+              <a:rPr lang="en-US" smtClean="0"/>
+              <a:pPr/>
+              <a:t>24</a:t>
+            </a:fld>
+            <a:endParaRPr lang="en-US"/>
+          </a:p>
+        </p:txBody>
+      </p:sp>
+    </p:spTree>
+    <p:extLst>
+      <p:ext uri="{BB962C8B-B14F-4D97-AF65-F5344CB8AC3E}">
+        <p14:creationId xmlns:p14="http://schemas.microsoft.com/office/powerpoint/2010/main" val="3955363709"/>
+      </p:ext>
+    </p:extLst>
+  </p:cSld>
+  <p:clrMapOvr>
+    <a:masterClrMapping/>
+  </p:clrMapOvr>
+</p:notes>
+</file>
+
+<file path=ppt/notesSlides/notesSlide8.xml><?xml version="1.0" encoding="utf-8"?>
+<p:notes xmlns:a="http://schemas.openxmlformats.org/drawingml/2006/main" xmlns:r="http://schemas.openxmlformats.org/officeDocument/2006/relationships" xmlns:p="http://schemas.openxmlformats.org/presentationml/2006/main">
+  <p:cSld>
+    <p:spTree>
+      <p:nvGrpSpPr>
+        <p:cNvPr id="1" name=""/>
+        <p:cNvGrpSpPr/>
+        <p:nvPr/>
+      </p:nvGrpSpPr>
+      <p:grpSpPr>
+        <a:xfrm>
+          <a:off x="0" y="0"/>
+          <a:ext cx="0" cy="0"/>
+          <a:chOff x="0" y="0"/>
+          <a:chExt cx="0" cy="0"/>
+        </a:xfrm>
+      </p:grpSpPr>
+      <p:sp>
+        <p:nvSpPr>
+          <p:cNvPr id="2" name="Slide Image Placeholder 1"/>
+          <p:cNvSpPr>
+            <a:spLocks noGrp="1" noRot="1" noChangeAspect="1"/>
+          </p:cNvSpPr>
+          <p:nvPr>
+            <p:ph type="sldImg"/>
+          </p:nvPr>
+        </p:nvSpPr>
+        <p:spPr/>
+      </p:sp>
+      <p:sp>
+        <p:nvSpPr>
+          <p:cNvPr id="3" name="Notes Placeholder 2"/>
+          <p:cNvSpPr>
+            <a:spLocks noGrp="1"/>
+          </p:cNvSpPr>
+          <p:nvPr>
+            <p:ph type="body" idx="1"/>
+          </p:nvPr>
+        </p:nvSpPr>
+        <p:spPr/>
+        <p:txBody>
+          <a:bodyPr/>
+          <a:lstStyle/>
+          <a:p>
+            <a:r>
+              <a:rPr lang="en-US" dirty="0" smtClean="0"/>
+              <a:t>Here are</a:t>
+            </a:r>
+            <a:r>
+              <a:rPr lang="en-US" baseline="0" dirty="0" smtClean="0"/>
+              <a:t> a few practical examples, which are somewhat out of scope of this tutorial. They represent three common patterns for distributed applications:</a:t>
+            </a:r>
+          </a:p>
+          <a:p>
+            <a:endParaRPr lang="en-US" baseline="0" dirty="0" smtClean="0"/>
+          </a:p>
+          <a:p>
+            <a:r>
+              <a:rPr lang="en-US" b="1" baseline="0" dirty="0" err="1" smtClean="0"/>
+              <a:t>Hello_world</a:t>
+            </a:r>
+            <a:r>
+              <a:rPr lang="en-US" b="1" baseline="0" dirty="0" smtClean="0"/>
+              <a:t> </a:t>
+            </a:r>
+            <a:r>
+              <a:rPr lang="en-US" baseline="0" dirty="0" smtClean="0"/>
+              <a:t>*uncoupled jobs”</a:t>
+            </a:r>
+          </a:p>
+          <a:p>
+            <a:endParaRPr lang="en-US" baseline="0" dirty="0" smtClean="0"/>
+          </a:p>
+          <a:p>
+            <a:r>
+              <a:rPr lang="en-US" b="1" baseline="0" dirty="0" err="1" smtClean="0"/>
+              <a:t>Chaining_jobs</a:t>
+            </a:r>
+            <a:r>
+              <a:rPr lang="en-US" b="1" baseline="0" dirty="0" smtClean="0"/>
+              <a:t> </a:t>
+            </a:r>
+            <a:r>
+              <a:rPr lang="en-US" baseline="0" dirty="0" smtClean="0"/>
+              <a:t>– (“workflow”) on job’s input depends on the other’s output</a:t>
+            </a:r>
+          </a:p>
+          <a:p>
+            <a:endParaRPr lang="en-US" baseline="0" dirty="0" smtClean="0"/>
+          </a:p>
+          <a:p>
+            <a:r>
+              <a:rPr lang="en-US" b="1" baseline="0" dirty="0" smtClean="0"/>
+              <a:t>Depending jobs </a:t>
+            </a:r>
+            <a:r>
+              <a:rPr lang="en-US" baseline="0" dirty="0" smtClean="0"/>
+              <a:t>– Centrally coordinated jobs</a:t>
+            </a:r>
+          </a:p>
+          <a:p>
+            <a:endParaRPr lang="en-US" baseline="0" dirty="0" smtClean="0"/>
+          </a:p>
+          <a:p>
+            <a:endParaRPr lang="en-US" baseline="0" dirty="0" smtClean="0"/>
+          </a:p>
+          <a:p>
+            <a:r>
+              <a:rPr lang="en-US" baseline="0" dirty="0" smtClean="0"/>
+              <a:t>Feel free to check out http://</a:t>
+            </a:r>
+            <a:r>
+              <a:rPr lang="en-US" baseline="0" dirty="0" err="1" smtClean="0"/>
+              <a:t>saga.cct.lsu.edu</a:t>
+            </a:r>
+            <a:r>
+              <a:rPr lang="en-US" baseline="0" dirty="0" smtClean="0"/>
+              <a:t>/software/</a:t>
+            </a:r>
+            <a:r>
+              <a:rPr lang="en-US" baseline="0" dirty="0" err="1" smtClean="0"/>
+              <a:t>cpp</a:t>
+            </a:r>
+            <a:r>
+              <a:rPr lang="en-US" baseline="0" dirty="0" smtClean="0"/>
+              <a:t>/documentation/tutorials/loni-training-2010</a:t>
+            </a:r>
+          </a:p>
+          <a:p>
+            <a:endParaRPr lang="en-US" dirty="0"/>
+          </a:p>
+        </p:txBody>
+      </p:sp>
+      <p:sp>
+        <p:nvSpPr>
+          <p:cNvPr id="4" name="Slide Number Placeholder 3"/>
+          <p:cNvSpPr>
+            <a:spLocks noGrp="1"/>
+          </p:cNvSpPr>
+          <p:nvPr>
+            <p:ph type="sldNum" sz="quarter" idx="10"/>
+          </p:nvPr>
+        </p:nvSpPr>
+        <p:spPr/>
+        <p:txBody>
+          <a:bodyPr/>
+          <a:lstStyle/>
+          <a:p>
+            <a:fld id="{2415D97C-649C-43F9-ADD9-F4FB9523026C}" type="slidenum">
+              <a:rPr lang="en-US" smtClean="0"/>
+              <a:pPr/>
+              <a:t>25</a:t>
+            </a:fld>
+            <a:endParaRPr lang="en-US"/>
+          </a:p>
+        </p:txBody>
+      </p:sp>
+    </p:spTree>
+    <p:extLst>
+      <p:ext uri="{BB962C8B-B14F-4D97-AF65-F5344CB8AC3E}">
+        <p14:creationId xmlns:p14="http://schemas.microsoft.com/office/powerpoint/2010/main" val="706395428"/>
+      </p:ext>
+    </p:extLst>
+  </p:cSld>
+  <p:clrMapOvr>
+    <a:masterClrMapping/>
+  </p:clrMapOvr>
+</p:notes>
+</file>
+
+<file path=ppt/notesSlides/notesSlide9.xml><?xml version="1.0" encoding="utf-8"?>
+<p:notes xmlns:a="http://schemas.openxmlformats.org/drawingml/2006/main" xmlns:r="http://schemas.openxmlformats.org/officeDocument/2006/relationships" xmlns:p="http://schemas.openxmlformats.org/presentationml/2006/main">
+  <p:cSld>
+    <p:spTree>
+      <p:nvGrpSpPr>
+        <p:cNvPr id="1" name=""/>
+        <p:cNvGrpSpPr/>
+        <p:nvPr/>
+      </p:nvGrpSpPr>
+      <p:grpSpPr>
+        <a:xfrm>
+          <a:off x="0" y="0"/>
+          <a:ext cx="0" cy="0"/>
+          <a:chOff x="0" y="0"/>
+          <a:chExt cx="0" cy="0"/>
+        </a:xfrm>
+      </p:grpSpPr>
+      <p:sp>
+        <p:nvSpPr>
+          <p:cNvPr id="2" name="Slide Image Placeholder 1"/>
+          <p:cNvSpPr>
+            <a:spLocks noGrp="1" noRot="1" noChangeAspect="1"/>
+          </p:cNvSpPr>
+          <p:nvPr>
+            <p:ph type="sldImg"/>
+          </p:nvPr>
+        </p:nvSpPr>
+        <p:spPr/>
+      </p:sp>
+      <p:sp>
+        <p:nvSpPr>
+          <p:cNvPr id="3" name="Notes Placeholder 2"/>
+          <p:cNvSpPr>
+            <a:spLocks noGrp="1"/>
+          </p:cNvSpPr>
+          <p:nvPr>
+            <p:ph type="body" idx="1"/>
+          </p:nvPr>
+        </p:nvSpPr>
+        <p:spPr/>
+        <p:txBody>
+          <a:bodyPr/>
+          <a:lstStyle/>
+          <a:p>
+            <a:r>
+              <a:rPr lang="en-US" dirty="0" smtClean="0"/>
+              <a:t>Here are</a:t>
+            </a:r>
+            <a:r>
+              <a:rPr lang="en-US" baseline="0" dirty="0" smtClean="0"/>
+              <a:t> a few practical examples, which are somewhat out of scope of this tutorial. They represent three common patterns for distributed applications:</a:t>
+            </a:r>
+          </a:p>
+          <a:p>
+            <a:endParaRPr lang="en-US" baseline="0" dirty="0" smtClean="0"/>
+          </a:p>
+          <a:p>
+            <a:r>
+              <a:rPr lang="en-US" b="1" baseline="0" dirty="0" err="1" smtClean="0"/>
+              <a:t>Hello_world</a:t>
+            </a:r>
+            <a:r>
+              <a:rPr lang="en-US" b="1" baseline="0" dirty="0" smtClean="0"/>
+              <a:t> </a:t>
+            </a:r>
+            <a:r>
+              <a:rPr lang="en-US" baseline="0" dirty="0" smtClean="0"/>
+              <a:t>*uncoupled jobs”</a:t>
+            </a:r>
+          </a:p>
+          <a:p>
+            <a:endParaRPr lang="en-US" baseline="0" dirty="0" smtClean="0"/>
+          </a:p>
+          <a:p>
+            <a:r>
+              <a:rPr lang="en-US" b="1" baseline="0" dirty="0" err="1" smtClean="0"/>
+              <a:t>Chaining_jobs</a:t>
+            </a:r>
+            <a:r>
+              <a:rPr lang="en-US" b="1" baseline="0" dirty="0" smtClean="0"/>
+              <a:t> </a:t>
+            </a:r>
+            <a:r>
+              <a:rPr lang="en-US" baseline="0" dirty="0" smtClean="0"/>
+              <a:t>– (“workflow”) on job’s input depends on the other’s output</a:t>
+            </a:r>
+          </a:p>
+          <a:p>
+            <a:endParaRPr lang="en-US" baseline="0" dirty="0" smtClean="0"/>
+          </a:p>
+          <a:p>
+            <a:r>
+              <a:rPr lang="en-US" b="1" baseline="0" dirty="0" smtClean="0"/>
+              <a:t>Depending jobs </a:t>
+            </a:r>
+            <a:r>
+              <a:rPr lang="en-US" baseline="0" dirty="0" smtClean="0"/>
+              <a:t>– Centrally coordinated jobs</a:t>
+            </a:r>
+          </a:p>
+          <a:p>
+            <a:endParaRPr lang="en-US" baseline="0" dirty="0" smtClean="0"/>
+          </a:p>
+          <a:p>
+            <a:endParaRPr lang="en-US" baseline="0" dirty="0" smtClean="0"/>
+          </a:p>
+          <a:p>
+            <a:r>
+              <a:rPr lang="en-US" baseline="0" dirty="0" smtClean="0"/>
+              <a:t>Feel free to check out http://</a:t>
+            </a:r>
+            <a:r>
+              <a:rPr lang="en-US" baseline="0" dirty="0" err="1" smtClean="0"/>
+              <a:t>saga.cct.lsu.edu</a:t>
+            </a:r>
+            <a:r>
+              <a:rPr lang="en-US" baseline="0" dirty="0" smtClean="0"/>
+              <a:t>/software/</a:t>
+            </a:r>
+            <a:r>
+              <a:rPr lang="en-US" baseline="0" dirty="0" err="1" smtClean="0"/>
+              <a:t>cpp</a:t>
+            </a:r>
+            <a:r>
+              <a:rPr lang="en-US" baseline="0" dirty="0" smtClean="0"/>
+              <a:t>/documentation/tutorials/loni-training-2010</a:t>
+            </a:r>
+          </a:p>
+          <a:p>
+            <a:endParaRPr lang="en-US" dirty="0"/>
+          </a:p>
+        </p:txBody>
+      </p:sp>
+      <p:sp>
+        <p:nvSpPr>
+          <p:cNvPr id="4" name="Slide Number Placeholder 3"/>
+          <p:cNvSpPr>
+            <a:spLocks noGrp="1"/>
+          </p:cNvSpPr>
+          <p:nvPr>
+            <p:ph type="sldNum" sz="quarter" idx="10"/>
+          </p:nvPr>
+        </p:nvSpPr>
+        <p:spPr/>
+        <p:txBody>
+          <a:bodyPr/>
+          <a:lstStyle/>
+          <a:p>
+            <a:fld id="{2415D97C-649C-43F9-ADD9-F4FB9523026C}" type="slidenum">
+              <a:rPr lang="en-US" smtClean="0"/>
+              <a:pPr/>
+              <a:t>26</a:t>
+            </a:fld>
+            <a:endParaRPr lang="en-US"/>
+          </a:p>
+        </p:txBody>
+      </p:sp>
+    </p:spTree>
+    <p:extLst>
+      <p:ext uri="{BB962C8B-B14F-4D97-AF65-F5344CB8AC3E}">
+        <p14:creationId xmlns:p14="http://schemas.microsoft.com/office/powerpoint/2010/main" val="3872439166"/>
       </p:ext>
     </p:extLst>
   </p:cSld>
@@ -10209,7 +10987,12 @@
             <p:ph idx="1"/>
           </p:nvPr>
         </p:nvSpPr>
-        <p:spPr/>
+        <p:spPr>
+          <a:xfrm>
+            <a:off x="1447159" y="2942035"/>
+            <a:ext cx="11557641" cy="5970078"/>
+          </a:xfrm>
+        </p:spPr>
         <p:txBody>
           <a:bodyPr/>
           <a:lstStyle/>
@@ -10224,112 +11007,192 @@
               <a:buNone/>
             </a:pPr>
             <a:r>
-              <a:rPr lang="en-US" dirty="0" smtClean="0"/>
+              <a:rPr lang="en-US" sz="2400" dirty="0" smtClean="0">
+                <a:latin typeface="Courier"/>
+              </a:rPr>
               <a:t>saga::</a:t>
             </a:r>
             <a:r>
-              <a:rPr lang="en-US" dirty="0" err="1" smtClean="0"/>
+              <a:rPr lang="en-US" sz="2400" dirty="0" err="1" smtClean="0">
+                <a:latin typeface="Courier"/>
+              </a:rPr>
               <a:t>url</a:t>
             </a:r>
             <a:r>
-              <a:rPr lang="en-US" dirty="0" smtClean="0"/>
+              <a:rPr lang="en-US" sz="2400" dirty="0" smtClean="0">
+                <a:latin typeface="Courier"/>
+              </a:rPr>
               <a:t> </a:t>
             </a:r>
             <a:r>
-              <a:rPr lang="en-US" dirty="0" err="1" smtClean="0"/>
+              <a:rPr lang="en-US" sz="2400" dirty="0" err="1" smtClean="0">
+                <a:latin typeface="Courier"/>
+              </a:rPr>
               <a:t>src</a:t>
             </a:r>
             <a:r>
-              <a:rPr lang="en-US" dirty="0" smtClean="0"/>
+              <a:rPr lang="en-US" sz="2400" dirty="0" smtClean="0">
+                <a:latin typeface="Courier"/>
+              </a:rPr>
               <a:t> (' … ');</a:t>
             </a:r>
             <a:br>
-              <a:rPr lang="en-US" dirty="0" smtClean="0"/>
+              <a:rPr lang="en-US" sz="2400" dirty="0" smtClean="0">
+                <a:latin typeface="Courier"/>
+              </a:rPr>
             </a:br>
             <a:r>
-              <a:rPr lang="en-US" dirty="0"/>
+              <a:rPr lang="en-US" sz="2400" dirty="0">
+                <a:latin typeface="Courier"/>
+              </a:rPr>
               <a:t>saga::</a:t>
             </a:r>
             <a:r>
-              <a:rPr lang="en-US" dirty="0" err="1"/>
+              <a:rPr lang="en-US" sz="2400" dirty="0" err="1">
+                <a:latin typeface="Courier"/>
+              </a:rPr>
               <a:t>url</a:t>
             </a:r>
             <a:r>
-              <a:rPr lang="en-US" dirty="0"/>
+              <a:rPr lang="en-US" sz="2400" dirty="0">
+                <a:latin typeface="Courier"/>
+              </a:rPr>
               <a:t> </a:t>
             </a:r>
             <a:r>
-              <a:rPr lang="en-US" dirty="0" err="1" smtClean="0"/>
+              <a:rPr lang="en-US" sz="2400" dirty="0" err="1" smtClean="0">
+                <a:latin typeface="Courier"/>
+              </a:rPr>
               <a:t>dst</a:t>
             </a:r>
             <a:r>
-              <a:rPr lang="en-US" dirty="0" smtClean="0"/>
+              <a:rPr lang="en-US" sz="2400" dirty="0" smtClean="0">
+                <a:latin typeface="Courier"/>
+              </a:rPr>
               <a:t> (' </a:t>
             </a:r>
             <a:r>
-              <a:rPr lang="en-US" dirty="0"/>
+              <a:rPr lang="en-US" sz="2400" dirty="0">
+                <a:latin typeface="Courier"/>
+              </a:rPr>
               <a:t>… </a:t>
             </a:r>
             <a:r>
-              <a:rPr lang="en-US" dirty="0" smtClean="0"/>
+              <a:rPr lang="en-US" sz="2400" dirty="0" smtClean="0">
+                <a:latin typeface="Courier"/>
+              </a:rPr>
               <a:t>');</a:t>
             </a:r>
             <a:r>
-              <a:rPr lang="en-US" dirty="0"/>
+              <a:rPr lang="en-US" sz="2400" dirty="0">
+                <a:latin typeface="Courier"/>
+              </a:rPr>
               <a:t/>
             </a:r>
             <a:br>
-              <a:rPr lang="en-US" dirty="0"/>
+              <a:rPr lang="en-US" sz="2400" dirty="0">
+                <a:latin typeface="Courier"/>
+              </a:rPr>
             </a:br>
             <a:r>
-              <a:rPr lang="en-US" dirty="0" smtClean="0"/>
-              <a:t>saga::file f(</a:t>
-            </a:r>
-            <a:r>
-              <a:rPr lang="en-US" dirty="0" err="1" smtClean="0"/>
+              <a:rPr lang="en-US" sz="2400" dirty="0" smtClean="0">
+                <a:latin typeface="Courier"/>
+              </a:rPr>
+              <a:t>saga::</a:t>
+            </a:r>
+            <a:r>
+              <a:rPr lang="en-US" sz="2400" dirty="0" err="1" smtClean="0">
+                <a:latin typeface="Courier"/>
+              </a:rPr>
+              <a:t>filesystem</a:t>
+            </a:r>
+            <a:r>
+              <a:rPr lang="en-US" sz="2400" dirty="0" smtClean="0">
+                <a:latin typeface="Courier"/>
+              </a:rPr>
+              <a:t>::file </a:t>
+            </a:r>
+            <a:r>
+              <a:rPr lang="en-US" sz="2400" dirty="0" smtClean="0">
+                <a:latin typeface="Courier"/>
+              </a:rPr>
+              <a:t>f(</a:t>
+            </a:r>
+            <a:r>
+              <a:rPr lang="en-US" sz="2400" dirty="0" err="1" smtClean="0">
+                <a:latin typeface="Courier"/>
+              </a:rPr>
               <a:t>src</a:t>
             </a:r>
             <a:r>
-              <a:rPr lang="en-US" dirty="0" smtClean="0"/>
-              <a:t>, saga::</a:t>
-            </a:r>
-            <a:r>
-              <a:rPr lang="en-US" dirty="0" err="1" smtClean="0"/>
+              <a:rPr lang="en-US" sz="2400" dirty="0" smtClean="0">
+                <a:latin typeface="Courier"/>
+              </a:rPr>
+              <a:t>, saga</a:t>
+            </a:r>
+            <a:r>
+              <a:rPr lang="en-US" sz="2400" dirty="0" smtClean="0">
+                <a:latin typeface="Courier"/>
+              </a:rPr>
+              <a:t>::</a:t>
+            </a:r>
+            <a:r>
+              <a:rPr lang="en-US" sz="2400" dirty="0" err="1" smtClean="0">
+                <a:latin typeface="Courier"/>
+              </a:rPr>
               <a:t>filesystem</a:t>
             </a:r>
             <a:r>
-              <a:rPr lang="en-US" dirty="0" smtClean="0"/>
+              <a:rPr lang="en-US" sz="2400" dirty="0" smtClean="0">
+                <a:latin typeface="Courier"/>
+              </a:rPr>
               <a:t>::</a:t>
             </a:r>
             <a:r>
-              <a:rPr lang="en-US" dirty="0" err="1" smtClean="0"/>
+              <a:rPr lang="en-US" sz="2400" dirty="0" err="1" smtClean="0">
+                <a:latin typeface="Courier"/>
+              </a:rPr>
               <a:t>ReadWrite</a:t>
             </a:r>
             <a:r>
-              <a:rPr lang="en-US" dirty="0" smtClean="0"/>
+              <a:rPr lang="en-US" sz="2400" dirty="0" smtClean="0">
+                <a:latin typeface="Courier"/>
+              </a:rPr>
               <a:t>);</a:t>
             </a:r>
             <a:r>
-              <a:rPr lang="en-US" dirty="0"/>
+              <a:rPr lang="en-US" sz="2400" dirty="0">
+                <a:latin typeface="Courier"/>
+              </a:rPr>
               <a:t/>
             </a:r>
             <a:br>
-              <a:rPr lang="en-US" dirty="0"/>
+              <a:rPr lang="en-US" sz="2400" dirty="0">
+                <a:latin typeface="Courier"/>
+              </a:rPr>
             </a:br>
             <a:r>
-              <a:rPr lang="en-US" dirty="0" err="1" smtClean="0"/>
+              <a:rPr lang="en-US" sz="2400" dirty="0" err="1" smtClean="0">
+                <a:latin typeface="Courier"/>
+              </a:rPr>
               <a:t>f.copy</a:t>
             </a:r>
             <a:r>
-              <a:rPr lang="en-US" dirty="0" smtClean="0"/>
+              <a:rPr lang="en-US" sz="2400" dirty="0" smtClean="0">
+                <a:latin typeface="Courier"/>
+              </a:rPr>
               <a:t>(</a:t>
             </a:r>
             <a:r>
-              <a:rPr lang="en-US" dirty="0" err="1" smtClean="0"/>
+              <a:rPr lang="en-US" sz="2400" dirty="0" err="1" smtClean="0">
+                <a:latin typeface="Courier"/>
+              </a:rPr>
               <a:t>dst</a:t>
             </a:r>
             <a:r>
-              <a:rPr lang="en-US" dirty="0" smtClean="0"/>
+              <a:rPr lang="en-US" sz="2400" dirty="0" smtClean="0">
+                <a:latin typeface="Courier"/>
+              </a:rPr>
               <a:t>);</a:t>
             </a:r>
           </a:p>
@@ -10514,227 +11377,443 @@
               </a:tabLst>
             </a:pPr>
             <a:r>
-              <a:rPr lang="en-US" dirty="0"/>
+              <a:rPr lang="en-US" sz="2000" dirty="0">
+                <a:latin typeface="Courier"/>
+                <a:cs typeface="Courier"/>
+              </a:rPr>
               <a:t>s</a:t>
             </a:r>
             <a:r>
-              <a:rPr lang="en-US" dirty="0" smtClean="0"/>
+              <a:rPr lang="en-US" sz="2000" dirty="0" smtClean="0">
+                <a:latin typeface="Courier"/>
+                <a:cs typeface="Courier"/>
+              </a:rPr>
               <a:t>aga::</a:t>
             </a:r>
             <a:r>
-              <a:rPr lang="en-US" dirty="0" err="1" smtClean="0"/>
+              <a:rPr lang="en-US" sz="2000" dirty="0" err="1" smtClean="0">
+                <a:latin typeface="Courier"/>
+                <a:cs typeface="Courier"/>
+              </a:rPr>
               <a:t>url</a:t>
             </a:r>
             <a:r>
-              <a:rPr lang="en-US" dirty="0" smtClean="0"/>
+              <a:rPr lang="en-US" sz="2000" dirty="0" smtClean="0">
+                <a:latin typeface="Courier"/>
+                <a:cs typeface="Courier"/>
+              </a:rPr>
               <a:t> </a:t>
             </a:r>
             <a:r>
-              <a:rPr lang="en-US" dirty="0" err="1" smtClean="0"/>
+              <a:rPr lang="en-US" sz="2000" dirty="0" err="1" smtClean="0">
+                <a:latin typeface="Courier"/>
+                <a:cs typeface="Courier"/>
+              </a:rPr>
               <a:t>src</a:t>
             </a:r>
             <a:r>
-              <a:rPr lang="en-US" dirty="0" smtClean="0"/>
+              <a:rPr lang="en-US" sz="2000" dirty="0" smtClean="0">
+                <a:latin typeface="Courier"/>
+                <a:cs typeface="Courier"/>
+              </a:rPr>
               <a:t> (' … ');</a:t>
             </a:r>
             <a:r>
-              <a:rPr lang="en-US" dirty="0"/>
+              <a:rPr lang="en-US" sz="2000" dirty="0">
+                <a:latin typeface="Courier"/>
+                <a:cs typeface="Courier"/>
+              </a:rPr>
               <a:t/>
             </a:r>
             <a:br>
-              <a:rPr lang="en-US" dirty="0"/>
+              <a:rPr lang="en-US" sz="2000" dirty="0">
+                <a:latin typeface="Courier"/>
+                <a:cs typeface="Courier"/>
+              </a:rPr>
             </a:br>
             <a:r>
-              <a:rPr lang="en-US" dirty="0" smtClean="0"/>
-              <a:t>saga::directory d (</a:t>
-            </a:r>
-            <a:r>
-              <a:rPr lang="en-US" dirty="0" err="1" smtClean="0"/>
+              <a:rPr lang="en-US" sz="2000" dirty="0" smtClean="0">
+                <a:latin typeface="Courier"/>
+                <a:cs typeface="Courier"/>
+              </a:rPr>
+              <a:t>saga:</a:t>
+            </a:r>
+            <a:r>
+              <a:rPr lang="en-US" sz="2000" dirty="0" smtClean="0">
+                <a:latin typeface="Courier"/>
+                <a:cs typeface="Courier"/>
+              </a:rPr>
+              <a:t>:</a:t>
+            </a:r>
+            <a:r>
+              <a:rPr lang="en-US" sz="2000" dirty="0" err="1" smtClean="0">
+                <a:latin typeface="Courier"/>
+                <a:cs typeface="Courier"/>
+              </a:rPr>
+              <a:t>filesystem</a:t>
+            </a:r>
+            <a:r>
+              <a:rPr lang="en-US" sz="2000" dirty="0" smtClean="0">
+                <a:latin typeface="Courier"/>
+                <a:cs typeface="Courier"/>
+              </a:rPr>
+              <a:t>::directory </a:t>
+            </a:r>
+            <a:r>
+              <a:rPr lang="en-US" sz="2000" dirty="0" smtClean="0">
+                <a:latin typeface="Courier"/>
+                <a:cs typeface="Courier"/>
+              </a:rPr>
+              <a:t>d (</a:t>
+            </a:r>
+            <a:r>
+              <a:rPr lang="en-US" sz="2000" dirty="0" err="1" smtClean="0">
+                <a:latin typeface="Courier"/>
+                <a:cs typeface="Courier"/>
+              </a:rPr>
               <a:t>src</a:t>
             </a:r>
             <a:r>
-              <a:rPr lang="en-US" dirty="0" smtClean="0"/>
+              <a:rPr lang="en-US" sz="2000" dirty="0" smtClean="0">
+                <a:latin typeface="Courier"/>
+                <a:cs typeface="Courier"/>
+              </a:rPr>
               <a:t>);</a:t>
             </a:r>
             <a:r>
-              <a:rPr lang="en-US" dirty="0"/>
+              <a:rPr lang="en-US" sz="2000" dirty="0">
+                <a:latin typeface="Courier"/>
+                <a:cs typeface="Courier"/>
+              </a:rPr>
               <a:t/>
             </a:r>
             <a:br>
-              <a:rPr lang="en-US" dirty="0"/>
+              <a:rPr lang="en-US" sz="2000" dirty="0">
+                <a:latin typeface="Courier"/>
+                <a:cs typeface="Courier"/>
+              </a:rPr>
             </a:br>
             <a:r>
-              <a:rPr lang="en-US" dirty="0" err="1" smtClean="0"/>
+              <a:rPr lang="en-US" sz="2000" dirty="0" err="1" smtClean="0">
+                <a:latin typeface="Courier"/>
+                <a:cs typeface="Courier"/>
+              </a:rPr>
               <a:t>std</a:t>
             </a:r>
             <a:r>
-              <a:rPr lang="en-US" dirty="0" smtClean="0"/>
+              <a:rPr lang="en-US" sz="2000" dirty="0" smtClean="0">
+                <a:latin typeface="Courier"/>
+                <a:cs typeface="Courier"/>
+              </a:rPr>
               <a:t>::vector&lt;</a:t>
             </a:r>
             <a:r>
-              <a:rPr lang="en-US" dirty="0" err="1" smtClean="0"/>
+              <a:rPr lang="en-US" sz="2000" dirty="0" err="1" smtClean="0">
+                <a:latin typeface="Courier"/>
+                <a:cs typeface="Courier"/>
+              </a:rPr>
               <a:t>std</a:t>
             </a:r>
             <a:r>
-              <a:rPr lang="en-US" dirty="0" smtClean="0"/>
+              <a:rPr lang="en-US" sz="2000" dirty="0" smtClean="0">
+                <a:latin typeface="Courier"/>
+                <a:cs typeface="Courier"/>
+              </a:rPr>
               <a:t>::string&gt; names = </a:t>
             </a:r>
             <a:r>
-              <a:rPr lang="en-US" dirty="0" err="1"/>
+              <a:rPr lang="en-US" sz="2000" dirty="0" err="1">
+                <a:latin typeface="Courier"/>
+                <a:cs typeface="Courier"/>
+              </a:rPr>
               <a:t>d</a:t>
             </a:r>
             <a:r>
-              <a:rPr lang="en-US" dirty="0" err="1" smtClean="0"/>
+              <a:rPr lang="en-US" sz="2000" dirty="0" err="1" smtClean="0">
+                <a:latin typeface="Courier"/>
+                <a:cs typeface="Courier"/>
+              </a:rPr>
               <a:t>.list</a:t>
             </a:r>
             <a:r>
-              <a:rPr lang="en-US" dirty="0" smtClean="0"/>
+              <a:rPr lang="en-US" sz="2000" dirty="0" smtClean="0">
+                <a:latin typeface="Courier"/>
+                <a:cs typeface="Courier"/>
+              </a:rPr>
               <a:t>('*');</a:t>
             </a:r>
             <a:r>
-              <a:rPr lang="en-US" dirty="0"/>
+              <a:rPr lang="en-US" sz="2000" dirty="0">
+                <a:latin typeface="Courier"/>
+                <a:cs typeface="Courier"/>
+              </a:rPr>
               <a:t/>
             </a:r>
             <a:br>
-              <a:rPr lang="en-US" dirty="0"/>
+              <a:rPr lang="en-US" sz="2000" dirty="0">
+                <a:latin typeface="Courier"/>
+                <a:cs typeface="Courier"/>
+              </a:rPr>
             </a:br>
             <a:r>
-              <a:rPr lang="en-US" dirty="0" smtClean="0"/>
+              <a:rPr lang="en-US" sz="2000" dirty="0" smtClean="0">
+                <a:latin typeface="Courier"/>
+                <a:cs typeface="Courier"/>
+              </a:rPr>
               <a:t/>
             </a:r>
             <a:br>
-              <a:rPr lang="en-US" dirty="0" smtClean="0"/>
+              <a:rPr lang="en-US" sz="2000" dirty="0" smtClean="0">
+                <a:latin typeface="Courier"/>
+                <a:cs typeface="Courier"/>
+              </a:rPr>
             </a:br>
             <a:r>
-              <a:rPr lang="en-US" dirty="0" smtClean="0"/>
-              <a:t>for (auto it = </a:t>
-            </a:r>
-            <a:r>
-              <a:rPr lang="en-US" dirty="0" err="1" smtClean="0"/>
+              <a:rPr lang="en-US" sz="2000" dirty="0" smtClean="0">
+                <a:latin typeface="Courier"/>
+                <a:cs typeface="Courier"/>
+              </a:rPr>
+              <a:t>for (</a:t>
+            </a:r>
+            <a:r>
+              <a:rPr lang="en-US" sz="2000" dirty="0" smtClean="0">
+                <a:latin typeface="Courier"/>
+                <a:cs typeface="Courier"/>
+              </a:rPr>
+              <a:t>auto it </a:t>
+            </a:r>
+            <a:r>
+              <a:rPr lang="en-US" sz="2000" dirty="0" smtClean="0">
+                <a:latin typeface="Courier"/>
+                <a:cs typeface="Courier"/>
+              </a:rPr>
+              <a:t>= </a:t>
+            </a:r>
+            <a:r>
+              <a:rPr lang="en-US" sz="2000" dirty="0" err="1" smtClean="0">
+                <a:latin typeface="Courier"/>
+                <a:cs typeface="Courier"/>
+              </a:rPr>
               <a:t>names.begin</a:t>
             </a:r>
             <a:r>
-              <a:rPr lang="en-US" dirty="0" smtClean="0"/>
+              <a:rPr lang="en-US" sz="2000" dirty="0" smtClean="0">
+                <a:latin typeface="Courier"/>
+                <a:cs typeface="Courier"/>
+              </a:rPr>
               <a:t>(); it != </a:t>
             </a:r>
             <a:r>
-              <a:rPr lang="en-US" dirty="0" err="1" smtClean="0"/>
+              <a:rPr lang="en-US" sz="2000" dirty="0" err="1" smtClean="0">
+                <a:latin typeface="Courier"/>
+                <a:cs typeface="Courier"/>
+              </a:rPr>
               <a:t>names.end</a:t>
             </a:r>
             <a:r>
-              <a:rPr lang="en-US" dirty="0" smtClean="0"/>
+              <a:rPr lang="en-US" sz="2000" dirty="0" smtClean="0">
+                <a:latin typeface="Courier"/>
+                <a:cs typeface="Courier"/>
+              </a:rPr>
               <a:t>(); ++it) {</a:t>
             </a:r>
             <a:br>
-              <a:rPr lang="en-US" dirty="0" smtClean="0"/>
+              <a:rPr lang="en-US" sz="2000" dirty="0" smtClean="0">
+                <a:latin typeface="Courier"/>
+                <a:cs typeface="Courier"/>
+              </a:rPr>
             </a:br>
             <a:r>
-              <a:rPr lang="en-US" dirty="0"/>
+              <a:rPr lang="en-US" sz="2000" dirty="0">
+                <a:latin typeface="Courier"/>
+                <a:cs typeface="Courier"/>
+              </a:rPr>
               <a:t>	</a:t>
             </a:r>
             <a:r>
-              <a:rPr lang="en-US" dirty="0" smtClean="0"/>
+              <a:rPr lang="en-US" sz="2000" dirty="0" smtClean="0">
+                <a:latin typeface="Courier"/>
+                <a:cs typeface="Courier"/>
+              </a:rPr>
               <a:t>saga::</a:t>
             </a:r>
             <a:r>
-              <a:rPr lang="en-US" dirty="0" err="1" smtClean="0"/>
+              <a:rPr lang="en-US" sz="2000" dirty="0" err="1" smtClean="0">
+                <a:latin typeface="Courier"/>
+                <a:cs typeface="Courier"/>
+              </a:rPr>
               <a:t>name_space</a:t>
             </a:r>
             <a:r>
-              <a:rPr lang="en-US" dirty="0" smtClean="0"/>
+              <a:rPr lang="en-US" sz="2000" dirty="0" smtClean="0">
+                <a:latin typeface="Courier"/>
+                <a:cs typeface="Courier"/>
+              </a:rPr>
               <a:t>::entry ns (*it);</a:t>
             </a:r>
             <a:br>
-              <a:rPr lang="en-US" dirty="0" smtClean="0"/>
+              <a:rPr lang="en-US" sz="2000" dirty="0" smtClean="0">
+                <a:latin typeface="Courier"/>
+                <a:cs typeface="Courier"/>
+              </a:rPr>
             </a:br>
             <a:r>
-              <a:rPr lang="en-US" dirty="0"/>
+              <a:rPr lang="en-US" sz="2000" dirty="0">
+                <a:latin typeface="Courier"/>
+                <a:cs typeface="Courier"/>
+              </a:rPr>
               <a:t>	</a:t>
             </a:r>
             <a:r>
-              <a:rPr lang="en-US" dirty="0" smtClean="0"/>
+              <a:rPr lang="en-US" sz="2000" dirty="0" smtClean="0">
+                <a:latin typeface="Courier"/>
+                <a:cs typeface="Courier"/>
+              </a:rPr>
               <a:t>if (</a:t>
             </a:r>
             <a:r>
-              <a:rPr lang="en-US" dirty="0" err="1" smtClean="0"/>
+              <a:rPr lang="en-US" sz="2000" dirty="0" err="1" smtClean="0">
+                <a:latin typeface="Courier"/>
+                <a:cs typeface="Courier"/>
+              </a:rPr>
               <a:t>ns.is_dir</a:t>
             </a:r>
             <a:r>
-              <a:rPr lang="en-US" dirty="0" smtClean="0"/>
+              <a:rPr lang="en-US" sz="2000" dirty="0" smtClean="0">
+                <a:latin typeface="Courier"/>
+                <a:cs typeface="Courier"/>
+              </a:rPr>
               <a:t>())		</a:t>
             </a:r>
             <a:r>
-              <a:rPr lang="en-US" dirty="0" err="1" smtClean="0"/>
+              <a:rPr lang="en-US" sz="2000" dirty="0" err="1" smtClean="0">
+                <a:latin typeface="Courier"/>
+                <a:cs typeface="Courier"/>
+              </a:rPr>
               <a:t>cout</a:t>
             </a:r>
             <a:r>
-              <a:rPr lang="en-US" dirty="0" smtClean="0"/>
+              <a:rPr lang="en-US" sz="2000" dirty="0" smtClean="0">
+                <a:latin typeface="Courier"/>
+                <a:cs typeface="Courier"/>
+              </a:rPr>
               <a:t> &lt;&lt; 'd ' &lt;&lt;  *it &lt;&lt; </a:t>
             </a:r>
             <a:r>
-              <a:rPr lang="en-US" dirty="0"/>
+              <a:rPr lang="en-US" sz="2000" dirty="0">
+                <a:latin typeface="Courier"/>
+                <a:cs typeface="Courier"/>
+              </a:rPr>
               <a:t>'\n'; 	</a:t>
             </a:r>
             <a:r>
-              <a:rPr lang="en-US" dirty="0" smtClean="0"/>
+              <a:rPr lang="en-US" sz="2000" dirty="0" smtClean="0">
+                <a:latin typeface="Courier"/>
+                <a:cs typeface="Courier"/>
+              </a:rPr>
               <a:t>else if (</a:t>
             </a:r>
             <a:r>
-              <a:rPr lang="en-US" dirty="0" err="1" smtClean="0"/>
+              <a:rPr lang="en-US" sz="2000" dirty="0" err="1" smtClean="0">
+                <a:latin typeface="Courier"/>
+                <a:cs typeface="Courier"/>
+              </a:rPr>
               <a:t>ns.is_link</a:t>
             </a:r>
             <a:r>
-              <a:rPr lang="en-US" dirty="0" smtClean="0"/>
+              <a:rPr lang="en-US" sz="2000" dirty="0" smtClean="0">
+                <a:latin typeface="Courier"/>
+                <a:cs typeface="Courier"/>
+              </a:rPr>
               <a:t>())	</a:t>
             </a:r>
             <a:r>
-              <a:rPr lang="en-US" dirty="0" err="1" smtClean="0"/>
+              <a:rPr lang="en-US" sz="2000" dirty="0" err="1" smtClean="0">
+                <a:latin typeface="Courier"/>
+                <a:cs typeface="Courier"/>
+              </a:rPr>
               <a:t>cout</a:t>
             </a:r>
             <a:r>
-              <a:rPr lang="en-US" dirty="0" smtClean="0"/>
+              <a:rPr lang="en-US" sz="2000" dirty="0" smtClean="0">
+                <a:latin typeface="Courier"/>
+                <a:cs typeface="Courier"/>
+              </a:rPr>
               <a:t> &lt;&lt; '-&gt;' &lt;&lt; </a:t>
             </a:r>
             <a:r>
-              <a:rPr lang="en-US" dirty="0" err="1" smtClean="0"/>
+              <a:rPr lang="en-US" sz="2000" dirty="0" err="1" smtClean="0">
+                <a:latin typeface="Courier"/>
+                <a:cs typeface="Courier"/>
+              </a:rPr>
               <a:t>ns.read_link</a:t>
             </a:r>
             <a:r>
-              <a:rPr lang="en-US" dirty="0" smtClean="0"/>
+              <a:rPr lang="en-US" sz="2000" dirty="0" smtClean="0">
+                <a:latin typeface="Courier"/>
+                <a:cs typeface="Courier"/>
+              </a:rPr>
               <a:t>() &lt;&lt; '\n';</a:t>
             </a:r>
             <a:br>
-              <a:rPr lang="en-US" dirty="0" smtClean="0"/>
+              <a:rPr lang="en-US" sz="2000" dirty="0" smtClean="0">
+                <a:latin typeface="Courier"/>
+                <a:cs typeface="Courier"/>
+              </a:rPr>
             </a:br>
             <a:r>
-              <a:rPr lang="en-US" dirty="0"/>
+              <a:rPr lang="en-US" sz="2000" dirty="0">
+                <a:latin typeface="Courier"/>
+                <a:cs typeface="Courier"/>
+              </a:rPr>
               <a:t>	</a:t>
             </a:r>
             <a:r>
-              <a:rPr lang="en-US" dirty="0" smtClean="0"/>
+              <a:rPr lang="en-US" sz="2000" dirty="0" smtClean="0">
+                <a:latin typeface="Courier"/>
+                <a:cs typeface="Courier"/>
+              </a:rPr>
               <a:t>else:		</a:t>
             </a:r>
             <a:r>
-              <a:rPr lang="en-US" dirty="0" err="1" smtClean="0"/>
+              <a:rPr lang="en-US" sz="2000" dirty="0" err="1" smtClean="0">
+                <a:latin typeface="Courier"/>
+                <a:cs typeface="Courier"/>
+              </a:rPr>
               <a:t>cout</a:t>
             </a:r>
             <a:r>
-              <a:rPr lang="en-US" dirty="0" smtClean="0"/>
+              <a:rPr lang="en-US" sz="2000" dirty="0" smtClean="0">
+                <a:latin typeface="Courier"/>
+                <a:cs typeface="Courier"/>
+              </a:rPr>
               <a:t> &lt;&lt; '  ' &lt;&lt; *it &lt;&lt; </a:t>
             </a:r>
             <a:r>
-              <a:rPr lang="en-US" dirty="0"/>
+              <a:rPr lang="en-US" sz="2000" dirty="0">
+                <a:latin typeface="Courier"/>
+                <a:cs typeface="Courier"/>
+              </a:rPr>
               <a:t>'\n</a:t>
             </a:r>
             <a:r>
-              <a:rPr lang="en-US" dirty="0" smtClean="0"/>
+              <a:rPr lang="en-US" sz="2000" dirty="0" smtClean="0">
+                <a:latin typeface="Courier"/>
+                <a:cs typeface="Courier"/>
+              </a:rPr>
               <a:t>';</a:t>
             </a:r>
             <a:br>
-              <a:rPr lang="en-US" dirty="0" smtClean="0"/>
+              <a:rPr lang="en-US" sz="2000" dirty="0" smtClean="0">
+                <a:latin typeface="Courier"/>
+                <a:cs typeface="Courier"/>
+              </a:rPr>
             </a:br>
             <a:r>
-              <a:rPr lang="en-US" dirty="0" smtClean="0"/>
+              <a:rPr lang="en-US" sz="2000" dirty="0" smtClean="0">
+                <a:latin typeface="Courier"/>
+                <a:cs typeface="Courier"/>
+              </a:rPr>
               <a:t>}</a:t>
             </a:r>
           </a:p>
@@ -11068,7 +12147,7 @@
         <p:spPr/>
         <p:txBody>
           <a:bodyPr>
-            <a:normAutofit lnSpcReduction="10000"/>
+            <a:normAutofit/>
           </a:bodyPr>
           <a:lstStyle/>
           <a:p>
@@ -11082,38 +12161,65 @@
               <a:buNone/>
             </a:pPr>
             <a:r>
-              <a:rPr lang="en-US" dirty="0" smtClean="0"/>
+              <a:rPr lang="en-US" sz="2000" dirty="0" smtClean="0">
+                <a:latin typeface="Courier"/>
+                <a:cs typeface="Courier"/>
+              </a:rPr>
               <a:t>saga::</a:t>
             </a:r>
             <a:r>
-              <a:rPr lang="en-US" dirty="0" err="1" smtClean="0"/>
+              <a:rPr lang="en-US" sz="2000" dirty="0" err="1" smtClean="0">
+                <a:latin typeface="Courier"/>
+                <a:cs typeface="Courier"/>
+              </a:rPr>
               <a:t>url</a:t>
             </a:r>
             <a:r>
-              <a:rPr lang="en-US" dirty="0"/>
+              <a:rPr lang="en-US" sz="2000" dirty="0">
+                <a:latin typeface="Courier"/>
+                <a:cs typeface="Courier"/>
+              </a:rPr>
               <a:t> </a:t>
             </a:r>
             <a:r>
-              <a:rPr lang="en-US" dirty="0" err="1"/>
+              <a:rPr lang="en-US" sz="2000" dirty="0" err="1">
+                <a:latin typeface="Courier"/>
+                <a:cs typeface="Courier"/>
+              </a:rPr>
               <a:t>js_url</a:t>
             </a:r>
             <a:r>
-              <a:rPr lang="en-US" dirty="0" smtClean="0"/>
+              <a:rPr lang="en-US" sz="2000" dirty="0" smtClean="0">
+                <a:latin typeface="Courier"/>
+                <a:cs typeface="Courier"/>
+              </a:rPr>
               <a:t>("</a:t>
             </a:r>
             <a:r>
-              <a:rPr lang="en-US" dirty="0"/>
+              <a:rPr lang="en-US" sz="2000" dirty="0">
+                <a:latin typeface="Courier"/>
+                <a:cs typeface="Courier"/>
+              </a:rPr>
               <a:t>fork://</a:t>
             </a:r>
             <a:r>
-              <a:rPr lang="en-US" dirty="0" err="1"/>
+              <a:rPr lang="en-US" sz="2000" dirty="0" err="1">
+                <a:latin typeface="Courier"/>
+                <a:cs typeface="Courier"/>
+              </a:rPr>
               <a:t>localhost</a:t>
             </a:r>
             <a:r>
-              <a:rPr lang="en-US" dirty="0" smtClean="0"/>
+              <a:rPr lang="en-US" sz="2000" dirty="0" smtClean="0">
+                <a:latin typeface="Courier"/>
+                <a:cs typeface="Courier"/>
+              </a:rPr>
               <a:t>/");</a:t>
             </a:r>
-            <a:endParaRPr lang="en-US" dirty="0"/>
+            <a:endParaRPr lang="en-US" sz="2000" dirty="0">
+              <a:latin typeface="Courier"/>
+              <a:cs typeface="Courier"/>
+            </a:endParaRPr>
           </a:p>
           <a:p>
             <a:pPr marL="0" indent="0">
@@ -11123,30 +12229,51 @@
               <a:buNone/>
             </a:pPr>
             <a:r>
-              <a:rPr lang="en-US" dirty="0"/>
+              <a:rPr lang="en-US" sz="2000" dirty="0">
+                <a:latin typeface="Courier"/>
+                <a:cs typeface="Courier"/>
+              </a:rPr>
               <a:t>s</a:t>
             </a:r>
             <a:r>
-              <a:rPr lang="en-US" dirty="0" smtClean="0"/>
+              <a:rPr lang="en-US" sz="2000" dirty="0" smtClean="0">
+                <a:latin typeface="Courier"/>
+                <a:cs typeface="Courier"/>
+              </a:rPr>
               <a:t>aga::job::service </a:t>
             </a:r>
             <a:r>
-              <a:rPr lang="en-US" dirty="0" err="1" smtClean="0"/>
+              <a:rPr lang="en-US" sz="2000" dirty="0" err="1" smtClean="0">
+                <a:latin typeface="Courier"/>
+                <a:cs typeface="Courier"/>
+              </a:rPr>
               <a:t>js</a:t>
             </a:r>
             <a:r>
-              <a:rPr lang="en-US" dirty="0" smtClean="0"/>
+              <a:rPr lang="en-US" sz="2000" dirty="0" smtClean="0">
+                <a:latin typeface="Courier"/>
+                <a:cs typeface="Courier"/>
+              </a:rPr>
               <a:t>(</a:t>
             </a:r>
             <a:r>
-              <a:rPr lang="en-US" dirty="0" err="1" smtClean="0"/>
+              <a:rPr lang="en-US" sz="2000" dirty="0" err="1" smtClean="0">
+                <a:latin typeface="Courier"/>
+                <a:cs typeface="Courier"/>
+              </a:rPr>
               <a:t>js_url</a:t>
             </a:r>
             <a:r>
-              <a:rPr lang="en-US" dirty="0" smtClean="0"/>
+              <a:rPr lang="en-US" sz="2000" dirty="0" smtClean="0">
+                <a:latin typeface="Courier"/>
+                <a:cs typeface="Courier"/>
+              </a:rPr>
               <a:t>);</a:t>
             </a:r>
-            <a:endParaRPr lang="en-US" dirty="0"/>
+            <a:endParaRPr lang="en-US" sz="2000" dirty="0">
+              <a:latin typeface="Courier"/>
+              <a:cs typeface="Courier"/>
+            </a:endParaRPr>
           </a:p>
           <a:p>
             <a:pPr marL="0" indent="0">
@@ -11156,18 +12283,30 @@
               <a:buNone/>
             </a:pPr>
             <a:r>
-              <a:rPr lang="en-US" dirty="0" smtClean="0"/>
+              <a:rPr lang="en-US" sz="2000" dirty="0" smtClean="0">
+                <a:latin typeface="Courier"/>
+                <a:cs typeface="Courier"/>
+              </a:rPr>
               <a:t>saga::job::description </a:t>
             </a:r>
             <a:r>
-              <a:rPr lang="en-US" dirty="0" err="1" smtClean="0"/>
+              <a:rPr lang="en-US" sz="2000" dirty="0" err="1" smtClean="0">
+                <a:latin typeface="Courier"/>
+                <a:cs typeface="Courier"/>
+              </a:rPr>
               <a:t>jd</a:t>
             </a:r>
             <a:r>
-              <a:rPr lang="en-US" dirty="0" smtClean="0"/>
+              <a:rPr lang="en-US" sz="2000" dirty="0" smtClean="0">
+                <a:latin typeface="Courier"/>
+                <a:cs typeface="Courier"/>
+              </a:rPr>
               <a:t>;</a:t>
             </a:r>
-            <a:endParaRPr lang="en-US" dirty="0"/>
+            <a:endParaRPr lang="en-US" sz="2000" dirty="0">
+              <a:latin typeface="Courier"/>
+              <a:cs typeface="Courier"/>
+            </a:endParaRPr>
           </a:p>
           <a:p>
             <a:pPr marL="0" indent="0">
@@ -11177,11 +12316,17 @@
               <a:buNone/>
             </a:pPr>
             <a:r>
-              <a:rPr lang="en-US" dirty="0" err="1" smtClean="0"/>
+              <a:rPr lang="en-US" sz="2000" dirty="0" err="1" smtClean="0">
+                <a:latin typeface="Courier"/>
+                <a:cs typeface="Courier"/>
+              </a:rPr>
               <a:t>js.set_attribute</a:t>
             </a:r>
             <a:r>
-              <a:rPr lang="en-US" dirty="0" smtClean="0"/>
+              <a:rPr lang="en-US" sz="2000" dirty="0" smtClean="0">
+                <a:latin typeface="Courier"/>
+                <a:cs typeface="Courier"/>
+              </a:rPr>
               <a:t>("executable", "touch");</a:t>
             </a:r>
           </a:p>
@@ -11192,7 +12337,10 @@
               </a:spcBef>
               <a:buNone/>
             </a:pPr>
-            <a:endParaRPr lang="en-US" dirty="0" smtClean="0"/>
+            <a:endParaRPr lang="en-US" sz="2000" dirty="0" smtClean="0">
+              <a:latin typeface="Courier"/>
+              <a:cs typeface="Courier"/>
+            </a:endParaRPr>
           </a:p>
           <a:p>
             <a:pPr marL="0" indent="0">
@@ -11202,27 +12350,45 @@
               <a:buNone/>
             </a:pPr>
             <a:r>
-              <a:rPr lang="en-US" dirty="0" err="1" smtClean="0"/>
+              <a:rPr lang="en-US" sz="2000" dirty="0" err="1" smtClean="0">
+                <a:latin typeface="Courier"/>
+                <a:cs typeface="Courier"/>
+              </a:rPr>
               <a:t>std</a:t>
             </a:r>
             <a:r>
-              <a:rPr lang="en-US" dirty="0" smtClean="0"/>
+              <a:rPr lang="en-US" sz="2000" dirty="0" smtClean="0">
+                <a:latin typeface="Courier"/>
+                <a:cs typeface="Courier"/>
+              </a:rPr>
               <a:t>::vector&lt;</a:t>
             </a:r>
             <a:r>
-              <a:rPr lang="en-US" dirty="0" err="1" smtClean="0"/>
+              <a:rPr lang="en-US" sz="2000" dirty="0" err="1" smtClean="0">
+                <a:latin typeface="Courier"/>
+                <a:cs typeface="Courier"/>
+              </a:rPr>
               <a:t>std</a:t>
             </a:r>
             <a:r>
-              <a:rPr lang="en-US" dirty="0" smtClean="0"/>
+              <a:rPr lang="en-US" sz="2000" dirty="0" smtClean="0">
+                <a:latin typeface="Courier"/>
+                <a:cs typeface="Courier"/>
+              </a:rPr>
               <a:t>::string&gt; </a:t>
             </a:r>
             <a:r>
-              <a:rPr lang="en-US" dirty="0" err="1" smtClean="0"/>
+              <a:rPr lang="en-US" sz="2000" dirty="0" err="1" smtClean="0">
+                <a:latin typeface="Courier"/>
+                <a:cs typeface="Courier"/>
+              </a:rPr>
               <a:t>args</a:t>
             </a:r>
             <a:r>
-              <a:rPr lang="en-US" dirty="0" smtClean="0"/>
+              <a:rPr lang="en-US" sz="2000" dirty="0" smtClean="0">
+                <a:latin typeface="Courier"/>
+                <a:cs typeface="Courier"/>
+              </a:rPr>
               <a:t>;</a:t>
             </a:r>
           </a:p>
@@ -11234,11 +12400,17 @@
               <a:buNone/>
             </a:pPr>
             <a:r>
-              <a:rPr lang="en-US" dirty="0" err="1" smtClean="0"/>
+              <a:rPr lang="en-US" sz="2000" dirty="0" err="1" smtClean="0">
+                <a:latin typeface="Courier"/>
+                <a:cs typeface="Courier"/>
+              </a:rPr>
               <a:t>args.push_back</a:t>
             </a:r>
             <a:r>
-              <a:rPr lang="en-US" dirty="0" smtClean="0"/>
+              <a:rPr lang="en-US" sz="2000" dirty="0" smtClean="0">
+                <a:latin typeface="Courier"/>
+                <a:cs typeface="Courier"/>
+              </a:rPr>
               <a:t>("-a");</a:t>
             </a:r>
           </a:p>
@@ -11250,14 +12422,23 @@
               <a:buNone/>
             </a:pPr>
             <a:r>
-              <a:rPr lang="en-US" dirty="0" err="1"/>
+              <a:rPr lang="en-US" sz="2000" dirty="0" err="1">
+                <a:latin typeface="Courier"/>
+                <a:cs typeface="Courier"/>
+              </a:rPr>
               <a:t>args.push_back</a:t>
             </a:r>
             <a:r>
-              <a:rPr lang="en-US" dirty="0" smtClean="0"/>
+              <a:rPr lang="en-US" sz="2000" dirty="0" smtClean="0">
+                <a:latin typeface="Courier"/>
+                <a:cs typeface="Courier"/>
+              </a:rPr>
               <a:t>("...filename…");</a:t>
             </a:r>
-            <a:endParaRPr lang="en-US" dirty="0"/>
+            <a:endParaRPr lang="en-US" sz="2000" dirty="0">
+              <a:latin typeface="Courier"/>
+              <a:cs typeface="Courier"/>
+            </a:endParaRPr>
           </a:p>
           <a:p>
             <a:pPr marL="0" indent="0">
@@ -11267,22 +12448,37 @@
               <a:buNone/>
             </a:pPr>
             <a:r>
-              <a:rPr lang="en-US" dirty="0" err="1" smtClean="0"/>
+              <a:rPr lang="en-US" sz="2000" dirty="0" err="1" smtClean="0">
+                <a:latin typeface="Courier"/>
+                <a:cs typeface="Courier"/>
+              </a:rPr>
               <a:t>js.set_vector_attribute</a:t>
             </a:r>
             <a:r>
-              <a:rPr lang="en-US" dirty="0" smtClean="0"/>
+              <a:rPr lang="en-US" sz="2000" dirty="0" smtClean="0">
+                <a:latin typeface="Courier"/>
+                <a:cs typeface="Courier"/>
+              </a:rPr>
               <a:t>("arguments", </a:t>
             </a:r>
             <a:r>
-              <a:rPr lang="en-US" dirty="0" err="1" smtClean="0"/>
+              <a:rPr lang="en-US" sz="2000" dirty="0" err="1" smtClean="0">
+                <a:latin typeface="Courier"/>
+                <a:cs typeface="Courier"/>
+              </a:rPr>
               <a:t>args</a:t>
             </a:r>
             <a:r>
-              <a:rPr lang="en-US" dirty="0" smtClean="0"/>
+              <a:rPr lang="en-US" sz="2000" dirty="0" smtClean="0">
+                <a:latin typeface="Courier"/>
+                <a:cs typeface="Courier"/>
+              </a:rPr>
               <a:t>);</a:t>
             </a:r>
-            <a:endParaRPr lang="en-US" dirty="0"/>
+            <a:endParaRPr lang="en-US" sz="2000" dirty="0">
+              <a:latin typeface="Courier"/>
+              <a:cs typeface="Courier"/>
+            </a:endParaRPr>
           </a:p>
           <a:p>
             <a:pPr marL="0" indent="0">
@@ -11291,7 +12487,10 @@
               </a:spcBef>
               <a:buNone/>
             </a:pPr>
-            <a:endParaRPr lang="en-US" dirty="0" smtClean="0"/>
+            <a:endParaRPr lang="en-US" sz="2000" dirty="0" smtClean="0">
+              <a:latin typeface="Courier"/>
+              <a:cs typeface="Courier"/>
+            </a:endParaRPr>
           </a:p>
           <a:p>
             <a:pPr marL="0" indent="0">
@@ -11301,26 +12500,44 @@
               <a:buNone/>
             </a:pPr>
             <a:r>
-              <a:rPr lang="en-US" dirty="0" smtClean="0"/>
+              <a:rPr lang="en-US" sz="2000" dirty="0" smtClean="0">
+                <a:latin typeface="Courier"/>
+                <a:cs typeface="Courier"/>
+              </a:rPr>
               <a:t>saga::job::job j = </a:t>
             </a:r>
             <a:r>
-              <a:rPr lang="en-US" dirty="0" err="1" smtClean="0"/>
+              <a:rPr lang="en-US" sz="2000" dirty="0" err="1" smtClean="0">
+                <a:latin typeface="Courier"/>
+                <a:cs typeface="Courier"/>
+              </a:rPr>
               <a:t>js.create_job</a:t>
             </a:r>
             <a:r>
-              <a:rPr lang="en-US" dirty="0" smtClean="0"/>
+              <a:rPr lang="en-US" sz="2000" dirty="0" smtClean="0">
+                <a:latin typeface="Courier"/>
+                <a:cs typeface="Courier"/>
+              </a:rPr>
               <a:t>(</a:t>
             </a:r>
             <a:r>
-              <a:rPr lang="en-US" dirty="0" err="1" smtClean="0"/>
+              <a:rPr lang="en-US" sz="2000" dirty="0" err="1" smtClean="0">
+                <a:latin typeface="Courier"/>
+                <a:cs typeface="Courier"/>
+              </a:rPr>
               <a:t>jd</a:t>
             </a:r>
             <a:r>
-              <a:rPr lang="en-US" dirty="0" smtClean="0"/>
+              <a:rPr lang="en-US" sz="2000" dirty="0" smtClean="0">
+                <a:latin typeface="Courier"/>
+                <a:cs typeface="Courier"/>
+              </a:rPr>
               <a:t>);</a:t>
             </a:r>
-            <a:endParaRPr lang="en-US" dirty="0"/>
+            <a:endParaRPr lang="en-US" sz="2000" dirty="0">
+              <a:latin typeface="Courier"/>
+              <a:cs typeface="Courier"/>
+            </a:endParaRPr>
           </a:p>
           <a:p>
             <a:pPr marL="0" indent="0">
@@ -11330,18 +12547,30 @@
               <a:buNone/>
             </a:pPr>
             <a:r>
-              <a:rPr lang="en-US" dirty="0" err="1"/>
+              <a:rPr lang="en-US" sz="2000" dirty="0" err="1">
+                <a:latin typeface="Courier"/>
+                <a:cs typeface="Courier"/>
+              </a:rPr>
               <a:t>j</a:t>
             </a:r>
             <a:r>
-              <a:rPr lang="en-US" dirty="0" err="1" smtClean="0"/>
+              <a:rPr lang="en-US" sz="2000" dirty="0" err="1" smtClean="0">
+                <a:latin typeface="Courier"/>
+                <a:cs typeface="Courier"/>
+              </a:rPr>
               <a:t>.run</a:t>
             </a:r>
             <a:r>
-              <a:rPr lang="en-US" dirty="0" smtClean="0"/>
+              <a:rPr lang="en-US" sz="2000" dirty="0" smtClean="0">
+                <a:latin typeface="Courier"/>
+                <a:cs typeface="Courier"/>
+              </a:rPr>
               <a:t>();</a:t>
             </a:r>
-            <a:endParaRPr lang="en-US" dirty="0"/>
+            <a:endParaRPr lang="en-US" sz="2000" dirty="0">
+              <a:latin typeface="Courier"/>
+              <a:cs typeface="Courier"/>
+            </a:endParaRPr>
           </a:p>
         </p:txBody>
       </p:sp>
@@ -11508,22 +12737,37 @@
               <a:buNone/>
             </a:pPr>
             <a:r>
-              <a:rPr lang="en-US" dirty="0" smtClean="0"/>
+              <a:rPr lang="en-US" sz="2000" dirty="0" smtClean="0">
+                <a:latin typeface="Courier"/>
+                <a:cs typeface="Courier"/>
+              </a:rPr>
               <a:t>saga</a:t>
             </a:r>
             <a:r>
-              <a:rPr lang="en-US" dirty="0"/>
+              <a:rPr lang="en-US" sz="2000" dirty="0">
+                <a:latin typeface="Courier"/>
+                <a:cs typeface="Courier"/>
+              </a:rPr>
               <a:t>::job::service </a:t>
             </a:r>
             <a:r>
-              <a:rPr lang="en-US" dirty="0" err="1" smtClean="0"/>
+              <a:rPr lang="en-US" sz="2000" dirty="0" err="1" smtClean="0">
+                <a:latin typeface="Courier"/>
+                <a:cs typeface="Courier"/>
+              </a:rPr>
               <a:t>js</a:t>
             </a:r>
             <a:r>
-              <a:rPr lang="en-US" dirty="0" smtClean="0"/>
+              <a:rPr lang="en-US" sz="2000" dirty="0" smtClean="0">
+                <a:latin typeface="Courier"/>
+                <a:cs typeface="Courier"/>
+              </a:rPr>
               <a:t>;</a:t>
             </a:r>
-            <a:endParaRPr lang="en-US" dirty="0"/>
+            <a:endParaRPr lang="en-US" sz="2000" dirty="0">
+              <a:latin typeface="Courier"/>
+              <a:cs typeface="Courier"/>
+            </a:endParaRPr>
           </a:p>
           <a:p>
             <a:pPr marL="0" indent="0">
@@ -11533,15 +12777,24 @@
               <a:buNone/>
             </a:pPr>
             <a:r>
-              <a:rPr lang="en-US" dirty="0" smtClean="0"/>
+              <a:rPr lang="en-US" sz="2000" dirty="0" smtClean="0">
+                <a:latin typeface="Courier"/>
+                <a:cs typeface="Courier"/>
+              </a:rPr>
               <a:t>saga::job::</a:t>
             </a:r>
             <a:r>
-              <a:rPr lang="en-US" dirty="0" err="1" smtClean="0"/>
+              <a:rPr lang="en-US" sz="2000" dirty="0" err="1" smtClean="0">
+                <a:latin typeface="Courier"/>
+                <a:cs typeface="Courier"/>
+              </a:rPr>
               <a:t>ostream</a:t>
             </a:r>
             <a:r>
-              <a:rPr lang="en-US" dirty="0" smtClean="0"/>
+              <a:rPr lang="en-US" sz="2000" dirty="0" smtClean="0">
+                <a:latin typeface="Courier"/>
+                <a:cs typeface="Courier"/>
+              </a:rPr>
               <a:t> in;</a:t>
             </a:r>
           </a:p>
@@ -11553,22 +12806,37 @@
               <a:buNone/>
             </a:pPr>
             <a:r>
-              <a:rPr lang="en-US" dirty="0"/>
+              <a:rPr lang="en-US" sz="2000" dirty="0">
+                <a:latin typeface="Courier"/>
+                <a:cs typeface="Courier"/>
+              </a:rPr>
               <a:t>saga::job</a:t>
             </a:r>
             <a:r>
-              <a:rPr lang="en-US" dirty="0" smtClean="0"/>
+              <a:rPr lang="en-US" sz="2000" dirty="0" smtClean="0">
+                <a:latin typeface="Courier"/>
+                <a:cs typeface="Courier"/>
+              </a:rPr>
               <a:t>::</a:t>
             </a:r>
             <a:r>
-              <a:rPr lang="en-US" dirty="0" err="1" smtClean="0"/>
+              <a:rPr lang="en-US" sz="2000" dirty="0" err="1" smtClean="0">
+                <a:latin typeface="Courier"/>
+                <a:cs typeface="Courier"/>
+              </a:rPr>
               <a:t>istream</a:t>
             </a:r>
             <a:r>
-              <a:rPr lang="en-US" dirty="0" smtClean="0"/>
+              <a:rPr lang="en-US" sz="2000" dirty="0" smtClean="0">
+                <a:latin typeface="Courier"/>
+                <a:cs typeface="Courier"/>
+              </a:rPr>
               <a:t> out, err;</a:t>
             </a:r>
-            <a:endParaRPr lang="en-US" dirty="0"/>
+            <a:endParaRPr lang="en-US" sz="2000" dirty="0">
+              <a:latin typeface="Courier"/>
+              <a:cs typeface="Courier"/>
+            </a:endParaRPr>
           </a:p>
           <a:p>
             <a:pPr marL="0" indent="0">
@@ -11577,7 +12845,10 @@
               </a:spcBef>
               <a:buNone/>
             </a:pPr>
-            <a:endParaRPr lang="en-US" dirty="0"/>
+            <a:endParaRPr lang="en-US" sz="2000" dirty="0">
+              <a:latin typeface="Courier"/>
+              <a:cs typeface="Courier"/>
+            </a:endParaRPr>
           </a:p>
           <a:p>
             <a:pPr marL="0" indent="0">
@@ -11587,18 +12858,30 @@
               <a:buNone/>
             </a:pPr>
             <a:r>
-              <a:rPr lang="en-US" dirty="0" smtClean="0"/>
+              <a:rPr lang="en-US" sz="2000" dirty="0" smtClean="0">
+                <a:latin typeface="Courier"/>
+                <a:cs typeface="Courier"/>
+              </a:rPr>
               <a:t>saga::job::job j = </a:t>
             </a:r>
             <a:r>
-              <a:rPr lang="en-US" dirty="0" err="1" smtClean="0"/>
+              <a:rPr lang="en-US" sz="2000" dirty="0" err="1" smtClean="0">
+                <a:latin typeface="Courier"/>
+                <a:cs typeface="Courier"/>
+              </a:rPr>
               <a:t>js.run_job</a:t>
             </a:r>
             <a:r>
-              <a:rPr lang="en-US" dirty="0" smtClean="0"/>
+              <a:rPr lang="en-US" sz="2000" dirty="0" smtClean="0">
+                <a:latin typeface="Courier"/>
+                <a:cs typeface="Courier"/>
+              </a:rPr>
               <a:t>(</a:t>
             </a:r>
-            <a:endParaRPr lang="en-US" dirty="0"/>
+            <a:endParaRPr lang="en-US" sz="2000" dirty="0">
+              <a:latin typeface="Courier"/>
+              <a:cs typeface="Courier"/>
+            </a:endParaRPr>
           </a:p>
           <a:p>
             <a:pPr marL="0" indent="0">
@@ -11608,23 +12891,38 @@
               <a:buNone/>
             </a:pPr>
             <a:r>
-              <a:rPr lang="en-US" dirty="0"/>
+              <a:rPr lang="en-US" sz="2000" dirty="0">
+                <a:latin typeface="Courier"/>
+                <a:cs typeface="Courier"/>
+              </a:rPr>
               <a:t> 	"/bin/echo -n HELLO </a:t>
             </a:r>
             <a:r>
-              <a:rPr lang="en-US" dirty="0" smtClean="0"/>
+              <a:rPr lang="en-US" sz="2000" dirty="0" smtClean="0">
+                <a:latin typeface="Courier"/>
+                <a:cs typeface="Courier"/>
+              </a:rPr>
               <a:t>SAGA", </a:t>
             </a:r>
             <a:r>
-              <a:rPr lang="en-US" dirty="0"/>
+              <a:rPr lang="en-US" sz="2000" dirty="0">
+                <a:latin typeface="Courier"/>
+                <a:cs typeface="Courier"/>
+              </a:rPr>
               <a:t>"fork://</a:t>
             </a:r>
             <a:r>
-              <a:rPr lang="en-US" dirty="0" err="1"/>
+              <a:rPr lang="en-US" sz="2000" dirty="0" err="1">
+                <a:latin typeface="Courier"/>
+                <a:cs typeface="Courier"/>
+              </a:rPr>
               <a:t>localhost</a:t>
             </a:r>
             <a:r>
-              <a:rPr lang="en-US" dirty="0" smtClean="0"/>
+              <a:rPr lang="en-US" sz="2000" dirty="0" smtClean="0">
+                <a:latin typeface="Courier"/>
+                <a:cs typeface="Courier"/>
+              </a:rPr>
               <a:t>/",</a:t>
             </a:r>
           </a:p>
@@ -11636,7 +12934,10 @@
               <a:buNone/>
             </a:pPr>
             <a:r>
-              <a:rPr lang="en-US" dirty="0" smtClean="0"/>
+              <a:rPr lang="en-US" sz="2000" dirty="0" smtClean="0">
+                <a:latin typeface="Courier"/>
+                <a:cs typeface="Courier"/>
+              </a:rPr>
               <a:t>	in, out, err);</a:t>
             </a:r>
           </a:p>
@@ -11647,7 +12948,10 @@
               </a:spcBef>
               <a:buNone/>
             </a:pPr>
-            <a:endParaRPr lang="en-US" dirty="0"/>
+            <a:endParaRPr lang="en-US" sz="2000" dirty="0">
+              <a:latin typeface="Courier"/>
+              <a:cs typeface="Courier"/>
+            </a:endParaRPr>
           </a:p>
           <a:p>
             <a:pPr marL="0" indent="0">
@@ -11657,15 +12961,24 @@
               <a:buNone/>
             </a:pPr>
             <a:r>
-              <a:rPr lang="en-US" dirty="0" err="1"/>
+              <a:rPr lang="en-US" sz="2000" dirty="0" err="1">
+                <a:latin typeface="Courier"/>
+                <a:cs typeface="Courier"/>
+              </a:rPr>
               <a:t>s</a:t>
             </a:r>
             <a:r>
-              <a:rPr lang="en-US" dirty="0" err="1" smtClean="0"/>
+              <a:rPr lang="en-US" sz="2000" dirty="0" err="1" smtClean="0">
+                <a:latin typeface="Courier"/>
+                <a:cs typeface="Courier"/>
+              </a:rPr>
               <a:t>td</a:t>
             </a:r>
             <a:r>
-              <a:rPr lang="en-US" dirty="0" smtClean="0"/>
+              <a:rPr lang="en-US" sz="2000" dirty="0" smtClean="0">
+                <a:latin typeface="Courier"/>
+                <a:cs typeface="Courier"/>
+              </a:rPr>
               <a:t>::string line;</a:t>
             </a:r>
           </a:p>
@@ -11677,27 +12990,45 @@
               <a:buNone/>
             </a:pPr>
             <a:r>
-              <a:rPr lang="en-US" dirty="0" smtClean="0"/>
+              <a:rPr lang="en-US" sz="2000" dirty="0" smtClean="0">
+                <a:latin typeface="Courier"/>
+                <a:cs typeface="Courier"/>
+              </a:rPr>
               <a:t>while (</a:t>
             </a:r>
             <a:r>
-              <a:rPr lang="en-US" dirty="0" err="1"/>
+              <a:rPr lang="en-US" sz="2000" dirty="0" err="1">
+                <a:latin typeface="Courier"/>
+                <a:cs typeface="Courier"/>
+              </a:rPr>
               <a:t>std</a:t>
             </a:r>
             <a:r>
-              <a:rPr lang="en-US" dirty="0"/>
+              <a:rPr lang="en-US" sz="2000" dirty="0">
+                <a:latin typeface="Courier"/>
+                <a:cs typeface="Courier"/>
+              </a:rPr>
               <a:t>::</a:t>
             </a:r>
             <a:r>
-              <a:rPr lang="en-US" dirty="0" err="1"/>
+              <a:rPr lang="en-US" sz="2000" dirty="0" err="1">
+                <a:latin typeface="Courier"/>
+                <a:cs typeface="Courier"/>
+              </a:rPr>
               <a:t>getline</a:t>
             </a:r>
             <a:r>
-              <a:rPr lang="en-US" dirty="0"/>
+              <a:rPr lang="en-US" sz="2000" dirty="0">
+                <a:latin typeface="Courier"/>
+                <a:cs typeface="Courier"/>
+              </a:rPr>
               <a:t>(line, out)</a:t>
             </a:r>
             <a:r>
-              <a:rPr lang="en-US" dirty="0" smtClean="0"/>
+              <a:rPr lang="en-US" sz="2000" dirty="0" smtClean="0">
+                <a:latin typeface="Courier"/>
+                <a:cs typeface="Courier"/>
+              </a:rPr>
               <a:t>) </a:t>
             </a:r>
           </a:p>
@@ -11709,39 +13040,66 @@
               <a:buNone/>
             </a:pPr>
             <a:r>
-              <a:rPr lang="en-US" dirty="0" smtClean="0"/>
+              <a:rPr lang="en-US" sz="2000" dirty="0" smtClean="0">
+                <a:latin typeface="Courier"/>
+                <a:cs typeface="Courier"/>
+              </a:rPr>
               <a:t>	</a:t>
             </a:r>
             <a:r>
-              <a:rPr lang="en-US" dirty="0" err="1" smtClean="0"/>
+              <a:rPr lang="en-US" sz="2000" dirty="0" err="1" smtClean="0">
+                <a:latin typeface="Courier"/>
+                <a:cs typeface="Courier"/>
+              </a:rPr>
               <a:t>std</a:t>
             </a:r>
             <a:r>
-              <a:rPr lang="en-US" dirty="0" smtClean="0"/>
+              <a:rPr lang="en-US" sz="2000" dirty="0" smtClean="0">
+                <a:latin typeface="Courier"/>
+                <a:cs typeface="Courier"/>
+              </a:rPr>
               <a:t>::</a:t>
             </a:r>
             <a:r>
-              <a:rPr lang="en-US" dirty="0" err="1" smtClean="0"/>
+              <a:rPr lang="en-US" sz="2000" dirty="0" err="1" smtClean="0">
+                <a:latin typeface="Courier"/>
+                <a:cs typeface="Courier"/>
+              </a:rPr>
               <a:t>cout</a:t>
             </a:r>
             <a:r>
-              <a:rPr lang="en-US" dirty="0" smtClean="0"/>
+              <a:rPr lang="en-US" sz="2000" dirty="0" smtClean="0">
+                <a:latin typeface="Courier"/>
+                <a:cs typeface="Courier"/>
+              </a:rPr>
               <a:t> &lt;&lt; out &lt;&lt; </a:t>
             </a:r>
             <a:r>
-              <a:rPr lang="en-US" dirty="0" err="1" smtClean="0"/>
+              <a:rPr lang="en-US" sz="2000" dirty="0" err="1" smtClean="0">
+                <a:latin typeface="Courier"/>
+                <a:cs typeface="Courier"/>
+              </a:rPr>
               <a:t>std</a:t>
             </a:r>
             <a:r>
-              <a:rPr lang="en-US" dirty="0" smtClean="0"/>
+              <a:rPr lang="en-US" sz="2000" dirty="0" smtClean="0">
+                <a:latin typeface="Courier"/>
+                <a:cs typeface="Courier"/>
+              </a:rPr>
               <a:t>::</a:t>
             </a:r>
             <a:r>
-              <a:rPr lang="en-US" dirty="0" err="1" smtClean="0"/>
+              <a:rPr lang="en-US" sz="2000" dirty="0" err="1" smtClean="0">
+                <a:latin typeface="Courier"/>
+                <a:cs typeface="Courier"/>
+              </a:rPr>
               <a:t>endl</a:t>
             </a:r>
             <a:r>
-              <a:rPr lang="en-US" dirty="0" smtClean="0"/>
+              <a:rPr lang="en-US" sz="2000" dirty="0" smtClean="0">
+                <a:latin typeface="Courier"/>
+                <a:cs typeface="Courier"/>
+              </a:rPr>
               <a:t>;</a:t>
             </a:r>
           </a:p>
@@ -11910,83 +13268,146 @@
               <a:buNone/>
             </a:pPr>
             <a:r>
-              <a:rPr lang="en-US" dirty="0" smtClean="0"/>
+              <a:rPr lang="en-US" sz="2000" dirty="0" smtClean="0">
+                <a:latin typeface="Courier"/>
+                <a:cs typeface="Courier"/>
+              </a:rPr>
               <a:t>// </a:t>
             </a:r>
             <a:r>
-              <a:rPr lang="en-US" dirty="0"/>
+              <a:rPr lang="en-US" sz="2000" dirty="0">
+                <a:latin typeface="Courier"/>
+                <a:cs typeface="Courier"/>
+              </a:rPr>
               <a:t>host A</a:t>
             </a:r>
             <a:br>
-              <a:rPr lang="en-US" dirty="0"/>
+              <a:rPr lang="en-US" sz="2000" dirty="0">
+                <a:latin typeface="Courier"/>
+                <a:cs typeface="Courier"/>
+              </a:rPr>
             </a:br>
             <a:r>
-              <a:rPr lang="en-US" dirty="0" smtClean="0"/>
+              <a:rPr lang="en-US" sz="2000" dirty="0" smtClean="0">
+                <a:latin typeface="Courier"/>
+                <a:cs typeface="Courier"/>
+              </a:rPr>
               <a:t>saga::</a:t>
             </a:r>
             <a:r>
-              <a:rPr lang="en-US" dirty="0" err="1" smtClean="0"/>
+              <a:rPr lang="en-US" sz="2000" dirty="0" err="1" smtClean="0">
+                <a:latin typeface="Courier"/>
+                <a:cs typeface="Courier"/>
+              </a:rPr>
               <a:t>url</a:t>
             </a:r>
             <a:r>
-              <a:rPr lang="en-US" dirty="0" smtClean="0"/>
+              <a:rPr lang="en-US" sz="2000" dirty="0" smtClean="0">
+                <a:latin typeface="Courier"/>
+                <a:cs typeface="Courier"/>
+              </a:rPr>
               <a:t> name </a:t>
             </a:r>
             <a:r>
-              <a:rPr lang="en-US" dirty="0"/>
+              <a:rPr lang="en-US" sz="2000" dirty="0">
+                <a:latin typeface="Courier"/>
+                <a:cs typeface="Courier"/>
+              </a:rPr>
               <a:t>= </a:t>
             </a:r>
             <a:r>
-              <a:rPr lang="en-US" dirty="0" err="1"/>
+              <a:rPr lang="en-US" sz="2000" dirty="0" err="1">
+                <a:latin typeface="Courier"/>
+                <a:cs typeface="Courier"/>
+              </a:rPr>
               <a:t>url</a:t>
             </a:r>
             <a:r>
-              <a:rPr lang="en-US" dirty="0"/>
+              <a:rPr lang="en-US" sz="2000" dirty="0">
+                <a:latin typeface="Courier"/>
+                <a:cs typeface="Courier"/>
+              </a:rPr>
               <a:t>(' … ')</a:t>
             </a:r>
             <a:br>
-              <a:rPr lang="en-US" dirty="0"/>
+              <a:rPr lang="en-US" sz="2000" dirty="0">
+                <a:latin typeface="Courier"/>
+                <a:cs typeface="Courier"/>
+              </a:rPr>
             </a:br>
             <a:r>
-              <a:rPr lang="en-US" dirty="0" smtClean="0"/>
+              <a:rPr lang="en-US" sz="2000" dirty="0" smtClean="0">
+                <a:latin typeface="Courier"/>
+                <a:cs typeface="Courier"/>
+              </a:rPr>
               <a:t>saga::advert::entry e(name, </a:t>
             </a:r>
             <a:br>
-              <a:rPr lang="en-US" dirty="0" smtClean="0"/>
+              <a:rPr lang="en-US" sz="2000" dirty="0" smtClean="0">
+                <a:latin typeface="Courier"/>
+                <a:cs typeface="Courier"/>
+              </a:rPr>
             </a:br>
             <a:r>
-              <a:rPr lang="en-US" dirty="0" smtClean="0"/>
+              <a:rPr lang="en-US" sz="2000" dirty="0" smtClean="0">
+                <a:latin typeface="Courier"/>
+                <a:cs typeface="Courier"/>
+              </a:rPr>
               <a:t>	</a:t>
             </a:r>
             <a:r>
-              <a:rPr lang="en-US" dirty="0" err="1" smtClean="0"/>
+              <a:rPr lang="en-US" sz="2000" dirty="0" err="1" smtClean="0">
+                <a:latin typeface="Courier"/>
+                <a:cs typeface="Courier"/>
+              </a:rPr>
               <a:t>advert.ReadWrite|advert.Create</a:t>
             </a:r>
             <a:r>
-              <a:rPr lang="en-US" dirty="0"/>
+              <a:rPr lang="en-US" sz="2000" dirty="0">
+                <a:latin typeface="Courier"/>
+                <a:cs typeface="Courier"/>
+              </a:rPr>
               <a:t>)</a:t>
             </a:r>
             <a:br>
-              <a:rPr lang="en-US" dirty="0"/>
+              <a:rPr lang="en-US" sz="2000" dirty="0">
+                <a:latin typeface="Courier"/>
+                <a:cs typeface="Courier"/>
+              </a:rPr>
             </a:br>
             <a:r>
-              <a:rPr lang="en-US" dirty="0" err="1" smtClean="0"/>
+              <a:rPr lang="en-US" sz="2000" dirty="0" err="1" smtClean="0">
+                <a:latin typeface="Courier"/>
+                <a:cs typeface="Courier"/>
+              </a:rPr>
               <a:t>e.set_attribute</a:t>
             </a:r>
             <a:r>
-              <a:rPr lang="en-US" dirty="0" smtClean="0"/>
+              <a:rPr lang="en-US" sz="2000" dirty="0" smtClean="0">
+                <a:latin typeface="Courier"/>
+                <a:cs typeface="Courier"/>
+              </a:rPr>
               <a:t>("started", " </a:t>
             </a:r>
             <a:r>
-              <a:rPr lang="en-US" dirty="0"/>
+              <a:rPr lang="en-US" sz="2000" dirty="0">
+                <a:latin typeface="Courier"/>
+                <a:cs typeface="Courier"/>
+              </a:rPr>
               <a:t>… </a:t>
             </a:r>
             <a:r>
-              <a:rPr lang="en-US" dirty="0" smtClean="0"/>
+              <a:rPr lang="en-US" sz="2000" dirty="0" smtClean="0">
+                <a:latin typeface="Courier"/>
+                <a:cs typeface="Courier"/>
+              </a:rPr>
               <a:t>" </a:t>
             </a:r>
             <a:r>
-              <a:rPr lang="en-US" dirty="0"/>
+              <a:rPr lang="en-US" sz="2000" dirty="0">
+                <a:latin typeface="Courier"/>
+                <a:cs typeface="Courier"/>
+              </a:rPr>
               <a:t>)</a:t>
             </a:r>
           </a:p>
@@ -11995,79 +13416,139 @@
               <a:buNone/>
             </a:pPr>
             <a:r>
-              <a:rPr lang="en-US" dirty="0" smtClean="0"/>
+              <a:rPr lang="en-US" sz="2000" dirty="0" smtClean="0">
+                <a:latin typeface="Courier"/>
+                <a:cs typeface="Courier"/>
+              </a:rPr>
               <a:t>// </a:t>
             </a:r>
             <a:r>
-              <a:rPr lang="en-US" dirty="0"/>
+              <a:rPr lang="en-US" sz="2000" dirty="0">
+                <a:latin typeface="Courier"/>
+                <a:cs typeface="Courier"/>
+              </a:rPr>
               <a:t>host B</a:t>
             </a:r>
             <a:br>
-              <a:rPr lang="en-US" dirty="0"/>
+              <a:rPr lang="en-US" sz="2000" dirty="0">
+                <a:latin typeface="Courier"/>
+                <a:cs typeface="Courier"/>
+              </a:rPr>
             </a:br>
             <a:r>
-              <a:rPr lang="en-US" dirty="0"/>
+              <a:rPr lang="en-US" sz="2000" dirty="0">
+                <a:latin typeface="Courier"/>
+                <a:cs typeface="Courier"/>
+              </a:rPr>
               <a:t>saga::</a:t>
             </a:r>
             <a:r>
-              <a:rPr lang="en-US" dirty="0" err="1"/>
+              <a:rPr lang="en-US" sz="2000" dirty="0" err="1">
+                <a:latin typeface="Courier"/>
+                <a:cs typeface="Courier"/>
+              </a:rPr>
               <a:t>url</a:t>
             </a:r>
             <a:r>
-              <a:rPr lang="en-US" dirty="0"/>
+              <a:rPr lang="en-US" sz="2000" dirty="0">
+                <a:latin typeface="Courier"/>
+                <a:cs typeface="Courier"/>
+              </a:rPr>
               <a:t> name = </a:t>
             </a:r>
             <a:r>
-              <a:rPr lang="en-US" dirty="0" err="1"/>
+              <a:rPr lang="en-US" sz="2000" dirty="0" err="1">
+                <a:latin typeface="Courier"/>
+                <a:cs typeface="Courier"/>
+              </a:rPr>
               <a:t>url</a:t>
             </a:r>
             <a:r>
-              <a:rPr lang="en-US" dirty="0"/>
+              <a:rPr lang="en-US" sz="2000" dirty="0">
+                <a:latin typeface="Courier"/>
+                <a:cs typeface="Courier"/>
+              </a:rPr>
               <a:t>(' … ')</a:t>
             </a:r>
             <a:br>
-              <a:rPr lang="en-US" dirty="0"/>
+              <a:rPr lang="en-US" sz="2000" dirty="0">
+                <a:latin typeface="Courier"/>
+                <a:cs typeface="Courier"/>
+              </a:rPr>
             </a:br>
             <a:r>
-              <a:rPr lang="en-US" dirty="0"/>
+              <a:rPr lang="en-US" sz="2000" dirty="0">
+                <a:latin typeface="Courier"/>
+                <a:cs typeface="Courier"/>
+              </a:rPr>
               <a:t>saga::advert::entry e(name, </a:t>
             </a:r>
             <a:r>
-              <a:rPr lang="en-US" dirty="0" err="1" smtClean="0"/>
+              <a:rPr lang="en-US" sz="2000" dirty="0" err="1" smtClean="0">
+                <a:latin typeface="Courier"/>
+                <a:cs typeface="Courier"/>
+              </a:rPr>
               <a:t>advert.Read</a:t>
             </a:r>
             <a:r>
-              <a:rPr lang="en-US" dirty="0" smtClean="0"/>
+              <a:rPr lang="en-US" sz="2000" dirty="0" smtClean="0">
+                <a:latin typeface="Courier"/>
+                <a:cs typeface="Courier"/>
+              </a:rPr>
               <a:t>)</a:t>
             </a:r>
             <a:r>
-              <a:rPr lang="en-US" dirty="0"/>
+              <a:rPr lang="en-US" sz="2000" dirty="0">
+                <a:latin typeface="Courier"/>
+                <a:cs typeface="Courier"/>
+              </a:rPr>
               <a:t/>
             </a:r>
             <a:br>
-              <a:rPr lang="en-US" dirty="0"/>
+              <a:rPr lang="en-US" sz="2000" dirty="0">
+                <a:latin typeface="Courier"/>
+                <a:cs typeface="Courier"/>
+              </a:rPr>
             </a:br>
             <a:r>
-              <a:rPr lang="en-US" dirty="0" err="1" smtClean="0"/>
+              <a:rPr lang="en-US" sz="2000" dirty="0" err="1" smtClean="0">
+                <a:latin typeface="Courier"/>
+                <a:cs typeface="Courier"/>
+              </a:rPr>
               <a:t>std</a:t>
             </a:r>
             <a:r>
-              <a:rPr lang="en-US" dirty="0" smtClean="0"/>
+              <a:rPr lang="en-US" sz="2000" dirty="0" smtClean="0">
+                <a:latin typeface="Courier"/>
+                <a:cs typeface="Courier"/>
+              </a:rPr>
               <a:t>::string started </a:t>
             </a:r>
             <a:r>
-              <a:rPr lang="en-US" dirty="0"/>
+              <a:rPr lang="en-US" sz="2000" dirty="0">
+                <a:latin typeface="Courier"/>
+                <a:cs typeface="Courier"/>
+              </a:rPr>
               <a:t>= </a:t>
             </a:r>
             <a:r>
-              <a:rPr lang="en-US" dirty="0" err="1" smtClean="0"/>
+              <a:rPr lang="en-US" sz="2000" dirty="0" err="1" smtClean="0">
+                <a:latin typeface="Courier"/>
+                <a:cs typeface="Courier"/>
+              </a:rPr>
               <a:t>e.get_attribute</a:t>
             </a:r>
             <a:r>
-              <a:rPr lang="en-US" dirty="0" smtClean="0"/>
+              <a:rPr lang="en-US" sz="2000" dirty="0" smtClean="0">
+                <a:latin typeface="Courier"/>
+                <a:cs typeface="Courier"/>
+              </a:rPr>
               <a:t>("started")</a:t>
             </a:r>
-            <a:endParaRPr lang="en-US" dirty="0"/>
+            <a:endParaRPr lang="en-US" sz="2000" dirty="0">
+              <a:latin typeface="Courier"/>
+              <a:cs typeface="Courier"/>
+            </a:endParaRPr>
           </a:p>
           <a:p>
             <a:pPr marL="0" indent="0">
@@ -12157,6 +13638,13 @@
   <p:clrMapOvr>
     <a:masterClrMapping/>
   </p:clrMapOvr>
+  <p:timing>
+    <p:tnLst>
+      <p:par>
+        <p:cTn xmlns:p14="http://schemas.microsoft.com/office/powerpoint/2010/main" id="1" dur="indefinite" restart="never" nodeType="tmRoot"/>
+      </p:par>
+    </p:tnLst>
+  </p:timing>
 </p:sld>
 </file>
 
@@ -12194,7 +13682,11 @@
           <a:p>
             <a:r>
               <a:rPr lang="en-US" dirty="0" smtClean="0"/>
-              <a:t>Programmers Guide</a:t>
+              <a:t>Additional Resources: Programmers </a:t>
+            </a:r>
+            <a:r>
+              <a:rPr lang="en-US" dirty="0" smtClean="0"/>
+              <a:t>Guide</a:t>
             </a:r>
             <a:endParaRPr lang="en-US" dirty="0"/>
           </a:p>
@@ -12212,7 +13704,9 @@
         </p:nvSpPr>
         <p:spPr/>
         <p:txBody>
-          <a:bodyPr/>
+          <a:bodyPr>
+            <a:normAutofit lnSpcReduction="10000"/>
+          </a:bodyPr>
           <a:lstStyle/>
           <a:p>
             <a:pPr fontAlgn="ctr"/>
@@ -12269,8 +13763,34 @@
             <a:pPr lvl="1" fontAlgn="ctr"/>
             <a:r>
               <a:rPr lang="en-US" sz="3600" dirty="0" smtClean="0"/>
-              <a:t>Stream (server/client)</a:t>
-            </a:r>
+              <a:t>Stream (server/client</a:t>
+            </a:r>
+            <a:r>
+              <a:rPr lang="en-US" sz="3600" dirty="0" smtClean="0"/>
+              <a:t>)</a:t>
+            </a:r>
+          </a:p>
+          <a:p>
+            <a:pPr fontAlgn="ctr"/>
+            <a:r>
+              <a:rPr lang="en-US" sz="3800" dirty="0">
+                <a:hlinkClick r:id="rId2"/>
+              </a:rPr>
+              <a:t>http://static.saga.cct.lsu.edu/docs/programming_guide/</a:t>
+            </a:r>
+            <a:r>
+              <a:rPr lang="en-US" sz="3800" dirty="0" smtClean="0">
+                <a:hlinkClick r:id="rId2"/>
+              </a:rPr>
+              <a:t>saga_programming_guide.pdf</a:t>
+            </a:r>
+            <a:endParaRPr lang="en-US" sz="3800" dirty="0" smtClean="0"/>
+          </a:p>
+          <a:p>
+            <a:pPr marL="0" indent="0" fontAlgn="ctr">
+              <a:buNone/>
+            </a:pPr>
+            <a:endParaRPr lang="en-US" sz="3800" dirty="0" smtClean="0"/>
           </a:p>
           <a:p>
             <a:pPr>
@@ -12584,6 +14104,11 @@
         </p:txBody>
       </p:sp>
     </p:spTree>
+    <p:extLst>
+      <p:ext uri="{BB962C8B-B14F-4D97-AF65-F5344CB8AC3E}">
+        <p14:creationId xmlns:p14="http://schemas.microsoft.com/office/powerpoint/2010/main" val="1850771897"/>
+      </p:ext>
+    </p:extLst>
   </p:cSld>
   <p:clrMapOvr>
     <a:masterClrMapping/>
@@ -12751,7 +14276,7 @@
               <a:solidFill>
                 <a:srgbClr val="FF0000"/>
               </a:solidFill>
-              <a:hlinkClick r:id="rId2"/>
+              <a:hlinkClick r:id="rId3"/>
             </a:endParaRPr>
           </a:p>
           <a:p>
@@ -13132,6 +14657,13 @@
   <p:clrMapOvr>
     <a:masterClrMapping/>
   </p:clrMapOvr>
+  <p:timing>
+    <p:tnLst>
+      <p:par>
+        <p:cTn xmlns:p14="http://schemas.microsoft.com/office/powerpoint/2010/main" id="1" dur="indefinite" restart="never" nodeType="tmRoot"/>
+      </p:par>
+    </p:tnLst>
+  </p:timing>
 </p:sld>
 </file>
 
@@ -13346,6 +14878,233 @@
   <p:clrMapOvr>
     <a:masterClrMapping/>
   </p:clrMapOvr>
+  <p:timing>
+    <p:tnLst>
+      <p:par>
+        <p:cTn xmlns:p14="http://schemas.microsoft.com/office/powerpoint/2010/main" id="1" dur="indefinite" restart="never" nodeType="tmRoot"/>
+      </p:par>
+    </p:tnLst>
+  </p:timing>
+</p:sld>
+</file>
+
+<file path=ppt/slides/slide28.xml><?xml version="1.0" encoding="utf-8"?>
+<p:sld xmlns:a="http://schemas.openxmlformats.org/drawingml/2006/main" xmlns:r="http://schemas.openxmlformats.org/officeDocument/2006/relationships" xmlns:p="http://schemas.openxmlformats.org/presentationml/2006/main">
+  <p:cSld>
+    <p:spTree>
+      <p:nvGrpSpPr>
+        <p:cNvPr id="1" name=""/>
+        <p:cNvGrpSpPr/>
+        <p:nvPr/>
+      </p:nvGrpSpPr>
+      <p:grpSpPr>
+        <a:xfrm>
+          <a:off x="0" y="0"/>
+          <a:ext cx="0" cy="0"/>
+          <a:chOff x="0" y="0"/>
+          <a:chExt cx="0" cy="0"/>
+        </a:xfrm>
+      </p:grpSpPr>
+      <p:sp>
+        <p:nvSpPr>
+          <p:cNvPr id="2" name="Title 1"/>
+          <p:cNvSpPr>
+            <a:spLocks noGrp="1"/>
+          </p:cNvSpPr>
+          <p:nvPr>
+            <p:ph type="title"/>
+          </p:nvPr>
+        </p:nvSpPr>
+        <p:spPr/>
+        <p:txBody>
+          <a:bodyPr/>
+          <a:lstStyle/>
+          <a:p>
+            <a:r>
+              <a:rPr lang="en-US" dirty="0" smtClean="0"/>
+              <a:t>Questions | Comments ?</a:t>
+            </a:r>
+            <a:endParaRPr lang="en-US" dirty="0"/>
+          </a:p>
+        </p:txBody>
+      </p:sp>
+      <p:sp>
+        <p:nvSpPr>
+          <p:cNvPr id="3" name="Content Placeholder 2"/>
+          <p:cNvSpPr>
+            <a:spLocks noGrp="1"/>
+          </p:cNvSpPr>
+          <p:nvPr>
+            <p:ph idx="1"/>
+          </p:nvPr>
+        </p:nvSpPr>
+        <p:spPr/>
+        <p:txBody>
+          <a:bodyPr/>
+          <a:lstStyle/>
+          <a:p>
+            <a:r>
+              <a:rPr lang="en-US" dirty="0" smtClean="0"/>
+              <a:t>We have covered:</a:t>
+            </a:r>
+          </a:p>
+          <a:p>
+            <a:pPr lvl="1"/>
+            <a:r>
+              <a:rPr lang="en-US" dirty="0"/>
+              <a:t>SAGA command line tools</a:t>
+            </a:r>
+          </a:p>
+          <a:p>
+            <a:pPr lvl="1"/>
+            <a:r>
+              <a:rPr lang="en-US" dirty="0"/>
+              <a:t>SAGA Python API</a:t>
+            </a:r>
+          </a:p>
+          <a:p>
+            <a:pPr lvl="1"/>
+            <a:r>
+              <a:rPr lang="en-US" dirty="0"/>
+              <a:t>SAGA C++ API</a:t>
+            </a:r>
+          </a:p>
+          <a:p>
+            <a:pPr lvl="1"/>
+            <a:r>
+              <a:rPr lang="en-US" dirty="0" smtClean="0"/>
+              <a:t>Examples</a:t>
+            </a:r>
+            <a:endParaRPr lang="en-US" dirty="0"/>
+          </a:p>
+          <a:p>
+            <a:r>
+              <a:rPr lang="en-US" dirty="0" smtClean="0"/>
+              <a:t>Check out the tutorial website for more details </a:t>
+            </a:r>
+            <a:r>
+              <a:rPr lang="en-US" dirty="0"/>
+              <a:t>and examples: </a:t>
+            </a:r>
+            <a:br>
+              <a:rPr lang="en-US" dirty="0"/>
+            </a:br>
+            <a:r>
+              <a:rPr lang="en-US" dirty="0"/>
+              <a:t/>
+            </a:r>
+            <a:br>
+              <a:rPr lang="en-US" dirty="0"/>
+            </a:br>
+            <a:r>
+              <a:rPr lang="en-US" dirty="0">
+                <a:hlinkClick r:id="rId3"/>
+              </a:rPr>
+              <a:t>http://saga.cct.lsu.edu/software/cpp/documentation/tutorials/loni-training-</a:t>
+            </a:r>
+            <a:r>
+              <a:rPr lang="en-US" dirty="0" smtClean="0">
+                <a:hlinkClick r:id="rId3"/>
+              </a:rPr>
+              <a:t>2010</a:t>
+            </a:r>
+            <a:endParaRPr lang="en-US" dirty="0" smtClean="0"/>
+          </a:p>
+          <a:p>
+            <a:pPr marL="0" indent="0">
+              <a:buNone/>
+            </a:pPr>
+            <a:endParaRPr lang="en-US" dirty="0"/>
+          </a:p>
+        </p:txBody>
+      </p:sp>
+      <p:sp>
+        <p:nvSpPr>
+          <p:cNvPr id="4" name="Date Placeholder 3"/>
+          <p:cNvSpPr>
+            <a:spLocks noGrp="1"/>
+          </p:cNvSpPr>
+          <p:nvPr>
+            <p:ph type="dt" sz="half" idx="10"/>
+          </p:nvPr>
+        </p:nvSpPr>
+        <p:spPr/>
+        <p:txBody>
+          <a:bodyPr/>
+          <a:lstStyle/>
+          <a:p>
+            <a:r>
+              <a:rPr lang="en-US" smtClean="0"/>
+              <a:t>November 29th, 2010</a:t>
+            </a:r>
+            <a:endParaRPr lang="en-US" dirty="0"/>
+          </a:p>
+        </p:txBody>
+      </p:sp>
+      <p:sp>
+        <p:nvSpPr>
+          <p:cNvPr id="5" name="Slide Number Placeholder 4"/>
+          <p:cNvSpPr>
+            <a:spLocks noGrp="1"/>
+          </p:cNvSpPr>
+          <p:nvPr>
+            <p:ph type="sldNum" sz="quarter" idx="11"/>
+          </p:nvPr>
+        </p:nvSpPr>
+        <p:spPr/>
+        <p:txBody>
+          <a:bodyPr/>
+          <a:lstStyle/>
+          <a:p>
+            <a:fld id="{7A426C1A-D210-4B4B-86AA-6AEDDDCCF5FF}" type="slidenum">
+              <a:rPr lang="en-US" smtClean="0"/>
+              <a:pPr/>
+              <a:t>28</a:t>
+            </a:fld>
+            <a:endParaRPr lang="en-US"/>
+          </a:p>
+        </p:txBody>
+      </p:sp>
+      <p:sp>
+        <p:nvSpPr>
+          <p:cNvPr id="6" name="Footer Placeholder 5"/>
+          <p:cNvSpPr>
+            <a:spLocks noGrp="1"/>
+          </p:cNvSpPr>
+          <p:nvPr>
+            <p:ph type="ftr" sz="quarter" idx="12"/>
+          </p:nvPr>
+        </p:nvSpPr>
+        <p:spPr/>
+        <p:txBody>
+          <a:bodyPr/>
+          <a:lstStyle/>
+          <a:p>
+            <a:r>
+              <a:rPr lang="en-US" smtClean="0"/>
+              <a:t>TeraGrid SAGA Tutorial</a:t>
+            </a:r>
+            <a:endParaRPr lang="en-US" dirty="0"/>
+          </a:p>
+        </p:txBody>
+      </p:sp>
+    </p:spTree>
+    <p:extLst>
+      <p:ext uri="{BB962C8B-B14F-4D97-AF65-F5344CB8AC3E}">
+        <p14:creationId xmlns:p14="http://schemas.microsoft.com/office/powerpoint/2010/main" val="2615391202"/>
+      </p:ext>
+    </p:extLst>
+  </p:cSld>
+  <p:clrMapOvr>
+    <a:masterClrMapping/>
+  </p:clrMapOvr>
+  <p:timing>
+    <p:tnLst>
+      <p:par>
+        <p:cTn xmlns:p14="http://schemas.microsoft.com/office/powerpoint/2010/main" id="1" dur="indefinite" restart="never" nodeType="tmRoot"/>
+      </p:par>
+    </p:tnLst>
+  </p:timing>
 </p:sld>
 </file>
 
@@ -13512,7 +15271,7 @@
                 </a:solidFill>
                 <a:hlinkClick r:id="rId7"/>
               </a:rPr>
-              <a:t>http://</a:t>
+              <a:t>http://static.saga.cct.lsu.edu/docs/programming_guide/</a:t>
             </a:r>
             <a:r>
               <a:rPr lang="en-US" dirty="0" smtClean="0">
@@ -13521,12 +15280,18 @@
                 </a:solidFill>
                 <a:hlinkClick r:id="rId7"/>
               </a:rPr>
-              <a:t>static.saga.cct.lsu.edu/docs/programming_guide/html/saga-programming-guide.html</a:t>
-            </a:r>
-            <a:endParaRPr lang="en-US" dirty="0" smtClean="0"/>
-          </a:p>
-          <a:p>
-            <a:pPr marL="783335" lvl="1"/>
+              <a:t>saga_programming_guide.pdf</a:t>
+            </a:r>
+            <a:endParaRPr lang="en-US" dirty="0" smtClean="0">
+              <a:solidFill>
+                <a:srgbClr val="B70000"/>
+              </a:solidFill>
+            </a:endParaRPr>
+          </a:p>
+          <a:p>
+            <a:pPr marL="487362" lvl="1" indent="0">
+              <a:buNone/>
+            </a:pPr>
             <a:endParaRPr lang="en-US" dirty="0" smtClean="0"/>
           </a:p>
           <a:p>
@@ -13535,7 +15300,7 @@
               <a:solidFill>
                 <a:srgbClr val="B70000"/>
               </a:solidFill>
-              <a:hlinkClick r:id="rId7"/>
+              <a:hlinkClick r:id="rId8"/>
             </a:endParaRPr>
           </a:p>
           <a:p>

</xml_diff>

<commit_message>
Fixed the FIXME which I had fixed yesterday but they were written over
git-svn-id: file://localhost/tmp/svn2git/svn@3278 defb5e50-622e-49ec-a68e-d72c7db87b45
</commit_message>
<xml_diff>
--- a/tutorial/general_tutorial/SAGA-API-levels.pptx
+++ b/tutorial/general_tutorial/SAGA-API-levels.pptx
@@ -1,6 +1,6 @@
 
 <file path=ppt/presentation.xml><?xml version="1.0" encoding="utf-8"?>
-<p:presentation xmlns:a="http://schemas.openxmlformats.org/drawingml/2006/main" xmlns:r="http://schemas.openxmlformats.org/officeDocument/2006/relationships" xmlns:p="http://schemas.openxmlformats.org/presentationml/2006/main" showSpecialPlsOnTitleSld="0" strictFirstAndLastChars="0" saveSubsetFonts="1">
+<p:presentation xmlns:a="http://schemas.openxmlformats.org/drawingml/2006/main" xmlns:r="http://schemas.openxmlformats.org/officeDocument/2006/relationships" xmlns:mc="http://schemas.openxmlformats.org/markup-compatibility/2006" xmlns:mv="urn:schemas-microsoft-com:mac:vml" xmlns:p="http://schemas.openxmlformats.org/presentationml/2006/main" mc:Ignorable="mv" mc:PreserveAttributes="mv:*" showSpecialPlsOnTitleSld="0" strictFirstAndLastChars="0" saveSubsetFonts="1">
   <p:sldMasterIdLst>
     <p:sldMasterId id="2147483701" r:id="rId1"/>
   </p:sldMasterIdLst>
@@ -177,7 +177,7 @@
 </file>
 
 <file path=ppt/notesMasters/notesMaster1.xml><?xml version="1.0" encoding="utf-8"?>
-<p:notesMaster xmlns:a="http://schemas.openxmlformats.org/drawingml/2006/main" xmlns:r="http://schemas.openxmlformats.org/officeDocument/2006/relationships" xmlns:p="http://schemas.openxmlformats.org/presentationml/2006/main">
+<p:notesMaster xmlns:a="http://schemas.openxmlformats.org/drawingml/2006/main" xmlns:r="http://schemas.openxmlformats.org/officeDocument/2006/relationships" xmlns:mc="http://schemas.openxmlformats.org/markup-compatibility/2006" xmlns:mv="urn:schemas-microsoft-com:mac:vml" xmlns:p="http://schemas.openxmlformats.org/presentationml/2006/main" mc:Ignorable="mv" mc:PreserveAttributes="mv:*">
   <p:cSld>
     <p:bg>
       <p:bgRef idx="1001">
@@ -430,7 +430,7 @@
     </p:spTree>
     <p:extLst>
       <p:ext uri="{BB962C8B-B14F-4D97-AF65-F5344CB8AC3E}">
-        <p14:creationId xmlns:p14="http://schemas.microsoft.com/office/powerpoint/2010/main" val="2265826956"/>
+        <p14:creationId xmlns:p14="http://schemas.microsoft.com/office/powerpoint/2010/main" xmlns:p="http://schemas.openxmlformats.org/presentationml/2006/main" xmlns:r="http://schemas.openxmlformats.org/officeDocument/2006/relationships" xmlns:a="http://schemas.openxmlformats.org/drawingml/2006/main" xmlns="" val="2265826956"/>
       </p:ext>
     </p:extLst>
   </p:cSld>
@@ -531,7 +531,7 @@
 </file>
 
 <file path=ppt/notesSlides/notesSlide1.xml><?xml version="1.0" encoding="utf-8"?>
-<p:notes xmlns:a="http://schemas.openxmlformats.org/drawingml/2006/main" xmlns:r="http://schemas.openxmlformats.org/officeDocument/2006/relationships" xmlns:p="http://schemas.openxmlformats.org/presentationml/2006/main">
+<p:notes xmlns:a="http://schemas.openxmlformats.org/drawingml/2006/main" xmlns:r="http://schemas.openxmlformats.org/officeDocument/2006/relationships" xmlns:mc="http://schemas.openxmlformats.org/markup-compatibility/2006" xmlns:mv="urn:schemas-microsoft-com:mac:vml" xmlns:p="http://schemas.openxmlformats.org/presentationml/2006/main" mc:Ignorable="mv" mc:PreserveAttributes="mv:*">
   <p:cSld>
     <p:spTree>
       <p:nvGrpSpPr>
@@ -613,7 +613,7 @@
 </file>
 
 <file path=ppt/notesSlides/notesSlide10.xml><?xml version="1.0" encoding="utf-8"?>
-<p:notes xmlns:a="http://schemas.openxmlformats.org/drawingml/2006/main" xmlns:r="http://schemas.openxmlformats.org/officeDocument/2006/relationships" xmlns:p="http://schemas.openxmlformats.org/presentationml/2006/main">
+<p:notes xmlns:a="http://schemas.openxmlformats.org/drawingml/2006/main" xmlns:r="http://schemas.openxmlformats.org/officeDocument/2006/relationships" xmlns:mc="http://schemas.openxmlformats.org/markup-compatibility/2006" xmlns:mv="urn:schemas-microsoft-com:mac:vml" xmlns:p="http://schemas.openxmlformats.org/presentationml/2006/main" mc:Ignorable="mv" mc:PreserveAttributes="mv:*">
   <p:cSld>
     <p:spTree>
       <p:nvGrpSpPr>
@@ -772,7 +772,7 @@
     </p:spTree>
     <p:extLst>
       <p:ext uri="{BB962C8B-B14F-4D97-AF65-F5344CB8AC3E}">
-        <p14:creationId xmlns:p14="http://schemas.microsoft.com/office/powerpoint/2010/main" val="229707918"/>
+        <p14:creationId xmlns:p14="http://schemas.microsoft.com/office/powerpoint/2010/main" xmlns:p="http://schemas.openxmlformats.org/presentationml/2006/main" xmlns:r="http://schemas.openxmlformats.org/officeDocument/2006/relationships" xmlns:a="http://schemas.openxmlformats.org/drawingml/2006/main" xmlns="" val="229707918"/>
       </p:ext>
     </p:extLst>
   </p:cSld>
@@ -783,7 +783,7 @@
 </file>
 
 <file path=ppt/notesSlides/notesSlide11.xml><?xml version="1.0" encoding="utf-8"?>
-<p:notes xmlns:a="http://schemas.openxmlformats.org/drawingml/2006/main" xmlns:r="http://schemas.openxmlformats.org/officeDocument/2006/relationships" xmlns:p="http://schemas.openxmlformats.org/presentationml/2006/main">
+<p:notes xmlns:a="http://schemas.openxmlformats.org/drawingml/2006/main" xmlns:r="http://schemas.openxmlformats.org/officeDocument/2006/relationships" xmlns:mc="http://schemas.openxmlformats.org/markup-compatibility/2006" xmlns:mv="urn:schemas-microsoft-com:mac:vml" xmlns:p="http://schemas.openxmlformats.org/presentationml/2006/main" mc:Ignorable="mv" mc:PreserveAttributes="mv:*">
   <p:cSld>
     <p:spTree>
       <p:nvGrpSpPr>
@@ -857,7 +857,7 @@
     </p:spTree>
     <p:extLst>
       <p:ext uri="{BB962C8B-B14F-4D97-AF65-F5344CB8AC3E}">
-        <p14:creationId xmlns:p14="http://schemas.microsoft.com/office/powerpoint/2010/main" val="793208553"/>
+        <p14:creationId xmlns:p14="http://schemas.microsoft.com/office/powerpoint/2010/main" xmlns:p="http://schemas.openxmlformats.org/presentationml/2006/main" xmlns:r="http://schemas.openxmlformats.org/officeDocument/2006/relationships" xmlns:a="http://schemas.openxmlformats.org/drawingml/2006/main" xmlns="" val="793208553"/>
       </p:ext>
     </p:extLst>
   </p:cSld>
@@ -868,7 +868,7 @@
 </file>
 
 <file path=ppt/notesSlides/notesSlide2.xml><?xml version="1.0" encoding="utf-8"?>
-<p:notes xmlns:a="http://schemas.openxmlformats.org/drawingml/2006/main" xmlns:r="http://schemas.openxmlformats.org/officeDocument/2006/relationships" xmlns:p="http://schemas.openxmlformats.org/presentationml/2006/main">
+<p:notes xmlns:a="http://schemas.openxmlformats.org/drawingml/2006/main" xmlns:r="http://schemas.openxmlformats.org/officeDocument/2006/relationships" xmlns:mc="http://schemas.openxmlformats.org/markup-compatibility/2006" xmlns:mv="urn:schemas-microsoft-com:mac:vml" xmlns:p="http://schemas.openxmlformats.org/presentationml/2006/main" mc:Ignorable="mv" mc:PreserveAttributes="mv:*">
   <p:cSld>
     <p:spTree>
       <p:nvGrpSpPr>
@@ -950,7 +950,7 @@
 </file>
 
 <file path=ppt/notesSlides/notesSlide3.xml><?xml version="1.0" encoding="utf-8"?>
-<p:notes xmlns:a="http://schemas.openxmlformats.org/drawingml/2006/main" xmlns:r="http://schemas.openxmlformats.org/officeDocument/2006/relationships" xmlns:p="http://schemas.openxmlformats.org/presentationml/2006/main">
+<p:notes xmlns:a="http://schemas.openxmlformats.org/drawingml/2006/main" xmlns:r="http://schemas.openxmlformats.org/officeDocument/2006/relationships" xmlns:mc="http://schemas.openxmlformats.org/markup-compatibility/2006" xmlns:mv="urn:schemas-microsoft-com:mac:vml" xmlns:p="http://schemas.openxmlformats.org/presentationml/2006/main" mc:Ignorable="mv" mc:PreserveAttributes="mv:*">
   <p:cSld>
     <p:spTree>
       <p:nvGrpSpPr>
@@ -1053,7 +1053,7 @@
     </p:spTree>
     <p:extLst>
       <p:ext uri="{BB962C8B-B14F-4D97-AF65-F5344CB8AC3E}">
-        <p14:creationId xmlns:p14="http://schemas.microsoft.com/office/powerpoint/2010/main" val="3191069449"/>
+        <p14:creationId xmlns:p14="http://schemas.microsoft.com/office/powerpoint/2010/main" xmlns:p="http://schemas.openxmlformats.org/presentationml/2006/main" xmlns:r="http://schemas.openxmlformats.org/officeDocument/2006/relationships" xmlns:a="http://schemas.openxmlformats.org/drawingml/2006/main" xmlns="" val="3191069449"/>
       </p:ext>
     </p:extLst>
   </p:cSld>
@@ -1064,7 +1064,7 @@
 </file>
 
 <file path=ppt/notesSlides/notesSlide4.xml><?xml version="1.0" encoding="utf-8"?>
-<p:notes xmlns:a="http://schemas.openxmlformats.org/drawingml/2006/main" xmlns:r="http://schemas.openxmlformats.org/officeDocument/2006/relationships" xmlns:p="http://schemas.openxmlformats.org/presentationml/2006/main">
+<p:notes xmlns:a="http://schemas.openxmlformats.org/drawingml/2006/main" xmlns:r="http://schemas.openxmlformats.org/officeDocument/2006/relationships" xmlns:mc="http://schemas.openxmlformats.org/markup-compatibility/2006" xmlns:mv="urn:schemas-microsoft-com:mac:vml" xmlns:p="http://schemas.openxmlformats.org/presentationml/2006/main" mc:Ignorable="mv" mc:PreserveAttributes="mv:*">
   <p:cSld>
     <p:spTree>
       <p:nvGrpSpPr>
@@ -1142,7 +1142,7 @@
     </p:spTree>
     <p:extLst>
       <p:ext uri="{BB962C8B-B14F-4D97-AF65-F5344CB8AC3E}">
-        <p14:creationId xmlns:p14="http://schemas.microsoft.com/office/powerpoint/2010/main" val="2322460532"/>
+        <p14:creationId xmlns:p14="http://schemas.microsoft.com/office/powerpoint/2010/main" xmlns:p="http://schemas.openxmlformats.org/presentationml/2006/main" xmlns:r="http://schemas.openxmlformats.org/officeDocument/2006/relationships" xmlns:a="http://schemas.openxmlformats.org/drawingml/2006/main" xmlns="" val="2322460532"/>
       </p:ext>
     </p:extLst>
   </p:cSld>
@@ -1153,7 +1153,7 @@
 </file>
 
 <file path=ppt/notesSlides/notesSlide5.xml><?xml version="1.0" encoding="utf-8"?>
-<p:notes xmlns:a="http://schemas.openxmlformats.org/drawingml/2006/main" xmlns:r="http://schemas.openxmlformats.org/officeDocument/2006/relationships" xmlns:p="http://schemas.openxmlformats.org/presentationml/2006/main">
+<p:notes xmlns:a="http://schemas.openxmlformats.org/drawingml/2006/main" xmlns:r="http://schemas.openxmlformats.org/officeDocument/2006/relationships" xmlns:mc="http://schemas.openxmlformats.org/markup-compatibility/2006" xmlns:mv="urn:schemas-microsoft-com:mac:vml" xmlns:p="http://schemas.openxmlformats.org/presentationml/2006/main" mc:Ignorable="mv" mc:PreserveAttributes="mv:*">
   <p:cSld>
     <p:spTree>
       <p:nvGrpSpPr>
@@ -1231,7 +1231,7 @@
     </p:spTree>
     <p:extLst>
       <p:ext uri="{BB962C8B-B14F-4D97-AF65-F5344CB8AC3E}">
-        <p14:creationId xmlns:p14="http://schemas.microsoft.com/office/powerpoint/2010/main" val="1970674551"/>
+        <p14:creationId xmlns:p14="http://schemas.microsoft.com/office/powerpoint/2010/main" xmlns:p="http://schemas.openxmlformats.org/presentationml/2006/main" xmlns:r="http://schemas.openxmlformats.org/officeDocument/2006/relationships" xmlns:a="http://schemas.openxmlformats.org/drawingml/2006/main" xmlns="" val="1970674551"/>
       </p:ext>
     </p:extLst>
   </p:cSld>
@@ -1242,7 +1242,7 @@
 </file>
 
 <file path=ppt/notesSlides/notesSlide6.xml><?xml version="1.0" encoding="utf-8"?>
-<p:notes xmlns:a="http://schemas.openxmlformats.org/drawingml/2006/main" xmlns:r="http://schemas.openxmlformats.org/officeDocument/2006/relationships" xmlns:p="http://schemas.openxmlformats.org/presentationml/2006/main">
+<p:notes xmlns:a="http://schemas.openxmlformats.org/drawingml/2006/main" xmlns:r="http://schemas.openxmlformats.org/officeDocument/2006/relationships" xmlns:mc="http://schemas.openxmlformats.org/markup-compatibility/2006" xmlns:mv="urn:schemas-microsoft-com:mac:vml" xmlns:p="http://schemas.openxmlformats.org/presentationml/2006/main" mc:Ignorable="mv" mc:PreserveAttributes="mv:*">
   <p:cSld>
     <p:spTree>
       <p:nvGrpSpPr>
@@ -1332,7 +1332,7 @@
     </p:spTree>
     <p:extLst>
       <p:ext uri="{BB962C8B-B14F-4D97-AF65-F5344CB8AC3E}">
-        <p14:creationId xmlns:p14="http://schemas.microsoft.com/office/powerpoint/2010/main" val="232248116"/>
+        <p14:creationId xmlns:p14="http://schemas.microsoft.com/office/powerpoint/2010/main" xmlns:p="http://schemas.openxmlformats.org/presentationml/2006/main" xmlns:r="http://schemas.openxmlformats.org/officeDocument/2006/relationships" xmlns:a="http://schemas.openxmlformats.org/drawingml/2006/main" xmlns="" val="232248116"/>
       </p:ext>
     </p:extLst>
   </p:cSld>
@@ -1343,7 +1343,7 @@
 </file>
 
 <file path=ppt/notesSlides/notesSlide7.xml><?xml version="1.0" encoding="utf-8"?>
-<p:notes xmlns:a="http://schemas.openxmlformats.org/drawingml/2006/main" xmlns:r="http://schemas.openxmlformats.org/officeDocument/2006/relationships" xmlns:p="http://schemas.openxmlformats.org/presentationml/2006/main">
+<p:notes xmlns:a="http://schemas.openxmlformats.org/drawingml/2006/main" xmlns:r="http://schemas.openxmlformats.org/officeDocument/2006/relationships" xmlns:mc="http://schemas.openxmlformats.org/markup-compatibility/2006" xmlns:mv="urn:schemas-microsoft-com:mac:vml" xmlns:p="http://schemas.openxmlformats.org/presentationml/2006/main" mc:Ignorable="mv" mc:PreserveAttributes="mv:*">
   <p:cSld>
     <p:spTree>
       <p:nvGrpSpPr>
@@ -1514,7 +1514,7 @@
     </p:spTree>
     <p:extLst>
       <p:ext uri="{BB962C8B-B14F-4D97-AF65-F5344CB8AC3E}">
-        <p14:creationId xmlns:p14="http://schemas.microsoft.com/office/powerpoint/2010/main" val="3955363709"/>
+        <p14:creationId xmlns:p14="http://schemas.microsoft.com/office/powerpoint/2010/main" xmlns:p="http://schemas.openxmlformats.org/presentationml/2006/main" xmlns:r="http://schemas.openxmlformats.org/officeDocument/2006/relationships" xmlns:a="http://schemas.openxmlformats.org/drawingml/2006/main" xmlns="" val="3955363709"/>
       </p:ext>
     </p:extLst>
   </p:cSld>
@@ -1525,7 +1525,7 @@
 </file>
 
 <file path=ppt/notesSlides/notesSlide8.xml><?xml version="1.0" encoding="utf-8"?>
-<p:notes xmlns:a="http://schemas.openxmlformats.org/drawingml/2006/main" xmlns:r="http://schemas.openxmlformats.org/officeDocument/2006/relationships" xmlns:p="http://schemas.openxmlformats.org/presentationml/2006/main">
+<p:notes xmlns:a="http://schemas.openxmlformats.org/drawingml/2006/main" xmlns:r="http://schemas.openxmlformats.org/officeDocument/2006/relationships" xmlns:mc="http://schemas.openxmlformats.org/markup-compatibility/2006" xmlns:mv="urn:schemas-microsoft-com:mac:vml" xmlns:p="http://schemas.openxmlformats.org/presentationml/2006/main" mc:Ignorable="mv" mc:PreserveAttributes="mv:*">
   <p:cSld>
     <p:spTree>
       <p:nvGrpSpPr>
@@ -1684,7 +1684,7 @@
     </p:spTree>
     <p:extLst>
       <p:ext uri="{BB962C8B-B14F-4D97-AF65-F5344CB8AC3E}">
-        <p14:creationId xmlns:p14="http://schemas.microsoft.com/office/powerpoint/2010/main" val="706395428"/>
+        <p14:creationId xmlns:p14="http://schemas.microsoft.com/office/powerpoint/2010/main" xmlns:p="http://schemas.openxmlformats.org/presentationml/2006/main" xmlns:r="http://schemas.openxmlformats.org/officeDocument/2006/relationships" xmlns:a="http://schemas.openxmlformats.org/drawingml/2006/main" xmlns="" val="706395428"/>
       </p:ext>
     </p:extLst>
   </p:cSld>
@@ -1695,7 +1695,7 @@
 </file>
 
 <file path=ppt/notesSlides/notesSlide9.xml><?xml version="1.0" encoding="utf-8"?>
-<p:notes xmlns:a="http://schemas.openxmlformats.org/drawingml/2006/main" xmlns:r="http://schemas.openxmlformats.org/officeDocument/2006/relationships" xmlns:p="http://schemas.openxmlformats.org/presentationml/2006/main">
+<p:notes xmlns:a="http://schemas.openxmlformats.org/drawingml/2006/main" xmlns:r="http://schemas.openxmlformats.org/officeDocument/2006/relationships" xmlns:mc="http://schemas.openxmlformats.org/markup-compatibility/2006" xmlns:mv="urn:schemas-microsoft-com:mac:vml" xmlns:p="http://schemas.openxmlformats.org/presentationml/2006/main" mc:Ignorable="mv" mc:PreserveAttributes="mv:*">
   <p:cSld>
     <p:spTree>
       <p:nvGrpSpPr>
@@ -1854,7 +1854,7 @@
     </p:spTree>
     <p:extLst>
       <p:ext uri="{BB962C8B-B14F-4D97-AF65-F5344CB8AC3E}">
-        <p14:creationId xmlns:p14="http://schemas.microsoft.com/office/powerpoint/2010/main" val="3872439166"/>
+        <p14:creationId xmlns:p14="http://schemas.microsoft.com/office/powerpoint/2010/main" xmlns:p="http://schemas.openxmlformats.org/presentationml/2006/main" xmlns:r="http://schemas.openxmlformats.org/officeDocument/2006/relationships" xmlns:a="http://schemas.openxmlformats.org/drawingml/2006/main" xmlns="" val="3872439166"/>
       </p:ext>
     </p:extLst>
   </p:cSld>
@@ -1865,7 +1865,7 @@
 </file>
 
 <file path=ppt/slideLayouts/slideLayout1.xml><?xml version="1.0" encoding="utf-8"?>
-<p:sldLayout xmlns:a="http://schemas.openxmlformats.org/drawingml/2006/main" xmlns:r="http://schemas.openxmlformats.org/officeDocument/2006/relationships" xmlns:p="http://schemas.openxmlformats.org/presentationml/2006/main" preserve="1">
+<p:sldLayout xmlns:a="http://schemas.openxmlformats.org/drawingml/2006/main" xmlns:r="http://schemas.openxmlformats.org/officeDocument/2006/relationships" xmlns:mc="http://schemas.openxmlformats.org/markup-compatibility/2006" xmlns:mv="urn:schemas-microsoft-com:mac:vml" xmlns:p="http://schemas.openxmlformats.org/presentationml/2006/main" mc:Ignorable="mv" mc:PreserveAttributes="mv:*" preserve="1">
   <p:cSld name="Title Slide">
     <p:spTree>
       <p:nvGrpSpPr>
@@ -2093,7 +2093,7 @@
 </file>
 
 <file path=ppt/slideLayouts/slideLayout10.xml><?xml version="1.0" encoding="utf-8"?>
-<p:sldLayout xmlns:a="http://schemas.openxmlformats.org/drawingml/2006/main" xmlns:r="http://schemas.openxmlformats.org/officeDocument/2006/relationships" xmlns:p="http://schemas.openxmlformats.org/presentationml/2006/main" type="picTx" preserve="1">
+<p:sldLayout xmlns:a="http://schemas.openxmlformats.org/drawingml/2006/main" xmlns:r="http://schemas.openxmlformats.org/officeDocument/2006/relationships" xmlns:mc="http://schemas.openxmlformats.org/markup-compatibility/2006" xmlns:mv="urn:schemas-microsoft-com:mac:vml" xmlns:p="http://schemas.openxmlformats.org/presentationml/2006/main" mc:Ignorable="mv" mc:PreserveAttributes="mv:*" type="picTx" preserve="1">
   <p:cSld name="Picture with Caption">
     <p:spTree>
       <p:nvGrpSpPr>
@@ -2419,7 +2419,7 @@
 </file>
 
 <file path=ppt/slideLayouts/slideLayout11.xml><?xml version="1.0" encoding="utf-8"?>
-<p:sldLayout xmlns:a="http://schemas.openxmlformats.org/drawingml/2006/main" xmlns:r="http://schemas.openxmlformats.org/officeDocument/2006/relationships" xmlns:p="http://schemas.openxmlformats.org/presentationml/2006/main" preserve="1">
+<p:sldLayout xmlns:a="http://schemas.openxmlformats.org/drawingml/2006/main" xmlns:r="http://schemas.openxmlformats.org/officeDocument/2006/relationships" xmlns:mc="http://schemas.openxmlformats.org/markup-compatibility/2006" xmlns:mv="urn:schemas-microsoft-com:mac:vml" xmlns:p="http://schemas.openxmlformats.org/presentationml/2006/main" mc:Ignorable="mv" mc:PreserveAttributes="mv:*" preserve="1">
   <p:cSld name="Picture above Caption">
     <p:spTree>
       <p:nvGrpSpPr>
@@ -2709,7 +2709,7 @@
 </file>
 
 <file path=ppt/slideLayouts/slideLayout12.xml><?xml version="1.0" encoding="utf-8"?>
-<p:sldLayout xmlns:a="http://schemas.openxmlformats.org/drawingml/2006/main" xmlns:r="http://schemas.openxmlformats.org/officeDocument/2006/relationships" xmlns:p="http://schemas.openxmlformats.org/presentationml/2006/main" preserve="1">
+<p:sldLayout xmlns:a="http://schemas.openxmlformats.org/drawingml/2006/main" xmlns:r="http://schemas.openxmlformats.org/officeDocument/2006/relationships" xmlns:mc="http://schemas.openxmlformats.org/markup-compatibility/2006" xmlns:mv="urn:schemas-microsoft-com:mac:vml" xmlns:p="http://schemas.openxmlformats.org/presentationml/2006/main" mc:Ignorable="mv" mc:PreserveAttributes="mv:*" preserve="1">
   <p:cSld name="2 Pictures with Caption">
     <p:spTree>
       <p:nvGrpSpPr>
@@ -3039,7 +3039,7 @@
 </file>
 
 <file path=ppt/slideLayouts/slideLayout13.xml><?xml version="1.0" encoding="utf-8"?>
-<p:sldLayout xmlns:a="http://schemas.openxmlformats.org/drawingml/2006/main" xmlns:r="http://schemas.openxmlformats.org/officeDocument/2006/relationships" xmlns:p="http://schemas.openxmlformats.org/presentationml/2006/main" preserve="1">
+<p:sldLayout xmlns:a="http://schemas.openxmlformats.org/drawingml/2006/main" xmlns:r="http://schemas.openxmlformats.org/officeDocument/2006/relationships" xmlns:mc="http://schemas.openxmlformats.org/markup-compatibility/2006" xmlns:mv="urn:schemas-microsoft-com:mac:vml" xmlns:p="http://schemas.openxmlformats.org/presentationml/2006/main" mc:Ignorable="mv" mc:PreserveAttributes="mv:*" preserve="1">
   <p:cSld name="3 Pictures with Caption">
     <p:spTree>
       <p:nvGrpSpPr>
@@ -3404,7 +3404,7 @@
 </file>
 
 <file path=ppt/slideLayouts/slideLayout14.xml><?xml version="1.0" encoding="utf-8"?>
-<p:sldLayout xmlns:a="http://schemas.openxmlformats.org/drawingml/2006/main" xmlns:r="http://schemas.openxmlformats.org/officeDocument/2006/relationships" xmlns:p="http://schemas.openxmlformats.org/presentationml/2006/main" type="vertTx" preserve="1">
+<p:sldLayout xmlns:a="http://schemas.openxmlformats.org/drawingml/2006/main" xmlns:r="http://schemas.openxmlformats.org/officeDocument/2006/relationships" xmlns:mc="http://schemas.openxmlformats.org/markup-compatibility/2006" xmlns:mv="urn:schemas-microsoft-com:mac:vml" xmlns:p="http://schemas.openxmlformats.org/presentationml/2006/main" mc:Ignorable="mv" mc:PreserveAttributes="mv:*" type="vertTx" preserve="1">
   <p:cSld name="Title and Vertical Text">
     <p:spTree>
       <p:nvGrpSpPr>
@@ -3574,7 +3574,7 @@
 </file>
 
 <file path=ppt/slideLayouts/slideLayout15.xml><?xml version="1.0" encoding="utf-8"?>
-<p:sldLayout xmlns:a="http://schemas.openxmlformats.org/drawingml/2006/main" xmlns:r="http://schemas.openxmlformats.org/officeDocument/2006/relationships" xmlns:p="http://schemas.openxmlformats.org/presentationml/2006/main" type="vertTitleAndTx" preserve="1">
+<p:sldLayout xmlns:a="http://schemas.openxmlformats.org/drawingml/2006/main" xmlns:r="http://schemas.openxmlformats.org/officeDocument/2006/relationships" xmlns:mc="http://schemas.openxmlformats.org/markup-compatibility/2006" xmlns:mv="urn:schemas-microsoft-com:mac:vml" xmlns:p="http://schemas.openxmlformats.org/presentationml/2006/main" mc:Ignorable="mv" mc:PreserveAttributes="mv:*" type="vertTitleAndTx" preserve="1">
   <p:cSld name="Vertical Title and Text">
     <p:spTree>
       <p:nvGrpSpPr>
@@ -3754,7 +3754,7 @@
 </file>
 
 <file path=ppt/slideLayouts/slideLayout2.xml><?xml version="1.0" encoding="utf-8"?>
-<p:sldLayout xmlns:a="http://schemas.openxmlformats.org/drawingml/2006/main" xmlns:r="http://schemas.openxmlformats.org/officeDocument/2006/relationships" xmlns:p="http://schemas.openxmlformats.org/presentationml/2006/main" type="obj" preserve="1">
+<p:sldLayout xmlns:a="http://schemas.openxmlformats.org/drawingml/2006/main" xmlns:r="http://schemas.openxmlformats.org/officeDocument/2006/relationships" xmlns:mc="http://schemas.openxmlformats.org/markup-compatibility/2006" xmlns:mv="urn:schemas-microsoft-com:mac:vml" xmlns:p="http://schemas.openxmlformats.org/presentationml/2006/main" mc:Ignorable="mv" mc:PreserveAttributes="mv:*" type="obj" preserve="1">
   <p:cSld name="Title and Content">
     <p:spTree>
       <p:nvGrpSpPr>
@@ -4018,7 +4018,7 @@
 </file>
 
 <file path=ppt/slideLayouts/slideLayout3.xml><?xml version="1.0" encoding="utf-8"?>
-<p:sldLayout xmlns:a="http://schemas.openxmlformats.org/drawingml/2006/main" xmlns:r="http://schemas.openxmlformats.org/officeDocument/2006/relationships" xmlns:p="http://schemas.openxmlformats.org/presentationml/2006/main" preserve="1">
+<p:sldLayout xmlns:a="http://schemas.openxmlformats.org/drawingml/2006/main" xmlns:r="http://schemas.openxmlformats.org/officeDocument/2006/relationships" xmlns:mc="http://schemas.openxmlformats.org/markup-compatibility/2006" xmlns:mv="urn:schemas-microsoft-com:mac:vml" xmlns:p="http://schemas.openxmlformats.org/presentationml/2006/main" mc:Ignorable="mv" mc:PreserveAttributes="mv:*" preserve="1">
   <p:cSld name="Title Slide with Picture">
     <p:spTree>
       <p:nvGrpSpPr>
@@ -4303,7 +4303,7 @@
 </file>
 
 <file path=ppt/slideLayouts/slideLayout4.xml><?xml version="1.0" encoding="utf-8"?>
-<p:sldLayout xmlns:a="http://schemas.openxmlformats.org/drawingml/2006/main" xmlns:r="http://schemas.openxmlformats.org/officeDocument/2006/relationships" xmlns:p="http://schemas.openxmlformats.org/presentationml/2006/main" type="secHead" preserve="1">
+<p:sldLayout xmlns:a="http://schemas.openxmlformats.org/drawingml/2006/main" xmlns:r="http://schemas.openxmlformats.org/officeDocument/2006/relationships" xmlns:mc="http://schemas.openxmlformats.org/markup-compatibility/2006" xmlns:mv="urn:schemas-microsoft-com:mac:vml" xmlns:p="http://schemas.openxmlformats.org/presentationml/2006/main" mc:Ignorable="mv" mc:PreserveAttributes="mv:*" type="secHead" preserve="1">
   <p:cSld name="Section Header">
     <p:spTree>
       <p:nvGrpSpPr>
@@ -4639,7 +4639,7 @@
 </file>
 
 <file path=ppt/slideLayouts/slideLayout5.xml><?xml version="1.0" encoding="utf-8"?>
-<p:sldLayout xmlns:a="http://schemas.openxmlformats.org/drawingml/2006/main" xmlns:r="http://schemas.openxmlformats.org/officeDocument/2006/relationships" xmlns:p="http://schemas.openxmlformats.org/presentationml/2006/main" type="twoObj" preserve="1">
+<p:sldLayout xmlns:a="http://schemas.openxmlformats.org/drawingml/2006/main" xmlns:r="http://schemas.openxmlformats.org/officeDocument/2006/relationships" xmlns:mc="http://schemas.openxmlformats.org/markup-compatibility/2006" xmlns:mv="urn:schemas-microsoft-com:mac:vml" xmlns:p="http://schemas.openxmlformats.org/presentationml/2006/main" mc:Ignorable="mv" mc:PreserveAttributes="mv:*" type="twoObj" preserve="1">
   <p:cSld name="Two Content">
     <p:spTree>
       <p:nvGrpSpPr>
@@ -4972,7 +4972,7 @@
 </file>
 
 <file path=ppt/slideLayouts/slideLayout6.xml><?xml version="1.0" encoding="utf-8"?>
-<p:sldLayout xmlns:a="http://schemas.openxmlformats.org/drawingml/2006/main" xmlns:r="http://schemas.openxmlformats.org/officeDocument/2006/relationships" xmlns:p="http://schemas.openxmlformats.org/presentationml/2006/main" type="twoTxTwoObj" preserve="1">
+<p:sldLayout xmlns:a="http://schemas.openxmlformats.org/drawingml/2006/main" xmlns:r="http://schemas.openxmlformats.org/officeDocument/2006/relationships" xmlns:mc="http://schemas.openxmlformats.org/markup-compatibility/2006" xmlns:mv="urn:schemas-microsoft-com:mac:vml" xmlns:p="http://schemas.openxmlformats.org/presentationml/2006/main" mc:Ignorable="mv" mc:PreserveAttributes="mv:*" type="twoTxTwoObj" preserve="1">
   <p:cSld name="Comparison">
     <p:spTree>
       <p:nvGrpSpPr>
@@ -5676,7 +5676,7 @@
 </file>
 
 <file path=ppt/slideLayouts/slideLayout7.xml><?xml version="1.0" encoding="utf-8"?>
-<p:sldLayout xmlns:a="http://schemas.openxmlformats.org/drawingml/2006/main" xmlns:r="http://schemas.openxmlformats.org/officeDocument/2006/relationships" xmlns:p="http://schemas.openxmlformats.org/presentationml/2006/main" type="titleOnly" preserve="1">
+<p:sldLayout xmlns:a="http://schemas.openxmlformats.org/drawingml/2006/main" xmlns:r="http://schemas.openxmlformats.org/officeDocument/2006/relationships" xmlns:mc="http://schemas.openxmlformats.org/markup-compatibility/2006" xmlns:mv="urn:schemas-microsoft-com:mac:vml" xmlns:p="http://schemas.openxmlformats.org/presentationml/2006/main" mc:Ignorable="mv" mc:PreserveAttributes="mv:*" type="titleOnly" preserve="1">
   <p:cSld name="Title Only">
     <p:spTree>
       <p:nvGrpSpPr>
@@ -5830,7 +5830,7 @@
 </file>
 
 <file path=ppt/slideLayouts/slideLayout8.xml><?xml version="1.0" encoding="utf-8"?>
-<p:sldLayout xmlns:a="http://schemas.openxmlformats.org/drawingml/2006/main" xmlns:r="http://schemas.openxmlformats.org/officeDocument/2006/relationships" xmlns:p="http://schemas.openxmlformats.org/presentationml/2006/main" type="blank" preserve="1">
+<p:sldLayout xmlns:a="http://schemas.openxmlformats.org/drawingml/2006/main" xmlns:r="http://schemas.openxmlformats.org/officeDocument/2006/relationships" xmlns:mc="http://schemas.openxmlformats.org/markup-compatibility/2006" xmlns:mv="urn:schemas-microsoft-com:mac:vml" xmlns:p="http://schemas.openxmlformats.org/presentationml/2006/main" mc:Ignorable="mv" mc:PreserveAttributes="mv:*" type="blank" preserve="1">
   <p:cSld name="Blank">
     <p:spTree>
       <p:nvGrpSpPr>
@@ -5997,7 +5997,7 @@
 </file>
 
 <file path=ppt/slideLayouts/slideLayout9.xml><?xml version="1.0" encoding="utf-8"?>
-<p:sldLayout xmlns:a="http://schemas.openxmlformats.org/drawingml/2006/main" xmlns:r="http://schemas.openxmlformats.org/officeDocument/2006/relationships" xmlns:p="http://schemas.openxmlformats.org/presentationml/2006/main" type="objTx" preserve="1">
+<p:sldLayout xmlns:a="http://schemas.openxmlformats.org/drawingml/2006/main" xmlns:r="http://schemas.openxmlformats.org/officeDocument/2006/relationships" xmlns:mc="http://schemas.openxmlformats.org/markup-compatibility/2006" xmlns:mv="urn:schemas-microsoft-com:mac:vml" xmlns:p="http://schemas.openxmlformats.org/presentationml/2006/main" mc:Ignorable="mv" mc:PreserveAttributes="mv:*" type="objTx" preserve="1">
   <p:cSld name="Content with Caption">
     <p:spTree>
       <p:nvGrpSpPr>
@@ -6375,7 +6375,7 @@
 </file>
 
 <file path=ppt/slideMasters/slideMaster1.xml><?xml version="1.0" encoding="utf-8"?>
-<p:sldMaster xmlns:a="http://schemas.openxmlformats.org/drawingml/2006/main" xmlns:r="http://schemas.openxmlformats.org/officeDocument/2006/relationships" xmlns:p="http://schemas.openxmlformats.org/presentationml/2006/main">
+<p:sldMaster xmlns:a="http://schemas.openxmlformats.org/drawingml/2006/main" xmlns:r="http://schemas.openxmlformats.org/officeDocument/2006/relationships" xmlns:mc="http://schemas.openxmlformats.org/markup-compatibility/2006" xmlns:mv="urn:schemas-microsoft-com:mac:vml" xmlns:p="http://schemas.openxmlformats.org/presentationml/2006/main" mc:Ignorable="mv" mc:PreserveAttributes="mv:*">
   <p:cSld>
     <p:bg>
       <p:bgRef idx="1001">
@@ -7032,7 +7032,7 @@
 </file>
 
 <file path=ppt/slides/slide1.xml><?xml version="1.0" encoding="utf-8"?>
-<p:sld xmlns:a="http://schemas.openxmlformats.org/drawingml/2006/main" xmlns:r="http://schemas.openxmlformats.org/officeDocument/2006/relationships" xmlns:p="http://schemas.openxmlformats.org/presentationml/2006/main">
+<p:sld xmlns:a="http://schemas.openxmlformats.org/drawingml/2006/main" xmlns:r="http://schemas.openxmlformats.org/officeDocument/2006/relationships" xmlns:mc="http://schemas.openxmlformats.org/markup-compatibility/2006" xmlns:mv="urn:schemas-microsoft-com:mac:vml" xmlns:p="http://schemas.openxmlformats.org/presentationml/2006/main" mc:Ignorable="mv" mc:PreserveAttributes="mv:*">
   <p:cSld>
     <p:spTree>
       <p:nvGrpSpPr>
@@ -7196,7 +7196,7 @@
     </p:spTree>
     <p:extLst>
       <p:ext uri="{BB962C8B-B14F-4D97-AF65-F5344CB8AC3E}">
-        <p14:creationId xmlns:p14="http://schemas.microsoft.com/office/powerpoint/2010/main" val="1681731650"/>
+        <p14:creationId xmlns:p14="http://schemas.microsoft.com/office/powerpoint/2010/main" xmlns:p="http://schemas.openxmlformats.org/presentationml/2006/main" xmlns:r="http://schemas.openxmlformats.org/officeDocument/2006/relationships" xmlns:a="http://schemas.openxmlformats.org/drawingml/2006/main" xmlns="" val="1681731650"/>
       </p:ext>
     </p:extLst>
   </p:cSld>
@@ -7206,7 +7206,7 @@
   <p:timing>
     <p:tnLst>
       <p:par>
-        <p:cTn xmlns:p14="http://schemas.microsoft.com/office/powerpoint/2010/main" id="1" dur="indefinite" restart="never" nodeType="tmRoot"/>
+        <p:cTn id="1" dur="indefinite" restart="never" nodeType="tmRoot"/>
       </p:par>
     </p:tnLst>
   </p:timing>
@@ -7214,7 +7214,7 @@
 </file>
 
 <file path=ppt/slides/slide10.xml><?xml version="1.0" encoding="utf-8"?>
-<p:sld xmlns:a="http://schemas.openxmlformats.org/drawingml/2006/main" xmlns:r="http://schemas.openxmlformats.org/officeDocument/2006/relationships" xmlns:p="http://schemas.openxmlformats.org/presentationml/2006/main">
+<p:sld xmlns:a="http://schemas.openxmlformats.org/drawingml/2006/main" xmlns:r="http://schemas.openxmlformats.org/officeDocument/2006/relationships" xmlns:mc="http://schemas.openxmlformats.org/markup-compatibility/2006" xmlns:mv="urn:schemas-microsoft-com:mac:vml" xmlns:p="http://schemas.openxmlformats.org/presentationml/2006/main" mc:Ignorable="mv" mc:PreserveAttributes="mv:*">
   <p:cSld>
     <p:spTree>
       <p:nvGrpSpPr>
@@ -7423,11 +7423,11 @@
   <p:clrMapOvr>
     <a:masterClrMapping/>
   </p:clrMapOvr>
-  <p:transition xmlns:p14="http://schemas.microsoft.com/office/powerpoint/2010/main"/>
+  <p:transition/>
   <p:timing>
     <p:tnLst>
       <p:par>
-        <p:cTn xmlns:p14="http://schemas.microsoft.com/office/powerpoint/2010/main" id="1" dur="indefinite" restart="never" nodeType="tmRoot"/>
+        <p:cTn id="1" dur="indefinite" restart="never" nodeType="tmRoot"/>
       </p:par>
     </p:tnLst>
   </p:timing>
@@ -7435,7 +7435,7 @@
 </file>
 
 <file path=ppt/slides/slide11.xml><?xml version="1.0" encoding="utf-8"?>
-<p:sld xmlns:a="http://schemas.openxmlformats.org/drawingml/2006/main" xmlns:r="http://schemas.openxmlformats.org/officeDocument/2006/relationships" xmlns:p="http://schemas.openxmlformats.org/presentationml/2006/main">
+<p:sld xmlns:a="http://schemas.openxmlformats.org/drawingml/2006/main" xmlns:r="http://schemas.openxmlformats.org/officeDocument/2006/relationships" xmlns:mc="http://schemas.openxmlformats.org/markup-compatibility/2006" xmlns:mv="urn:schemas-microsoft-com:mac:vml" xmlns:p="http://schemas.openxmlformats.org/presentationml/2006/main" mc:Ignorable="mv" mc:PreserveAttributes="mv:*">
   <p:cSld>
     <p:spTree>
       <p:nvGrpSpPr>
@@ -7578,7 +7578,7 @@
           <p:nvPr>
             <p:extLst>
               <p:ext uri="{D42A27DB-BD31-4B8C-83A1-F6EECF244321}">
-                <p14:modId xmlns:p14="http://schemas.microsoft.com/office/powerpoint/2010/main" val="3414472680"/>
+                <p14:modId xmlns:p14="http://schemas.microsoft.com/office/powerpoint/2010/main" xmlns:p="http://schemas.openxmlformats.org/presentationml/2006/main" xmlns:r="http://schemas.openxmlformats.org/officeDocument/2006/relationships" xmlns:a="http://schemas.openxmlformats.org/drawingml/2006/main" xmlns="" val="3414472680"/>
               </p:ext>
             </p:extLst>
           </p:nvPr>
@@ -8205,11 +8205,11 @@
   <p:clrMapOvr>
     <a:masterClrMapping/>
   </p:clrMapOvr>
-  <p:transition xmlns:p14="http://schemas.microsoft.com/office/powerpoint/2010/main"/>
+  <p:transition/>
   <p:timing>
     <p:tnLst>
       <p:par>
-        <p:cTn xmlns:p14="http://schemas.microsoft.com/office/powerpoint/2010/main" id="1" dur="indefinite" restart="never" nodeType="tmRoot"/>
+        <p:cTn id="1" dur="indefinite" restart="never" nodeType="tmRoot"/>
       </p:par>
     </p:tnLst>
   </p:timing>
@@ -8217,7 +8217,7 @@
 </file>
 
 <file path=ppt/slides/slide12.xml><?xml version="1.0" encoding="utf-8"?>
-<p:sld xmlns:a="http://schemas.openxmlformats.org/drawingml/2006/main" xmlns:r="http://schemas.openxmlformats.org/officeDocument/2006/relationships" xmlns:p="http://schemas.openxmlformats.org/presentationml/2006/main">
+<p:sld xmlns:a="http://schemas.openxmlformats.org/drawingml/2006/main" xmlns:r="http://schemas.openxmlformats.org/officeDocument/2006/relationships" xmlns:mc="http://schemas.openxmlformats.org/markup-compatibility/2006" xmlns:mv="urn:schemas-microsoft-com:mac:vml" xmlns:p="http://schemas.openxmlformats.org/presentationml/2006/main" mc:Ignorable="mv" mc:PreserveAttributes="mv:*">
   <p:cSld>
     <p:spTree>
       <p:nvGrpSpPr>
@@ -8399,7 +8399,7 @@
   <p:timing>
     <p:tnLst>
       <p:par>
-        <p:cTn xmlns:p14="http://schemas.microsoft.com/office/powerpoint/2010/main" id="1" dur="indefinite" restart="never" nodeType="tmRoot"/>
+        <p:cTn id="1" dur="indefinite" restart="never" nodeType="tmRoot"/>
       </p:par>
     </p:tnLst>
   </p:timing>
@@ -8407,7 +8407,7 @@
 </file>
 
 <file path=ppt/slides/slide13.xml><?xml version="1.0" encoding="utf-8"?>
-<p:sld xmlns:a="http://schemas.openxmlformats.org/drawingml/2006/main" xmlns:r="http://schemas.openxmlformats.org/officeDocument/2006/relationships" xmlns:p="http://schemas.openxmlformats.org/presentationml/2006/main">
+<p:sld xmlns:a="http://schemas.openxmlformats.org/drawingml/2006/main" xmlns:r="http://schemas.openxmlformats.org/officeDocument/2006/relationships" xmlns:mc="http://schemas.openxmlformats.org/markup-compatibility/2006" xmlns:mv="urn:schemas-microsoft-com:mac:vml" xmlns:p="http://schemas.openxmlformats.org/presentationml/2006/main" mc:Ignorable="mv" mc:PreserveAttributes="mv:*">
   <p:cSld>
     <p:spTree>
       <p:nvGrpSpPr>
@@ -8548,7 +8548,7 @@
           <p:nvPr>
             <p:extLst>
               <p:ext uri="{D42A27DB-BD31-4B8C-83A1-F6EECF244321}">
-                <p14:modId xmlns:p14="http://schemas.microsoft.com/office/powerpoint/2010/main" val="4007099573"/>
+                <p14:modId xmlns:p14="http://schemas.microsoft.com/office/powerpoint/2010/main" xmlns:p="http://schemas.openxmlformats.org/presentationml/2006/main" xmlns:r="http://schemas.openxmlformats.org/officeDocument/2006/relationships" xmlns:a="http://schemas.openxmlformats.org/drawingml/2006/main" xmlns="" val="4007099573"/>
               </p:ext>
             </p:extLst>
           </p:nvPr>
@@ -8951,7 +8951,7 @@
   <p:timing>
     <p:tnLst>
       <p:par>
-        <p:cTn xmlns:p14="http://schemas.microsoft.com/office/powerpoint/2010/main" id="1" dur="indefinite" restart="never" nodeType="tmRoot"/>
+        <p:cTn id="1" dur="indefinite" restart="never" nodeType="tmRoot"/>
       </p:par>
     </p:tnLst>
   </p:timing>
@@ -8959,7 +8959,7 @@
 </file>
 
 <file path=ppt/slides/slide14.xml><?xml version="1.0" encoding="utf-8"?>
-<p:sld xmlns:a="http://schemas.openxmlformats.org/drawingml/2006/main" xmlns:r="http://schemas.openxmlformats.org/officeDocument/2006/relationships" xmlns:p="http://schemas.openxmlformats.org/presentationml/2006/main">
+<p:sld xmlns:a="http://schemas.openxmlformats.org/drawingml/2006/main" xmlns:r="http://schemas.openxmlformats.org/officeDocument/2006/relationships" xmlns:mc="http://schemas.openxmlformats.org/markup-compatibility/2006" xmlns:mv="urn:schemas-microsoft-com:mac:vml" xmlns:p="http://schemas.openxmlformats.org/presentationml/2006/main" mc:Ignorable="mv" mc:PreserveAttributes="mv:*">
   <p:cSld>
     <p:spTree>
       <p:nvGrpSpPr>
@@ -9050,12 +9050,6 @@
               </a:rPr>
               <a:t>mport saga</a:t>
             </a:r>
-            <a:r>
-              <a:rPr lang="en-US" sz="2400" dirty="0" smtClean="0">
-                <a:latin typeface="Courier"/>
-              </a:rPr>
-              <a:t/>
-            </a:r>
             <a:br>
               <a:rPr lang="en-US" sz="2400" dirty="0" smtClean="0">
                 <a:latin typeface="Courier"/>
@@ -9071,13 +9065,7 @@
               <a:rPr lang="en-US" sz="2400" dirty="0" smtClean="0">
                 <a:latin typeface="Courier"/>
               </a:rPr>
-              <a:t> </a:t>
-            </a:r>
-            <a:r>
-              <a:rPr lang="en-US" sz="2400" dirty="0" smtClean="0">
-                <a:latin typeface="Courier"/>
-              </a:rPr>
-              <a:t>= </a:t>
+              <a:t> = </a:t>
             </a:r>
             <a:r>
               <a:rPr lang="en-US" sz="2400" dirty="0" err="1" smtClean="0">
@@ -9215,12 +9203,6 @@
                 <a:latin typeface="Courier"/>
               </a:rPr>
               <a:t>-copy")</a:t>
-            </a:r>
-            <a:r>
-              <a:rPr lang="en-US" sz="2400" dirty="0">
-                <a:latin typeface="Courier"/>
-              </a:rPr>
-              <a:t/>
             </a:r>
             <a:br>
               <a:rPr lang="en-US" sz="2400" dirty="0">
@@ -9380,7 +9362,7 @@
     </p:spTree>
     <p:extLst>
       <p:ext uri="{BB962C8B-B14F-4D97-AF65-F5344CB8AC3E}">
-        <p14:creationId xmlns:p14="http://schemas.microsoft.com/office/powerpoint/2010/main" val="943545212"/>
+        <p14:creationId xmlns:p14="http://schemas.microsoft.com/office/powerpoint/2010/main" xmlns:p="http://schemas.openxmlformats.org/presentationml/2006/main" xmlns:r="http://schemas.openxmlformats.org/officeDocument/2006/relationships" xmlns:a="http://schemas.openxmlformats.org/drawingml/2006/main" xmlns="" val="943545212"/>
       </p:ext>
     </p:extLst>
   </p:cSld>
@@ -9390,7 +9372,7 @@
   <p:timing>
     <p:tnLst>
       <p:par>
-        <p:cTn xmlns:p14="http://schemas.microsoft.com/office/powerpoint/2010/main" id="1" dur="indefinite" restart="never" nodeType="tmRoot"/>
+        <p:cTn id="1" dur="indefinite" restart="never" nodeType="tmRoot"/>
       </p:par>
     </p:tnLst>
   </p:timing>
@@ -9398,7 +9380,7 @@
 </file>
 
 <file path=ppt/slides/slide15.xml><?xml version="1.0" encoding="utf-8"?>
-<p:sld xmlns:a="http://schemas.openxmlformats.org/drawingml/2006/main" xmlns:r="http://schemas.openxmlformats.org/officeDocument/2006/relationships" xmlns:p="http://schemas.openxmlformats.org/presentationml/2006/main">
+<p:sld xmlns:a="http://schemas.openxmlformats.org/drawingml/2006/main" xmlns:r="http://schemas.openxmlformats.org/officeDocument/2006/relationships" xmlns:mc="http://schemas.openxmlformats.org/markup-compatibility/2006" xmlns:mv="urn:schemas-microsoft-com:mac:vml" xmlns:p="http://schemas.openxmlformats.org/presentationml/2006/main" mc:Ignorable="mv" mc:PreserveAttributes="mv:*">
   <p:cSld>
     <p:spTree>
       <p:nvGrpSpPr>
@@ -9480,13 +9462,7 @@
               <a:rPr lang="en-US" sz="2400" dirty="0" smtClean="0">
                 <a:latin typeface="Courier"/>
               </a:rPr>
-              <a:t>import </a:t>
-            </a:r>
-            <a:r>
-              <a:rPr lang="en-US" sz="2400" dirty="0" smtClean="0">
-                <a:latin typeface="Courier"/>
-              </a:rPr>
-              <a:t>saga</a:t>
+              <a:t>import saga</a:t>
             </a:r>
             <a:br>
               <a:rPr lang="en-US" sz="2400" dirty="0" smtClean="0">
@@ -9553,12 +9529,6 @@
               </a:rPr>
               <a:t>)</a:t>
             </a:r>
-            <a:r>
-              <a:rPr lang="en-US" sz="2400" dirty="0">
-                <a:latin typeface="Courier"/>
-              </a:rPr>
-              <a:t/>
-            </a:r>
             <a:br>
               <a:rPr lang="en-US" sz="2400" dirty="0">
                 <a:latin typeface="Courier"/>
@@ -9702,37 +9672,19 @@
               <a:rPr lang="en-US" sz="2400" dirty="0" smtClean="0">
                 <a:latin typeface="Courier"/>
               </a:rPr>
-              <a:t>()</a:t>
+              <a:t>():</a:t>
+            </a:r>
+            <a:r>
+              <a:rPr lang="en-US" sz="2400" dirty="0">
+                <a:latin typeface="Courier"/>
+              </a:rPr>
+              <a:t> </a:t>
             </a:r>
             <a:r>
               <a:rPr lang="en-US" sz="2400" dirty="0" smtClean="0">
                 <a:latin typeface="Courier"/>
               </a:rPr>
-              <a:t>:</a:t>
-            </a:r>
-            <a:r>
-              <a:rPr lang="en-US" sz="2400" dirty="0">
-                <a:latin typeface="Courier"/>
-              </a:rPr>
-              <a:t> </a:t>
-            </a:r>
-            <a:r>
-              <a:rPr lang="en-US" sz="2400" dirty="0" smtClean="0">
-                <a:latin typeface="Courier"/>
-              </a:rPr>
-              <a:t>   </a:t>
-            </a:r>
-            <a:r>
-              <a:rPr lang="en-US" sz="2400" dirty="0" smtClean="0">
-                <a:latin typeface="Courier"/>
-              </a:rPr>
-              <a:t>print </a:t>
-            </a:r>
-            <a:r>
-              <a:rPr lang="en-US" sz="2400" dirty="0" smtClean="0">
-                <a:latin typeface="Courier"/>
-              </a:rPr>
-              <a:t>'d ',  name</a:t>
+              <a:t>   print 'd ',  name</a:t>
             </a:r>
             <a:br>
               <a:rPr lang="en-US" sz="2400" dirty="0" smtClean="0">
@@ -9767,19 +9719,7 @@
               <a:rPr lang="en-US" sz="2400" dirty="0" smtClean="0">
                 <a:latin typeface="Courier"/>
               </a:rPr>
-              <a:t>()</a:t>
-            </a:r>
-            <a:r>
-              <a:rPr lang="en-US" sz="2400" dirty="0" smtClean="0">
-                <a:latin typeface="Courier"/>
-              </a:rPr>
-              <a:t>: print </a:t>
-            </a:r>
-            <a:r>
-              <a:rPr lang="en-US" sz="2400" dirty="0" smtClean="0">
-                <a:latin typeface="Courier"/>
-              </a:rPr>
-              <a:t>'-&gt;', </a:t>
+              <a:t>(): print '-&gt;', </a:t>
             </a:r>
             <a:r>
               <a:rPr lang="en-US" sz="2400" dirty="0" err="1" smtClean="0">
@@ -9802,37 +9742,19 @@
               <a:rPr lang="en-US" sz="2400" dirty="0" smtClean="0">
                 <a:latin typeface="Courier"/>
               </a:rPr>
-              <a:t>    </a:t>
+              <a:t>    else:</a:t>
+            </a:r>
+            <a:r>
+              <a:rPr lang="en-US" sz="2400" dirty="0">
+                <a:latin typeface="Courier"/>
+              </a:rPr>
+              <a:t> </a:t>
             </a:r>
             <a:r>
               <a:rPr lang="en-US" sz="2400" dirty="0" smtClean="0">
                 <a:latin typeface="Courier"/>
               </a:rPr>
-              <a:t>else:</a:t>
-            </a:r>
-            <a:r>
-              <a:rPr lang="en-US" sz="2400" dirty="0">
-                <a:latin typeface="Courier"/>
-              </a:rPr>
-              <a:t> </a:t>
-            </a:r>
-            <a:r>
-              <a:rPr lang="en-US" sz="2400" dirty="0" smtClean="0">
-                <a:latin typeface="Courier"/>
-              </a:rPr>
-              <a:t>             </a:t>
-            </a:r>
-            <a:r>
-              <a:rPr lang="en-US" sz="2400" dirty="0" smtClean="0">
-                <a:latin typeface="Courier"/>
-              </a:rPr>
-              <a:t>print </a:t>
-            </a:r>
-            <a:r>
-              <a:rPr lang="en-US" sz="2400" dirty="0" smtClean="0">
-                <a:latin typeface="Courier"/>
-              </a:rPr>
-              <a:t>'  ', name</a:t>
+              <a:t>             print '  ', name</a:t>
             </a:r>
           </a:p>
         </p:txBody>
@@ -9914,7 +9836,7 @@
     </p:spTree>
     <p:extLst>
       <p:ext uri="{BB962C8B-B14F-4D97-AF65-F5344CB8AC3E}">
-        <p14:creationId xmlns:p14="http://schemas.microsoft.com/office/powerpoint/2010/main" val="2110749326"/>
+        <p14:creationId xmlns:p14="http://schemas.microsoft.com/office/powerpoint/2010/main" xmlns:p="http://schemas.openxmlformats.org/presentationml/2006/main" xmlns:r="http://schemas.openxmlformats.org/officeDocument/2006/relationships" xmlns:a="http://schemas.openxmlformats.org/drawingml/2006/main" xmlns="" val="2110749326"/>
       </p:ext>
     </p:extLst>
   </p:cSld>
@@ -9924,7 +9846,7 @@
   <p:timing>
     <p:tnLst>
       <p:par>
-        <p:cTn xmlns:p14="http://schemas.microsoft.com/office/powerpoint/2010/main" id="1" dur="indefinite" restart="never" nodeType="tmRoot"/>
+        <p:cTn id="1" dur="indefinite" restart="never" nodeType="tmRoot"/>
       </p:par>
     </p:tnLst>
   </p:timing>
@@ -9932,7 +9854,7 @@
 </file>
 
 <file path=ppt/slides/slide16.xml><?xml version="1.0" encoding="utf-8"?>
-<p:sld xmlns:a="http://schemas.openxmlformats.org/drawingml/2006/main" xmlns:r="http://schemas.openxmlformats.org/officeDocument/2006/relationships" xmlns:p="http://schemas.openxmlformats.org/presentationml/2006/main">
+<p:sld xmlns:a="http://schemas.openxmlformats.org/drawingml/2006/main" xmlns:r="http://schemas.openxmlformats.org/officeDocument/2006/relationships" xmlns:mc="http://schemas.openxmlformats.org/markup-compatibility/2006" xmlns:mv="urn:schemas-microsoft-com:mac:vml" xmlns:p="http://schemas.openxmlformats.org/presentationml/2006/main" mc:Ignorable="mv" mc:PreserveAttributes="mv:*">
   <p:cSld>
     <p:spTree>
       <p:nvGrpSpPr>
@@ -10381,7 +10303,7 @@
     </p:spTree>
     <p:extLst>
       <p:ext uri="{BB962C8B-B14F-4D97-AF65-F5344CB8AC3E}">
-        <p14:creationId xmlns:p14="http://schemas.microsoft.com/office/powerpoint/2010/main" val="2059702227"/>
+        <p14:creationId xmlns:p14="http://schemas.microsoft.com/office/powerpoint/2010/main" xmlns:p="http://schemas.openxmlformats.org/presentationml/2006/main" xmlns:r="http://schemas.openxmlformats.org/officeDocument/2006/relationships" xmlns:a="http://schemas.openxmlformats.org/drawingml/2006/main" xmlns="" val="2059702227"/>
       </p:ext>
     </p:extLst>
   </p:cSld>
@@ -10392,7 +10314,7 @@
 </file>
 
 <file path=ppt/slides/slide17.xml><?xml version="1.0" encoding="utf-8"?>
-<p:sld xmlns:a="http://schemas.openxmlformats.org/drawingml/2006/main" xmlns:r="http://schemas.openxmlformats.org/officeDocument/2006/relationships" xmlns:p="http://schemas.openxmlformats.org/presentationml/2006/main">
+<p:sld xmlns:a="http://schemas.openxmlformats.org/drawingml/2006/main" xmlns:r="http://schemas.openxmlformats.org/officeDocument/2006/relationships" xmlns:mc="http://schemas.openxmlformats.org/markup-compatibility/2006" xmlns:mv="urn:schemas-microsoft-com:mac:vml" xmlns:p="http://schemas.openxmlformats.org/presentationml/2006/main" mc:Ignorable="mv" mc:PreserveAttributes="mv:*">
   <p:cSld>
     <p:spTree>
       <p:nvGrpSpPr>
@@ -10476,19 +10398,7 @@
               <a:rPr lang="en-US" sz="2400" dirty="0" smtClean="0">
                 <a:latin typeface="Courier"/>
               </a:rPr>
-              <a:t># </a:t>
-            </a:r>
-            <a:r>
-              <a:rPr lang="en-US" sz="2400" dirty="0" smtClean="0">
-                <a:latin typeface="Courier"/>
-              </a:rPr>
-              <a:t>host/process </a:t>
-            </a:r>
-            <a:r>
-              <a:rPr lang="en-US" sz="2400" dirty="0" smtClean="0">
-                <a:latin typeface="Courier"/>
-              </a:rPr>
-              <a:t>A</a:t>
+              <a:t># host/process A</a:t>
             </a:r>
             <a:br>
               <a:rPr lang="en-US" sz="2400" dirty="0" smtClean="0">
@@ -10569,12 +10479,6 @@
                 <a:latin typeface="Courier"/>
               </a:rPr>
               <a:t>")</a:t>
-            </a:r>
-            <a:r>
-              <a:rPr lang="en-US" sz="2400" dirty="0" smtClean="0">
-                <a:latin typeface="Courier"/>
-              </a:rPr>
-              <a:t/>
             </a:r>
             <a:br>
               <a:rPr lang="en-US" sz="2400" dirty="0" smtClean="0">
@@ -10676,13 +10580,7 @@
               <a:rPr lang="en-US" sz="2400" dirty="0" smtClean="0">
                 <a:latin typeface="Courier"/>
               </a:rPr>
-              <a:t># host/process </a:t>
-            </a:r>
-            <a:r>
-              <a:rPr lang="en-US" sz="2400" dirty="0" smtClean="0">
-                <a:latin typeface="Courier"/>
-              </a:rPr>
-              <a:t>B</a:t>
+              <a:t># host/process B</a:t>
             </a:r>
             <a:br>
               <a:rPr lang="en-US" sz="2400" dirty="0" smtClean="0">
@@ -10748,12 +10646,6 @@
               </a:rPr>
               <a:t>")</a:t>
             </a:r>
-            <a:r>
-              <a:rPr lang="en-US" sz="2400" dirty="0">
-                <a:latin typeface="Courier"/>
-              </a:rPr>
-              <a:t/>
-            </a:r>
             <a:br>
               <a:rPr lang="en-US" sz="2400" dirty="0">
                 <a:latin typeface="Courier"/>
@@ -10798,41 +10690,32 @@
               <a:rPr lang="en-US" sz="2400" dirty="0" smtClean="0">
                 <a:latin typeface="Courier"/>
               </a:rPr>
-              <a:t>started: " </a:t>
+              <a:t>started: " + </a:t>
+            </a:r>
+            <a:r>
+              <a:rPr lang="en-US" sz="2400" dirty="0" err="1" smtClean="0">
+                <a:latin typeface="Courier"/>
+              </a:rPr>
+              <a:t>e.get_attribute</a:t>
+            </a:r>
+            <a:r>
+              <a:rPr lang="en-US" sz="2400" dirty="0">
+                <a:latin typeface="Courier"/>
+              </a:rPr>
+              <a:t>("</a:t>
             </a:r>
             <a:r>
               <a:rPr lang="en-US" sz="2400" dirty="0" smtClean="0">
                 <a:latin typeface="Courier"/>
               </a:rPr>
-              <a:t>+ </a:t>
-            </a:r>
-            <a:r>
-              <a:rPr lang="en-US" sz="2400" dirty="0" err="1" smtClean="0">
-                <a:latin typeface="Courier"/>
-              </a:rPr>
-              <a:t>e.get_attribute</a:t>
+              <a:t>started</a:t>
             </a:r>
             <a:r>
               <a:rPr lang="en-US" sz="2400" dirty="0">
                 <a:latin typeface="Courier"/>
               </a:rPr>
-              <a:t>("</a:t>
-            </a:r>
-            <a:r>
-              <a:rPr lang="en-US" sz="2400" dirty="0" smtClean="0">
-                <a:latin typeface="Courier"/>
-              </a:rPr>
-              <a:t>started</a:t>
-            </a:r>
-            <a:r>
-              <a:rPr lang="en-US" sz="2400" dirty="0">
-                <a:latin typeface="Courier"/>
-              </a:rPr>
               <a:t>")</a:t>
             </a:r>
-            <a:endParaRPr lang="en-US" sz="2400" dirty="0">
-              <a:latin typeface="Courier"/>
-            </a:endParaRPr>
           </a:p>
         </p:txBody>
       </p:sp>
@@ -10909,7 +10792,7 @@
     </p:spTree>
     <p:extLst>
       <p:ext uri="{BB962C8B-B14F-4D97-AF65-F5344CB8AC3E}">
-        <p14:creationId xmlns:p14="http://schemas.microsoft.com/office/powerpoint/2010/main" val="2253681799"/>
+        <p14:creationId xmlns:p14="http://schemas.microsoft.com/office/powerpoint/2010/main" xmlns:p="http://schemas.openxmlformats.org/presentationml/2006/main" xmlns:r="http://schemas.openxmlformats.org/officeDocument/2006/relationships" xmlns:a="http://schemas.openxmlformats.org/drawingml/2006/main" xmlns="" val="2253681799"/>
       </p:ext>
     </p:extLst>
   </p:cSld>
@@ -10920,7 +10803,7 @@
 </file>
 
 <file path=ppt/slides/slide18.xml><?xml version="1.0" encoding="utf-8"?>
-<p:sld xmlns:a="http://schemas.openxmlformats.org/drawingml/2006/main" xmlns:r="http://schemas.openxmlformats.org/officeDocument/2006/relationships" xmlns:p="http://schemas.openxmlformats.org/presentationml/2006/main">
+<p:sld xmlns:a="http://schemas.openxmlformats.org/drawingml/2006/main" xmlns:r="http://schemas.openxmlformats.org/officeDocument/2006/relationships" xmlns:mc="http://schemas.openxmlformats.org/markup-compatibility/2006" xmlns:mv="urn:schemas-microsoft-com:mac:vml" xmlns:p="http://schemas.openxmlformats.org/presentationml/2006/main" mc:Ignorable="mv" mc:PreserveAttributes="mv:*">
   <p:cSld>
     <p:spTree>
       <p:nvGrpSpPr>
@@ -11110,31 +10993,19 @@
               <a:rPr lang="en-US" sz="2400" dirty="0" smtClean="0">
                 <a:latin typeface="Courier"/>
               </a:rPr>
-              <a:t>::file </a:t>
+              <a:t>::file f(</a:t>
+            </a:r>
+            <a:r>
+              <a:rPr lang="en-US" sz="2400" dirty="0" err="1" smtClean="0">
+                <a:latin typeface="Courier"/>
+              </a:rPr>
+              <a:t>src</a:t>
             </a:r>
             <a:r>
               <a:rPr lang="en-US" sz="2400" dirty="0" smtClean="0">
                 <a:latin typeface="Courier"/>
               </a:rPr>
-              <a:t>f(</a:t>
-            </a:r>
-            <a:r>
-              <a:rPr lang="en-US" sz="2400" dirty="0" err="1" smtClean="0">
-                <a:latin typeface="Courier"/>
-              </a:rPr>
-              <a:t>src</a:t>
-            </a:r>
-            <a:r>
-              <a:rPr lang="en-US" sz="2400" dirty="0" smtClean="0">
-                <a:latin typeface="Courier"/>
-              </a:rPr>
-              <a:t>, saga</a:t>
-            </a:r>
-            <a:r>
-              <a:rPr lang="en-US" sz="2400" dirty="0" smtClean="0">
-                <a:latin typeface="Courier"/>
-              </a:rPr>
-              <a:t>::</a:t>
+              <a:t>, saga::</a:t>
             </a:r>
             <a:r>
               <a:rPr lang="en-US" sz="2400" dirty="0" err="1" smtClean="0">
@@ -11271,7 +11142,7 @@
     </p:spTree>
     <p:extLst>
       <p:ext uri="{BB962C8B-B14F-4D97-AF65-F5344CB8AC3E}">
-        <p14:creationId xmlns:p14="http://schemas.microsoft.com/office/powerpoint/2010/main" val="3368190089"/>
+        <p14:creationId xmlns:p14="http://schemas.microsoft.com/office/powerpoint/2010/main" xmlns:p="http://schemas.openxmlformats.org/presentationml/2006/main" xmlns:r="http://schemas.openxmlformats.org/officeDocument/2006/relationships" xmlns:a="http://schemas.openxmlformats.org/drawingml/2006/main" xmlns="" val="3368190089"/>
       </p:ext>
     </p:extLst>
   </p:cSld>
@@ -11281,7 +11152,7 @@
   <p:timing>
     <p:tnLst>
       <p:par>
-        <p:cTn xmlns:p14="http://schemas.microsoft.com/office/powerpoint/2010/main" id="1" dur="indefinite" restart="never" nodeType="tmRoot"/>
+        <p:cTn id="1" dur="indefinite" restart="never" nodeType="tmRoot"/>
       </p:par>
     </p:tnLst>
   </p:timing>
@@ -11289,7 +11160,7 @@
 </file>
 
 <file path=ppt/slides/slide19.xml><?xml version="1.0" encoding="utf-8"?>
-<p:sld xmlns:a="http://schemas.openxmlformats.org/drawingml/2006/main" xmlns:r="http://schemas.openxmlformats.org/officeDocument/2006/relationships" xmlns:p="http://schemas.openxmlformats.org/presentationml/2006/main">
+<p:sld xmlns:a="http://schemas.openxmlformats.org/drawingml/2006/main" xmlns:r="http://schemas.openxmlformats.org/officeDocument/2006/relationships" xmlns:mc="http://schemas.openxmlformats.org/markup-compatibility/2006" xmlns:mv="urn:schemas-microsoft-com:mac:vml" xmlns:p="http://schemas.openxmlformats.org/presentationml/2006/main" mc:Ignorable="mv" mc:PreserveAttributes="mv:*">
   <p:cSld>
     <p:spTree>
       <p:nvGrpSpPr>
@@ -11436,35 +11307,21 @@
                 <a:latin typeface="Courier"/>
                 <a:cs typeface="Courier"/>
               </a:rPr>
-              <a:t>saga:</a:t>
+              <a:t>saga::</a:t>
+            </a:r>
+            <a:r>
+              <a:rPr lang="en-US" sz="2000" dirty="0" err="1" smtClean="0">
+                <a:latin typeface="Courier"/>
+                <a:cs typeface="Courier"/>
+              </a:rPr>
+              <a:t>filesystem</a:t>
             </a:r>
             <a:r>
               <a:rPr lang="en-US" sz="2000" dirty="0" smtClean="0">
                 <a:latin typeface="Courier"/>
                 <a:cs typeface="Courier"/>
               </a:rPr>
-              <a:t>:</a:t>
-            </a:r>
-            <a:r>
-              <a:rPr lang="en-US" sz="2000" dirty="0" err="1" smtClean="0">
-                <a:latin typeface="Courier"/>
-                <a:cs typeface="Courier"/>
-              </a:rPr>
-              <a:t>filesystem</a:t>
-            </a:r>
-            <a:r>
-              <a:rPr lang="en-US" sz="2000" dirty="0" smtClean="0">
-                <a:latin typeface="Courier"/>
-                <a:cs typeface="Courier"/>
-              </a:rPr>
-              <a:t>::directory </a:t>
-            </a:r>
-            <a:r>
-              <a:rPr lang="en-US" sz="2000" dirty="0" smtClean="0">
-                <a:latin typeface="Courier"/>
-                <a:cs typeface="Courier"/>
-              </a:rPr>
-              <a:t>d (</a:t>
+              <a:t>::directory d (</a:t>
             </a:r>
             <a:r>
               <a:rPr lang="en-US" sz="2000" dirty="0" err="1" smtClean="0">
@@ -11573,21 +11430,7 @@
                 <a:latin typeface="Courier"/>
                 <a:cs typeface="Courier"/>
               </a:rPr>
-              <a:t>for (</a:t>
-            </a:r>
-            <a:r>
-              <a:rPr lang="en-US" sz="2000" dirty="0" smtClean="0">
-                <a:latin typeface="Courier"/>
-                <a:cs typeface="Courier"/>
-              </a:rPr>
-              <a:t>auto it </a:t>
-            </a:r>
-            <a:r>
-              <a:rPr lang="en-US" sz="2000" dirty="0" smtClean="0">
-                <a:latin typeface="Courier"/>
-                <a:cs typeface="Courier"/>
-              </a:rPr>
-              <a:t>= </a:t>
+              <a:t>for (auto it = </a:t>
             </a:r>
             <a:r>
               <a:rPr lang="en-US" sz="2000" dirty="0" err="1" smtClean="0">
@@ -11896,7 +11739,7 @@
     </p:spTree>
     <p:extLst>
       <p:ext uri="{BB962C8B-B14F-4D97-AF65-F5344CB8AC3E}">
-        <p14:creationId xmlns:p14="http://schemas.microsoft.com/office/powerpoint/2010/main" val="2572922824"/>
+        <p14:creationId xmlns:p14="http://schemas.microsoft.com/office/powerpoint/2010/main" xmlns:p="http://schemas.openxmlformats.org/presentationml/2006/main" xmlns:r="http://schemas.openxmlformats.org/officeDocument/2006/relationships" xmlns:a="http://schemas.openxmlformats.org/drawingml/2006/main" xmlns="" val="2572922824"/>
       </p:ext>
     </p:extLst>
   </p:cSld>
@@ -11906,7 +11749,7 @@
   <p:timing>
     <p:tnLst>
       <p:par>
-        <p:cTn xmlns:p14="http://schemas.microsoft.com/office/powerpoint/2010/main" id="1" dur="indefinite" restart="never" nodeType="tmRoot"/>
+        <p:cTn id="1" dur="indefinite" restart="never" nodeType="tmRoot"/>
       </p:par>
     </p:tnLst>
   </p:timing>
@@ -11914,7 +11757,7 @@
 </file>
 
 <file path=ppt/slides/slide2.xml><?xml version="1.0" encoding="utf-8"?>
-<p:sld xmlns:a="http://schemas.openxmlformats.org/drawingml/2006/main" xmlns:r="http://schemas.openxmlformats.org/officeDocument/2006/relationships" xmlns:p="http://schemas.openxmlformats.org/presentationml/2006/main">
+<p:sld xmlns:a="http://schemas.openxmlformats.org/drawingml/2006/main" xmlns:r="http://schemas.openxmlformats.org/officeDocument/2006/relationships" xmlns:mc="http://schemas.openxmlformats.org/markup-compatibility/2006" xmlns:mv="urn:schemas-microsoft-com:mac:vml" xmlns:p="http://schemas.openxmlformats.org/presentationml/2006/main" mc:Ignorable="mv" mc:PreserveAttributes="mv:*">
   <p:cSld>
     <p:spTree>
       <p:nvGrpSpPr>
@@ -12077,7 +11920,7 @@
   <p:timing>
     <p:tnLst>
       <p:par>
-        <p:cTn xmlns:p14="http://schemas.microsoft.com/office/powerpoint/2010/main" id="1" dur="indefinite" restart="never" nodeType="tmRoot"/>
+        <p:cTn id="1" dur="indefinite" restart="never" nodeType="tmRoot"/>
       </p:par>
     </p:tnLst>
   </p:timing>
@@ -12085,7 +11928,7 @@
 </file>
 
 <file path=ppt/slides/slide20.xml><?xml version="1.0" encoding="utf-8"?>
-<p:sld xmlns:a="http://schemas.openxmlformats.org/drawingml/2006/main" xmlns:r="http://schemas.openxmlformats.org/officeDocument/2006/relationships" xmlns:p="http://schemas.openxmlformats.org/presentationml/2006/main">
+<p:sld xmlns:a="http://schemas.openxmlformats.org/drawingml/2006/main" xmlns:r="http://schemas.openxmlformats.org/officeDocument/2006/relationships" xmlns:mc="http://schemas.openxmlformats.org/markup-compatibility/2006" xmlns:mv="urn:schemas-microsoft-com:mac:vml" xmlns:p="http://schemas.openxmlformats.org/presentationml/2006/main" mc:Ignorable="mv" mc:PreserveAttributes="mv:*">
   <p:cSld>
     <p:spTree>
       <p:nvGrpSpPr>
@@ -12647,7 +12490,7 @@
     </p:spTree>
     <p:extLst>
       <p:ext uri="{BB962C8B-B14F-4D97-AF65-F5344CB8AC3E}">
-        <p14:creationId xmlns:p14="http://schemas.microsoft.com/office/powerpoint/2010/main" val="1169737179"/>
+        <p14:creationId xmlns:p14="http://schemas.microsoft.com/office/powerpoint/2010/main" xmlns:p="http://schemas.openxmlformats.org/presentationml/2006/main" xmlns:r="http://schemas.openxmlformats.org/officeDocument/2006/relationships" xmlns:a="http://schemas.openxmlformats.org/drawingml/2006/main" xmlns="" val="1169737179"/>
       </p:ext>
     </p:extLst>
   </p:cSld>
@@ -12658,7 +12501,7 @@
 </file>
 
 <file path=ppt/slides/slide21.xml><?xml version="1.0" encoding="utf-8"?>
-<p:sld xmlns:a="http://schemas.openxmlformats.org/drawingml/2006/main" xmlns:r="http://schemas.openxmlformats.org/officeDocument/2006/relationships" xmlns:p="http://schemas.openxmlformats.org/presentationml/2006/main">
+<p:sld xmlns:a="http://schemas.openxmlformats.org/drawingml/2006/main" xmlns:r="http://schemas.openxmlformats.org/officeDocument/2006/relationships" xmlns:mc="http://schemas.openxmlformats.org/markup-compatibility/2006" xmlns:mv="urn:schemas-microsoft-com:mac:vml" xmlns:p="http://schemas.openxmlformats.org/presentationml/2006/main" mc:Ignorable="mv" mc:PreserveAttributes="mv:*">
   <p:cSld>
     <p:spTree>
       <p:nvGrpSpPr>
@@ -13184,7 +13027,7 @@
     </p:spTree>
     <p:extLst>
       <p:ext uri="{BB962C8B-B14F-4D97-AF65-F5344CB8AC3E}">
-        <p14:creationId xmlns:p14="http://schemas.microsoft.com/office/powerpoint/2010/main" val="1188723698"/>
+        <p14:creationId xmlns:p14="http://schemas.microsoft.com/office/powerpoint/2010/main" xmlns:p="http://schemas.openxmlformats.org/presentationml/2006/main" xmlns:r="http://schemas.openxmlformats.org/officeDocument/2006/relationships" xmlns:a="http://schemas.openxmlformats.org/drawingml/2006/main" xmlns="" val="1188723698"/>
       </p:ext>
     </p:extLst>
   </p:cSld>
@@ -13195,7 +13038,7 @@
 </file>
 
 <file path=ppt/slides/slide22.xml><?xml version="1.0" encoding="utf-8"?>
-<p:sld xmlns:a="http://schemas.openxmlformats.org/drawingml/2006/main" xmlns:r="http://schemas.openxmlformats.org/officeDocument/2006/relationships" xmlns:p="http://schemas.openxmlformats.org/presentationml/2006/main">
+<p:sld xmlns:a="http://schemas.openxmlformats.org/drawingml/2006/main" xmlns:r="http://schemas.openxmlformats.org/officeDocument/2006/relationships" xmlns:mc="http://schemas.openxmlformats.org/markup-compatibility/2006" xmlns:mv="urn:schemas-microsoft-com:mac:vml" xmlns:p="http://schemas.openxmlformats.org/presentationml/2006/main" mc:Ignorable="mv" mc:PreserveAttributes="mv:*">
   <p:cSld>
     <p:spTree>
       <p:nvGrpSpPr>
@@ -13631,7 +13474,7 @@
     </p:spTree>
     <p:extLst>
       <p:ext uri="{BB962C8B-B14F-4D97-AF65-F5344CB8AC3E}">
-        <p14:creationId xmlns:p14="http://schemas.microsoft.com/office/powerpoint/2010/main" val="935873552"/>
+        <p14:creationId xmlns:p14="http://schemas.microsoft.com/office/powerpoint/2010/main" xmlns:p="http://schemas.openxmlformats.org/presentationml/2006/main" xmlns:r="http://schemas.openxmlformats.org/officeDocument/2006/relationships" xmlns:a="http://schemas.openxmlformats.org/drawingml/2006/main" xmlns="" val="935873552"/>
       </p:ext>
     </p:extLst>
   </p:cSld>
@@ -13641,7 +13484,7 @@
   <p:timing>
     <p:tnLst>
       <p:par>
-        <p:cTn xmlns:p14="http://schemas.microsoft.com/office/powerpoint/2010/main" id="1" dur="indefinite" restart="never" nodeType="tmRoot"/>
+        <p:cTn id="1" dur="indefinite" restart="never" nodeType="tmRoot"/>
       </p:par>
     </p:tnLst>
   </p:timing>
@@ -13649,7 +13492,7 @@
 </file>
 
 <file path=ppt/slides/slide23.xml><?xml version="1.0" encoding="utf-8"?>
-<p:sld xmlns:a="http://schemas.openxmlformats.org/drawingml/2006/main" xmlns:r="http://schemas.openxmlformats.org/officeDocument/2006/relationships" xmlns:p="http://schemas.openxmlformats.org/presentationml/2006/main">
+<p:sld xmlns:a="http://schemas.openxmlformats.org/drawingml/2006/main" xmlns:r="http://schemas.openxmlformats.org/officeDocument/2006/relationships" xmlns:mc="http://schemas.openxmlformats.org/markup-compatibility/2006" xmlns:mv="urn:schemas-microsoft-com:mac:vml" xmlns:p="http://schemas.openxmlformats.org/presentationml/2006/main" mc:Ignorable="mv" mc:PreserveAttributes="mv:*">
   <p:cSld>
     <p:spTree>
       <p:nvGrpSpPr>
@@ -13682,11 +13525,7 @@
           <a:p>
             <a:r>
               <a:rPr lang="en-US" dirty="0" smtClean="0"/>
-              <a:t>Additional Resources: Programmers </a:t>
-            </a:r>
-            <a:r>
-              <a:rPr lang="en-US" dirty="0" smtClean="0"/>
-              <a:t>Guide</a:t>
+              <a:t>Additional Resources: Programmers Guide</a:t>
             </a:r>
             <a:endParaRPr lang="en-US" dirty="0"/>
           </a:p>
@@ -13763,11 +13602,7 @@
             <a:pPr lvl="1" fontAlgn="ctr"/>
             <a:r>
               <a:rPr lang="en-US" sz="3600" dirty="0" smtClean="0"/>
-              <a:t>Stream (server/client</a:t>
-            </a:r>
-            <a:r>
-              <a:rPr lang="en-US" sz="3600" dirty="0" smtClean="0"/>
-              <a:t>)</a:t>
+              <a:t>Stream (server/client)</a:t>
             </a:r>
           </a:p>
           <a:p>
@@ -13878,7 +13713,7 @@
   <p:timing>
     <p:tnLst>
       <p:par>
-        <p:cTn xmlns:p14="http://schemas.microsoft.com/office/powerpoint/2010/main" id="1" dur="indefinite" restart="never" nodeType="tmRoot"/>
+        <p:cTn id="1" dur="indefinite" restart="never" nodeType="tmRoot"/>
       </p:par>
     </p:tnLst>
   </p:timing>
@@ -13886,7 +13721,7 @@
 </file>
 
 <file path=ppt/slides/slide24.xml><?xml version="1.0" encoding="utf-8"?>
-<p:sld xmlns:a="http://schemas.openxmlformats.org/drawingml/2006/main" xmlns:r="http://schemas.openxmlformats.org/officeDocument/2006/relationships" xmlns:p="http://schemas.openxmlformats.org/presentationml/2006/main">
+<p:sld xmlns:a="http://schemas.openxmlformats.org/drawingml/2006/main" xmlns:r="http://schemas.openxmlformats.org/officeDocument/2006/relationships" xmlns:mc="http://schemas.openxmlformats.org/markup-compatibility/2006" xmlns:mv="urn:schemas-microsoft-com:mac:vml" xmlns:p="http://schemas.openxmlformats.org/presentationml/2006/main" mc:Ignorable="mv" mc:PreserveAttributes="mv:*">
   <p:cSld>
     <p:spTree>
       <p:nvGrpSpPr>
@@ -14106,18 +13941,18 @@
     </p:spTree>
     <p:extLst>
       <p:ext uri="{BB962C8B-B14F-4D97-AF65-F5344CB8AC3E}">
-        <p14:creationId xmlns:p14="http://schemas.microsoft.com/office/powerpoint/2010/main" val="1850771897"/>
+        <p14:creationId xmlns:p14="http://schemas.microsoft.com/office/powerpoint/2010/main" xmlns:p="http://schemas.openxmlformats.org/presentationml/2006/main" xmlns:r="http://schemas.openxmlformats.org/officeDocument/2006/relationships" xmlns:a="http://schemas.openxmlformats.org/drawingml/2006/main" xmlns="" val="1850771897"/>
       </p:ext>
     </p:extLst>
   </p:cSld>
   <p:clrMapOvr>
     <a:masterClrMapping/>
   </p:clrMapOvr>
-  <p:transition xmlns:p14="http://schemas.microsoft.com/office/powerpoint/2010/main"/>
+  <p:transition/>
   <p:timing>
     <p:tnLst>
       <p:par>
-        <p:cTn xmlns:p14="http://schemas.microsoft.com/office/powerpoint/2010/main" id="1" dur="indefinite" restart="never" nodeType="tmRoot"/>
+        <p:cTn id="1" dur="indefinite" restart="never" nodeType="tmRoot"/>
       </p:par>
     </p:tnLst>
   </p:timing>
@@ -14125,7 +13960,7 @@
 </file>
 
 <file path=ppt/slides/slide25.xml><?xml version="1.0" encoding="utf-8"?>
-<p:sld xmlns:a="http://schemas.openxmlformats.org/drawingml/2006/main" xmlns:r="http://schemas.openxmlformats.org/officeDocument/2006/relationships" xmlns:p="http://schemas.openxmlformats.org/presentationml/2006/main">
+<p:sld xmlns:a="http://schemas.openxmlformats.org/drawingml/2006/main" xmlns:r="http://schemas.openxmlformats.org/officeDocument/2006/relationships" xmlns:mc="http://schemas.openxmlformats.org/markup-compatibility/2006" xmlns:mv="urn:schemas-microsoft-com:mac:vml" xmlns:p="http://schemas.openxmlformats.org/presentationml/2006/main" mc:Ignorable="mv" mc:PreserveAttributes="mv:*">
   <p:cSld>
     <p:spTree>
       <p:nvGrpSpPr>
@@ -14257,33 +14092,33 @@
               <a:rPr lang="en-US" dirty="0" smtClean="0"/>
               <a:t>The source code can be found here (see ‘Example1’):</a:t>
             </a:r>
+            <a:endParaRPr lang="en-US" dirty="0" smtClean="0"/>
           </a:p>
           <a:p>
             <a:pPr lvl="1"/>
             <a:r>
-              <a:rPr lang="en-US" dirty="0" smtClean="0"/>
-              <a:t>http://faust.cct.lsu.edu/trac/saga/wiki/		</a:t>
-            </a:r>
-            <a:r>
               <a:rPr lang="en-US" dirty="0" smtClean="0">
-                <a:solidFill>
-                  <a:srgbClr val="FF0000"/>
-                </a:solidFill>
-              </a:rPr>
-              <a:t>FIXME</a:t>
-            </a:r>
-            <a:endParaRPr lang="en-US" dirty="0" smtClean="0">
-              <a:solidFill>
-                <a:srgbClr val="FF0000"/>
-              </a:solidFill>
-              <a:hlinkClick r:id="rId3"/>
-            </a:endParaRPr>
-          </a:p>
-          <a:p>
-            <a:pPr lvl="1" fontAlgn="ctr"/>
+                <a:hlinkClick r:id="rId3"/>
+              </a:rPr>
+              <a:t>https://svn.cct.lsu.edu/repos/saga/core/trunk/examples/</a:t>
+            </a:r>
+            <a:r>
+              <a:rPr lang="en-US" dirty="0" smtClean="0">
+                <a:hlinkClick r:id="rId3"/>
+              </a:rPr>
+              <a:t>tutorial</a:t>
+            </a:r>
+            <a:endParaRPr lang="en-US" dirty="0" smtClean="0"/>
+          </a:p>
+          <a:p>
+            <a:pPr lvl="1"/>
+            <a:r>
+              <a:rPr lang="en-US" sz="2800" dirty="0" smtClean="0"/>
+              <a:t>The </a:t>
+            </a:r>
             <a:r>
               <a:rPr lang="en-US" sz="2800" dirty="0"/>
-              <a:t>The example uses </a:t>
+              <a:t>example uses </a:t>
             </a:r>
             <a:r>
               <a:rPr lang="en-US" sz="2800" dirty="0" err="1"/>
@@ -14300,7 +14135,7 @@
             <a:endParaRPr lang="en-US" sz="2800" dirty="0"/>
           </a:p>
           <a:p>
-            <a:pPr lvl="1" fontAlgn="ctr"/>
+            <a:pPr lvl="2" fontAlgn="ctr"/>
             <a:r>
               <a:rPr lang="en-US" dirty="0" smtClean="0"/>
               <a:t>For remote execution change HOST1, HOST2, HOST3 from "</a:t>
@@ -14311,20 +14146,13 @@
             </a:r>
             <a:r>
               <a:rPr lang="en-US" dirty="0" smtClean="0"/>
-              <a:t>" to "</a:t>
-            </a:r>
-            <a:r>
-              <a:rPr lang="en-US" dirty="0" smtClean="0">
-                <a:solidFill>
-                  <a:srgbClr val="FF0000"/>
-                </a:solidFill>
-              </a:rPr>
-              <a:t>FIXME</a:t>
+              <a:t>" </a:t>
             </a:r>
             <a:r>
               <a:rPr lang="en-US" dirty="0" smtClean="0"/>
-              <a:t>"</a:t>
-            </a:r>
+              <a:t>to</a:t>
+            </a:r>
+            <a:endParaRPr lang="en-US" dirty="0" smtClean="0"/>
           </a:p>
         </p:txBody>
       </p:sp>
@@ -14407,11 +14235,11 @@
   <p:clrMapOvr>
     <a:masterClrMapping/>
   </p:clrMapOvr>
-  <p:transition xmlns:p14="http://schemas.microsoft.com/office/powerpoint/2010/main"/>
+  <p:transition/>
   <p:timing>
     <p:tnLst>
       <p:par>
-        <p:cTn xmlns:p14="http://schemas.microsoft.com/office/powerpoint/2010/main" id="1" dur="indefinite" restart="never" nodeType="tmRoot"/>
+        <p:cTn id="1" dur="indefinite" restart="never" nodeType="tmRoot"/>
       </p:par>
     </p:tnLst>
   </p:timing>
@@ -14419,7 +14247,7 @@
 </file>
 
 <file path=ppt/slides/slide26.xml><?xml version="1.0" encoding="utf-8"?>
-<p:sld xmlns:a="http://schemas.openxmlformats.org/drawingml/2006/main" xmlns:r="http://schemas.openxmlformats.org/officeDocument/2006/relationships" xmlns:p="http://schemas.openxmlformats.org/presentationml/2006/main">
+<p:sld xmlns:a="http://schemas.openxmlformats.org/drawingml/2006/main" xmlns:r="http://schemas.openxmlformats.org/officeDocument/2006/relationships" xmlns:mc="http://schemas.openxmlformats.org/markup-compatibility/2006" xmlns:mv="urn:schemas-microsoft-com:mac:vml" xmlns:p="http://schemas.openxmlformats.org/presentationml/2006/main" mc:Ignorable="mv" mc:PreserveAttributes="mv:*">
   <p:cSld>
     <p:spTree>
       <p:nvGrpSpPr>
@@ -14660,7 +14488,7 @@
   <p:timing>
     <p:tnLst>
       <p:par>
-        <p:cTn xmlns:p14="http://schemas.microsoft.com/office/powerpoint/2010/main" id="1" dur="indefinite" restart="never" nodeType="tmRoot"/>
+        <p:cTn id="1" dur="indefinite" restart="never" nodeType="tmRoot"/>
       </p:par>
     </p:tnLst>
   </p:timing>
@@ -14668,7 +14496,7 @@
 </file>
 
 <file path=ppt/slides/slide27.xml><?xml version="1.0" encoding="utf-8"?>
-<p:sld xmlns:a="http://schemas.openxmlformats.org/drawingml/2006/main" xmlns:r="http://schemas.openxmlformats.org/officeDocument/2006/relationships" xmlns:p="http://schemas.openxmlformats.org/presentationml/2006/main">
+<p:sld xmlns:a="http://schemas.openxmlformats.org/drawingml/2006/main" xmlns:r="http://schemas.openxmlformats.org/officeDocument/2006/relationships" xmlns:mc="http://schemas.openxmlformats.org/markup-compatibility/2006" xmlns:mv="urn:schemas-microsoft-com:mac:vml" xmlns:p="http://schemas.openxmlformats.org/presentationml/2006/main" mc:Ignorable="mv" mc:PreserveAttributes="mv:*">
   <p:cSld>
     <p:spTree>
       <p:nvGrpSpPr>
@@ -14881,7 +14709,7 @@
   <p:timing>
     <p:tnLst>
       <p:par>
-        <p:cTn xmlns:p14="http://schemas.microsoft.com/office/powerpoint/2010/main" id="1" dur="indefinite" restart="never" nodeType="tmRoot"/>
+        <p:cTn id="1" dur="indefinite" restart="never" nodeType="tmRoot"/>
       </p:par>
     </p:tnLst>
   </p:timing>
@@ -14889,7 +14717,7 @@
 </file>
 
 <file path=ppt/slides/slide28.xml><?xml version="1.0" encoding="utf-8"?>
-<p:sld xmlns:a="http://schemas.openxmlformats.org/drawingml/2006/main" xmlns:r="http://schemas.openxmlformats.org/officeDocument/2006/relationships" xmlns:p="http://schemas.openxmlformats.org/presentationml/2006/main">
+<p:sld xmlns:a="http://schemas.openxmlformats.org/drawingml/2006/main" xmlns:r="http://schemas.openxmlformats.org/officeDocument/2006/relationships" xmlns:mc="http://schemas.openxmlformats.org/markup-compatibility/2006" xmlns:mv="urn:schemas-microsoft-com:mac:vml" xmlns:p="http://schemas.openxmlformats.org/presentationml/2006/main" mc:Ignorable="mv" mc:PreserveAttributes="mv:*">
   <p:cSld>
     <p:spTree>
       <p:nvGrpSpPr>
@@ -15091,7 +14919,7 @@
     </p:spTree>
     <p:extLst>
       <p:ext uri="{BB962C8B-B14F-4D97-AF65-F5344CB8AC3E}">
-        <p14:creationId xmlns:p14="http://schemas.microsoft.com/office/powerpoint/2010/main" val="2615391202"/>
+        <p14:creationId xmlns:p14="http://schemas.microsoft.com/office/powerpoint/2010/main" xmlns:p="http://schemas.openxmlformats.org/presentationml/2006/main" xmlns:r="http://schemas.openxmlformats.org/officeDocument/2006/relationships" xmlns:a="http://schemas.openxmlformats.org/drawingml/2006/main" xmlns="" val="2615391202"/>
       </p:ext>
     </p:extLst>
   </p:cSld>
@@ -15101,7 +14929,7 @@
   <p:timing>
     <p:tnLst>
       <p:par>
-        <p:cTn xmlns:p14="http://schemas.microsoft.com/office/powerpoint/2010/main" id="1" dur="indefinite" restart="never" nodeType="tmRoot"/>
+        <p:cTn id="1" dur="indefinite" restart="never" nodeType="tmRoot"/>
       </p:par>
     </p:tnLst>
   </p:timing>
@@ -15109,7 +14937,7 @@
 </file>
 
 <file path=ppt/slides/slide3.xml><?xml version="1.0" encoding="utf-8"?>
-<p:sld xmlns:a="http://schemas.openxmlformats.org/drawingml/2006/main" xmlns:r="http://schemas.openxmlformats.org/officeDocument/2006/relationships" xmlns:p="http://schemas.openxmlformats.org/presentationml/2006/main">
+<p:sld xmlns:a="http://schemas.openxmlformats.org/drawingml/2006/main" xmlns:r="http://schemas.openxmlformats.org/officeDocument/2006/relationships" xmlns:mc="http://schemas.openxmlformats.org/markup-compatibility/2006" xmlns:mv="urn:schemas-microsoft-com:mac:vml" xmlns:p="http://schemas.openxmlformats.org/presentationml/2006/main" mc:Ignorable="mv" mc:PreserveAttributes="mv:*">
   <p:cSld>
     <p:spTree>
       <p:nvGrpSpPr>
@@ -15161,14 +14989,14 @@
         </p:nvSpPr>
         <p:spPr>
           <a:xfrm>
-            <a:off x="1447159" y="2942035"/>
-            <a:ext cx="11303641" cy="5970078"/>
+            <a:off x="1447159" y="2942034"/>
+            <a:ext cx="11303641" cy="6201965"/>
           </a:xfrm>
           <a:ln/>
         </p:spPr>
         <p:txBody>
           <a:bodyPr>
-            <a:normAutofit fontScale="92500" lnSpcReduction="10000"/>
+            <a:normAutofit fontScale="85000" lnSpcReduction="10000"/>
           </a:bodyPr>
           <a:lstStyle/>
           <a:p>
@@ -15287,6 +15115,52 @@
                 <a:srgbClr val="B70000"/>
               </a:solidFill>
             </a:endParaRPr>
+          </a:p>
+          <a:p>
+            <a:pPr marL="477527" indent="-477838"/>
+            <a:r>
+              <a:rPr lang="en-US" dirty="0" smtClean="0">
+                <a:solidFill>
+                  <a:srgbClr val="B70000"/>
+                </a:solidFill>
+              </a:rPr>
+              <a:t>Example Code:</a:t>
+            </a:r>
+          </a:p>
+          <a:p>
+            <a:pPr marL="965200" lvl="1" indent="-477838"/>
+            <a:r>
+              <a:rPr lang="en-US" dirty="0" smtClean="0">
+                <a:solidFill>
+                  <a:srgbClr val="B70000"/>
+                </a:solidFill>
+              </a:rPr>
+              <a:t>https</a:t>
+            </a:r>
+            <a:r>
+              <a:rPr lang="en-US" dirty="0" smtClean="0">
+                <a:solidFill>
+                  <a:srgbClr val="B70000"/>
+                </a:solidFill>
+              </a:rPr>
+              <a:t>://</a:t>
+            </a:r>
+            <a:r>
+              <a:rPr lang="en-US" dirty="0" err="1" smtClean="0">
+                <a:solidFill>
+                  <a:srgbClr val="B70000"/>
+                </a:solidFill>
+              </a:rPr>
+              <a:t>svn.cct.lsu.edu</a:t>
+            </a:r>
+            <a:r>
+              <a:rPr lang="en-US" dirty="0" smtClean="0">
+                <a:solidFill>
+                  <a:srgbClr val="B70000"/>
+                </a:solidFill>
+              </a:rPr>
+              <a:t>/repos/saga/core/trunk/examples/</a:t>
+            </a:r>
           </a:p>
           <a:p>
             <a:pPr marL="487362" lvl="1" indent="0">
@@ -15392,11 +15266,11 @@
   <p:clrMapOvr>
     <a:masterClrMapping/>
   </p:clrMapOvr>
-  <p:transition xmlns:p14="http://schemas.microsoft.com/office/powerpoint/2010/main"/>
+  <p:transition/>
   <p:timing>
     <p:tnLst>
       <p:par>
-        <p:cTn xmlns:p14="http://schemas.microsoft.com/office/powerpoint/2010/main" id="1" dur="indefinite" restart="never" nodeType="tmRoot"/>
+        <p:cTn id="1" dur="indefinite" restart="never" nodeType="tmRoot"/>
       </p:par>
     </p:tnLst>
   </p:timing>
@@ -15404,7 +15278,7 @@
 </file>
 
 <file path=ppt/slides/slide4.xml><?xml version="1.0" encoding="utf-8"?>
-<p:sld xmlns:a="http://schemas.openxmlformats.org/drawingml/2006/main" xmlns:r="http://schemas.openxmlformats.org/officeDocument/2006/relationships" xmlns:p="http://schemas.openxmlformats.org/presentationml/2006/main">
+<p:sld xmlns:a="http://schemas.openxmlformats.org/drawingml/2006/main" xmlns:r="http://schemas.openxmlformats.org/officeDocument/2006/relationships" xmlns:mc="http://schemas.openxmlformats.org/markup-compatibility/2006" xmlns:mv="urn:schemas-microsoft-com:mac:vml" xmlns:p="http://schemas.openxmlformats.org/presentationml/2006/main" mc:Ignorable="mv" mc:PreserveAttributes="mv:*">
   <p:cSld>
     <p:spTree>
       <p:nvGrpSpPr>
@@ -15581,7 +15455,7 @@
     </p:spTree>
     <p:extLst>
       <p:ext uri="{BB962C8B-B14F-4D97-AF65-F5344CB8AC3E}">
-        <p14:creationId xmlns:p14="http://schemas.microsoft.com/office/powerpoint/2010/main" val="2457049260"/>
+        <p14:creationId xmlns:p14="http://schemas.microsoft.com/office/powerpoint/2010/main" xmlns:p="http://schemas.openxmlformats.org/presentationml/2006/main" xmlns:r="http://schemas.openxmlformats.org/officeDocument/2006/relationships" xmlns:a="http://schemas.openxmlformats.org/drawingml/2006/main" xmlns="" val="2457049260"/>
       </p:ext>
     </p:extLst>
   </p:cSld>
@@ -15592,7 +15466,7 @@
 </file>
 
 <file path=ppt/slides/slide5.xml><?xml version="1.0" encoding="utf-8"?>
-<p:sld xmlns:a="http://schemas.openxmlformats.org/drawingml/2006/main" xmlns:r="http://schemas.openxmlformats.org/officeDocument/2006/relationships" xmlns:p="http://schemas.openxmlformats.org/presentationml/2006/main">
+<p:sld xmlns:a="http://schemas.openxmlformats.org/drawingml/2006/main" xmlns:r="http://schemas.openxmlformats.org/officeDocument/2006/relationships" xmlns:mc="http://schemas.openxmlformats.org/markup-compatibility/2006" xmlns:mv="urn:schemas-microsoft-com:mac:vml" xmlns:p="http://schemas.openxmlformats.org/presentationml/2006/main" mc:Ignorable="mv" mc:PreserveAttributes="mv:*">
   <p:cSld>
     <p:spTree>
       <p:nvGrpSpPr>
@@ -15756,18 +15630,18 @@
     </p:spTree>
     <p:extLst>
       <p:ext uri="{BB962C8B-B14F-4D97-AF65-F5344CB8AC3E}">
-        <p14:creationId xmlns:p14="http://schemas.microsoft.com/office/powerpoint/2010/main" val="2448934113"/>
+        <p14:creationId xmlns:p14="http://schemas.microsoft.com/office/powerpoint/2010/main" xmlns:p="http://schemas.openxmlformats.org/presentationml/2006/main" xmlns:r="http://schemas.openxmlformats.org/officeDocument/2006/relationships" xmlns:a="http://schemas.openxmlformats.org/drawingml/2006/main" xmlns="" val="2448934113"/>
       </p:ext>
     </p:extLst>
   </p:cSld>
   <p:clrMapOvr>
     <a:masterClrMapping/>
   </p:clrMapOvr>
-  <p:transition xmlns:p14="http://schemas.microsoft.com/office/powerpoint/2010/main"/>
+  <p:transition/>
   <p:timing>
     <p:tnLst>
       <p:par>
-        <p:cTn xmlns:p14="http://schemas.microsoft.com/office/powerpoint/2010/main" id="1" dur="indefinite" restart="never" nodeType="tmRoot"/>
+        <p:cTn id="1" dur="indefinite" restart="never" nodeType="tmRoot"/>
       </p:par>
     </p:tnLst>
   </p:timing>
@@ -15775,7 +15649,7 @@
 </file>
 
 <file path=ppt/slides/slide6.xml><?xml version="1.0" encoding="utf-8"?>
-<p:sld xmlns:a="http://schemas.openxmlformats.org/drawingml/2006/main" xmlns:r="http://schemas.openxmlformats.org/officeDocument/2006/relationships" xmlns:p="http://schemas.openxmlformats.org/presentationml/2006/main">
+<p:sld xmlns:a="http://schemas.openxmlformats.org/drawingml/2006/main" xmlns:r="http://schemas.openxmlformats.org/officeDocument/2006/relationships" xmlns:mc="http://schemas.openxmlformats.org/markup-compatibility/2006" xmlns:mv="urn:schemas-microsoft-com:mac:vml" xmlns:p="http://schemas.openxmlformats.org/presentationml/2006/main" mc:Ignorable="mv" mc:PreserveAttributes="mv:*">
   <p:cSld>
     <p:spTree>
       <p:nvGrpSpPr>
@@ -15824,7 +15698,7 @@
             <p:ph idx="1"/>
             <p:extLst>
               <p:ext uri="{D42A27DB-BD31-4B8C-83A1-F6EECF244321}">
-                <p14:modId xmlns:p14="http://schemas.microsoft.com/office/powerpoint/2010/main" val="2475253389"/>
+                <p14:modId xmlns:p14="http://schemas.microsoft.com/office/powerpoint/2010/main" xmlns:p="http://schemas.openxmlformats.org/presentationml/2006/main" xmlns:r="http://schemas.openxmlformats.org/officeDocument/2006/relationships" xmlns:a="http://schemas.openxmlformats.org/drawingml/2006/main" xmlns="" val="2475253389"/>
               </p:ext>
             </p:extLst>
           </p:nvPr>
@@ -16751,7 +16625,7 @@
     </p:spTree>
     <p:extLst>
       <p:ext uri="{BB962C8B-B14F-4D97-AF65-F5344CB8AC3E}">
-        <p14:creationId xmlns:p14="http://schemas.microsoft.com/office/powerpoint/2010/main" val="4167202409"/>
+        <p14:creationId xmlns:p14="http://schemas.microsoft.com/office/powerpoint/2010/main" xmlns:p="http://schemas.openxmlformats.org/presentationml/2006/main" xmlns:r="http://schemas.openxmlformats.org/officeDocument/2006/relationships" xmlns:a="http://schemas.openxmlformats.org/drawingml/2006/main" xmlns="" val="4167202409"/>
       </p:ext>
     </p:extLst>
   </p:cSld>
@@ -16761,7 +16635,7 @@
   <p:timing>
     <p:tnLst>
       <p:par>
-        <p:cTn xmlns:p14="http://schemas.microsoft.com/office/powerpoint/2010/main" id="1" dur="indefinite" restart="never" nodeType="tmRoot"/>
+        <p:cTn id="1" dur="indefinite" restart="never" nodeType="tmRoot"/>
       </p:par>
     </p:tnLst>
   </p:timing>
@@ -16769,7 +16643,7 @@
 </file>
 
 <file path=ppt/slides/slide7.xml><?xml version="1.0" encoding="utf-8"?>
-<p:sld xmlns:a="http://schemas.openxmlformats.org/drawingml/2006/main" xmlns:r="http://schemas.openxmlformats.org/officeDocument/2006/relationships" xmlns:p="http://schemas.openxmlformats.org/presentationml/2006/main">
+<p:sld xmlns:a="http://schemas.openxmlformats.org/drawingml/2006/main" xmlns:r="http://schemas.openxmlformats.org/officeDocument/2006/relationships" xmlns:mc="http://schemas.openxmlformats.org/markup-compatibility/2006" xmlns:mv="urn:schemas-microsoft-com:mac:vml" xmlns:p="http://schemas.openxmlformats.org/presentationml/2006/main" mc:Ignorable="mv" mc:PreserveAttributes="mv:*">
   <p:cSld>
     <p:spTree>
       <p:nvGrpSpPr>
@@ -16874,15 +16748,7 @@
             </a:r>
             <a:r>
               <a:rPr lang="en-US" dirty="0" smtClean="0"/>
-              <a:t>	$</a:t>
-            </a:r>
-            <a:r>
-              <a:rPr lang="en-US" dirty="0" smtClean="0"/>
-              <a:t>SAGA_ROOT/</a:t>
-            </a:r>
-            <a:r>
-              <a:rPr lang="en-US" dirty="0" smtClean="0"/>
-              <a:t>tools/</a:t>
+              <a:t>	$SAGA_ROOT/tools/</a:t>
             </a:r>
             <a:r>
               <a:rPr lang="en-US" dirty="0" err="1" smtClean="0"/>
@@ -16910,15 +16776,7 @@
             </a:pPr>
             <a:r>
               <a:rPr lang="en-US" dirty="0" smtClean="0"/>
-              <a:t>saga-job 	$</a:t>
-            </a:r>
-            <a:r>
-              <a:rPr lang="en-US" dirty="0" smtClean="0"/>
-              <a:t>SAGA_ROOT/</a:t>
-            </a:r>
-            <a:r>
-              <a:rPr lang="en-US" dirty="0" smtClean="0"/>
-              <a:t>tools/</a:t>
+              <a:t>saga-job 	$SAGA_ROOT/tools/</a:t>
             </a:r>
             <a:r>
               <a:rPr lang="en-US" dirty="0" err="1" smtClean="0"/>
@@ -16945,15 +16803,7 @@
             </a:r>
             <a:r>
               <a:rPr lang="en-US" dirty="0" smtClean="0"/>
-              <a:t>	$</a:t>
-            </a:r>
-            <a:r>
-              <a:rPr lang="en-US" dirty="0" smtClean="0"/>
-              <a:t>SAGA_ROOT/</a:t>
-            </a:r>
-            <a:r>
-              <a:rPr lang="en-US" dirty="0" smtClean="0"/>
-              <a:t>tools/</a:t>
+              <a:t>	$SAGA_ROOT/tools/</a:t>
             </a:r>
             <a:r>
               <a:rPr lang="en-US" dirty="0" err="1" smtClean="0"/>
@@ -16976,15 +16826,7 @@
             </a:pPr>
             <a:r>
               <a:rPr lang="en-US" dirty="0" smtClean="0"/>
-              <a:t>saga-shell	$</a:t>
-            </a:r>
-            <a:r>
-              <a:rPr lang="en-US" dirty="0" smtClean="0"/>
-              <a:t>SAGA_ROOT/</a:t>
-            </a:r>
-            <a:r>
-              <a:rPr lang="en-US" dirty="0" smtClean="0"/>
-              <a:t>tools/shell/</a:t>
+              <a:t>saga-shell	$SAGA_ROOT/tools/shell/</a:t>
             </a:r>
             <a:endParaRPr lang="en-US" dirty="0"/>
           </a:p>
@@ -17065,11 +16907,11 @@
   <p:clrMapOvr>
     <a:masterClrMapping/>
   </p:clrMapOvr>
-  <p:transition xmlns:p14="http://schemas.microsoft.com/office/powerpoint/2010/main"/>
+  <p:transition/>
   <p:timing>
     <p:tnLst>
       <p:par>
-        <p:cTn xmlns:p14="http://schemas.microsoft.com/office/powerpoint/2010/main" id="1" dur="indefinite" restart="never" nodeType="tmRoot"/>
+        <p:cTn id="1" dur="indefinite" restart="never" nodeType="tmRoot"/>
       </p:par>
     </p:tnLst>
   </p:timing>
@@ -17077,7 +16919,7 @@
 </file>
 
 <file path=ppt/slides/slide8.xml><?xml version="1.0" encoding="utf-8"?>
-<p:sld xmlns:a="http://schemas.openxmlformats.org/drawingml/2006/main" xmlns:r="http://schemas.openxmlformats.org/officeDocument/2006/relationships" xmlns:p="http://schemas.openxmlformats.org/presentationml/2006/main">
+<p:sld xmlns:a="http://schemas.openxmlformats.org/drawingml/2006/main" xmlns:r="http://schemas.openxmlformats.org/officeDocument/2006/relationships" xmlns:mc="http://schemas.openxmlformats.org/markup-compatibility/2006" xmlns:mv="urn:schemas-microsoft-com:mac:vml" xmlns:p="http://schemas.openxmlformats.org/presentationml/2006/main" mc:Ignorable="mv" mc:PreserveAttributes="mv:*">
   <p:cSld>
     <p:spTree>
       <p:nvGrpSpPr>
@@ -17246,7 +17088,7 @@
           <p:nvPr>
             <p:extLst>
               <p:ext uri="{D42A27DB-BD31-4B8C-83A1-F6EECF244321}">
-                <p14:modId xmlns:p14="http://schemas.microsoft.com/office/powerpoint/2010/main" val="3768818699"/>
+                <p14:modId xmlns:p14="http://schemas.microsoft.com/office/powerpoint/2010/main" xmlns:p="http://schemas.openxmlformats.org/presentationml/2006/main" xmlns:r="http://schemas.openxmlformats.org/officeDocument/2006/relationships" xmlns:a="http://schemas.openxmlformats.org/drawingml/2006/main" xmlns="" val="3768818699"/>
               </p:ext>
             </p:extLst>
           </p:nvPr>
@@ -17541,11 +17383,11 @@
   <p:clrMapOvr>
     <a:masterClrMapping/>
   </p:clrMapOvr>
-  <p:transition xmlns:p14="http://schemas.microsoft.com/office/powerpoint/2010/main"/>
+  <p:transition/>
   <p:timing>
     <p:tnLst>
       <p:par>
-        <p:cTn xmlns:p14="http://schemas.microsoft.com/office/powerpoint/2010/main" id="1" dur="indefinite" restart="never" nodeType="tmRoot"/>
+        <p:cTn id="1" dur="indefinite" restart="never" nodeType="tmRoot"/>
       </p:par>
     </p:tnLst>
   </p:timing>
@@ -17553,7 +17395,7 @@
 </file>
 
 <file path=ppt/slides/slide9.xml><?xml version="1.0" encoding="utf-8"?>
-<p:sld xmlns:a="http://schemas.openxmlformats.org/drawingml/2006/main" xmlns:r="http://schemas.openxmlformats.org/officeDocument/2006/relationships" xmlns:p="http://schemas.openxmlformats.org/presentationml/2006/main">
+<p:sld xmlns:a="http://schemas.openxmlformats.org/drawingml/2006/main" xmlns:r="http://schemas.openxmlformats.org/officeDocument/2006/relationships" xmlns:mc="http://schemas.openxmlformats.org/markup-compatibility/2006" xmlns:mv="urn:schemas-microsoft-com:mac:vml" xmlns:p="http://schemas.openxmlformats.org/presentationml/2006/main" mc:Ignorable="mv" mc:PreserveAttributes="mv:*">
   <p:cSld>
     <p:spTree>
       <p:nvGrpSpPr>
@@ -17722,7 +17564,7 @@
           <p:nvPr>
             <p:extLst>
               <p:ext uri="{D42A27DB-BD31-4B8C-83A1-F6EECF244321}">
-                <p14:modId xmlns:p14="http://schemas.microsoft.com/office/powerpoint/2010/main" val="1142005977"/>
+                <p14:modId xmlns:p14="http://schemas.microsoft.com/office/powerpoint/2010/main" xmlns:p="http://schemas.openxmlformats.org/presentationml/2006/main" xmlns:r="http://schemas.openxmlformats.org/officeDocument/2006/relationships" xmlns:a="http://schemas.openxmlformats.org/drawingml/2006/main" xmlns="" val="1142005977"/>
               </p:ext>
             </p:extLst>
           </p:nvPr>
@@ -18095,11 +17937,11 @@
   <p:clrMapOvr>
     <a:masterClrMapping/>
   </p:clrMapOvr>
-  <p:transition xmlns:p14="http://schemas.microsoft.com/office/powerpoint/2010/main"/>
+  <p:transition/>
   <p:timing>
     <p:tnLst>
       <p:par>
-        <p:cTn xmlns:p14="http://schemas.microsoft.com/office/powerpoint/2010/main" id="1" dur="indefinite" restart="never" nodeType="tmRoot"/>
+        <p:cTn id="1" dur="indefinite" restart="never" nodeType="tmRoot"/>
       </p:par>
     </p:tnLst>
   </p:timing>

</xml_diff>